<commit_message>
Conceptual Modelling - 1
</commit_message>
<xml_diff>
--- a/GATE/images/gate_images.pptx
+++ b/GATE/images/gate_images.pptx
@@ -6,6 +6,8 @@
   </p:sldMasterIdLst>
   <p:sldIdLst>
     <p:sldId id="256" r:id="rId3"/>
+    <p:sldId id="257" r:id="rId4"/>
+    <p:sldId id="258" r:id="rId5"/>
   </p:sldIdLst>
   <p:sldSz cx="10080625" cy="5670550"/>
   <p:notesSz cx="7559675" cy="10691812"/>
@@ -53,7 +55,7 @@
       </p:grpSpPr>
       <p:sp>
         <p:nvSpPr>
-          <p:cNvPr id="26" name="PlaceHolder 1"/>
+          <p:cNvPr id="23" name="PlaceHolder 1"/>
           <p:cNvSpPr>
             <a:spLocks noGrp="1"/>
           </p:cNvSpPr>
@@ -64,7 +66,7 @@
         <p:spPr>
           <a:xfrm>
             <a:off x="504000" y="226080"/>
-            <a:ext cx="9071640" cy="946440"/>
+            <a:ext cx="9071280" cy="946080"/>
           </a:xfrm>
           <a:prstGeom prst="rect">
             <a:avLst/>
@@ -84,7 +86,7 @@
       </p:sp>
       <p:sp>
         <p:nvSpPr>
-          <p:cNvPr id="27" name="PlaceHolder 2"/>
+          <p:cNvPr id="24" name="PlaceHolder 2"/>
           <p:cNvSpPr>
             <a:spLocks noGrp="1"/>
           </p:cNvSpPr>
@@ -95,7 +97,7 @@
         <p:spPr>
           <a:xfrm>
             <a:off x="504000" y="1326600"/>
-            <a:ext cx="9071640" cy="1568160"/>
+            <a:ext cx="9072000" cy="1568520"/>
           </a:xfrm>
           <a:prstGeom prst="rect">
             <a:avLst/>
@@ -114,7 +116,7 @@
       </p:sp>
       <p:sp>
         <p:nvSpPr>
-          <p:cNvPr id="28" name="PlaceHolder 3"/>
+          <p:cNvPr id="25" name="PlaceHolder 3"/>
           <p:cNvSpPr>
             <a:spLocks noGrp="1"/>
           </p:cNvSpPr>
@@ -124,8 +126,8 @@
         </p:nvSpPr>
         <p:spPr>
           <a:xfrm>
-            <a:off x="504000" y="3044160"/>
-            <a:ext cx="9071640" cy="1568160"/>
+            <a:off x="504000" y="3044520"/>
+            <a:ext cx="9072000" cy="1568520"/>
           </a:xfrm>
           <a:prstGeom prst="rect">
             <a:avLst/>
@@ -166,7 +168,7 @@
       </p:grpSpPr>
       <p:sp>
         <p:nvSpPr>
-          <p:cNvPr id="29" name="PlaceHolder 1"/>
+          <p:cNvPr id="26" name="PlaceHolder 1"/>
           <p:cNvSpPr>
             <a:spLocks noGrp="1"/>
           </p:cNvSpPr>
@@ -177,7 +179,7 @@
         <p:spPr>
           <a:xfrm>
             <a:off x="504000" y="226080"/>
-            <a:ext cx="9071640" cy="946440"/>
+            <a:ext cx="9071280" cy="946080"/>
           </a:xfrm>
           <a:prstGeom prst="rect">
             <a:avLst/>
@@ -197,7 +199,7 @@
       </p:sp>
       <p:sp>
         <p:nvSpPr>
-          <p:cNvPr id="30" name="PlaceHolder 2"/>
+          <p:cNvPr id="27" name="PlaceHolder 2"/>
           <p:cNvSpPr>
             <a:spLocks noGrp="1"/>
           </p:cNvSpPr>
@@ -208,7 +210,7 @@
         <p:spPr>
           <a:xfrm>
             <a:off x="504000" y="1326600"/>
-            <a:ext cx="4426920" cy="1568160"/>
+            <a:ext cx="4426920" cy="1568520"/>
           </a:xfrm>
           <a:prstGeom prst="rect">
             <a:avLst/>
@@ -227,7 +229,7 @@
       </p:sp>
       <p:sp>
         <p:nvSpPr>
-          <p:cNvPr id="31" name="PlaceHolder 3"/>
+          <p:cNvPr id="28" name="PlaceHolder 3"/>
           <p:cNvSpPr>
             <a:spLocks noGrp="1"/>
           </p:cNvSpPr>
@@ -238,7 +240,7 @@
         <p:spPr>
           <a:xfrm>
             <a:off x="5152680" y="1326600"/>
-            <a:ext cx="4426920" cy="1568160"/>
+            <a:ext cx="4426920" cy="1568520"/>
           </a:xfrm>
           <a:prstGeom prst="rect">
             <a:avLst/>
@@ -257,7 +259,7 @@
       </p:sp>
       <p:sp>
         <p:nvSpPr>
-          <p:cNvPr id="32" name="PlaceHolder 4"/>
+          <p:cNvPr id="29" name="PlaceHolder 4"/>
           <p:cNvSpPr>
             <a:spLocks noGrp="1"/>
           </p:cNvSpPr>
@@ -267,8 +269,8 @@
         </p:nvSpPr>
         <p:spPr>
           <a:xfrm>
-            <a:off x="504000" y="3044160"/>
-            <a:ext cx="4426920" cy="1568160"/>
+            <a:off x="504000" y="3044520"/>
+            <a:ext cx="4426920" cy="1568520"/>
           </a:xfrm>
           <a:prstGeom prst="rect">
             <a:avLst/>
@@ -287,7 +289,7 @@
       </p:sp>
       <p:sp>
         <p:nvSpPr>
-          <p:cNvPr id="33" name="PlaceHolder 5"/>
+          <p:cNvPr id="30" name="PlaceHolder 5"/>
           <p:cNvSpPr>
             <a:spLocks noGrp="1"/>
           </p:cNvSpPr>
@@ -297,8 +299,8 @@
         </p:nvSpPr>
         <p:spPr>
           <a:xfrm>
-            <a:off x="5152680" y="3044160"/>
-            <a:ext cx="4426920" cy="1568160"/>
+            <a:off x="5152680" y="3044520"/>
+            <a:ext cx="4426920" cy="1568520"/>
           </a:xfrm>
           <a:prstGeom prst="rect">
             <a:avLst/>
@@ -339,7 +341,7 @@
       </p:grpSpPr>
       <p:sp>
         <p:nvSpPr>
-          <p:cNvPr id="34" name="PlaceHolder 1"/>
+          <p:cNvPr id="31" name="PlaceHolder 1"/>
           <p:cNvSpPr>
             <a:spLocks noGrp="1"/>
           </p:cNvSpPr>
@@ -350,7 +352,7 @@
         <p:spPr>
           <a:xfrm>
             <a:off x="504000" y="226080"/>
-            <a:ext cx="9071640" cy="946440"/>
+            <a:ext cx="9071280" cy="946080"/>
           </a:xfrm>
           <a:prstGeom prst="rect">
             <a:avLst/>
@@ -370,7 +372,7 @@
       </p:sp>
       <p:sp>
         <p:nvSpPr>
-          <p:cNvPr id="35" name="PlaceHolder 2"/>
+          <p:cNvPr id="32" name="PlaceHolder 2"/>
           <p:cNvSpPr>
             <a:spLocks noGrp="1"/>
           </p:cNvSpPr>
@@ -381,7 +383,7 @@
         <p:spPr>
           <a:xfrm>
             <a:off x="504000" y="1326600"/>
-            <a:ext cx="2920680" cy="1568160"/>
+            <a:ext cx="2921040" cy="1568520"/>
           </a:xfrm>
           <a:prstGeom prst="rect">
             <a:avLst/>
@@ -400,7 +402,7 @@
       </p:sp>
       <p:sp>
         <p:nvSpPr>
-          <p:cNvPr id="36" name="PlaceHolder 3"/>
+          <p:cNvPr id="33" name="PlaceHolder 3"/>
           <p:cNvSpPr>
             <a:spLocks noGrp="1"/>
           </p:cNvSpPr>
@@ -410,8 +412,8 @@
         </p:nvSpPr>
         <p:spPr>
           <a:xfrm>
-            <a:off x="3571200" y="1326600"/>
-            <a:ext cx="2920680" cy="1568160"/>
+            <a:off x="3571560" y="1326600"/>
+            <a:ext cx="2921040" cy="1568520"/>
           </a:xfrm>
           <a:prstGeom prst="rect">
             <a:avLst/>
@@ -430,7 +432,7 @@
       </p:sp>
       <p:sp>
         <p:nvSpPr>
-          <p:cNvPr id="37" name="PlaceHolder 4"/>
+          <p:cNvPr id="34" name="PlaceHolder 4"/>
           <p:cNvSpPr>
             <a:spLocks noGrp="1"/>
           </p:cNvSpPr>
@@ -440,8 +442,8 @@
         </p:nvSpPr>
         <p:spPr>
           <a:xfrm>
-            <a:off x="6638040" y="1326600"/>
-            <a:ext cx="2920680" cy="1568160"/>
+            <a:off x="6639120" y="1326600"/>
+            <a:ext cx="2921040" cy="1568520"/>
           </a:xfrm>
           <a:prstGeom prst="rect">
             <a:avLst/>
@@ -460,7 +462,7 @@
       </p:sp>
       <p:sp>
         <p:nvSpPr>
-          <p:cNvPr id="38" name="PlaceHolder 5"/>
+          <p:cNvPr id="35" name="PlaceHolder 5"/>
           <p:cNvSpPr>
             <a:spLocks noGrp="1"/>
           </p:cNvSpPr>
@@ -470,8 +472,8 @@
         </p:nvSpPr>
         <p:spPr>
           <a:xfrm>
-            <a:off x="504000" y="3044160"/>
-            <a:ext cx="2920680" cy="1568160"/>
+            <a:off x="504000" y="3044520"/>
+            <a:ext cx="2921040" cy="1568520"/>
           </a:xfrm>
           <a:prstGeom prst="rect">
             <a:avLst/>
@@ -490,7 +492,7 @@
       </p:sp>
       <p:sp>
         <p:nvSpPr>
-          <p:cNvPr id="39" name="PlaceHolder 6"/>
+          <p:cNvPr id="36" name="PlaceHolder 6"/>
           <p:cNvSpPr>
             <a:spLocks noGrp="1"/>
           </p:cNvSpPr>
@@ -500,8 +502,8 @@
         </p:nvSpPr>
         <p:spPr>
           <a:xfrm>
-            <a:off x="3571200" y="3044160"/>
-            <a:ext cx="2920680" cy="1568160"/>
+            <a:off x="3571560" y="3044520"/>
+            <a:ext cx="2921040" cy="1568520"/>
           </a:xfrm>
           <a:prstGeom prst="rect">
             <a:avLst/>
@@ -520,7 +522,7 @@
       </p:sp>
       <p:sp>
         <p:nvSpPr>
-          <p:cNvPr id="40" name="PlaceHolder 7"/>
+          <p:cNvPr id="37" name="PlaceHolder 7"/>
           <p:cNvSpPr>
             <a:spLocks noGrp="1"/>
           </p:cNvSpPr>
@@ -530,8 +532,8 @@
         </p:nvSpPr>
         <p:spPr>
           <a:xfrm>
-            <a:off x="6638040" y="3044160"/>
-            <a:ext cx="2920680" cy="1568160"/>
+            <a:off x="6639120" y="3044520"/>
+            <a:ext cx="2921040" cy="1568520"/>
           </a:xfrm>
           <a:prstGeom prst="rect">
             <a:avLst/>
@@ -572,7 +574,7 @@
       </p:grpSpPr>
       <p:sp>
         <p:nvSpPr>
-          <p:cNvPr id="5" name="PlaceHolder 1"/>
+          <p:cNvPr id="2" name="PlaceHolder 1"/>
           <p:cNvSpPr>
             <a:spLocks noGrp="1"/>
           </p:cNvSpPr>
@@ -583,7 +585,7 @@
         <p:spPr>
           <a:xfrm>
             <a:off x="504000" y="226080"/>
-            <a:ext cx="9071640" cy="946440"/>
+            <a:ext cx="9071280" cy="946080"/>
           </a:xfrm>
           <a:prstGeom prst="rect">
             <a:avLst/>
@@ -603,7 +605,7 @@
       </p:sp>
       <p:sp>
         <p:nvSpPr>
-          <p:cNvPr id="6" name="PlaceHolder 2"/>
+          <p:cNvPr id="3" name="PlaceHolder 2"/>
           <p:cNvSpPr>
             <a:spLocks noGrp="1"/>
           </p:cNvSpPr>
@@ -614,7 +616,7 @@
         <p:spPr>
           <a:xfrm>
             <a:off x="504000" y="1326600"/>
-            <a:ext cx="9071640" cy="3288240"/>
+            <a:ext cx="9072000" cy="3288600"/>
           </a:xfrm>
           <a:prstGeom prst="rect">
             <a:avLst/>
@@ -656,7 +658,7 @@
       </p:grpSpPr>
       <p:sp>
         <p:nvSpPr>
-          <p:cNvPr id="7" name="PlaceHolder 1"/>
+          <p:cNvPr id="4" name="PlaceHolder 1"/>
           <p:cNvSpPr>
             <a:spLocks noGrp="1"/>
           </p:cNvSpPr>
@@ -667,7 +669,7 @@
         <p:spPr>
           <a:xfrm>
             <a:off x="504000" y="226080"/>
-            <a:ext cx="9071640" cy="946440"/>
+            <a:ext cx="9071280" cy="946080"/>
           </a:xfrm>
           <a:prstGeom prst="rect">
             <a:avLst/>
@@ -687,7 +689,7 @@
       </p:sp>
       <p:sp>
         <p:nvSpPr>
-          <p:cNvPr id="8" name="PlaceHolder 2"/>
+          <p:cNvPr id="5" name="PlaceHolder 2"/>
           <p:cNvSpPr>
             <a:spLocks noGrp="1"/>
           </p:cNvSpPr>
@@ -698,7 +700,7 @@
         <p:spPr>
           <a:xfrm>
             <a:off x="504000" y="1326600"/>
-            <a:ext cx="9071640" cy="3288240"/>
+            <a:ext cx="9072000" cy="3288600"/>
           </a:xfrm>
           <a:prstGeom prst="rect">
             <a:avLst/>
@@ -739,7 +741,7 @@
       </p:grpSpPr>
       <p:sp>
         <p:nvSpPr>
-          <p:cNvPr id="9" name="PlaceHolder 1"/>
+          <p:cNvPr id="6" name="PlaceHolder 1"/>
           <p:cNvSpPr>
             <a:spLocks noGrp="1"/>
           </p:cNvSpPr>
@@ -750,7 +752,7 @@
         <p:spPr>
           <a:xfrm>
             <a:off x="504000" y="226080"/>
-            <a:ext cx="9071640" cy="946440"/>
+            <a:ext cx="9071280" cy="946080"/>
           </a:xfrm>
           <a:prstGeom prst="rect">
             <a:avLst/>
@@ -770,7 +772,7 @@
       </p:sp>
       <p:sp>
         <p:nvSpPr>
-          <p:cNvPr id="10" name="PlaceHolder 2"/>
+          <p:cNvPr id="7" name="PlaceHolder 2"/>
           <p:cNvSpPr>
             <a:spLocks noGrp="1"/>
           </p:cNvSpPr>
@@ -781,7 +783,7 @@
         <p:spPr>
           <a:xfrm>
             <a:off x="504000" y="1326600"/>
-            <a:ext cx="4426920" cy="3288240"/>
+            <a:ext cx="4426920" cy="3288600"/>
           </a:xfrm>
           <a:prstGeom prst="rect">
             <a:avLst/>
@@ -800,7 +802,7 @@
       </p:sp>
       <p:sp>
         <p:nvSpPr>
-          <p:cNvPr id="11" name="PlaceHolder 3"/>
+          <p:cNvPr id="8" name="PlaceHolder 3"/>
           <p:cNvSpPr>
             <a:spLocks noGrp="1"/>
           </p:cNvSpPr>
@@ -811,7 +813,7 @@
         <p:spPr>
           <a:xfrm>
             <a:off x="5152680" y="1326600"/>
-            <a:ext cx="4426920" cy="3288240"/>
+            <a:ext cx="4426920" cy="3288600"/>
           </a:xfrm>
           <a:prstGeom prst="rect">
             <a:avLst/>
@@ -852,7 +854,7 @@
       </p:grpSpPr>
       <p:sp>
         <p:nvSpPr>
-          <p:cNvPr id="12" name="PlaceHolder 1"/>
+          <p:cNvPr id="9" name="PlaceHolder 1"/>
           <p:cNvSpPr>
             <a:spLocks noGrp="1"/>
           </p:cNvSpPr>
@@ -863,7 +865,7 @@
         <p:spPr>
           <a:xfrm>
             <a:off x="504000" y="226080"/>
-            <a:ext cx="9071640" cy="946440"/>
+            <a:ext cx="9071280" cy="946080"/>
           </a:xfrm>
           <a:prstGeom prst="rect">
             <a:avLst/>
@@ -905,7 +907,7 @@
       </p:grpSpPr>
       <p:sp>
         <p:nvSpPr>
-          <p:cNvPr id="13" name="PlaceHolder 1"/>
+          <p:cNvPr id="10" name="PlaceHolder 1"/>
           <p:cNvSpPr>
             <a:spLocks noGrp="1"/>
           </p:cNvSpPr>
@@ -916,7 +918,7 @@
         <p:spPr>
           <a:xfrm>
             <a:off x="504000" y="226080"/>
-            <a:ext cx="9071640" cy="4388400"/>
+            <a:ext cx="9071280" cy="4386600"/>
           </a:xfrm>
           <a:prstGeom prst="rect">
             <a:avLst/>
@@ -958,7 +960,7 @@
       </p:grpSpPr>
       <p:sp>
         <p:nvSpPr>
-          <p:cNvPr id="14" name="PlaceHolder 1"/>
+          <p:cNvPr id="11" name="PlaceHolder 1"/>
           <p:cNvSpPr>
             <a:spLocks noGrp="1"/>
           </p:cNvSpPr>
@@ -969,7 +971,7 @@
         <p:spPr>
           <a:xfrm>
             <a:off x="504000" y="226080"/>
-            <a:ext cx="9071640" cy="946440"/>
+            <a:ext cx="9071280" cy="946080"/>
           </a:xfrm>
           <a:prstGeom prst="rect">
             <a:avLst/>
@@ -989,7 +991,7 @@
       </p:sp>
       <p:sp>
         <p:nvSpPr>
-          <p:cNvPr id="15" name="PlaceHolder 2"/>
+          <p:cNvPr id="12" name="PlaceHolder 2"/>
           <p:cNvSpPr>
             <a:spLocks noGrp="1"/>
           </p:cNvSpPr>
@@ -1000,7 +1002,7 @@
         <p:spPr>
           <a:xfrm>
             <a:off x="504000" y="1326600"/>
-            <a:ext cx="4426920" cy="1568160"/>
+            <a:ext cx="4426920" cy="1568520"/>
           </a:xfrm>
           <a:prstGeom prst="rect">
             <a:avLst/>
@@ -1019,7 +1021,7 @@
       </p:sp>
       <p:sp>
         <p:nvSpPr>
-          <p:cNvPr id="16" name="PlaceHolder 3"/>
+          <p:cNvPr id="13" name="PlaceHolder 3"/>
           <p:cNvSpPr>
             <a:spLocks noGrp="1"/>
           </p:cNvSpPr>
@@ -1030,7 +1032,7 @@
         <p:spPr>
           <a:xfrm>
             <a:off x="5152680" y="1326600"/>
-            <a:ext cx="4426920" cy="3288240"/>
+            <a:ext cx="4426920" cy="3288600"/>
           </a:xfrm>
           <a:prstGeom prst="rect">
             <a:avLst/>
@@ -1049,7 +1051,7 @@
       </p:sp>
       <p:sp>
         <p:nvSpPr>
-          <p:cNvPr id="17" name="PlaceHolder 4"/>
+          <p:cNvPr id="14" name="PlaceHolder 4"/>
           <p:cNvSpPr>
             <a:spLocks noGrp="1"/>
           </p:cNvSpPr>
@@ -1059,8 +1061,8 @@
         </p:nvSpPr>
         <p:spPr>
           <a:xfrm>
-            <a:off x="504000" y="3044160"/>
-            <a:ext cx="4426920" cy="1568160"/>
+            <a:off x="504000" y="3044520"/>
+            <a:ext cx="4426920" cy="1568520"/>
           </a:xfrm>
           <a:prstGeom prst="rect">
             <a:avLst/>
@@ -1101,7 +1103,7 @@
       </p:grpSpPr>
       <p:sp>
         <p:nvSpPr>
-          <p:cNvPr id="18" name="PlaceHolder 1"/>
+          <p:cNvPr id="15" name="PlaceHolder 1"/>
           <p:cNvSpPr>
             <a:spLocks noGrp="1"/>
           </p:cNvSpPr>
@@ -1112,7 +1114,7 @@
         <p:spPr>
           <a:xfrm>
             <a:off x="504000" y="226080"/>
-            <a:ext cx="9071640" cy="946440"/>
+            <a:ext cx="9071280" cy="946080"/>
           </a:xfrm>
           <a:prstGeom prst="rect">
             <a:avLst/>
@@ -1132,7 +1134,7 @@
       </p:sp>
       <p:sp>
         <p:nvSpPr>
-          <p:cNvPr id="19" name="PlaceHolder 2"/>
+          <p:cNvPr id="16" name="PlaceHolder 2"/>
           <p:cNvSpPr>
             <a:spLocks noGrp="1"/>
           </p:cNvSpPr>
@@ -1143,7 +1145,7 @@
         <p:spPr>
           <a:xfrm>
             <a:off x="504000" y="1326600"/>
-            <a:ext cx="4426920" cy="3288240"/>
+            <a:ext cx="4426920" cy="3288600"/>
           </a:xfrm>
           <a:prstGeom prst="rect">
             <a:avLst/>
@@ -1162,7 +1164,7 @@
       </p:sp>
       <p:sp>
         <p:nvSpPr>
-          <p:cNvPr id="20" name="PlaceHolder 3"/>
+          <p:cNvPr id="17" name="PlaceHolder 3"/>
           <p:cNvSpPr>
             <a:spLocks noGrp="1"/>
           </p:cNvSpPr>
@@ -1173,7 +1175,7 @@
         <p:spPr>
           <a:xfrm>
             <a:off x="5152680" y="1326600"/>
-            <a:ext cx="4426920" cy="1568160"/>
+            <a:ext cx="4426920" cy="1568520"/>
           </a:xfrm>
           <a:prstGeom prst="rect">
             <a:avLst/>
@@ -1192,7 +1194,7 @@
       </p:sp>
       <p:sp>
         <p:nvSpPr>
-          <p:cNvPr id="21" name="PlaceHolder 4"/>
+          <p:cNvPr id="18" name="PlaceHolder 4"/>
           <p:cNvSpPr>
             <a:spLocks noGrp="1"/>
           </p:cNvSpPr>
@@ -1202,8 +1204,8 @@
         </p:nvSpPr>
         <p:spPr>
           <a:xfrm>
-            <a:off x="5152680" y="3044160"/>
-            <a:ext cx="4426920" cy="1568160"/>
+            <a:off x="5152680" y="3044520"/>
+            <a:ext cx="4426920" cy="1568520"/>
           </a:xfrm>
           <a:prstGeom prst="rect">
             <a:avLst/>
@@ -1244,7 +1246,7 @@
       </p:grpSpPr>
       <p:sp>
         <p:nvSpPr>
-          <p:cNvPr id="22" name="PlaceHolder 1"/>
+          <p:cNvPr id="19" name="PlaceHolder 1"/>
           <p:cNvSpPr>
             <a:spLocks noGrp="1"/>
           </p:cNvSpPr>
@@ -1255,7 +1257,7 @@
         <p:spPr>
           <a:xfrm>
             <a:off x="504000" y="226080"/>
-            <a:ext cx="9071640" cy="946440"/>
+            <a:ext cx="9071280" cy="946080"/>
           </a:xfrm>
           <a:prstGeom prst="rect">
             <a:avLst/>
@@ -1275,7 +1277,7 @@
       </p:sp>
       <p:sp>
         <p:nvSpPr>
-          <p:cNvPr id="23" name="PlaceHolder 2"/>
+          <p:cNvPr id="20" name="PlaceHolder 2"/>
           <p:cNvSpPr>
             <a:spLocks noGrp="1"/>
           </p:cNvSpPr>
@@ -1286,7 +1288,7 @@
         <p:spPr>
           <a:xfrm>
             <a:off x="504000" y="1326600"/>
-            <a:ext cx="4426920" cy="1568160"/>
+            <a:ext cx="4426920" cy="1568520"/>
           </a:xfrm>
           <a:prstGeom prst="rect">
             <a:avLst/>
@@ -1305,7 +1307,7 @@
       </p:sp>
       <p:sp>
         <p:nvSpPr>
-          <p:cNvPr id="24" name="PlaceHolder 3"/>
+          <p:cNvPr id="21" name="PlaceHolder 3"/>
           <p:cNvSpPr>
             <a:spLocks noGrp="1"/>
           </p:cNvSpPr>
@@ -1316,7 +1318,7 @@
         <p:spPr>
           <a:xfrm>
             <a:off x="5152680" y="1326600"/>
-            <a:ext cx="4426920" cy="1568160"/>
+            <a:ext cx="4426920" cy="1568520"/>
           </a:xfrm>
           <a:prstGeom prst="rect">
             <a:avLst/>
@@ -1335,7 +1337,7 @@
       </p:sp>
       <p:sp>
         <p:nvSpPr>
-          <p:cNvPr id="25" name="PlaceHolder 4"/>
+          <p:cNvPr id="22" name="PlaceHolder 4"/>
           <p:cNvSpPr>
             <a:spLocks noGrp="1"/>
           </p:cNvSpPr>
@@ -1345,8 +1347,8 @@
         </p:nvSpPr>
         <p:spPr>
           <a:xfrm>
-            <a:off x="504000" y="3044160"/>
-            <a:ext cx="9071640" cy="1568160"/>
+            <a:off x="504000" y="3044520"/>
+            <a:ext cx="9072000" cy="1568520"/>
           </a:xfrm>
           <a:prstGeom prst="rect">
             <a:avLst/>
@@ -1398,7 +1400,7 @@
         <p:spPr>
           <a:xfrm>
             <a:off x="504000" y="226080"/>
-            <a:ext cx="9071640" cy="946440"/>
+            <a:ext cx="9071280" cy="946080"/>
           </a:xfrm>
           <a:prstGeom prst="rect">
             <a:avLst/>
@@ -1411,12 +1413,24 @@
           <a:p>
             <a:pPr algn="ctr"/>
             <a:r>
-              <a:rPr b="0" lang="en-IN" sz="4400" spc="-1" strike="noStrike">
-                <a:latin typeface="Arial"/>
-              </a:rPr>
-              <a:t>Click to edit the title text format</a:t>
-            </a:r>
-            <a:endParaRPr b="0" lang="en-IN" sz="4400" spc="-1" strike="noStrike">
+              <a:rPr b="0" lang="en-IN" sz="1800" spc="-1" strike="noStrike">
+                <a:latin typeface="Arial"/>
+              </a:rPr>
+              <a:t>Click to edit </a:t>
+            </a:r>
+            <a:r>
+              <a:rPr b="0" lang="en-IN" sz="1800" spc="-1" strike="noStrike">
+                <a:latin typeface="Arial"/>
+              </a:rPr>
+              <a:t>the title text </a:t>
+            </a:r>
+            <a:r>
+              <a:rPr b="0" lang="en-IN" sz="1800" spc="-1" strike="noStrike">
+                <a:latin typeface="Arial"/>
+              </a:rPr>
+              <a:t>format</a:t>
+            </a:r>
+            <a:endParaRPr b="0" lang="en-IN" sz="1800" spc="-1" strike="noStrike">
               <a:latin typeface="Arial"/>
             </a:endParaRPr>
           </a:p>
@@ -1435,7 +1449,7 @@
         <p:spPr>
           <a:xfrm>
             <a:off x="504000" y="1326600"/>
-            <a:ext cx="9071640" cy="3288240"/>
+            <a:ext cx="9072000" cy="3288600"/>
           </a:xfrm>
           <a:prstGeom prst="rect">
             <a:avLst/>
@@ -1597,116 +1611,6 @@
             </a:r>
             <a:endParaRPr b="0" lang="en-IN" sz="2000" spc="-1" strike="noStrike">
               <a:latin typeface="Arial"/>
-            </a:endParaRPr>
-          </a:p>
-        </p:txBody>
-      </p:sp>
-      <p:sp>
-        <p:nvSpPr>
-          <p:cNvPr id="2" name="PlaceHolder 3"/>
-          <p:cNvSpPr>
-            <a:spLocks noGrp="1"/>
-          </p:cNvSpPr>
-          <p:nvPr>
-            <p:ph type="dt"/>
-          </p:nvPr>
-        </p:nvSpPr>
-        <p:spPr>
-          <a:xfrm>
-            <a:off x="504000" y="5165280"/>
-            <a:ext cx="2348280" cy="390600"/>
-          </a:xfrm>
-          <a:prstGeom prst="rect">
-            <a:avLst/>
-          </a:prstGeom>
-        </p:spPr>
-        <p:txBody>
-          <a:bodyPr lIns="0" rIns="0" tIns="0" bIns="0">
-            <a:noAutofit/>
-          </a:bodyPr>
-          <a:p>
-            <a:r>
-              <a:rPr b="0" lang="en-IN" sz="1400" spc="-1" strike="noStrike">
-                <a:latin typeface="Times New Roman"/>
-              </a:rPr>
-              <a:t>&lt;date/time&gt;</a:t>
-            </a:r>
-            <a:endParaRPr b="0" lang="en-IN" sz="1400" spc="-1" strike="noStrike">
-              <a:latin typeface="Times New Roman"/>
-            </a:endParaRPr>
-          </a:p>
-        </p:txBody>
-      </p:sp>
-      <p:sp>
-        <p:nvSpPr>
-          <p:cNvPr id="3" name="PlaceHolder 4"/>
-          <p:cNvSpPr>
-            <a:spLocks noGrp="1"/>
-          </p:cNvSpPr>
-          <p:nvPr>
-            <p:ph type="ftr"/>
-          </p:nvPr>
-        </p:nvSpPr>
-        <p:spPr>
-          <a:xfrm>
-            <a:off x="3447360" y="5165280"/>
-            <a:ext cx="3195000" cy="390600"/>
-          </a:xfrm>
-          <a:prstGeom prst="rect">
-            <a:avLst/>
-          </a:prstGeom>
-        </p:spPr>
-        <p:txBody>
-          <a:bodyPr lIns="0" rIns="0" tIns="0" bIns="0">
-            <a:noAutofit/>
-          </a:bodyPr>
-          <a:p>
-            <a:pPr algn="ctr"/>
-            <a:r>
-              <a:rPr b="0" lang="en-IN" sz="1400" spc="-1" strike="noStrike">
-                <a:latin typeface="Times New Roman"/>
-              </a:rPr>
-              <a:t>&lt;footer&gt;</a:t>
-            </a:r>
-            <a:endParaRPr b="0" lang="en-IN" sz="1400" spc="-1" strike="noStrike">
-              <a:latin typeface="Times New Roman"/>
-            </a:endParaRPr>
-          </a:p>
-        </p:txBody>
-      </p:sp>
-      <p:sp>
-        <p:nvSpPr>
-          <p:cNvPr id="4" name="PlaceHolder 5"/>
-          <p:cNvSpPr>
-            <a:spLocks noGrp="1"/>
-          </p:cNvSpPr>
-          <p:nvPr>
-            <p:ph type="sldNum"/>
-          </p:nvPr>
-        </p:nvSpPr>
-        <p:spPr>
-          <a:xfrm>
-            <a:off x="7227360" y="5165280"/>
-            <a:ext cx="2348280" cy="390600"/>
-          </a:xfrm>
-          <a:prstGeom prst="rect">
-            <a:avLst/>
-          </a:prstGeom>
-        </p:spPr>
-        <p:txBody>
-          <a:bodyPr lIns="0" rIns="0" tIns="0" bIns="0">
-            <a:noAutofit/>
-          </a:bodyPr>
-          <a:p>
-            <a:pPr algn="r"/>
-            <a:fld id="{7AAE4F67-08BF-4C1D-BB4E-8EFCE0B8680B}" type="slidenum">
-              <a:rPr b="0" lang="en-IN" sz="1400" spc="-1" strike="noStrike">
-                <a:latin typeface="Times New Roman"/>
-              </a:rPr>
-              <a:t>&lt;number&gt;</a:t>
-            </a:fld>
-            <a:endParaRPr b="0" lang="en-IN" sz="1400" spc="-1" strike="noStrike">
-              <a:latin typeface="Times New Roman"/>
             </a:endParaRPr>
           </a:p>
         </p:txBody>
@@ -1750,14 +1654,14 @@
       </p:grpSpPr>
       <p:sp>
         <p:nvSpPr>
-          <p:cNvPr id="41" name="CustomShape 1"/>
+          <p:cNvPr id="38" name="CustomShape 1"/>
           <p:cNvSpPr/>
           <p:nvPr/>
         </p:nvSpPr>
         <p:spPr>
           <a:xfrm>
             <a:off x="1836000" y="1332000"/>
-            <a:ext cx="2376000" cy="792000"/>
+            <a:ext cx="2375640" cy="791640"/>
           </a:xfrm>
           <a:prstGeom prst="rect">
             <a:avLst/>
@@ -1782,10 +1686,18 @@
             <a:noAutofit/>
           </a:bodyPr>
           <a:p>
-            <a:pPr algn="ctr"/>
-            <a:r>
-              <a:rPr b="0" lang="en-IN" sz="1800" spc="-1" strike="noStrike">
-                <a:latin typeface="Arial"/>
+            <a:pPr algn="ctr">
+              <a:lnSpc>
+                <a:spcPct val="100000"/>
+              </a:lnSpc>
+            </a:pPr>
+            <a:r>
+              <a:rPr b="0" lang="en-IN" sz="1800" spc="-1" strike="noStrike">
+                <a:solidFill>
+                  <a:srgbClr val="000000"/>
+                </a:solidFill>
+                <a:latin typeface="Arial"/>
+                <a:ea typeface="DejaVu Sans"/>
               </a:rPr>
               <a:t>User Requirements</a:t>
             </a:r>
@@ -1797,14 +1709,14 @@
       </p:sp>
       <p:sp>
         <p:nvSpPr>
-          <p:cNvPr id="42" name="CustomShape 2"/>
+          <p:cNvPr id="39" name="CustomShape 2"/>
           <p:cNvSpPr/>
           <p:nvPr/>
         </p:nvSpPr>
         <p:spPr>
           <a:xfrm>
             <a:off x="1836000" y="2880000"/>
-            <a:ext cx="2376000" cy="792000"/>
+            <a:ext cx="2375640" cy="791640"/>
           </a:xfrm>
           <a:prstGeom prst="rect">
             <a:avLst/>
@@ -1829,16 +1741,28 @@
             <a:noAutofit/>
           </a:bodyPr>
           <a:p>
-            <a:pPr algn="ctr"/>
-            <a:r>
-              <a:rPr b="0" lang="en-IN" sz="1800" spc="-1" strike="noStrike">
-                <a:latin typeface="Arial"/>
+            <a:pPr algn="ctr">
+              <a:lnSpc>
+                <a:spcPct val="100000"/>
+              </a:lnSpc>
+            </a:pPr>
+            <a:r>
+              <a:rPr b="0" lang="en-IN" sz="1800" spc="-1" strike="noStrike">
+                <a:solidFill>
+                  <a:srgbClr val="000000"/>
+                </a:solidFill>
+                <a:latin typeface="Arial"/>
+                <a:ea typeface="DejaVu Sans"/>
               </a:rPr>
               <a:t>System Requirements</a:t>
             </a:r>
             <a:r>
               <a:rPr b="0" lang="en-IN" sz="1800" spc="-1" strike="noStrike">
-                <a:latin typeface="Arial"/>
+                <a:solidFill>
+                  <a:srgbClr val="000000"/>
+                </a:solidFill>
+                <a:latin typeface="Arial"/>
+                <a:ea typeface="DejaVu Sans"/>
               </a:rPr>
               <a:t>	</a:t>
             </a:r>
@@ -1850,14 +1774,14 @@
       </p:sp>
       <p:sp>
         <p:nvSpPr>
-          <p:cNvPr id="43" name="CustomShape 3"/>
+          <p:cNvPr id="40" name="CustomShape 3"/>
           <p:cNvSpPr/>
           <p:nvPr/>
         </p:nvSpPr>
         <p:spPr>
           <a:xfrm>
             <a:off x="1836000" y="4176000"/>
-            <a:ext cx="2376000" cy="792000"/>
+            <a:ext cx="2375640" cy="791640"/>
           </a:xfrm>
           <a:prstGeom prst="rect">
             <a:avLst/>
@@ -1882,10 +1806,18 @@
             <a:noAutofit/>
           </a:bodyPr>
           <a:p>
-            <a:pPr algn="ctr"/>
-            <a:r>
-              <a:rPr b="0" lang="en-IN" sz="1800" spc="-1" strike="noStrike">
-                <a:latin typeface="Arial"/>
+            <a:pPr algn="ctr">
+              <a:lnSpc>
+                <a:spcPct val="100000"/>
+              </a:lnSpc>
+            </a:pPr>
+            <a:r>
+              <a:rPr b="0" lang="en-IN" sz="1800" spc="-1" strike="noStrike">
+                <a:solidFill>
+                  <a:srgbClr val="000000"/>
+                </a:solidFill>
+                <a:latin typeface="Arial"/>
+                <a:ea typeface="DejaVu Sans"/>
               </a:rPr>
               <a:t>Software desgin</a:t>
             </a:r>
@@ -1894,10 +1826,18 @@
             </a:endParaRPr>
           </a:p>
           <a:p>
-            <a:pPr algn="ctr"/>
-            <a:r>
-              <a:rPr b="0" lang="en-IN" sz="1800" spc="-1" strike="noStrike">
-                <a:latin typeface="Arial"/>
+            <a:pPr algn="ctr">
+              <a:lnSpc>
+                <a:spcPct val="100000"/>
+              </a:lnSpc>
+            </a:pPr>
+            <a:r>
+              <a:rPr b="0" lang="en-IN" sz="1800" spc="-1" strike="noStrike">
+                <a:solidFill>
+                  <a:srgbClr val="000000"/>
+                </a:solidFill>
+                <a:latin typeface="Arial"/>
+                <a:ea typeface="DejaVu Sans"/>
               </a:rPr>
               <a:t>Specification</a:t>
             </a:r>
@@ -1909,14 +1849,14 @@
       </p:sp>
       <p:sp>
         <p:nvSpPr>
-          <p:cNvPr id="44" name="CustomShape 4"/>
+          <p:cNvPr id="41" name="CustomShape 4"/>
           <p:cNvSpPr/>
           <p:nvPr/>
         </p:nvSpPr>
         <p:spPr>
           <a:xfrm>
             <a:off x="5292000" y="900000"/>
-            <a:ext cx="2376000" cy="1512000"/>
+            <a:ext cx="2375640" cy="1511640"/>
           </a:xfrm>
           <a:prstGeom prst="rect">
             <a:avLst/>
@@ -1941,10 +1881,18 @@
             <a:noAutofit/>
           </a:bodyPr>
           <a:p>
-            <a:pPr algn="ctr"/>
-            <a:r>
-              <a:rPr b="0" lang="en-IN" sz="1800" spc="-1" strike="noStrike">
-                <a:latin typeface="Arial"/>
+            <a:pPr algn="ctr">
+              <a:lnSpc>
+                <a:spcPct val="100000"/>
+              </a:lnSpc>
+            </a:pPr>
+            <a:r>
+              <a:rPr b="0" lang="en-IN" sz="1800" spc="-1" strike="noStrike">
+                <a:solidFill>
+                  <a:srgbClr val="000000"/>
+                </a:solidFill>
+                <a:latin typeface="Arial"/>
+                <a:ea typeface="DejaVu Sans"/>
               </a:rPr>
               <a:t>Client Managers</a:t>
             </a:r>
@@ -1953,10 +1901,18 @@
             </a:endParaRPr>
           </a:p>
           <a:p>
-            <a:pPr algn="ctr"/>
-            <a:r>
-              <a:rPr b="0" lang="en-IN" sz="1800" spc="-1" strike="noStrike">
-                <a:latin typeface="Arial"/>
+            <a:pPr algn="ctr">
+              <a:lnSpc>
+                <a:spcPct val="100000"/>
+              </a:lnSpc>
+            </a:pPr>
+            <a:r>
+              <a:rPr b="0" lang="en-IN" sz="1800" spc="-1" strike="noStrike">
+                <a:solidFill>
+                  <a:srgbClr val="000000"/>
+                </a:solidFill>
+                <a:latin typeface="Arial"/>
+                <a:ea typeface="DejaVu Sans"/>
               </a:rPr>
               <a:t>System end-users</a:t>
             </a:r>
@@ -1965,10 +1921,18 @@
             </a:endParaRPr>
           </a:p>
           <a:p>
-            <a:pPr algn="ctr"/>
-            <a:r>
-              <a:rPr b="0" lang="en-IN" sz="1800" spc="-1" strike="noStrike">
-                <a:latin typeface="Arial"/>
+            <a:pPr algn="ctr">
+              <a:lnSpc>
+                <a:spcPct val="100000"/>
+              </a:lnSpc>
+            </a:pPr>
+            <a:r>
+              <a:rPr b="0" lang="en-IN" sz="1800" spc="-1" strike="noStrike">
+                <a:solidFill>
+                  <a:srgbClr val="000000"/>
+                </a:solidFill>
+                <a:latin typeface="Arial"/>
+                <a:ea typeface="DejaVu Sans"/>
               </a:rPr>
               <a:t>Client engineers</a:t>
             </a:r>
@@ -1977,10 +1941,18 @@
             </a:endParaRPr>
           </a:p>
           <a:p>
-            <a:pPr algn="ctr"/>
-            <a:r>
-              <a:rPr b="0" lang="en-IN" sz="1800" spc="-1" strike="noStrike">
-                <a:latin typeface="Arial"/>
+            <a:pPr algn="ctr">
+              <a:lnSpc>
+                <a:spcPct val="100000"/>
+              </a:lnSpc>
+            </a:pPr>
+            <a:r>
+              <a:rPr b="0" lang="en-IN" sz="1800" spc="-1" strike="noStrike">
+                <a:solidFill>
+                  <a:srgbClr val="000000"/>
+                </a:solidFill>
+                <a:latin typeface="Arial"/>
+                <a:ea typeface="DejaVu Sans"/>
               </a:rPr>
               <a:t>Contract Managers</a:t>
             </a:r>
@@ -1989,10 +1961,18 @@
             </a:endParaRPr>
           </a:p>
           <a:p>
-            <a:pPr algn="ctr"/>
-            <a:r>
-              <a:rPr b="0" lang="en-IN" sz="1800" spc="-1" strike="noStrike">
-                <a:latin typeface="Arial"/>
+            <a:pPr algn="ctr">
+              <a:lnSpc>
+                <a:spcPct val="100000"/>
+              </a:lnSpc>
+            </a:pPr>
+            <a:r>
+              <a:rPr b="0" lang="en-IN" sz="1800" spc="-1" strike="noStrike">
+                <a:solidFill>
+                  <a:srgbClr val="000000"/>
+                </a:solidFill>
+                <a:latin typeface="Arial"/>
+                <a:ea typeface="DejaVu Sans"/>
               </a:rPr>
               <a:t>System architects</a:t>
             </a:r>
@@ -2004,14 +1984,14 @@
       </p:sp>
       <p:sp>
         <p:nvSpPr>
-          <p:cNvPr id="45" name="CustomShape 5"/>
+          <p:cNvPr id="42" name="CustomShape 5"/>
           <p:cNvSpPr/>
           <p:nvPr/>
         </p:nvSpPr>
         <p:spPr>
           <a:xfrm>
             <a:off x="5292000" y="2571480"/>
-            <a:ext cx="2376000" cy="1280520"/>
+            <a:ext cx="2375640" cy="1280160"/>
           </a:xfrm>
           <a:prstGeom prst="rect">
             <a:avLst/>
@@ -2036,10 +2016,18 @@
             <a:noAutofit/>
           </a:bodyPr>
           <a:p>
-            <a:pPr algn="ctr"/>
-            <a:r>
-              <a:rPr b="0" lang="en-IN" sz="1800" spc="-1" strike="noStrike">
-                <a:latin typeface="Arial"/>
+            <a:pPr algn="ctr">
+              <a:lnSpc>
+                <a:spcPct val="100000"/>
+              </a:lnSpc>
+            </a:pPr>
+            <a:r>
+              <a:rPr b="0" lang="en-IN" sz="1800" spc="-1" strike="noStrike">
+                <a:solidFill>
+                  <a:srgbClr val="000000"/>
+                </a:solidFill>
+                <a:latin typeface="Arial"/>
+                <a:ea typeface="DejaVu Sans"/>
               </a:rPr>
               <a:t>System end-users</a:t>
             </a:r>
@@ -2048,10 +2036,18 @@
             </a:endParaRPr>
           </a:p>
           <a:p>
-            <a:pPr algn="ctr"/>
-            <a:r>
-              <a:rPr b="0" lang="en-IN" sz="1800" spc="-1" strike="noStrike">
-                <a:latin typeface="Arial"/>
+            <a:pPr algn="ctr">
+              <a:lnSpc>
+                <a:spcPct val="100000"/>
+              </a:lnSpc>
+            </a:pPr>
+            <a:r>
+              <a:rPr b="0" lang="en-IN" sz="1800" spc="-1" strike="noStrike">
+                <a:solidFill>
+                  <a:srgbClr val="000000"/>
+                </a:solidFill>
+                <a:latin typeface="Arial"/>
+                <a:ea typeface="DejaVu Sans"/>
               </a:rPr>
               <a:t>Client engineers</a:t>
             </a:r>
@@ -2060,10 +2056,18 @@
             </a:endParaRPr>
           </a:p>
           <a:p>
-            <a:pPr algn="ctr"/>
-            <a:r>
-              <a:rPr b="0" lang="en-IN" sz="1800" spc="-1" strike="noStrike">
-                <a:latin typeface="Arial"/>
+            <a:pPr algn="ctr">
+              <a:lnSpc>
+                <a:spcPct val="100000"/>
+              </a:lnSpc>
+            </a:pPr>
+            <a:r>
+              <a:rPr b="0" lang="en-IN" sz="1800" spc="-1" strike="noStrike">
+                <a:solidFill>
+                  <a:srgbClr val="000000"/>
+                </a:solidFill>
+                <a:latin typeface="Arial"/>
+                <a:ea typeface="DejaVu Sans"/>
               </a:rPr>
               <a:t>System architects</a:t>
             </a:r>
@@ -2072,10 +2076,18 @@
             </a:endParaRPr>
           </a:p>
           <a:p>
-            <a:pPr algn="ctr"/>
-            <a:r>
-              <a:rPr b="0" lang="en-IN" sz="1800" spc="-1" strike="noStrike">
-                <a:latin typeface="Arial"/>
+            <a:pPr algn="ctr">
+              <a:lnSpc>
+                <a:spcPct val="100000"/>
+              </a:lnSpc>
+            </a:pPr>
+            <a:r>
+              <a:rPr b="0" lang="en-IN" sz="1800" spc="-1" strike="noStrike">
+                <a:solidFill>
+                  <a:srgbClr val="000000"/>
+                </a:solidFill>
+                <a:latin typeface="Arial"/>
+                <a:ea typeface="DejaVu Sans"/>
               </a:rPr>
               <a:t>Software Developers</a:t>
             </a:r>
@@ -2087,14 +2099,14 @@
       </p:sp>
       <p:sp>
         <p:nvSpPr>
-          <p:cNvPr id="46" name="CustomShape 6"/>
+          <p:cNvPr id="43" name="CustomShape 6"/>
           <p:cNvSpPr/>
           <p:nvPr/>
         </p:nvSpPr>
         <p:spPr>
           <a:xfrm>
             <a:off x="5292000" y="4047480"/>
-            <a:ext cx="2376000" cy="1028520"/>
+            <a:ext cx="2375640" cy="1028160"/>
           </a:xfrm>
           <a:prstGeom prst="rect">
             <a:avLst/>
@@ -2119,10 +2131,18 @@
             <a:noAutofit/>
           </a:bodyPr>
           <a:p>
-            <a:pPr algn="ctr"/>
-            <a:r>
-              <a:rPr b="0" lang="en-IN" sz="1800" spc="-1" strike="noStrike">
-                <a:latin typeface="Arial"/>
+            <a:pPr algn="ctr">
+              <a:lnSpc>
+                <a:spcPct val="100000"/>
+              </a:lnSpc>
+            </a:pPr>
+            <a:r>
+              <a:rPr b="0" lang="en-IN" sz="1800" spc="-1" strike="noStrike">
+                <a:solidFill>
+                  <a:srgbClr val="000000"/>
+                </a:solidFill>
+                <a:latin typeface="Arial"/>
+                <a:ea typeface="DejaVu Sans"/>
               </a:rPr>
               <a:t>Client engineers</a:t>
             </a:r>
@@ -2131,10 +2151,18 @@
             </a:endParaRPr>
           </a:p>
           <a:p>
-            <a:pPr algn="ctr"/>
-            <a:r>
-              <a:rPr b="0" lang="en-IN" sz="1800" spc="-1" strike="noStrike">
-                <a:latin typeface="Arial"/>
+            <a:pPr algn="ctr">
+              <a:lnSpc>
+                <a:spcPct val="100000"/>
+              </a:lnSpc>
+            </a:pPr>
+            <a:r>
+              <a:rPr b="0" lang="en-IN" sz="1800" spc="-1" strike="noStrike">
+                <a:solidFill>
+                  <a:srgbClr val="000000"/>
+                </a:solidFill>
+                <a:latin typeface="Arial"/>
+                <a:ea typeface="DejaVu Sans"/>
               </a:rPr>
               <a:t>System architects</a:t>
             </a:r>
@@ -2143,10 +2171,18 @@
             </a:endParaRPr>
           </a:p>
           <a:p>
-            <a:pPr algn="ctr"/>
-            <a:r>
-              <a:rPr b="0" lang="en-IN" sz="1800" spc="-1" strike="noStrike">
-                <a:latin typeface="Arial"/>
+            <a:pPr algn="ctr">
+              <a:lnSpc>
+                <a:spcPct val="100000"/>
+              </a:lnSpc>
+            </a:pPr>
+            <a:r>
+              <a:rPr b="0" lang="en-IN" sz="1800" spc="-1" strike="noStrike">
+                <a:solidFill>
+                  <a:srgbClr val="000000"/>
+                </a:solidFill>
+                <a:latin typeface="Arial"/>
+                <a:ea typeface="DejaVu Sans"/>
               </a:rPr>
               <a:t>System developers</a:t>
             </a:r>
@@ -2158,7 +2194,7 @@
       </p:sp>
       <p:sp>
         <p:nvSpPr>
-          <p:cNvPr id="47" name="Line 7"/>
+          <p:cNvPr id="44" name="Line 7"/>
           <p:cNvSpPr/>
           <p:nvPr/>
         </p:nvSpPr>
@@ -2186,7 +2222,7 @@
       </p:sp>
       <p:sp>
         <p:nvSpPr>
-          <p:cNvPr id="48" name="Line 8"/>
+          <p:cNvPr id="45" name="Line 8"/>
           <p:cNvSpPr/>
           <p:nvPr/>
         </p:nvSpPr>
@@ -2214,7 +2250,7 @@
       </p:sp>
       <p:sp>
         <p:nvSpPr>
-          <p:cNvPr id="49" name="Line 9"/>
+          <p:cNvPr id="46" name="Line 9"/>
           <p:cNvSpPr/>
           <p:nvPr/>
         </p:nvSpPr>
@@ -2242,14 +2278,14 @@
       </p:sp>
       <p:sp>
         <p:nvSpPr>
-          <p:cNvPr id="50" name="TextShape 10"/>
-          <p:cNvSpPr txBox="1"/>
+          <p:cNvPr id="47" name="CustomShape 10"/>
+          <p:cNvSpPr/>
           <p:nvPr/>
         </p:nvSpPr>
         <p:spPr>
           <a:xfrm>
             <a:off x="2988000" y="360000"/>
-            <a:ext cx="4392000" cy="346320"/>
+            <a:ext cx="4391640" cy="345960"/>
           </a:xfrm>
           <a:prstGeom prst="rect">
             <a:avLst/>
@@ -2259,16 +2295,1178 @@
             <a:noFill/>
           </a:ln>
         </p:spPr>
+        <p:style>
+          <a:lnRef idx="0"/>
+          <a:fillRef idx="0"/>
+          <a:effectRef idx="0"/>
+          <a:fontRef idx="minor"/>
+        </p:style>
         <p:txBody>
           <a:bodyPr lIns="90000" rIns="90000" tIns="45000" bIns="45000">
             <a:noAutofit/>
           </a:bodyPr>
           <a:p>
+            <a:pPr>
+              <a:lnSpc>
+                <a:spcPct val="100000"/>
+              </a:lnSpc>
+            </a:pPr>
             <a:r>
               <a:rPr b="0" lang="en-IN" sz="1800" spc="-1" strike="noStrike">
                 <a:latin typeface="Arial"/>
               </a:rPr>
               <a:t>Requirements ---&gt; Audience</a:t>
+            </a:r>
+            <a:endParaRPr b="0" lang="en-IN" sz="1800" spc="-1" strike="noStrike">
+              <a:latin typeface="Arial"/>
+            </a:endParaRPr>
+          </a:p>
+        </p:txBody>
+      </p:sp>
+    </p:spTree>
+  </p:cSld>
+  <mc:AlternateContent>
+    <mc:Choice Requires="p14">
+      <p:transition spd="slow" p14:dur="2000"/>
+    </mc:Choice>
+    <mc:Fallback>
+      <p:transition spd="slow"/>
+    </mc:Fallback>
+  </mc:AlternateContent>
+</p:sld>
+</file>
+
+<file path=ppt/slides/slide2.xml><?xml version="1.0" encoding="utf-8"?>
+<p:sld xmlns:a="http://schemas.openxmlformats.org/drawingml/2006/main" xmlns:p="http://schemas.openxmlformats.org/presentationml/2006/main" xmlns:r="http://schemas.openxmlformats.org/officeDocument/2006/relationships" xmlns:p14="http://schemas.microsoft.com/office/powerpoint/2010/main" xmlns:p15="http://schemas.microsoft.com/office/powerpoint/2012/main" xmlns:mc="http://schemas.openxmlformats.org/markup-compatibility/2006">
+  <p:cSld>
+    <p:spTree>
+      <p:nvGrpSpPr>
+        <p:cNvPr id="1" name=""/>
+        <p:cNvGrpSpPr/>
+        <p:nvPr/>
+      </p:nvGrpSpPr>
+      <p:grpSpPr>
+        <a:xfrm>
+          <a:off x="0" y="0"/>
+          <a:ext cx="0" cy="0"/>
+          <a:chOff x="0" y="0"/>
+          <a:chExt cx="0" cy="0"/>
+        </a:xfrm>
+      </p:grpSpPr>
+      <p:sp>
+        <p:nvSpPr>
+          <p:cNvPr id="48" name="CustomShape 1"/>
+          <p:cNvSpPr/>
+          <p:nvPr/>
+        </p:nvSpPr>
+        <p:spPr>
+          <a:xfrm>
+            <a:off x="1908000" y="936000"/>
+            <a:ext cx="1440000" cy="792000"/>
+          </a:xfrm>
+          <a:prstGeom prst="rect">
+            <a:avLst/>
+          </a:prstGeom>
+          <a:solidFill>
+            <a:srgbClr val="729fcf"/>
+          </a:solidFill>
+          <a:ln>
+            <a:solidFill>
+              <a:srgbClr val="3465a4"/>
+            </a:solidFill>
+          </a:ln>
+        </p:spPr>
+        <p:style>
+          <a:lnRef idx="0"/>
+          <a:fillRef idx="0"/>
+          <a:effectRef idx="0"/>
+          <a:fontRef idx="minor"/>
+        </p:style>
+        <p:txBody>
+          <a:bodyPr wrap="none" lIns="90000" rIns="90000" tIns="45000" bIns="45000" anchor="ctr">
+            <a:noAutofit/>
+          </a:bodyPr>
+          <a:p>
+            <a:pPr algn="ctr"/>
+            <a:r>
+              <a:rPr b="0" lang="en-IN" sz="1800" spc="-1" strike="noStrike">
+                <a:latin typeface="Arial"/>
+              </a:rPr>
+              <a:t>BOOKS</a:t>
+            </a:r>
+            <a:endParaRPr b="0" lang="en-IN" sz="1800" spc="-1" strike="noStrike">
+              <a:latin typeface="Arial"/>
+            </a:endParaRPr>
+          </a:p>
+        </p:txBody>
+      </p:sp>
+      <p:sp>
+        <p:nvSpPr>
+          <p:cNvPr id="49" name="CustomShape 2"/>
+          <p:cNvSpPr/>
+          <p:nvPr/>
+        </p:nvSpPr>
+        <p:spPr>
+          <a:xfrm>
+            <a:off x="6084000" y="936000"/>
+            <a:ext cx="1440000" cy="792000"/>
+          </a:xfrm>
+          <a:prstGeom prst="rect">
+            <a:avLst/>
+          </a:prstGeom>
+          <a:solidFill>
+            <a:srgbClr val="729fcf"/>
+          </a:solidFill>
+          <a:ln>
+            <a:solidFill>
+              <a:srgbClr val="3465a4"/>
+            </a:solidFill>
+          </a:ln>
+        </p:spPr>
+        <p:style>
+          <a:lnRef idx="0"/>
+          <a:fillRef idx="0"/>
+          <a:effectRef idx="0"/>
+          <a:fontRef idx="minor"/>
+        </p:style>
+        <p:txBody>
+          <a:bodyPr wrap="none" lIns="90000" rIns="90000" tIns="45000" bIns="45000" anchor="ctr">
+            <a:noAutofit/>
+          </a:bodyPr>
+          <a:p>
+            <a:pPr algn="ctr"/>
+            <a:r>
+              <a:rPr b="0" lang="en-IN" sz="1800" spc="-1" strike="noStrike">
+                <a:latin typeface="Arial"/>
+              </a:rPr>
+              <a:t>USERS</a:t>
+            </a:r>
+            <a:endParaRPr b="0" lang="en-IN" sz="1800" spc="-1" strike="noStrike">
+              <a:latin typeface="Arial"/>
+            </a:endParaRPr>
+          </a:p>
+        </p:txBody>
+      </p:sp>
+      <p:sp>
+        <p:nvSpPr>
+          <p:cNvPr id="50" name="CustomShape 3"/>
+          <p:cNvSpPr/>
+          <p:nvPr/>
+        </p:nvSpPr>
+        <p:spPr>
+          <a:xfrm>
+            <a:off x="1908000" y="4068000"/>
+            <a:ext cx="1440000" cy="792000"/>
+          </a:xfrm>
+          <a:prstGeom prst="rect">
+            <a:avLst/>
+          </a:prstGeom>
+          <a:solidFill>
+            <a:srgbClr val="729fcf"/>
+          </a:solidFill>
+          <a:ln>
+            <a:solidFill>
+              <a:srgbClr val="3465a4"/>
+            </a:solidFill>
+          </a:ln>
+        </p:spPr>
+        <p:style>
+          <a:lnRef idx="0"/>
+          <a:fillRef idx="0"/>
+          <a:effectRef idx="0"/>
+          <a:fontRef idx="minor"/>
+        </p:style>
+        <p:txBody>
+          <a:bodyPr wrap="none" lIns="90000" rIns="90000" tIns="45000" bIns="45000" anchor="ctr">
+            <a:noAutofit/>
+          </a:bodyPr>
+          <a:p>
+            <a:pPr algn="ctr"/>
+            <a:r>
+              <a:rPr b="0" lang="en-IN" sz="1800" spc="-1" strike="noStrike">
+                <a:latin typeface="Arial"/>
+              </a:rPr>
+              <a:t>SUPPLIERS</a:t>
+            </a:r>
+            <a:endParaRPr b="0" lang="en-IN" sz="1800" spc="-1" strike="noStrike">
+              <a:latin typeface="Arial"/>
+            </a:endParaRPr>
+          </a:p>
+        </p:txBody>
+      </p:sp>
+      <p:sp>
+        <p:nvSpPr>
+          <p:cNvPr id="51" name="CustomShape 4"/>
+          <p:cNvSpPr/>
+          <p:nvPr/>
+        </p:nvSpPr>
+        <p:spPr>
+          <a:xfrm>
+            <a:off x="4032000" y="648000"/>
+            <a:ext cx="1440000" cy="1368000"/>
+          </a:xfrm>
+          <a:custGeom>
+            <a:avLst/>
+            <a:gdLst/>
+            <a:ahLst/>
+            <a:rect l="l" t="t" r="r" b="b"/>
+            <a:pathLst>
+              <a:path w="21600" h="21600">
+                <a:moveTo>
+                  <a:pt x="10800" y="0"/>
+                </a:moveTo>
+                <a:lnTo>
+                  <a:pt x="21600" y="10800"/>
+                </a:lnTo>
+                <a:lnTo>
+                  <a:pt x="10800" y="21600"/>
+                </a:lnTo>
+                <a:lnTo>
+                  <a:pt x="0" y="10800"/>
+                </a:lnTo>
+                <a:lnTo>
+                  <a:pt x="10800" y="0"/>
+                </a:lnTo>
+                <a:close/>
+              </a:path>
+            </a:pathLst>
+          </a:custGeom>
+          <a:solidFill>
+            <a:srgbClr val="729fcf"/>
+          </a:solidFill>
+          <a:ln>
+            <a:solidFill>
+              <a:srgbClr val="3465a4"/>
+            </a:solidFill>
+          </a:ln>
+        </p:spPr>
+        <p:style>
+          <a:lnRef idx="0"/>
+          <a:fillRef idx="0"/>
+          <a:effectRef idx="0"/>
+          <a:fontRef idx="minor"/>
+        </p:style>
+        <p:txBody>
+          <a:bodyPr wrap="none" lIns="90000" rIns="90000" tIns="45000" bIns="45000" anchor="ctr">
+            <a:noAutofit/>
+          </a:bodyPr>
+          <a:p>
+            <a:pPr algn="ctr"/>
+            <a:r>
+              <a:rPr b="0" lang="en-IN" sz="1800" spc="-1" strike="noStrike">
+                <a:latin typeface="Arial"/>
+              </a:rPr>
+              <a:t>Borrowed</a:t>
+            </a:r>
+            <a:endParaRPr b="0" lang="en-IN" sz="1800" spc="-1" strike="noStrike">
+              <a:latin typeface="Arial"/>
+            </a:endParaRPr>
+          </a:p>
+          <a:p>
+            <a:pPr algn="ctr"/>
+            <a:r>
+              <a:rPr b="0" lang="en-IN" sz="1800" spc="-1" strike="noStrike">
+                <a:latin typeface="Arial"/>
+              </a:rPr>
+              <a:t>By</a:t>
+            </a:r>
+            <a:endParaRPr b="0" lang="en-IN" sz="1800" spc="-1" strike="noStrike">
+              <a:latin typeface="Arial"/>
+            </a:endParaRPr>
+          </a:p>
+        </p:txBody>
+      </p:sp>
+      <p:sp>
+        <p:nvSpPr>
+          <p:cNvPr id="52" name="CustomShape 5"/>
+          <p:cNvSpPr/>
+          <p:nvPr/>
+        </p:nvSpPr>
+        <p:spPr>
+          <a:xfrm>
+            <a:off x="1872000" y="2232360"/>
+            <a:ext cx="1440000" cy="1368000"/>
+          </a:xfrm>
+          <a:custGeom>
+            <a:avLst/>
+            <a:gdLst/>
+            <a:ahLst/>
+            <a:rect l="l" t="t" r="r" b="b"/>
+            <a:pathLst>
+              <a:path w="21600" h="21600">
+                <a:moveTo>
+                  <a:pt x="10800" y="0"/>
+                </a:moveTo>
+                <a:lnTo>
+                  <a:pt x="21600" y="10800"/>
+                </a:lnTo>
+                <a:lnTo>
+                  <a:pt x="10800" y="21600"/>
+                </a:lnTo>
+                <a:lnTo>
+                  <a:pt x="0" y="10800"/>
+                </a:lnTo>
+                <a:lnTo>
+                  <a:pt x="10800" y="0"/>
+                </a:lnTo>
+                <a:close/>
+              </a:path>
+            </a:pathLst>
+          </a:custGeom>
+          <a:solidFill>
+            <a:srgbClr val="729fcf"/>
+          </a:solidFill>
+          <a:ln>
+            <a:solidFill>
+              <a:srgbClr val="3465a4"/>
+            </a:solidFill>
+          </a:ln>
+        </p:spPr>
+        <p:style>
+          <a:lnRef idx="0"/>
+          <a:fillRef idx="0"/>
+          <a:effectRef idx="0"/>
+          <a:fontRef idx="minor"/>
+        </p:style>
+        <p:txBody>
+          <a:bodyPr wrap="none" lIns="90000" rIns="90000" tIns="45000" bIns="45000" anchor="ctr">
+            <a:noAutofit/>
+          </a:bodyPr>
+          <a:p>
+            <a:pPr algn="ctr"/>
+            <a:r>
+              <a:rPr b="0" lang="en-IN" sz="1800" spc="-1" strike="noStrike">
+                <a:latin typeface="Arial"/>
+              </a:rPr>
+              <a:t>Supplied</a:t>
+            </a:r>
+            <a:endParaRPr b="0" lang="en-IN" sz="1800" spc="-1" strike="noStrike">
+              <a:latin typeface="Arial"/>
+            </a:endParaRPr>
+          </a:p>
+          <a:p>
+            <a:pPr algn="ctr"/>
+            <a:r>
+              <a:rPr b="0" lang="en-IN" sz="1800" spc="-1" strike="noStrike">
+                <a:latin typeface="Arial"/>
+              </a:rPr>
+              <a:t>By</a:t>
+            </a:r>
+            <a:endParaRPr b="0" lang="en-IN" sz="1800" spc="-1" strike="noStrike">
+              <a:latin typeface="Arial"/>
+            </a:endParaRPr>
+          </a:p>
+        </p:txBody>
+      </p:sp>
+      <p:sp>
+        <p:nvSpPr>
+          <p:cNvPr id="53" name="Line 6"/>
+          <p:cNvSpPr/>
+          <p:nvPr/>
+        </p:nvSpPr>
+        <p:spPr>
+          <a:xfrm>
+            <a:off x="3348000" y="1332000"/>
+            <a:ext cx="684000" cy="0"/>
+          </a:xfrm>
+          <a:prstGeom prst="line">
+            <a:avLst/>
+          </a:prstGeom>
+          <a:ln>
+            <a:solidFill>
+              <a:srgbClr val="3465a4"/>
+            </a:solidFill>
+          </a:ln>
+        </p:spPr>
+        <p:style>
+          <a:lnRef idx="0"/>
+          <a:fillRef idx="0"/>
+          <a:effectRef idx="0"/>
+          <a:fontRef idx="minor"/>
+        </p:style>
+      </p:sp>
+      <p:sp>
+        <p:nvSpPr>
+          <p:cNvPr id="54" name="Line 7"/>
+          <p:cNvSpPr/>
+          <p:nvPr/>
+        </p:nvSpPr>
+        <p:spPr>
+          <a:xfrm>
+            <a:off x="5436000" y="1332000"/>
+            <a:ext cx="684000" cy="0"/>
+          </a:xfrm>
+          <a:prstGeom prst="line">
+            <a:avLst/>
+          </a:prstGeom>
+          <a:ln>
+            <a:solidFill>
+              <a:srgbClr val="3465a4"/>
+            </a:solidFill>
+          </a:ln>
+        </p:spPr>
+        <p:style>
+          <a:lnRef idx="0"/>
+          <a:fillRef idx="0"/>
+          <a:effectRef idx="0"/>
+          <a:fontRef idx="minor"/>
+        </p:style>
+      </p:sp>
+      <p:sp>
+        <p:nvSpPr>
+          <p:cNvPr id="55" name="Line 8"/>
+          <p:cNvSpPr/>
+          <p:nvPr/>
+        </p:nvSpPr>
+        <p:spPr>
+          <a:xfrm>
+            <a:off x="2592000" y="1728000"/>
+            <a:ext cx="0" cy="504360"/>
+          </a:xfrm>
+          <a:prstGeom prst="line">
+            <a:avLst/>
+          </a:prstGeom>
+          <a:ln>
+            <a:solidFill>
+              <a:srgbClr val="3465a4"/>
+            </a:solidFill>
+          </a:ln>
+        </p:spPr>
+        <p:style>
+          <a:lnRef idx="0"/>
+          <a:fillRef idx="0"/>
+          <a:effectRef idx="0"/>
+          <a:fontRef idx="minor"/>
+        </p:style>
+      </p:sp>
+      <p:sp>
+        <p:nvSpPr>
+          <p:cNvPr id="56" name="Line 9"/>
+          <p:cNvSpPr/>
+          <p:nvPr/>
+        </p:nvSpPr>
+        <p:spPr>
+          <a:xfrm>
+            <a:off x="2592000" y="3564360"/>
+            <a:ext cx="0" cy="504360"/>
+          </a:xfrm>
+          <a:prstGeom prst="line">
+            <a:avLst/>
+          </a:prstGeom>
+          <a:ln>
+            <a:solidFill>
+              <a:srgbClr val="3465a4"/>
+            </a:solidFill>
+          </a:ln>
+        </p:spPr>
+        <p:style>
+          <a:lnRef idx="0"/>
+          <a:fillRef idx="0"/>
+          <a:effectRef idx="0"/>
+          <a:fontRef idx="minor"/>
+        </p:style>
+      </p:sp>
+      <p:sp>
+        <p:nvSpPr>
+          <p:cNvPr id="57" name="CustomShape 10"/>
+          <p:cNvSpPr/>
+          <p:nvPr/>
+        </p:nvSpPr>
+        <p:spPr>
+          <a:xfrm>
+            <a:off x="5184000" y="2340000"/>
+            <a:ext cx="2016000" cy="576000"/>
+          </a:xfrm>
+          <a:prstGeom prst="ellipse">
+            <a:avLst/>
+          </a:prstGeom>
+          <a:solidFill>
+            <a:srgbClr val="729fcf"/>
+          </a:solidFill>
+          <a:ln>
+            <a:solidFill>
+              <a:srgbClr val="3465a4"/>
+            </a:solidFill>
+          </a:ln>
+        </p:spPr>
+        <p:style>
+          <a:lnRef idx="0"/>
+          <a:fillRef idx="0"/>
+          <a:effectRef idx="0"/>
+          <a:fontRef idx="minor"/>
+        </p:style>
+        <p:txBody>
+          <a:bodyPr wrap="none" lIns="90000" rIns="90000" tIns="45000" bIns="45000" anchor="ctr">
+            <a:noAutofit/>
+          </a:bodyPr>
+          <a:p>
+            <a:pPr algn="ctr"/>
+            <a:r>
+              <a:rPr b="0" lang="en-IN" sz="1800" spc="-1" strike="noStrike">
+                <a:latin typeface="Arial"/>
+              </a:rPr>
+              <a:t>Date of Issue</a:t>
+            </a:r>
+            <a:endParaRPr b="0" lang="en-IN" sz="1800" spc="-1" strike="noStrike">
+              <a:latin typeface="Arial"/>
+            </a:endParaRPr>
+          </a:p>
+        </p:txBody>
+      </p:sp>
+      <p:sp>
+        <p:nvSpPr>
+          <p:cNvPr id="58" name="CustomShape 11"/>
+          <p:cNvSpPr/>
+          <p:nvPr/>
+        </p:nvSpPr>
+        <p:spPr>
+          <a:xfrm>
+            <a:off x="3960360" y="3240360"/>
+            <a:ext cx="2016000" cy="576000"/>
+          </a:xfrm>
+          <a:prstGeom prst="ellipse">
+            <a:avLst/>
+          </a:prstGeom>
+          <a:solidFill>
+            <a:srgbClr val="729fcf"/>
+          </a:solidFill>
+          <a:ln>
+            <a:solidFill>
+              <a:srgbClr val="3465a4"/>
+            </a:solidFill>
+          </a:ln>
+        </p:spPr>
+        <p:style>
+          <a:lnRef idx="0"/>
+          <a:fillRef idx="0"/>
+          <a:effectRef idx="0"/>
+          <a:fontRef idx="minor"/>
+        </p:style>
+        <p:txBody>
+          <a:bodyPr wrap="none" lIns="90000" rIns="90000" tIns="45000" bIns="45000" anchor="ctr">
+            <a:noAutofit/>
+          </a:bodyPr>
+          <a:p>
+            <a:pPr algn="ctr"/>
+            <a:r>
+              <a:rPr b="0" lang="en-IN" sz="1800" spc="-1" strike="noStrike">
+                <a:latin typeface="Arial"/>
+              </a:rPr>
+              <a:t>Date of Supply</a:t>
+            </a:r>
+            <a:endParaRPr b="0" lang="en-IN" sz="1800" spc="-1" strike="noStrike">
+              <a:latin typeface="Arial"/>
+            </a:endParaRPr>
+          </a:p>
+        </p:txBody>
+      </p:sp>
+      <p:cxnSp>
+        <p:nvCxnSpPr>
+          <p:cNvPr id="59" name="Line 12"/>
+          <p:cNvCxnSpPr/>
+          <p:nvPr/>
+        </p:nvCxnSpPr>
+        <p:spPr>
+          <a:xfrm>
+            <a:off x="0" y="0"/>
+            <a:ext cx="360" cy="360"/>
+          </a:xfrm>
+          <a:prstGeom prst="line">
+            <a:avLst/>
+          </a:prstGeom>
+          <a:ln>
+            <a:solidFill>
+              <a:srgbClr val="3465a4"/>
+            </a:solidFill>
+          </a:ln>
+        </p:spPr>
+      </p:cxnSp>
+      <p:cxnSp>
+        <p:nvCxnSpPr>
+          <p:cNvPr id="60" name="Line 13"/>
+          <p:cNvCxnSpPr/>
+          <p:nvPr/>
+        </p:nvCxnSpPr>
+        <p:spPr>
+          <a:xfrm>
+            <a:off x="0" y="0"/>
+            <a:ext cx="360" cy="360"/>
+          </a:xfrm>
+          <a:prstGeom prst="line">
+            <a:avLst/>
+          </a:prstGeom>
+          <a:ln>
+            <a:solidFill>
+              <a:srgbClr val="3465a4"/>
+            </a:solidFill>
+          </a:ln>
+        </p:spPr>
+      </p:cxnSp>
+    </p:spTree>
+  </p:cSld>
+  <mc:AlternateContent>
+    <mc:Choice Requires="p14">
+      <p:transition spd="slow" p14:dur="2000"/>
+    </mc:Choice>
+    <mc:Fallback>
+      <p:transition spd="slow"/>
+    </mc:Fallback>
+  </mc:AlternateContent>
+</p:sld>
+</file>
+
+<file path=ppt/slides/slide3.xml><?xml version="1.0" encoding="utf-8"?>
+<p:sld xmlns:a="http://schemas.openxmlformats.org/drawingml/2006/main" xmlns:p="http://schemas.openxmlformats.org/presentationml/2006/main" xmlns:r="http://schemas.openxmlformats.org/officeDocument/2006/relationships" xmlns:p14="http://schemas.microsoft.com/office/powerpoint/2010/main" xmlns:p15="http://schemas.microsoft.com/office/powerpoint/2012/main" xmlns:mc="http://schemas.openxmlformats.org/markup-compatibility/2006">
+  <p:cSld>
+    <p:spTree>
+      <p:nvGrpSpPr>
+        <p:cNvPr id="1" name=""/>
+        <p:cNvGrpSpPr/>
+        <p:nvPr/>
+      </p:nvGrpSpPr>
+      <p:grpSpPr>
+        <a:xfrm>
+          <a:off x="0" y="0"/>
+          <a:ext cx="0" cy="0"/>
+          <a:chOff x="0" y="0"/>
+          <a:chExt cx="0" cy="0"/>
+        </a:xfrm>
+      </p:grpSpPr>
+      <p:sp>
+        <p:nvSpPr>
+          <p:cNvPr id="61" name="CustomShape 1"/>
+          <p:cNvSpPr/>
+          <p:nvPr/>
+        </p:nvSpPr>
+        <p:spPr>
+          <a:xfrm>
+            <a:off x="3060000" y="2268000"/>
+            <a:ext cx="1440000" cy="792000"/>
+          </a:xfrm>
+          <a:prstGeom prst="rect">
+            <a:avLst/>
+          </a:prstGeom>
+          <a:solidFill>
+            <a:srgbClr val="729fcf"/>
+          </a:solidFill>
+          <a:ln>
+            <a:solidFill>
+              <a:srgbClr val="3465a4"/>
+            </a:solidFill>
+          </a:ln>
+        </p:spPr>
+        <p:style>
+          <a:lnRef idx="0"/>
+          <a:fillRef idx="0"/>
+          <a:effectRef idx="0"/>
+          <a:fontRef idx="minor"/>
+        </p:style>
+        <p:txBody>
+          <a:bodyPr wrap="none" lIns="90000" rIns="90000" tIns="45000" bIns="45000" anchor="ctr">
+            <a:noAutofit/>
+          </a:bodyPr>
+          <a:p>
+            <a:pPr algn="ctr"/>
+            <a:r>
+              <a:rPr b="0" lang="en-IN" sz="1800" spc="-1" strike="noStrike">
+                <a:latin typeface="Arial"/>
+              </a:rPr>
+              <a:t>STAFF</a:t>
+            </a:r>
+            <a:endParaRPr b="0" lang="en-IN" sz="1800" spc="-1" strike="noStrike">
+              <a:latin typeface="Arial"/>
+            </a:endParaRPr>
+          </a:p>
+        </p:txBody>
+      </p:sp>
+      <p:sp>
+        <p:nvSpPr>
+          <p:cNvPr id="62" name="CustomShape 2"/>
+          <p:cNvSpPr/>
+          <p:nvPr/>
+        </p:nvSpPr>
+        <p:spPr>
+          <a:xfrm>
+            <a:off x="5832000" y="1980000"/>
+            <a:ext cx="1440000" cy="1368000"/>
+          </a:xfrm>
+          <a:custGeom>
+            <a:avLst/>
+            <a:gdLst/>
+            <a:ahLst/>
+            <a:rect l="l" t="t" r="r" b="b"/>
+            <a:pathLst>
+              <a:path w="21600" h="21600">
+                <a:moveTo>
+                  <a:pt x="10800" y="0"/>
+                </a:moveTo>
+                <a:lnTo>
+                  <a:pt x="21600" y="10800"/>
+                </a:lnTo>
+                <a:lnTo>
+                  <a:pt x="10800" y="21600"/>
+                </a:lnTo>
+                <a:lnTo>
+                  <a:pt x="0" y="10800"/>
+                </a:lnTo>
+                <a:lnTo>
+                  <a:pt x="10800" y="0"/>
+                </a:lnTo>
+                <a:close/>
+              </a:path>
+            </a:pathLst>
+          </a:custGeom>
+          <a:solidFill>
+            <a:srgbClr val="729fcf"/>
+          </a:solidFill>
+          <a:ln>
+            <a:solidFill>
+              <a:srgbClr val="3465a4"/>
+            </a:solidFill>
+          </a:ln>
+        </p:spPr>
+        <p:style>
+          <a:lnRef idx="0"/>
+          <a:fillRef idx="0"/>
+          <a:effectRef idx="0"/>
+          <a:fontRef idx="minor"/>
+        </p:style>
+        <p:txBody>
+          <a:bodyPr wrap="none" lIns="90000" rIns="90000" tIns="45000" bIns="45000" anchor="ctr">
+            <a:noAutofit/>
+          </a:bodyPr>
+          <a:p>
+            <a:pPr algn="ctr"/>
+            <a:r>
+              <a:rPr b="0" lang="en-IN" sz="1800" spc="-1" strike="noStrike">
+                <a:latin typeface="Arial"/>
+              </a:rPr>
+              <a:t>Rep</a:t>
+            </a:r>
+            <a:r>
+              <a:rPr b="0" lang="en-IN" sz="1800" spc="-1" strike="noStrike">
+                <a:latin typeface="Arial"/>
+              </a:rPr>
+              <a:t>ort</a:t>
+            </a:r>
+            <a:endParaRPr b="0" lang="en-IN" sz="1800" spc="-1" strike="noStrike">
+              <a:latin typeface="Arial"/>
+            </a:endParaRPr>
+          </a:p>
+          <a:p>
+            <a:pPr algn="ctr"/>
+            <a:r>
+              <a:rPr b="0" lang="en-IN" sz="1800" spc="-1" strike="noStrike">
+                <a:latin typeface="Arial"/>
+              </a:rPr>
+              <a:t>To</a:t>
+            </a:r>
+            <a:endParaRPr b="0" lang="en-IN" sz="1800" spc="-1" strike="noStrike">
+              <a:latin typeface="Arial"/>
+            </a:endParaRPr>
+          </a:p>
+        </p:txBody>
+      </p:sp>
+      <p:sp>
+        <p:nvSpPr>
+          <p:cNvPr id="63" name="Line 3"/>
+          <p:cNvSpPr/>
+          <p:nvPr/>
+        </p:nvSpPr>
+        <p:spPr>
+          <a:xfrm>
+            <a:off x="4500000" y="2664000"/>
+            <a:ext cx="1332000" cy="0"/>
+          </a:xfrm>
+          <a:prstGeom prst="line">
+            <a:avLst/>
+          </a:prstGeom>
+          <a:ln>
+            <a:solidFill>
+              <a:srgbClr val="3465a4"/>
+            </a:solidFill>
+          </a:ln>
+        </p:spPr>
+        <p:style>
+          <a:lnRef idx="0"/>
+          <a:fillRef idx="0"/>
+          <a:effectRef idx="0"/>
+          <a:fontRef idx="minor"/>
+        </p:style>
+      </p:sp>
+      <p:cxnSp>
+        <p:nvCxnSpPr>
+          <p:cNvPr id="64" name="Line 4"/>
+          <p:cNvCxnSpPr/>
+          <p:nvPr/>
+        </p:nvCxnSpPr>
+        <p:spPr>
+          <a:xfrm>
+            <a:off x="0" y="0"/>
+            <a:ext cx="360" cy="360"/>
+          </a:xfrm>
+          <a:prstGeom prst="line">
+            <a:avLst/>
+          </a:prstGeom>
+          <a:ln>
+            <a:solidFill>
+              <a:srgbClr val="3465a4"/>
+            </a:solidFill>
+          </a:ln>
+        </p:spPr>
+      </p:cxnSp>
+      <p:sp>
+        <p:nvSpPr>
+          <p:cNvPr id="65" name="CustomShape 5"/>
+          <p:cNvSpPr/>
+          <p:nvPr/>
+        </p:nvSpPr>
+        <p:spPr>
+          <a:xfrm>
+            <a:off x="2376000" y="1044000"/>
+            <a:ext cx="1152000" cy="684000"/>
+          </a:xfrm>
+          <a:prstGeom prst="ellipse">
+            <a:avLst/>
+          </a:prstGeom>
+          <a:solidFill>
+            <a:srgbClr val="729fcf"/>
+          </a:solidFill>
+          <a:ln>
+            <a:solidFill>
+              <a:srgbClr val="3465a4"/>
+            </a:solidFill>
+          </a:ln>
+        </p:spPr>
+        <p:style>
+          <a:lnRef idx="0"/>
+          <a:fillRef idx="0"/>
+          <a:effectRef idx="0"/>
+          <a:fontRef idx="minor"/>
+        </p:style>
+        <p:txBody>
+          <a:bodyPr wrap="none" lIns="90000" rIns="90000" tIns="45000" bIns="45000" anchor="ctr">
+            <a:noAutofit/>
+          </a:bodyPr>
+          <a:p>
+            <a:pPr algn="ctr"/>
+            <a:r>
+              <a:rPr b="0" lang="en-IN" sz="1800" spc="-1" strike="noStrike">
+                <a:latin typeface="Arial"/>
+              </a:rPr>
+              <a:t>E_CODE</a:t>
+            </a:r>
+            <a:endParaRPr b="0" lang="en-IN" sz="1800" spc="-1" strike="noStrike">
+              <a:latin typeface="Arial"/>
+            </a:endParaRPr>
+          </a:p>
+        </p:txBody>
+      </p:sp>
+      <p:sp>
+        <p:nvSpPr>
+          <p:cNvPr id="66" name="CustomShape 6"/>
+          <p:cNvSpPr/>
+          <p:nvPr/>
+        </p:nvSpPr>
+        <p:spPr>
+          <a:xfrm>
+            <a:off x="3780360" y="1044360"/>
+            <a:ext cx="1152000" cy="684000"/>
+          </a:xfrm>
+          <a:prstGeom prst="ellipse">
+            <a:avLst/>
+          </a:prstGeom>
+          <a:solidFill>
+            <a:srgbClr val="729fcf"/>
+          </a:solidFill>
+          <a:ln>
+            <a:solidFill>
+              <a:srgbClr val="3465a4"/>
+            </a:solidFill>
+          </a:ln>
+        </p:spPr>
+        <p:style>
+          <a:lnRef idx="0"/>
+          <a:fillRef idx="0"/>
+          <a:effectRef idx="0"/>
+          <a:fontRef idx="minor"/>
+        </p:style>
+        <p:txBody>
+          <a:bodyPr wrap="none" lIns="90000" rIns="90000" tIns="45000" bIns="45000" anchor="ctr">
+            <a:noAutofit/>
+          </a:bodyPr>
+          <a:p>
+            <a:pPr algn="ctr"/>
+            <a:r>
+              <a:rPr b="0" lang="en-IN" sz="1800" spc="-1" strike="noStrike">
+                <a:latin typeface="Arial"/>
+              </a:rPr>
+              <a:t>NAME</a:t>
+            </a:r>
+            <a:endParaRPr b="0" lang="en-IN" sz="1800" spc="-1" strike="noStrike">
+              <a:latin typeface="Arial"/>
+            </a:endParaRPr>
+          </a:p>
+        </p:txBody>
+      </p:sp>
+      <p:sp>
+        <p:nvSpPr>
+          <p:cNvPr id="67" name="CustomShape 7"/>
+          <p:cNvSpPr/>
+          <p:nvPr/>
+        </p:nvSpPr>
+        <p:spPr>
+          <a:xfrm>
+            <a:off x="2376360" y="1044360"/>
+            <a:ext cx="1152000" cy="684000"/>
+          </a:xfrm>
+          <a:prstGeom prst="ellipse">
+            <a:avLst/>
+          </a:prstGeom>
+          <a:solidFill>
+            <a:srgbClr val="729fcf"/>
+          </a:solidFill>
+          <a:ln>
+            <a:solidFill>
+              <a:srgbClr val="3465a4"/>
+            </a:solidFill>
+          </a:ln>
+        </p:spPr>
+        <p:style>
+          <a:lnRef idx="0"/>
+          <a:fillRef idx="0"/>
+          <a:effectRef idx="0"/>
+          <a:fontRef idx="minor"/>
+        </p:style>
+        <p:txBody>
+          <a:bodyPr wrap="none" lIns="90000" rIns="90000" tIns="45000" bIns="45000" anchor="ctr">
+            <a:noAutofit/>
+          </a:bodyPr>
+          <a:p>
+            <a:pPr algn="ctr"/>
+            <a:r>
+              <a:rPr b="0" lang="en-IN" sz="1800" spc="-1" strike="noStrike">
+                <a:latin typeface="Arial"/>
+              </a:rPr>
+              <a:t>E_CODE</a:t>
+            </a:r>
+            <a:endParaRPr b="0" lang="en-IN" sz="1800" spc="-1" strike="noStrike">
+              <a:latin typeface="Arial"/>
+            </a:endParaRPr>
+          </a:p>
+        </p:txBody>
+      </p:sp>
+      <p:sp>
+        <p:nvSpPr>
+          <p:cNvPr id="68" name="CustomShape 8"/>
+          <p:cNvSpPr/>
+          <p:nvPr/>
+        </p:nvSpPr>
+        <p:spPr>
+          <a:xfrm>
+            <a:off x="1512720" y="2160720"/>
+            <a:ext cx="1152000" cy="684000"/>
+          </a:xfrm>
+          <a:prstGeom prst="ellipse">
+            <a:avLst/>
+          </a:prstGeom>
+          <a:solidFill>
+            <a:srgbClr val="729fcf"/>
+          </a:solidFill>
+          <a:ln>
+            <a:solidFill>
+              <a:srgbClr val="3465a4"/>
+            </a:solidFill>
+          </a:ln>
+        </p:spPr>
+        <p:style>
+          <a:lnRef idx="0"/>
+          <a:fillRef idx="0"/>
+          <a:effectRef idx="0"/>
+          <a:fontRef idx="minor"/>
+        </p:style>
+        <p:txBody>
+          <a:bodyPr wrap="none" lIns="90000" rIns="90000" tIns="45000" bIns="45000" anchor="ctr">
+            <a:noAutofit/>
+          </a:bodyPr>
+          <a:p>
+            <a:pPr algn="ctr"/>
+            <a:r>
+              <a:rPr b="0" lang="en-IN" sz="1800" spc="-1" strike="noStrike">
+                <a:latin typeface="Arial"/>
+              </a:rPr>
+              <a:t>DEPT</a:t>
+            </a:r>
+            <a:endParaRPr b="0" lang="en-IN" sz="1800" spc="-1" strike="noStrike">
+              <a:latin typeface="Arial"/>
+            </a:endParaRPr>
+          </a:p>
+        </p:txBody>
+      </p:sp>
+      <p:sp>
+        <p:nvSpPr>
+          <p:cNvPr id="69" name="Line 9"/>
+          <p:cNvSpPr/>
+          <p:nvPr/>
+        </p:nvSpPr>
+        <p:spPr>
+          <a:xfrm>
+            <a:off x="3096000" y="1728360"/>
+            <a:ext cx="576000" cy="539640"/>
+          </a:xfrm>
+          <a:prstGeom prst="line">
+            <a:avLst/>
+          </a:prstGeom>
+          <a:ln>
+            <a:solidFill>
+              <a:srgbClr val="3465a4"/>
+            </a:solidFill>
+          </a:ln>
+        </p:spPr>
+        <p:style>
+          <a:lnRef idx="0"/>
+          <a:fillRef idx="0"/>
+          <a:effectRef idx="0"/>
+          <a:fontRef idx="minor"/>
+        </p:style>
+      </p:sp>
+      <p:sp>
+        <p:nvSpPr>
+          <p:cNvPr id="70" name="Line 10"/>
+          <p:cNvSpPr/>
+          <p:nvPr/>
+        </p:nvSpPr>
+        <p:spPr>
+          <a:xfrm flipH="1">
+            <a:off x="3960000" y="1728360"/>
+            <a:ext cx="360000" cy="540000"/>
+          </a:xfrm>
+          <a:prstGeom prst="line">
+            <a:avLst/>
+          </a:prstGeom>
+          <a:ln>
+            <a:solidFill>
+              <a:srgbClr val="3465a4"/>
+            </a:solidFill>
+          </a:ln>
+        </p:spPr>
+        <p:style>
+          <a:lnRef idx="0"/>
+          <a:fillRef idx="0"/>
+          <a:effectRef idx="0"/>
+          <a:fontRef idx="minor"/>
+        </p:style>
+      </p:sp>
+      <p:sp>
+        <p:nvSpPr>
+          <p:cNvPr id="71" name="Line 11"/>
+          <p:cNvSpPr/>
+          <p:nvPr/>
+        </p:nvSpPr>
+        <p:spPr>
+          <a:xfrm flipH="1">
+            <a:off x="2664720" y="2520360"/>
+            <a:ext cx="395280" cy="0"/>
+          </a:xfrm>
+          <a:prstGeom prst="line">
+            <a:avLst/>
+          </a:prstGeom>
+          <a:ln>
+            <a:solidFill>
+              <a:srgbClr val="3465a4"/>
+            </a:solidFill>
+          </a:ln>
+        </p:spPr>
+        <p:style>
+          <a:lnRef idx="0"/>
+          <a:fillRef idx="0"/>
+          <a:effectRef idx="0"/>
+          <a:fontRef idx="minor"/>
+        </p:style>
+      </p:sp>
+      <p:sp>
+        <p:nvSpPr>
+          <p:cNvPr id="72" name="TextShape 12"/>
+          <p:cNvSpPr txBox="1"/>
+          <p:nvPr/>
+        </p:nvSpPr>
+        <p:spPr>
+          <a:xfrm>
+            <a:off x="4500000" y="2376000"/>
+            <a:ext cx="1404000" cy="602280"/>
+          </a:xfrm>
+          <a:prstGeom prst="rect">
+            <a:avLst/>
+          </a:prstGeom>
+          <a:noFill/>
+          <a:ln>
+            <a:noFill/>
+          </a:ln>
+        </p:spPr>
+        <p:txBody>
+          <a:bodyPr lIns="90000" rIns="90000" tIns="45000" bIns="45000">
+            <a:noAutofit/>
+          </a:bodyPr>
+          <a:p>
+            <a:r>
+              <a:rPr b="0" lang="en-IN" sz="1800" spc="-1" strike="noStrike">
+                <a:latin typeface="Arial"/>
+              </a:rPr>
+              <a:t>MANAG</a:t>
+            </a:r>
+            <a:r>
+              <a:rPr b="0" lang="en-IN" sz="1800" spc="-1" strike="noStrike">
+                <a:latin typeface="Arial"/>
+              </a:rPr>
+              <a:t>ER</a:t>
+            </a:r>
+            <a:endParaRPr b="0" lang="en-IN" sz="1800" spc="-1" strike="noStrike">
+              <a:latin typeface="Arial"/>
+            </a:endParaRPr>
+          </a:p>
+        </p:txBody>
+      </p:sp>
+      <p:sp>
+        <p:nvSpPr>
+          <p:cNvPr id="73" name="TextShape 13"/>
+          <p:cNvSpPr txBox="1"/>
+          <p:nvPr/>
+        </p:nvSpPr>
+        <p:spPr>
+          <a:xfrm>
+            <a:off x="4320000" y="3204360"/>
+            <a:ext cx="1404000" cy="602280"/>
+          </a:xfrm>
+          <a:prstGeom prst="rect">
+            <a:avLst/>
+          </a:prstGeom>
+          <a:noFill/>
+          <a:ln>
+            <a:noFill/>
+          </a:ln>
+        </p:spPr>
+        <p:txBody>
+          <a:bodyPr lIns="90000" rIns="90000" tIns="45000" bIns="45000">
+            <a:noAutofit/>
+          </a:bodyPr>
+          <a:p>
+            <a:r>
+              <a:rPr b="0" lang="en-IN" sz="1800" spc="-1" strike="noStrike">
+                <a:latin typeface="Arial"/>
+              </a:rPr>
+              <a:t>WO</a:t>
+            </a:r>
+            <a:r>
+              <a:rPr b="0" lang="en-IN" sz="1800" spc="-1" strike="noStrike">
+                <a:latin typeface="Arial"/>
+              </a:rPr>
+              <a:t>RKE</a:t>
+            </a:r>
+            <a:r>
+              <a:rPr b="0" lang="en-IN" sz="1800" spc="-1" strike="noStrike">
+                <a:latin typeface="Arial"/>
+              </a:rPr>
+              <a:t>R</a:t>
             </a:r>
             <a:endParaRPr b="0" lang="en-IN" sz="1800" spc="-1" strike="noStrike">
               <a:latin typeface="Arial"/>

</xml_diff>

<commit_message>
Conceputal desgin -3, part 1
</commit_message>
<xml_diff>
--- a/GATE/images/gate_images.pptx
+++ b/GATE/images/gate_images.pptx
@@ -12,6 +12,9 @@
     <p:sldId id="260" r:id="rId7"/>
     <p:sldId id="261" r:id="rId8"/>
     <p:sldId id="262" r:id="rId9"/>
+    <p:sldId id="263" r:id="rId10"/>
+    <p:sldId id="264" r:id="rId11"/>
+    <p:sldId id="265" r:id="rId12"/>
   </p:sldIdLst>
   <p:sldSz cx="10080625" cy="5670550"/>
   <p:notesSz cx="7559675" cy="10691812"/>
@@ -1420,25 +1423,85 @@
               <a:rPr b="0" lang="en-IN" sz="4400" spc="-1" strike="noStrike">
                 <a:latin typeface="Arial"/>
               </a:rPr>
-              <a:t>Click to </a:t>
+              <a:t>Cli</a:t>
             </a:r>
             <a:r>
               <a:rPr b="0" lang="en-IN" sz="4400" spc="-1" strike="noStrike">
                 <a:latin typeface="Arial"/>
               </a:rPr>
-              <a:t>edit the </a:t>
+              <a:t>ck </a:t>
             </a:r>
             <a:r>
               <a:rPr b="0" lang="en-IN" sz="4400" spc="-1" strike="noStrike">
                 <a:latin typeface="Arial"/>
               </a:rPr>
-              <a:t>title text </a:t>
+              <a:t>to </a:t>
             </a:r>
             <a:r>
               <a:rPr b="0" lang="en-IN" sz="4400" spc="-1" strike="noStrike">
                 <a:latin typeface="Arial"/>
               </a:rPr>
-              <a:t>format</a:t>
+              <a:t>ed</a:t>
+            </a:r>
+            <a:r>
+              <a:rPr b="0" lang="en-IN" sz="4400" spc="-1" strike="noStrike">
+                <a:latin typeface="Arial"/>
+              </a:rPr>
+              <a:t>it </a:t>
+            </a:r>
+            <a:r>
+              <a:rPr b="0" lang="en-IN" sz="4400" spc="-1" strike="noStrike">
+                <a:latin typeface="Arial"/>
+              </a:rPr>
+              <a:t>th</a:t>
+            </a:r>
+            <a:r>
+              <a:rPr b="0" lang="en-IN" sz="4400" spc="-1" strike="noStrike">
+                <a:latin typeface="Arial"/>
+              </a:rPr>
+              <a:t>e </a:t>
+            </a:r>
+            <a:r>
+              <a:rPr b="0" lang="en-IN" sz="4400" spc="-1" strike="noStrike">
+                <a:latin typeface="Arial"/>
+              </a:rPr>
+              <a:t>titl</a:t>
+            </a:r>
+            <a:r>
+              <a:rPr b="0" lang="en-IN" sz="4400" spc="-1" strike="noStrike">
+                <a:latin typeface="Arial"/>
+              </a:rPr>
+              <a:t>e </a:t>
+            </a:r>
+            <a:r>
+              <a:rPr b="0" lang="en-IN" sz="4400" spc="-1" strike="noStrike">
+                <a:latin typeface="Arial"/>
+              </a:rPr>
+              <a:t>te</a:t>
+            </a:r>
+            <a:r>
+              <a:rPr b="0" lang="en-IN" sz="4400" spc="-1" strike="noStrike">
+                <a:latin typeface="Arial"/>
+              </a:rPr>
+              <a:t>xt </a:t>
+            </a:r>
+            <a:r>
+              <a:rPr b="0" lang="en-IN" sz="4400" spc="-1" strike="noStrike">
+                <a:latin typeface="Arial"/>
+              </a:rPr>
+              <a:t>for</a:t>
+            </a:r>
+            <a:r>
+              <a:rPr b="0" lang="en-IN" sz="4400" spc="-1" strike="noStrike">
+                <a:latin typeface="Arial"/>
+              </a:rPr>
+              <a:t>m</a:t>
+            </a:r>
+            <a:r>
+              <a:rPr b="0" lang="en-IN" sz="4400" spc="-1" strike="noStrike">
+                <a:latin typeface="Arial"/>
+              </a:rPr>
+              <a:t>at</a:t>
             </a:r>
             <a:endParaRPr b="0" lang="en-IN" sz="4400" spc="-1" strike="noStrike">
               <a:latin typeface="Arial"/>
@@ -1671,7 +1734,7 @@
         <p:spPr>
           <a:xfrm>
             <a:off x="1836000" y="1332000"/>
-            <a:ext cx="2374200" cy="790200"/>
+            <a:ext cx="2373840" cy="789840"/>
           </a:xfrm>
           <a:prstGeom prst="rect">
             <a:avLst/>
@@ -1726,7 +1789,7 @@
         <p:spPr>
           <a:xfrm>
             <a:off x="1836000" y="2880000"/>
-            <a:ext cx="2374200" cy="790200"/>
+            <a:ext cx="2373840" cy="789840"/>
           </a:xfrm>
           <a:prstGeom prst="rect">
             <a:avLst/>
@@ -1791,7 +1854,7 @@
         <p:spPr>
           <a:xfrm>
             <a:off x="1836000" y="4176000"/>
-            <a:ext cx="2374200" cy="790200"/>
+            <a:ext cx="2373840" cy="789840"/>
           </a:xfrm>
           <a:prstGeom prst="rect">
             <a:avLst/>
@@ -1866,7 +1929,7 @@
         <p:spPr>
           <a:xfrm>
             <a:off x="5292000" y="900000"/>
-            <a:ext cx="2374200" cy="1510200"/>
+            <a:ext cx="2373840" cy="1509840"/>
           </a:xfrm>
           <a:prstGeom prst="rect">
             <a:avLst/>
@@ -2001,7 +2064,7 @@
         <p:spPr>
           <a:xfrm>
             <a:off x="5292000" y="2571480"/>
-            <a:ext cx="2374200" cy="1278720"/>
+            <a:ext cx="2373840" cy="1278360"/>
           </a:xfrm>
           <a:prstGeom prst="rect">
             <a:avLst/>
@@ -2116,7 +2179,7 @@
         <p:spPr>
           <a:xfrm>
             <a:off x="5292000" y="4047480"/>
-            <a:ext cx="2374200" cy="1026720"/>
+            <a:ext cx="2373840" cy="1026360"/>
           </a:xfrm>
           <a:prstGeom prst="rect">
             <a:avLst/>
@@ -2295,7 +2358,7 @@
         <p:spPr>
           <a:xfrm>
             <a:off x="2988000" y="360000"/>
-            <a:ext cx="4390200" cy="344520"/>
+            <a:ext cx="4389840" cy="344160"/>
           </a:xfrm>
           <a:prstGeom prst="rect">
             <a:avLst/>
@@ -2336,6 +2399,623 @@
             </a:endParaRPr>
           </a:p>
         </p:txBody>
+      </p:sp>
+    </p:spTree>
+  </p:cSld>
+  <mc:AlternateContent>
+    <mc:Choice Requires="p14">
+      <p:transition spd="slow" p14:dur="2000"/>
+    </mc:Choice>
+    <mc:Fallback>
+      <p:transition spd="slow"/>
+    </mc:Fallback>
+  </mc:AlternateContent>
+</p:sld>
+</file>
+
+<file path=ppt/slides/slide10.xml><?xml version="1.0" encoding="utf-8"?>
+<p:sld xmlns:a="http://schemas.openxmlformats.org/drawingml/2006/main" xmlns:p="http://schemas.openxmlformats.org/presentationml/2006/main" xmlns:r="http://schemas.openxmlformats.org/officeDocument/2006/relationships" xmlns:p14="http://schemas.microsoft.com/office/powerpoint/2010/main" xmlns:p15="http://schemas.microsoft.com/office/powerpoint/2012/main" xmlns:mc="http://schemas.openxmlformats.org/markup-compatibility/2006">
+  <p:cSld>
+    <p:spTree>
+      <p:nvGrpSpPr>
+        <p:cNvPr id="1" name=""/>
+        <p:cNvGrpSpPr/>
+        <p:nvPr/>
+      </p:nvGrpSpPr>
+      <p:grpSpPr>
+        <a:xfrm>
+          <a:off x="0" y="0"/>
+          <a:ext cx="0" cy="0"/>
+          <a:chOff x="0" y="0"/>
+          <a:chExt cx="0" cy="0"/>
+        </a:xfrm>
+      </p:grpSpPr>
+      <p:sp>
+        <p:nvSpPr>
+          <p:cNvPr id="199" name="CustomShape 1"/>
+          <p:cNvSpPr/>
+          <p:nvPr/>
+        </p:nvSpPr>
+        <p:spPr>
+          <a:xfrm>
+            <a:off x="1440000" y="720000"/>
+            <a:ext cx="6768000" cy="1800000"/>
+          </a:xfrm>
+          <a:prstGeom prst="rect">
+            <a:avLst/>
+          </a:prstGeom>
+          <a:solidFill>
+            <a:srgbClr val="cccccc"/>
+          </a:solidFill>
+          <a:ln>
+            <a:solidFill>
+              <a:srgbClr val="3465a4"/>
+            </a:solidFill>
+          </a:ln>
+        </p:spPr>
+        <p:style>
+          <a:lnRef idx="0"/>
+          <a:fillRef idx="0"/>
+          <a:effectRef idx="0"/>
+          <a:fontRef idx="minor"/>
+        </p:style>
+      </p:sp>
+      <p:sp>
+        <p:nvSpPr>
+          <p:cNvPr id="200" name="CustomShape 2"/>
+          <p:cNvSpPr/>
+          <p:nvPr/>
+        </p:nvSpPr>
+        <p:spPr>
+          <a:xfrm>
+            <a:off x="2016000" y="1188000"/>
+            <a:ext cx="1438200" cy="790200"/>
+          </a:xfrm>
+          <a:prstGeom prst="rect">
+            <a:avLst/>
+          </a:prstGeom>
+          <a:solidFill>
+            <a:srgbClr val="729fcf"/>
+          </a:solidFill>
+          <a:ln>
+            <a:solidFill>
+              <a:srgbClr val="3465a4"/>
+            </a:solidFill>
+          </a:ln>
+        </p:spPr>
+        <p:style>
+          <a:lnRef idx="0"/>
+          <a:fillRef idx="0"/>
+          <a:effectRef idx="0"/>
+          <a:fontRef idx="minor"/>
+        </p:style>
+        <p:txBody>
+          <a:bodyPr wrap="none" lIns="90000" rIns="90000" tIns="45000" bIns="45000" anchor="ctr">
+            <a:noAutofit/>
+          </a:bodyPr>
+          <a:p>
+            <a:pPr algn="ctr">
+              <a:lnSpc>
+                <a:spcPct val="100000"/>
+              </a:lnSpc>
+            </a:pPr>
+            <a:r>
+              <a:rPr b="0" lang="en-IN" sz="1800" spc="-1" strike="noStrike">
+                <a:solidFill>
+                  <a:srgbClr val="000000"/>
+                </a:solidFill>
+                <a:latin typeface="Arial"/>
+                <a:ea typeface="DejaVu Sans"/>
+              </a:rPr>
+              <a:t>TEACHER</a:t>
+            </a:r>
+            <a:endParaRPr b="0" lang="en-IN" sz="1800" spc="-1" strike="noStrike">
+              <a:latin typeface="Arial"/>
+            </a:endParaRPr>
+          </a:p>
+        </p:txBody>
+      </p:sp>
+      <p:sp>
+        <p:nvSpPr>
+          <p:cNvPr id="201" name="CustomShape 3"/>
+          <p:cNvSpPr/>
+          <p:nvPr/>
+        </p:nvSpPr>
+        <p:spPr>
+          <a:xfrm>
+            <a:off x="6192000" y="1188000"/>
+            <a:ext cx="1438200" cy="790200"/>
+          </a:xfrm>
+          <a:prstGeom prst="rect">
+            <a:avLst/>
+          </a:prstGeom>
+          <a:solidFill>
+            <a:srgbClr val="729fcf"/>
+          </a:solidFill>
+          <a:ln>
+            <a:solidFill>
+              <a:srgbClr val="3465a4"/>
+            </a:solidFill>
+          </a:ln>
+        </p:spPr>
+        <p:style>
+          <a:lnRef idx="0"/>
+          <a:fillRef idx="0"/>
+          <a:effectRef idx="0"/>
+          <a:fontRef idx="minor"/>
+        </p:style>
+        <p:txBody>
+          <a:bodyPr wrap="none" lIns="90000" rIns="90000" tIns="45000" bIns="45000" anchor="ctr">
+            <a:noAutofit/>
+          </a:bodyPr>
+          <a:p>
+            <a:pPr algn="ctr">
+              <a:lnSpc>
+                <a:spcPct val="100000"/>
+              </a:lnSpc>
+            </a:pPr>
+            <a:r>
+              <a:rPr b="0" lang="en-IN" sz="1800" spc="-1" strike="noStrike">
+                <a:solidFill>
+                  <a:srgbClr val="000000"/>
+                </a:solidFill>
+                <a:latin typeface="Arial"/>
+                <a:ea typeface="DejaVu Sans"/>
+              </a:rPr>
+              <a:t>SUBJECT</a:t>
+            </a:r>
+            <a:endParaRPr b="0" lang="en-IN" sz="1800" spc="-1" strike="noStrike">
+              <a:latin typeface="Arial"/>
+            </a:endParaRPr>
+          </a:p>
+        </p:txBody>
+      </p:sp>
+      <p:sp>
+        <p:nvSpPr>
+          <p:cNvPr id="202" name="CustomShape 4"/>
+          <p:cNvSpPr/>
+          <p:nvPr/>
+        </p:nvSpPr>
+        <p:spPr>
+          <a:xfrm>
+            <a:off x="4140000" y="900000"/>
+            <a:ext cx="1438200" cy="1366200"/>
+          </a:xfrm>
+          <a:custGeom>
+            <a:avLst/>
+            <a:gdLst/>
+            <a:ahLst/>
+            <a:rect l="l" t="t" r="r" b="b"/>
+            <a:pathLst>
+              <a:path w="21600" h="21600">
+                <a:moveTo>
+                  <a:pt x="10800" y="0"/>
+                </a:moveTo>
+                <a:lnTo>
+                  <a:pt x="21600" y="10800"/>
+                </a:lnTo>
+                <a:lnTo>
+                  <a:pt x="10800" y="21600"/>
+                </a:lnTo>
+                <a:lnTo>
+                  <a:pt x="0" y="10800"/>
+                </a:lnTo>
+                <a:lnTo>
+                  <a:pt x="10800" y="0"/>
+                </a:lnTo>
+                <a:close/>
+              </a:path>
+            </a:pathLst>
+          </a:custGeom>
+          <a:solidFill>
+            <a:srgbClr val="729fcf"/>
+          </a:solidFill>
+          <a:ln>
+            <a:solidFill>
+              <a:srgbClr val="3465a4"/>
+            </a:solidFill>
+          </a:ln>
+        </p:spPr>
+        <p:style>
+          <a:lnRef idx="0"/>
+          <a:fillRef idx="0"/>
+          <a:effectRef idx="0"/>
+          <a:fontRef idx="minor"/>
+        </p:style>
+        <p:txBody>
+          <a:bodyPr wrap="none" lIns="90000" rIns="90000" tIns="45000" bIns="45000" anchor="ctr">
+            <a:noAutofit/>
+          </a:bodyPr>
+          <a:p>
+            <a:pPr algn="ctr">
+              <a:lnSpc>
+                <a:spcPct val="100000"/>
+              </a:lnSpc>
+            </a:pPr>
+            <a:r>
+              <a:rPr b="0" lang="en-IN" sz="1800" spc="-1" strike="noStrike">
+                <a:solidFill>
+                  <a:srgbClr val="000000"/>
+                </a:solidFill>
+                <a:latin typeface="Arial"/>
+                <a:ea typeface="DejaVu Sans"/>
+              </a:rPr>
+              <a:t>TEACHES</a:t>
+            </a:r>
+            <a:endParaRPr b="0" lang="en-IN" sz="1800" spc="-1" strike="noStrike">
+              <a:latin typeface="Arial"/>
+            </a:endParaRPr>
+          </a:p>
+        </p:txBody>
+      </p:sp>
+      <p:sp>
+        <p:nvSpPr>
+          <p:cNvPr id="203" name="Line 5"/>
+          <p:cNvSpPr/>
+          <p:nvPr/>
+        </p:nvSpPr>
+        <p:spPr>
+          <a:xfrm>
+            <a:off x="3456000" y="1584000"/>
+            <a:ext cx="684000" cy="0"/>
+          </a:xfrm>
+          <a:prstGeom prst="line">
+            <a:avLst/>
+          </a:prstGeom>
+          <a:ln>
+            <a:solidFill>
+              <a:srgbClr val="3465a4"/>
+            </a:solidFill>
+          </a:ln>
+        </p:spPr>
+        <p:style>
+          <a:lnRef idx="0"/>
+          <a:fillRef idx="0"/>
+          <a:effectRef idx="0"/>
+          <a:fontRef idx="minor"/>
+        </p:style>
+      </p:sp>
+      <p:sp>
+        <p:nvSpPr>
+          <p:cNvPr id="204" name="Line 6"/>
+          <p:cNvSpPr/>
+          <p:nvPr/>
+        </p:nvSpPr>
+        <p:spPr>
+          <a:xfrm>
+            <a:off x="0" y="0"/>
+            <a:ext cx="360" cy="360"/>
+          </a:xfrm>
+          <a:prstGeom prst="line">
+            <a:avLst/>
+          </a:prstGeom>
+          <a:ln>
+            <a:solidFill>
+              <a:srgbClr val="3465a4"/>
+            </a:solidFill>
+          </a:ln>
+        </p:spPr>
+        <p:style>
+          <a:lnRef idx="0"/>
+          <a:fillRef idx="0"/>
+          <a:effectRef idx="0"/>
+          <a:fontRef idx="minor"/>
+        </p:style>
+      </p:sp>
+      <p:sp>
+        <p:nvSpPr>
+          <p:cNvPr id="205" name="Line 7"/>
+          <p:cNvSpPr/>
+          <p:nvPr/>
+        </p:nvSpPr>
+        <p:spPr>
+          <a:xfrm>
+            <a:off x="0" y="0"/>
+            <a:ext cx="360" cy="360"/>
+          </a:xfrm>
+          <a:prstGeom prst="line">
+            <a:avLst/>
+          </a:prstGeom>
+          <a:ln>
+            <a:solidFill>
+              <a:srgbClr val="3465a4"/>
+            </a:solidFill>
+          </a:ln>
+        </p:spPr>
+        <p:style>
+          <a:lnRef idx="0"/>
+          <a:fillRef idx="0"/>
+          <a:effectRef idx="0"/>
+          <a:fontRef idx="minor"/>
+        </p:style>
+      </p:sp>
+      <p:sp>
+        <p:nvSpPr>
+          <p:cNvPr id="206" name="Line 8"/>
+          <p:cNvSpPr/>
+          <p:nvPr/>
+        </p:nvSpPr>
+        <p:spPr>
+          <a:xfrm>
+            <a:off x="5578560" y="1584000"/>
+            <a:ext cx="613440" cy="0"/>
+          </a:xfrm>
+          <a:prstGeom prst="line">
+            <a:avLst/>
+          </a:prstGeom>
+          <a:ln>
+            <a:solidFill>
+              <a:srgbClr val="3465a4"/>
+            </a:solidFill>
+          </a:ln>
+        </p:spPr>
+        <p:style>
+          <a:lnRef idx="0"/>
+          <a:fillRef idx="0"/>
+          <a:effectRef idx="0"/>
+          <a:fontRef idx="minor"/>
+        </p:style>
+      </p:sp>
+      <p:sp>
+        <p:nvSpPr>
+          <p:cNvPr id="207" name="CustomShape 9"/>
+          <p:cNvSpPr/>
+          <p:nvPr/>
+        </p:nvSpPr>
+        <p:spPr>
+          <a:xfrm>
+            <a:off x="4320000" y="3168000"/>
+            <a:ext cx="1042200" cy="792000"/>
+          </a:xfrm>
+          <a:custGeom>
+            <a:avLst/>
+            <a:gdLst/>
+            <a:ahLst/>
+            <a:rect l="l" t="t" r="r" b="b"/>
+            <a:pathLst>
+              <a:path w="21600" h="21600">
+                <a:moveTo>
+                  <a:pt x="10800" y="0"/>
+                </a:moveTo>
+                <a:lnTo>
+                  <a:pt x="21600" y="10800"/>
+                </a:lnTo>
+                <a:lnTo>
+                  <a:pt x="10800" y="21600"/>
+                </a:lnTo>
+                <a:lnTo>
+                  <a:pt x="0" y="10800"/>
+                </a:lnTo>
+                <a:lnTo>
+                  <a:pt x="10800" y="0"/>
+                </a:lnTo>
+                <a:close/>
+              </a:path>
+            </a:pathLst>
+          </a:custGeom>
+          <a:solidFill>
+            <a:srgbClr val="729fcf"/>
+          </a:solidFill>
+          <a:ln>
+            <a:solidFill>
+              <a:srgbClr val="3465a4"/>
+            </a:solidFill>
+          </a:ln>
+        </p:spPr>
+        <p:style>
+          <a:lnRef idx="0"/>
+          <a:fillRef idx="0"/>
+          <a:effectRef idx="0"/>
+          <a:fontRef idx="minor"/>
+        </p:style>
+        <p:txBody>
+          <a:bodyPr wrap="none" lIns="90000" rIns="90000" tIns="45000" bIns="45000" anchor="ctr">
+            <a:noAutofit/>
+          </a:bodyPr>
+          <a:p>
+            <a:pPr algn="ctr">
+              <a:lnSpc>
+                <a:spcPct val="100000"/>
+              </a:lnSpc>
+            </a:pPr>
+            <a:r>
+              <a:rPr b="0" lang="en-IN" sz="1800" spc="-1" strike="noStrike">
+                <a:solidFill>
+                  <a:srgbClr val="000000"/>
+                </a:solidFill>
+                <a:latin typeface="Arial"/>
+                <a:ea typeface="DejaVu Sans"/>
+              </a:rPr>
+              <a:t>USES</a:t>
+            </a:r>
+            <a:endParaRPr b="0" lang="en-IN" sz="1800" spc="-1" strike="noStrike">
+              <a:latin typeface="Arial"/>
+            </a:endParaRPr>
+          </a:p>
+        </p:txBody>
+      </p:sp>
+      <p:sp>
+        <p:nvSpPr>
+          <p:cNvPr id="208" name="CustomShape 10"/>
+          <p:cNvSpPr/>
+          <p:nvPr/>
+        </p:nvSpPr>
+        <p:spPr>
+          <a:xfrm>
+            <a:off x="4176000" y="4428000"/>
+            <a:ext cx="1438200" cy="790200"/>
+          </a:xfrm>
+          <a:prstGeom prst="rect">
+            <a:avLst/>
+          </a:prstGeom>
+          <a:solidFill>
+            <a:srgbClr val="729fcf"/>
+          </a:solidFill>
+          <a:ln>
+            <a:solidFill>
+              <a:srgbClr val="3465a4"/>
+            </a:solidFill>
+          </a:ln>
+        </p:spPr>
+        <p:style>
+          <a:lnRef idx="0"/>
+          <a:fillRef idx="0"/>
+          <a:effectRef idx="0"/>
+          <a:fontRef idx="minor"/>
+        </p:style>
+        <p:txBody>
+          <a:bodyPr wrap="none" lIns="90000" rIns="90000" tIns="45000" bIns="45000" anchor="ctr">
+            <a:noAutofit/>
+          </a:bodyPr>
+          <a:p>
+            <a:pPr algn="ctr">
+              <a:lnSpc>
+                <a:spcPct val="100000"/>
+              </a:lnSpc>
+            </a:pPr>
+            <a:r>
+              <a:rPr b="0" lang="en-IN" sz="1800" spc="-1" strike="noStrike">
+                <a:solidFill>
+                  <a:srgbClr val="000000"/>
+                </a:solidFill>
+                <a:latin typeface="Arial"/>
+                <a:ea typeface="DejaVu Sans"/>
+              </a:rPr>
+              <a:t>BOOKS</a:t>
+            </a:r>
+            <a:endParaRPr b="0" lang="en-IN" sz="1800" spc="-1" strike="noStrike">
+              <a:latin typeface="Arial"/>
+            </a:endParaRPr>
+          </a:p>
+        </p:txBody>
+      </p:sp>
+      <p:sp>
+        <p:nvSpPr>
+          <p:cNvPr id="209" name="Line 11"/>
+          <p:cNvSpPr/>
+          <p:nvPr/>
+        </p:nvSpPr>
+        <p:spPr>
+          <a:xfrm>
+            <a:off x="4860000" y="3960000"/>
+            <a:ext cx="0" cy="468000"/>
+          </a:xfrm>
+          <a:prstGeom prst="line">
+            <a:avLst/>
+          </a:prstGeom>
+          <a:ln>
+            <a:solidFill>
+              <a:srgbClr val="3465a4"/>
+            </a:solidFill>
+          </a:ln>
+        </p:spPr>
+        <p:style>
+          <a:lnRef idx="0"/>
+          <a:fillRef idx="0"/>
+          <a:effectRef idx="0"/>
+          <a:fontRef idx="minor"/>
+        </p:style>
+      </p:sp>
+      <p:sp>
+        <p:nvSpPr>
+          <p:cNvPr id="210" name="CustomShape 12"/>
+          <p:cNvSpPr/>
+          <p:nvPr/>
+        </p:nvSpPr>
+        <p:spPr>
+          <a:xfrm>
+            <a:off x="5870160" y="3314160"/>
+            <a:ext cx="1152000" cy="504000"/>
+          </a:xfrm>
+          <a:prstGeom prst="ellipse">
+            <a:avLst/>
+          </a:prstGeom>
+          <a:solidFill>
+            <a:srgbClr val="729fcf"/>
+          </a:solidFill>
+          <a:ln>
+            <a:solidFill>
+              <a:srgbClr val="3465a4"/>
+            </a:solidFill>
+          </a:ln>
+        </p:spPr>
+        <p:style>
+          <a:lnRef idx="0"/>
+          <a:fillRef idx="0"/>
+          <a:effectRef idx="0"/>
+          <a:fontRef idx="minor"/>
+        </p:style>
+        <p:txBody>
+          <a:bodyPr wrap="none" lIns="90000" rIns="90000" tIns="45000" bIns="45000" anchor="ctr">
+            <a:noAutofit/>
+          </a:bodyPr>
+          <a:p>
+            <a:pPr algn="ctr"/>
+            <a:r>
+              <a:rPr b="0" lang="en-IN" sz="1800" spc="-1" strike="noStrike">
+                <a:latin typeface="Arial"/>
+              </a:rPr>
+              <a:t>REF/TEXT</a:t>
+            </a:r>
+            <a:endParaRPr b="0" lang="en-IN" sz="1800" spc="-1" strike="noStrike">
+              <a:latin typeface="Arial"/>
+            </a:endParaRPr>
+          </a:p>
+        </p:txBody>
+      </p:sp>
+      <p:sp>
+        <p:nvSpPr>
+          <p:cNvPr id="211" name="Line 13"/>
+          <p:cNvSpPr/>
+          <p:nvPr/>
+        </p:nvSpPr>
+        <p:spPr>
+          <a:xfrm>
+            <a:off x="4860000" y="2520000"/>
+            <a:ext cx="0" cy="648000"/>
+          </a:xfrm>
+          <a:prstGeom prst="line">
+            <a:avLst/>
+          </a:prstGeom>
+          <a:ln>
+            <a:solidFill>
+              <a:srgbClr val="3465a4"/>
+            </a:solidFill>
+          </a:ln>
+        </p:spPr>
+        <p:style>
+          <a:lnRef idx="0"/>
+          <a:fillRef idx="0"/>
+          <a:effectRef idx="0"/>
+          <a:fontRef idx="minor"/>
+        </p:style>
+      </p:sp>
+      <p:sp>
+        <p:nvSpPr>
+          <p:cNvPr id="212" name="Line 14"/>
+          <p:cNvSpPr/>
+          <p:nvPr/>
+        </p:nvSpPr>
+        <p:spPr>
+          <a:xfrm>
+            <a:off x="5362200" y="3564000"/>
+            <a:ext cx="507960" cy="0"/>
+          </a:xfrm>
+          <a:prstGeom prst="line">
+            <a:avLst/>
+          </a:prstGeom>
+          <a:ln>
+            <a:solidFill>
+              <a:srgbClr val="3465a4"/>
+            </a:solidFill>
+          </a:ln>
+        </p:spPr>
+        <p:style>
+          <a:lnRef idx="0"/>
+          <a:fillRef idx="0"/>
+          <a:effectRef idx="0"/>
+          <a:fontRef idx="minor"/>
+        </p:style>
       </p:sp>
     </p:spTree>
   </p:cSld>
@@ -2376,7 +3056,7 @@
         <p:spPr>
           <a:xfrm>
             <a:off x="1908000" y="936000"/>
-            <a:ext cx="1438560" cy="790560"/>
+            <a:ext cx="1438200" cy="790200"/>
           </a:xfrm>
           <a:prstGeom prst="rect">
             <a:avLst/>
@@ -2431,7 +3111,7 @@
         <p:spPr>
           <a:xfrm>
             <a:off x="6084000" y="936000"/>
-            <a:ext cx="1438560" cy="790560"/>
+            <a:ext cx="1438200" cy="790200"/>
           </a:xfrm>
           <a:prstGeom prst="rect">
             <a:avLst/>
@@ -2486,7 +3166,7 @@
         <p:spPr>
           <a:xfrm>
             <a:off x="1908000" y="4068000"/>
-            <a:ext cx="1438560" cy="790560"/>
+            <a:ext cx="1438200" cy="790200"/>
           </a:xfrm>
           <a:prstGeom prst="rect">
             <a:avLst/>
@@ -2541,7 +3221,7 @@
         <p:spPr>
           <a:xfrm>
             <a:off x="4032000" y="648000"/>
-            <a:ext cx="1438560" cy="1366560"/>
+            <a:ext cx="1438200" cy="1366200"/>
           </a:xfrm>
           <a:custGeom>
             <a:avLst/>
@@ -2639,7 +3319,7 @@
         <p:spPr>
           <a:xfrm>
             <a:off x="1872000" y="2232360"/>
-            <a:ext cx="1438560" cy="1366560"/>
+            <a:ext cx="1438200" cy="1366200"/>
           </a:xfrm>
           <a:custGeom>
             <a:avLst/>
@@ -2845,7 +3525,7 @@
         <p:spPr>
           <a:xfrm>
             <a:off x="5184000" y="2340000"/>
-            <a:ext cx="2014560" cy="574560"/>
+            <a:ext cx="2014200" cy="574200"/>
           </a:xfrm>
           <a:prstGeom prst="ellipse">
             <a:avLst/>
@@ -2900,7 +3580,7 @@
         <p:spPr>
           <a:xfrm>
             <a:off x="3960360" y="3240360"/>
-            <a:ext cx="2014560" cy="574560"/>
+            <a:ext cx="2014200" cy="574200"/>
           </a:xfrm>
           <a:prstGeom prst="ellipse">
             <a:avLst/>
@@ -3039,7 +3719,7 @@
         <p:spPr>
           <a:xfrm>
             <a:off x="3060000" y="2268000"/>
-            <a:ext cx="1438560" cy="790560"/>
+            <a:ext cx="1438200" cy="790200"/>
           </a:xfrm>
           <a:prstGeom prst="rect">
             <a:avLst/>
@@ -3094,7 +3774,7 @@
         <p:spPr>
           <a:xfrm>
             <a:off x="5832000" y="1980000"/>
-            <a:ext cx="1438560" cy="1366560"/>
+            <a:ext cx="1438200" cy="1366200"/>
           </a:xfrm>
           <a:custGeom>
             <a:avLst/>
@@ -3246,7 +3926,7 @@
         <p:spPr>
           <a:xfrm>
             <a:off x="2376000" y="1044000"/>
-            <a:ext cx="1150560" cy="682560"/>
+            <a:ext cx="1150200" cy="682200"/>
           </a:xfrm>
           <a:prstGeom prst="ellipse">
             <a:avLst/>
@@ -3301,7 +3981,7 @@
         <p:spPr>
           <a:xfrm>
             <a:off x="3780360" y="1044360"/>
-            <a:ext cx="1150560" cy="682560"/>
+            <a:ext cx="1150200" cy="682200"/>
           </a:xfrm>
           <a:prstGeom prst="ellipse">
             <a:avLst/>
@@ -3356,7 +4036,7 @@
         <p:spPr>
           <a:xfrm>
             <a:off x="2376360" y="1044360"/>
-            <a:ext cx="1150560" cy="682560"/>
+            <a:ext cx="1150200" cy="682200"/>
           </a:xfrm>
           <a:prstGeom prst="ellipse">
             <a:avLst/>
@@ -3411,7 +4091,7 @@
         <p:spPr>
           <a:xfrm>
             <a:off x="1512720" y="2160720"/>
-            <a:ext cx="1150560" cy="682560"/>
+            <a:ext cx="1150200" cy="682200"/>
           </a:xfrm>
           <a:prstGeom prst="ellipse">
             <a:avLst/>
@@ -3547,7 +4227,7 @@
         <p:spPr>
           <a:xfrm>
             <a:off x="4500000" y="2376000"/>
-            <a:ext cx="1402560" cy="600840"/>
+            <a:ext cx="1402200" cy="600480"/>
           </a:xfrm>
           <a:prstGeom prst="rect">
             <a:avLst/>
@@ -3598,7 +4278,7 @@
         <p:spPr>
           <a:xfrm>
             <a:off x="4320000" y="3204360"/>
-            <a:ext cx="1402560" cy="600840"/>
+            <a:ext cx="1402200" cy="600480"/>
           </a:xfrm>
           <a:prstGeom prst="rect">
             <a:avLst/>
@@ -3679,7 +4359,7 @@
         <p:spPr>
           <a:xfrm>
             <a:off x="504000" y="576000"/>
-            <a:ext cx="430920" cy="1654920"/>
+            <a:ext cx="430560" cy="1654560"/>
           </a:xfrm>
           <a:prstGeom prst="ellipse">
             <a:avLst/>
@@ -3709,7 +4389,7 @@
         <p:spPr>
           <a:xfrm>
             <a:off x="1440360" y="576360"/>
-            <a:ext cx="430920" cy="1654920"/>
+            <a:ext cx="430560" cy="1654560"/>
           </a:xfrm>
           <a:prstGeom prst="ellipse">
             <a:avLst/>
@@ -3739,7 +4419,7 @@
         <p:spPr>
           <a:xfrm>
             <a:off x="3204720" y="612720"/>
-            <a:ext cx="430920" cy="1654920"/>
+            <a:ext cx="430560" cy="1654560"/>
           </a:xfrm>
           <a:prstGeom prst="ellipse">
             <a:avLst/>
@@ -3769,7 +4449,7 @@
         <p:spPr>
           <a:xfrm>
             <a:off x="4068720" y="576720"/>
-            <a:ext cx="430920" cy="1654920"/>
+            <a:ext cx="430560" cy="1654560"/>
           </a:xfrm>
           <a:prstGeom prst="ellipse">
             <a:avLst/>
@@ -3799,7 +4479,7 @@
         <p:spPr>
           <a:xfrm>
             <a:off x="504720" y="3204720"/>
-            <a:ext cx="430920" cy="1654920"/>
+            <a:ext cx="430560" cy="1654560"/>
           </a:xfrm>
           <a:prstGeom prst="ellipse">
             <a:avLst/>
@@ -3829,7 +4509,7 @@
         <p:spPr>
           <a:xfrm>
             <a:off x="1440720" y="3168720"/>
-            <a:ext cx="430920" cy="1654920"/>
+            <a:ext cx="430560" cy="1654560"/>
           </a:xfrm>
           <a:prstGeom prst="ellipse">
             <a:avLst/>
@@ -3859,7 +4539,7 @@
         <p:spPr>
           <a:xfrm>
             <a:off x="3240720" y="3168720"/>
-            <a:ext cx="430920" cy="1654920"/>
+            <a:ext cx="430560" cy="1654560"/>
           </a:xfrm>
           <a:prstGeom prst="ellipse">
             <a:avLst/>
@@ -3889,7 +4569,7 @@
         <p:spPr>
           <a:xfrm>
             <a:off x="4068720" y="3168720"/>
-            <a:ext cx="430920" cy="1654920"/>
+            <a:ext cx="430560" cy="1654560"/>
           </a:xfrm>
           <a:prstGeom prst="ellipse">
             <a:avLst/>
@@ -3919,7 +4599,7 @@
         <p:spPr>
           <a:xfrm>
             <a:off x="540000" y="936000"/>
-            <a:ext cx="502920" cy="345240"/>
+            <a:ext cx="502560" cy="344880"/>
           </a:xfrm>
           <a:prstGeom prst="rect">
             <a:avLst/>
@@ -3970,7 +4650,7 @@
         <p:spPr>
           <a:xfrm>
             <a:off x="540000" y="1512000"/>
-            <a:ext cx="502920" cy="345240"/>
+            <a:ext cx="502560" cy="344880"/>
           </a:xfrm>
           <a:prstGeom prst="rect">
             <a:avLst/>
@@ -4021,7 +4701,7 @@
         <p:spPr>
           <a:xfrm>
             <a:off x="1512000" y="1512000"/>
-            <a:ext cx="502920" cy="345240"/>
+            <a:ext cx="502560" cy="344880"/>
           </a:xfrm>
           <a:prstGeom prst="rect">
             <a:avLst/>
@@ -4072,7 +4752,7 @@
         <p:spPr>
           <a:xfrm>
             <a:off x="1512000" y="900000"/>
-            <a:ext cx="502920" cy="345240"/>
+            <a:ext cx="502560" cy="344880"/>
           </a:xfrm>
           <a:prstGeom prst="rect">
             <a:avLst/>
@@ -4123,7 +4803,7 @@
         <p:spPr>
           <a:xfrm>
             <a:off x="540000" y="1260000"/>
-            <a:ext cx="502920" cy="345240"/>
+            <a:ext cx="502560" cy="344880"/>
           </a:xfrm>
           <a:prstGeom prst="rect">
             <a:avLst/>
@@ -4174,7 +4854,7 @@
         <p:spPr>
           <a:xfrm>
             <a:off x="1512000" y="1224000"/>
-            <a:ext cx="502920" cy="345240"/>
+            <a:ext cx="502560" cy="344880"/>
           </a:xfrm>
           <a:prstGeom prst="rect">
             <a:avLst/>
@@ -4225,7 +4905,7 @@
         <p:spPr>
           <a:xfrm>
             <a:off x="3240000" y="900000"/>
-            <a:ext cx="502920" cy="345240"/>
+            <a:ext cx="502560" cy="344880"/>
           </a:xfrm>
           <a:prstGeom prst="rect">
             <a:avLst/>
@@ -4276,7 +4956,7 @@
         <p:spPr>
           <a:xfrm>
             <a:off x="4104000" y="900000"/>
-            <a:ext cx="502920" cy="345240"/>
+            <a:ext cx="502560" cy="344880"/>
           </a:xfrm>
           <a:prstGeom prst="rect">
             <a:avLst/>
@@ -4327,7 +5007,7 @@
         <p:spPr>
           <a:xfrm>
             <a:off x="4104000" y="1224000"/>
-            <a:ext cx="502920" cy="345240"/>
+            <a:ext cx="502560" cy="344880"/>
           </a:xfrm>
           <a:prstGeom prst="rect">
             <a:avLst/>
@@ -4378,7 +5058,7 @@
         <p:spPr>
           <a:xfrm>
             <a:off x="4104000" y="1620000"/>
-            <a:ext cx="502920" cy="345240"/>
+            <a:ext cx="502560" cy="344880"/>
           </a:xfrm>
           <a:prstGeom prst="rect">
             <a:avLst/>
@@ -4429,7 +5109,7 @@
         <p:spPr>
           <a:xfrm>
             <a:off x="576000" y="3492000"/>
-            <a:ext cx="502920" cy="345240"/>
+            <a:ext cx="502560" cy="344880"/>
           </a:xfrm>
           <a:prstGeom prst="rect">
             <a:avLst/>
@@ -4480,7 +5160,7 @@
         <p:spPr>
           <a:xfrm>
             <a:off x="576000" y="3852000"/>
-            <a:ext cx="502920" cy="345240"/>
+            <a:ext cx="502560" cy="344880"/>
           </a:xfrm>
           <a:prstGeom prst="rect">
             <a:avLst/>
@@ -4531,7 +5211,7 @@
         <p:spPr>
           <a:xfrm>
             <a:off x="576000" y="4176000"/>
-            <a:ext cx="502920" cy="345240"/>
+            <a:ext cx="502560" cy="344880"/>
           </a:xfrm>
           <a:prstGeom prst="rect">
             <a:avLst/>
@@ -4582,7 +5262,7 @@
         <p:spPr>
           <a:xfrm>
             <a:off x="1476000" y="3492000"/>
-            <a:ext cx="502920" cy="345240"/>
+            <a:ext cx="502560" cy="344880"/>
           </a:xfrm>
           <a:prstGeom prst="rect">
             <a:avLst/>
@@ -4633,7 +5313,7 @@
         <p:spPr>
           <a:xfrm>
             <a:off x="3240000" y="3492000"/>
-            <a:ext cx="502920" cy="345240"/>
+            <a:ext cx="502560" cy="344880"/>
           </a:xfrm>
           <a:prstGeom prst="rect">
             <a:avLst/>
@@ -4684,7 +5364,7 @@
         <p:spPr>
           <a:xfrm>
             <a:off x="3276000" y="3960000"/>
-            <a:ext cx="502920" cy="345240"/>
+            <a:ext cx="502560" cy="344880"/>
           </a:xfrm>
           <a:prstGeom prst="rect">
             <a:avLst/>
@@ -4735,7 +5415,7 @@
         <p:spPr>
           <a:xfrm>
             <a:off x="4140000" y="3492000"/>
-            <a:ext cx="502920" cy="345240"/>
+            <a:ext cx="502560" cy="344880"/>
           </a:xfrm>
           <a:prstGeom prst="rect">
             <a:avLst/>
@@ -4786,7 +5466,7 @@
         <p:spPr>
           <a:xfrm>
             <a:off x="4140000" y="3924000"/>
-            <a:ext cx="502920" cy="345240"/>
+            <a:ext cx="502560" cy="344880"/>
           </a:xfrm>
           <a:prstGeom prst="rect">
             <a:avLst/>
@@ -5134,7 +5814,7 @@
         <p:spPr>
           <a:xfrm>
             <a:off x="540000" y="2412000"/>
-            <a:ext cx="1294920" cy="345240"/>
+            <a:ext cx="1294560" cy="344880"/>
           </a:xfrm>
           <a:prstGeom prst="rect">
             <a:avLst/>
@@ -5185,7 +5865,7 @@
         <p:spPr>
           <a:xfrm>
             <a:off x="3168000" y="2412000"/>
-            <a:ext cx="1438920" cy="394920"/>
+            <a:ext cx="1438560" cy="394560"/>
           </a:xfrm>
           <a:prstGeom prst="rect">
             <a:avLst/>
@@ -5236,7 +5916,7 @@
         <p:spPr>
           <a:xfrm>
             <a:off x="3168000" y="4968000"/>
-            <a:ext cx="1582920" cy="358920"/>
+            <a:ext cx="1582560" cy="358560"/>
           </a:xfrm>
           <a:prstGeom prst="rect">
             <a:avLst/>
@@ -5287,7 +5967,7 @@
         <p:spPr>
           <a:xfrm>
             <a:off x="504000" y="4968000"/>
-            <a:ext cx="1438920" cy="358920"/>
+            <a:ext cx="1438560" cy="358560"/>
           </a:xfrm>
           <a:prstGeom prst="rect">
             <a:avLst/>
@@ -5368,7 +6048,7 @@
         <p:spPr>
           <a:xfrm>
             <a:off x="1872000" y="1008000"/>
-            <a:ext cx="2087280" cy="791280"/>
+            <a:ext cx="2086920" cy="790920"/>
           </a:xfrm>
           <a:prstGeom prst="rect">
             <a:avLst/>
@@ -5398,7 +6078,7 @@
         <p:spPr>
           <a:xfrm>
             <a:off x="5328000" y="756000"/>
-            <a:ext cx="1655280" cy="1223280"/>
+            <a:ext cx="1654920" cy="1222920"/>
           </a:xfrm>
           <a:custGeom>
             <a:avLst/>
@@ -5451,7 +6131,7 @@
         <p:spPr>
           <a:xfrm>
             <a:off x="1872360" y="3672360"/>
-            <a:ext cx="2087280" cy="791280"/>
+            <a:ext cx="2086920" cy="790920"/>
           </a:xfrm>
           <a:prstGeom prst="rect">
             <a:avLst/>
@@ -5481,7 +6161,7 @@
         <p:spPr>
           <a:xfrm>
             <a:off x="5328360" y="3420360"/>
-            <a:ext cx="1655280" cy="1223280"/>
+            <a:ext cx="1654920" cy="1222920"/>
           </a:xfrm>
           <a:custGeom>
             <a:avLst/>
@@ -5589,7 +6269,7 @@
         <p:spPr>
           <a:xfrm>
             <a:off x="1188000" y="2304000"/>
-            <a:ext cx="6911280" cy="345600"/>
+            <a:ext cx="6910920" cy="345240"/>
           </a:xfrm>
           <a:prstGeom prst="rect">
             <a:avLst/>
@@ -5640,7 +6320,7 @@
         <p:spPr>
           <a:xfrm>
             <a:off x="1080000" y="4788000"/>
-            <a:ext cx="7163280" cy="601560"/>
+            <a:ext cx="7162920" cy="601200"/>
           </a:xfrm>
           <a:prstGeom prst="rect">
             <a:avLst/>
@@ -5721,7 +6401,7 @@
         <p:spPr>
           <a:xfrm>
             <a:off x="1908000" y="2232000"/>
-            <a:ext cx="1438560" cy="790560"/>
+            <a:ext cx="1438200" cy="790200"/>
           </a:xfrm>
           <a:prstGeom prst="rect">
             <a:avLst/>
@@ -5776,7 +6456,7 @@
         <p:spPr>
           <a:xfrm>
             <a:off x="6084000" y="2232000"/>
-            <a:ext cx="1438560" cy="790560"/>
+            <a:ext cx="1438200" cy="790200"/>
           </a:xfrm>
           <a:prstGeom prst="rect">
             <a:avLst/>
@@ -5831,7 +6511,7 @@
         <p:spPr>
           <a:xfrm>
             <a:off x="4032000" y="1944000"/>
-            <a:ext cx="1438560" cy="1366560"/>
+            <a:ext cx="1438200" cy="1366200"/>
           </a:xfrm>
           <a:custGeom>
             <a:avLst/>
@@ -6038,7 +6718,7 @@
         <p:spPr>
           <a:xfrm>
             <a:off x="2592000" y="3636000"/>
-            <a:ext cx="7127280" cy="601560"/>
+            <a:ext cx="7126920" cy="601200"/>
           </a:xfrm>
           <a:prstGeom prst="rect">
             <a:avLst/>
@@ -6139,7 +6819,7 @@
         <p:spPr>
           <a:xfrm>
             <a:off x="5934960" y="2130480"/>
-            <a:ext cx="1697040" cy="1008000"/>
+            <a:ext cx="1696680" cy="1007640"/>
           </a:xfrm>
           <a:prstGeom prst="rect">
             <a:avLst/>
@@ -6169,7 +6849,7 @@
         <p:spPr>
           <a:xfrm>
             <a:off x="1908000" y="2232000"/>
-            <a:ext cx="1438560" cy="790560"/>
+            <a:ext cx="1438200" cy="790200"/>
           </a:xfrm>
           <a:prstGeom prst="rect">
             <a:avLst/>
@@ -6224,7 +6904,7 @@
         <p:spPr>
           <a:xfrm>
             <a:off x="6084000" y="2232000"/>
-            <a:ext cx="1438560" cy="790560"/>
+            <a:ext cx="1438200" cy="790200"/>
           </a:xfrm>
           <a:prstGeom prst="rect">
             <a:avLst/>
@@ -6279,7 +6959,7 @@
         <p:spPr>
           <a:xfrm>
             <a:off x="4032000" y="1944000"/>
-            <a:ext cx="1438560" cy="1366560"/>
+            <a:ext cx="1438200" cy="1366200"/>
           </a:xfrm>
           <a:custGeom>
             <a:avLst/>
@@ -6438,7 +7118,7 @@
         <p:spPr>
           <a:xfrm>
             <a:off x="1764000" y="3564000"/>
-            <a:ext cx="7127280" cy="601560"/>
+            <a:ext cx="7126920" cy="601200"/>
           </a:xfrm>
           <a:prstGeom prst="rect">
             <a:avLst/>
@@ -6472,8 +7152,110 @@
                 <a:latin typeface="Arial"/>
                 <a:ea typeface="DejaVu Sans"/>
               </a:rPr>
-              <a:t>A</a:t>
-            </a:r>
+              <a:t>ACCOUNT is EXISTENT DEPENDANTA on CUSTOMER, so ACCOUNT is a weak entity</a:t>
+            </a:r>
+            <a:endParaRPr b="0" lang="en-IN" sz="1800" spc="-1" strike="noStrike">
+              <a:latin typeface="Arial"/>
+            </a:endParaRPr>
+          </a:p>
+        </p:txBody>
+      </p:sp>
+      <p:sp>
+        <p:nvSpPr>
+          <p:cNvPr id="139" name="Line 9"/>
+          <p:cNvSpPr/>
+          <p:nvPr/>
+        </p:nvSpPr>
+        <p:spPr>
+          <a:xfrm>
+            <a:off x="5470560" y="2628000"/>
+            <a:ext cx="613440" cy="0"/>
+          </a:xfrm>
+          <a:prstGeom prst="line">
+            <a:avLst/>
+          </a:prstGeom>
+          <a:ln>
+            <a:solidFill>
+              <a:srgbClr val="3465a4"/>
+            </a:solidFill>
+          </a:ln>
+        </p:spPr>
+        <p:style>
+          <a:lnRef idx="0"/>
+          <a:fillRef idx="0"/>
+          <a:effectRef idx="0"/>
+          <a:fontRef idx="minor"/>
+        </p:style>
+      </p:sp>
+    </p:spTree>
+  </p:cSld>
+  <mc:AlternateContent>
+    <mc:Choice Requires="p14">
+      <p:transition spd="slow" p14:dur="2000"/>
+    </mc:Choice>
+    <mc:Fallback>
+      <p:transition spd="slow"/>
+    </mc:Fallback>
+  </mc:AlternateContent>
+</p:sld>
+</file>
+
+<file path=ppt/slides/slide8.xml><?xml version="1.0" encoding="utf-8"?>
+<p:sld xmlns:a="http://schemas.openxmlformats.org/drawingml/2006/main" xmlns:p="http://schemas.openxmlformats.org/presentationml/2006/main" xmlns:r="http://schemas.openxmlformats.org/officeDocument/2006/relationships" xmlns:p14="http://schemas.microsoft.com/office/powerpoint/2010/main" xmlns:p15="http://schemas.microsoft.com/office/powerpoint/2012/main" xmlns:mc="http://schemas.openxmlformats.org/markup-compatibility/2006">
+  <p:cSld>
+    <p:spTree>
+      <p:nvGrpSpPr>
+        <p:cNvPr id="1" name=""/>
+        <p:cNvGrpSpPr/>
+        <p:nvPr/>
+      </p:nvGrpSpPr>
+      <p:grpSpPr>
+        <a:xfrm>
+          <a:off x="0" y="0"/>
+          <a:ext cx="0" cy="0"/>
+          <a:chOff x="0" y="0"/>
+          <a:chExt cx="0" cy="0"/>
+        </a:xfrm>
+      </p:grpSpPr>
+      <p:sp>
+        <p:nvSpPr>
+          <p:cNvPr id="140" name="CustomShape 1"/>
+          <p:cNvSpPr/>
+          <p:nvPr/>
+        </p:nvSpPr>
+        <p:spPr>
+          <a:xfrm>
+            <a:off x="1945800" y="3636000"/>
+            <a:ext cx="1438200" cy="790200"/>
+          </a:xfrm>
+          <a:prstGeom prst="rect">
+            <a:avLst/>
+          </a:prstGeom>
+          <a:solidFill>
+            <a:srgbClr val="729fcf"/>
+          </a:solidFill>
+          <a:ln>
+            <a:solidFill>
+              <a:srgbClr val="3465a4"/>
+            </a:solidFill>
+          </a:ln>
+        </p:spPr>
+        <p:style>
+          <a:lnRef idx="0"/>
+          <a:fillRef idx="0"/>
+          <a:effectRef idx="0"/>
+          <a:fontRef idx="minor"/>
+        </p:style>
+        <p:txBody>
+          <a:bodyPr wrap="none" lIns="90000" rIns="90000" tIns="45000" bIns="45000" anchor="ctr">
+            <a:noAutofit/>
+          </a:bodyPr>
+          <a:p>
+            <a:pPr algn="ctr">
+              <a:lnSpc>
+                <a:spcPct val="100000"/>
+              </a:lnSpc>
+            </a:pPr>
             <a:r>
               <a:rPr b="0" lang="en-IN" sz="1800" spc="-1" strike="noStrike">
                 <a:solidFill>
@@ -6482,8 +7264,18 @@
                 <a:latin typeface="Arial"/>
                 <a:ea typeface="DejaVu Sans"/>
               </a:rPr>
-              <a:t>C</a:t>
-            </a:r>
+              <a:t>RESERVED</a:t>
+            </a:r>
+            <a:endParaRPr b="0" lang="en-IN" sz="1800" spc="-1" strike="noStrike">
+              <a:latin typeface="Arial"/>
+            </a:endParaRPr>
+          </a:p>
+          <a:p>
+            <a:pPr algn="ctr">
+              <a:lnSpc>
+                <a:spcPct val="100000"/>
+              </a:lnSpc>
+            </a:pPr>
             <a:r>
               <a:rPr b="0" lang="en-IN" sz="1800" spc="-1" strike="noStrike">
                 <a:solidFill>
@@ -6492,8 +7284,53 @@
                 <a:latin typeface="Arial"/>
                 <a:ea typeface="DejaVu Sans"/>
               </a:rPr>
-              <a:t>C</a:t>
-            </a:r>
+              <a:t>TICKET</a:t>
+            </a:r>
+            <a:endParaRPr b="0" lang="en-IN" sz="1800" spc="-1" strike="noStrike">
+              <a:latin typeface="Arial"/>
+            </a:endParaRPr>
+          </a:p>
+        </p:txBody>
+      </p:sp>
+      <p:sp>
+        <p:nvSpPr>
+          <p:cNvPr id="141" name="CustomShape 2"/>
+          <p:cNvSpPr/>
+          <p:nvPr/>
+        </p:nvSpPr>
+        <p:spPr>
+          <a:xfrm>
+            <a:off x="6300000" y="3673800"/>
+            <a:ext cx="1438200" cy="790200"/>
+          </a:xfrm>
+          <a:prstGeom prst="rect">
+            <a:avLst/>
+          </a:prstGeom>
+          <a:solidFill>
+            <a:srgbClr val="729fcf"/>
+          </a:solidFill>
+          <a:ln>
+            <a:solidFill>
+              <a:srgbClr val="3465a4"/>
+            </a:solidFill>
+          </a:ln>
+        </p:spPr>
+        <p:style>
+          <a:lnRef idx="0"/>
+          <a:fillRef idx="0"/>
+          <a:effectRef idx="0"/>
+          <a:fontRef idx="minor"/>
+        </p:style>
+        <p:txBody>
+          <a:bodyPr wrap="none" lIns="90000" rIns="90000" tIns="45000" bIns="45000" anchor="ctr">
+            <a:noAutofit/>
+          </a:bodyPr>
+          <a:p>
+            <a:pPr algn="ctr">
+              <a:lnSpc>
+                <a:spcPct val="100000"/>
+              </a:lnSpc>
+            </a:pPr>
             <a:r>
               <a:rPr b="0" lang="en-IN" sz="1800" spc="-1" strike="noStrike">
                 <a:solidFill>
@@ -6502,8 +7339,18 @@
                 <a:latin typeface="Arial"/>
                 <a:ea typeface="DejaVu Sans"/>
               </a:rPr>
-              <a:t>O</a:t>
-            </a:r>
+              <a:t>UNRES..</a:t>
+            </a:r>
+            <a:endParaRPr b="0" lang="en-IN" sz="1800" spc="-1" strike="noStrike">
+              <a:latin typeface="Arial"/>
+            </a:endParaRPr>
+          </a:p>
+          <a:p>
+            <a:pPr algn="ctr">
+              <a:lnSpc>
+                <a:spcPct val="100000"/>
+              </a:lnSpc>
+            </a:pPr>
             <a:r>
               <a:rPr b="0" lang="en-IN" sz="1800" spc="-1" strike="noStrike">
                 <a:solidFill>
@@ -6512,8 +7359,133 @@
                 <a:latin typeface="Arial"/>
                 <a:ea typeface="DejaVu Sans"/>
               </a:rPr>
-              <a:t>U</a:t>
-            </a:r>
+              <a:t>TICKET</a:t>
+            </a:r>
+            <a:endParaRPr b="0" lang="en-IN" sz="1800" spc="-1" strike="noStrike">
+              <a:latin typeface="Arial"/>
+            </a:endParaRPr>
+          </a:p>
+        </p:txBody>
+      </p:sp>
+      <p:sp>
+        <p:nvSpPr>
+          <p:cNvPr id="142" name="Line 3"/>
+          <p:cNvSpPr/>
+          <p:nvPr/>
+        </p:nvSpPr>
+        <p:spPr>
+          <a:xfrm>
+            <a:off x="0" y="0"/>
+            <a:ext cx="360" cy="360"/>
+          </a:xfrm>
+          <a:prstGeom prst="line">
+            <a:avLst/>
+          </a:prstGeom>
+          <a:ln>
+            <a:solidFill>
+              <a:srgbClr val="3465a4"/>
+            </a:solidFill>
+          </a:ln>
+        </p:spPr>
+        <p:style>
+          <a:lnRef idx="0"/>
+          <a:fillRef idx="0"/>
+          <a:effectRef idx="0"/>
+          <a:fontRef idx="minor"/>
+        </p:style>
+      </p:sp>
+      <p:sp>
+        <p:nvSpPr>
+          <p:cNvPr id="143" name="Line 4"/>
+          <p:cNvSpPr/>
+          <p:nvPr/>
+        </p:nvSpPr>
+        <p:spPr>
+          <a:xfrm>
+            <a:off x="0" y="0"/>
+            <a:ext cx="360" cy="360"/>
+          </a:xfrm>
+          <a:prstGeom prst="line">
+            <a:avLst/>
+          </a:prstGeom>
+          <a:ln>
+            <a:solidFill>
+              <a:srgbClr val="3465a4"/>
+            </a:solidFill>
+          </a:ln>
+        </p:spPr>
+        <p:style>
+          <a:lnRef idx="0"/>
+          <a:fillRef idx="0"/>
+          <a:effectRef idx="0"/>
+          <a:fontRef idx="minor"/>
+        </p:style>
+      </p:sp>
+      <p:sp>
+        <p:nvSpPr>
+          <p:cNvPr id="144" name="CustomShape 5"/>
+          <p:cNvSpPr/>
+          <p:nvPr/>
+        </p:nvSpPr>
+        <p:spPr>
+          <a:xfrm>
+            <a:off x="1764000" y="4860000"/>
+            <a:ext cx="7126920" cy="601200"/>
+          </a:xfrm>
+          <a:prstGeom prst="rect">
+            <a:avLst/>
+          </a:prstGeom>
+          <a:noFill/>
+          <a:ln>
+            <a:noFill/>
+          </a:ln>
+        </p:spPr>
+        <p:style>
+          <a:lnRef idx="0"/>
+          <a:fillRef idx="0"/>
+          <a:effectRef idx="0"/>
+          <a:fontRef idx="minor"/>
+        </p:style>
+      </p:sp>
+      <p:sp>
+        <p:nvSpPr>
+          <p:cNvPr id="145" name="CustomShape 6"/>
+          <p:cNvSpPr/>
+          <p:nvPr/>
+        </p:nvSpPr>
+        <p:spPr>
+          <a:xfrm>
+            <a:off x="4140000" y="1080000"/>
+            <a:ext cx="1438200" cy="790200"/>
+          </a:xfrm>
+          <a:prstGeom prst="rect">
+            <a:avLst/>
+          </a:prstGeom>
+          <a:solidFill>
+            <a:srgbClr val="729fcf"/>
+          </a:solidFill>
+          <a:ln>
+            <a:solidFill>
+              <a:srgbClr val="3465a4"/>
+            </a:solidFill>
+          </a:ln>
+        </p:spPr>
+        <p:style>
+          <a:lnRef idx="0"/>
+          <a:fillRef idx="0"/>
+          <a:effectRef idx="0"/>
+          <a:fontRef idx="minor"/>
+        </p:style>
+        <p:txBody>
+          <a:bodyPr wrap="none" lIns="90000" rIns="90000" tIns="45000" bIns="45000" anchor="ctr">
+            <a:noAutofit/>
+          </a:bodyPr>
+          <a:p>
+            <a:pPr algn="ctr">
+              <a:lnSpc>
+                <a:spcPct val="100000"/>
+              </a:lnSpc>
+            </a:pPr>
             <a:r>
               <a:rPr b="0" lang="en-IN" sz="1800" spc="-1" strike="noStrike">
                 <a:solidFill>
@@ -6522,8 +7494,945 @@
                 <a:latin typeface="Arial"/>
                 <a:ea typeface="DejaVu Sans"/>
               </a:rPr>
-              <a:t>N</a:t>
-            </a:r>
+              <a:t>TICKET</a:t>
+            </a:r>
+            <a:endParaRPr b="0" lang="en-IN" sz="1800" spc="-1" strike="noStrike">
+              <a:latin typeface="Arial"/>
+            </a:endParaRPr>
+          </a:p>
+        </p:txBody>
+      </p:sp>
+      <p:sp>
+        <p:nvSpPr>
+          <p:cNvPr id="146" name="CustomShape 7"/>
+          <p:cNvSpPr/>
+          <p:nvPr/>
+        </p:nvSpPr>
+        <p:spPr>
+          <a:xfrm>
+            <a:off x="4392000" y="2267640"/>
+            <a:ext cx="936000" cy="1008000"/>
+          </a:xfrm>
+          <a:custGeom>
+            <a:avLst/>
+            <a:gdLst/>
+            <a:ahLst/>
+            <a:rect l="0" t="0" r="r" b="b"/>
+            <a:pathLst>
+              <a:path w="2602" h="2802">
+                <a:moveTo>
+                  <a:pt x="1300" y="2801"/>
+                </a:moveTo>
+                <a:lnTo>
+                  <a:pt x="2601" y="0"/>
+                </a:lnTo>
+                <a:lnTo>
+                  <a:pt x="0" y="0"/>
+                </a:lnTo>
+                <a:lnTo>
+                  <a:pt x="1300" y="2801"/>
+                </a:lnTo>
+              </a:path>
+            </a:pathLst>
+          </a:custGeom>
+          <a:solidFill>
+            <a:srgbClr val="729fcf"/>
+          </a:solidFill>
+          <a:ln>
+            <a:solidFill>
+              <a:srgbClr val="3465a4"/>
+            </a:solidFill>
+          </a:ln>
+        </p:spPr>
+        <p:style>
+          <a:lnRef idx="0"/>
+          <a:fillRef idx="0"/>
+          <a:effectRef idx="0"/>
+          <a:fontRef idx="minor"/>
+        </p:style>
+      </p:sp>
+      <p:sp>
+        <p:nvSpPr>
+          <p:cNvPr id="147" name="TextShape 8"/>
+          <p:cNvSpPr txBox="1"/>
+          <p:nvPr/>
+        </p:nvSpPr>
+        <p:spPr>
+          <a:xfrm>
+            <a:off x="4572000" y="2304000"/>
+            <a:ext cx="648000" cy="346320"/>
+          </a:xfrm>
+          <a:prstGeom prst="rect">
+            <a:avLst/>
+          </a:prstGeom>
+          <a:noFill/>
+          <a:ln>
+            <a:noFill/>
+          </a:ln>
+        </p:spPr>
+        <p:txBody>
+          <a:bodyPr lIns="90000" rIns="90000" tIns="45000" bIns="45000">
+            <a:noAutofit/>
+          </a:bodyPr>
+          <a:p>
+            <a:r>
+              <a:rPr b="0" lang="en-IN" sz="1800" spc="-1" strike="noStrike">
+                <a:latin typeface="Arial"/>
+              </a:rPr>
+              <a:t>IS A</a:t>
+            </a:r>
+            <a:endParaRPr b="0" lang="en-IN" sz="1800" spc="-1" strike="noStrike">
+              <a:latin typeface="Arial"/>
+            </a:endParaRPr>
+          </a:p>
+        </p:txBody>
+      </p:sp>
+      <p:sp>
+        <p:nvSpPr>
+          <p:cNvPr id="148" name="Line 9"/>
+          <p:cNvSpPr/>
+          <p:nvPr/>
+        </p:nvSpPr>
+        <p:spPr>
+          <a:xfrm flipH="1">
+            <a:off x="3384000" y="2772000"/>
+            <a:ext cx="1224000" cy="864000"/>
+          </a:xfrm>
+          <a:prstGeom prst="line">
+            <a:avLst/>
+          </a:prstGeom>
+          <a:ln>
+            <a:solidFill>
+              <a:srgbClr val="3465a4"/>
+            </a:solidFill>
+          </a:ln>
+        </p:spPr>
+        <p:style>
+          <a:lnRef idx="0"/>
+          <a:fillRef idx="0"/>
+          <a:effectRef idx="0"/>
+          <a:fontRef idx="minor"/>
+        </p:style>
+      </p:sp>
+      <p:sp>
+        <p:nvSpPr>
+          <p:cNvPr id="149" name="Line 10"/>
+          <p:cNvSpPr/>
+          <p:nvPr/>
+        </p:nvSpPr>
+        <p:spPr>
+          <a:xfrm>
+            <a:off x="5112000" y="2772000"/>
+            <a:ext cx="1188000" cy="901800"/>
+          </a:xfrm>
+          <a:prstGeom prst="line">
+            <a:avLst/>
+          </a:prstGeom>
+          <a:ln>
+            <a:solidFill>
+              <a:srgbClr val="3465a4"/>
+            </a:solidFill>
+          </a:ln>
+        </p:spPr>
+        <p:style>
+          <a:lnRef idx="0"/>
+          <a:fillRef idx="0"/>
+          <a:effectRef idx="0"/>
+          <a:fontRef idx="minor"/>
+        </p:style>
+      </p:sp>
+      <p:sp>
+        <p:nvSpPr>
+          <p:cNvPr id="150" name="Line 11"/>
+          <p:cNvSpPr/>
+          <p:nvPr/>
+        </p:nvSpPr>
+        <p:spPr>
+          <a:xfrm>
+            <a:off x="4824000" y="1870200"/>
+            <a:ext cx="0" cy="433800"/>
+          </a:xfrm>
+          <a:prstGeom prst="line">
+            <a:avLst/>
+          </a:prstGeom>
+          <a:ln>
+            <a:solidFill>
+              <a:srgbClr val="3465a4"/>
+            </a:solidFill>
+          </a:ln>
+        </p:spPr>
+        <p:style>
+          <a:lnRef idx="0"/>
+          <a:fillRef idx="0"/>
+          <a:effectRef idx="0"/>
+          <a:fontRef idx="minor"/>
+        </p:style>
+      </p:sp>
+      <p:sp>
+        <p:nvSpPr>
+          <p:cNvPr id="151" name="CustomShape 12"/>
+          <p:cNvSpPr/>
+          <p:nvPr/>
+        </p:nvSpPr>
+        <p:spPr>
+          <a:xfrm>
+            <a:off x="2592000" y="432000"/>
+            <a:ext cx="1152000" cy="504000"/>
+          </a:xfrm>
+          <a:prstGeom prst="ellipse">
+            <a:avLst/>
+          </a:prstGeom>
+          <a:solidFill>
+            <a:srgbClr val="729fcf"/>
+          </a:solidFill>
+          <a:ln>
+            <a:solidFill>
+              <a:srgbClr val="3465a4"/>
+            </a:solidFill>
+          </a:ln>
+        </p:spPr>
+        <p:style>
+          <a:lnRef idx="0"/>
+          <a:fillRef idx="0"/>
+          <a:effectRef idx="0"/>
+          <a:fontRef idx="minor"/>
+        </p:style>
+        <p:txBody>
+          <a:bodyPr wrap="none" lIns="90000" rIns="90000" tIns="45000" bIns="45000" anchor="ctr">
+            <a:noAutofit/>
+          </a:bodyPr>
+          <a:p>
+            <a:pPr algn="ctr"/>
+            <a:r>
+              <a:rPr b="0" lang="en-IN" sz="1800" spc="-1" strike="noStrike">
+                <a:latin typeface="Arial"/>
+              </a:rPr>
+              <a:t>DESTI..</a:t>
+            </a:r>
+            <a:endParaRPr b="0" lang="en-IN" sz="1800" spc="-1" strike="noStrike">
+              <a:latin typeface="Arial"/>
+            </a:endParaRPr>
+          </a:p>
+        </p:txBody>
+      </p:sp>
+      <p:sp>
+        <p:nvSpPr>
+          <p:cNvPr id="152" name="CustomShape 13"/>
+          <p:cNvSpPr/>
+          <p:nvPr/>
+        </p:nvSpPr>
+        <p:spPr>
+          <a:xfrm>
+            <a:off x="4104360" y="360360"/>
+            <a:ext cx="1152000" cy="504000"/>
+          </a:xfrm>
+          <a:prstGeom prst="ellipse">
+            <a:avLst/>
+          </a:prstGeom>
+          <a:solidFill>
+            <a:srgbClr val="729fcf"/>
+          </a:solidFill>
+          <a:ln>
+            <a:solidFill>
+              <a:srgbClr val="3465a4"/>
+            </a:solidFill>
+          </a:ln>
+        </p:spPr>
+        <p:style>
+          <a:lnRef idx="0"/>
+          <a:fillRef idx="0"/>
+          <a:effectRef idx="0"/>
+          <a:fontRef idx="minor"/>
+        </p:style>
+        <p:txBody>
+          <a:bodyPr wrap="none" lIns="90000" rIns="90000" tIns="45000" bIns="45000" anchor="ctr">
+            <a:noAutofit/>
+          </a:bodyPr>
+          <a:p>
+            <a:pPr algn="ctr"/>
+            <a:r>
+              <a:rPr b="0" lang="en-IN" sz="1800" spc="-1" strike="noStrike">
+                <a:latin typeface="Arial"/>
+              </a:rPr>
+              <a:t>SOURCE</a:t>
+            </a:r>
+            <a:endParaRPr b="0" lang="en-IN" sz="1800" spc="-1" strike="noStrike">
+              <a:latin typeface="Arial"/>
+            </a:endParaRPr>
+          </a:p>
+        </p:txBody>
+      </p:sp>
+      <p:sp>
+        <p:nvSpPr>
+          <p:cNvPr id="153" name="CustomShape 14"/>
+          <p:cNvSpPr/>
+          <p:nvPr/>
+        </p:nvSpPr>
+        <p:spPr>
+          <a:xfrm>
+            <a:off x="5652720" y="432720"/>
+            <a:ext cx="1152000" cy="504000"/>
+          </a:xfrm>
+          <a:prstGeom prst="ellipse">
+            <a:avLst/>
+          </a:prstGeom>
+          <a:solidFill>
+            <a:srgbClr val="729fcf"/>
+          </a:solidFill>
+          <a:ln>
+            <a:solidFill>
+              <a:srgbClr val="3465a4"/>
+            </a:solidFill>
+          </a:ln>
+        </p:spPr>
+        <p:style>
+          <a:lnRef idx="0"/>
+          <a:fillRef idx="0"/>
+          <a:effectRef idx="0"/>
+          <a:fontRef idx="minor"/>
+        </p:style>
+        <p:txBody>
+          <a:bodyPr wrap="none" lIns="90000" rIns="90000" tIns="45000" bIns="45000" anchor="ctr">
+            <a:noAutofit/>
+          </a:bodyPr>
+          <a:p>
+            <a:pPr algn="ctr"/>
+            <a:r>
+              <a:rPr b="0" lang="en-IN" sz="1800" spc="-1" strike="noStrike">
+                <a:latin typeface="Arial"/>
+              </a:rPr>
+              <a:t>TICKET NO</a:t>
+            </a:r>
+            <a:endParaRPr b="0" lang="en-IN" sz="1800" spc="-1" strike="noStrike">
+              <a:latin typeface="Arial"/>
+            </a:endParaRPr>
+          </a:p>
+        </p:txBody>
+      </p:sp>
+      <p:sp>
+        <p:nvSpPr>
+          <p:cNvPr id="154" name="CustomShape 15"/>
+          <p:cNvSpPr/>
+          <p:nvPr/>
+        </p:nvSpPr>
+        <p:spPr>
+          <a:xfrm>
+            <a:off x="3813480" y="4321080"/>
+            <a:ext cx="1152000" cy="504000"/>
+          </a:xfrm>
+          <a:prstGeom prst="ellipse">
+            <a:avLst/>
+          </a:prstGeom>
+          <a:solidFill>
+            <a:srgbClr val="729fcf"/>
+          </a:solidFill>
+          <a:ln>
+            <a:solidFill>
+              <a:srgbClr val="3465a4"/>
+            </a:solidFill>
+          </a:ln>
+        </p:spPr>
+        <p:style>
+          <a:lnRef idx="0"/>
+          <a:fillRef idx="0"/>
+          <a:effectRef idx="0"/>
+          <a:fontRef idx="minor"/>
+        </p:style>
+        <p:txBody>
+          <a:bodyPr wrap="none" lIns="90000" rIns="90000" tIns="45000" bIns="45000" anchor="ctr">
+            <a:noAutofit/>
+          </a:bodyPr>
+          <a:p>
+            <a:pPr algn="ctr"/>
+            <a:r>
+              <a:rPr b="0" lang="en-IN" sz="1800" spc="-1" strike="noStrike">
+                <a:latin typeface="Arial"/>
+              </a:rPr>
+              <a:t>TRAIN NO</a:t>
+            </a:r>
+            <a:endParaRPr b="0" lang="en-IN" sz="1800" spc="-1" strike="noStrike">
+              <a:latin typeface="Arial"/>
+            </a:endParaRPr>
+          </a:p>
+        </p:txBody>
+      </p:sp>
+      <p:sp>
+        <p:nvSpPr>
+          <p:cNvPr id="155" name="CustomShape 16"/>
+          <p:cNvSpPr/>
+          <p:nvPr/>
+        </p:nvSpPr>
+        <p:spPr>
+          <a:xfrm>
+            <a:off x="2193840" y="4717440"/>
+            <a:ext cx="1152000" cy="504000"/>
+          </a:xfrm>
+          <a:prstGeom prst="ellipse">
+            <a:avLst/>
+          </a:prstGeom>
+          <a:solidFill>
+            <a:srgbClr val="729fcf"/>
+          </a:solidFill>
+          <a:ln>
+            <a:solidFill>
+              <a:srgbClr val="3465a4"/>
+            </a:solidFill>
+          </a:ln>
+        </p:spPr>
+        <p:style>
+          <a:lnRef idx="0"/>
+          <a:fillRef idx="0"/>
+          <a:effectRef idx="0"/>
+          <a:fontRef idx="minor"/>
+        </p:style>
+        <p:txBody>
+          <a:bodyPr wrap="none" lIns="90000" rIns="90000" tIns="45000" bIns="45000" anchor="ctr">
+            <a:noAutofit/>
+          </a:bodyPr>
+          <a:p>
+            <a:pPr algn="ctr"/>
+            <a:r>
+              <a:rPr b="0" lang="en-IN" sz="1800" spc="-1" strike="noStrike">
+                <a:latin typeface="Arial"/>
+              </a:rPr>
+              <a:t>SEAT NO</a:t>
+            </a:r>
+            <a:endParaRPr b="0" lang="en-IN" sz="1800" spc="-1" strike="noStrike">
+              <a:latin typeface="Arial"/>
+            </a:endParaRPr>
+          </a:p>
+        </p:txBody>
+      </p:sp>
+      <p:sp>
+        <p:nvSpPr>
+          <p:cNvPr id="156" name="CustomShape 17"/>
+          <p:cNvSpPr/>
+          <p:nvPr/>
+        </p:nvSpPr>
+        <p:spPr>
+          <a:xfrm>
+            <a:off x="682200" y="4501800"/>
+            <a:ext cx="1152000" cy="504000"/>
+          </a:xfrm>
+          <a:prstGeom prst="ellipse">
+            <a:avLst/>
+          </a:prstGeom>
+          <a:solidFill>
+            <a:srgbClr val="729fcf"/>
+          </a:solidFill>
+          <a:ln>
+            <a:solidFill>
+              <a:srgbClr val="3465a4"/>
+            </a:solidFill>
+          </a:ln>
+        </p:spPr>
+        <p:style>
+          <a:lnRef idx="0"/>
+          <a:fillRef idx="0"/>
+          <a:effectRef idx="0"/>
+          <a:fontRef idx="minor"/>
+        </p:style>
+        <p:txBody>
+          <a:bodyPr wrap="none" lIns="90000" rIns="90000" tIns="45000" bIns="45000" anchor="ctr">
+            <a:noAutofit/>
+          </a:bodyPr>
+          <a:p>
+            <a:pPr algn="ctr"/>
+            <a:r>
+              <a:rPr b="0" lang="en-IN" sz="1800" spc="-1" strike="noStrike">
+                <a:latin typeface="Arial"/>
+              </a:rPr>
+              <a:t>RES UPTO</a:t>
+            </a:r>
+            <a:endParaRPr b="0" lang="en-IN" sz="1800" spc="-1" strike="noStrike">
+              <a:latin typeface="Arial"/>
+            </a:endParaRPr>
+          </a:p>
+        </p:txBody>
+      </p:sp>
+      <p:sp>
+        <p:nvSpPr>
+          <p:cNvPr id="157" name="CustomShape 18"/>
+          <p:cNvSpPr/>
+          <p:nvPr/>
+        </p:nvSpPr>
+        <p:spPr>
+          <a:xfrm>
+            <a:off x="5434560" y="4574160"/>
+            <a:ext cx="1152000" cy="504000"/>
+          </a:xfrm>
+          <a:prstGeom prst="ellipse">
+            <a:avLst/>
+          </a:prstGeom>
+          <a:solidFill>
+            <a:srgbClr val="729fcf"/>
+          </a:solidFill>
+          <a:ln>
+            <a:solidFill>
+              <a:srgbClr val="3465a4"/>
+            </a:solidFill>
+          </a:ln>
+        </p:spPr>
+        <p:style>
+          <a:lnRef idx="0"/>
+          <a:fillRef idx="0"/>
+          <a:effectRef idx="0"/>
+          <a:fontRef idx="minor"/>
+        </p:style>
+        <p:txBody>
+          <a:bodyPr wrap="none" lIns="90000" rIns="90000" tIns="45000" bIns="45000" anchor="ctr">
+            <a:noAutofit/>
+          </a:bodyPr>
+          <a:p>
+            <a:pPr algn="ctr"/>
+            <a:r>
+              <a:rPr b="0" lang="en-IN" sz="1800" spc="-1" strike="noStrike">
+                <a:latin typeface="Arial"/>
+              </a:rPr>
+              <a:t>LOCAL /EXP</a:t>
+            </a:r>
+            <a:endParaRPr b="0" lang="en-IN" sz="1800" spc="-1" strike="noStrike">
+              <a:latin typeface="Arial"/>
+            </a:endParaRPr>
+          </a:p>
+        </p:txBody>
+      </p:sp>
+      <p:sp>
+        <p:nvSpPr>
+          <p:cNvPr id="158" name="CustomShape 19"/>
+          <p:cNvSpPr/>
+          <p:nvPr/>
+        </p:nvSpPr>
+        <p:spPr>
+          <a:xfrm>
+            <a:off x="7634160" y="4574520"/>
+            <a:ext cx="1152000" cy="504000"/>
+          </a:xfrm>
+          <a:prstGeom prst="ellipse">
+            <a:avLst/>
+          </a:prstGeom>
+          <a:solidFill>
+            <a:srgbClr val="729fcf"/>
+          </a:solidFill>
+          <a:ln>
+            <a:solidFill>
+              <a:srgbClr val="3465a4"/>
+            </a:solidFill>
+          </a:ln>
+        </p:spPr>
+        <p:style>
+          <a:lnRef idx="0"/>
+          <a:fillRef idx="0"/>
+          <a:effectRef idx="0"/>
+          <a:fontRef idx="minor"/>
+        </p:style>
+        <p:txBody>
+          <a:bodyPr wrap="none" lIns="90000" rIns="90000" tIns="45000" bIns="45000" anchor="ctr">
+            <a:noAutofit/>
+          </a:bodyPr>
+          <a:p>
+            <a:pPr algn="ctr"/>
+            <a:r>
+              <a:rPr b="0" lang="en-IN" sz="1800" spc="-1" strike="noStrike">
+                <a:latin typeface="Arial"/>
+              </a:rPr>
+              <a:t>FARE</a:t>
+            </a:r>
+            <a:endParaRPr b="0" lang="en-IN" sz="1800" spc="-1" strike="noStrike">
+              <a:latin typeface="Arial"/>
+            </a:endParaRPr>
+          </a:p>
+        </p:txBody>
+      </p:sp>
+      <p:sp>
+        <p:nvSpPr>
+          <p:cNvPr id="159" name="CustomShape 20"/>
+          <p:cNvSpPr/>
+          <p:nvPr/>
+        </p:nvSpPr>
+        <p:spPr>
+          <a:xfrm>
+            <a:off x="686520" y="3098880"/>
+            <a:ext cx="1152000" cy="504000"/>
+          </a:xfrm>
+          <a:prstGeom prst="ellipse">
+            <a:avLst/>
+          </a:prstGeom>
+          <a:solidFill>
+            <a:srgbClr val="729fcf"/>
+          </a:solidFill>
+          <a:ln>
+            <a:solidFill>
+              <a:srgbClr val="3465a4"/>
+            </a:solidFill>
+          </a:ln>
+        </p:spPr>
+        <p:style>
+          <a:lnRef idx="0"/>
+          <a:fillRef idx="0"/>
+          <a:effectRef idx="0"/>
+          <a:fontRef idx="minor"/>
+        </p:style>
+        <p:txBody>
+          <a:bodyPr wrap="none" lIns="90000" rIns="90000" tIns="45000" bIns="45000" anchor="ctr">
+            <a:noAutofit/>
+          </a:bodyPr>
+          <a:p>
+            <a:pPr algn="ctr"/>
+            <a:r>
+              <a:rPr b="0" lang="en-IN" sz="1800" spc="-1" strike="noStrike">
+                <a:latin typeface="Arial"/>
+              </a:rPr>
+              <a:t>FARE</a:t>
+            </a:r>
+            <a:endParaRPr b="0" lang="en-IN" sz="1800" spc="-1" strike="noStrike">
+              <a:latin typeface="Arial"/>
+            </a:endParaRPr>
+          </a:p>
+        </p:txBody>
+      </p:sp>
+      <p:sp>
+        <p:nvSpPr>
+          <p:cNvPr id="160" name="Line 21"/>
+          <p:cNvSpPr/>
+          <p:nvPr/>
+        </p:nvSpPr>
+        <p:spPr>
+          <a:xfrm>
+            <a:off x="3240000" y="936000"/>
+            <a:ext cx="900000" cy="432000"/>
+          </a:xfrm>
+          <a:prstGeom prst="line">
+            <a:avLst/>
+          </a:prstGeom>
+          <a:ln>
+            <a:solidFill>
+              <a:srgbClr val="3465a4"/>
+            </a:solidFill>
+          </a:ln>
+        </p:spPr>
+        <p:style>
+          <a:lnRef idx="0"/>
+          <a:fillRef idx="0"/>
+          <a:effectRef idx="0"/>
+          <a:fontRef idx="minor"/>
+        </p:style>
+      </p:sp>
+      <p:sp>
+        <p:nvSpPr>
+          <p:cNvPr id="161" name="Line 22"/>
+          <p:cNvSpPr/>
+          <p:nvPr/>
+        </p:nvSpPr>
+        <p:spPr>
+          <a:xfrm>
+            <a:off x="4608000" y="864360"/>
+            <a:ext cx="0" cy="215640"/>
+          </a:xfrm>
+          <a:prstGeom prst="line">
+            <a:avLst/>
+          </a:prstGeom>
+          <a:ln>
+            <a:solidFill>
+              <a:srgbClr val="3465a4"/>
+            </a:solidFill>
+          </a:ln>
+        </p:spPr>
+        <p:style>
+          <a:lnRef idx="0"/>
+          <a:fillRef idx="0"/>
+          <a:effectRef idx="0"/>
+          <a:fontRef idx="minor"/>
+        </p:style>
+      </p:sp>
+      <p:sp>
+        <p:nvSpPr>
+          <p:cNvPr id="162" name="Line 23"/>
+          <p:cNvSpPr/>
+          <p:nvPr/>
+        </p:nvSpPr>
+        <p:spPr>
+          <a:xfrm flipH="1">
+            <a:off x="5578200" y="936720"/>
+            <a:ext cx="613800" cy="431280"/>
+          </a:xfrm>
+          <a:prstGeom prst="line">
+            <a:avLst/>
+          </a:prstGeom>
+          <a:ln>
+            <a:solidFill>
+              <a:srgbClr val="3465a4"/>
+            </a:solidFill>
+          </a:ln>
+        </p:spPr>
+        <p:style>
+          <a:lnRef idx="0"/>
+          <a:fillRef idx="0"/>
+          <a:effectRef idx="0"/>
+          <a:fontRef idx="minor"/>
+        </p:style>
+      </p:sp>
+      <p:sp>
+        <p:nvSpPr>
+          <p:cNvPr id="163" name="Line 24"/>
+          <p:cNvSpPr/>
+          <p:nvPr/>
+        </p:nvSpPr>
+        <p:spPr>
+          <a:xfrm>
+            <a:off x="1296000" y="3602880"/>
+            <a:ext cx="649800" cy="33120"/>
+          </a:xfrm>
+          <a:prstGeom prst="line">
+            <a:avLst/>
+          </a:prstGeom>
+          <a:ln>
+            <a:solidFill>
+              <a:srgbClr val="3465a4"/>
+            </a:solidFill>
+          </a:ln>
+        </p:spPr>
+        <p:style>
+          <a:lnRef idx="0"/>
+          <a:fillRef idx="0"/>
+          <a:effectRef idx="0"/>
+          <a:fontRef idx="minor"/>
+        </p:style>
+      </p:sp>
+      <p:sp>
+        <p:nvSpPr>
+          <p:cNvPr id="164" name="Line 25"/>
+          <p:cNvSpPr/>
+          <p:nvPr/>
+        </p:nvSpPr>
+        <p:spPr>
+          <a:xfrm flipV="1">
+            <a:off x="1656000" y="4426200"/>
+            <a:ext cx="289800" cy="181800"/>
+          </a:xfrm>
+          <a:prstGeom prst="line">
+            <a:avLst/>
+          </a:prstGeom>
+          <a:ln>
+            <a:solidFill>
+              <a:srgbClr val="3465a4"/>
+            </a:solidFill>
+          </a:ln>
+        </p:spPr>
+        <p:style>
+          <a:lnRef idx="0"/>
+          <a:fillRef idx="0"/>
+          <a:effectRef idx="0"/>
+          <a:fontRef idx="minor"/>
+        </p:style>
+      </p:sp>
+      <p:sp>
+        <p:nvSpPr>
+          <p:cNvPr id="165" name="Line 26"/>
+          <p:cNvSpPr/>
+          <p:nvPr/>
+        </p:nvSpPr>
+        <p:spPr>
+          <a:xfrm flipH="1" flipV="1">
+            <a:off x="2664000" y="4426200"/>
+            <a:ext cx="72000" cy="291240"/>
+          </a:xfrm>
+          <a:prstGeom prst="line">
+            <a:avLst/>
+          </a:prstGeom>
+          <a:ln>
+            <a:solidFill>
+              <a:srgbClr val="3465a4"/>
+            </a:solidFill>
+          </a:ln>
+        </p:spPr>
+        <p:style>
+          <a:lnRef idx="0"/>
+          <a:fillRef idx="0"/>
+          <a:effectRef idx="0"/>
+          <a:fontRef idx="minor"/>
+        </p:style>
+      </p:sp>
+      <p:sp>
+        <p:nvSpPr>
+          <p:cNvPr id="166" name="Line 27"/>
+          <p:cNvSpPr/>
+          <p:nvPr/>
+        </p:nvSpPr>
+        <p:spPr>
+          <a:xfrm flipH="1" flipV="1">
+            <a:off x="3384000" y="4426200"/>
+            <a:ext cx="504000" cy="37800"/>
+          </a:xfrm>
+          <a:prstGeom prst="line">
+            <a:avLst/>
+          </a:prstGeom>
+          <a:ln>
+            <a:solidFill>
+              <a:srgbClr val="3465a4"/>
+            </a:solidFill>
+          </a:ln>
+        </p:spPr>
+        <p:style>
+          <a:lnRef idx="0"/>
+          <a:fillRef idx="0"/>
+          <a:effectRef idx="0"/>
+          <a:fontRef idx="minor"/>
+        </p:style>
+      </p:sp>
+      <p:sp>
+        <p:nvSpPr>
+          <p:cNvPr id="167" name="Line 28"/>
+          <p:cNvSpPr/>
+          <p:nvPr/>
+        </p:nvSpPr>
+        <p:spPr>
+          <a:xfrm flipV="1">
+            <a:off x="6336000" y="4464000"/>
+            <a:ext cx="360000" cy="216000"/>
+          </a:xfrm>
+          <a:prstGeom prst="line">
+            <a:avLst/>
+          </a:prstGeom>
+          <a:ln>
+            <a:solidFill>
+              <a:srgbClr val="3465a4"/>
+            </a:solidFill>
+          </a:ln>
+        </p:spPr>
+        <p:style>
+          <a:lnRef idx="0"/>
+          <a:fillRef idx="0"/>
+          <a:effectRef idx="0"/>
+          <a:fontRef idx="minor"/>
+        </p:style>
+      </p:sp>
+      <p:sp>
+        <p:nvSpPr>
+          <p:cNvPr id="168" name="Line 29"/>
+          <p:cNvSpPr/>
+          <p:nvPr/>
+        </p:nvSpPr>
+        <p:spPr>
+          <a:xfrm>
+            <a:off x="7560000" y="4464000"/>
+            <a:ext cx="504000" cy="110520"/>
+          </a:xfrm>
+          <a:prstGeom prst="line">
+            <a:avLst/>
+          </a:prstGeom>
+          <a:ln>
+            <a:solidFill>
+              <a:srgbClr val="3465a4"/>
+            </a:solidFill>
+          </a:ln>
+        </p:spPr>
+        <p:style>
+          <a:lnRef idx="0"/>
+          <a:fillRef idx="0"/>
+          <a:effectRef idx="0"/>
+          <a:fontRef idx="minor"/>
+        </p:style>
+      </p:sp>
+    </p:spTree>
+  </p:cSld>
+  <mc:AlternateContent>
+    <mc:Choice Requires="p14">
+      <p:transition spd="slow" p14:dur="2000"/>
+    </mc:Choice>
+    <mc:Fallback>
+      <p:transition spd="slow"/>
+    </mc:Fallback>
+  </mc:AlternateContent>
+</p:sld>
+</file>
+
+<file path=ppt/slides/slide9.xml><?xml version="1.0" encoding="utf-8"?>
+<p:sld xmlns:a="http://schemas.openxmlformats.org/drawingml/2006/main" xmlns:p="http://schemas.openxmlformats.org/presentationml/2006/main" xmlns:r="http://schemas.openxmlformats.org/officeDocument/2006/relationships" xmlns:p14="http://schemas.microsoft.com/office/powerpoint/2010/main" xmlns:p15="http://schemas.microsoft.com/office/powerpoint/2012/main" xmlns:mc="http://schemas.openxmlformats.org/markup-compatibility/2006">
+  <p:cSld>
+    <p:spTree>
+      <p:nvGrpSpPr>
+        <p:cNvPr id="1" name=""/>
+        <p:cNvGrpSpPr/>
+        <p:nvPr/>
+      </p:nvGrpSpPr>
+      <p:grpSpPr>
+        <a:xfrm>
+          <a:off x="0" y="0"/>
+          <a:ext cx="0" cy="0"/>
+          <a:chOff x="0" y="0"/>
+          <a:chExt cx="0" cy="0"/>
+        </a:xfrm>
+      </p:grpSpPr>
+      <p:sp>
+        <p:nvSpPr>
+          <p:cNvPr id="169" name="CustomShape 1"/>
+          <p:cNvSpPr/>
+          <p:nvPr/>
+        </p:nvSpPr>
+        <p:spPr>
+          <a:xfrm>
+            <a:off x="432000" y="72000"/>
+            <a:ext cx="9072000" cy="2520000"/>
+          </a:xfrm>
+          <a:prstGeom prst="rect">
+            <a:avLst/>
+          </a:prstGeom>
+          <a:solidFill>
+            <a:srgbClr val="cccccc"/>
+          </a:solidFill>
+          <a:ln>
+            <a:solidFill>
+              <a:srgbClr val="3465a4"/>
+            </a:solidFill>
+          </a:ln>
+        </p:spPr>
+        <p:style>
+          <a:lnRef idx="0"/>
+          <a:fillRef idx="0"/>
+          <a:effectRef idx="0"/>
+          <a:fontRef idx="minor"/>
+        </p:style>
+      </p:sp>
+      <p:sp>
+        <p:nvSpPr>
+          <p:cNvPr id="170" name="CustomShape 2"/>
+          <p:cNvSpPr/>
+          <p:nvPr/>
+        </p:nvSpPr>
+        <p:spPr>
+          <a:xfrm>
+            <a:off x="2016000" y="1188000"/>
+            <a:ext cx="1438200" cy="790200"/>
+          </a:xfrm>
+          <a:prstGeom prst="rect">
+            <a:avLst/>
+          </a:prstGeom>
+          <a:solidFill>
+            <a:srgbClr val="729fcf"/>
+          </a:solidFill>
+          <a:ln>
+            <a:solidFill>
+              <a:srgbClr val="3465a4"/>
+            </a:solidFill>
+          </a:ln>
+        </p:spPr>
+        <p:style>
+          <a:lnRef idx="0"/>
+          <a:fillRef idx="0"/>
+          <a:effectRef idx="0"/>
+          <a:fontRef idx="minor"/>
+        </p:style>
+        <p:txBody>
+          <a:bodyPr wrap="none" lIns="90000" rIns="90000" tIns="45000" bIns="45000" anchor="ctr">
+            <a:noAutofit/>
+          </a:bodyPr>
+          <a:p>
+            <a:pPr algn="ctr">
+              <a:lnSpc>
+                <a:spcPct val="100000"/>
+              </a:lnSpc>
+            </a:pPr>
             <a:r>
               <a:rPr b="0" lang="en-IN" sz="1800" spc="-1" strike="noStrike">
                 <a:solidFill>
@@ -6532,8 +8441,53 @@
                 <a:latin typeface="Arial"/>
                 <a:ea typeface="DejaVu Sans"/>
               </a:rPr>
-              <a:t>T</a:t>
-            </a:r>
+              <a:t>TEACHER</a:t>
+            </a:r>
+            <a:endParaRPr b="0" lang="en-IN" sz="1800" spc="-1" strike="noStrike">
+              <a:latin typeface="Arial"/>
+            </a:endParaRPr>
+          </a:p>
+        </p:txBody>
+      </p:sp>
+      <p:sp>
+        <p:nvSpPr>
+          <p:cNvPr id="171" name="CustomShape 3"/>
+          <p:cNvSpPr/>
+          <p:nvPr/>
+        </p:nvSpPr>
+        <p:spPr>
+          <a:xfrm>
+            <a:off x="6192000" y="1188000"/>
+            <a:ext cx="1438200" cy="790200"/>
+          </a:xfrm>
+          <a:prstGeom prst="rect">
+            <a:avLst/>
+          </a:prstGeom>
+          <a:solidFill>
+            <a:srgbClr val="729fcf"/>
+          </a:solidFill>
+          <a:ln>
+            <a:solidFill>
+              <a:srgbClr val="3465a4"/>
+            </a:solidFill>
+          </a:ln>
+        </p:spPr>
+        <p:style>
+          <a:lnRef idx="0"/>
+          <a:fillRef idx="0"/>
+          <a:effectRef idx="0"/>
+          <a:fontRef idx="minor"/>
+        </p:style>
+        <p:txBody>
+          <a:bodyPr wrap="none" lIns="90000" rIns="90000" tIns="45000" bIns="45000" anchor="ctr">
+            <a:noAutofit/>
+          </a:bodyPr>
+          <a:p>
+            <a:pPr algn="ctr">
+              <a:lnSpc>
+                <a:spcPct val="100000"/>
+              </a:lnSpc>
+            </a:pPr>
             <a:r>
               <a:rPr b="0" lang="en-IN" sz="1800" spc="-1" strike="noStrike">
                 <a:solidFill>
@@ -6542,8 +8496,76 @@
                 <a:latin typeface="Arial"/>
                 <a:ea typeface="DejaVu Sans"/>
               </a:rPr>
-              <a:t> </a:t>
-            </a:r>
+              <a:t>SUBJECT</a:t>
+            </a:r>
+            <a:endParaRPr b="0" lang="en-IN" sz="1800" spc="-1" strike="noStrike">
+              <a:latin typeface="Arial"/>
+            </a:endParaRPr>
+          </a:p>
+        </p:txBody>
+      </p:sp>
+      <p:sp>
+        <p:nvSpPr>
+          <p:cNvPr id="172" name="CustomShape 4"/>
+          <p:cNvSpPr/>
+          <p:nvPr/>
+        </p:nvSpPr>
+        <p:spPr>
+          <a:xfrm>
+            <a:off x="4140000" y="900000"/>
+            <a:ext cx="1438200" cy="1366200"/>
+          </a:xfrm>
+          <a:custGeom>
+            <a:avLst/>
+            <a:gdLst/>
+            <a:ahLst/>
+            <a:rect l="l" t="t" r="r" b="b"/>
+            <a:pathLst>
+              <a:path w="21600" h="21600">
+                <a:moveTo>
+                  <a:pt x="10800" y="0"/>
+                </a:moveTo>
+                <a:lnTo>
+                  <a:pt x="21600" y="10800"/>
+                </a:lnTo>
+                <a:lnTo>
+                  <a:pt x="10800" y="21600"/>
+                </a:lnTo>
+                <a:lnTo>
+                  <a:pt x="0" y="10800"/>
+                </a:lnTo>
+                <a:lnTo>
+                  <a:pt x="10800" y="0"/>
+                </a:lnTo>
+                <a:close/>
+              </a:path>
+            </a:pathLst>
+          </a:custGeom>
+          <a:solidFill>
+            <a:srgbClr val="729fcf"/>
+          </a:solidFill>
+          <a:ln>
+            <a:solidFill>
+              <a:srgbClr val="3465a4"/>
+            </a:solidFill>
+          </a:ln>
+        </p:spPr>
+        <p:style>
+          <a:lnRef idx="0"/>
+          <a:fillRef idx="0"/>
+          <a:effectRef idx="0"/>
+          <a:fontRef idx="minor"/>
+        </p:style>
+        <p:txBody>
+          <a:bodyPr wrap="none" lIns="90000" rIns="90000" tIns="45000" bIns="45000" anchor="ctr">
+            <a:noAutofit/>
+          </a:bodyPr>
+          <a:p>
+            <a:pPr algn="ctr">
+              <a:lnSpc>
+                <a:spcPct val="100000"/>
+              </a:lnSpc>
+            </a:pPr>
             <a:r>
               <a:rPr b="0" lang="en-IN" sz="1800" spc="-1" strike="noStrike">
                 <a:solidFill>
@@ -6552,8 +8574,130 @@
                 <a:latin typeface="Arial"/>
                 <a:ea typeface="DejaVu Sans"/>
               </a:rPr>
-              <a:t>i</a:t>
-            </a:r>
+              <a:t>TEACHES</a:t>
+            </a:r>
+            <a:endParaRPr b="0" lang="en-IN" sz="1800" spc="-1" strike="noStrike">
+              <a:latin typeface="Arial"/>
+            </a:endParaRPr>
+          </a:p>
+        </p:txBody>
+      </p:sp>
+      <p:sp>
+        <p:nvSpPr>
+          <p:cNvPr id="173" name="Line 5"/>
+          <p:cNvSpPr/>
+          <p:nvPr/>
+        </p:nvSpPr>
+        <p:spPr>
+          <a:xfrm>
+            <a:off x="3456000" y="1584000"/>
+            <a:ext cx="684000" cy="0"/>
+          </a:xfrm>
+          <a:prstGeom prst="line">
+            <a:avLst/>
+          </a:prstGeom>
+          <a:ln>
+            <a:solidFill>
+              <a:srgbClr val="3465a4"/>
+            </a:solidFill>
+          </a:ln>
+        </p:spPr>
+        <p:style>
+          <a:lnRef idx="0"/>
+          <a:fillRef idx="0"/>
+          <a:effectRef idx="0"/>
+          <a:fontRef idx="minor"/>
+        </p:style>
+      </p:sp>
+      <p:sp>
+        <p:nvSpPr>
+          <p:cNvPr id="174" name="Line 6"/>
+          <p:cNvSpPr/>
+          <p:nvPr/>
+        </p:nvSpPr>
+        <p:spPr>
+          <a:xfrm>
+            <a:off x="0" y="0"/>
+            <a:ext cx="360" cy="360"/>
+          </a:xfrm>
+          <a:prstGeom prst="line">
+            <a:avLst/>
+          </a:prstGeom>
+          <a:ln>
+            <a:solidFill>
+              <a:srgbClr val="3465a4"/>
+            </a:solidFill>
+          </a:ln>
+        </p:spPr>
+        <p:style>
+          <a:lnRef idx="0"/>
+          <a:fillRef idx="0"/>
+          <a:effectRef idx="0"/>
+          <a:fontRef idx="minor"/>
+        </p:style>
+      </p:sp>
+      <p:sp>
+        <p:nvSpPr>
+          <p:cNvPr id="175" name="Line 7"/>
+          <p:cNvSpPr/>
+          <p:nvPr/>
+        </p:nvSpPr>
+        <p:spPr>
+          <a:xfrm>
+            <a:off x="0" y="0"/>
+            <a:ext cx="360" cy="360"/>
+          </a:xfrm>
+          <a:prstGeom prst="line">
+            <a:avLst/>
+          </a:prstGeom>
+          <a:ln>
+            <a:solidFill>
+              <a:srgbClr val="3465a4"/>
+            </a:solidFill>
+          </a:ln>
+        </p:spPr>
+        <p:style>
+          <a:lnRef idx="0"/>
+          <a:fillRef idx="0"/>
+          <a:effectRef idx="0"/>
+          <a:fontRef idx="minor"/>
+        </p:style>
+      </p:sp>
+      <p:sp>
+        <p:nvSpPr>
+          <p:cNvPr id="176" name="CustomShape 8"/>
+          <p:cNvSpPr/>
+          <p:nvPr/>
+        </p:nvSpPr>
+        <p:spPr>
+          <a:xfrm>
+            <a:off x="-36000" y="3384000"/>
+            <a:ext cx="2628000" cy="601200"/>
+          </a:xfrm>
+          <a:prstGeom prst="rect">
+            <a:avLst/>
+          </a:prstGeom>
+          <a:noFill/>
+          <a:ln>
+            <a:noFill/>
+          </a:ln>
+        </p:spPr>
+        <p:style>
+          <a:lnRef idx="0"/>
+          <a:fillRef idx="0"/>
+          <a:effectRef idx="0"/>
+          <a:fontRef idx="minor"/>
+        </p:style>
+        <p:txBody>
+          <a:bodyPr lIns="90000" rIns="90000" tIns="45000" bIns="45000">
+            <a:noAutofit/>
+          </a:bodyPr>
+          <a:p>
+            <a:pPr>
+              <a:lnSpc>
+                <a:spcPct val="100000"/>
+              </a:lnSpc>
+            </a:pPr>
             <a:r>
               <a:rPr b="0" lang="en-IN" sz="1800" spc="-1" strike="noStrike">
                 <a:solidFill>
@@ -6562,8 +8706,468 @@
                 <a:latin typeface="Arial"/>
                 <a:ea typeface="DejaVu Sans"/>
               </a:rPr>
-              <a:t>s</a:t>
-            </a:r>
+              <a:t>We require the set of books used by the teacher to teach the subject</a:t>
+            </a:r>
+            <a:endParaRPr b="0" lang="en-IN" sz="1800" spc="-1" strike="noStrike">
+              <a:latin typeface="Arial"/>
+            </a:endParaRPr>
+          </a:p>
+        </p:txBody>
+      </p:sp>
+      <p:sp>
+        <p:nvSpPr>
+          <p:cNvPr id="177" name="Line 9"/>
+          <p:cNvSpPr/>
+          <p:nvPr/>
+        </p:nvSpPr>
+        <p:spPr>
+          <a:xfrm>
+            <a:off x="5578560" y="1584000"/>
+            <a:ext cx="613440" cy="0"/>
+          </a:xfrm>
+          <a:prstGeom prst="line">
+            <a:avLst/>
+          </a:prstGeom>
+          <a:ln>
+            <a:solidFill>
+              <a:srgbClr val="3465a4"/>
+            </a:solidFill>
+          </a:ln>
+        </p:spPr>
+        <p:style>
+          <a:lnRef idx="0"/>
+          <a:fillRef idx="0"/>
+          <a:effectRef idx="0"/>
+          <a:fontRef idx="minor"/>
+        </p:style>
+      </p:sp>
+      <p:sp>
+        <p:nvSpPr>
+          <p:cNvPr id="178" name="CustomShape 10"/>
+          <p:cNvSpPr/>
+          <p:nvPr/>
+        </p:nvSpPr>
+        <p:spPr>
+          <a:xfrm>
+            <a:off x="5868360" y="180360"/>
+            <a:ext cx="1152000" cy="504000"/>
+          </a:xfrm>
+          <a:prstGeom prst="ellipse">
+            <a:avLst/>
+          </a:prstGeom>
+          <a:solidFill>
+            <a:srgbClr val="729fcf"/>
+          </a:solidFill>
+          <a:ln>
+            <a:solidFill>
+              <a:srgbClr val="3465a4"/>
+            </a:solidFill>
+          </a:ln>
+        </p:spPr>
+        <p:style>
+          <a:lnRef idx="0"/>
+          <a:fillRef idx="0"/>
+          <a:effectRef idx="0"/>
+          <a:fontRef idx="minor"/>
+        </p:style>
+        <p:txBody>
+          <a:bodyPr wrap="none" lIns="90000" rIns="90000" tIns="45000" bIns="45000" anchor="ctr">
+            <a:noAutofit/>
+          </a:bodyPr>
+          <a:p>
+            <a:pPr algn="ctr"/>
+            <a:r>
+              <a:rPr b="0" lang="en-IN" sz="1800" spc="-1" strike="noStrike">
+                <a:latin typeface="Arial"/>
+              </a:rPr>
+              <a:t>S_C</a:t>
+            </a:r>
+            <a:r>
+              <a:rPr b="0" lang="en-IN" sz="1800" spc="-1" strike="noStrike">
+                <a:latin typeface="Arial"/>
+              </a:rPr>
+              <a:t>OD</a:t>
+            </a:r>
+            <a:r>
+              <a:rPr b="0" lang="en-IN" sz="1800" spc="-1" strike="noStrike">
+                <a:latin typeface="Arial"/>
+              </a:rPr>
+              <a:t>E</a:t>
+            </a:r>
+            <a:endParaRPr b="0" lang="en-IN" sz="1800" spc="-1" strike="noStrike">
+              <a:latin typeface="Arial"/>
+            </a:endParaRPr>
+          </a:p>
+        </p:txBody>
+      </p:sp>
+      <p:sp>
+        <p:nvSpPr>
+          <p:cNvPr id="179" name="CustomShape 11"/>
+          <p:cNvSpPr/>
+          <p:nvPr/>
+        </p:nvSpPr>
+        <p:spPr>
+          <a:xfrm>
+            <a:off x="7344720" y="216720"/>
+            <a:ext cx="1152000" cy="504000"/>
+          </a:xfrm>
+          <a:prstGeom prst="ellipse">
+            <a:avLst/>
+          </a:prstGeom>
+          <a:solidFill>
+            <a:srgbClr val="729fcf"/>
+          </a:solidFill>
+          <a:ln>
+            <a:solidFill>
+              <a:srgbClr val="3465a4"/>
+            </a:solidFill>
+          </a:ln>
+        </p:spPr>
+        <p:style>
+          <a:lnRef idx="0"/>
+          <a:fillRef idx="0"/>
+          <a:effectRef idx="0"/>
+          <a:fontRef idx="minor"/>
+        </p:style>
+        <p:txBody>
+          <a:bodyPr wrap="none" lIns="90000" rIns="90000" tIns="45000" bIns="45000" anchor="ctr">
+            <a:noAutofit/>
+          </a:bodyPr>
+          <a:p>
+            <a:pPr algn="ctr"/>
+            <a:r>
+              <a:rPr b="0" lang="en-IN" sz="1800" spc="-1" strike="noStrike">
+                <a:latin typeface="Arial"/>
+              </a:rPr>
+              <a:t>TIT</a:t>
+            </a:r>
+            <a:r>
+              <a:rPr b="0" lang="en-IN" sz="1800" spc="-1" strike="noStrike">
+                <a:latin typeface="Arial"/>
+              </a:rPr>
+              <a:t>LE</a:t>
+            </a:r>
+            <a:endParaRPr b="0" lang="en-IN" sz="1800" spc="-1" strike="noStrike">
+              <a:latin typeface="Arial"/>
+            </a:endParaRPr>
+          </a:p>
+        </p:txBody>
+      </p:sp>
+      <p:sp>
+        <p:nvSpPr>
+          <p:cNvPr id="180" name="CustomShape 12"/>
+          <p:cNvSpPr/>
+          <p:nvPr/>
+        </p:nvSpPr>
+        <p:spPr>
+          <a:xfrm>
+            <a:off x="7921080" y="937080"/>
+            <a:ext cx="1152000" cy="504000"/>
+          </a:xfrm>
+          <a:prstGeom prst="ellipse">
+            <a:avLst/>
+          </a:prstGeom>
+          <a:solidFill>
+            <a:srgbClr val="729fcf"/>
+          </a:solidFill>
+          <a:ln>
+            <a:solidFill>
+              <a:srgbClr val="3465a4"/>
+            </a:solidFill>
+          </a:ln>
+        </p:spPr>
+        <p:style>
+          <a:lnRef idx="0"/>
+          <a:fillRef idx="0"/>
+          <a:effectRef idx="0"/>
+          <a:fontRef idx="minor"/>
+        </p:style>
+        <p:txBody>
+          <a:bodyPr wrap="none" lIns="90000" rIns="90000" tIns="45000" bIns="45000" anchor="ctr">
+            <a:noAutofit/>
+          </a:bodyPr>
+          <a:p>
+            <a:pPr algn="ctr"/>
+            <a:r>
+              <a:rPr b="0" lang="en-IN" sz="1800" spc="-1" strike="noStrike">
+                <a:latin typeface="Arial"/>
+              </a:rPr>
+              <a:t>UG/PG</a:t>
+            </a:r>
+            <a:endParaRPr b="0" lang="en-IN" sz="1800" spc="-1" strike="noStrike">
+              <a:latin typeface="Arial"/>
+            </a:endParaRPr>
+          </a:p>
+        </p:txBody>
+      </p:sp>
+      <p:sp>
+        <p:nvSpPr>
+          <p:cNvPr id="181" name="CustomShape 13"/>
+          <p:cNvSpPr/>
+          <p:nvPr/>
+        </p:nvSpPr>
+        <p:spPr>
+          <a:xfrm>
+            <a:off x="7921440" y="1693440"/>
+            <a:ext cx="1152000" cy="504000"/>
+          </a:xfrm>
+          <a:prstGeom prst="ellipse">
+            <a:avLst/>
+          </a:prstGeom>
+          <a:solidFill>
+            <a:srgbClr val="729fcf"/>
+          </a:solidFill>
+          <a:ln>
+            <a:solidFill>
+              <a:srgbClr val="3465a4"/>
+            </a:solidFill>
+          </a:ln>
+        </p:spPr>
+        <p:style>
+          <a:lnRef idx="0"/>
+          <a:fillRef idx="0"/>
+          <a:effectRef idx="0"/>
+          <a:fontRef idx="minor"/>
+        </p:style>
+        <p:txBody>
+          <a:bodyPr wrap="none" lIns="90000" rIns="90000" tIns="45000" bIns="45000" anchor="ctr">
+            <a:noAutofit/>
+          </a:bodyPr>
+          <a:p>
+            <a:pPr algn="ctr"/>
+            <a:r>
+              <a:rPr b="0" lang="en-IN" sz="1800" spc="-1" strike="noStrike">
+                <a:latin typeface="Arial"/>
+              </a:rPr>
+              <a:t>LTP</a:t>
+            </a:r>
+            <a:endParaRPr b="0" lang="en-IN" sz="1800" spc="-1" strike="noStrike">
+              <a:latin typeface="Arial"/>
+            </a:endParaRPr>
+          </a:p>
+        </p:txBody>
+      </p:sp>
+      <p:sp>
+        <p:nvSpPr>
+          <p:cNvPr id="182" name="CustomShape 14"/>
+          <p:cNvSpPr/>
+          <p:nvPr/>
+        </p:nvSpPr>
+        <p:spPr>
+          <a:xfrm>
+            <a:off x="7921440" y="937440"/>
+            <a:ext cx="1152000" cy="504000"/>
+          </a:xfrm>
+          <a:prstGeom prst="ellipse">
+            <a:avLst/>
+          </a:prstGeom>
+          <a:solidFill>
+            <a:srgbClr val="729fcf"/>
+          </a:solidFill>
+          <a:ln>
+            <a:solidFill>
+              <a:srgbClr val="3465a4"/>
+            </a:solidFill>
+          </a:ln>
+        </p:spPr>
+        <p:style>
+          <a:lnRef idx="0"/>
+          <a:fillRef idx="0"/>
+          <a:effectRef idx="0"/>
+          <a:fontRef idx="minor"/>
+        </p:style>
+        <p:txBody>
+          <a:bodyPr wrap="none" lIns="90000" rIns="90000" tIns="45000" bIns="45000" anchor="ctr">
+            <a:noAutofit/>
+          </a:bodyPr>
+          <a:p>
+            <a:pPr algn="ctr"/>
+            <a:r>
+              <a:rPr b="0" lang="en-IN" sz="1800" spc="-1" strike="noStrike">
+                <a:latin typeface="Arial"/>
+              </a:rPr>
+              <a:t>U</a:t>
+            </a:r>
+            <a:r>
+              <a:rPr b="0" lang="en-IN" sz="1800" spc="-1" strike="noStrike">
+                <a:latin typeface="Arial"/>
+              </a:rPr>
+              <a:t>G/</a:t>
+            </a:r>
+            <a:r>
+              <a:rPr b="0" lang="en-IN" sz="1800" spc="-1" strike="noStrike">
+                <a:latin typeface="Arial"/>
+              </a:rPr>
+              <a:t>P</a:t>
+            </a:r>
+            <a:r>
+              <a:rPr b="0" lang="en-IN" sz="1800" spc="-1" strike="noStrike">
+                <a:latin typeface="Arial"/>
+              </a:rPr>
+              <a:t>G</a:t>
+            </a:r>
+            <a:endParaRPr b="0" lang="en-IN" sz="1800" spc="-1" strike="noStrike">
+              <a:latin typeface="Arial"/>
+            </a:endParaRPr>
+          </a:p>
+        </p:txBody>
+      </p:sp>
+      <p:sp>
+        <p:nvSpPr>
+          <p:cNvPr id="183" name="CustomShape 15"/>
+          <p:cNvSpPr/>
+          <p:nvPr/>
+        </p:nvSpPr>
+        <p:spPr>
+          <a:xfrm>
+            <a:off x="2089440" y="433440"/>
+            <a:ext cx="1152000" cy="504000"/>
+          </a:xfrm>
+          <a:prstGeom prst="ellipse">
+            <a:avLst/>
+          </a:prstGeom>
+          <a:solidFill>
+            <a:srgbClr val="729fcf"/>
+          </a:solidFill>
+          <a:ln>
+            <a:solidFill>
+              <a:srgbClr val="3465a4"/>
+            </a:solidFill>
+          </a:ln>
+        </p:spPr>
+        <p:style>
+          <a:lnRef idx="0"/>
+          <a:fillRef idx="0"/>
+          <a:effectRef idx="0"/>
+          <a:fontRef idx="minor"/>
+        </p:style>
+        <p:txBody>
+          <a:bodyPr wrap="none" lIns="90000" rIns="90000" tIns="45000" bIns="45000" anchor="ctr">
+            <a:noAutofit/>
+          </a:bodyPr>
+          <a:p>
+            <a:pPr algn="ctr"/>
+            <a:r>
+              <a:rPr b="0" lang="en-IN" sz="1800" spc="-1" strike="noStrike">
+                <a:latin typeface="Arial"/>
+              </a:rPr>
+              <a:t>NAME</a:t>
+            </a:r>
+            <a:endParaRPr b="0" lang="en-IN" sz="1800" spc="-1" strike="noStrike">
+              <a:latin typeface="Arial"/>
+            </a:endParaRPr>
+          </a:p>
+        </p:txBody>
+      </p:sp>
+      <p:sp>
+        <p:nvSpPr>
+          <p:cNvPr id="184" name="CustomShape 16"/>
+          <p:cNvSpPr/>
+          <p:nvPr/>
+        </p:nvSpPr>
+        <p:spPr>
+          <a:xfrm>
+            <a:off x="649800" y="541800"/>
+            <a:ext cx="1152000" cy="504000"/>
+          </a:xfrm>
+          <a:prstGeom prst="ellipse">
+            <a:avLst/>
+          </a:prstGeom>
+          <a:solidFill>
+            <a:srgbClr val="729fcf"/>
+          </a:solidFill>
+          <a:ln>
+            <a:solidFill>
+              <a:srgbClr val="3465a4"/>
+            </a:solidFill>
+          </a:ln>
+        </p:spPr>
+        <p:style>
+          <a:lnRef idx="0"/>
+          <a:fillRef idx="0"/>
+          <a:effectRef idx="0"/>
+          <a:fontRef idx="minor"/>
+        </p:style>
+        <p:txBody>
+          <a:bodyPr wrap="none" lIns="90000" rIns="90000" tIns="45000" bIns="45000" anchor="ctr">
+            <a:noAutofit/>
+          </a:bodyPr>
+          <a:p>
+            <a:pPr algn="ctr"/>
+            <a:r>
+              <a:rPr b="0" lang="en-IN" sz="1800" spc="-1" strike="noStrike">
+                <a:latin typeface="Arial"/>
+              </a:rPr>
+              <a:t>DEPT</a:t>
+            </a:r>
+            <a:endParaRPr b="0" lang="en-IN" sz="1800" spc="-1" strike="noStrike">
+              <a:latin typeface="Arial"/>
+            </a:endParaRPr>
+          </a:p>
+        </p:txBody>
+      </p:sp>
+      <p:sp>
+        <p:nvSpPr>
+          <p:cNvPr id="185" name="CustomShape 17"/>
+          <p:cNvSpPr/>
+          <p:nvPr/>
+        </p:nvSpPr>
+        <p:spPr>
+          <a:xfrm>
+            <a:off x="4320000" y="3168000"/>
+            <a:ext cx="1042200" cy="792000"/>
+          </a:xfrm>
+          <a:custGeom>
+            <a:avLst/>
+            <a:gdLst/>
+            <a:ahLst/>
+            <a:rect l="l" t="t" r="r" b="b"/>
+            <a:pathLst>
+              <a:path w="21600" h="21600">
+                <a:moveTo>
+                  <a:pt x="10800" y="0"/>
+                </a:moveTo>
+                <a:lnTo>
+                  <a:pt x="21600" y="10800"/>
+                </a:lnTo>
+                <a:lnTo>
+                  <a:pt x="10800" y="21600"/>
+                </a:lnTo>
+                <a:lnTo>
+                  <a:pt x="0" y="10800"/>
+                </a:lnTo>
+                <a:lnTo>
+                  <a:pt x="10800" y="0"/>
+                </a:lnTo>
+                <a:close/>
+              </a:path>
+            </a:pathLst>
+          </a:custGeom>
+          <a:solidFill>
+            <a:srgbClr val="729fcf"/>
+          </a:solidFill>
+          <a:ln>
+            <a:solidFill>
+              <a:srgbClr val="3465a4"/>
+            </a:solidFill>
+          </a:ln>
+        </p:spPr>
+        <p:style>
+          <a:lnRef idx="0"/>
+          <a:fillRef idx="0"/>
+          <a:effectRef idx="0"/>
+          <a:fontRef idx="minor"/>
+        </p:style>
+        <p:txBody>
+          <a:bodyPr wrap="none" lIns="90000" rIns="90000" tIns="45000" bIns="45000" anchor="ctr">
+            <a:noAutofit/>
+          </a:bodyPr>
+          <a:p>
+            <a:pPr algn="ctr">
+              <a:lnSpc>
+                <a:spcPct val="100000"/>
+              </a:lnSpc>
+            </a:pPr>
             <a:r>
               <a:rPr b="0" lang="en-IN" sz="1800" spc="-1" strike="noStrike">
                 <a:solidFill>
@@ -6572,8 +9176,53 @@
                 <a:latin typeface="Arial"/>
                 <a:ea typeface="DejaVu Sans"/>
               </a:rPr>
-              <a:t> </a:t>
-            </a:r>
+              <a:t>USES</a:t>
+            </a:r>
+            <a:endParaRPr b="0" lang="en-IN" sz="1800" spc="-1" strike="noStrike">
+              <a:latin typeface="Arial"/>
+            </a:endParaRPr>
+          </a:p>
+        </p:txBody>
+      </p:sp>
+      <p:sp>
+        <p:nvSpPr>
+          <p:cNvPr id="186" name="CustomShape 18"/>
+          <p:cNvSpPr/>
+          <p:nvPr/>
+        </p:nvSpPr>
+        <p:spPr>
+          <a:xfrm>
+            <a:off x="4176000" y="4428000"/>
+            <a:ext cx="1438200" cy="790200"/>
+          </a:xfrm>
+          <a:prstGeom prst="rect">
+            <a:avLst/>
+          </a:prstGeom>
+          <a:solidFill>
+            <a:srgbClr val="729fcf"/>
+          </a:solidFill>
+          <a:ln>
+            <a:solidFill>
+              <a:srgbClr val="3465a4"/>
+            </a:solidFill>
+          </a:ln>
+        </p:spPr>
+        <p:style>
+          <a:lnRef idx="0"/>
+          <a:fillRef idx="0"/>
+          <a:effectRef idx="0"/>
+          <a:fontRef idx="minor"/>
+        </p:style>
+        <p:txBody>
+          <a:bodyPr wrap="none" lIns="90000" rIns="90000" tIns="45000" bIns="45000" anchor="ctr">
+            <a:noAutofit/>
+          </a:bodyPr>
+          <a:p>
+            <a:pPr algn="ctr">
+              <a:lnSpc>
+                <a:spcPct val="100000"/>
+              </a:lnSpc>
+            </a:pPr>
             <a:r>
               <a:rPr b="0" lang="en-IN" sz="1800" spc="-1" strike="noStrike">
                 <a:solidFill>
@@ -6582,8 +9231,165 @@
                 <a:latin typeface="Arial"/>
                 <a:ea typeface="DejaVu Sans"/>
               </a:rPr>
-              <a:t>E</a:t>
-            </a:r>
+              <a:t>BOOKS</a:t>
+            </a:r>
+            <a:endParaRPr b="0" lang="en-IN" sz="1800" spc="-1" strike="noStrike">
+              <a:latin typeface="Arial"/>
+            </a:endParaRPr>
+          </a:p>
+        </p:txBody>
+      </p:sp>
+      <p:cxnSp>
+        <p:nvCxnSpPr>
+          <p:cNvPr id="187" name="Line 19"/>
+          <p:cNvCxnSpPr/>
+          <p:nvPr/>
+        </p:nvCxnSpPr>
+        <p:spPr>
+          <a:xfrm>
+            <a:off x="0" y="0"/>
+            <a:ext cx="360" cy="360"/>
+          </a:xfrm>
+          <a:prstGeom prst="line">
+            <a:avLst/>
+          </a:prstGeom>
+          <a:ln>
+            <a:solidFill>
+              <a:srgbClr val="3465a4"/>
+            </a:solidFill>
+          </a:ln>
+        </p:spPr>
+      </p:cxnSp>
+      <p:cxnSp>
+        <p:nvCxnSpPr>
+          <p:cNvPr id="188" name="Line 20"/>
+          <p:cNvCxnSpPr/>
+          <p:nvPr/>
+        </p:nvCxnSpPr>
+        <p:spPr>
+          <a:xfrm>
+            <a:off x="0" y="0"/>
+            <a:ext cx="360" cy="360"/>
+          </a:xfrm>
+          <a:prstGeom prst="line">
+            <a:avLst/>
+          </a:prstGeom>
+          <a:ln>
+            <a:solidFill>
+              <a:srgbClr val="3465a4"/>
+            </a:solidFill>
+          </a:ln>
+        </p:spPr>
+      </p:cxnSp>
+      <p:sp>
+        <p:nvSpPr>
+          <p:cNvPr id="189" name="Line 21"/>
+          <p:cNvSpPr/>
+          <p:nvPr/>
+        </p:nvSpPr>
+        <p:spPr>
+          <a:xfrm>
+            <a:off x="4860000" y="3960000"/>
+            <a:ext cx="0" cy="468000"/>
+          </a:xfrm>
+          <a:prstGeom prst="line">
+            <a:avLst/>
+          </a:prstGeom>
+          <a:ln>
+            <a:solidFill>
+              <a:srgbClr val="3465a4"/>
+            </a:solidFill>
+          </a:ln>
+        </p:spPr>
+        <p:style>
+          <a:lnRef idx="0"/>
+          <a:fillRef idx="0"/>
+          <a:effectRef idx="0"/>
+          <a:fontRef idx="minor"/>
+        </p:style>
+      </p:sp>
+      <p:sp>
+        <p:nvSpPr>
+          <p:cNvPr id="190" name="CustomShape 22"/>
+          <p:cNvSpPr/>
+          <p:nvPr/>
+        </p:nvSpPr>
+        <p:spPr>
+          <a:xfrm>
+            <a:off x="5870160" y="3782160"/>
+            <a:ext cx="1152000" cy="504000"/>
+          </a:xfrm>
+          <a:prstGeom prst="ellipse">
+            <a:avLst/>
+          </a:prstGeom>
+          <a:solidFill>
+            <a:srgbClr val="729fcf"/>
+          </a:solidFill>
+          <a:ln>
+            <a:solidFill>
+              <a:srgbClr val="3465a4"/>
+            </a:solidFill>
+          </a:ln>
+        </p:spPr>
+        <p:style>
+          <a:lnRef idx="0"/>
+          <a:fillRef idx="0"/>
+          <a:effectRef idx="0"/>
+          <a:fontRef idx="minor"/>
+        </p:style>
+        <p:txBody>
+          <a:bodyPr wrap="none" lIns="90000" rIns="90000" tIns="45000" bIns="45000" anchor="ctr">
+            <a:noAutofit/>
+          </a:bodyPr>
+          <a:p>
+            <a:pPr algn="ctr"/>
+            <a:r>
+              <a:rPr b="0" lang="en-IN" sz="1800" spc="-1" strike="noStrike">
+                <a:latin typeface="Arial"/>
+              </a:rPr>
+              <a:t>REF/TEXT</a:t>
+            </a:r>
+            <a:endParaRPr b="0" lang="en-IN" sz="1800" spc="-1" strike="noStrike">
+              <a:latin typeface="Arial"/>
+            </a:endParaRPr>
+          </a:p>
+        </p:txBody>
+      </p:sp>
+      <p:sp>
+        <p:nvSpPr>
+          <p:cNvPr id="191" name="CustomShape 23"/>
+          <p:cNvSpPr/>
+          <p:nvPr/>
+        </p:nvSpPr>
+        <p:spPr>
+          <a:xfrm>
+            <a:off x="7380000" y="3115440"/>
+            <a:ext cx="2628000" cy="601200"/>
+          </a:xfrm>
+          <a:prstGeom prst="rect">
+            <a:avLst/>
+          </a:prstGeom>
+          <a:noFill/>
+          <a:ln>
+            <a:noFill/>
+          </a:ln>
+        </p:spPr>
+        <p:style>
+          <a:lnRef idx="0"/>
+          <a:fillRef idx="0"/>
+          <a:effectRef idx="0"/>
+          <a:fontRef idx="minor"/>
+        </p:style>
+        <p:txBody>
+          <a:bodyPr lIns="90000" rIns="90000" tIns="45000" bIns="45000">
+            <a:noAutofit/>
+          </a:bodyPr>
+          <a:p>
+            <a:pPr>
+              <a:lnSpc>
+                <a:spcPct val="100000"/>
+              </a:lnSpc>
+            </a:pPr>
             <a:r>
               <a:rPr b="0" lang="en-IN" sz="1800" spc="-1" strike="noStrike">
                 <a:solidFill>
@@ -6592,604 +9398,186 @@
                 <a:latin typeface="Arial"/>
                 <a:ea typeface="DejaVu Sans"/>
               </a:rPr>
-              <a:t>X</a:t>
-            </a:r>
-            <a:r>
-              <a:rPr b="0" lang="en-IN" sz="1800" spc="-1" strike="noStrike">
-                <a:solidFill>
-                  <a:srgbClr val="000000"/>
-                </a:solidFill>
-                <a:latin typeface="Arial"/>
-                <a:ea typeface="DejaVu Sans"/>
-              </a:rPr>
-              <a:t>I</a:t>
-            </a:r>
-            <a:r>
-              <a:rPr b="0" lang="en-IN" sz="1800" spc="-1" strike="noStrike">
-                <a:solidFill>
-                  <a:srgbClr val="000000"/>
-                </a:solidFill>
-                <a:latin typeface="Arial"/>
-                <a:ea typeface="DejaVu Sans"/>
-              </a:rPr>
-              <a:t>S</a:t>
-            </a:r>
-            <a:r>
-              <a:rPr b="0" lang="en-IN" sz="1800" spc="-1" strike="noStrike">
-                <a:solidFill>
-                  <a:srgbClr val="000000"/>
-                </a:solidFill>
-                <a:latin typeface="Arial"/>
-                <a:ea typeface="DejaVu Sans"/>
-              </a:rPr>
-              <a:t>T</a:t>
-            </a:r>
-            <a:r>
-              <a:rPr b="0" lang="en-IN" sz="1800" spc="-1" strike="noStrike">
-                <a:solidFill>
-                  <a:srgbClr val="000000"/>
-                </a:solidFill>
-                <a:latin typeface="Arial"/>
-                <a:ea typeface="DejaVu Sans"/>
-              </a:rPr>
-              <a:t>E</a:t>
-            </a:r>
-            <a:r>
-              <a:rPr b="0" lang="en-IN" sz="1800" spc="-1" strike="noStrike">
-                <a:solidFill>
-                  <a:srgbClr val="000000"/>
-                </a:solidFill>
-                <a:latin typeface="Arial"/>
-                <a:ea typeface="DejaVu Sans"/>
-              </a:rPr>
-              <a:t>N</a:t>
-            </a:r>
-            <a:r>
-              <a:rPr b="0" lang="en-IN" sz="1800" spc="-1" strike="noStrike">
-                <a:solidFill>
-                  <a:srgbClr val="000000"/>
-                </a:solidFill>
-                <a:latin typeface="Arial"/>
-                <a:ea typeface="DejaVu Sans"/>
-              </a:rPr>
-              <a:t>T</a:t>
-            </a:r>
-            <a:r>
-              <a:rPr b="0" lang="en-IN" sz="1800" spc="-1" strike="noStrike">
-                <a:solidFill>
-                  <a:srgbClr val="000000"/>
-                </a:solidFill>
-                <a:latin typeface="Arial"/>
-                <a:ea typeface="DejaVu Sans"/>
-              </a:rPr>
-              <a:t> </a:t>
-            </a:r>
-            <a:r>
-              <a:rPr b="0" lang="en-IN" sz="1800" spc="-1" strike="noStrike">
-                <a:solidFill>
-                  <a:srgbClr val="000000"/>
-                </a:solidFill>
-                <a:latin typeface="Arial"/>
-                <a:ea typeface="DejaVu Sans"/>
-              </a:rPr>
-              <a:t>D</a:t>
-            </a:r>
-            <a:r>
-              <a:rPr b="0" lang="en-IN" sz="1800" spc="-1" strike="noStrike">
-                <a:solidFill>
-                  <a:srgbClr val="000000"/>
-                </a:solidFill>
-                <a:latin typeface="Arial"/>
-                <a:ea typeface="DejaVu Sans"/>
-              </a:rPr>
-              <a:t>E</a:t>
-            </a:r>
-            <a:r>
-              <a:rPr b="0" lang="en-IN" sz="1800" spc="-1" strike="noStrike">
-                <a:solidFill>
-                  <a:srgbClr val="000000"/>
-                </a:solidFill>
-                <a:latin typeface="Arial"/>
-                <a:ea typeface="DejaVu Sans"/>
-              </a:rPr>
-              <a:t>P</a:t>
-            </a:r>
-            <a:r>
-              <a:rPr b="0" lang="en-IN" sz="1800" spc="-1" strike="noStrike">
-                <a:solidFill>
-                  <a:srgbClr val="000000"/>
-                </a:solidFill>
-                <a:latin typeface="Arial"/>
-                <a:ea typeface="DejaVu Sans"/>
-              </a:rPr>
-              <a:t>E</a:t>
-            </a:r>
-            <a:r>
-              <a:rPr b="0" lang="en-IN" sz="1800" spc="-1" strike="noStrike">
-                <a:solidFill>
-                  <a:srgbClr val="000000"/>
-                </a:solidFill>
-                <a:latin typeface="Arial"/>
-                <a:ea typeface="DejaVu Sans"/>
-              </a:rPr>
-              <a:t>N</a:t>
-            </a:r>
-            <a:r>
-              <a:rPr b="0" lang="en-IN" sz="1800" spc="-1" strike="noStrike">
-                <a:solidFill>
-                  <a:srgbClr val="000000"/>
-                </a:solidFill>
-                <a:latin typeface="Arial"/>
-                <a:ea typeface="DejaVu Sans"/>
-              </a:rPr>
-              <a:t>D</a:t>
-            </a:r>
-            <a:r>
-              <a:rPr b="0" lang="en-IN" sz="1800" spc="-1" strike="noStrike">
-                <a:solidFill>
-                  <a:srgbClr val="000000"/>
-                </a:solidFill>
-                <a:latin typeface="Arial"/>
-                <a:ea typeface="DejaVu Sans"/>
-              </a:rPr>
-              <a:t>A</a:t>
-            </a:r>
-            <a:r>
-              <a:rPr b="0" lang="en-IN" sz="1800" spc="-1" strike="noStrike">
-                <a:solidFill>
-                  <a:srgbClr val="000000"/>
-                </a:solidFill>
-                <a:latin typeface="Arial"/>
-                <a:ea typeface="DejaVu Sans"/>
-              </a:rPr>
-              <a:t>N</a:t>
-            </a:r>
-            <a:r>
-              <a:rPr b="0" lang="en-IN" sz="1800" spc="-1" strike="noStrike">
-                <a:solidFill>
-                  <a:srgbClr val="000000"/>
-                </a:solidFill>
-                <a:latin typeface="Arial"/>
-                <a:ea typeface="DejaVu Sans"/>
-              </a:rPr>
-              <a:t>T</a:t>
-            </a:r>
-            <a:r>
-              <a:rPr b="0" lang="en-IN" sz="1800" spc="-1" strike="noStrike">
-                <a:solidFill>
-                  <a:srgbClr val="000000"/>
-                </a:solidFill>
-                <a:latin typeface="Arial"/>
-                <a:ea typeface="DejaVu Sans"/>
-              </a:rPr>
-              <a:t>A</a:t>
-            </a:r>
-            <a:r>
-              <a:rPr b="0" lang="en-IN" sz="1800" spc="-1" strike="noStrike">
-                <a:solidFill>
-                  <a:srgbClr val="000000"/>
-                </a:solidFill>
-                <a:latin typeface="Arial"/>
-                <a:ea typeface="DejaVu Sans"/>
-              </a:rPr>
-              <a:t> </a:t>
-            </a:r>
-            <a:r>
-              <a:rPr b="0" lang="en-IN" sz="1800" spc="-1" strike="noStrike">
-                <a:solidFill>
-                  <a:srgbClr val="000000"/>
-                </a:solidFill>
-                <a:latin typeface="Arial"/>
-                <a:ea typeface="DejaVu Sans"/>
-              </a:rPr>
-              <a:t>o</a:t>
-            </a:r>
-            <a:r>
-              <a:rPr b="0" lang="en-IN" sz="1800" spc="-1" strike="noStrike">
-                <a:solidFill>
-                  <a:srgbClr val="000000"/>
-                </a:solidFill>
-                <a:latin typeface="Arial"/>
-                <a:ea typeface="DejaVu Sans"/>
-              </a:rPr>
-              <a:t>n</a:t>
-            </a:r>
-            <a:r>
-              <a:rPr b="0" lang="en-IN" sz="1800" spc="-1" strike="noStrike">
-                <a:solidFill>
-                  <a:srgbClr val="000000"/>
-                </a:solidFill>
-                <a:latin typeface="Arial"/>
-                <a:ea typeface="DejaVu Sans"/>
-              </a:rPr>
-              <a:t> </a:t>
-            </a:r>
-            <a:r>
-              <a:rPr b="0" lang="en-IN" sz="1800" spc="-1" strike="noStrike">
-                <a:solidFill>
-                  <a:srgbClr val="000000"/>
-                </a:solidFill>
-                <a:latin typeface="Arial"/>
-                <a:ea typeface="DejaVu Sans"/>
-              </a:rPr>
-              <a:t>C</a:t>
-            </a:r>
-            <a:r>
-              <a:rPr b="0" lang="en-IN" sz="1800" spc="-1" strike="noStrike">
-                <a:solidFill>
-                  <a:srgbClr val="000000"/>
-                </a:solidFill>
-                <a:latin typeface="Arial"/>
-                <a:ea typeface="DejaVu Sans"/>
-              </a:rPr>
-              <a:t>U</a:t>
-            </a:r>
-            <a:r>
-              <a:rPr b="0" lang="en-IN" sz="1800" spc="-1" strike="noStrike">
-                <a:solidFill>
-                  <a:srgbClr val="000000"/>
-                </a:solidFill>
-                <a:latin typeface="Arial"/>
-                <a:ea typeface="DejaVu Sans"/>
-              </a:rPr>
-              <a:t>S</a:t>
-            </a:r>
-            <a:r>
-              <a:rPr b="0" lang="en-IN" sz="1800" spc="-1" strike="noStrike">
-                <a:solidFill>
-                  <a:srgbClr val="000000"/>
-                </a:solidFill>
-                <a:latin typeface="Arial"/>
-                <a:ea typeface="DejaVu Sans"/>
-              </a:rPr>
-              <a:t>T</a:t>
-            </a:r>
-            <a:r>
-              <a:rPr b="0" lang="en-IN" sz="1800" spc="-1" strike="noStrike">
-                <a:solidFill>
-                  <a:srgbClr val="000000"/>
-                </a:solidFill>
-                <a:latin typeface="Arial"/>
-                <a:ea typeface="DejaVu Sans"/>
-              </a:rPr>
-              <a:t>O</a:t>
-            </a:r>
-            <a:r>
-              <a:rPr b="0" lang="en-IN" sz="1800" spc="-1" strike="noStrike">
-                <a:solidFill>
-                  <a:srgbClr val="000000"/>
-                </a:solidFill>
-                <a:latin typeface="Arial"/>
-                <a:ea typeface="DejaVu Sans"/>
-              </a:rPr>
-              <a:t>M</a:t>
-            </a:r>
-            <a:r>
-              <a:rPr b="0" lang="en-IN" sz="1800" spc="-1" strike="noStrike">
-                <a:solidFill>
-                  <a:srgbClr val="000000"/>
-                </a:solidFill>
-                <a:latin typeface="Arial"/>
-                <a:ea typeface="DejaVu Sans"/>
-              </a:rPr>
-              <a:t>E</a:t>
-            </a:r>
-            <a:r>
-              <a:rPr b="0" lang="en-IN" sz="1800" spc="-1" strike="noStrike">
-                <a:solidFill>
-                  <a:srgbClr val="000000"/>
-                </a:solidFill>
-                <a:latin typeface="Arial"/>
-                <a:ea typeface="DejaVu Sans"/>
-              </a:rPr>
-              <a:t>R</a:t>
-            </a:r>
-            <a:r>
-              <a:rPr b="0" lang="en-IN" sz="1800" spc="-1" strike="noStrike">
-                <a:solidFill>
-                  <a:srgbClr val="000000"/>
-                </a:solidFill>
-                <a:latin typeface="Arial"/>
-                <a:ea typeface="DejaVu Sans"/>
-              </a:rPr>
-              <a:t>,</a:t>
-            </a:r>
-            <a:r>
-              <a:rPr b="0" lang="en-IN" sz="1800" spc="-1" strike="noStrike">
-                <a:solidFill>
-                  <a:srgbClr val="000000"/>
-                </a:solidFill>
-                <a:latin typeface="Arial"/>
-                <a:ea typeface="DejaVu Sans"/>
-              </a:rPr>
-              <a:t> </a:t>
-            </a:r>
-            <a:r>
-              <a:rPr b="0" lang="en-IN" sz="1800" spc="-1" strike="noStrike">
-                <a:solidFill>
-                  <a:srgbClr val="000000"/>
-                </a:solidFill>
-                <a:latin typeface="Arial"/>
-                <a:ea typeface="DejaVu Sans"/>
-              </a:rPr>
-              <a:t>s</a:t>
-            </a:r>
-            <a:r>
-              <a:rPr b="0" lang="en-IN" sz="1800" spc="-1" strike="noStrike">
-                <a:solidFill>
-                  <a:srgbClr val="000000"/>
-                </a:solidFill>
-                <a:latin typeface="Arial"/>
-                <a:ea typeface="DejaVu Sans"/>
-              </a:rPr>
-              <a:t>o</a:t>
-            </a:r>
-            <a:r>
-              <a:rPr b="0" lang="en-IN" sz="1800" spc="-1" strike="noStrike">
-                <a:solidFill>
-                  <a:srgbClr val="000000"/>
-                </a:solidFill>
-                <a:latin typeface="Arial"/>
-                <a:ea typeface="DejaVu Sans"/>
-              </a:rPr>
-              <a:t> </a:t>
-            </a:r>
-            <a:r>
-              <a:rPr b="0" lang="en-IN" sz="1800" spc="-1" strike="noStrike">
-                <a:solidFill>
-                  <a:srgbClr val="000000"/>
-                </a:solidFill>
-                <a:latin typeface="Arial"/>
-                <a:ea typeface="DejaVu Sans"/>
-              </a:rPr>
-              <a:t>A</a:t>
-            </a:r>
-            <a:r>
-              <a:rPr b="0" lang="en-IN" sz="1800" spc="-1" strike="noStrike">
-                <a:solidFill>
-                  <a:srgbClr val="000000"/>
-                </a:solidFill>
-                <a:latin typeface="Arial"/>
-                <a:ea typeface="DejaVu Sans"/>
-              </a:rPr>
-              <a:t>C</a:t>
-            </a:r>
-            <a:r>
-              <a:rPr b="0" lang="en-IN" sz="1800" spc="-1" strike="noStrike">
-                <a:solidFill>
-                  <a:srgbClr val="000000"/>
-                </a:solidFill>
-                <a:latin typeface="Arial"/>
-                <a:ea typeface="DejaVu Sans"/>
-              </a:rPr>
-              <a:t>C</a:t>
-            </a:r>
-            <a:r>
-              <a:rPr b="0" lang="en-IN" sz="1800" spc="-1" strike="noStrike">
-                <a:solidFill>
-                  <a:srgbClr val="000000"/>
-                </a:solidFill>
-                <a:latin typeface="Arial"/>
-                <a:ea typeface="DejaVu Sans"/>
-              </a:rPr>
-              <a:t>O</a:t>
-            </a:r>
-            <a:r>
-              <a:rPr b="0" lang="en-IN" sz="1800" spc="-1" strike="noStrike">
-                <a:solidFill>
-                  <a:srgbClr val="000000"/>
-                </a:solidFill>
-                <a:latin typeface="Arial"/>
-                <a:ea typeface="DejaVu Sans"/>
-              </a:rPr>
-              <a:t>U</a:t>
-            </a:r>
-            <a:r>
-              <a:rPr b="0" lang="en-IN" sz="1800" spc="-1" strike="noStrike">
-                <a:solidFill>
-                  <a:srgbClr val="000000"/>
-                </a:solidFill>
-                <a:latin typeface="Arial"/>
-                <a:ea typeface="DejaVu Sans"/>
-              </a:rPr>
-              <a:t>N</a:t>
-            </a:r>
-            <a:r>
-              <a:rPr b="0" lang="en-IN" sz="1800" spc="-1" strike="noStrike">
-                <a:solidFill>
-                  <a:srgbClr val="000000"/>
-                </a:solidFill>
-                <a:latin typeface="Arial"/>
-                <a:ea typeface="DejaVu Sans"/>
-              </a:rPr>
-              <a:t>T</a:t>
-            </a:r>
-            <a:r>
-              <a:rPr b="0" lang="en-IN" sz="1800" spc="-1" strike="noStrike">
-                <a:solidFill>
-                  <a:srgbClr val="000000"/>
-                </a:solidFill>
-                <a:latin typeface="Arial"/>
-                <a:ea typeface="DejaVu Sans"/>
-              </a:rPr>
-              <a:t> </a:t>
-            </a:r>
-            <a:r>
-              <a:rPr b="0" lang="en-IN" sz="1800" spc="-1" strike="noStrike">
-                <a:solidFill>
-                  <a:srgbClr val="000000"/>
-                </a:solidFill>
-                <a:latin typeface="Arial"/>
-                <a:ea typeface="DejaVu Sans"/>
-              </a:rPr>
-              <a:t>i</a:t>
-            </a:r>
-            <a:r>
-              <a:rPr b="0" lang="en-IN" sz="1800" spc="-1" strike="noStrike">
-                <a:solidFill>
-                  <a:srgbClr val="000000"/>
-                </a:solidFill>
-                <a:latin typeface="Arial"/>
-                <a:ea typeface="DejaVu Sans"/>
-              </a:rPr>
-              <a:t>s</a:t>
-            </a:r>
-            <a:r>
-              <a:rPr b="0" lang="en-IN" sz="1800" spc="-1" strike="noStrike">
-                <a:solidFill>
-                  <a:srgbClr val="000000"/>
-                </a:solidFill>
-                <a:latin typeface="Arial"/>
-                <a:ea typeface="DejaVu Sans"/>
-              </a:rPr>
-              <a:t> </a:t>
-            </a:r>
-            <a:r>
-              <a:rPr b="0" lang="en-IN" sz="1800" spc="-1" strike="noStrike">
-                <a:solidFill>
-                  <a:srgbClr val="000000"/>
-                </a:solidFill>
-                <a:latin typeface="Arial"/>
-                <a:ea typeface="DejaVu Sans"/>
-              </a:rPr>
-              <a:t>a</a:t>
-            </a:r>
-            <a:r>
-              <a:rPr b="0" lang="en-IN" sz="1800" spc="-1" strike="noStrike">
-                <a:solidFill>
-                  <a:srgbClr val="000000"/>
-                </a:solidFill>
-                <a:latin typeface="Arial"/>
-                <a:ea typeface="DejaVu Sans"/>
-              </a:rPr>
-              <a:t> </a:t>
-            </a:r>
-            <a:r>
-              <a:rPr b="0" lang="en-IN" sz="1800" spc="-1" strike="noStrike">
-                <a:solidFill>
-                  <a:srgbClr val="000000"/>
-                </a:solidFill>
-                <a:latin typeface="Arial"/>
-                <a:ea typeface="DejaVu Sans"/>
-              </a:rPr>
-              <a:t>w</a:t>
-            </a:r>
-            <a:r>
-              <a:rPr b="0" lang="en-IN" sz="1800" spc="-1" strike="noStrike">
-                <a:solidFill>
-                  <a:srgbClr val="000000"/>
-                </a:solidFill>
-                <a:latin typeface="Arial"/>
-                <a:ea typeface="DejaVu Sans"/>
-              </a:rPr>
-              <a:t>e</a:t>
-            </a:r>
-            <a:r>
-              <a:rPr b="0" lang="en-IN" sz="1800" spc="-1" strike="noStrike">
-                <a:solidFill>
-                  <a:srgbClr val="000000"/>
-                </a:solidFill>
-                <a:latin typeface="Arial"/>
-                <a:ea typeface="DejaVu Sans"/>
-              </a:rPr>
-              <a:t>a</a:t>
-            </a:r>
-            <a:r>
-              <a:rPr b="0" lang="en-IN" sz="1800" spc="-1" strike="noStrike">
-                <a:solidFill>
-                  <a:srgbClr val="000000"/>
-                </a:solidFill>
-                <a:latin typeface="Arial"/>
-                <a:ea typeface="DejaVu Sans"/>
-              </a:rPr>
-              <a:t>k</a:t>
-            </a:r>
-            <a:r>
-              <a:rPr b="0" lang="en-IN" sz="1800" spc="-1" strike="noStrike">
-                <a:solidFill>
-                  <a:srgbClr val="000000"/>
-                </a:solidFill>
-                <a:latin typeface="Arial"/>
-                <a:ea typeface="DejaVu Sans"/>
-              </a:rPr>
-              <a:t> </a:t>
-            </a:r>
-            <a:r>
-              <a:rPr b="0" lang="en-IN" sz="1800" spc="-1" strike="noStrike">
-                <a:solidFill>
-                  <a:srgbClr val="000000"/>
-                </a:solidFill>
-                <a:latin typeface="Arial"/>
-                <a:ea typeface="DejaVu Sans"/>
-              </a:rPr>
-              <a:t>e</a:t>
-            </a:r>
-            <a:r>
-              <a:rPr b="0" lang="en-IN" sz="1800" spc="-1" strike="noStrike">
-                <a:solidFill>
-                  <a:srgbClr val="000000"/>
-                </a:solidFill>
-                <a:latin typeface="Arial"/>
-                <a:ea typeface="DejaVu Sans"/>
-              </a:rPr>
-              <a:t>n</a:t>
-            </a:r>
-            <a:r>
-              <a:rPr b="0" lang="en-IN" sz="1800" spc="-1" strike="noStrike">
-                <a:solidFill>
-                  <a:srgbClr val="000000"/>
-                </a:solidFill>
-                <a:latin typeface="Arial"/>
-                <a:ea typeface="DejaVu Sans"/>
-              </a:rPr>
-              <a:t>t</a:t>
-            </a:r>
-            <a:r>
-              <a:rPr b="0" lang="en-IN" sz="1800" spc="-1" strike="noStrike">
-                <a:solidFill>
-                  <a:srgbClr val="000000"/>
-                </a:solidFill>
-                <a:latin typeface="Arial"/>
-                <a:ea typeface="DejaVu Sans"/>
-              </a:rPr>
-              <a:t>i</a:t>
-            </a:r>
-            <a:r>
-              <a:rPr b="0" lang="en-IN" sz="1800" spc="-1" strike="noStrike">
-                <a:solidFill>
-                  <a:srgbClr val="000000"/>
-                </a:solidFill>
-                <a:latin typeface="Arial"/>
-                <a:ea typeface="DejaVu Sans"/>
-              </a:rPr>
-              <a:t>t</a:t>
-            </a:r>
-            <a:r>
-              <a:rPr b="0" lang="en-IN" sz="1800" spc="-1" strike="noStrike">
-                <a:solidFill>
-                  <a:srgbClr val="000000"/>
-                </a:solidFill>
-                <a:latin typeface="Arial"/>
-                <a:ea typeface="DejaVu Sans"/>
-              </a:rPr>
-              <a:t>y</a:t>
-            </a:r>
-            <a:endParaRPr b="0" lang="en-IN" sz="1800" spc="-1" strike="noStrike">
-              <a:latin typeface="Arial"/>
-            </a:endParaRPr>
-          </a:p>
-        </p:txBody>
-      </p:sp>
-      <p:sp>
-        <p:nvSpPr>
-          <p:cNvPr id="139" name="Line 9"/>
-          <p:cNvSpPr/>
-          <p:nvPr/>
-        </p:nvSpPr>
-        <p:spPr>
-          <a:xfrm>
-            <a:off x="5470560" y="2628000"/>
-            <a:ext cx="613440" cy="0"/>
+              <a:t>We consider the relationship TEACHES along with entities TEACHER and SUBJECT as an AGGRGATE entity and define the realtion USES.</a:t>
+            </a:r>
+            <a:endParaRPr b="0" lang="en-IN" sz="1800" spc="-1" strike="noStrike">
+              <a:latin typeface="Arial"/>
+            </a:endParaRPr>
+          </a:p>
+        </p:txBody>
+      </p:sp>
+      <p:sp>
+        <p:nvSpPr>
+          <p:cNvPr id="192" name="Line 24"/>
+          <p:cNvSpPr/>
+          <p:nvPr/>
+        </p:nvSpPr>
+        <p:spPr>
+          <a:xfrm>
+            <a:off x="5112000" y="3744000"/>
+            <a:ext cx="758160" cy="216000"/>
+          </a:xfrm>
+          <a:prstGeom prst="line">
+            <a:avLst/>
+          </a:prstGeom>
+          <a:ln>
+            <a:solidFill>
+              <a:srgbClr val="3465a4"/>
+            </a:solidFill>
+          </a:ln>
+        </p:spPr>
+        <p:style>
+          <a:lnRef idx="0"/>
+          <a:fillRef idx="0"/>
+          <a:effectRef idx="0"/>
+          <a:fontRef idx="minor"/>
+        </p:style>
+      </p:sp>
+      <p:sp>
+        <p:nvSpPr>
+          <p:cNvPr id="193" name="Line 25"/>
+          <p:cNvSpPr/>
+          <p:nvPr/>
+        </p:nvSpPr>
+        <p:spPr>
+          <a:xfrm>
+            <a:off x="7630200" y="1693440"/>
+            <a:ext cx="793800" cy="0"/>
+          </a:xfrm>
+          <a:prstGeom prst="line">
+            <a:avLst/>
+          </a:prstGeom>
+          <a:ln>
+            <a:solidFill>
+              <a:srgbClr val="3465a4"/>
+            </a:solidFill>
+          </a:ln>
+        </p:spPr>
+        <p:style>
+          <a:lnRef idx="0"/>
+          <a:fillRef idx="0"/>
+          <a:effectRef idx="0"/>
+          <a:fontRef idx="minor"/>
+        </p:style>
+      </p:sp>
+      <p:sp>
+        <p:nvSpPr>
+          <p:cNvPr id="194" name="Line 26"/>
+          <p:cNvSpPr/>
+          <p:nvPr/>
+        </p:nvSpPr>
+        <p:spPr>
+          <a:xfrm>
+            <a:off x="7630560" y="1477440"/>
+            <a:ext cx="793800" cy="0"/>
+          </a:xfrm>
+          <a:prstGeom prst="line">
+            <a:avLst/>
+          </a:prstGeom>
+          <a:ln>
+            <a:solidFill>
+              <a:srgbClr val="3465a4"/>
+            </a:solidFill>
+          </a:ln>
+        </p:spPr>
+        <p:style>
+          <a:lnRef idx="0"/>
+          <a:fillRef idx="0"/>
+          <a:effectRef idx="0"/>
+          <a:fontRef idx="minor"/>
+        </p:style>
+      </p:sp>
+      <p:sp>
+        <p:nvSpPr>
+          <p:cNvPr id="195" name="Line 27"/>
+          <p:cNvSpPr/>
+          <p:nvPr/>
+        </p:nvSpPr>
+        <p:spPr>
+          <a:xfrm flipV="1">
+            <a:off x="7234920" y="720720"/>
+            <a:ext cx="613080" cy="467280"/>
+          </a:xfrm>
+          <a:prstGeom prst="line">
+            <a:avLst/>
+          </a:prstGeom>
+          <a:ln>
+            <a:solidFill>
+              <a:srgbClr val="3465a4"/>
+            </a:solidFill>
+          </a:ln>
+        </p:spPr>
+        <p:style>
+          <a:lnRef idx="0"/>
+          <a:fillRef idx="0"/>
+          <a:effectRef idx="0"/>
+          <a:fontRef idx="minor"/>
+        </p:style>
+      </p:sp>
+      <p:sp>
+        <p:nvSpPr>
+          <p:cNvPr id="196" name="Line 28"/>
+          <p:cNvSpPr/>
+          <p:nvPr/>
+        </p:nvSpPr>
+        <p:spPr>
+          <a:xfrm flipH="1" flipV="1">
+            <a:off x="6480000" y="684360"/>
+            <a:ext cx="144000" cy="503640"/>
+          </a:xfrm>
+          <a:prstGeom prst="line">
+            <a:avLst/>
+          </a:prstGeom>
+          <a:ln>
+            <a:solidFill>
+              <a:srgbClr val="3465a4"/>
+            </a:solidFill>
+          </a:ln>
+        </p:spPr>
+        <p:style>
+          <a:lnRef idx="0"/>
+          <a:fillRef idx="0"/>
+          <a:effectRef idx="0"/>
+          <a:fontRef idx="minor"/>
+        </p:style>
+      </p:sp>
+      <p:sp>
+        <p:nvSpPr>
+          <p:cNvPr id="197" name="Line 29"/>
+          <p:cNvSpPr/>
+          <p:nvPr/>
+        </p:nvSpPr>
+        <p:spPr>
+          <a:xfrm flipH="1" flipV="1">
+            <a:off x="2664000" y="937440"/>
+            <a:ext cx="72000" cy="250560"/>
+          </a:xfrm>
+          <a:prstGeom prst="line">
+            <a:avLst/>
+          </a:prstGeom>
+          <a:ln>
+            <a:solidFill>
+              <a:srgbClr val="3465a4"/>
+            </a:solidFill>
+          </a:ln>
+        </p:spPr>
+        <p:style>
+          <a:lnRef idx="0"/>
+          <a:fillRef idx="0"/>
+          <a:effectRef idx="0"/>
+          <a:fontRef idx="minor"/>
+        </p:style>
+      </p:sp>
+      <p:sp>
+        <p:nvSpPr>
+          <p:cNvPr id="198" name="Line 30"/>
+          <p:cNvSpPr/>
+          <p:nvPr/>
+        </p:nvSpPr>
+        <p:spPr>
+          <a:xfrm flipH="1" flipV="1">
+            <a:off x="1440000" y="1045800"/>
+            <a:ext cx="576000" cy="142200"/>
           </a:xfrm>
           <a:prstGeom prst="line">
             <a:avLst/>

</xml_diff>

<commit_message>
Formal Specification part 1
</commit_message>
<xml_diff>
--- a/GATE/images/gate_images.pptx
+++ b/GATE/images/gate_images.pptx
@@ -19,6 +19,7 @@
     <p:sldId id="267" r:id="rId14"/>
     <p:sldId id="268" r:id="rId15"/>
     <p:sldId id="269" r:id="rId16"/>
+    <p:sldId id="270" r:id="rId17"/>
   </p:sldIdLst>
   <p:sldSz cx="10080625" cy="5670550"/>
   <p:notesSz cx="7559675" cy="10691812"/>
@@ -1427,49 +1428,13 @@
               <a:rPr b="0" lang="en-IN" sz="4400" spc="-1" strike="noStrike">
                 <a:latin typeface="Arial"/>
               </a:rPr>
-              <a:t>Clic</a:t>
+              <a:t>Click to edit the title </a:t>
             </a:r>
             <a:r>
               <a:rPr b="0" lang="en-IN" sz="4400" spc="-1" strike="noStrike">
                 <a:latin typeface="Arial"/>
               </a:rPr>
-              <a:t>k to </a:t>
-            </a:r>
-            <a:r>
-              <a:rPr b="0" lang="en-IN" sz="4400" spc="-1" strike="noStrike">
-                <a:latin typeface="Arial"/>
-              </a:rPr>
-              <a:t>edit </a:t>
-            </a:r>
-            <a:r>
-              <a:rPr b="0" lang="en-IN" sz="4400" spc="-1" strike="noStrike">
-                <a:latin typeface="Arial"/>
-              </a:rPr>
-              <a:t>the </a:t>
-            </a:r>
-            <a:r>
-              <a:rPr b="0" lang="en-IN" sz="4400" spc="-1" strike="noStrike">
-                <a:latin typeface="Arial"/>
-              </a:rPr>
-              <a:t>title </a:t>
-            </a:r>
-            <a:r>
-              <a:rPr b="0" lang="en-IN" sz="4400" spc="-1" strike="noStrike">
-                <a:latin typeface="Arial"/>
-              </a:rPr>
-              <a:t>text </a:t>
-            </a:r>
-            <a:r>
-              <a:rPr b="0" lang="en-IN" sz="4400" spc="-1" strike="noStrike">
-                <a:latin typeface="Arial"/>
-              </a:rPr>
-              <a:t>form</a:t>
-            </a:r>
-            <a:r>
-              <a:rPr b="0" lang="en-IN" sz="4400" spc="-1" strike="noStrike">
-                <a:latin typeface="Arial"/>
-              </a:rPr>
-              <a:t>at</a:t>
+              <a:t>text format</a:t>
             </a:r>
             <a:endParaRPr b="0" lang="en-IN" sz="4400" spc="-1" strike="noStrike">
               <a:latin typeface="Arial"/>
@@ -1702,7 +1667,7 @@
         <p:spPr>
           <a:xfrm>
             <a:off x="1836000" y="1332000"/>
-            <a:ext cx="2373480" cy="789480"/>
+            <a:ext cx="2373120" cy="789120"/>
           </a:xfrm>
           <a:prstGeom prst="rect">
             <a:avLst/>
@@ -1757,7 +1722,7 @@
         <p:spPr>
           <a:xfrm>
             <a:off x="1836000" y="2880000"/>
-            <a:ext cx="2373480" cy="789480"/>
+            <a:ext cx="2373120" cy="789120"/>
           </a:xfrm>
           <a:prstGeom prst="rect">
             <a:avLst/>
@@ -1822,7 +1787,7 @@
         <p:spPr>
           <a:xfrm>
             <a:off x="1836000" y="4176000"/>
-            <a:ext cx="2373480" cy="789480"/>
+            <a:ext cx="2373120" cy="789120"/>
           </a:xfrm>
           <a:prstGeom prst="rect">
             <a:avLst/>
@@ -1897,7 +1862,7 @@
         <p:spPr>
           <a:xfrm>
             <a:off x="5292000" y="900000"/>
-            <a:ext cx="2373480" cy="1509480"/>
+            <a:ext cx="2373120" cy="1509120"/>
           </a:xfrm>
           <a:prstGeom prst="rect">
             <a:avLst/>
@@ -2032,7 +1997,7 @@
         <p:spPr>
           <a:xfrm>
             <a:off x="5292000" y="2571480"/>
-            <a:ext cx="2373480" cy="1278000"/>
+            <a:ext cx="2373120" cy="1277640"/>
           </a:xfrm>
           <a:prstGeom prst="rect">
             <a:avLst/>
@@ -2147,7 +2112,7 @@
         <p:spPr>
           <a:xfrm>
             <a:off x="5292000" y="4047480"/>
-            <a:ext cx="2373480" cy="1026000"/>
+            <a:ext cx="2373120" cy="1025640"/>
           </a:xfrm>
           <a:prstGeom prst="rect">
             <a:avLst/>
@@ -2326,7 +2291,7 @@
         <p:spPr>
           <a:xfrm>
             <a:off x="2988000" y="360000"/>
-            <a:ext cx="4389480" cy="343800"/>
+            <a:ext cx="4389120" cy="343440"/>
           </a:xfrm>
           <a:prstGeom prst="rect">
             <a:avLst/>
@@ -2407,7 +2372,7 @@
         <p:spPr>
           <a:xfrm>
             <a:off x="1440000" y="720000"/>
-            <a:ext cx="6767640" cy="1799640"/>
+            <a:ext cx="6767280" cy="1799280"/>
           </a:xfrm>
           <a:prstGeom prst="rect">
             <a:avLst/>
@@ -2437,7 +2402,7 @@
         <p:spPr>
           <a:xfrm>
             <a:off x="2016000" y="1188000"/>
-            <a:ext cx="1437840" cy="789840"/>
+            <a:ext cx="1437480" cy="789480"/>
           </a:xfrm>
           <a:prstGeom prst="rect">
             <a:avLst/>
@@ -2492,7 +2457,7 @@
         <p:spPr>
           <a:xfrm>
             <a:off x="6192000" y="1188000"/>
-            <a:ext cx="1437840" cy="789840"/>
+            <a:ext cx="1437480" cy="789480"/>
           </a:xfrm>
           <a:prstGeom prst="rect">
             <a:avLst/>
@@ -2547,7 +2512,7 @@
         <p:spPr>
           <a:xfrm>
             <a:off x="4140000" y="900000"/>
-            <a:ext cx="1437840" cy="1365840"/>
+            <a:ext cx="1437480" cy="1365480"/>
           </a:xfrm>
           <a:custGeom>
             <a:avLst/>
@@ -2733,7 +2698,7 @@
         <p:spPr>
           <a:xfrm>
             <a:off x="4320000" y="3168000"/>
-            <a:ext cx="1041840" cy="791640"/>
+            <a:ext cx="1041480" cy="791280"/>
           </a:xfrm>
           <a:custGeom>
             <a:avLst/>
@@ -2811,7 +2776,7 @@
         <p:spPr>
           <a:xfrm>
             <a:off x="4176000" y="4428000"/>
-            <a:ext cx="1437840" cy="789840"/>
+            <a:ext cx="1437480" cy="789480"/>
           </a:xfrm>
           <a:prstGeom prst="rect">
             <a:avLst/>
@@ -2893,7 +2858,7 @@
         <p:spPr>
           <a:xfrm>
             <a:off x="5870160" y="3314160"/>
-            <a:ext cx="1151640" cy="503640"/>
+            <a:ext cx="1151280" cy="503280"/>
           </a:xfrm>
           <a:prstGeom prst="ellipse">
             <a:avLst/>
@@ -3032,7 +2997,7 @@
         <p:spPr>
           <a:xfrm>
             <a:off x="1944000" y="900000"/>
-            <a:ext cx="1437840" cy="789840"/>
+            <a:ext cx="1437480" cy="789480"/>
           </a:xfrm>
           <a:prstGeom prst="rect">
             <a:avLst/>
@@ -3087,7 +3052,7 @@
         <p:spPr>
           <a:xfrm>
             <a:off x="6120000" y="900000"/>
-            <a:ext cx="1437840" cy="789840"/>
+            <a:ext cx="1437480" cy="789480"/>
           </a:xfrm>
           <a:prstGeom prst="rect">
             <a:avLst/>
@@ -3142,7 +3107,7 @@
         <p:spPr>
           <a:xfrm>
             <a:off x="4068000" y="612000"/>
-            <a:ext cx="1437840" cy="1365840"/>
+            <a:ext cx="1437480" cy="1365480"/>
           </a:xfrm>
           <a:custGeom>
             <a:avLst/>
@@ -3321,7 +3286,7 @@
         <p:spPr>
           <a:xfrm>
             <a:off x="2592000" y="5904000"/>
-            <a:ext cx="7126560" cy="600840"/>
+            <a:ext cx="7126200" cy="600480"/>
           </a:xfrm>
           <a:prstGeom prst="rect">
             <a:avLst/>
@@ -3392,7 +3357,7 @@
         <p:spPr>
           <a:xfrm>
             <a:off x="360000" y="216360"/>
-            <a:ext cx="1151640" cy="503640"/>
+            <a:ext cx="1151280" cy="503280"/>
           </a:xfrm>
           <a:prstGeom prst="ellipse">
             <a:avLst/>
@@ -3447,7 +3412,7 @@
         <p:spPr>
           <a:xfrm>
             <a:off x="1727640" y="216360"/>
-            <a:ext cx="1151640" cy="503640"/>
+            <a:ext cx="1151280" cy="503280"/>
           </a:xfrm>
           <a:prstGeom prst="ellipse">
             <a:avLst/>
@@ -3502,7 +3467,7 @@
         <p:spPr>
           <a:xfrm>
             <a:off x="359280" y="1008360"/>
-            <a:ext cx="1151640" cy="503640"/>
+            <a:ext cx="1151280" cy="503280"/>
           </a:xfrm>
           <a:prstGeom prst="ellipse">
             <a:avLst/>
@@ -3557,7 +3522,7 @@
         <p:spPr>
           <a:xfrm>
             <a:off x="358920" y="1800360"/>
-            <a:ext cx="1151640" cy="503640"/>
+            <a:ext cx="1151280" cy="503280"/>
           </a:xfrm>
           <a:prstGeom prst="ellipse">
             <a:avLst/>
@@ -3612,7 +3577,7 @@
         <p:spPr>
           <a:xfrm>
             <a:off x="1906560" y="1836360"/>
-            <a:ext cx="1151640" cy="503640"/>
+            <a:ext cx="1151280" cy="503280"/>
           </a:xfrm>
           <a:prstGeom prst="ellipse">
             <a:avLst/>
@@ -3667,7 +3632,7 @@
         <p:spPr>
           <a:xfrm>
             <a:off x="4211280" y="360"/>
-            <a:ext cx="1151640" cy="503640"/>
+            <a:ext cx="1151280" cy="503280"/>
           </a:xfrm>
           <a:prstGeom prst="ellipse">
             <a:avLst/>
@@ -3722,7 +3687,7 @@
         <p:spPr>
           <a:xfrm>
             <a:off x="6226920" y="360"/>
-            <a:ext cx="1151640" cy="503640"/>
+            <a:ext cx="1151280" cy="503280"/>
           </a:xfrm>
           <a:prstGeom prst="ellipse">
             <a:avLst/>
@@ -3777,7 +3742,7 @@
         <p:spPr>
           <a:xfrm>
             <a:off x="4210920" y="360"/>
-            <a:ext cx="1151640" cy="503640"/>
+            <a:ext cx="1151280" cy="503280"/>
           </a:xfrm>
           <a:prstGeom prst="ellipse">
             <a:avLst/>
@@ -3832,7 +3797,7 @@
         <p:spPr>
           <a:xfrm>
             <a:off x="7738920" y="252360"/>
-            <a:ext cx="1151640" cy="503640"/>
+            <a:ext cx="1151280" cy="503280"/>
           </a:xfrm>
           <a:prstGeom prst="ellipse">
             <a:avLst/>
@@ -3887,7 +3852,7 @@
         <p:spPr>
           <a:xfrm>
             <a:off x="7810920" y="936360"/>
-            <a:ext cx="1151640" cy="503640"/>
+            <a:ext cx="1151280" cy="503280"/>
           </a:xfrm>
           <a:prstGeom prst="ellipse">
             <a:avLst/>
@@ -4211,7 +4176,7 @@
         </p:nvGraphicFramePr>
         <p:xfrm>
           <a:off x="56880" y="2866680"/>
-          <a:ext cx="5075280" cy="2159280"/>
+          <a:ext cx="5075280" cy="1206000"/>
         </p:xfrm>
         <a:graphic>
           <a:graphicData uri="http://schemas.openxmlformats.org/drawingml/2006/table">
@@ -4227,10 +4192,15 @@
               <a:tr h="432360">
                 <a:tc>
                   <a:txBody>
-                    <a:bodyPr lIns="90000" rIns="90000" tIns="46800" bIns="46800">
+                    <a:bodyPr lIns="90000" rIns="90000">
                       <a:noAutofit/>
                     </a:bodyPr>
                     <a:p>
+                      <a:pPr>
+                        <a:lnSpc>
+                          <a:spcPct val="100000"/>
+                        </a:lnSpc>
+                      </a:pPr>
                       <a:r>
                         <a:rPr b="0" lang="en-IN" sz="1800" spc="-1" strike="noStrike">
                           <a:latin typeface="Arial"/>
@@ -4270,10 +4240,15 @@
                 </a:tc>
                 <a:tc>
                   <a:txBody>
-                    <a:bodyPr lIns="90000" rIns="90000" tIns="46800" bIns="46800">
+                    <a:bodyPr lIns="90000" rIns="90000">
                       <a:noAutofit/>
                     </a:bodyPr>
                     <a:p>
+                      <a:pPr>
+                        <a:lnSpc>
+                          <a:spcPct val="100000"/>
+                        </a:lnSpc>
+                      </a:pPr>
                       <a:r>
                         <a:rPr b="0" lang="en-IN" sz="1800" spc="-1" strike="noStrike">
                           <a:latin typeface="Arial"/>
@@ -4313,10 +4288,15 @@
                 </a:tc>
                 <a:tc>
                   <a:txBody>
-                    <a:bodyPr lIns="90000" rIns="90000" tIns="46800" bIns="46800">
+                    <a:bodyPr lIns="90000" rIns="90000">
                       <a:noAutofit/>
                     </a:bodyPr>
                     <a:p>
+                      <a:pPr>
+                        <a:lnSpc>
+                          <a:spcPct val="100000"/>
+                        </a:lnSpc>
+                      </a:pPr>
                       <a:r>
                         <a:rPr b="0" lang="en-IN" sz="1800" spc="-1" strike="noStrike">
                           <a:latin typeface="Arial"/>
@@ -4356,10 +4336,15 @@
                 </a:tc>
                 <a:tc>
                   <a:txBody>
-                    <a:bodyPr lIns="90000" rIns="90000" tIns="46800" bIns="46800">
+                    <a:bodyPr lIns="90000" rIns="90000">
                       <a:noAutofit/>
                     </a:bodyPr>
                     <a:p>
+                      <a:pPr>
+                        <a:lnSpc>
+                          <a:spcPct val="100000"/>
+                        </a:lnSpc>
+                      </a:pPr>
                       <a:r>
                         <a:rPr b="0" lang="en-IN" sz="1800" spc="-1" strike="noStrike">
                           <a:latin typeface="Arial"/>
@@ -4399,10 +4384,15 @@
                 </a:tc>
                 <a:tc>
                   <a:txBody>
-                    <a:bodyPr lIns="90000" rIns="90000" tIns="46800" bIns="46800">
+                    <a:bodyPr lIns="90000" rIns="90000">
                       <a:noAutofit/>
                     </a:bodyPr>
                     <a:p>
+                      <a:pPr>
+                        <a:lnSpc>
+                          <a:spcPct val="100000"/>
+                        </a:lnSpc>
+                      </a:pPr>
                       <a:r>
                         <a:rPr b="0" lang="en-IN" sz="1800" spc="-1" strike="noStrike">
                           <a:latin typeface="Arial"/>
@@ -4727,7 +4717,7 @@
         </p:nvGraphicFramePr>
         <p:xfrm>
           <a:off x="6489000" y="2479320"/>
-          <a:ext cx="5075280" cy="2159280"/>
+          <a:ext cx="3271680" cy="1079640"/>
         </p:xfrm>
         <a:graphic>
           <a:graphicData uri="http://schemas.openxmlformats.org/drawingml/2006/table">
@@ -4738,13 +4728,18 @@
                 <a:gridCol w="982440"/>
                 <a:gridCol w="1056600"/>
               </a:tblGrid>
-              <a:tr h="365760">
+              <a:tr h="363240">
                 <a:tc>
                   <a:txBody>
-                    <a:bodyPr lIns="90000" rIns="90000" tIns="46800" bIns="46800">
+                    <a:bodyPr lIns="90000" rIns="90000">
                       <a:noAutofit/>
                     </a:bodyPr>
                     <a:p>
+                      <a:pPr>
+                        <a:lnSpc>
+                          <a:spcPct val="100000"/>
+                        </a:lnSpc>
+                      </a:pPr>
                       <a:r>
                         <a:rPr b="0" lang="en-IN" sz="1800" spc="-1" strike="noStrike">
                           <a:latin typeface="Arial"/>
@@ -4784,10 +4779,15 @@
                 </a:tc>
                 <a:tc>
                   <a:txBody>
-                    <a:bodyPr lIns="90000" rIns="90000" tIns="46800" bIns="46800">
+                    <a:bodyPr lIns="90000" rIns="90000">
                       <a:noAutofit/>
                     </a:bodyPr>
                     <a:p>
+                      <a:pPr>
+                        <a:lnSpc>
+                          <a:spcPct val="100000"/>
+                        </a:lnSpc>
+                      </a:pPr>
                       <a:r>
                         <a:rPr b="0" lang="en-IN" sz="1800" spc="-1" strike="noStrike">
                           <a:latin typeface="Arial"/>
@@ -4827,10 +4827,15 @@
                 </a:tc>
                 <a:tc>
                   <a:txBody>
-                    <a:bodyPr lIns="90000" rIns="90000" tIns="46800" bIns="46800">
+                    <a:bodyPr lIns="90000" rIns="90000">
                       <a:noAutofit/>
                     </a:bodyPr>
                     <a:p>
+                      <a:pPr>
+                        <a:lnSpc>
+                          <a:spcPct val="100000"/>
+                        </a:lnSpc>
+                      </a:pPr>
                       <a:r>
                         <a:rPr b="0" lang="en-IN" sz="1800" spc="-1" strike="noStrike">
                           <a:latin typeface="Arial"/>
@@ -4869,7 +4874,7 @@
                   </a:tcPr>
                 </a:tc>
               </a:tr>
-              <a:tr h="371880">
+              <a:tr h="369000">
                 <a:tc>
                   <a:tcPr marL="90000" marR="90000">
                     <a:lnL w="720">
@@ -4952,7 +4957,7 @@
                   </a:tcPr>
                 </a:tc>
               </a:tr>
-              <a:tr h="342360">
+              <a:tr h="347760">
                 <a:tc>
                   <a:tcPr marL="90000" marR="90000">
                     <a:lnL w="720">
@@ -5047,7 +5052,7 @@
         </p:nvGraphicFramePr>
         <p:xfrm>
           <a:off x="5065920" y="4241880"/>
-          <a:ext cx="5075280" cy="2159280"/>
+          <a:ext cx="3125520" cy="1086840"/>
         </p:xfrm>
         <a:graphic>
           <a:graphicData uri="http://schemas.openxmlformats.org/drawingml/2006/table">
@@ -5058,13 +5063,18 @@
                 <a:gridCol w="1145880"/>
                 <a:gridCol w="1250280"/>
               </a:tblGrid>
-              <a:tr h="410400">
+              <a:tr h="391320">
                 <a:tc>
                   <a:txBody>
-                    <a:bodyPr lIns="90000" rIns="90000" tIns="46800" bIns="46800">
+                    <a:bodyPr lIns="90000" rIns="90000">
                       <a:noAutofit/>
                     </a:bodyPr>
                     <a:p>
+                      <a:pPr>
+                        <a:lnSpc>
+                          <a:spcPct val="100000"/>
+                        </a:lnSpc>
+                      </a:pPr>
                       <a:r>
                         <a:rPr b="0" lang="en-IN" sz="1800" spc="-1" strike="noStrike">
                           <a:latin typeface="Arial"/>
@@ -5104,10 +5114,15 @@
                 </a:tc>
                 <a:tc>
                   <a:txBody>
-                    <a:bodyPr lIns="90000" rIns="90000" tIns="46800" bIns="46800">
+                    <a:bodyPr lIns="90000" rIns="90000">
                       <a:noAutofit/>
                     </a:bodyPr>
                     <a:p>
+                      <a:pPr>
+                        <a:lnSpc>
+                          <a:spcPct val="100000"/>
+                        </a:lnSpc>
+                      </a:pPr>
                       <a:r>
                         <a:rPr b="0" lang="en-IN" sz="1800" spc="-1" strike="noStrike">
                           <a:latin typeface="Arial"/>
@@ -5147,10 +5162,15 @@
                 </a:tc>
                 <a:tc>
                   <a:txBody>
-                    <a:bodyPr lIns="90000" rIns="90000" tIns="46800" bIns="46800">
+                    <a:bodyPr lIns="90000" rIns="90000">
                       <a:noAutofit/>
                     </a:bodyPr>
                     <a:p>
+                      <a:pPr>
+                        <a:lnSpc>
+                          <a:spcPct val="100000"/>
+                        </a:lnSpc>
+                      </a:pPr>
                       <a:r>
                         <a:rPr b="0" lang="en-IN" sz="1800" spc="-1" strike="noStrike">
                           <a:latin typeface="Arial"/>
@@ -5189,7 +5209,7 @@
                   </a:tcPr>
                 </a:tc>
               </a:tr>
-              <a:tr h="342360">
+              <a:tr h="347760">
                 <a:tc>
                   <a:tcPr marL="90000" marR="90000">
                     <a:lnL w="720">
@@ -5272,7 +5292,7 @@
                   </a:tcPr>
                 </a:tc>
               </a:tr>
-              <a:tr h="334440">
+              <a:tr h="347760">
                 <a:tc>
                   <a:tcPr marL="90000" marR="90000">
                     <a:lnL w="720">
@@ -5361,14 +5381,14 @@
       </p:graphicFrame>
       <p:sp>
         <p:nvSpPr>
-          <p:cNvPr id="243" name="TextShape 31"/>
-          <p:cNvSpPr txBox="1"/>
+          <p:cNvPr id="243" name="CustomShape 31"/>
+          <p:cNvSpPr/>
           <p:nvPr/>
         </p:nvSpPr>
         <p:spPr>
           <a:xfrm>
             <a:off x="576000" y="4320000"/>
-            <a:ext cx="2448000" cy="346320"/>
+            <a:ext cx="2447640" cy="345960"/>
           </a:xfrm>
           <a:prstGeom prst="rect">
             <a:avLst/>
@@ -5378,22 +5398,27 @@
             <a:noFill/>
           </a:ln>
         </p:spPr>
+        <p:style>
+          <a:lnRef idx="0"/>
+          <a:fillRef idx="0"/>
+          <a:effectRef idx="0"/>
+          <a:fontRef idx="minor"/>
+        </p:style>
         <p:txBody>
           <a:bodyPr lIns="90000" rIns="90000" tIns="45000" bIns="45000">
             <a:noAutofit/>
           </a:bodyPr>
           <a:p>
+            <a:pPr>
+              <a:lnSpc>
+                <a:spcPct val="100000"/>
+              </a:lnSpc>
+            </a:pPr>
             <a:r>
               <a:rPr b="0" lang="en-IN" sz="1800" spc="-1" strike="noStrike">
                 <a:latin typeface="Arial"/>
               </a:rPr>
-              <a:t>BOOKS </a:t>
-            </a:r>
-            <a:r>
-              <a:rPr b="0" lang="en-IN" sz="1800" spc="-1" strike="noStrike">
-                <a:latin typeface="Arial"/>
-              </a:rPr>
-              <a:t>TABLE</a:t>
+              <a:t>BOOKS TABLE</a:t>
             </a:r>
             <a:endParaRPr b="0" lang="en-IN" sz="1800" spc="-1" strike="noStrike">
               <a:latin typeface="Arial"/>
@@ -5403,14 +5428,14 @@
       </p:sp>
       <p:sp>
         <p:nvSpPr>
-          <p:cNvPr id="244" name="TextShape 32"/>
-          <p:cNvSpPr txBox="1"/>
+          <p:cNvPr id="244" name="CustomShape 32"/>
+          <p:cNvSpPr/>
           <p:nvPr/>
         </p:nvSpPr>
         <p:spPr>
           <a:xfrm>
             <a:off x="7092000" y="3672000"/>
-            <a:ext cx="2448000" cy="346320"/>
+            <a:ext cx="2447640" cy="345960"/>
           </a:xfrm>
           <a:prstGeom prst="rect">
             <a:avLst/>
@@ -5420,22 +5445,27 @@
             <a:noFill/>
           </a:ln>
         </p:spPr>
+        <p:style>
+          <a:lnRef idx="0"/>
+          <a:fillRef idx="0"/>
+          <a:effectRef idx="0"/>
+          <a:fontRef idx="minor"/>
+        </p:style>
         <p:txBody>
           <a:bodyPr lIns="90000" rIns="90000" tIns="45000" bIns="45000">
             <a:noAutofit/>
           </a:bodyPr>
           <a:p>
+            <a:pPr>
+              <a:lnSpc>
+                <a:spcPct val="100000"/>
+              </a:lnSpc>
+            </a:pPr>
             <a:r>
               <a:rPr b="0" lang="en-IN" sz="1800" spc="-1" strike="noStrike">
                 <a:latin typeface="Arial"/>
               </a:rPr>
-              <a:t>USERS </a:t>
-            </a:r>
-            <a:r>
-              <a:rPr b="0" lang="en-IN" sz="1800" spc="-1" strike="noStrike">
-                <a:latin typeface="Arial"/>
-              </a:rPr>
-              <a:t>TABLE</a:t>
+              <a:t>USERS TABLE</a:t>
             </a:r>
             <a:endParaRPr b="0" lang="en-IN" sz="1800" spc="-1" strike="noStrike">
               <a:latin typeface="Arial"/>
@@ -5445,14 +5475,14 @@
       </p:sp>
       <p:sp>
         <p:nvSpPr>
-          <p:cNvPr id="245" name="TextShape 33"/>
-          <p:cNvSpPr txBox="1"/>
+          <p:cNvPr id="245" name="CustomShape 33"/>
+          <p:cNvSpPr/>
           <p:nvPr/>
         </p:nvSpPr>
         <p:spPr>
           <a:xfrm>
             <a:off x="3744000" y="5328000"/>
-            <a:ext cx="2448000" cy="346320"/>
+            <a:ext cx="2447640" cy="345960"/>
           </a:xfrm>
           <a:prstGeom prst="rect">
             <a:avLst/>
@@ -5462,28 +5492,27 @@
             <a:noFill/>
           </a:ln>
         </p:spPr>
+        <p:style>
+          <a:lnRef idx="0"/>
+          <a:fillRef idx="0"/>
+          <a:effectRef idx="0"/>
+          <a:fontRef idx="minor"/>
+        </p:style>
         <p:txBody>
           <a:bodyPr lIns="90000" rIns="90000" tIns="45000" bIns="45000">
             <a:noAutofit/>
           </a:bodyPr>
           <a:p>
+            <a:pPr>
+              <a:lnSpc>
+                <a:spcPct val="100000"/>
+              </a:lnSpc>
+            </a:pPr>
             <a:r>
               <a:rPr b="0" lang="en-IN" sz="1800" spc="-1" strike="noStrike">
                 <a:latin typeface="Arial"/>
               </a:rPr>
-              <a:t>Borrow</a:t>
-            </a:r>
-            <a:r>
-              <a:rPr b="0" lang="en-IN" sz="1800" spc="-1" strike="noStrike">
-                <a:latin typeface="Arial"/>
-              </a:rPr>
-              <a:t>ed By </a:t>
-            </a:r>
-            <a:r>
-              <a:rPr b="0" lang="en-IN" sz="1800" spc="-1" strike="noStrike">
-                <a:latin typeface="Arial"/>
-              </a:rPr>
-              <a:t>TABLE</a:t>
+              <a:t>Borrowed By TABLE</a:t>
             </a:r>
             <a:endParaRPr b="0" lang="en-IN" sz="1800" spc="-1" strike="noStrike">
               <a:latin typeface="Arial"/>
@@ -5530,7 +5559,7 @@
         <p:spPr>
           <a:xfrm>
             <a:off x="5934960" y="1050480"/>
-            <a:ext cx="1696320" cy="1007280"/>
+            <a:ext cx="1695960" cy="1006920"/>
           </a:xfrm>
           <a:prstGeom prst="rect">
             <a:avLst/>
@@ -5560,7 +5589,7 @@
         <p:spPr>
           <a:xfrm>
             <a:off x="1908000" y="1152000"/>
-            <a:ext cx="1437840" cy="789840"/>
+            <a:ext cx="1437480" cy="789480"/>
           </a:xfrm>
           <a:prstGeom prst="rect">
             <a:avLst/>
@@ -5615,7 +5644,7 @@
         <p:spPr>
           <a:xfrm>
             <a:off x="6084000" y="1152000"/>
-            <a:ext cx="1437840" cy="789840"/>
+            <a:ext cx="1437480" cy="789480"/>
           </a:xfrm>
           <a:prstGeom prst="rect">
             <a:avLst/>
@@ -5670,7 +5699,7 @@
         <p:spPr>
           <a:xfrm>
             <a:off x="4032000" y="864000"/>
-            <a:ext cx="1437840" cy="1365840"/>
+            <a:ext cx="1437480" cy="1365480"/>
           </a:xfrm>
           <a:custGeom>
             <a:avLst/>
@@ -5802,7 +5831,7 @@
         <p:spPr>
           <a:xfrm>
             <a:off x="1548000" y="576000"/>
-            <a:ext cx="2124000" cy="468000"/>
+            <a:ext cx="2123640" cy="467640"/>
           </a:xfrm>
           <a:prstGeom prst="rect">
             <a:avLst/>
@@ -5908,7 +5937,7 @@
         <p:spPr>
           <a:xfrm>
             <a:off x="5760000" y="576000"/>
-            <a:ext cx="2124000" cy="468000"/>
+            <a:ext cx="2123640" cy="467640"/>
           </a:xfrm>
           <a:prstGeom prst="rect">
             <a:avLst/>
@@ -5959,7 +5988,7 @@
         <p:spPr>
           <a:xfrm>
             <a:off x="216000" y="2376000"/>
-            <a:ext cx="2124000" cy="2592000"/>
+            <a:ext cx="2123640" cy="2591640"/>
           </a:xfrm>
           <a:prstGeom prst="rect">
             <a:avLst/>
@@ -6009,7 +6038,7 @@
         </p:nvGraphicFramePr>
         <p:xfrm>
           <a:off x="2967840" y="3226680"/>
-          <a:ext cx="5075280" cy="2159280"/>
+          <a:ext cx="2872440" cy="1154520"/>
         </p:xfrm>
         <a:graphic>
           <a:graphicData uri="http://schemas.openxmlformats.org/drawingml/2006/table">
@@ -6020,7 +6049,7 @@
                 <a:gridCol w="982080"/>
                 <a:gridCol w="863280"/>
               </a:tblGrid>
-              <a:tr h="343080">
+              <a:tr h="347760">
                 <a:tc>
                   <a:tcPr marL="90000" marR="90000">
                     <a:lnL w="720">
@@ -6103,7 +6132,7 @@
                   </a:tcPr>
                 </a:tc>
               </a:tr>
-              <a:tr h="380160">
+              <a:tr h="378000">
                 <a:tc>
                   <a:tcPr marL="90000" marR="90000">
                     <a:lnL w="720">
@@ -6186,7 +6215,7 @@
                   </a:tcPr>
                 </a:tc>
               </a:tr>
-              <a:tr h="431640">
+              <a:tr h="428760">
                 <a:tc>
                   <a:tcPr marL="90000" marR="90000">
                     <a:lnL w="720">
@@ -6281,7 +6310,7 @@
         </p:nvGraphicFramePr>
         <p:xfrm>
           <a:off x="6654600" y="3214800"/>
-          <a:ext cx="5075280" cy="2159280"/>
+          <a:ext cx="2351520" cy="1124280"/>
         </p:xfrm>
         <a:graphic>
           <a:graphicData uri="http://schemas.openxmlformats.org/drawingml/2006/table">
@@ -6668,7 +6697,7 @@
         <p:spPr>
           <a:xfrm>
             <a:off x="1945800" y="3636000"/>
-            <a:ext cx="1437840" cy="789840"/>
+            <a:ext cx="1437480" cy="789480"/>
           </a:xfrm>
           <a:prstGeom prst="rect">
             <a:avLst/>
@@ -6743,7 +6772,7 @@
         <p:spPr>
           <a:xfrm>
             <a:off x="6300000" y="3673800"/>
-            <a:ext cx="1437840" cy="789840"/>
+            <a:ext cx="1437480" cy="789480"/>
           </a:xfrm>
           <a:prstGeom prst="rect">
             <a:avLst/>
@@ -6872,7 +6901,7 @@
         <p:spPr>
           <a:xfrm>
             <a:off x="1764000" y="4860000"/>
-            <a:ext cx="7126560" cy="600840"/>
+            <a:ext cx="7126200" cy="600480"/>
           </a:xfrm>
           <a:prstGeom prst="rect">
             <a:avLst/>
@@ -6898,7 +6927,7 @@
         <p:spPr>
           <a:xfrm>
             <a:off x="4140000" y="1080000"/>
-            <a:ext cx="1437840" cy="789840"/>
+            <a:ext cx="1437480" cy="789480"/>
           </a:xfrm>
           <a:prstGeom prst="rect">
             <a:avLst/>
@@ -6953,7 +6982,7 @@
         <p:spPr>
           <a:xfrm>
             <a:off x="4392000" y="2267640"/>
-            <a:ext cx="935640" cy="1007640"/>
+            <a:ext cx="935280" cy="1007280"/>
           </a:xfrm>
           <a:custGeom>
             <a:avLst/>
@@ -7002,7 +7031,7 @@
         <p:spPr>
           <a:xfrm>
             <a:off x="4572000" y="2304000"/>
-            <a:ext cx="647640" cy="345960"/>
+            <a:ext cx="647280" cy="345600"/>
           </a:xfrm>
           <a:prstGeom prst="rect">
             <a:avLst/>
@@ -7030,7 +7059,11 @@
             </a:pPr>
             <a:r>
               <a:rPr b="0" lang="en-IN" sz="1800" spc="-1" strike="noStrike">
-                <a:latin typeface="Arial"/>
+                <a:solidFill>
+                  <a:srgbClr val="000000"/>
+                </a:solidFill>
+                <a:latin typeface="Arial"/>
+                <a:ea typeface="DejaVu Sans"/>
               </a:rPr>
               <a:t>IS A</a:t>
             </a:r>
@@ -7130,7 +7163,7 @@
         <p:spPr>
           <a:xfrm>
             <a:off x="2592000" y="432000"/>
-            <a:ext cx="1151640" cy="503640"/>
+            <a:ext cx="1151280" cy="503280"/>
           </a:xfrm>
           <a:prstGeom prst="ellipse">
             <a:avLst/>
@@ -7185,7 +7218,7 @@
         <p:spPr>
           <a:xfrm>
             <a:off x="4104360" y="360360"/>
-            <a:ext cx="1151640" cy="503640"/>
+            <a:ext cx="1151280" cy="503280"/>
           </a:xfrm>
           <a:prstGeom prst="ellipse">
             <a:avLst/>
@@ -7240,7 +7273,7 @@
         <p:spPr>
           <a:xfrm>
             <a:off x="5652720" y="432720"/>
-            <a:ext cx="1151640" cy="503640"/>
+            <a:ext cx="1151280" cy="503280"/>
           </a:xfrm>
           <a:prstGeom prst="ellipse">
             <a:avLst/>
@@ -7295,7 +7328,7 @@
         <p:spPr>
           <a:xfrm>
             <a:off x="3813480" y="4321080"/>
-            <a:ext cx="1151640" cy="503640"/>
+            <a:ext cx="1151280" cy="503280"/>
           </a:xfrm>
           <a:prstGeom prst="ellipse">
             <a:avLst/>
@@ -7350,7 +7383,7 @@
         <p:spPr>
           <a:xfrm>
             <a:off x="2193840" y="4717440"/>
-            <a:ext cx="1151640" cy="503640"/>
+            <a:ext cx="1151280" cy="503280"/>
           </a:xfrm>
           <a:prstGeom prst="ellipse">
             <a:avLst/>
@@ -7405,7 +7438,7 @@
         <p:spPr>
           <a:xfrm>
             <a:off x="682200" y="4501800"/>
-            <a:ext cx="1151640" cy="503640"/>
+            <a:ext cx="1151280" cy="503280"/>
           </a:xfrm>
           <a:prstGeom prst="ellipse">
             <a:avLst/>
@@ -7460,7 +7493,7 @@
         <p:spPr>
           <a:xfrm>
             <a:off x="5434560" y="4574160"/>
-            <a:ext cx="1151640" cy="503640"/>
+            <a:ext cx="1151280" cy="503280"/>
           </a:xfrm>
           <a:prstGeom prst="ellipse">
             <a:avLst/>
@@ -7515,7 +7548,7 @@
         <p:spPr>
           <a:xfrm>
             <a:off x="7634160" y="4574520"/>
-            <a:ext cx="1151640" cy="503640"/>
+            <a:ext cx="1151280" cy="503280"/>
           </a:xfrm>
           <a:prstGeom prst="ellipse">
             <a:avLst/>
@@ -7570,7 +7603,7 @@
         <p:spPr>
           <a:xfrm>
             <a:off x="686520" y="3098880"/>
-            <a:ext cx="1151640" cy="503640"/>
+            <a:ext cx="1151280" cy="503280"/>
           </a:xfrm>
           <a:prstGeom prst="ellipse">
             <a:avLst/>
@@ -7868,7 +7901,7 @@
         <p:spPr>
           <a:xfrm>
             <a:off x="216000" y="288000"/>
-            <a:ext cx="2376000" cy="2304000"/>
+            <a:ext cx="2375640" cy="2303640"/>
           </a:xfrm>
           <a:prstGeom prst="rect">
             <a:avLst/>
@@ -7989,7 +8022,7 @@
         <p:spPr>
           <a:xfrm>
             <a:off x="1908000" y="936000"/>
-            <a:ext cx="1437840" cy="789840"/>
+            <a:ext cx="1437480" cy="789480"/>
           </a:xfrm>
           <a:prstGeom prst="rect">
             <a:avLst/>
@@ -8027,8 +8060,53 @@
                 <a:latin typeface="Arial"/>
                 <a:ea typeface="DejaVu Sans"/>
               </a:rPr>
-              <a:t>BOO</a:t>
-            </a:r>
+              <a:t>BOOKS</a:t>
+            </a:r>
+            <a:endParaRPr b="0" lang="en-IN" sz="1800" spc="-1" strike="noStrike">
+              <a:latin typeface="Arial"/>
+            </a:endParaRPr>
+          </a:p>
+        </p:txBody>
+      </p:sp>
+      <p:sp>
+        <p:nvSpPr>
+          <p:cNvPr id="293" name="CustomShape 2"/>
+          <p:cNvSpPr/>
+          <p:nvPr/>
+        </p:nvSpPr>
+        <p:spPr>
+          <a:xfrm>
+            <a:off x="6084000" y="936000"/>
+            <a:ext cx="1437480" cy="789480"/>
+          </a:xfrm>
+          <a:prstGeom prst="rect">
+            <a:avLst/>
+          </a:prstGeom>
+          <a:solidFill>
+            <a:srgbClr val="729fcf"/>
+          </a:solidFill>
+          <a:ln>
+            <a:solidFill>
+              <a:srgbClr val="3465a4"/>
+            </a:solidFill>
+          </a:ln>
+        </p:spPr>
+        <p:style>
+          <a:lnRef idx="0"/>
+          <a:fillRef idx="0"/>
+          <a:effectRef idx="0"/>
+          <a:fontRef idx="minor"/>
+        </p:style>
+        <p:txBody>
+          <a:bodyPr wrap="none" lIns="90000" rIns="90000" tIns="45000" bIns="45000" anchor="ctr">
+            <a:noAutofit/>
+          </a:bodyPr>
+          <a:p>
+            <a:pPr algn="ctr">
+              <a:lnSpc>
+                <a:spcPct val="100000"/>
+              </a:lnSpc>
+            </a:pPr>
             <a:r>
               <a:rPr b="0" lang="en-IN" sz="1800" spc="-1" strike="noStrike">
                 <a:solidFill>
@@ -8037,7 +8115,7 @@
                 <a:latin typeface="Arial"/>
                 <a:ea typeface="DejaVu Sans"/>
               </a:rPr>
-              <a:t>KS</a:t>
+              <a:t>USERS</a:t>
             </a:r>
             <a:endParaRPr b="0" lang="en-IN" sz="1800" spc="-1" strike="noStrike">
               <a:latin typeface="Arial"/>
@@ -8047,14 +8125,14 @@
       </p:sp>
       <p:sp>
         <p:nvSpPr>
-          <p:cNvPr id="293" name="CustomShape 2"/>
-          <p:cNvSpPr/>
-          <p:nvPr/>
-        </p:nvSpPr>
-        <p:spPr>
-          <a:xfrm>
-            <a:off x="6084000" y="936000"/>
-            <a:ext cx="1437840" cy="789840"/>
+          <p:cNvPr id="294" name="CustomShape 3"/>
+          <p:cNvSpPr/>
+          <p:nvPr/>
+        </p:nvSpPr>
+        <p:spPr>
+          <a:xfrm>
+            <a:off x="4934160" y="4392000"/>
+            <a:ext cx="1437480" cy="789480"/>
           </a:xfrm>
           <a:prstGeom prst="rect">
             <a:avLst/>
@@ -8092,7 +8170,7 @@
                 <a:latin typeface="Arial"/>
                 <a:ea typeface="DejaVu Sans"/>
               </a:rPr>
-              <a:t>USERS</a:t>
+              <a:t>SUPPLIERS</a:t>
             </a:r>
             <a:endParaRPr b="0" lang="en-IN" sz="1800" spc="-1" strike="noStrike">
               <a:latin typeface="Arial"/>
@@ -8102,61 +8180,6 @@
       </p:sp>
       <p:sp>
         <p:nvSpPr>
-          <p:cNvPr id="294" name="CustomShape 3"/>
-          <p:cNvSpPr/>
-          <p:nvPr/>
-        </p:nvSpPr>
-        <p:spPr>
-          <a:xfrm>
-            <a:off x="4934160" y="4392000"/>
-            <a:ext cx="1437840" cy="789840"/>
-          </a:xfrm>
-          <a:prstGeom prst="rect">
-            <a:avLst/>
-          </a:prstGeom>
-          <a:solidFill>
-            <a:srgbClr val="729fcf"/>
-          </a:solidFill>
-          <a:ln>
-            <a:solidFill>
-              <a:srgbClr val="3465a4"/>
-            </a:solidFill>
-          </a:ln>
-        </p:spPr>
-        <p:style>
-          <a:lnRef idx="0"/>
-          <a:fillRef idx="0"/>
-          <a:effectRef idx="0"/>
-          <a:fontRef idx="minor"/>
-        </p:style>
-        <p:txBody>
-          <a:bodyPr wrap="none" lIns="90000" rIns="90000" tIns="45000" bIns="45000" anchor="ctr">
-            <a:noAutofit/>
-          </a:bodyPr>
-          <a:p>
-            <a:pPr algn="ctr">
-              <a:lnSpc>
-                <a:spcPct val="100000"/>
-              </a:lnSpc>
-            </a:pPr>
-            <a:r>
-              <a:rPr b="0" lang="en-IN" sz="1800" spc="-1" strike="noStrike">
-                <a:solidFill>
-                  <a:srgbClr val="000000"/>
-                </a:solidFill>
-                <a:latin typeface="Arial"/>
-                <a:ea typeface="DejaVu Sans"/>
-              </a:rPr>
-              <a:t>SUPPLIERS</a:t>
-            </a:r>
-            <a:endParaRPr b="0" lang="en-IN" sz="1800" spc="-1" strike="noStrike">
-              <a:latin typeface="Arial"/>
-            </a:endParaRPr>
-          </a:p>
-        </p:txBody>
-      </p:sp>
-      <p:sp>
-        <p:nvSpPr>
           <p:cNvPr id="295" name="CustomShape 4"/>
           <p:cNvSpPr/>
           <p:nvPr/>
@@ -8164,7 +8187,7 @@
         <p:spPr>
           <a:xfrm>
             <a:off x="4032000" y="648000"/>
-            <a:ext cx="1437840" cy="1365840"/>
+            <a:ext cx="1437480" cy="1365480"/>
           </a:xfrm>
           <a:custGeom>
             <a:avLst/>
@@ -8262,7 +8285,7 @@
         <p:spPr>
           <a:xfrm>
             <a:off x="1908000" y="3204360"/>
-            <a:ext cx="1437840" cy="1365840"/>
+            <a:ext cx="1437480" cy="1365480"/>
           </a:xfrm>
           <a:custGeom>
             <a:avLst/>
@@ -8414,7 +8437,7 @@
         <p:spPr>
           <a:xfrm>
             <a:off x="4140000" y="2234160"/>
-            <a:ext cx="1152000" cy="573840"/>
+            <a:ext cx="1151640" cy="573480"/>
           </a:xfrm>
           <a:prstGeom prst="ellipse">
             <a:avLst/>
@@ -8469,7 +8492,7 @@
         <p:spPr>
           <a:xfrm>
             <a:off x="3708360" y="3636360"/>
-            <a:ext cx="1079640" cy="573840"/>
+            <a:ext cx="1079280" cy="573480"/>
           </a:xfrm>
           <a:prstGeom prst="ellipse">
             <a:avLst/>
@@ -8578,7 +8601,7 @@
         <p:spPr>
           <a:xfrm>
             <a:off x="504000" y="396000"/>
-            <a:ext cx="1152000" cy="573840"/>
+            <a:ext cx="1151640" cy="573480"/>
           </a:xfrm>
           <a:prstGeom prst="ellipse">
             <a:avLst/>
@@ -8633,7 +8656,7 @@
         <p:spPr>
           <a:xfrm>
             <a:off x="1944000" y="180000"/>
-            <a:ext cx="1152000" cy="573840"/>
+            <a:ext cx="1151640" cy="573480"/>
           </a:xfrm>
           <a:prstGeom prst="ellipse">
             <a:avLst/>
@@ -8688,7 +8711,7 @@
         <p:spPr>
           <a:xfrm>
             <a:off x="288000" y="1152000"/>
-            <a:ext cx="1152000" cy="573840"/>
+            <a:ext cx="1151640" cy="573480"/>
           </a:xfrm>
           <a:prstGeom prst="ellipse">
             <a:avLst/>
@@ -8743,7 +8766,7 @@
         <p:spPr>
           <a:xfrm>
             <a:off x="5940000" y="180000"/>
-            <a:ext cx="1152000" cy="573840"/>
+            <a:ext cx="1151640" cy="573480"/>
           </a:xfrm>
           <a:prstGeom prst="ellipse">
             <a:avLst/>
@@ -8798,7 +8821,7 @@
         <p:spPr>
           <a:xfrm>
             <a:off x="7560000" y="180000"/>
-            <a:ext cx="1152000" cy="573840"/>
+            <a:ext cx="1151640" cy="573480"/>
           </a:xfrm>
           <a:prstGeom prst="ellipse">
             <a:avLst/>
@@ -8853,7 +8876,7 @@
         <p:spPr>
           <a:xfrm>
             <a:off x="7992000" y="972000"/>
-            <a:ext cx="1152000" cy="573840"/>
+            <a:ext cx="1151640" cy="573480"/>
           </a:xfrm>
           <a:prstGeom prst="ellipse">
             <a:avLst/>
@@ -8899,12 +8922,12 @@
           </a:p>
         </p:txBody>
       </p:sp>
-      <p:cxnSp>
-        <p:nvCxnSpPr>
+      <p:sp>
+        <p:nvSpPr>
           <p:cNvPr id="309" name="Line 18"/>
-          <p:cNvCxnSpPr/>
-          <p:nvPr/>
-        </p:nvCxnSpPr>
+          <p:cNvSpPr/>
+          <p:nvPr/>
+        </p:nvSpPr>
         <p:spPr>
           <a:xfrm>
             <a:off x="0" y="0"/>
@@ -8919,7 +8942,13 @@
             </a:solidFill>
           </a:ln>
         </p:spPr>
-      </p:cxnSp>
+        <p:style>
+          <a:lnRef idx="0"/>
+          <a:fillRef idx="0"/>
+          <a:effectRef idx="0"/>
+          <a:fontRef idx="minor"/>
+        </p:style>
+      </p:sp>
       <p:sp>
         <p:nvSpPr>
           <p:cNvPr id="310" name="CustomShape 19"/>
@@ -8929,7 +8958,7 @@
         <p:spPr>
           <a:xfrm>
             <a:off x="432000" y="3636360"/>
-            <a:ext cx="1079640" cy="573840"/>
+            <a:ext cx="1079280" cy="573480"/>
           </a:xfrm>
           <a:prstGeom prst="ellipse">
             <a:avLst/>
@@ -8984,7 +9013,7 @@
         <p:spPr>
           <a:xfrm>
             <a:off x="6803640" y="4068360"/>
-            <a:ext cx="1079640" cy="573840"/>
+            <a:ext cx="1079280" cy="573480"/>
           </a:xfrm>
           <a:prstGeom prst="ellipse">
             <a:avLst/>
@@ -9039,7 +9068,7 @@
         <p:spPr>
           <a:xfrm>
             <a:off x="6839280" y="4752360"/>
-            <a:ext cx="1079640" cy="573840"/>
+            <a:ext cx="1079280" cy="573480"/>
           </a:xfrm>
           <a:prstGeom prst="ellipse">
             <a:avLst/>
@@ -9410,6 +9439,505 @@
           <a:fontRef idx="minor"/>
         </p:style>
       </p:sp>
+    </p:spTree>
+  </p:cSld>
+  <mc:AlternateContent>
+    <mc:Choice Requires="p14">
+      <p:transition spd="slow" p14:dur="2000"/>
+    </mc:Choice>
+    <mc:Fallback>
+      <p:transition spd="slow"/>
+    </mc:Fallback>
+  </mc:AlternateContent>
+</p:sld>
+</file>
+
+<file path=ppt/slides/slide15.xml><?xml version="1.0" encoding="utf-8"?>
+<p:sld xmlns:a="http://schemas.openxmlformats.org/drawingml/2006/main" xmlns:p="http://schemas.openxmlformats.org/presentationml/2006/main" xmlns:r="http://schemas.openxmlformats.org/officeDocument/2006/relationships" xmlns:p14="http://schemas.microsoft.com/office/powerpoint/2010/main" xmlns:p15="http://schemas.microsoft.com/office/powerpoint/2012/main" xmlns:mc="http://schemas.openxmlformats.org/markup-compatibility/2006">
+  <p:cSld>
+    <p:spTree>
+      <p:nvGrpSpPr>
+        <p:cNvPr id="1" name=""/>
+        <p:cNvGrpSpPr/>
+        <p:nvPr/>
+      </p:nvGrpSpPr>
+      <p:grpSpPr>
+        <a:xfrm>
+          <a:off x="0" y="0"/>
+          <a:ext cx="0" cy="0"/>
+          <a:chOff x="0" y="0"/>
+          <a:chExt cx="0" cy="0"/>
+        </a:xfrm>
+      </p:grpSpPr>
+      <p:sp>
+        <p:nvSpPr>
+          <p:cNvPr id="325" name="TextShape 1"/>
+          <p:cNvSpPr txBox="1"/>
+          <p:nvPr/>
+        </p:nvSpPr>
+        <p:spPr>
+          <a:xfrm>
+            <a:off x="2556000" y="1152000"/>
+            <a:ext cx="4536000" cy="360000"/>
+          </a:xfrm>
+          <a:prstGeom prst="rect">
+            <a:avLst/>
+          </a:prstGeom>
+          <a:noFill/>
+          <a:ln>
+            <a:noFill/>
+          </a:ln>
+        </p:spPr>
+        <p:txBody>
+          <a:bodyPr lIns="90000" rIns="90000" tIns="45000" bIns="45000">
+            <a:noAutofit/>
+          </a:bodyPr>
+          <a:p>
+            <a:r>
+              <a:rPr b="0" lang="en-IN" sz="1800" spc="-1" strike="noStrike">
+                <a:latin typeface="Arial"/>
+              </a:rPr>
+              <a:t>FORMAL SPECIFICATION LANGUAGES</a:t>
+            </a:r>
+            <a:endParaRPr b="0" lang="en-IN" sz="1800" spc="-1" strike="noStrike">
+              <a:latin typeface="Arial"/>
+            </a:endParaRPr>
+          </a:p>
+        </p:txBody>
+      </p:sp>
+      <p:graphicFrame>
+        <p:nvGraphicFramePr>
+          <p:cNvPr id="326" name="Table 2"/>
+          <p:cNvGraphicFramePr/>
+          <p:nvPr/>
+        </p:nvGraphicFramePr>
+        <p:xfrm>
+          <a:off x="1008000" y="1994760"/>
+          <a:ext cx="7704000" cy="2698920"/>
+        </p:xfrm>
+        <a:graphic>
+          <a:graphicData uri="http://schemas.openxmlformats.org/drawingml/2006/table">
+            <a:tbl>
+              <a:tblPr/>
+              <a:tblGrid>
+                <a:gridCol w="2567160"/>
+                <a:gridCol w="2567160"/>
+                <a:gridCol w="2569680"/>
+              </a:tblGrid>
+              <a:tr h="719640">
+                <a:tc>
+                  <a:tcPr marL="90000" marR="90000">
+                    <a:lnL w="720">
+                      <a:solidFill>
+                        <a:srgbClr val="ffffff"/>
+                      </a:solidFill>
+                    </a:lnL>
+                    <a:lnR w="720">
+                      <a:solidFill>
+                        <a:srgbClr val="ffffff"/>
+                      </a:solidFill>
+                    </a:lnR>
+                    <a:lnT w="720">
+                      <a:solidFill>
+                        <a:srgbClr val="ffffff"/>
+                      </a:solidFill>
+                    </a:lnT>
+                    <a:lnB w="720">
+                      <a:solidFill>
+                        <a:srgbClr val="ffffff"/>
+                      </a:solidFill>
+                    </a:lnB>
+                    <a:solidFill>
+                      <a:srgbClr val="b3b3b3"/>
+                    </a:solidFill>
+                  </a:tcPr>
+                </a:tc>
+                <a:tc>
+                  <a:txBody>
+                    <a:bodyPr lIns="90000" rIns="90000" tIns="46800" bIns="46800">
+                      <a:noAutofit/>
+                    </a:bodyPr>
+                    <a:p>
+                      <a:r>
+                        <a:rPr b="0" lang="en-IN" sz="1800" spc="-1" strike="noStrike">
+                          <a:latin typeface="Arial"/>
+                        </a:rPr>
+                        <a:t>Sequential</a:t>
+                      </a:r>
+                      <a:endParaRPr b="0" lang="en-IN" sz="1800" spc="-1" strike="noStrike">
+                        <a:latin typeface="Arial"/>
+                      </a:endParaRPr>
+                    </a:p>
+                  </a:txBody>
+                  <a:tcPr marL="90000" marR="90000">
+                    <a:lnL w="720">
+                      <a:solidFill>
+                        <a:srgbClr val="ffffff"/>
+                      </a:solidFill>
+                    </a:lnL>
+                    <a:lnR w="720">
+                      <a:solidFill>
+                        <a:srgbClr val="ffffff"/>
+                      </a:solidFill>
+                    </a:lnR>
+                    <a:lnT w="720">
+                      <a:solidFill>
+                        <a:srgbClr val="ffffff"/>
+                      </a:solidFill>
+                    </a:lnT>
+                    <a:lnB w="720">
+                      <a:solidFill>
+                        <a:srgbClr val="ffffff"/>
+                      </a:solidFill>
+                    </a:lnB>
+                    <a:solidFill>
+                      <a:srgbClr val="b3b3b3"/>
+                    </a:solidFill>
+                  </a:tcPr>
+                </a:tc>
+                <a:tc>
+                  <a:txBody>
+                    <a:bodyPr lIns="90000" rIns="90000" tIns="46800" bIns="46800">
+                      <a:noAutofit/>
+                    </a:bodyPr>
+                    <a:p>
+                      <a:r>
+                        <a:rPr b="0" lang="en-IN" sz="1800" spc="-1" strike="noStrike">
+                          <a:latin typeface="Arial"/>
+                        </a:rPr>
+                        <a:t>Concurrent</a:t>
+                      </a:r>
+                      <a:endParaRPr b="0" lang="en-IN" sz="1800" spc="-1" strike="noStrike">
+                        <a:latin typeface="Arial"/>
+                      </a:endParaRPr>
+                    </a:p>
+                  </a:txBody>
+                  <a:tcPr marL="90000" marR="90000">
+                    <a:lnL w="720">
+                      <a:solidFill>
+                        <a:srgbClr val="ffffff"/>
+                      </a:solidFill>
+                    </a:lnL>
+                    <a:lnR w="720">
+                      <a:solidFill>
+                        <a:srgbClr val="ffffff"/>
+                      </a:solidFill>
+                    </a:lnR>
+                    <a:lnT w="720">
+                      <a:solidFill>
+                        <a:srgbClr val="ffffff"/>
+                      </a:solidFill>
+                    </a:lnT>
+                    <a:lnB w="720">
+                      <a:solidFill>
+                        <a:srgbClr val="ffffff"/>
+                      </a:solidFill>
+                    </a:lnB>
+                    <a:solidFill>
+                      <a:srgbClr val="b3b3b3"/>
+                    </a:solidFill>
+                  </a:tcPr>
+                </a:tc>
+              </a:tr>
+              <a:tr h="719640">
+                <a:tc>
+                  <a:txBody>
+                    <a:bodyPr lIns="90000" rIns="90000" tIns="46800" bIns="46800">
+                      <a:noAutofit/>
+                    </a:bodyPr>
+                    <a:p>
+                      <a:r>
+                        <a:rPr b="0" lang="en-IN" sz="1800" spc="-1" strike="noStrike">
+                          <a:latin typeface="Arial"/>
+                        </a:rPr>
+                        <a:t>Algebraic</a:t>
+                      </a:r>
+                      <a:endParaRPr b="0" lang="en-IN" sz="1800" spc="-1" strike="noStrike">
+                        <a:latin typeface="Arial"/>
+                      </a:endParaRPr>
+                    </a:p>
+                  </a:txBody>
+                  <a:tcPr marL="90000" marR="90000">
+                    <a:lnL w="720">
+                      <a:solidFill>
+                        <a:srgbClr val="ffffff"/>
+                      </a:solidFill>
+                    </a:lnL>
+                    <a:lnR w="720">
+                      <a:solidFill>
+                        <a:srgbClr val="ffffff"/>
+                      </a:solidFill>
+                    </a:lnR>
+                    <a:lnT w="720">
+                      <a:solidFill>
+                        <a:srgbClr val="ffffff"/>
+                      </a:solidFill>
+                    </a:lnT>
+                    <a:lnB w="720">
+                      <a:solidFill>
+                        <a:srgbClr val="ffffff"/>
+                      </a:solidFill>
+                    </a:lnB>
+                    <a:solidFill>
+                      <a:srgbClr val="cccccc"/>
+                    </a:solidFill>
+                  </a:tcPr>
+                </a:tc>
+                <a:tc>
+                  <a:txBody>
+                    <a:bodyPr lIns="90000" rIns="90000" tIns="46800" bIns="46800">
+                      <a:noAutofit/>
+                    </a:bodyPr>
+                    <a:p>
+                      <a:r>
+                        <a:rPr b="0" lang="en-IN" sz="1800" spc="-1" strike="noStrike">
+                          <a:latin typeface="Arial"/>
+                        </a:rPr>
+                        <a:t>Larch(Guttag et. al)</a:t>
+                      </a:r>
+                      <a:endParaRPr b="0" lang="en-IN" sz="1800" spc="-1" strike="noStrike">
+                        <a:latin typeface="Arial"/>
+                      </a:endParaRPr>
+                    </a:p>
+                    <a:p>
+                      <a:r>
+                        <a:rPr b="0" lang="en-IN" sz="1800" spc="-1" strike="noStrike">
+                          <a:latin typeface="Arial"/>
+                        </a:rPr>
+                        <a:t>OBJ(Futatsugi et. al)</a:t>
+                      </a:r>
+                      <a:endParaRPr b="0" lang="en-IN" sz="1800" spc="-1" strike="noStrike">
+                        <a:latin typeface="Arial"/>
+                      </a:endParaRPr>
+                    </a:p>
+                  </a:txBody>
+                  <a:tcPr marL="90000" marR="90000">
+                    <a:lnL w="720">
+                      <a:solidFill>
+                        <a:srgbClr val="ffffff"/>
+                      </a:solidFill>
+                    </a:lnL>
+                    <a:lnR w="720">
+                      <a:solidFill>
+                        <a:srgbClr val="ffffff"/>
+                      </a:solidFill>
+                    </a:lnR>
+                    <a:lnT w="720">
+                      <a:solidFill>
+                        <a:srgbClr val="ffffff"/>
+                      </a:solidFill>
+                    </a:lnT>
+                    <a:lnB w="720">
+                      <a:solidFill>
+                        <a:srgbClr val="ffffff"/>
+                      </a:solidFill>
+                    </a:lnB>
+                    <a:solidFill>
+                      <a:srgbClr val="cccccc"/>
+                    </a:solidFill>
+                  </a:tcPr>
+                </a:tc>
+                <a:tc>
+                  <a:txBody>
+                    <a:bodyPr lIns="90000" rIns="90000" tIns="46800" bIns="46800">
+                      <a:noAutofit/>
+                    </a:bodyPr>
+                    <a:p>
+                      <a:r>
+                        <a:rPr b="0" lang="en-IN" sz="1800" spc="-1" strike="noStrike">
+                          <a:latin typeface="Arial"/>
+                        </a:rPr>
+                        <a:t>Lotos(Bolognesi)</a:t>
+                      </a:r>
+                      <a:endParaRPr b="0" lang="en-IN" sz="1800" spc="-1" strike="noStrike">
+                        <a:latin typeface="Arial"/>
+                      </a:endParaRPr>
+                    </a:p>
+                  </a:txBody>
+                  <a:tcPr marL="90000" marR="90000">
+                    <a:lnL w="720">
+                      <a:solidFill>
+                        <a:srgbClr val="ffffff"/>
+                      </a:solidFill>
+                    </a:lnL>
+                    <a:lnR w="720">
+                      <a:solidFill>
+                        <a:srgbClr val="ffffff"/>
+                      </a:solidFill>
+                    </a:lnR>
+                    <a:lnT w="720">
+                      <a:solidFill>
+                        <a:srgbClr val="ffffff"/>
+                      </a:solidFill>
+                    </a:lnT>
+                    <a:lnB w="720">
+                      <a:solidFill>
+                        <a:srgbClr val="ffffff"/>
+                      </a:solidFill>
+                    </a:lnB>
+                    <a:solidFill>
+                      <a:srgbClr val="cccccc"/>
+                    </a:solidFill>
+                  </a:tcPr>
+                </a:tc>
+              </a:tr>
+              <a:tr h="720360">
+                <a:tc>
+                  <a:txBody>
+                    <a:bodyPr lIns="90000" rIns="90000" tIns="46800" bIns="46800">
+                      <a:noAutofit/>
+                    </a:bodyPr>
+                    <a:p>
+                      <a:r>
+                        <a:rPr b="0" lang="en-IN" sz="1800" spc="-1" strike="noStrike">
+                          <a:latin typeface="Arial"/>
+                        </a:rPr>
+                        <a:t>Model-based</a:t>
+                      </a:r>
+                      <a:endParaRPr b="0" lang="en-IN" sz="1800" spc="-1" strike="noStrike">
+                        <a:latin typeface="Arial"/>
+                      </a:endParaRPr>
+                    </a:p>
+                  </a:txBody>
+                  <a:tcPr marL="90000" marR="90000">
+                    <a:lnL w="720">
+                      <a:solidFill>
+                        <a:srgbClr val="ffffff"/>
+                      </a:solidFill>
+                    </a:lnL>
+                    <a:lnR w="720">
+                      <a:solidFill>
+                        <a:srgbClr val="ffffff"/>
+                      </a:solidFill>
+                    </a:lnR>
+                    <a:lnT w="720">
+                      <a:solidFill>
+                        <a:srgbClr val="ffffff"/>
+                      </a:solidFill>
+                    </a:lnT>
+                    <a:lnB w="720">
+                      <a:solidFill>
+                        <a:srgbClr val="ffffff"/>
+                      </a:solidFill>
+                    </a:lnB>
+                    <a:solidFill>
+                      <a:srgbClr val="e6e6e6"/>
+                    </a:solidFill>
+                  </a:tcPr>
+                </a:tc>
+                <a:tc>
+                  <a:txBody>
+                    <a:bodyPr lIns="90000" rIns="90000" tIns="46800" bIns="46800">
+                      <a:noAutofit/>
+                    </a:bodyPr>
+                    <a:p>
+                      <a:r>
+                        <a:rPr b="0" lang="en-IN" sz="1800" spc="-1" strike="noStrike">
+                          <a:latin typeface="Arial"/>
+                        </a:rPr>
+                        <a:t>Z (Spivey et. al)</a:t>
+                      </a:r>
+                      <a:endParaRPr b="0" lang="en-IN" sz="1800" spc="-1" strike="noStrike">
+                        <a:latin typeface="Arial"/>
+                      </a:endParaRPr>
+                    </a:p>
+                    <a:p>
+                      <a:r>
+                        <a:rPr b="0" lang="en-IN" sz="1800" spc="-1" strike="noStrike">
+                          <a:latin typeface="Arial"/>
+                        </a:rPr>
+                        <a:t>VDM(Jones et. al)</a:t>
+                      </a:r>
+                      <a:endParaRPr b="0" lang="en-IN" sz="1800" spc="-1" strike="noStrike">
+                        <a:latin typeface="Arial"/>
+                      </a:endParaRPr>
+                    </a:p>
+                  </a:txBody>
+                  <a:tcPr marL="90000" marR="90000">
+                    <a:lnL w="720">
+                      <a:solidFill>
+                        <a:srgbClr val="ffffff"/>
+                      </a:solidFill>
+                    </a:lnL>
+                    <a:lnR w="720">
+                      <a:solidFill>
+                        <a:srgbClr val="ffffff"/>
+                      </a:solidFill>
+                    </a:lnR>
+                    <a:lnT w="720">
+                      <a:solidFill>
+                        <a:srgbClr val="ffffff"/>
+                      </a:solidFill>
+                    </a:lnT>
+                    <a:lnB w="720">
+                      <a:solidFill>
+                        <a:srgbClr val="ffffff"/>
+                      </a:solidFill>
+                    </a:lnB>
+                    <a:solidFill>
+                      <a:srgbClr val="e6e6e6"/>
+                    </a:solidFill>
+                  </a:tcPr>
+                </a:tc>
+                <a:tc>
+                  <a:txBody>
+                    <a:bodyPr lIns="90000" rIns="90000" tIns="46800" bIns="46800">
+                      <a:noAutofit/>
+                    </a:bodyPr>
+                    <a:p>
+                      <a:r>
+                        <a:rPr b="0" lang="en-IN" sz="1800" spc="-1" strike="noStrike">
+                          <a:latin typeface="Arial"/>
+                        </a:rPr>
+                        <a:t>CSP</a:t>
+                      </a:r>
+                      <a:endParaRPr b="0" lang="en-IN" sz="1800" spc="-1" strike="noStrike">
+                        <a:latin typeface="Arial"/>
+                      </a:endParaRPr>
+                    </a:p>
+                    <a:p>
+                      <a:r>
+                        <a:rPr b="0" lang="en-IN" sz="1800" spc="-1" strike="noStrike">
+                          <a:latin typeface="Arial"/>
+                        </a:rPr>
+                        <a:t>Petri Nets(Peterson)</a:t>
+                      </a:r>
+                      <a:endParaRPr b="0" lang="en-IN" sz="1800" spc="-1" strike="noStrike">
+                        <a:latin typeface="Arial"/>
+                      </a:endParaRPr>
+                    </a:p>
+                  </a:txBody>
+                  <a:tcPr marL="90000" marR="90000">
+                    <a:lnL w="720">
+                      <a:solidFill>
+                        <a:srgbClr val="ffffff"/>
+                      </a:solidFill>
+                    </a:lnL>
+                    <a:lnR w="720">
+                      <a:solidFill>
+                        <a:srgbClr val="ffffff"/>
+                      </a:solidFill>
+                    </a:lnR>
+                    <a:lnT w="720">
+                      <a:solidFill>
+                        <a:srgbClr val="ffffff"/>
+                      </a:solidFill>
+                    </a:lnT>
+                    <a:lnB w="720">
+                      <a:solidFill>
+                        <a:srgbClr val="ffffff"/>
+                      </a:solidFill>
+                    </a:lnB>
+                    <a:solidFill>
+                      <a:srgbClr val="e6e6e6"/>
+                    </a:solidFill>
+                  </a:tcPr>
+                </a:tc>
+              </a:tr>
+            </a:tbl>
+          </a:graphicData>
+        </a:graphic>
+      </p:graphicFrame>
     </p:spTree>
   </p:cSld>
   <mc:AlternateContent>
@@ -9449,7 +9977,7 @@
         <p:spPr>
           <a:xfrm>
             <a:off x="1908000" y="936000"/>
-            <a:ext cx="1437840" cy="789840"/>
+            <a:ext cx="1437480" cy="789480"/>
           </a:xfrm>
           <a:prstGeom prst="rect">
             <a:avLst/>
@@ -9504,7 +10032,7 @@
         <p:spPr>
           <a:xfrm>
             <a:off x="6084000" y="936000"/>
-            <a:ext cx="1437840" cy="789840"/>
+            <a:ext cx="1437480" cy="789480"/>
           </a:xfrm>
           <a:prstGeom prst="rect">
             <a:avLst/>
@@ -9559,7 +10087,7 @@
         <p:spPr>
           <a:xfrm>
             <a:off x="1908000" y="4068000"/>
-            <a:ext cx="1437840" cy="789840"/>
+            <a:ext cx="1437480" cy="789480"/>
           </a:xfrm>
           <a:prstGeom prst="rect">
             <a:avLst/>
@@ -9614,7 +10142,7 @@
         <p:spPr>
           <a:xfrm>
             <a:off x="4032000" y="648000"/>
-            <a:ext cx="1437840" cy="1365840"/>
+            <a:ext cx="1437480" cy="1365480"/>
           </a:xfrm>
           <a:custGeom>
             <a:avLst/>
@@ -9712,7 +10240,7 @@
         <p:spPr>
           <a:xfrm>
             <a:off x="1872000" y="2232360"/>
-            <a:ext cx="1437840" cy="1365840"/>
+            <a:ext cx="1437480" cy="1365480"/>
           </a:xfrm>
           <a:custGeom>
             <a:avLst/>
@@ -9918,7 +10446,7 @@
         <p:spPr>
           <a:xfrm>
             <a:off x="5184000" y="2340000"/>
-            <a:ext cx="2013840" cy="573840"/>
+            <a:ext cx="2013480" cy="573480"/>
           </a:xfrm>
           <a:prstGeom prst="ellipse">
             <a:avLst/>
@@ -9973,7 +10501,7 @@
         <p:spPr>
           <a:xfrm>
             <a:off x="3960360" y="3240360"/>
-            <a:ext cx="2013840" cy="573840"/>
+            <a:ext cx="2013480" cy="573480"/>
           </a:xfrm>
           <a:prstGeom prst="ellipse">
             <a:avLst/>
@@ -10112,7 +10640,7 @@
         <p:spPr>
           <a:xfrm>
             <a:off x="3060000" y="2268000"/>
-            <a:ext cx="1437840" cy="789840"/>
+            <a:ext cx="1437480" cy="789480"/>
           </a:xfrm>
           <a:prstGeom prst="rect">
             <a:avLst/>
@@ -10167,7 +10695,7 @@
         <p:spPr>
           <a:xfrm>
             <a:off x="5832000" y="1980000"/>
-            <a:ext cx="1437840" cy="1365840"/>
+            <a:ext cx="1437480" cy="1365480"/>
           </a:xfrm>
           <a:custGeom>
             <a:avLst/>
@@ -10319,7 +10847,7 @@
         <p:spPr>
           <a:xfrm>
             <a:off x="2376000" y="1044000"/>
-            <a:ext cx="1149840" cy="681840"/>
+            <a:ext cx="1149480" cy="681480"/>
           </a:xfrm>
           <a:prstGeom prst="ellipse">
             <a:avLst/>
@@ -10374,7 +10902,7 @@
         <p:spPr>
           <a:xfrm>
             <a:off x="3780360" y="1044360"/>
-            <a:ext cx="1149840" cy="681840"/>
+            <a:ext cx="1149480" cy="681480"/>
           </a:xfrm>
           <a:prstGeom prst="ellipse">
             <a:avLst/>
@@ -10429,7 +10957,7 @@
         <p:spPr>
           <a:xfrm>
             <a:off x="2376360" y="1044360"/>
-            <a:ext cx="1149840" cy="681840"/>
+            <a:ext cx="1149480" cy="681480"/>
           </a:xfrm>
           <a:prstGeom prst="ellipse">
             <a:avLst/>
@@ -10484,7 +11012,7 @@
         <p:spPr>
           <a:xfrm>
             <a:off x="1512720" y="2160720"/>
-            <a:ext cx="1149840" cy="681840"/>
+            <a:ext cx="1149480" cy="681480"/>
           </a:xfrm>
           <a:prstGeom prst="ellipse">
             <a:avLst/>
@@ -10620,7 +11148,7 @@
         <p:spPr>
           <a:xfrm>
             <a:off x="4500000" y="2376000"/>
-            <a:ext cx="1401840" cy="600120"/>
+            <a:ext cx="1401480" cy="599760"/>
           </a:xfrm>
           <a:prstGeom prst="rect">
             <a:avLst/>
@@ -10671,7 +11199,7 @@
         <p:spPr>
           <a:xfrm>
             <a:off x="4320000" y="3204360"/>
-            <a:ext cx="1401840" cy="600120"/>
+            <a:ext cx="1401480" cy="599760"/>
           </a:xfrm>
           <a:prstGeom prst="rect">
             <a:avLst/>
@@ -10752,7 +11280,7 @@
         <p:spPr>
           <a:xfrm>
             <a:off x="504000" y="576000"/>
-            <a:ext cx="430200" cy="1654200"/>
+            <a:ext cx="429840" cy="1653840"/>
           </a:xfrm>
           <a:prstGeom prst="ellipse">
             <a:avLst/>
@@ -10782,7 +11310,7 @@
         <p:spPr>
           <a:xfrm>
             <a:off x="1440360" y="576360"/>
-            <a:ext cx="430200" cy="1654200"/>
+            <a:ext cx="429840" cy="1653840"/>
           </a:xfrm>
           <a:prstGeom prst="ellipse">
             <a:avLst/>
@@ -10812,7 +11340,7 @@
         <p:spPr>
           <a:xfrm>
             <a:off x="3204720" y="612720"/>
-            <a:ext cx="430200" cy="1654200"/>
+            <a:ext cx="429840" cy="1653840"/>
           </a:xfrm>
           <a:prstGeom prst="ellipse">
             <a:avLst/>
@@ -10842,7 +11370,7 @@
         <p:spPr>
           <a:xfrm>
             <a:off x="4068720" y="576720"/>
-            <a:ext cx="430200" cy="1654200"/>
+            <a:ext cx="429840" cy="1653840"/>
           </a:xfrm>
           <a:prstGeom prst="ellipse">
             <a:avLst/>
@@ -10872,7 +11400,7 @@
         <p:spPr>
           <a:xfrm>
             <a:off x="504720" y="3204720"/>
-            <a:ext cx="430200" cy="1654200"/>
+            <a:ext cx="429840" cy="1653840"/>
           </a:xfrm>
           <a:prstGeom prst="ellipse">
             <a:avLst/>
@@ -10902,7 +11430,7 @@
         <p:spPr>
           <a:xfrm>
             <a:off x="1440720" y="3168720"/>
-            <a:ext cx="430200" cy="1654200"/>
+            <a:ext cx="429840" cy="1653840"/>
           </a:xfrm>
           <a:prstGeom prst="ellipse">
             <a:avLst/>
@@ -10932,7 +11460,7 @@
         <p:spPr>
           <a:xfrm>
             <a:off x="3240720" y="3168720"/>
-            <a:ext cx="430200" cy="1654200"/>
+            <a:ext cx="429840" cy="1653840"/>
           </a:xfrm>
           <a:prstGeom prst="ellipse">
             <a:avLst/>
@@ -10962,7 +11490,7 @@
         <p:spPr>
           <a:xfrm>
             <a:off x="4068720" y="3168720"/>
-            <a:ext cx="430200" cy="1654200"/>
+            <a:ext cx="429840" cy="1653840"/>
           </a:xfrm>
           <a:prstGeom prst="ellipse">
             <a:avLst/>
@@ -10992,7 +11520,7 @@
         <p:spPr>
           <a:xfrm>
             <a:off x="540000" y="936000"/>
-            <a:ext cx="502200" cy="344520"/>
+            <a:ext cx="501840" cy="344160"/>
           </a:xfrm>
           <a:prstGeom prst="rect">
             <a:avLst/>
@@ -11043,7 +11571,7 @@
         <p:spPr>
           <a:xfrm>
             <a:off x="540000" y="1512000"/>
-            <a:ext cx="502200" cy="344520"/>
+            <a:ext cx="501840" cy="344160"/>
           </a:xfrm>
           <a:prstGeom prst="rect">
             <a:avLst/>
@@ -11094,7 +11622,7 @@
         <p:spPr>
           <a:xfrm>
             <a:off x="1512000" y="1512000"/>
-            <a:ext cx="502200" cy="344520"/>
+            <a:ext cx="501840" cy="344160"/>
           </a:xfrm>
           <a:prstGeom prst="rect">
             <a:avLst/>
@@ -11145,7 +11673,7 @@
         <p:spPr>
           <a:xfrm>
             <a:off x="1512000" y="900000"/>
-            <a:ext cx="502200" cy="344520"/>
+            <a:ext cx="501840" cy="344160"/>
           </a:xfrm>
           <a:prstGeom prst="rect">
             <a:avLst/>
@@ -11196,7 +11724,7 @@
         <p:spPr>
           <a:xfrm>
             <a:off x="540000" y="1260000"/>
-            <a:ext cx="502200" cy="344520"/>
+            <a:ext cx="501840" cy="344160"/>
           </a:xfrm>
           <a:prstGeom prst="rect">
             <a:avLst/>
@@ -11247,7 +11775,7 @@
         <p:spPr>
           <a:xfrm>
             <a:off x="1512000" y="1224000"/>
-            <a:ext cx="502200" cy="344520"/>
+            <a:ext cx="501840" cy="344160"/>
           </a:xfrm>
           <a:prstGeom prst="rect">
             <a:avLst/>
@@ -11298,7 +11826,7 @@
         <p:spPr>
           <a:xfrm>
             <a:off x="3240000" y="900000"/>
-            <a:ext cx="502200" cy="344520"/>
+            <a:ext cx="501840" cy="344160"/>
           </a:xfrm>
           <a:prstGeom prst="rect">
             <a:avLst/>
@@ -11349,7 +11877,7 @@
         <p:spPr>
           <a:xfrm>
             <a:off x="4104000" y="900000"/>
-            <a:ext cx="502200" cy="344520"/>
+            <a:ext cx="501840" cy="344160"/>
           </a:xfrm>
           <a:prstGeom prst="rect">
             <a:avLst/>
@@ -11400,7 +11928,7 @@
         <p:spPr>
           <a:xfrm>
             <a:off x="4104000" y="1224000"/>
-            <a:ext cx="502200" cy="344520"/>
+            <a:ext cx="501840" cy="344160"/>
           </a:xfrm>
           <a:prstGeom prst="rect">
             <a:avLst/>
@@ -11451,7 +11979,7 @@
         <p:spPr>
           <a:xfrm>
             <a:off x="4104000" y="1620000"/>
-            <a:ext cx="502200" cy="344520"/>
+            <a:ext cx="501840" cy="344160"/>
           </a:xfrm>
           <a:prstGeom prst="rect">
             <a:avLst/>
@@ -11502,7 +12030,7 @@
         <p:spPr>
           <a:xfrm>
             <a:off x="576000" y="3492000"/>
-            <a:ext cx="502200" cy="344520"/>
+            <a:ext cx="501840" cy="344160"/>
           </a:xfrm>
           <a:prstGeom prst="rect">
             <a:avLst/>
@@ -11553,7 +12081,7 @@
         <p:spPr>
           <a:xfrm>
             <a:off x="576000" y="3852000"/>
-            <a:ext cx="502200" cy="344520"/>
+            <a:ext cx="501840" cy="344160"/>
           </a:xfrm>
           <a:prstGeom prst="rect">
             <a:avLst/>
@@ -11604,7 +12132,7 @@
         <p:spPr>
           <a:xfrm>
             <a:off x="576000" y="4176000"/>
-            <a:ext cx="502200" cy="344520"/>
+            <a:ext cx="501840" cy="344160"/>
           </a:xfrm>
           <a:prstGeom prst="rect">
             <a:avLst/>
@@ -11655,7 +12183,7 @@
         <p:spPr>
           <a:xfrm>
             <a:off x="1476000" y="3492000"/>
-            <a:ext cx="502200" cy="344520"/>
+            <a:ext cx="501840" cy="344160"/>
           </a:xfrm>
           <a:prstGeom prst="rect">
             <a:avLst/>
@@ -11706,7 +12234,7 @@
         <p:spPr>
           <a:xfrm>
             <a:off x="3240000" y="3492000"/>
-            <a:ext cx="502200" cy="344520"/>
+            <a:ext cx="501840" cy="344160"/>
           </a:xfrm>
           <a:prstGeom prst="rect">
             <a:avLst/>
@@ -11757,7 +12285,7 @@
         <p:spPr>
           <a:xfrm>
             <a:off x="3276000" y="3960000"/>
-            <a:ext cx="502200" cy="344520"/>
+            <a:ext cx="501840" cy="344160"/>
           </a:xfrm>
           <a:prstGeom prst="rect">
             <a:avLst/>
@@ -11808,7 +12336,7 @@
         <p:spPr>
           <a:xfrm>
             <a:off x="4140000" y="3492000"/>
-            <a:ext cx="502200" cy="344520"/>
+            <a:ext cx="501840" cy="344160"/>
           </a:xfrm>
           <a:prstGeom prst="rect">
             <a:avLst/>
@@ -11859,7 +12387,7 @@
         <p:spPr>
           <a:xfrm>
             <a:off x="4140000" y="3924000"/>
-            <a:ext cx="502200" cy="344520"/>
+            <a:ext cx="501840" cy="344160"/>
           </a:xfrm>
           <a:prstGeom prst="rect">
             <a:avLst/>
@@ -12207,7 +12735,7 @@
         <p:spPr>
           <a:xfrm>
             <a:off x="540000" y="2412000"/>
-            <a:ext cx="1294200" cy="344520"/>
+            <a:ext cx="1293840" cy="344160"/>
           </a:xfrm>
           <a:prstGeom prst="rect">
             <a:avLst/>
@@ -12258,7 +12786,7 @@
         <p:spPr>
           <a:xfrm>
             <a:off x="3168000" y="2412000"/>
-            <a:ext cx="1438200" cy="394200"/>
+            <a:ext cx="1437840" cy="393840"/>
           </a:xfrm>
           <a:prstGeom prst="rect">
             <a:avLst/>
@@ -12309,7 +12837,7 @@
         <p:spPr>
           <a:xfrm>
             <a:off x="3168000" y="4968000"/>
-            <a:ext cx="1582200" cy="358200"/>
+            <a:ext cx="1581840" cy="357840"/>
           </a:xfrm>
           <a:prstGeom prst="rect">
             <a:avLst/>
@@ -12360,7 +12888,7 @@
         <p:spPr>
           <a:xfrm>
             <a:off x="504000" y="4968000"/>
-            <a:ext cx="1438200" cy="358200"/>
+            <a:ext cx="1437840" cy="357840"/>
           </a:xfrm>
           <a:prstGeom prst="rect">
             <a:avLst/>
@@ -12441,7 +12969,7 @@
         <p:spPr>
           <a:xfrm>
             <a:off x="1872000" y="1008000"/>
-            <a:ext cx="2086560" cy="790560"/>
+            <a:ext cx="2086200" cy="790200"/>
           </a:xfrm>
           <a:prstGeom prst="rect">
             <a:avLst/>
@@ -12471,7 +12999,7 @@
         <p:spPr>
           <a:xfrm>
             <a:off x="5328000" y="756000"/>
-            <a:ext cx="1654560" cy="1222560"/>
+            <a:ext cx="1654200" cy="1222200"/>
           </a:xfrm>
           <a:custGeom>
             <a:avLst/>
@@ -12524,7 +13052,7 @@
         <p:spPr>
           <a:xfrm>
             <a:off x="1872360" y="3672360"/>
-            <a:ext cx="2086560" cy="790560"/>
+            <a:ext cx="2086200" cy="790200"/>
           </a:xfrm>
           <a:prstGeom prst="rect">
             <a:avLst/>
@@ -12554,7 +13082,7 @@
         <p:spPr>
           <a:xfrm>
             <a:off x="5328360" y="3420360"/>
-            <a:ext cx="1654560" cy="1222560"/>
+            <a:ext cx="1654200" cy="1222200"/>
           </a:xfrm>
           <a:custGeom>
             <a:avLst/>
@@ -12662,7 +13190,7 @@
         <p:spPr>
           <a:xfrm>
             <a:off x="1188000" y="2304000"/>
-            <a:ext cx="6910560" cy="344880"/>
+            <a:ext cx="6910200" cy="344520"/>
           </a:xfrm>
           <a:prstGeom prst="rect">
             <a:avLst/>
@@ -12713,7 +13241,7 @@
         <p:spPr>
           <a:xfrm>
             <a:off x="1080000" y="4788000"/>
-            <a:ext cx="7162560" cy="600840"/>
+            <a:ext cx="7162200" cy="600480"/>
           </a:xfrm>
           <a:prstGeom prst="rect">
             <a:avLst/>
@@ -12794,7 +13322,7 @@
         <p:spPr>
           <a:xfrm>
             <a:off x="1908000" y="2232000"/>
-            <a:ext cx="1437840" cy="789840"/>
+            <a:ext cx="1437480" cy="789480"/>
           </a:xfrm>
           <a:prstGeom prst="rect">
             <a:avLst/>
@@ -12849,7 +13377,7 @@
         <p:spPr>
           <a:xfrm>
             <a:off x="6084000" y="2232000"/>
-            <a:ext cx="1437840" cy="789840"/>
+            <a:ext cx="1437480" cy="789480"/>
           </a:xfrm>
           <a:prstGeom prst="rect">
             <a:avLst/>
@@ -12904,7 +13432,7 @@
         <p:spPr>
           <a:xfrm>
             <a:off x="4032000" y="1944000"/>
-            <a:ext cx="1437840" cy="1365840"/>
+            <a:ext cx="1437480" cy="1365480"/>
           </a:xfrm>
           <a:custGeom>
             <a:avLst/>
@@ -13111,7 +13639,7 @@
         <p:spPr>
           <a:xfrm>
             <a:off x="2592000" y="3636000"/>
-            <a:ext cx="7126560" cy="600840"/>
+            <a:ext cx="7126200" cy="600480"/>
           </a:xfrm>
           <a:prstGeom prst="rect">
             <a:avLst/>
@@ -13212,7 +13740,7 @@
         <p:spPr>
           <a:xfrm>
             <a:off x="5934960" y="2130480"/>
-            <a:ext cx="1696320" cy="1007280"/>
+            <a:ext cx="1695960" cy="1006920"/>
           </a:xfrm>
           <a:prstGeom prst="rect">
             <a:avLst/>
@@ -13242,7 +13770,7 @@
         <p:spPr>
           <a:xfrm>
             <a:off x="1908000" y="2232000"/>
-            <a:ext cx="1437840" cy="789840"/>
+            <a:ext cx="1437480" cy="789480"/>
           </a:xfrm>
           <a:prstGeom prst="rect">
             <a:avLst/>
@@ -13297,7 +13825,7 @@
         <p:spPr>
           <a:xfrm>
             <a:off x="6084000" y="2232000"/>
-            <a:ext cx="1437840" cy="789840"/>
+            <a:ext cx="1437480" cy="789480"/>
           </a:xfrm>
           <a:prstGeom prst="rect">
             <a:avLst/>
@@ -13352,7 +13880,7 @@
         <p:spPr>
           <a:xfrm>
             <a:off x="4032000" y="1944000"/>
-            <a:ext cx="1437840" cy="1365840"/>
+            <a:ext cx="1437480" cy="1365480"/>
           </a:xfrm>
           <a:custGeom>
             <a:avLst/>
@@ -13511,7 +14039,7 @@
         <p:spPr>
           <a:xfrm>
             <a:off x="1764000" y="3564000"/>
-            <a:ext cx="7126560" cy="600840"/>
+            <a:ext cx="7126200" cy="600480"/>
           </a:xfrm>
           <a:prstGeom prst="rect">
             <a:avLst/>
@@ -13619,7 +14147,7 @@
         <p:spPr>
           <a:xfrm>
             <a:off x="1945800" y="3636000"/>
-            <a:ext cx="1437840" cy="789840"/>
+            <a:ext cx="1437480" cy="789480"/>
           </a:xfrm>
           <a:prstGeom prst="rect">
             <a:avLst/>
@@ -13694,7 +14222,7 @@
         <p:spPr>
           <a:xfrm>
             <a:off x="6300000" y="3673800"/>
-            <a:ext cx="1437840" cy="789840"/>
+            <a:ext cx="1437480" cy="789480"/>
           </a:xfrm>
           <a:prstGeom prst="rect">
             <a:avLst/>
@@ -13823,7 +14351,7 @@
         <p:spPr>
           <a:xfrm>
             <a:off x="1764000" y="4860000"/>
-            <a:ext cx="7126560" cy="600840"/>
+            <a:ext cx="7126200" cy="600480"/>
           </a:xfrm>
           <a:prstGeom prst="rect">
             <a:avLst/>
@@ -13849,7 +14377,7 @@
         <p:spPr>
           <a:xfrm>
             <a:off x="4140000" y="1080000"/>
-            <a:ext cx="1437840" cy="789840"/>
+            <a:ext cx="1437480" cy="789480"/>
           </a:xfrm>
           <a:prstGeom prst="rect">
             <a:avLst/>
@@ -13904,7 +14432,7 @@
         <p:spPr>
           <a:xfrm>
             <a:off x="4392000" y="2267640"/>
-            <a:ext cx="935640" cy="1007640"/>
+            <a:ext cx="935280" cy="1007280"/>
           </a:xfrm>
           <a:custGeom>
             <a:avLst/>
@@ -13953,7 +14481,7 @@
         <p:spPr>
           <a:xfrm>
             <a:off x="4572000" y="2304000"/>
-            <a:ext cx="647640" cy="345960"/>
+            <a:ext cx="647280" cy="345600"/>
           </a:xfrm>
           <a:prstGeom prst="rect">
             <a:avLst/>
@@ -13981,7 +14509,11 @@
             </a:pPr>
             <a:r>
               <a:rPr b="0" lang="en-IN" sz="1800" spc="-1" strike="noStrike">
-                <a:latin typeface="Arial"/>
+                <a:solidFill>
+                  <a:srgbClr val="000000"/>
+                </a:solidFill>
+                <a:latin typeface="Arial"/>
+                <a:ea typeface="DejaVu Sans"/>
               </a:rPr>
               <a:t>IS A</a:t>
             </a:r>
@@ -14081,7 +14613,7 @@
         <p:spPr>
           <a:xfrm>
             <a:off x="2592000" y="432000"/>
-            <a:ext cx="1151640" cy="503640"/>
+            <a:ext cx="1151280" cy="503280"/>
           </a:xfrm>
           <a:prstGeom prst="ellipse">
             <a:avLst/>
@@ -14136,7 +14668,7 @@
         <p:spPr>
           <a:xfrm>
             <a:off x="4104360" y="360360"/>
-            <a:ext cx="1151640" cy="503640"/>
+            <a:ext cx="1151280" cy="503280"/>
           </a:xfrm>
           <a:prstGeom prst="ellipse">
             <a:avLst/>
@@ -14191,7 +14723,7 @@
         <p:spPr>
           <a:xfrm>
             <a:off x="5652720" y="432720"/>
-            <a:ext cx="1151640" cy="503640"/>
+            <a:ext cx="1151280" cy="503280"/>
           </a:xfrm>
           <a:prstGeom prst="ellipse">
             <a:avLst/>
@@ -14246,7 +14778,7 @@
         <p:spPr>
           <a:xfrm>
             <a:off x="3813480" y="4321080"/>
-            <a:ext cx="1151640" cy="503640"/>
+            <a:ext cx="1151280" cy="503280"/>
           </a:xfrm>
           <a:prstGeom prst="ellipse">
             <a:avLst/>
@@ -14301,7 +14833,7 @@
         <p:spPr>
           <a:xfrm>
             <a:off x="2193840" y="4717440"/>
-            <a:ext cx="1151640" cy="503640"/>
+            <a:ext cx="1151280" cy="503280"/>
           </a:xfrm>
           <a:prstGeom prst="ellipse">
             <a:avLst/>
@@ -14356,7 +14888,7 @@
         <p:spPr>
           <a:xfrm>
             <a:off x="682200" y="4501800"/>
-            <a:ext cx="1151640" cy="503640"/>
+            <a:ext cx="1151280" cy="503280"/>
           </a:xfrm>
           <a:prstGeom prst="ellipse">
             <a:avLst/>
@@ -14411,7 +14943,7 @@
         <p:spPr>
           <a:xfrm>
             <a:off x="5434560" y="4574160"/>
-            <a:ext cx="1151640" cy="503640"/>
+            <a:ext cx="1151280" cy="503280"/>
           </a:xfrm>
           <a:prstGeom prst="ellipse">
             <a:avLst/>
@@ -14466,7 +14998,7 @@
         <p:spPr>
           <a:xfrm>
             <a:off x="7634160" y="4574520"/>
-            <a:ext cx="1151640" cy="503640"/>
+            <a:ext cx="1151280" cy="503280"/>
           </a:xfrm>
           <a:prstGeom prst="ellipse">
             <a:avLst/>
@@ -14521,7 +15053,7 @@
         <p:spPr>
           <a:xfrm>
             <a:off x="686520" y="3098880"/>
-            <a:ext cx="1151640" cy="503640"/>
+            <a:ext cx="1151280" cy="503280"/>
           </a:xfrm>
           <a:prstGeom prst="ellipse">
             <a:avLst/>
@@ -14849,7 +15381,7 @@
         <p:spPr>
           <a:xfrm>
             <a:off x="432000" y="72000"/>
-            <a:ext cx="9071640" cy="2519640"/>
+            <a:ext cx="9071280" cy="2519280"/>
           </a:xfrm>
           <a:prstGeom prst="rect">
             <a:avLst/>
@@ -14879,7 +15411,7 @@
         <p:spPr>
           <a:xfrm>
             <a:off x="2016000" y="1188000"/>
-            <a:ext cx="1437840" cy="789840"/>
+            <a:ext cx="1437480" cy="789480"/>
           </a:xfrm>
           <a:prstGeom prst="rect">
             <a:avLst/>
@@ -14934,7 +15466,7 @@
         <p:spPr>
           <a:xfrm>
             <a:off x="6192000" y="1188000"/>
-            <a:ext cx="1437840" cy="789840"/>
+            <a:ext cx="1437480" cy="789480"/>
           </a:xfrm>
           <a:prstGeom prst="rect">
             <a:avLst/>
@@ -14989,7 +15521,7 @@
         <p:spPr>
           <a:xfrm>
             <a:off x="4140000" y="900000"/>
-            <a:ext cx="1437840" cy="1365840"/>
+            <a:ext cx="1437480" cy="1365480"/>
           </a:xfrm>
           <a:custGeom>
             <a:avLst/>
@@ -15148,7 +15680,7 @@
         <p:spPr>
           <a:xfrm>
             <a:off x="-36000" y="3384000"/>
-            <a:ext cx="2627640" cy="600840"/>
+            <a:ext cx="2627280" cy="600480"/>
           </a:xfrm>
           <a:prstGeom prst="rect">
             <a:avLst/>
@@ -15226,7 +15758,7 @@
         <p:spPr>
           <a:xfrm>
             <a:off x="5868360" y="180360"/>
-            <a:ext cx="1151640" cy="503640"/>
+            <a:ext cx="1151280" cy="503280"/>
           </a:xfrm>
           <a:prstGeom prst="ellipse">
             <a:avLst/>
@@ -15281,7 +15813,7 @@
         <p:spPr>
           <a:xfrm>
             <a:off x="7344720" y="216720"/>
-            <a:ext cx="1151640" cy="503640"/>
+            <a:ext cx="1151280" cy="503280"/>
           </a:xfrm>
           <a:prstGeom prst="ellipse">
             <a:avLst/>
@@ -15336,7 +15868,7 @@
         <p:spPr>
           <a:xfrm>
             <a:off x="7921080" y="937080"/>
-            <a:ext cx="1151640" cy="503640"/>
+            <a:ext cx="1151280" cy="503280"/>
           </a:xfrm>
           <a:prstGeom prst="ellipse">
             <a:avLst/>
@@ -15391,7 +15923,7 @@
         <p:spPr>
           <a:xfrm>
             <a:off x="7921440" y="1693440"/>
-            <a:ext cx="1151640" cy="503640"/>
+            <a:ext cx="1151280" cy="503280"/>
           </a:xfrm>
           <a:prstGeom prst="ellipse">
             <a:avLst/>
@@ -15446,7 +15978,7 @@
         <p:spPr>
           <a:xfrm>
             <a:off x="7921440" y="937440"/>
-            <a:ext cx="1151640" cy="503640"/>
+            <a:ext cx="1151280" cy="503280"/>
           </a:xfrm>
           <a:prstGeom prst="ellipse">
             <a:avLst/>
@@ -15501,7 +16033,7 @@
         <p:spPr>
           <a:xfrm>
             <a:off x="2089440" y="433440"/>
-            <a:ext cx="1151640" cy="503640"/>
+            <a:ext cx="1151280" cy="503280"/>
           </a:xfrm>
           <a:prstGeom prst="ellipse">
             <a:avLst/>
@@ -15556,7 +16088,7 @@
         <p:spPr>
           <a:xfrm>
             <a:off x="649800" y="541800"/>
-            <a:ext cx="1151640" cy="503640"/>
+            <a:ext cx="1151280" cy="503280"/>
           </a:xfrm>
           <a:prstGeom prst="ellipse">
             <a:avLst/>
@@ -15611,7 +16143,7 @@
         <p:spPr>
           <a:xfrm>
             <a:off x="4320000" y="3168000"/>
-            <a:ext cx="1041840" cy="791640"/>
+            <a:ext cx="1041480" cy="791280"/>
           </a:xfrm>
           <a:custGeom>
             <a:avLst/>
@@ -15689,7 +16221,7 @@
         <p:spPr>
           <a:xfrm>
             <a:off x="4176000" y="4428000"/>
-            <a:ext cx="1437840" cy="789840"/>
+            <a:ext cx="1437480" cy="789480"/>
           </a:xfrm>
           <a:prstGeom prst="rect">
             <a:avLst/>
@@ -15825,7 +16357,7 @@
         <p:spPr>
           <a:xfrm>
             <a:off x="5870160" y="3782160"/>
-            <a:ext cx="1151640" cy="503640"/>
+            <a:ext cx="1151280" cy="503280"/>
           </a:xfrm>
           <a:prstGeom prst="ellipse">
             <a:avLst/>
@@ -15880,7 +16412,7 @@
         <p:spPr>
           <a:xfrm>
             <a:off x="7380000" y="3115440"/>
-            <a:ext cx="2627640" cy="600840"/>
+            <a:ext cx="2627280" cy="600480"/>
           </a:xfrm>
           <a:prstGeom prst="rect">
             <a:avLst/>

</xml_diff>

<commit_message>
DBMS: File Systems - 1
</commit_message>
<xml_diff>
--- a/GATE/images/gate_images.pptx
+++ b/GATE/images/gate_images.pptx
@@ -20,6 +20,10 @@
     <p:sldId id="268" r:id="rId15"/>
     <p:sldId id="269" r:id="rId16"/>
     <p:sldId id="270" r:id="rId17"/>
+    <p:sldId id="271" r:id="rId18"/>
+    <p:sldId id="272" r:id="rId19"/>
+    <p:sldId id="273" r:id="rId20"/>
+    <p:sldId id="274" r:id="rId21"/>
   </p:sldIdLst>
   <p:sldSz cx="10080625" cy="5670550"/>
   <p:notesSz cx="7559675" cy="10691812"/>
@@ -1661,7 +1665,7 @@
         <p:spPr>
           <a:xfrm>
             <a:off x="1836000" y="1332000"/>
-            <a:ext cx="2372400" cy="788400"/>
+            <a:ext cx="2371680" cy="787680"/>
           </a:xfrm>
           <a:prstGeom prst="rect">
             <a:avLst/>
@@ -1716,7 +1720,7 @@
         <p:spPr>
           <a:xfrm>
             <a:off x="1836000" y="2880000"/>
-            <a:ext cx="2372400" cy="788400"/>
+            <a:ext cx="2371680" cy="787680"/>
           </a:xfrm>
           <a:prstGeom prst="rect">
             <a:avLst/>
@@ -1781,7 +1785,7 @@
         <p:spPr>
           <a:xfrm>
             <a:off x="1836000" y="4176000"/>
-            <a:ext cx="2372400" cy="788400"/>
+            <a:ext cx="2371680" cy="787680"/>
           </a:xfrm>
           <a:prstGeom prst="rect">
             <a:avLst/>
@@ -1856,7 +1860,7 @@
         <p:spPr>
           <a:xfrm>
             <a:off x="5292000" y="900000"/>
-            <a:ext cx="2372400" cy="1508400"/>
+            <a:ext cx="2371680" cy="1507680"/>
           </a:xfrm>
           <a:prstGeom prst="rect">
             <a:avLst/>
@@ -1991,7 +1995,7 @@
         <p:spPr>
           <a:xfrm>
             <a:off x="5292000" y="2571480"/>
-            <a:ext cx="2372400" cy="1276920"/>
+            <a:ext cx="2371680" cy="1276200"/>
           </a:xfrm>
           <a:prstGeom prst="rect">
             <a:avLst/>
@@ -2106,7 +2110,7 @@
         <p:spPr>
           <a:xfrm>
             <a:off x="5292000" y="4047480"/>
-            <a:ext cx="2372400" cy="1024920"/>
+            <a:ext cx="2371680" cy="1024200"/>
           </a:xfrm>
           <a:prstGeom prst="rect">
             <a:avLst/>
@@ -2285,7 +2289,7 @@
         <p:spPr>
           <a:xfrm>
             <a:off x="2988000" y="360000"/>
-            <a:ext cx="4388400" cy="342720"/>
+            <a:ext cx="4387680" cy="342000"/>
           </a:xfrm>
           <a:prstGeom prst="rect">
             <a:avLst/>
@@ -2366,7 +2370,7 @@
         <p:spPr>
           <a:xfrm>
             <a:off x="1440000" y="720000"/>
-            <a:ext cx="6766560" cy="1798560"/>
+            <a:ext cx="6765840" cy="1797840"/>
           </a:xfrm>
           <a:prstGeom prst="rect">
             <a:avLst/>
@@ -2396,7 +2400,7 @@
         <p:spPr>
           <a:xfrm>
             <a:off x="2016000" y="1188000"/>
-            <a:ext cx="1436760" cy="788760"/>
+            <a:ext cx="1436040" cy="788040"/>
           </a:xfrm>
           <a:prstGeom prst="rect">
             <a:avLst/>
@@ -2451,7 +2455,7 @@
         <p:spPr>
           <a:xfrm>
             <a:off x="6192000" y="1188000"/>
-            <a:ext cx="1436760" cy="788760"/>
+            <a:ext cx="1436040" cy="788040"/>
           </a:xfrm>
           <a:prstGeom prst="rect">
             <a:avLst/>
@@ -2506,7 +2510,7 @@
         <p:spPr>
           <a:xfrm>
             <a:off x="4140000" y="900000"/>
-            <a:ext cx="1436760" cy="1364760"/>
+            <a:ext cx="1436040" cy="1364040"/>
           </a:xfrm>
           <a:custGeom>
             <a:avLst/>
@@ -2692,7 +2696,7 @@
         <p:spPr>
           <a:xfrm>
             <a:off x="4320000" y="3168000"/>
-            <a:ext cx="1040760" cy="790560"/>
+            <a:ext cx="1040040" cy="789840"/>
           </a:xfrm>
           <a:custGeom>
             <a:avLst/>
@@ -2770,7 +2774,7 @@
         <p:spPr>
           <a:xfrm>
             <a:off x="4176000" y="4428000"/>
-            <a:ext cx="1436760" cy="788760"/>
+            <a:ext cx="1436040" cy="788040"/>
           </a:xfrm>
           <a:prstGeom prst="rect">
             <a:avLst/>
@@ -2852,7 +2856,7 @@
         <p:spPr>
           <a:xfrm>
             <a:off x="5870160" y="3314160"/>
-            <a:ext cx="1150560" cy="502560"/>
+            <a:ext cx="1149840" cy="501840"/>
           </a:xfrm>
           <a:prstGeom prst="ellipse">
             <a:avLst/>
@@ -2991,7 +2995,7 @@
         <p:spPr>
           <a:xfrm>
             <a:off x="1944000" y="900000"/>
-            <a:ext cx="1436760" cy="788760"/>
+            <a:ext cx="1436040" cy="788040"/>
           </a:xfrm>
           <a:prstGeom prst="rect">
             <a:avLst/>
@@ -3046,7 +3050,7 @@
         <p:spPr>
           <a:xfrm>
             <a:off x="6120000" y="900000"/>
-            <a:ext cx="1436760" cy="788760"/>
+            <a:ext cx="1436040" cy="788040"/>
           </a:xfrm>
           <a:prstGeom prst="rect">
             <a:avLst/>
@@ -3101,7 +3105,7 @@
         <p:spPr>
           <a:xfrm>
             <a:off x="4068000" y="612000"/>
-            <a:ext cx="1436760" cy="1364760"/>
+            <a:ext cx="1436040" cy="1364040"/>
           </a:xfrm>
           <a:custGeom>
             <a:avLst/>
@@ -3280,7 +3284,7 @@
         <p:spPr>
           <a:xfrm>
             <a:off x="2592000" y="5904000"/>
-            <a:ext cx="7125480" cy="599760"/>
+            <a:ext cx="7124760" cy="599040"/>
           </a:xfrm>
           <a:prstGeom prst="rect">
             <a:avLst/>
@@ -3351,7 +3355,7 @@
         <p:spPr>
           <a:xfrm>
             <a:off x="360000" y="216360"/>
-            <a:ext cx="1150560" cy="502560"/>
+            <a:ext cx="1149840" cy="501840"/>
           </a:xfrm>
           <a:prstGeom prst="ellipse">
             <a:avLst/>
@@ -3406,7 +3410,7 @@
         <p:spPr>
           <a:xfrm>
             <a:off x="1727640" y="216360"/>
-            <a:ext cx="1150560" cy="502560"/>
+            <a:ext cx="1149840" cy="501840"/>
           </a:xfrm>
           <a:prstGeom prst="ellipse">
             <a:avLst/>
@@ -3461,7 +3465,7 @@
         <p:spPr>
           <a:xfrm>
             <a:off x="359280" y="1008360"/>
-            <a:ext cx="1150560" cy="502560"/>
+            <a:ext cx="1149840" cy="501840"/>
           </a:xfrm>
           <a:prstGeom prst="ellipse">
             <a:avLst/>
@@ -3516,7 +3520,7 @@
         <p:spPr>
           <a:xfrm>
             <a:off x="358920" y="1800360"/>
-            <a:ext cx="1150560" cy="502560"/>
+            <a:ext cx="1149840" cy="501840"/>
           </a:xfrm>
           <a:prstGeom prst="ellipse">
             <a:avLst/>
@@ -3571,7 +3575,7 @@
         <p:spPr>
           <a:xfrm>
             <a:off x="1906560" y="1836360"/>
-            <a:ext cx="1150560" cy="502560"/>
+            <a:ext cx="1149840" cy="501840"/>
           </a:xfrm>
           <a:prstGeom prst="ellipse">
             <a:avLst/>
@@ -3626,7 +3630,7 @@
         <p:spPr>
           <a:xfrm>
             <a:off x="4211280" y="360"/>
-            <a:ext cx="1150560" cy="502560"/>
+            <a:ext cx="1149840" cy="501840"/>
           </a:xfrm>
           <a:prstGeom prst="ellipse">
             <a:avLst/>
@@ -3681,7 +3685,7 @@
         <p:spPr>
           <a:xfrm>
             <a:off x="6226920" y="360"/>
-            <a:ext cx="1150560" cy="502560"/>
+            <a:ext cx="1149840" cy="501840"/>
           </a:xfrm>
           <a:prstGeom prst="ellipse">
             <a:avLst/>
@@ -3736,7 +3740,7 @@
         <p:spPr>
           <a:xfrm>
             <a:off x="4210920" y="360"/>
-            <a:ext cx="1150560" cy="502560"/>
+            <a:ext cx="1149840" cy="501840"/>
           </a:xfrm>
           <a:prstGeom prst="ellipse">
             <a:avLst/>
@@ -3791,7 +3795,7 @@
         <p:spPr>
           <a:xfrm>
             <a:off x="7738920" y="252360"/>
-            <a:ext cx="1150560" cy="502560"/>
+            <a:ext cx="1149840" cy="501840"/>
           </a:xfrm>
           <a:prstGeom prst="ellipse">
             <a:avLst/>
@@ -3846,7 +3850,7 @@
         <p:spPr>
           <a:xfrm>
             <a:off x="7810920" y="936360"/>
-            <a:ext cx="1150560" cy="502560"/>
+            <a:ext cx="1149840" cy="501840"/>
           </a:xfrm>
           <a:prstGeom prst="ellipse">
             <a:avLst/>
@@ -5382,7 +5386,7 @@
         <p:spPr>
           <a:xfrm>
             <a:off x="576000" y="4320000"/>
-            <a:ext cx="2446920" cy="345240"/>
+            <a:ext cx="2446200" cy="344520"/>
           </a:xfrm>
           <a:prstGeom prst="rect">
             <a:avLst/>
@@ -5433,7 +5437,7 @@
         <p:spPr>
           <a:xfrm>
             <a:off x="7092000" y="3672000"/>
-            <a:ext cx="2446920" cy="345240"/>
+            <a:ext cx="2446200" cy="344520"/>
           </a:xfrm>
           <a:prstGeom prst="rect">
             <a:avLst/>
@@ -5484,7 +5488,7 @@
         <p:spPr>
           <a:xfrm>
             <a:off x="3744000" y="5328000"/>
-            <a:ext cx="2446920" cy="345240"/>
+            <a:ext cx="2446200" cy="344520"/>
           </a:xfrm>
           <a:prstGeom prst="rect">
             <a:avLst/>
@@ -5565,7 +5569,7 @@
         <p:spPr>
           <a:xfrm>
             <a:off x="5934960" y="1050480"/>
-            <a:ext cx="1695240" cy="1006200"/>
+            <a:ext cx="1694520" cy="1005480"/>
           </a:xfrm>
           <a:prstGeom prst="rect">
             <a:avLst/>
@@ -5595,7 +5599,7 @@
         <p:spPr>
           <a:xfrm>
             <a:off x="1908000" y="1152000"/>
-            <a:ext cx="1436760" cy="788760"/>
+            <a:ext cx="1436040" cy="788040"/>
           </a:xfrm>
           <a:prstGeom prst="rect">
             <a:avLst/>
@@ -5650,7 +5654,7 @@
         <p:spPr>
           <a:xfrm>
             <a:off x="6084000" y="1152000"/>
-            <a:ext cx="1436760" cy="788760"/>
+            <a:ext cx="1436040" cy="788040"/>
           </a:xfrm>
           <a:prstGeom prst="rect">
             <a:avLst/>
@@ -5705,7 +5709,7 @@
         <p:spPr>
           <a:xfrm>
             <a:off x="4032000" y="864000"/>
-            <a:ext cx="1436760" cy="1364760"/>
+            <a:ext cx="1436040" cy="1364040"/>
           </a:xfrm>
           <a:custGeom>
             <a:avLst/>
@@ -5837,7 +5841,7 @@
         <p:spPr>
           <a:xfrm>
             <a:off x="1548000" y="576000"/>
-            <a:ext cx="2122920" cy="466920"/>
+            <a:ext cx="2122200" cy="466200"/>
           </a:xfrm>
           <a:prstGeom prst="rect">
             <a:avLst/>
@@ -5943,7 +5947,7 @@
         <p:spPr>
           <a:xfrm>
             <a:off x="5760000" y="576000"/>
-            <a:ext cx="2122920" cy="466920"/>
+            <a:ext cx="2122200" cy="466200"/>
           </a:xfrm>
           <a:prstGeom prst="rect">
             <a:avLst/>
@@ -5994,7 +5998,7 @@
         <p:spPr>
           <a:xfrm>
             <a:off x="216000" y="2376000"/>
-            <a:ext cx="2122920" cy="2590920"/>
+            <a:ext cx="2122200" cy="2590200"/>
           </a:xfrm>
           <a:prstGeom prst="rect">
             <a:avLst/>
@@ -6703,7 +6707,7 @@
         <p:spPr>
           <a:xfrm>
             <a:off x="1945800" y="3636000"/>
-            <a:ext cx="1436760" cy="788760"/>
+            <a:ext cx="1436040" cy="788040"/>
           </a:xfrm>
           <a:prstGeom prst="rect">
             <a:avLst/>
@@ -6778,7 +6782,7 @@
         <p:spPr>
           <a:xfrm>
             <a:off x="6300000" y="3673800"/>
-            <a:ext cx="1436760" cy="788760"/>
+            <a:ext cx="1436040" cy="788040"/>
           </a:xfrm>
           <a:prstGeom prst="rect">
             <a:avLst/>
@@ -6907,7 +6911,7 @@
         <p:spPr>
           <a:xfrm>
             <a:off x="1764000" y="4860000"/>
-            <a:ext cx="7125480" cy="599760"/>
+            <a:ext cx="7124760" cy="599040"/>
           </a:xfrm>
           <a:prstGeom prst="rect">
             <a:avLst/>
@@ -6933,7 +6937,7 @@
         <p:spPr>
           <a:xfrm>
             <a:off x="4140000" y="1080000"/>
-            <a:ext cx="1436760" cy="788760"/>
+            <a:ext cx="1436040" cy="788040"/>
           </a:xfrm>
           <a:prstGeom prst="rect">
             <a:avLst/>
@@ -6988,7 +6992,7 @@
         <p:spPr>
           <a:xfrm>
             <a:off x="4392000" y="2267640"/>
-            <a:ext cx="934560" cy="1006560"/>
+            <a:ext cx="933840" cy="1005840"/>
           </a:xfrm>
           <a:custGeom>
             <a:avLst/>
@@ -7037,7 +7041,7 @@
         <p:spPr>
           <a:xfrm>
             <a:off x="4572000" y="2304000"/>
-            <a:ext cx="646560" cy="344880"/>
+            <a:ext cx="645840" cy="344160"/>
           </a:xfrm>
           <a:prstGeom prst="rect">
             <a:avLst/>
@@ -7169,7 +7173,7 @@
         <p:spPr>
           <a:xfrm>
             <a:off x="2592000" y="432000"/>
-            <a:ext cx="1150560" cy="502560"/>
+            <a:ext cx="1149840" cy="501840"/>
           </a:xfrm>
           <a:prstGeom prst="ellipse">
             <a:avLst/>
@@ -7224,7 +7228,7 @@
         <p:spPr>
           <a:xfrm>
             <a:off x="4104360" y="360360"/>
-            <a:ext cx="1150560" cy="502560"/>
+            <a:ext cx="1149840" cy="501840"/>
           </a:xfrm>
           <a:prstGeom prst="ellipse">
             <a:avLst/>
@@ -7279,7 +7283,7 @@
         <p:spPr>
           <a:xfrm>
             <a:off x="5652720" y="432720"/>
-            <a:ext cx="1150560" cy="502560"/>
+            <a:ext cx="1149840" cy="501840"/>
           </a:xfrm>
           <a:prstGeom prst="ellipse">
             <a:avLst/>
@@ -7334,7 +7338,7 @@
         <p:spPr>
           <a:xfrm>
             <a:off x="3813480" y="4321080"/>
-            <a:ext cx="1150560" cy="502560"/>
+            <a:ext cx="1149840" cy="501840"/>
           </a:xfrm>
           <a:prstGeom prst="ellipse">
             <a:avLst/>
@@ -7389,7 +7393,7 @@
         <p:spPr>
           <a:xfrm>
             <a:off x="2193840" y="4717440"/>
-            <a:ext cx="1150560" cy="502560"/>
+            <a:ext cx="1149840" cy="501840"/>
           </a:xfrm>
           <a:prstGeom prst="ellipse">
             <a:avLst/>
@@ -7444,7 +7448,7 @@
         <p:spPr>
           <a:xfrm>
             <a:off x="682200" y="4501800"/>
-            <a:ext cx="1150560" cy="502560"/>
+            <a:ext cx="1149840" cy="501840"/>
           </a:xfrm>
           <a:prstGeom prst="ellipse">
             <a:avLst/>
@@ -7499,7 +7503,7 @@
         <p:spPr>
           <a:xfrm>
             <a:off x="5434560" y="4574160"/>
-            <a:ext cx="1150560" cy="502560"/>
+            <a:ext cx="1149840" cy="501840"/>
           </a:xfrm>
           <a:prstGeom prst="ellipse">
             <a:avLst/>
@@ -7554,7 +7558,7 @@
         <p:spPr>
           <a:xfrm>
             <a:off x="7634160" y="4574520"/>
-            <a:ext cx="1150560" cy="502560"/>
+            <a:ext cx="1149840" cy="501840"/>
           </a:xfrm>
           <a:prstGeom prst="ellipse">
             <a:avLst/>
@@ -7609,7 +7613,7 @@
         <p:spPr>
           <a:xfrm>
             <a:off x="686520" y="3098880"/>
-            <a:ext cx="1150560" cy="502560"/>
+            <a:ext cx="1149840" cy="501840"/>
           </a:xfrm>
           <a:prstGeom prst="ellipse">
             <a:avLst/>
@@ -7907,7 +7911,7 @@
         <p:spPr>
           <a:xfrm>
             <a:off x="216000" y="288000"/>
-            <a:ext cx="2374920" cy="2302920"/>
+            <a:ext cx="2374200" cy="2302200"/>
           </a:xfrm>
           <a:prstGeom prst="rect">
             <a:avLst/>
@@ -8028,7 +8032,7 @@
         <p:spPr>
           <a:xfrm>
             <a:off x="1908000" y="936000"/>
-            <a:ext cx="1436760" cy="788760"/>
+            <a:ext cx="1436040" cy="788040"/>
           </a:xfrm>
           <a:prstGeom prst="rect">
             <a:avLst/>
@@ -8083,7 +8087,7 @@
         <p:spPr>
           <a:xfrm>
             <a:off x="6084000" y="936000"/>
-            <a:ext cx="1436760" cy="788760"/>
+            <a:ext cx="1436040" cy="788040"/>
           </a:xfrm>
           <a:prstGeom prst="rect">
             <a:avLst/>
@@ -8138,7 +8142,7 @@
         <p:spPr>
           <a:xfrm>
             <a:off x="4934160" y="4392000"/>
-            <a:ext cx="1436760" cy="788760"/>
+            <a:ext cx="1436040" cy="788040"/>
           </a:xfrm>
           <a:prstGeom prst="rect">
             <a:avLst/>
@@ -8193,7 +8197,7 @@
         <p:spPr>
           <a:xfrm>
             <a:off x="4032000" y="648000"/>
-            <a:ext cx="1436760" cy="1364760"/>
+            <a:ext cx="1436040" cy="1364040"/>
           </a:xfrm>
           <a:custGeom>
             <a:avLst/>
@@ -8291,7 +8295,7 @@
         <p:spPr>
           <a:xfrm>
             <a:off x="1908000" y="3204360"/>
-            <a:ext cx="1436760" cy="1364760"/>
+            <a:ext cx="1436040" cy="1364040"/>
           </a:xfrm>
           <a:custGeom>
             <a:avLst/>
@@ -8443,7 +8447,7 @@
         <p:spPr>
           <a:xfrm>
             <a:off x="4140000" y="2234160"/>
-            <a:ext cx="1150920" cy="572760"/>
+            <a:ext cx="1150200" cy="572040"/>
           </a:xfrm>
           <a:prstGeom prst="ellipse">
             <a:avLst/>
@@ -8498,7 +8502,7 @@
         <p:spPr>
           <a:xfrm>
             <a:off x="3708360" y="3636360"/>
-            <a:ext cx="1078560" cy="572760"/>
+            <a:ext cx="1077840" cy="572040"/>
           </a:xfrm>
           <a:prstGeom prst="ellipse">
             <a:avLst/>
@@ -8607,7 +8611,7 @@
         <p:spPr>
           <a:xfrm>
             <a:off x="504000" y="396000"/>
-            <a:ext cx="1150920" cy="572760"/>
+            <a:ext cx="1150200" cy="572040"/>
           </a:xfrm>
           <a:prstGeom prst="ellipse">
             <a:avLst/>
@@ -8662,7 +8666,7 @@
         <p:spPr>
           <a:xfrm>
             <a:off x="1944000" y="180000"/>
-            <a:ext cx="1150920" cy="572760"/>
+            <a:ext cx="1150200" cy="572040"/>
           </a:xfrm>
           <a:prstGeom prst="ellipse">
             <a:avLst/>
@@ -8717,7 +8721,7 @@
         <p:spPr>
           <a:xfrm>
             <a:off x="288000" y="1152000"/>
-            <a:ext cx="1150920" cy="572760"/>
+            <a:ext cx="1150200" cy="572040"/>
           </a:xfrm>
           <a:prstGeom prst="ellipse">
             <a:avLst/>
@@ -8772,7 +8776,7 @@
         <p:spPr>
           <a:xfrm>
             <a:off x="5940000" y="180000"/>
-            <a:ext cx="1150920" cy="572760"/>
+            <a:ext cx="1150200" cy="572040"/>
           </a:xfrm>
           <a:prstGeom prst="ellipse">
             <a:avLst/>
@@ -8827,7 +8831,7 @@
         <p:spPr>
           <a:xfrm>
             <a:off x="7560000" y="180000"/>
-            <a:ext cx="1150920" cy="572760"/>
+            <a:ext cx="1150200" cy="572040"/>
           </a:xfrm>
           <a:prstGeom prst="ellipse">
             <a:avLst/>
@@ -8882,7 +8886,7 @@
         <p:spPr>
           <a:xfrm>
             <a:off x="7992000" y="972000"/>
-            <a:ext cx="1150920" cy="572760"/>
+            <a:ext cx="1150200" cy="572040"/>
           </a:xfrm>
           <a:prstGeom prst="ellipse">
             <a:avLst/>
@@ -8964,7 +8968,7 @@
         <p:spPr>
           <a:xfrm>
             <a:off x="432000" y="3636360"/>
-            <a:ext cx="1078560" cy="572760"/>
+            <a:ext cx="1077840" cy="572040"/>
           </a:xfrm>
           <a:prstGeom prst="ellipse">
             <a:avLst/>
@@ -9019,7 +9023,7 @@
         <p:spPr>
           <a:xfrm>
             <a:off x="6803640" y="4068360"/>
-            <a:ext cx="1078560" cy="572760"/>
+            <a:ext cx="1077840" cy="572040"/>
           </a:xfrm>
           <a:prstGeom prst="ellipse">
             <a:avLst/>
@@ -9074,7 +9078,7 @@
         <p:spPr>
           <a:xfrm>
             <a:off x="6839280" y="4752360"/>
-            <a:ext cx="1078560" cy="572760"/>
+            <a:ext cx="1077840" cy="572040"/>
           </a:xfrm>
           <a:prstGeom prst="ellipse">
             <a:avLst/>
@@ -9484,7 +9488,7 @@
         <p:spPr>
           <a:xfrm>
             <a:off x="2556000" y="1152000"/>
-            <a:ext cx="4535280" cy="359280"/>
+            <a:ext cx="4534560" cy="358560"/>
           </a:xfrm>
           <a:prstGeom prst="rect">
             <a:avLst/>
@@ -10027,6 +10031,2273 @@
 </p:sld>
 </file>
 
+<file path=ppt/slides/slide16.xml><?xml version="1.0" encoding="utf-8"?>
+<p:sld xmlns:a="http://schemas.openxmlformats.org/drawingml/2006/main" xmlns:p="http://schemas.openxmlformats.org/presentationml/2006/main" xmlns:r="http://schemas.openxmlformats.org/officeDocument/2006/relationships" xmlns:p14="http://schemas.microsoft.com/office/powerpoint/2010/main" xmlns:p15="http://schemas.microsoft.com/office/powerpoint/2012/main" xmlns:mc="http://schemas.openxmlformats.org/markup-compatibility/2006">
+  <p:cSld>
+    <p:spTree>
+      <p:nvGrpSpPr>
+        <p:cNvPr id="1" name=""/>
+        <p:cNvGrpSpPr/>
+        <p:nvPr/>
+      </p:nvGrpSpPr>
+      <p:grpSpPr>
+        <a:xfrm>
+          <a:off x="0" y="0"/>
+          <a:ext cx="0" cy="0"/>
+          <a:chOff x="0" y="0"/>
+          <a:chExt cx="0" cy="0"/>
+        </a:xfrm>
+      </p:grpSpPr>
+      <p:graphicFrame>
+        <p:nvGraphicFramePr>
+          <p:cNvPr id="327" name="Table 1"/>
+          <p:cNvGraphicFramePr/>
+          <p:nvPr/>
+        </p:nvGraphicFramePr>
+        <p:xfrm>
+          <a:off x="648720" y="2534760"/>
+          <a:ext cx="8783640" cy="416880"/>
+        </p:xfrm>
+        <a:graphic>
+          <a:graphicData uri="http://schemas.openxmlformats.org/drawingml/2006/table">
+            <a:tbl>
+              <a:tblPr/>
+              <a:tblGrid>
+                <a:gridCol w="414000"/>
+                <a:gridCol w="2530080"/>
+                <a:gridCol w="312480"/>
+                <a:gridCol w="2440800"/>
+                <a:gridCol w="520920"/>
+                <a:gridCol w="2143080"/>
+                <a:gridCol w="422640"/>
+              </a:tblGrid>
+              <a:tr h="417240">
+                <a:tc>
+                  <a:tcPr marL="90000" marR="90000">
+                    <a:lnL w="720">
+                      <a:solidFill>
+                        <a:srgbClr val="ffffff"/>
+                      </a:solidFill>
+                    </a:lnL>
+                    <a:lnR w="720">
+                      <a:solidFill>
+                        <a:srgbClr val="ffffff"/>
+                      </a:solidFill>
+                    </a:lnR>
+                    <a:lnT w="720">
+                      <a:solidFill>
+                        <a:srgbClr val="ffffff"/>
+                      </a:solidFill>
+                    </a:lnT>
+                    <a:lnB w="720">
+                      <a:solidFill>
+                        <a:srgbClr val="ffffff"/>
+                      </a:solidFill>
+                    </a:lnB>
+                    <a:solidFill>
+                      <a:srgbClr val="b3b3b3"/>
+                    </a:solidFill>
+                  </a:tcPr>
+                </a:tc>
+                <a:tc>
+                  <a:txBody>
+                    <a:bodyPr lIns="90000" rIns="90000">
+                      <a:noAutofit/>
+                    </a:bodyPr>
+                    <a:p>
+                      <a:pPr>
+                        <a:lnSpc>
+                          <a:spcPct val="100000"/>
+                        </a:lnSpc>
+                      </a:pPr>
+                      <a:r>
+                        <a:rPr b="0" lang="en-IN" sz="1800" spc="-1" strike="noStrike">
+                          <a:latin typeface="Arial"/>
+                        </a:rPr>
+                        <a:t>Block B1</a:t>
+                      </a:r>
+                      <a:endParaRPr b="0" lang="en-IN" sz="1800" spc="-1" strike="noStrike">
+                        <a:latin typeface="Arial"/>
+                      </a:endParaRPr>
+                    </a:p>
+                  </a:txBody>
+                  <a:tcPr marL="90000" marR="90000">
+                    <a:lnL w="720">
+                      <a:solidFill>
+                        <a:srgbClr val="ffffff"/>
+                      </a:solidFill>
+                    </a:lnL>
+                    <a:lnR w="720">
+                      <a:solidFill>
+                        <a:srgbClr val="ffffff"/>
+                      </a:solidFill>
+                    </a:lnR>
+                    <a:lnT w="720">
+                      <a:solidFill>
+                        <a:srgbClr val="ffffff"/>
+                      </a:solidFill>
+                    </a:lnT>
+                    <a:lnB w="720">
+                      <a:solidFill>
+                        <a:srgbClr val="ffffff"/>
+                      </a:solidFill>
+                    </a:lnB>
+                    <a:solidFill>
+                      <a:srgbClr val="b3b3b3"/>
+                    </a:solidFill>
+                  </a:tcPr>
+                </a:tc>
+                <a:tc>
+                  <a:tcPr marL="90000" marR="90000">
+                    <a:lnL w="720">
+                      <a:solidFill>
+                        <a:srgbClr val="ffffff"/>
+                      </a:solidFill>
+                    </a:lnL>
+                    <a:lnR w="720">
+                      <a:solidFill>
+                        <a:srgbClr val="ffffff"/>
+                      </a:solidFill>
+                    </a:lnR>
+                    <a:lnT w="720">
+                      <a:solidFill>
+                        <a:srgbClr val="ffffff"/>
+                      </a:solidFill>
+                    </a:lnT>
+                    <a:lnB w="720">
+                      <a:solidFill>
+                        <a:srgbClr val="ffffff"/>
+                      </a:solidFill>
+                    </a:lnB>
+                    <a:solidFill>
+                      <a:srgbClr val="b3b3b3"/>
+                    </a:solidFill>
+                  </a:tcPr>
+                </a:tc>
+                <a:tc>
+                  <a:txBody>
+                    <a:bodyPr lIns="90000" rIns="90000">
+                      <a:noAutofit/>
+                    </a:bodyPr>
+                    <a:p>
+                      <a:pPr>
+                        <a:lnSpc>
+                          <a:spcPct val="100000"/>
+                        </a:lnSpc>
+                      </a:pPr>
+                      <a:r>
+                        <a:rPr b="0" lang="en-IN" sz="1800" spc="-1" strike="noStrike">
+                          <a:latin typeface="Arial"/>
+                        </a:rPr>
+                        <a:t>Block B2</a:t>
+                      </a:r>
+                      <a:endParaRPr b="0" lang="en-IN" sz="1800" spc="-1" strike="noStrike">
+                        <a:latin typeface="Arial"/>
+                      </a:endParaRPr>
+                    </a:p>
+                  </a:txBody>
+                  <a:tcPr marL="90000" marR="90000">
+                    <a:lnL w="720">
+                      <a:solidFill>
+                        <a:srgbClr val="ffffff"/>
+                      </a:solidFill>
+                    </a:lnL>
+                    <a:lnR w="720">
+                      <a:solidFill>
+                        <a:srgbClr val="ffffff"/>
+                      </a:solidFill>
+                    </a:lnR>
+                    <a:lnT w="720">
+                      <a:solidFill>
+                        <a:srgbClr val="ffffff"/>
+                      </a:solidFill>
+                    </a:lnT>
+                    <a:lnB w="720">
+                      <a:solidFill>
+                        <a:srgbClr val="ffffff"/>
+                      </a:solidFill>
+                    </a:lnB>
+                    <a:solidFill>
+                      <a:srgbClr val="b3b3b3"/>
+                    </a:solidFill>
+                  </a:tcPr>
+                </a:tc>
+                <a:tc>
+                  <a:tcPr marL="90000" marR="90000">
+                    <a:lnL w="720">
+                      <a:solidFill>
+                        <a:srgbClr val="ffffff"/>
+                      </a:solidFill>
+                    </a:lnL>
+                    <a:lnR w="720">
+                      <a:solidFill>
+                        <a:srgbClr val="ffffff"/>
+                      </a:solidFill>
+                    </a:lnR>
+                    <a:lnT w="720">
+                      <a:solidFill>
+                        <a:srgbClr val="ffffff"/>
+                      </a:solidFill>
+                    </a:lnT>
+                    <a:lnB w="720">
+                      <a:solidFill>
+                        <a:srgbClr val="ffffff"/>
+                      </a:solidFill>
+                    </a:lnB>
+                    <a:solidFill>
+                      <a:srgbClr val="b3b3b3"/>
+                    </a:solidFill>
+                  </a:tcPr>
+                </a:tc>
+                <a:tc>
+                  <a:txBody>
+                    <a:bodyPr lIns="90000" rIns="90000">
+                      <a:noAutofit/>
+                    </a:bodyPr>
+                    <a:p>
+                      <a:pPr>
+                        <a:lnSpc>
+                          <a:spcPct val="100000"/>
+                        </a:lnSpc>
+                      </a:pPr>
+                      <a:r>
+                        <a:rPr b="0" lang="en-IN" sz="1800" spc="-1" strike="noStrike">
+                          <a:latin typeface="Arial"/>
+                        </a:rPr>
+                        <a:t>Block B3</a:t>
+                      </a:r>
+                      <a:endParaRPr b="0" lang="en-IN" sz="1800" spc="-1" strike="noStrike">
+                        <a:latin typeface="Arial"/>
+                      </a:endParaRPr>
+                    </a:p>
+                  </a:txBody>
+                  <a:tcPr marL="90000" marR="90000">
+                    <a:lnL w="720">
+                      <a:solidFill>
+                        <a:srgbClr val="ffffff"/>
+                      </a:solidFill>
+                    </a:lnL>
+                    <a:lnR w="720">
+                      <a:solidFill>
+                        <a:srgbClr val="ffffff"/>
+                      </a:solidFill>
+                    </a:lnR>
+                    <a:lnT w="720">
+                      <a:solidFill>
+                        <a:srgbClr val="ffffff"/>
+                      </a:solidFill>
+                    </a:lnT>
+                    <a:lnB w="720">
+                      <a:solidFill>
+                        <a:srgbClr val="ffffff"/>
+                      </a:solidFill>
+                    </a:lnB>
+                    <a:solidFill>
+                      <a:srgbClr val="b3b3b3"/>
+                    </a:solidFill>
+                  </a:tcPr>
+                </a:tc>
+                <a:tc>
+                  <a:tcPr marL="90000" marR="90000">
+                    <a:lnL w="720">
+                      <a:solidFill>
+                        <a:srgbClr val="ffffff"/>
+                      </a:solidFill>
+                    </a:lnL>
+                    <a:lnR w="720">
+                      <a:solidFill>
+                        <a:srgbClr val="ffffff"/>
+                      </a:solidFill>
+                    </a:lnR>
+                    <a:lnT w="720">
+                      <a:solidFill>
+                        <a:srgbClr val="ffffff"/>
+                      </a:solidFill>
+                    </a:lnT>
+                    <a:lnB w="720">
+                      <a:solidFill>
+                        <a:srgbClr val="ffffff"/>
+                      </a:solidFill>
+                    </a:lnB>
+                    <a:solidFill>
+                      <a:srgbClr val="b3b3b3"/>
+                    </a:solidFill>
+                  </a:tcPr>
+                </a:tc>
+              </a:tr>
+            </a:tbl>
+          </a:graphicData>
+        </a:graphic>
+      </p:graphicFrame>
+      <p:sp>
+        <p:nvSpPr>
+          <p:cNvPr id="328" name="CustomShape 2"/>
+          <p:cNvSpPr/>
+          <p:nvPr/>
+        </p:nvSpPr>
+        <p:spPr>
+          <a:xfrm>
+            <a:off x="3492000" y="3541680"/>
+            <a:ext cx="3023640" cy="345960"/>
+          </a:xfrm>
+          <a:prstGeom prst="rect">
+            <a:avLst/>
+          </a:prstGeom>
+          <a:noFill/>
+          <a:ln>
+            <a:noFill/>
+          </a:ln>
+        </p:spPr>
+        <p:style>
+          <a:lnRef idx="0"/>
+          <a:fillRef idx="0"/>
+          <a:effectRef idx="0"/>
+          <a:fontRef idx="minor"/>
+        </p:style>
+        <p:txBody>
+          <a:bodyPr lIns="90000" rIns="90000" tIns="45000" bIns="45000">
+            <a:noAutofit/>
+          </a:bodyPr>
+          <a:p>
+            <a:pPr>
+              <a:lnSpc>
+                <a:spcPct val="100000"/>
+              </a:lnSpc>
+            </a:pPr>
+            <a:r>
+              <a:rPr b="0" lang="en-IN" sz="1800" spc="-1" strike="noStrike">
+                <a:latin typeface="Arial"/>
+              </a:rPr>
+              <a:t>Inter block gap</a:t>
+            </a:r>
+            <a:endParaRPr b="0" lang="en-IN" sz="1800" spc="-1" strike="noStrike">
+              <a:latin typeface="Arial"/>
+            </a:endParaRPr>
+          </a:p>
+        </p:txBody>
+      </p:sp>
+      <p:sp>
+        <p:nvSpPr>
+          <p:cNvPr id="329" name="CustomShape 3"/>
+          <p:cNvSpPr/>
+          <p:nvPr/>
+        </p:nvSpPr>
+        <p:spPr>
+          <a:xfrm>
+            <a:off x="144000" y="3564000"/>
+            <a:ext cx="3023640" cy="345960"/>
+          </a:xfrm>
+          <a:prstGeom prst="rect">
+            <a:avLst/>
+          </a:prstGeom>
+          <a:noFill/>
+          <a:ln>
+            <a:noFill/>
+          </a:ln>
+        </p:spPr>
+        <p:style>
+          <a:lnRef idx="0"/>
+          <a:fillRef idx="0"/>
+          <a:effectRef idx="0"/>
+          <a:fontRef idx="minor"/>
+        </p:style>
+        <p:txBody>
+          <a:bodyPr lIns="90000" rIns="90000" tIns="45000" bIns="45000">
+            <a:noAutofit/>
+          </a:bodyPr>
+          <a:p>
+            <a:pPr>
+              <a:lnSpc>
+                <a:spcPct val="100000"/>
+              </a:lnSpc>
+            </a:pPr>
+            <a:r>
+              <a:rPr b="0" lang="en-IN" sz="1800" spc="-1" strike="noStrike">
+                <a:latin typeface="Arial"/>
+              </a:rPr>
+              <a:t>Track Begin</a:t>
+            </a:r>
+            <a:endParaRPr b="0" lang="en-IN" sz="1800" spc="-1" strike="noStrike">
+              <a:latin typeface="Arial"/>
+            </a:endParaRPr>
+          </a:p>
+        </p:txBody>
+      </p:sp>
+      <p:sp>
+        <p:nvSpPr>
+          <p:cNvPr id="330" name="CustomShape 4"/>
+          <p:cNvSpPr/>
+          <p:nvPr/>
+        </p:nvSpPr>
+        <p:spPr>
+          <a:xfrm>
+            <a:off x="7308000" y="3528000"/>
+            <a:ext cx="3023640" cy="345960"/>
+          </a:xfrm>
+          <a:prstGeom prst="rect">
+            <a:avLst/>
+          </a:prstGeom>
+          <a:noFill/>
+          <a:ln>
+            <a:noFill/>
+          </a:ln>
+        </p:spPr>
+        <p:style>
+          <a:lnRef idx="0"/>
+          <a:fillRef idx="0"/>
+          <a:effectRef idx="0"/>
+          <a:fontRef idx="minor"/>
+        </p:style>
+        <p:txBody>
+          <a:bodyPr lIns="90000" rIns="90000" tIns="45000" bIns="45000">
+            <a:noAutofit/>
+          </a:bodyPr>
+          <a:p>
+            <a:pPr>
+              <a:lnSpc>
+                <a:spcPct val="100000"/>
+              </a:lnSpc>
+            </a:pPr>
+            <a:r>
+              <a:rPr b="0" lang="en-IN" sz="1800" spc="-1" strike="noStrike">
+                <a:latin typeface="Arial"/>
+              </a:rPr>
+              <a:t>Track End</a:t>
+            </a:r>
+            <a:endParaRPr b="0" lang="en-IN" sz="1800" spc="-1" strike="noStrike">
+              <a:latin typeface="Arial"/>
+            </a:endParaRPr>
+          </a:p>
+        </p:txBody>
+      </p:sp>
+      <p:sp>
+        <p:nvSpPr>
+          <p:cNvPr id="331" name="Line 5"/>
+          <p:cNvSpPr/>
+          <p:nvPr/>
+        </p:nvSpPr>
+        <p:spPr>
+          <a:xfrm>
+            <a:off x="864000" y="2951640"/>
+            <a:ext cx="0" cy="612360"/>
+          </a:xfrm>
+          <a:prstGeom prst="line">
+            <a:avLst/>
+          </a:prstGeom>
+          <a:ln>
+            <a:solidFill>
+              <a:srgbClr val="3465a4"/>
+            </a:solidFill>
+            <a:tailEnd len="med" type="triangle" w="med"/>
+          </a:ln>
+        </p:spPr>
+        <p:style>
+          <a:lnRef idx="0"/>
+          <a:fillRef idx="0"/>
+          <a:effectRef idx="0"/>
+          <a:fontRef idx="minor"/>
+        </p:style>
+      </p:sp>
+      <p:sp>
+        <p:nvSpPr>
+          <p:cNvPr id="332" name="Line 6"/>
+          <p:cNvSpPr/>
+          <p:nvPr/>
+        </p:nvSpPr>
+        <p:spPr>
+          <a:xfrm>
+            <a:off x="3816000" y="2951640"/>
+            <a:ext cx="432000" cy="590040"/>
+          </a:xfrm>
+          <a:prstGeom prst="line">
+            <a:avLst/>
+          </a:prstGeom>
+          <a:ln>
+            <a:solidFill>
+              <a:srgbClr val="3465a4"/>
+            </a:solidFill>
+            <a:tailEnd len="med" type="triangle" w="med"/>
+          </a:ln>
+        </p:spPr>
+        <p:style>
+          <a:lnRef idx="0"/>
+          <a:fillRef idx="0"/>
+          <a:effectRef idx="0"/>
+          <a:fontRef idx="minor"/>
+        </p:style>
+      </p:sp>
+      <p:sp>
+        <p:nvSpPr>
+          <p:cNvPr id="333" name="Line 7"/>
+          <p:cNvSpPr/>
+          <p:nvPr/>
+        </p:nvSpPr>
+        <p:spPr>
+          <a:xfrm flipH="1">
+            <a:off x="4536000" y="2951640"/>
+            <a:ext cx="2016000" cy="504360"/>
+          </a:xfrm>
+          <a:prstGeom prst="line">
+            <a:avLst/>
+          </a:prstGeom>
+          <a:ln>
+            <a:solidFill>
+              <a:srgbClr val="3465a4"/>
+            </a:solidFill>
+            <a:tailEnd len="med" type="triangle" w="med"/>
+          </a:ln>
+        </p:spPr>
+        <p:style>
+          <a:lnRef idx="0"/>
+          <a:fillRef idx="0"/>
+          <a:effectRef idx="0"/>
+          <a:fontRef idx="minor"/>
+        </p:style>
+      </p:sp>
+      <p:sp>
+        <p:nvSpPr>
+          <p:cNvPr id="334" name="Line 8"/>
+          <p:cNvSpPr/>
+          <p:nvPr/>
+        </p:nvSpPr>
+        <p:spPr>
+          <a:xfrm flipH="1">
+            <a:off x="8280000" y="2951640"/>
+            <a:ext cx="936000" cy="576360"/>
+          </a:xfrm>
+          <a:prstGeom prst="line">
+            <a:avLst/>
+          </a:prstGeom>
+          <a:ln>
+            <a:solidFill>
+              <a:srgbClr val="3465a4"/>
+            </a:solidFill>
+            <a:tailEnd len="med" type="triangle" w="med"/>
+          </a:ln>
+        </p:spPr>
+        <p:style>
+          <a:lnRef idx="0"/>
+          <a:fillRef idx="0"/>
+          <a:effectRef idx="0"/>
+          <a:fontRef idx="minor"/>
+        </p:style>
+      </p:sp>
+    </p:spTree>
+  </p:cSld>
+  <mc:AlternateContent>
+    <mc:Choice Requires="p14">
+      <p:transition spd="slow" p14:dur="2000"/>
+    </mc:Choice>
+    <mc:Fallback>
+      <p:transition spd="slow"/>
+    </mc:Fallback>
+  </mc:AlternateContent>
+</p:sld>
+</file>
+
+<file path=ppt/slides/slide17.xml><?xml version="1.0" encoding="utf-8"?>
+<p:sld xmlns:a="http://schemas.openxmlformats.org/drawingml/2006/main" xmlns:p="http://schemas.openxmlformats.org/presentationml/2006/main" xmlns:r="http://schemas.openxmlformats.org/officeDocument/2006/relationships" xmlns:p14="http://schemas.microsoft.com/office/powerpoint/2010/main" xmlns:p15="http://schemas.microsoft.com/office/powerpoint/2012/main" xmlns:mc="http://schemas.openxmlformats.org/markup-compatibility/2006">
+  <p:cSld>
+    <p:spTree>
+      <p:nvGrpSpPr>
+        <p:cNvPr id="1" name=""/>
+        <p:cNvGrpSpPr/>
+        <p:nvPr/>
+      </p:nvGrpSpPr>
+      <p:grpSpPr>
+        <a:xfrm>
+          <a:off x="0" y="0"/>
+          <a:ext cx="0" cy="0"/>
+          <a:chOff x="0" y="0"/>
+          <a:chExt cx="0" cy="0"/>
+        </a:xfrm>
+      </p:grpSpPr>
+      <p:graphicFrame>
+        <p:nvGraphicFramePr>
+          <p:cNvPr id="335" name="Table 1"/>
+          <p:cNvGraphicFramePr/>
+          <p:nvPr/>
+        </p:nvGraphicFramePr>
+        <p:xfrm>
+          <a:off x="648720" y="2160000"/>
+          <a:ext cx="8783640" cy="791640"/>
+        </p:xfrm>
+        <a:graphic>
+          <a:graphicData uri="http://schemas.openxmlformats.org/drawingml/2006/table">
+            <a:tbl>
+              <a:tblPr/>
+              <a:tblGrid>
+                <a:gridCol w="414000"/>
+                <a:gridCol w="2530080"/>
+                <a:gridCol w="312480"/>
+                <a:gridCol w="2440800"/>
+                <a:gridCol w="520920"/>
+                <a:gridCol w="2143080"/>
+                <a:gridCol w="422640"/>
+              </a:tblGrid>
+              <a:tr h="791640">
+                <a:tc>
+                  <a:tcPr marL="90000" marR="90000">
+                    <a:lnL w="720">
+                      <a:solidFill>
+                        <a:srgbClr val="ffffff"/>
+                      </a:solidFill>
+                    </a:lnL>
+                    <a:lnR w="720">
+                      <a:solidFill>
+                        <a:srgbClr val="ffffff"/>
+                      </a:solidFill>
+                    </a:lnR>
+                    <a:lnT w="720">
+                      <a:solidFill>
+                        <a:srgbClr val="ffffff"/>
+                      </a:solidFill>
+                    </a:lnT>
+                    <a:lnB w="720">
+                      <a:solidFill>
+                        <a:srgbClr val="ffffff"/>
+                      </a:solidFill>
+                    </a:lnB>
+                    <a:solidFill>
+                      <a:srgbClr val="b3b3b3"/>
+                    </a:solidFill>
+                  </a:tcPr>
+                </a:tc>
+                <a:tc>
+                  <a:tcPr marL="90000" marR="90000">
+                    <a:lnL w="720">
+                      <a:solidFill>
+                        <a:srgbClr val="ffffff"/>
+                      </a:solidFill>
+                    </a:lnL>
+                    <a:lnR w="720">
+                      <a:solidFill>
+                        <a:srgbClr val="ffffff"/>
+                      </a:solidFill>
+                    </a:lnR>
+                    <a:lnT w="720">
+                      <a:solidFill>
+                        <a:srgbClr val="ffffff"/>
+                      </a:solidFill>
+                    </a:lnT>
+                    <a:lnB w="720">
+                      <a:solidFill>
+                        <a:srgbClr val="ffffff"/>
+                      </a:solidFill>
+                    </a:lnB>
+                    <a:solidFill>
+                      <a:srgbClr val="b3b3b3"/>
+                    </a:solidFill>
+                  </a:tcPr>
+                </a:tc>
+                <a:tc>
+                  <a:tcPr marL="90000" marR="90000">
+                    <a:lnL w="720">
+                      <a:solidFill>
+                        <a:srgbClr val="ffffff"/>
+                      </a:solidFill>
+                    </a:lnL>
+                    <a:lnR w="720">
+                      <a:solidFill>
+                        <a:srgbClr val="ffffff"/>
+                      </a:solidFill>
+                    </a:lnR>
+                    <a:lnT w="720">
+                      <a:solidFill>
+                        <a:srgbClr val="ffffff"/>
+                      </a:solidFill>
+                    </a:lnT>
+                    <a:lnB w="720">
+                      <a:solidFill>
+                        <a:srgbClr val="ffffff"/>
+                      </a:solidFill>
+                    </a:lnB>
+                    <a:solidFill>
+                      <a:srgbClr val="b3b3b3"/>
+                    </a:solidFill>
+                  </a:tcPr>
+                </a:tc>
+                <a:tc>
+                  <a:txBody>
+                    <a:bodyPr lIns="90000" rIns="90000">
+                      <a:noAutofit/>
+                    </a:bodyPr>
+                    <a:p>
+                      <a:pPr>
+                        <a:lnSpc>
+                          <a:spcPct val="100000"/>
+                        </a:lnSpc>
+                      </a:pPr>
+                      <a:r>
+                        <a:rPr b="0" lang="en-IN" sz="1800" spc="-1" strike="noStrike">
+                          <a:latin typeface="Arial"/>
+                        </a:rPr>
+                        <a:t>Block B2</a:t>
+                      </a:r>
+                      <a:endParaRPr b="0" lang="en-IN" sz="1800" spc="-1" strike="noStrike">
+                        <a:latin typeface="Arial"/>
+                      </a:endParaRPr>
+                    </a:p>
+                  </a:txBody>
+                  <a:tcPr marL="90000" marR="90000">
+                    <a:lnL w="720">
+                      <a:solidFill>
+                        <a:srgbClr val="ffffff"/>
+                      </a:solidFill>
+                    </a:lnL>
+                    <a:lnR w="720">
+                      <a:solidFill>
+                        <a:srgbClr val="ffffff"/>
+                      </a:solidFill>
+                    </a:lnR>
+                    <a:lnT w="720">
+                      <a:solidFill>
+                        <a:srgbClr val="ffffff"/>
+                      </a:solidFill>
+                    </a:lnT>
+                    <a:lnB w="720">
+                      <a:solidFill>
+                        <a:srgbClr val="ffffff"/>
+                      </a:solidFill>
+                    </a:lnB>
+                    <a:solidFill>
+                      <a:srgbClr val="b3b3b3"/>
+                    </a:solidFill>
+                  </a:tcPr>
+                </a:tc>
+                <a:tc>
+                  <a:tcPr marL="90000" marR="90000">
+                    <a:lnL w="720">
+                      <a:solidFill>
+                        <a:srgbClr val="ffffff"/>
+                      </a:solidFill>
+                    </a:lnL>
+                    <a:lnR w="720">
+                      <a:solidFill>
+                        <a:srgbClr val="ffffff"/>
+                      </a:solidFill>
+                    </a:lnR>
+                    <a:lnT w="720">
+                      <a:solidFill>
+                        <a:srgbClr val="ffffff"/>
+                      </a:solidFill>
+                    </a:lnT>
+                    <a:lnB w="720">
+                      <a:solidFill>
+                        <a:srgbClr val="ffffff"/>
+                      </a:solidFill>
+                    </a:lnB>
+                    <a:solidFill>
+                      <a:srgbClr val="b3b3b3"/>
+                    </a:solidFill>
+                  </a:tcPr>
+                </a:tc>
+                <a:tc>
+                  <a:txBody>
+                    <a:bodyPr lIns="90000" rIns="90000">
+                      <a:noAutofit/>
+                    </a:bodyPr>
+                    <a:p>
+                      <a:pPr>
+                        <a:lnSpc>
+                          <a:spcPct val="100000"/>
+                        </a:lnSpc>
+                      </a:pPr>
+                      <a:r>
+                        <a:rPr b="0" lang="en-IN" sz="1800" spc="-1" strike="noStrike">
+                          <a:latin typeface="Arial"/>
+                        </a:rPr>
+                        <a:t>Block B3</a:t>
+                      </a:r>
+                      <a:endParaRPr b="0" lang="en-IN" sz="1800" spc="-1" strike="noStrike">
+                        <a:latin typeface="Arial"/>
+                      </a:endParaRPr>
+                    </a:p>
+                  </a:txBody>
+                  <a:tcPr marL="90000" marR="90000">
+                    <a:lnL w="720">
+                      <a:solidFill>
+                        <a:srgbClr val="ffffff"/>
+                      </a:solidFill>
+                    </a:lnL>
+                    <a:lnR w="720">
+                      <a:solidFill>
+                        <a:srgbClr val="ffffff"/>
+                      </a:solidFill>
+                    </a:lnR>
+                    <a:lnT w="720">
+                      <a:solidFill>
+                        <a:srgbClr val="ffffff"/>
+                      </a:solidFill>
+                    </a:lnT>
+                    <a:lnB w="720">
+                      <a:solidFill>
+                        <a:srgbClr val="ffffff"/>
+                      </a:solidFill>
+                    </a:lnB>
+                    <a:solidFill>
+                      <a:srgbClr val="b3b3b3"/>
+                    </a:solidFill>
+                  </a:tcPr>
+                </a:tc>
+                <a:tc>
+                  <a:tcPr marL="90000" marR="90000">
+                    <a:lnL w="720">
+                      <a:solidFill>
+                        <a:srgbClr val="ffffff"/>
+                      </a:solidFill>
+                    </a:lnL>
+                    <a:lnR w="720">
+                      <a:solidFill>
+                        <a:srgbClr val="ffffff"/>
+                      </a:solidFill>
+                    </a:lnR>
+                    <a:lnT w="720">
+                      <a:solidFill>
+                        <a:srgbClr val="ffffff"/>
+                      </a:solidFill>
+                    </a:lnT>
+                    <a:lnB w="720">
+                      <a:solidFill>
+                        <a:srgbClr val="ffffff"/>
+                      </a:solidFill>
+                    </a:lnB>
+                    <a:solidFill>
+                      <a:srgbClr val="b3b3b3"/>
+                    </a:solidFill>
+                  </a:tcPr>
+                </a:tc>
+              </a:tr>
+            </a:tbl>
+          </a:graphicData>
+        </a:graphic>
+      </p:graphicFrame>
+      <p:sp>
+        <p:nvSpPr>
+          <p:cNvPr id="336" name="CustomShape 2"/>
+          <p:cNvSpPr/>
+          <p:nvPr/>
+        </p:nvSpPr>
+        <p:spPr>
+          <a:xfrm>
+            <a:off x="3492000" y="3541680"/>
+            <a:ext cx="3023640" cy="345960"/>
+          </a:xfrm>
+          <a:prstGeom prst="rect">
+            <a:avLst/>
+          </a:prstGeom>
+          <a:noFill/>
+          <a:ln>
+            <a:noFill/>
+          </a:ln>
+        </p:spPr>
+        <p:style>
+          <a:lnRef idx="0"/>
+          <a:fillRef idx="0"/>
+          <a:effectRef idx="0"/>
+          <a:fontRef idx="minor"/>
+        </p:style>
+        <p:txBody>
+          <a:bodyPr lIns="90000" rIns="90000" tIns="45000" bIns="45000">
+            <a:noAutofit/>
+          </a:bodyPr>
+          <a:p>
+            <a:pPr>
+              <a:lnSpc>
+                <a:spcPct val="100000"/>
+              </a:lnSpc>
+            </a:pPr>
+            <a:r>
+              <a:rPr b="0" lang="en-IN" sz="1800" spc="-1" strike="noStrike">
+                <a:latin typeface="Arial"/>
+              </a:rPr>
+              <a:t>Inter block gap</a:t>
+            </a:r>
+            <a:endParaRPr b="0" lang="en-IN" sz="1800" spc="-1" strike="noStrike">
+              <a:latin typeface="Arial"/>
+            </a:endParaRPr>
+          </a:p>
+        </p:txBody>
+      </p:sp>
+      <p:sp>
+        <p:nvSpPr>
+          <p:cNvPr id="337" name="CustomShape 3"/>
+          <p:cNvSpPr/>
+          <p:nvPr/>
+        </p:nvSpPr>
+        <p:spPr>
+          <a:xfrm>
+            <a:off x="144000" y="3564000"/>
+            <a:ext cx="3023640" cy="345960"/>
+          </a:xfrm>
+          <a:prstGeom prst="rect">
+            <a:avLst/>
+          </a:prstGeom>
+          <a:noFill/>
+          <a:ln>
+            <a:noFill/>
+          </a:ln>
+        </p:spPr>
+        <p:style>
+          <a:lnRef idx="0"/>
+          <a:fillRef idx="0"/>
+          <a:effectRef idx="0"/>
+          <a:fontRef idx="minor"/>
+        </p:style>
+        <p:txBody>
+          <a:bodyPr lIns="90000" rIns="90000" tIns="45000" bIns="45000">
+            <a:noAutofit/>
+          </a:bodyPr>
+          <a:p>
+            <a:pPr>
+              <a:lnSpc>
+                <a:spcPct val="100000"/>
+              </a:lnSpc>
+            </a:pPr>
+            <a:r>
+              <a:rPr b="0" lang="en-IN" sz="1800" spc="-1" strike="noStrike">
+                <a:latin typeface="Arial"/>
+              </a:rPr>
+              <a:t>Track Begin</a:t>
+            </a:r>
+            <a:endParaRPr b="0" lang="en-IN" sz="1800" spc="-1" strike="noStrike">
+              <a:latin typeface="Arial"/>
+            </a:endParaRPr>
+          </a:p>
+        </p:txBody>
+      </p:sp>
+      <p:sp>
+        <p:nvSpPr>
+          <p:cNvPr id="338" name="CustomShape 4"/>
+          <p:cNvSpPr/>
+          <p:nvPr/>
+        </p:nvSpPr>
+        <p:spPr>
+          <a:xfrm>
+            <a:off x="7308000" y="3528000"/>
+            <a:ext cx="3023640" cy="345960"/>
+          </a:xfrm>
+          <a:prstGeom prst="rect">
+            <a:avLst/>
+          </a:prstGeom>
+          <a:noFill/>
+          <a:ln>
+            <a:noFill/>
+          </a:ln>
+        </p:spPr>
+        <p:style>
+          <a:lnRef idx="0"/>
+          <a:fillRef idx="0"/>
+          <a:effectRef idx="0"/>
+          <a:fontRef idx="minor"/>
+        </p:style>
+        <p:txBody>
+          <a:bodyPr lIns="90000" rIns="90000" tIns="45000" bIns="45000">
+            <a:noAutofit/>
+          </a:bodyPr>
+          <a:p>
+            <a:pPr>
+              <a:lnSpc>
+                <a:spcPct val="100000"/>
+              </a:lnSpc>
+            </a:pPr>
+            <a:r>
+              <a:rPr b="0" lang="en-IN" sz="1800" spc="-1" strike="noStrike">
+                <a:latin typeface="Arial"/>
+              </a:rPr>
+              <a:t>Track End</a:t>
+            </a:r>
+            <a:endParaRPr b="0" lang="en-IN" sz="1800" spc="-1" strike="noStrike">
+              <a:latin typeface="Arial"/>
+            </a:endParaRPr>
+          </a:p>
+        </p:txBody>
+      </p:sp>
+      <p:sp>
+        <p:nvSpPr>
+          <p:cNvPr id="339" name="Line 5"/>
+          <p:cNvSpPr/>
+          <p:nvPr/>
+        </p:nvSpPr>
+        <p:spPr>
+          <a:xfrm>
+            <a:off x="864000" y="2951640"/>
+            <a:ext cx="0" cy="612360"/>
+          </a:xfrm>
+          <a:prstGeom prst="line">
+            <a:avLst/>
+          </a:prstGeom>
+          <a:ln>
+            <a:solidFill>
+              <a:srgbClr val="3465a4"/>
+            </a:solidFill>
+            <a:tailEnd len="med" type="triangle" w="med"/>
+          </a:ln>
+        </p:spPr>
+        <p:style>
+          <a:lnRef idx="0"/>
+          <a:fillRef idx="0"/>
+          <a:effectRef idx="0"/>
+          <a:fontRef idx="minor"/>
+        </p:style>
+      </p:sp>
+      <p:sp>
+        <p:nvSpPr>
+          <p:cNvPr id="340" name="Line 6"/>
+          <p:cNvSpPr/>
+          <p:nvPr/>
+        </p:nvSpPr>
+        <p:spPr>
+          <a:xfrm>
+            <a:off x="3816000" y="2951640"/>
+            <a:ext cx="432000" cy="590040"/>
+          </a:xfrm>
+          <a:prstGeom prst="line">
+            <a:avLst/>
+          </a:prstGeom>
+          <a:ln>
+            <a:solidFill>
+              <a:srgbClr val="3465a4"/>
+            </a:solidFill>
+            <a:tailEnd len="med" type="triangle" w="med"/>
+          </a:ln>
+        </p:spPr>
+        <p:style>
+          <a:lnRef idx="0"/>
+          <a:fillRef idx="0"/>
+          <a:effectRef idx="0"/>
+          <a:fontRef idx="minor"/>
+        </p:style>
+      </p:sp>
+      <p:sp>
+        <p:nvSpPr>
+          <p:cNvPr id="341" name="Line 7"/>
+          <p:cNvSpPr/>
+          <p:nvPr/>
+        </p:nvSpPr>
+        <p:spPr>
+          <a:xfrm flipH="1">
+            <a:off x="4536000" y="2951640"/>
+            <a:ext cx="2016000" cy="504360"/>
+          </a:xfrm>
+          <a:prstGeom prst="line">
+            <a:avLst/>
+          </a:prstGeom>
+          <a:ln>
+            <a:solidFill>
+              <a:srgbClr val="3465a4"/>
+            </a:solidFill>
+            <a:tailEnd len="med" type="triangle" w="med"/>
+          </a:ln>
+        </p:spPr>
+        <p:style>
+          <a:lnRef idx="0"/>
+          <a:fillRef idx="0"/>
+          <a:effectRef idx="0"/>
+          <a:fontRef idx="minor"/>
+        </p:style>
+      </p:sp>
+      <p:sp>
+        <p:nvSpPr>
+          <p:cNvPr id="342" name="Line 8"/>
+          <p:cNvSpPr/>
+          <p:nvPr/>
+        </p:nvSpPr>
+        <p:spPr>
+          <a:xfrm flipH="1">
+            <a:off x="8280000" y="2951640"/>
+            <a:ext cx="936000" cy="576360"/>
+          </a:xfrm>
+          <a:prstGeom prst="line">
+            <a:avLst/>
+          </a:prstGeom>
+          <a:ln>
+            <a:solidFill>
+              <a:srgbClr val="3465a4"/>
+            </a:solidFill>
+            <a:tailEnd len="med" type="triangle" w="med"/>
+          </a:ln>
+        </p:spPr>
+        <p:style>
+          <a:lnRef idx="0"/>
+          <a:fillRef idx="0"/>
+          <a:effectRef idx="0"/>
+          <a:fontRef idx="minor"/>
+        </p:style>
+      </p:sp>
+    </p:spTree>
+  </p:cSld>
+  <mc:AlternateContent>
+    <mc:Choice Requires="p14">
+      <p:transition spd="slow" p14:dur="2000"/>
+    </mc:Choice>
+    <mc:Fallback>
+      <p:transition spd="slow"/>
+    </mc:Fallback>
+  </mc:AlternateContent>
+</p:sld>
+</file>
+
+<file path=ppt/slides/slide18.xml><?xml version="1.0" encoding="utf-8"?>
+<p:sld xmlns:a="http://schemas.openxmlformats.org/drawingml/2006/main" xmlns:p="http://schemas.openxmlformats.org/presentationml/2006/main" xmlns:r="http://schemas.openxmlformats.org/officeDocument/2006/relationships" xmlns:p14="http://schemas.microsoft.com/office/powerpoint/2010/main" xmlns:p15="http://schemas.microsoft.com/office/powerpoint/2012/main" xmlns:mc="http://schemas.openxmlformats.org/markup-compatibility/2006">
+  <p:cSld>
+    <p:spTree>
+      <p:nvGrpSpPr>
+        <p:cNvPr id="1" name=""/>
+        <p:cNvGrpSpPr/>
+        <p:nvPr/>
+      </p:nvGrpSpPr>
+      <p:grpSpPr>
+        <a:xfrm>
+          <a:off x="0" y="0"/>
+          <a:ext cx="0" cy="0"/>
+          <a:chOff x="0" y="0"/>
+          <a:chExt cx="0" cy="0"/>
+        </a:xfrm>
+      </p:grpSpPr>
+      <p:graphicFrame>
+        <p:nvGraphicFramePr>
+          <p:cNvPr id="343" name="Table 1"/>
+          <p:cNvGraphicFramePr/>
+          <p:nvPr/>
+        </p:nvGraphicFramePr>
+        <p:xfrm>
+          <a:off x="587520" y="2302920"/>
+          <a:ext cx="5075280" cy="2879280"/>
+        </p:xfrm>
+        <a:graphic>
+          <a:graphicData uri="http://schemas.openxmlformats.org/drawingml/2006/table">
+            <a:tbl>
+              <a:tblPr/>
+              <a:tblGrid>
+                <a:gridCol w="1042200"/>
+                <a:gridCol w="1131120"/>
+                <a:gridCol w="1056600"/>
+              </a:tblGrid>
+              <a:tr h="405360">
+                <a:tc>
+                  <a:txBody>
+                    <a:bodyPr lIns="90000" rIns="90000" tIns="46800" bIns="46800">
+                      <a:noAutofit/>
+                    </a:bodyPr>
+                    <a:p>
+                      <a:r>
+                        <a:rPr b="0" lang="en-IN" sz="1800" spc="-1" strike="noStrike">
+                          <a:latin typeface="Arial"/>
+                        </a:rPr>
+                        <a:t>A</a:t>
+                      </a:r>
+                      <a:endParaRPr b="0" lang="en-IN" sz="1800" spc="-1" strike="noStrike">
+                        <a:latin typeface="Arial"/>
+                      </a:endParaRPr>
+                    </a:p>
+                  </a:txBody>
+                  <a:tcPr marL="90000" marR="90000">
+                    <a:lnL w="720">
+                      <a:solidFill>
+                        <a:srgbClr val="ffffff"/>
+                      </a:solidFill>
+                    </a:lnL>
+                    <a:lnR w="720">
+                      <a:solidFill>
+                        <a:srgbClr val="ffffff"/>
+                      </a:solidFill>
+                    </a:lnR>
+                    <a:lnT w="720">
+                      <a:solidFill>
+                        <a:srgbClr val="ffffff"/>
+                      </a:solidFill>
+                    </a:lnT>
+                    <a:lnB w="720">
+                      <a:solidFill>
+                        <a:srgbClr val="ffffff"/>
+                      </a:solidFill>
+                    </a:lnB>
+                    <a:solidFill>
+                      <a:srgbClr val="b3b3b3"/>
+                    </a:solidFill>
+                  </a:tcPr>
+                </a:tc>
+                <a:tc>
+                  <a:txBody>
+                    <a:bodyPr lIns="90000" rIns="90000" tIns="46800" bIns="46800">
+                      <a:noAutofit/>
+                    </a:bodyPr>
+                    <a:p>
+                      <a:r>
+                        <a:rPr b="0" lang="en-IN" sz="1800" spc="-1" strike="noStrike">
+                          <a:latin typeface="Arial"/>
+                        </a:rPr>
+                        <a:t>B</a:t>
+                      </a:r>
+                      <a:endParaRPr b="0" lang="en-IN" sz="1800" spc="-1" strike="noStrike">
+                        <a:latin typeface="Arial"/>
+                      </a:endParaRPr>
+                    </a:p>
+                  </a:txBody>
+                  <a:tcPr marL="90000" marR="90000">
+                    <a:lnL w="720">
+                      <a:solidFill>
+                        <a:srgbClr val="ffffff"/>
+                      </a:solidFill>
+                    </a:lnL>
+                    <a:lnR w="720">
+                      <a:solidFill>
+                        <a:srgbClr val="ffffff"/>
+                      </a:solidFill>
+                    </a:lnR>
+                    <a:lnT w="720">
+                      <a:solidFill>
+                        <a:srgbClr val="ffffff"/>
+                      </a:solidFill>
+                    </a:lnT>
+                    <a:lnB w="720">
+                      <a:solidFill>
+                        <a:srgbClr val="ffffff"/>
+                      </a:solidFill>
+                    </a:lnB>
+                    <a:solidFill>
+                      <a:srgbClr val="b3b3b3"/>
+                    </a:solidFill>
+                  </a:tcPr>
+                </a:tc>
+                <a:tc>
+                  <a:txBody>
+                    <a:bodyPr lIns="90000" rIns="90000" tIns="46800" bIns="46800">
+                      <a:noAutofit/>
+                    </a:bodyPr>
+                    <a:p>
+                      <a:r>
+                        <a:rPr b="0" lang="en-IN" sz="1800" spc="-1" strike="noStrike">
+                          <a:latin typeface="Arial"/>
+                        </a:rPr>
+                        <a:t>C</a:t>
+                      </a:r>
+                      <a:endParaRPr b="0" lang="en-IN" sz="1800" spc="-1" strike="noStrike">
+                        <a:latin typeface="Arial"/>
+                      </a:endParaRPr>
+                    </a:p>
+                  </a:txBody>
+                  <a:tcPr marL="90000" marR="90000">
+                    <a:lnL w="720">
+                      <a:solidFill>
+                        <a:srgbClr val="ffffff"/>
+                      </a:solidFill>
+                    </a:lnL>
+                    <a:lnR w="720">
+                      <a:solidFill>
+                        <a:srgbClr val="ffffff"/>
+                      </a:solidFill>
+                    </a:lnR>
+                    <a:lnT w="720">
+                      <a:solidFill>
+                        <a:srgbClr val="ffffff"/>
+                      </a:solidFill>
+                    </a:lnT>
+                    <a:lnB w="720">
+                      <a:solidFill>
+                        <a:srgbClr val="ffffff"/>
+                      </a:solidFill>
+                    </a:lnB>
+                    <a:solidFill>
+                      <a:srgbClr val="b3b3b3"/>
+                    </a:solidFill>
+                  </a:tcPr>
+                </a:tc>
+              </a:tr>
+              <a:tr h="416880">
+                <a:tc>
+                  <a:tcPr marL="90000" marR="90000">
+                    <a:lnL w="720">
+                      <a:solidFill>
+                        <a:srgbClr val="ffffff"/>
+                      </a:solidFill>
+                    </a:lnL>
+                    <a:lnR w="720">
+                      <a:solidFill>
+                        <a:srgbClr val="ffffff"/>
+                      </a:solidFill>
+                    </a:lnR>
+                    <a:lnT w="720">
+                      <a:solidFill>
+                        <a:srgbClr val="ffffff"/>
+                      </a:solidFill>
+                    </a:lnT>
+                    <a:lnB w="720">
+                      <a:solidFill>
+                        <a:srgbClr val="ffffff"/>
+                      </a:solidFill>
+                    </a:lnB>
+                    <a:solidFill>
+                      <a:srgbClr val="cccccc"/>
+                    </a:solidFill>
+                  </a:tcPr>
+                </a:tc>
+                <a:tc>
+                  <a:tcPr marL="90000" marR="90000">
+                    <a:lnL w="720">
+                      <a:solidFill>
+                        <a:srgbClr val="ffffff"/>
+                      </a:solidFill>
+                    </a:lnL>
+                    <a:lnR w="720">
+                      <a:solidFill>
+                        <a:srgbClr val="ffffff"/>
+                      </a:solidFill>
+                    </a:lnR>
+                    <a:lnT w="720">
+                      <a:solidFill>
+                        <a:srgbClr val="ffffff"/>
+                      </a:solidFill>
+                    </a:lnT>
+                    <a:lnB w="720">
+                      <a:solidFill>
+                        <a:srgbClr val="ffffff"/>
+                      </a:solidFill>
+                    </a:lnB>
+                    <a:solidFill>
+                      <a:srgbClr val="cccccc"/>
+                    </a:solidFill>
+                  </a:tcPr>
+                </a:tc>
+                <a:tc>
+                  <a:tcPr marL="90000" marR="90000">
+                    <a:lnL w="720">
+                      <a:solidFill>
+                        <a:srgbClr val="ffffff"/>
+                      </a:solidFill>
+                    </a:lnL>
+                    <a:lnR w="720">
+                      <a:solidFill>
+                        <a:srgbClr val="ffffff"/>
+                      </a:solidFill>
+                    </a:lnR>
+                    <a:lnT w="720">
+                      <a:solidFill>
+                        <a:srgbClr val="ffffff"/>
+                      </a:solidFill>
+                    </a:lnT>
+                    <a:lnB w="720">
+                      <a:solidFill>
+                        <a:srgbClr val="ffffff"/>
+                      </a:solidFill>
+                    </a:lnB>
+                    <a:solidFill>
+                      <a:srgbClr val="cccccc"/>
+                    </a:solidFill>
+                  </a:tcPr>
+                </a:tc>
+              </a:tr>
+              <a:tr h="371880">
+                <a:tc>
+                  <a:tcPr marL="90000" marR="90000">
+                    <a:lnL w="720">
+                      <a:solidFill>
+                        <a:srgbClr val="ffffff"/>
+                      </a:solidFill>
+                    </a:lnL>
+                    <a:lnR w="720">
+                      <a:solidFill>
+                        <a:srgbClr val="ffffff"/>
+                      </a:solidFill>
+                    </a:lnR>
+                    <a:lnT w="720">
+                      <a:solidFill>
+                        <a:srgbClr val="ffffff"/>
+                      </a:solidFill>
+                    </a:lnT>
+                    <a:lnB w="720">
+                      <a:solidFill>
+                        <a:srgbClr val="ffffff"/>
+                      </a:solidFill>
+                    </a:lnB>
+                    <a:solidFill>
+                      <a:srgbClr val="e6e6e6"/>
+                    </a:solidFill>
+                  </a:tcPr>
+                </a:tc>
+                <a:tc>
+                  <a:tcPr marL="90000" marR="90000">
+                    <a:lnL w="720">
+                      <a:solidFill>
+                        <a:srgbClr val="ffffff"/>
+                      </a:solidFill>
+                    </a:lnL>
+                    <a:lnR w="720">
+                      <a:solidFill>
+                        <a:srgbClr val="ffffff"/>
+                      </a:solidFill>
+                    </a:lnR>
+                    <a:lnT w="720">
+                      <a:solidFill>
+                        <a:srgbClr val="ffffff"/>
+                      </a:solidFill>
+                    </a:lnT>
+                    <a:lnB w="720">
+                      <a:solidFill>
+                        <a:srgbClr val="ffffff"/>
+                      </a:solidFill>
+                    </a:lnB>
+                    <a:solidFill>
+                      <a:srgbClr val="e6e6e6"/>
+                    </a:solidFill>
+                  </a:tcPr>
+                </a:tc>
+                <a:tc>
+                  <a:tcPr marL="90000" marR="90000">
+                    <a:lnL w="720">
+                      <a:solidFill>
+                        <a:srgbClr val="ffffff"/>
+                      </a:solidFill>
+                    </a:lnL>
+                    <a:lnR w="720">
+                      <a:solidFill>
+                        <a:srgbClr val="ffffff"/>
+                      </a:solidFill>
+                    </a:lnR>
+                    <a:lnT w="720">
+                      <a:solidFill>
+                        <a:srgbClr val="ffffff"/>
+                      </a:solidFill>
+                    </a:lnT>
+                    <a:lnB w="720">
+                      <a:solidFill>
+                        <a:srgbClr val="ffffff"/>
+                      </a:solidFill>
+                    </a:lnB>
+                    <a:solidFill>
+                      <a:srgbClr val="e6e6e6"/>
+                    </a:solidFill>
+                  </a:tcPr>
+                </a:tc>
+              </a:tr>
+              <a:tr h="357120">
+                <a:tc>
+                  <a:tcPr marL="90000" marR="90000">
+                    <a:lnL w="720">
+                      <a:solidFill>
+                        <a:srgbClr val="ffffff"/>
+                      </a:solidFill>
+                    </a:lnL>
+                    <a:lnR w="720">
+                      <a:solidFill>
+                        <a:srgbClr val="ffffff"/>
+                      </a:solidFill>
+                    </a:lnR>
+                    <a:lnT w="720">
+                      <a:solidFill>
+                        <a:srgbClr val="ffffff"/>
+                      </a:solidFill>
+                    </a:lnT>
+                    <a:lnB w="720">
+                      <a:solidFill>
+                        <a:srgbClr val="ffffff"/>
+                      </a:solidFill>
+                    </a:lnB>
+                    <a:solidFill>
+                      <a:srgbClr val="cccccc"/>
+                    </a:solidFill>
+                  </a:tcPr>
+                </a:tc>
+                <a:tc>
+                  <a:tcPr marL="90000" marR="90000">
+                    <a:lnL w="720">
+                      <a:solidFill>
+                        <a:srgbClr val="ffffff"/>
+                      </a:solidFill>
+                    </a:lnL>
+                    <a:lnR w="720">
+                      <a:solidFill>
+                        <a:srgbClr val="ffffff"/>
+                      </a:solidFill>
+                    </a:lnR>
+                    <a:lnT w="720">
+                      <a:solidFill>
+                        <a:srgbClr val="ffffff"/>
+                      </a:solidFill>
+                    </a:lnT>
+                    <a:lnB w="720">
+                      <a:solidFill>
+                        <a:srgbClr val="ffffff"/>
+                      </a:solidFill>
+                    </a:lnB>
+                    <a:solidFill>
+                      <a:srgbClr val="cccccc"/>
+                    </a:solidFill>
+                  </a:tcPr>
+                </a:tc>
+                <a:tc>
+                  <a:tcPr marL="90000" marR="90000">
+                    <a:lnL w="720">
+                      <a:solidFill>
+                        <a:srgbClr val="ffffff"/>
+                      </a:solidFill>
+                    </a:lnL>
+                    <a:lnR w="720">
+                      <a:solidFill>
+                        <a:srgbClr val="ffffff"/>
+                      </a:solidFill>
+                    </a:lnR>
+                    <a:lnT w="720">
+                      <a:solidFill>
+                        <a:srgbClr val="ffffff"/>
+                      </a:solidFill>
+                    </a:lnT>
+                    <a:lnB w="720">
+                      <a:solidFill>
+                        <a:srgbClr val="ffffff"/>
+                      </a:solidFill>
+                    </a:lnB>
+                    <a:solidFill>
+                      <a:srgbClr val="cccccc"/>
+                    </a:solidFill>
+                  </a:tcPr>
+                </a:tc>
+              </a:tr>
+            </a:tbl>
+          </a:graphicData>
+        </a:graphic>
+      </p:graphicFrame>
+      <p:graphicFrame>
+        <p:nvGraphicFramePr>
+          <p:cNvPr id="344" name="Table 2"/>
+          <p:cNvGraphicFramePr/>
+          <p:nvPr/>
+        </p:nvGraphicFramePr>
+        <p:xfrm>
+          <a:off x="5497200" y="2705040"/>
+          <a:ext cx="5075280" cy="2879280"/>
+        </p:xfrm>
+        <a:graphic>
+          <a:graphicData uri="http://schemas.openxmlformats.org/drawingml/2006/table">
+            <a:tbl>
+              <a:tblPr/>
+              <a:tblGrid>
+                <a:gridCol w="938160"/>
+                <a:gridCol w="878040"/>
+                <a:gridCol w="848160"/>
+              </a:tblGrid>
+              <a:tr h="420480">
+                <a:tc>
+                  <a:txBody>
+                    <a:bodyPr lIns="90000" rIns="90000" tIns="46800" bIns="46800">
+                      <a:noAutofit/>
+                    </a:bodyPr>
+                    <a:p>
+                      <a:r>
+                        <a:rPr b="0" lang="en-IN" sz="1800" spc="-1" strike="noStrike">
+                          <a:latin typeface="Arial"/>
+                        </a:rPr>
+                        <a:t>A</a:t>
+                      </a:r>
+                      <a:endParaRPr b="0" lang="en-IN" sz="1800" spc="-1" strike="noStrike">
+                        <a:latin typeface="Arial"/>
+                      </a:endParaRPr>
+                    </a:p>
+                  </a:txBody>
+                  <a:tcPr marL="90000" marR="90000">
+                    <a:lnL w="720">
+                      <a:solidFill>
+                        <a:srgbClr val="ffffff"/>
+                      </a:solidFill>
+                    </a:lnL>
+                    <a:lnR w="720">
+                      <a:solidFill>
+                        <a:srgbClr val="ffffff"/>
+                      </a:solidFill>
+                    </a:lnR>
+                    <a:lnT w="720">
+                      <a:solidFill>
+                        <a:srgbClr val="ffffff"/>
+                      </a:solidFill>
+                    </a:lnT>
+                    <a:lnB w="720">
+                      <a:solidFill>
+                        <a:srgbClr val="ffffff"/>
+                      </a:solidFill>
+                    </a:lnB>
+                    <a:solidFill>
+                      <a:srgbClr val="b3b3b3"/>
+                    </a:solidFill>
+                  </a:tcPr>
+                </a:tc>
+                <a:tc>
+                  <a:txBody>
+                    <a:bodyPr lIns="90000" rIns="90000" tIns="46800" bIns="46800">
+                      <a:noAutofit/>
+                    </a:bodyPr>
+                    <a:p>
+                      <a:r>
+                        <a:rPr b="0" lang="en-IN" sz="1800" spc="-1" strike="noStrike">
+                          <a:latin typeface="Arial"/>
+                        </a:rPr>
+                        <a:t>B</a:t>
+                      </a:r>
+                      <a:endParaRPr b="0" lang="en-IN" sz="1800" spc="-1" strike="noStrike">
+                        <a:latin typeface="Arial"/>
+                      </a:endParaRPr>
+                    </a:p>
+                  </a:txBody>
+                  <a:tcPr marL="90000" marR="90000">
+                    <a:lnL w="720">
+                      <a:solidFill>
+                        <a:srgbClr val="ffffff"/>
+                      </a:solidFill>
+                    </a:lnL>
+                    <a:lnR w="720">
+                      <a:solidFill>
+                        <a:srgbClr val="ffffff"/>
+                      </a:solidFill>
+                    </a:lnR>
+                    <a:lnT w="720">
+                      <a:solidFill>
+                        <a:srgbClr val="ffffff"/>
+                      </a:solidFill>
+                    </a:lnT>
+                    <a:lnB w="720">
+                      <a:solidFill>
+                        <a:srgbClr val="ffffff"/>
+                      </a:solidFill>
+                    </a:lnB>
+                    <a:solidFill>
+                      <a:srgbClr val="b3b3b3"/>
+                    </a:solidFill>
+                  </a:tcPr>
+                </a:tc>
+                <a:tc>
+                  <a:txBody>
+                    <a:bodyPr lIns="90000" rIns="90000" tIns="46800" bIns="46800">
+                      <a:noAutofit/>
+                    </a:bodyPr>
+                    <a:p>
+                      <a:r>
+                        <a:rPr b="0" lang="en-IN" sz="1800" spc="-1" strike="noStrike">
+                          <a:latin typeface="Arial"/>
+                        </a:rPr>
+                        <a:t>C</a:t>
+                      </a:r>
+                      <a:endParaRPr b="0" lang="en-IN" sz="1800" spc="-1" strike="noStrike">
+                        <a:latin typeface="Arial"/>
+                      </a:endParaRPr>
+                    </a:p>
+                  </a:txBody>
+                  <a:tcPr marL="90000" marR="90000">
+                    <a:lnL w="720">
+                      <a:solidFill>
+                        <a:srgbClr val="ffffff"/>
+                      </a:solidFill>
+                    </a:lnL>
+                    <a:lnR w="720">
+                      <a:solidFill>
+                        <a:srgbClr val="ffffff"/>
+                      </a:solidFill>
+                    </a:lnR>
+                    <a:lnT w="720">
+                      <a:solidFill>
+                        <a:srgbClr val="ffffff"/>
+                      </a:solidFill>
+                    </a:lnT>
+                    <a:lnB w="720">
+                      <a:solidFill>
+                        <a:srgbClr val="ffffff"/>
+                      </a:solidFill>
+                    </a:lnB>
+                    <a:solidFill>
+                      <a:srgbClr val="b3b3b3"/>
+                    </a:solidFill>
+                  </a:tcPr>
+                </a:tc>
+              </a:tr>
+              <a:tr h="431280">
+                <a:tc>
+                  <a:tcPr marL="90000" marR="90000">
+                    <a:lnL w="720">
+                      <a:solidFill>
+                        <a:srgbClr val="ffffff"/>
+                      </a:solidFill>
+                    </a:lnL>
+                    <a:lnR w="720">
+                      <a:solidFill>
+                        <a:srgbClr val="ffffff"/>
+                      </a:solidFill>
+                    </a:lnR>
+                    <a:lnT w="720">
+                      <a:solidFill>
+                        <a:srgbClr val="ffffff"/>
+                      </a:solidFill>
+                    </a:lnT>
+                    <a:lnB w="720">
+                      <a:solidFill>
+                        <a:srgbClr val="ffffff"/>
+                      </a:solidFill>
+                    </a:lnB>
+                    <a:solidFill>
+                      <a:srgbClr val="cccccc"/>
+                    </a:solidFill>
+                  </a:tcPr>
+                </a:tc>
+                <a:tc>
+                  <a:tcPr marL="90000" marR="90000">
+                    <a:lnL w="720">
+                      <a:solidFill>
+                        <a:srgbClr val="ffffff"/>
+                      </a:solidFill>
+                    </a:lnL>
+                    <a:lnR w="720">
+                      <a:solidFill>
+                        <a:srgbClr val="ffffff"/>
+                      </a:solidFill>
+                    </a:lnR>
+                    <a:lnT w="720">
+                      <a:solidFill>
+                        <a:srgbClr val="ffffff"/>
+                      </a:solidFill>
+                    </a:lnT>
+                    <a:lnB w="720">
+                      <a:solidFill>
+                        <a:srgbClr val="ffffff"/>
+                      </a:solidFill>
+                    </a:lnB>
+                    <a:solidFill>
+                      <a:srgbClr val="cccccc"/>
+                    </a:solidFill>
+                  </a:tcPr>
+                </a:tc>
+                <a:tc>
+                  <a:tcPr marL="90000" marR="90000">
+                    <a:lnL w="720">
+                      <a:solidFill>
+                        <a:srgbClr val="ffffff"/>
+                      </a:solidFill>
+                    </a:lnL>
+                    <a:lnR w="720">
+                      <a:solidFill>
+                        <a:srgbClr val="ffffff"/>
+                      </a:solidFill>
+                    </a:lnR>
+                    <a:lnT w="720">
+                      <a:solidFill>
+                        <a:srgbClr val="ffffff"/>
+                      </a:solidFill>
+                    </a:lnT>
+                    <a:lnB w="720">
+                      <a:solidFill>
+                        <a:srgbClr val="ffffff"/>
+                      </a:solidFill>
+                    </a:lnB>
+                    <a:solidFill>
+                      <a:srgbClr val="cccccc"/>
+                    </a:solidFill>
+                  </a:tcPr>
+                </a:tc>
+              </a:tr>
+              <a:tr h="372240">
+                <a:tc>
+                  <a:tcPr marL="90000" marR="90000">
+                    <a:lnL w="720">
+                      <a:solidFill>
+                        <a:srgbClr val="ffffff"/>
+                      </a:solidFill>
+                    </a:lnL>
+                    <a:lnR w="720">
+                      <a:solidFill>
+                        <a:srgbClr val="ffffff"/>
+                      </a:solidFill>
+                    </a:lnR>
+                    <a:lnT w="720">
+                      <a:solidFill>
+                        <a:srgbClr val="ffffff"/>
+                      </a:solidFill>
+                    </a:lnT>
+                    <a:lnB w="720">
+                      <a:solidFill>
+                        <a:srgbClr val="ffffff"/>
+                      </a:solidFill>
+                    </a:lnB>
+                    <a:solidFill>
+                      <a:srgbClr val="e6e6e6"/>
+                    </a:solidFill>
+                  </a:tcPr>
+                </a:tc>
+                <a:tc>
+                  <a:tcPr marL="90000" marR="90000">
+                    <a:lnL w="720">
+                      <a:solidFill>
+                        <a:srgbClr val="ffffff"/>
+                      </a:solidFill>
+                    </a:lnL>
+                    <a:lnR w="720">
+                      <a:solidFill>
+                        <a:srgbClr val="ffffff"/>
+                      </a:solidFill>
+                    </a:lnR>
+                    <a:lnT w="720">
+                      <a:solidFill>
+                        <a:srgbClr val="ffffff"/>
+                      </a:solidFill>
+                    </a:lnT>
+                    <a:lnB w="720">
+                      <a:solidFill>
+                        <a:srgbClr val="ffffff"/>
+                      </a:solidFill>
+                    </a:lnB>
+                    <a:solidFill>
+                      <a:srgbClr val="e6e6e6"/>
+                    </a:solidFill>
+                  </a:tcPr>
+                </a:tc>
+                <a:tc>
+                  <a:tcPr marL="90000" marR="90000">
+                    <a:lnL w="720">
+                      <a:solidFill>
+                        <a:srgbClr val="ffffff"/>
+                      </a:solidFill>
+                    </a:lnL>
+                    <a:lnR w="720">
+                      <a:solidFill>
+                        <a:srgbClr val="ffffff"/>
+                      </a:solidFill>
+                    </a:lnR>
+                    <a:lnT w="720">
+                      <a:solidFill>
+                        <a:srgbClr val="ffffff"/>
+                      </a:solidFill>
+                    </a:lnT>
+                    <a:lnB w="720">
+                      <a:solidFill>
+                        <a:srgbClr val="ffffff"/>
+                      </a:solidFill>
+                    </a:lnB>
+                    <a:solidFill>
+                      <a:srgbClr val="e6e6e6"/>
+                    </a:solidFill>
+                  </a:tcPr>
+                </a:tc>
+              </a:tr>
+              <a:tr h="357120">
+                <a:tc>
+                  <a:tcPr marL="90000" marR="90000">
+                    <a:lnL w="720">
+                      <a:solidFill>
+                        <a:srgbClr val="ffffff"/>
+                      </a:solidFill>
+                    </a:lnL>
+                    <a:lnR w="720">
+                      <a:solidFill>
+                        <a:srgbClr val="ffffff"/>
+                      </a:solidFill>
+                    </a:lnR>
+                    <a:lnT w="720">
+                      <a:solidFill>
+                        <a:srgbClr val="ffffff"/>
+                      </a:solidFill>
+                    </a:lnT>
+                    <a:lnB w="720">
+                      <a:solidFill>
+                        <a:srgbClr val="ffffff"/>
+                      </a:solidFill>
+                    </a:lnB>
+                    <a:solidFill>
+                      <a:srgbClr val="cccccc"/>
+                    </a:solidFill>
+                  </a:tcPr>
+                </a:tc>
+                <a:tc>
+                  <a:tcPr marL="90000" marR="90000">
+                    <a:lnL w="720">
+                      <a:solidFill>
+                        <a:srgbClr val="ffffff"/>
+                      </a:solidFill>
+                    </a:lnL>
+                    <a:lnR w="720">
+                      <a:solidFill>
+                        <a:srgbClr val="ffffff"/>
+                      </a:solidFill>
+                    </a:lnR>
+                    <a:lnT w="720">
+                      <a:solidFill>
+                        <a:srgbClr val="ffffff"/>
+                      </a:solidFill>
+                    </a:lnT>
+                    <a:lnB w="720">
+                      <a:solidFill>
+                        <a:srgbClr val="ffffff"/>
+                      </a:solidFill>
+                    </a:lnB>
+                    <a:solidFill>
+                      <a:srgbClr val="cccccc"/>
+                    </a:solidFill>
+                  </a:tcPr>
+                </a:tc>
+                <a:tc>
+                  <a:tcPr marL="90000" marR="90000">
+                    <a:lnL w="720">
+                      <a:solidFill>
+                        <a:srgbClr val="ffffff"/>
+                      </a:solidFill>
+                    </a:lnL>
+                    <a:lnR w="720">
+                      <a:solidFill>
+                        <a:srgbClr val="ffffff"/>
+                      </a:solidFill>
+                    </a:lnR>
+                    <a:lnT w="720">
+                      <a:solidFill>
+                        <a:srgbClr val="ffffff"/>
+                      </a:solidFill>
+                    </a:lnT>
+                    <a:lnB w="720">
+                      <a:solidFill>
+                        <a:srgbClr val="ffffff"/>
+                      </a:solidFill>
+                    </a:lnB>
+                    <a:solidFill>
+                      <a:srgbClr val="cccccc"/>
+                    </a:solidFill>
+                  </a:tcPr>
+                </a:tc>
+              </a:tr>
+            </a:tbl>
+          </a:graphicData>
+        </a:graphic>
+      </p:graphicFrame>
+      <p:sp>
+        <p:nvSpPr>
+          <p:cNvPr id="345" name="TextShape 3"/>
+          <p:cNvSpPr txBox="1"/>
+          <p:nvPr/>
+        </p:nvSpPr>
+        <p:spPr>
+          <a:xfrm>
+            <a:off x="3456000" y="1008000"/>
+            <a:ext cx="3240000" cy="346320"/>
+          </a:xfrm>
+          <a:prstGeom prst="rect">
+            <a:avLst/>
+          </a:prstGeom>
+          <a:noFill/>
+          <a:ln>
+            <a:noFill/>
+          </a:ln>
+        </p:spPr>
+        <p:txBody>
+          <a:bodyPr lIns="90000" rIns="90000" tIns="45000" bIns="45000">
+            <a:noAutofit/>
+          </a:bodyPr>
+          <a:p>
+            <a:r>
+              <a:rPr b="0" lang="en-IN" sz="1800" spc="-1" strike="noStrike">
+                <a:latin typeface="Arial"/>
+              </a:rPr>
+              <a:t>Fixed Length Records</a:t>
+            </a:r>
+            <a:endParaRPr b="0" lang="en-IN" sz="1800" spc="-1" strike="noStrike">
+              <a:latin typeface="Arial"/>
+            </a:endParaRPr>
+          </a:p>
+        </p:txBody>
+      </p:sp>
+      <p:sp>
+        <p:nvSpPr>
+          <p:cNvPr id="346" name="TextShape 4"/>
+          <p:cNvSpPr txBox="1"/>
+          <p:nvPr/>
+        </p:nvSpPr>
+        <p:spPr>
+          <a:xfrm>
+            <a:off x="648000" y="1836000"/>
+            <a:ext cx="3240000" cy="346320"/>
+          </a:xfrm>
+          <a:prstGeom prst="rect">
+            <a:avLst/>
+          </a:prstGeom>
+          <a:noFill/>
+          <a:ln>
+            <a:noFill/>
+          </a:ln>
+        </p:spPr>
+        <p:txBody>
+          <a:bodyPr lIns="90000" rIns="90000" tIns="45000" bIns="45000">
+            <a:noAutofit/>
+          </a:bodyPr>
+          <a:p>
+            <a:r>
+              <a:rPr b="0" lang="en-IN" sz="1800" spc="-1" strike="noStrike">
+                <a:latin typeface="Arial"/>
+              </a:rPr>
+              <a:t>Relation table</a:t>
+            </a:r>
+            <a:endParaRPr b="0" lang="en-IN" sz="1800" spc="-1" strike="noStrike">
+              <a:latin typeface="Arial"/>
+            </a:endParaRPr>
+          </a:p>
+        </p:txBody>
+      </p:sp>
+      <p:sp>
+        <p:nvSpPr>
+          <p:cNvPr id="347" name="TextShape 5"/>
+          <p:cNvSpPr txBox="1"/>
+          <p:nvPr/>
+        </p:nvSpPr>
+        <p:spPr>
+          <a:xfrm>
+            <a:off x="5436000" y="2160000"/>
+            <a:ext cx="3240000" cy="346320"/>
+          </a:xfrm>
+          <a:prstGeom prst="rect">
+            <a:avLst/>
+          </a:prstGeom>
+          <a:noFill/>
+          <a:ln>
+            <a:noFill/>
+          </a:ln>
+        </p:spPr>
+        <p:txBody>
+          <a:bodyPr lIns="90000" rIns="90000" tIns="45000" bIns="45000">
+            <a:noAutofit/>
+          </a:bodyPr>
+          <a:p>
+            <a:r>
+              <a:rPr b="0" lang="en-IN" sz="1800" spc="-1" strike="noStrike">
+                <a:latin typeface="Arial"/>
+              </a:rPr>
+              <a:t>File</a:t>
+            </a:r>
+            <a:endParaRPr b="0" lang="en-IN" sz="1800" spc="-1" strike="noStrike">
+              <a:latin typeface="Arial"/>
+            </a:endParaRPr>
+          </a:p>
+        </p:txBody>
+      </p:sp>
+      <p:sp>
+        <p:nvSpPr>
+          <p:cNvPr id="348" name="Line 6"/>
+          <p:cNvSpPr/>
+          <p:nvPr/>
+        </p:nvSpPr>
+        <p:spPr>
+          <a:xfrm>
+            <a:off x="8496000" y="2808000"/>
+            <a:ext cx="0" cy="1368000"/>
+          </a:xfrm>
+          <a:prstGeom prst="line">
+            <a:avLst/>
+          </a:prstGeom>
+          <a:ln>
+            <a:solidFill>
+              <a:srgbClr val="3465a4"/>
+            </a:solidFill>
+          </a:ln>
+        </p:spPr>
+        <p:style>
+          <a:lnRef idx="0"/>
+          <a:fillRef idx="0"/>
+          <a:effectRef idx="0"/>
+          <a:fontRef idx="minor"/>
+        </p:style>
+      </p:sp>
+      <p:sp>
+        <p:nvSpPr>
+          <p:cNvPr id="349" name="TextShape 7"/>
+          <p:cNvSpPr txBox="1"/>
+          <p:nvPr/>
+        </p:nvSpPr>
+        <p:spPr>
+          <a:xfrm>
+            <a:off x="8676000" y="2988000"/>
+            <a:ext cx="1044000" cy="756000"/>
+          </a:xfrm>
+          <a:prstGeom prst="rect">
+            <a:avLst/>
+          </a:prstGeom>
+          <a:noFill/>
+          <a:ln>
+            <a:noFill/>
+          </a:ln>
+        </p:spPr>
+        <p:txBody>
+          <a:bodyPr lIns="90000" rIns="90000" tIns="45000" bIns="45000">
+            <a:noAutofit/>
+          </a:bodyPr>
+          <a:p>
+            <a:r>
+              <a:rPr b="0" lang="en-IN" sz="1800" spc="-1" strike="noStrike">
+                <a:latin typeface="Arial"/>
+              </a:rPr>
+              <a:t>Records in a file</a:t>
+            </a:r>
+            <a:endParaRPr b="0" lang="en-IN" sz="1800" spc="-1" strike="noStrike">
+              <a:latin typeface="Arial"/>
+            </a:endParaRPr>
+          </a:p>
+        </p:txBody>
+      </p:sp>
+      <p:sp>
+        <p:nvSpPr>
+          <p:cNvPr id="350" name="Line 8"/>
+          <p:cNvSpPr/>
+          <p:nvPr/>
+        </p:nvSpPr>
+        <p:spPr>
+          <a:xfrm>
+            <a:off x="3817080" y="2880000"/>
+            <a:ext cx="1680120" cy="504000"/>
+          </a:xfrm>
+          <a:prstGeom prst="line">
+            <a:avLst/>
+          </a:prstGeom>
+          <a:ln>
+            <a:solidFill>
+              <a:srgbClr val="3465a4"/>
+            </a:solidFill>
+            <a:headEnd len="med" type="oval" w="med"/>
+            <a:tailEnd len="med" type="triangle" w="med"/>
+          </a:ln>
+        </p:spPr>
+        <p:style>
+          <a:lnRef idx="0"/>
+          <a:fillRef idx="0"/>
+          <a:effectRef idx="0"/>
+          <a:fontRef idx="minor"/>
+        </p:style>
+      </p:sp>
+      <p:sp>
+        <p:nvSpPr>
+          <p:cNvPr id="351" name="Line 9"/>
+          <p:cNvSpPr/>
+          <p:nvPr/>
+        </p:nvSpPr>
+        <p:spPr>
+          <a:xfrm>
+            <a:off x="3816360" y="3295800"/>
+            <a:ext cx="1680120" cy="504000"/>
+          </a:xfrm>
+          <a:prstGeom prst="line">
+            <a:avLst/>
+          </a:prstGeom>
+          <a:ln>
+            <a:solidFill>
+              <a:srgbClr val="3465a4"/>
+            </a:solidFill>
+            <a:headEnd len="med" type="oval" w="med"/>
+            <a:tailEnd len="med" type="triangle" w="med"/>
+          </a:ln>
+        </p:spPr>
+        <p:style>
+          <a:lnRef idx="0"/>
+          <a:fillRef idx="0"/>
+          <a:effectRef idx="0"/>
+          <a:fontRef idx="minor"/>
+        </p:style>
+      </p:sp>
+      <p:sp>
+        <p:nvSpPr>
+          <p:cNvPr id="352" name="Line 10"/>
+          <p:cNvSpPr/>
+          <p:nvPr/>
+        </p:nvSpPr>
+        <p:spPr>
+          <a:xfrm>
+            <a:off x="3815640" y="3675600"/>
+            <a:ext cx="1680120" cy="504000"/>
+          </a:xfrm>
+          <a:prstGeom prst="line">
+            <a:avLst/>
+          </a:prstGeom>
+          <a:ln>
+            <a:solidFill>
+              <a:srgbClr val="3465a4"/>
+            </a:solidFill>
+            <a:headEnd len="med" type="oval" w="med"/>
+            <a:tailEnd len="med" type="triangle" w="med"/>
+          </a:ln>
+        </p:spPr>
+        <p:style>
+          <a:lnRef idx="0"/>
+          <a:fillRef idx="0"/>
+          <a:effectRef idx="0"/>
+          <a:fontRef idx="minor"/>
+        </p:style>
+      </p:sp>
+      <p:sp>
+        <p:nvSpPr>
+          <p:cNvPr id="353" name="TextShape 11"/>
+          <p:cNvSpPr txBox="1"/>
+          <p:nvPr/>
+        </p:nvSpPr>
+        <p:spPr>
+          <a:xfrm>
+            <a:off x="2448000" y="4464000"/>
+            <a:ext cx="5832000" cy="756000"/>
+          </a:xfrm>
+          <a:prstGeom prst="rect">
+            <a:avLst/>
+          </a:prstGeom>
+          <a:noFill/>
+          <a:ln>
+            <a:noFill/>
+          </a:ln>
+        </p:spPr>
+        <p:txBody>
+          <a:bodyPr lIns="90000" rIns="90000" tIns="45000" bIns="45000">
+            <a:noAutofit/>
+          </a:bodyPr>
+          <a:p>
+            <a:r>
+              <a:rPr b="0" lang="en-IN" sz="1800" spc="-1" strike="noStrike">
+                <a:latin typeface="Arial"/>
+              </a:rPr>
+              <a:t>Each tuple in the table is stored as a fixed length record in the file</a:t>
+            </a:r>
+            <a:endParaRPr b="0" lang="en-IN" sz="1800" spc="-1" strike="noStrike">
+              <a:latin typeface="Arial"/>
+            </a:endParaRPr>
+          </a:p>
+        </p:txBody>
+      </p:sp>
+    </p:spTree>
+  </p:cSld>
+  <mc:AlternateContent>
+    <mc:Choice Requires="p14">
+      <p:transition spd="slow" p14:dur="2000"/>
+    </mc:Choice>
+    <mc:Fallback>
+      <p:transition spd="slow"/>
+    </mc:Fallback>
+  </mc:AlternateContent>
+</p:sld>
+</file>
+
+<file path=ppt/slides/slide19.xml><?xml version="1.0" encoding="utf-8"?>
+<p:sld xmlns:a="http://schemas.openxmlformats.org/drawingml/2006/main" xmlns:p="http://schemas.openxmlformats.org/presentationml/2006/main" xmlns:r="http://schemas.openxmlformats.org/officeDocument/2006/relationships" xmlns:p14="http://schemas.microsoft.com/office/powerpoint/2010/main" xmlns:p15="http://schemas.microsoft.com/office/powerpoint/2012/main" xmlns:mc="http://schemas.openxmlformats.org/markup-compatibility/2006">
+  <p:cSld>
+    <p:spTree>
+      <p:nvGrpSpPr>
+        <p:cNvPr id="1" name=""/>
+        <p:cNvGrpSpPr/>
+        <p:nvPr/>
+      </p:nvGrpSpPr>
+      <p:grpSpPr>
+        <a:xfrm>
+          <a:off x="0" y="0"/>
+          <a:ext cx="0" cy="0"/>
+          <a:chOff x="0" y="0"/>
+          <a:chExt cx="0" cy="0"/>
+        </a:xfrm>
+      </p:grpSpPr>
+    </p:spTree>
+  </p:cSld>
+  <mc:AlternateContent>
+    <mc:Choice Requires="p14">
+      <p:transition spd="slow" p14:dur="2000"/>
+    </mc:Choice>
+    <mc:Fallback>
+      <p:transition spd="slow"/>
+    </mc:Fallback>
+  </mc:AlternateContent>
+</p:sld>
+</file>
+
 <file path=ppt/slides/slide2.xml><?xml version="1.0" encoding="utf-8"?>
 <p:sld xmlns:a="http://schemas.openxmlformats.org/drawingml/2006/main" xmlns:p="http://schemas.openxmlformats.org/presentationml/2006/main" xmlns:r="http://schemas.openxmlformats.org/officeDocument/2006/relationships" xmlns:p14="http://schemas.microsoft.com/office/powerpoint/2010/main" xmlns:p15="http://schemas.microsoft.com/office/powerpoint/2012/main" xmlns:mc="http://schemas.openxmlformats.org/markup-compatibility/2006">
   <p:cSld>
@@ -10053,7 +12324,7 @@
         <p:spPr>
           <a:xfrm>
             <a:off x="1908000" y="936000"/>
-            <a:ext cx="1436760" cy="788760"/>
+            <a:ext cx="1436040" cy="788040"/>
           </a:xfrm>
           <a:prstGeom prst="rect">
             <a:avLst/>
@@ -10108,7 +12379,7 @@
         <p:spPr>
           <a:xfrm>
             <a:off x="6084000" y="936000"/>
-            <a:ext cx="1436760" cy="788760"/>
+            <a:ext cx="1436040" cy="788040"/>
           </a:xfrm>
           <a:prstGeom prst="rect">
             <a:avLst/>
@@ -10163,7 +12434,7 @@
         <p:spPr>
           <a:xfrm>
             <a:off x="1908000" y="4068000"/>
-            <a:ext cx="1436760" cy="788760"/>
+            <a:ext cx="1436040" cy="788040"/>
           </a:xfrm>
           <a:prstGeom prst="rect">
             <a:avLst/>
@@ -10218,7 +12489,7 @@
         <p:spPr>
           <a:xfrm>
             <a:off x="4032000" y="648000"/>
-            <a:ext cx="1436760" cy="1364760"/>
+            <a:ext cx="1436040" cy="1364040"/>
           </a:xfrm>
           <a:custGeom>
             <a:avLst/>
@@ -10316,7 +12587,7 @@
         <p:spPr>
           <a:xfrm>
             <a:off x="1872000" y="2232360"/>
-            <a:ext cx="1436760" cy="1364760"/>
+            <a:ext cx="1436040" cy="1364040"/>
           </a:xfrm>
           <a:custGeom>
             <a:avLst/>
@@ -10522,7 +12793,7 @@
         <p:spPr>
           <a:xfrm>
             <a:off x="5184000" y="2340000"/>
-            <a:ext cx="2012760" cy="572760"/>
+            <a:ext cx="2012040" cy="572040"/>
           </a:xfrm>
           <a:prstGeom prst="ellipse">
             <a:avLst/>
@@ -10577,7 +12848,7 @@
         <p:spPr>
           <a:xfrm>
             <a:off x="3960360" y="3240360"/>
-            <a:ext cx="2012760" cy="572760"/>
+            <a:ext cx="2012040" cy="572040"/>
           </a:xfrm>
           <a:prstGeom prst="ellipse">
             <a:avLst/>
@@ -10716,7 +12987,7 @@
         <p:spPr>
           <a:xfrm>
             <a:off x="3060000" y="2268000"/>
-            <a:ext cx="1436760" cy="788760"/>
+            <a:ext cx="1436040" cy="788040"/>
           </a:xfrm>
           <a:prstGeom prst="rect">
             <a:avLst/>
@@ -10771,7 +13042,7 @@
         <p:spPr>
           <a:xfrm>
             <a:off x="5832000" y="1980000"/>
-            <a:ext cx="1436760" cy="1364760"/>
+            <a:ext cx="1436040" cy="1364040"/>
           </a:xfrm>
           <a:custGeom>
             <a:avLst/>
@@ -10923,7 +13194,7 @@
         <p:spPr>
           <a:xfrm>
             <a:off x="2376000" y="1044000"/>
-            <a:ext cx="1148760" cy="680760"/>
+            <a:ext cx="1148040" cy="680040"/>
           </a:xfrm>
           <a:prstGeom prst="ellipse">
             <a:avLst/>
@@ -10978,7 +13249,7 @@
         <p:spPr>
           <a:xfrm>
             <a:off x="3780360" y="1044360"/>
-            <a:ext cx="1148760" cy="680760"/>
+            <a:ext cx="1148040" cy="680040"/>
           </a:xfrm>
           <a:prstGeom prst="ellipse">
             <a:avLst/>
@@ -11033,7 +13304,7 @@
         <p:spPr>
           <a:xfrm>
             <a:off x="2376360" y="1044360"/>
-            <a:ext cx="1148760" cy="680760"/>
+            <a:ext cx="1148040" cy="680040"/>
           </a:xfrm>
           <a:prstGeom prst="ellipse">
             <a:avLst/>
@@ -11088,7 +13359,7 @@
         <p:spPr>
           <a:xfrm>
             <a:off x="1512720" y="2160720"/>
-            <a:ext cx="1148760" cy="680760"/>
+            <a:ext cx="1148040" cy="680040"/>
           </a:xfrm>
           <a:prstGeom prst="ellipse">
             <a:avLst/>
@@ -11224,7 +13495,7 @@
         <p:spPr>
           <a:xfrm>
             <a:off x="4500000" y="2376000"/>
-            <a:ext cx="1400760" cy="599040"/>
+            <a:ext cx="1400040" cy="598320"/>
           </a:xfrm>
           <a:prstGeom prst="rect">
             <a:avLst/>
@@ -11275,7 +13546,7 @@
         <p:spPr>
           <a:xfrm>
             <a:off x="4320000" y="3204360"/>
-            <a:ext cx="1400760" cy="599040"/>
+            <a:ext cx="1400040" cy="598320"/>
           </a:xfrm>
           <a:prstGeom prst="rect">
             <a:avLst/>
@@ -11356,7 +13627,7 @@
         <p:spPr>
           <a:xfrm>
             <a:off x="504000" y="576000"/>
-            <a:ext cx="429120" cy="1653120"/>
+            <a:ext cx="428400" cy="1652400"/>
           </a:xfrm>
           <a:prstGeom prst="ellipse">
             <a:avLst/>
@@ -11386,7 +13657,7 @@
         <p:spPr>
           <a:xfrm>
             <a:off x="1440360" y="576360"/>
-            <a:ext cx="429120" cy="1653120"/>
+            <a:ext cx="428400" cy="1652400"/>
           </a:xfrm>
           <a:prstGeom prst="ellipse">
             <a:avLst/>
@@ -11416,7 +13687,7 @@
         <p:spPr>
           <a:xfrm>
             <a:off x="3204720" y="612720"/>
-            <a:ext cx="429120" cy="1653120"/>
+            <a:ext cx="428400" cy="1652400"/>
           </a:xfrm>
           <a:prstGeom prst="ellipse">
             <a:avLst/>
@@ -11446,7 +13717,7 @@
         <p:spPr>
           <a:xfrm>
             <a:off x="4068720" y="576720"/>
-            <a:ext cx="429120" cy="1653120"/>
+            <a:ext cx="428400" cy="1652400"/>
           </a:xfrm>
           <a:prstGeom prst="ellipse">
             <a:avLst/>
@@ -11476,7 +13747,7 @@
         <p:spPr>
           <a:xfrm>
             <a:off x="504720" y="3204720"/>
-            <a:ext cx="429120" cy="1653120"/>
+            <a:ext cx="428400" cy="1652400"/>
           </a:xfrm>
           <a:prstGeom prst="ellipse">
             <a:avLst/>
@@ -11506,7 +13777,7 @@
         <p:spPr>
           <a:xfrm>
             <a:off x="1440720" y="3168720"/>
-            <a:ext cx="429120" cy="1653120"/>
+            <a:ext cx="428400" cy="1652400"/>
           </a:xfrm>
           <a:prstGeom prst="ellipse">
             <a:avLst/>
@@ -11536,7 +13807,7 @@
         <p:spPr>
           <a:xfrm>
             <a:off x="3240720" y="3168720"/>
-            <a:ext cx="429120" cy="1653120"/>
+            <a:ext cx="428400" cy="1652400"/>
           </a:xfrm>
           <a:prstGeom prst="ellipse">
             <a:avLst/>
@@ -11566,7 +13837,7 @@
         <p:spPr>
           <a:xfrm>
             <a:off x="4068720" y="3168720"/>
-            <a:ext cx="429120" cy="1653120"/>
+            <a:ext cx="428400" cy="1652400"/>
           </a:xfrm>
           <a:prstGeom prst="ellipse">
             <a:avLst/>
@@ -11596,7 +13867,7 @@
         <p:spPr>
           <a:xfrm>
             <a:off x="540000" y="936000"/>
-            <a:ext cx="501120" cy="343440"/>
+            <a:ext cx="500400" cy="342720"/>
           </a:xfrm>
           <a:prstGeom prst="rect">
             <a:avLst/>
@@ -11647,7 +13918,7 @@
         <p:spPr>
           <a:xfrm>
             <a:off x="540000" y="1512000"/>
-            <a:ext cx="501120" cy="343440"/>
+            <a:ext cx="500400" cy="342720"/>
           </a:xfrm>
           <a:prstGeom prst="rect">
             <a:avLst/>
@@ -11698,7 +13969,7 @@
         <p:spPr>
           <a:xfrm>
             <a:off x="1512000" y="1512000"/>
-            <a:ext cx="501120" cy="343440"/>
+            <a:ext cx="500400" cy="342720"/>
           </a:xfrm>
           <a:prstGeom prst="rect">
             <a:avLst/>
@@ -11749,7 +14020,7 @@
         <p:spPr>
           <a:xfrm>
             <a:off x="1512000" y="900000"/>
-            <a:ext cx="501120" cy="343440"/>
+            <a:ext cx="500400" cy="342720"/>
           </a:xfrm>
           <a:prstGeom prst="rect">
             <a:avLst/>
@@ -11800,7 +14071,7 @@
         <p:spPr>
           <a:xfrm>
             <a:off x="540000" y="1260000"/>
-            <a:ext cx="501120" cy="343440"/>
+            <a:ext cx="500400" cy="342720"/>
           </a:xfrm>
           <a:prstGeom prst="rect">
             <a:avLst/>
@@ -11851,7 +14122,7 @@
         <p:spPr>
           <a:xfrm>
             <a:off x="1512000" y="1224000"/>
-            <a:ext cx="501120" cy="343440"/>
+            <a:ext cx="500400" cy="342720"/>
           </a:xfrm>
           <a:prstGeom prst="rect">
             <a:avLst/>
@@ -11902,7 +14173,7 @@
         <p:spPr>
           <a:xfrm>
             <a:off x="3240000" y="900000"/>
-            <a:ext cx="501120" cy="343440"/>
+            <a:ext cx="500400" cy="342720"/>
           </a:xfrm>
           <a:prstGeom prst="rect">
             <a:avLst/>
@@ -11953,7 +14224,7 @@
         <p:spPr>
           <a:xfrm>
             <a:off x="4104000" y="900000"/>
-            <a:ext cx="501120" cy="343440"/>
+            <a:ext cx="500400" cy="342720"/>
           </a:xfrm>
           <a:prstGeom prst="rect">
             <a:avLst/>
@@ -12004,7 +14275,7 @@
         <p:spPr>
           <a:xfrm>
             <a:off x="4104000" y="1224000"/>
-            <a:ext cx="501120" cy="343440"/>
+            <a:ext cx="500400" cy="342720"/>
           </a:xfrm>
           <a:prstGeom prst="rect">
             <a:avLst/>
@@ -12055,7 +14326,7 @@
         <p:spPr>
           <a:xfrm>
             <a:off x="4104000" y="1620000"/>
-            <a:ext cx="501120" cy="343440"/>
+            <a:ext cx="500400" cy="342720"/>
           </a:xfrm>
           <a:prstGeom prst="rect">
             <a:avLst/>
@@ -12106,7 +14377,7 @@
         <p:spPr>
           <a:xfrm>
             <a:off x="576000" y="3492000"/>
-            <a:ext cx="501120" cy="343440"/>
+            <a:ext cx="500400" cy="342720"/>
           </a:xfrm>
           <a:prstGeom prst="rect">
             <a:avLst/>
@@ -12157,7 +14428,7 @@
         <p:spPr>
           <a:xfrm>
             <a:off x="576000" y="3852000"/>
-            <a:ext cx="501120" cy="343440"/>
+            <a:ext cx="500400" cy="342720"/>
           </a:xfrm>
           <a:prstGeom prst="rect">
             <a:avLst/>
@@ -12208,7 +14479,7 @@
         <p:spPr>
           <a:xfrm>
             <a:off x="576000" y="4176000"/>
-            <a:ext cx="501120" cy="343440"/>
+            <a:ext cx="500400" cy="342720"/>
           </a:xfrm>
           <a:prstGeom prst="rect">
             <a:avLst/>
@@ -12259,7 +14530,7 @@
         <p:spPr>
           <a:xfrm>
             <a:off x="1476000" y="3492000"/>
-            <a:ext cx="501120" cy="343440"/>
+            <a:ext cx="500400" cy="342720"/>
           </a:xfrm>
           <a:prstGeom prst="rect">
             <a:avLst/>
@@ -12310,7 +14581,7 @@
         <p:spPr>
           <a:xfrm>
             <a:off x="3240000" y="3492000"/>
-            <a:ext cx="501120" cy="343440"/>
+            <a:ext cx="500400" cy="342720"/>
           </a:xfrm>
           <a:prstGeom prst="rect">
             <a:avLst/>
@@ -12361,7 +14632,7 @@
         <p:spPr>
           <a:xfrm>
             <a:off x="3276000" y="3960000"/>
-            <a:ext cx="501120" cy="343440"/>
+            <a:ext cx="500400" cy="342720"/>
           </a:xfrm>
           <a:prstGeom prst="rect">
             <a:avLst/>
@@ -12412,7 +14683,7 @@
         <p:spPr>
           <a:xfrm>
             <a:off x="4140000" y="3492000"/>
-            <a:ext cx="501120" cy="343440"/>
+            <a:ext cx="500400" cy="342720"/>
           </a:xfrm>
           <a:prstGeom prst="rect">
             <a:avLst/>
@@ -12463,7 +14734,7 @@
         <p:spPr>
           <a:xfrm>
             <a:off x="4140000" y="3924000"/>
-            <a:ext cx="501120" cy="343440"/>
+            <a:ext cx="500400" cy="342720"/>
           </a:xfrm>
           <a:prstGeom prst="rect">
             <a:avLst/>
@@ -12811,7 +15082,7 @@
         <p:spPr>
           <a:xfrm>
             <a:off x="540000" y="2412000"/>
-            <a:ext cx="1293120" cy="343440"/>
+            <a:ext cx="1292400" cy="342720"/>
           </a:xfrm>
           <a:prstGeom prst="rect">
             <a:avLst/>
@@ -12862,7 +15133,7 @@
         <p:spPr>
           <a:xfrm>
             <a:off x="3168000" y="2412000"/>
-            <a:ext cx="1437120" cy="393120"/>
+            <a:ext cx="1436400" cy="392400"/>
           </a:xfrm>
           <a:prstGeom prst="rect">
             <a:avLst/>
@@ -12913,7 +15184,7 @@
         <p:spPr>
           <a:xfrm>
             <a:off x="3168000" y="4968000"/>
-            <a:ext cx="1581120" cy="357120"/>
+            <a:ext cx="1580400" cy="356400"/>
           </a:xfrm>
           <a:prstGeom prst="rect">
             <a:avLst/>
@@ -12964,7 +15235,7 @@
         <p:spPr>
           <a:xfrm>
             <a:off x="504000" y="4968000"/>
-            <a:ext cx="1437120" cy="357120"/>
+            <a:ext cx="1436400" cy="356400"/>
           </a:xfrm>
           <a:prstGeom prst="rect">
             <a:avLst/>
@@ -13045,7 +15316,7 @@
         <p:spPr>
           <a:xfrm>
             <a:off x="1872000" y="1008000"/>
-            <a:ext cx="2085480" cy="789480"/>
+            <a:ext cx="2084760" cy="788760"/>
           </a:xfrm>
           <a:prstGeom prst="rect">
             <a:avLst/>
@@ -13075,7 +15346,7 @@
         <p:spPr>
           <a:xfrm>
             <a:off x="5328000" y="756000"/>
-            <a:ext cx="1653480" cy="1221480"/>
+            <a:ext cx="1652760" cy="1220760"/>
           </a:xfrm>
           <a:custGeom>
             <a:avLst/>
@@ -13128,7 +15399,7 @@
         <p:spPr>
           <a:xfrm>
             <a:off x="1872360" y="3672360"/>
-            <a:ext cx="2085480" cy="789480"/>
+            <a:ext cx="2084760" cy="788760"/>
           </a:xfrm>
           <a:prstGeom prst="rect">
             <a:avLst/>
@@ -13158,7 +15429,7 @@
         <p:spPr>
           <a:xfrm>
             <a:off x="5328360" y="3420360"/>
-            <a:ext cx="1653480" cy="1221480"/>
+            <a:ext cx="1652760" cy="1220760"/>
           </a:xfrm>
           <a:custGeom>
             <a:avLst/>
@@ -13266,7 +15537,7 @@
         <p:spPr>
           <a:xfrm>
             <a:off x="1188000" y="2304000"/>
-            <a:ext cx="6909480" cy="343800"/>
+            <a:ext cx="6908760" cy="343080"/>
           </a:xfrm>
           <a:prstGeom prst="rect">
             <a:avLst/>
@@ -13317,7 +15588,7 @@
         <p:spPr>
           <a:xfrm>
             <a:off x="1080000" y="4788000"/>
-            <a:ext cx="7161480" cy="599760"/>
+            <a:ext cx="7160760" cy="599040"/>
           </a:xfrm>
           <a:prstGeom prst="rect">
             <a:avLst/>
@@ -13398,7 +15669,7 @@
         <p:spPr>
           <a:xfrm>
             <a:off x="1908000" y="2232000"/>
-            <a:ext cx="1436760" cy="788760"/>
+            <a:ext cx="1436040" cy="788040"/>
           </a:xfrm>
           <a:prstGeom prst="rect">
             <a:avLst/>
@@ -13453,7 +15724,7 @@
         <p:spPr>
           <a:xfrm>
             <a:off x="6084000" y="2232000"/>
-            <a:ext cx="1436760" cy="788760"/>
+            <a:ext cx="1436040" cy="788040"/>
           </a:xfrm>
           <a:prstGeom prst="rect">
             <a:avLst/>
@@ -13508,7 +15779,7 @@
         <p:spPr>
           <a:xfrm>
             <a:off x="4032000" y="1944000"/>
-            <a:ext cx="1436760" cy="1364760"/>
+            <a:ext cx="1436040" cy="1364040"/>
           </a:xfrm>
           <a:custGeom>
             <a:avLst/>
@@ -13715,7 +15986,7 @@
         <p:spPr>
           <a:xfrm>
             <a:off x="2592000" y="3636000"/>
-            <a:ext cx="7125480" cy="599760"/>
+            <a:ext cx="7124760" cy="599040"/>
           </a:xfrm>
           <a:prstGeom prst="rect">
             <a:avLst/>
@@ -13816,7 +16087,7 @@
         <p:spPr>
           <a:xfrm>
             <a:off x="5934960" y="2130480"/>
-            <a:ext cx="1695240" cy="1006200"/>
+            <a:ext cx="1694520" cy="1005480"/>
           </a:xfrm>
           <a:prstGeom prst="rect">
             <a:avLst/>
@@ -13846,7 +16117,7 @@
         <p:spPr>
           <a:xfrm>
             <a:off x="1908000" y="2232000"/>
-            <a:ext cx="1436760" cy="788760"/>
+            <a:ext cx="1436040" cy="788040"/>
           </a:xfrm>
           <a:prstGeom prst="rect">
             <a:avLst/>
@@ -13901,7 +16172,7 @@
         <p:spPr>
           <a:xfrm>
             <a:off x="6084000" y="2232000"/>
-            <a:ext cx="1436760" cy="788760"/>
+            <a:ext cx="1436040" cy="788040"/>
           </a:xfrm>
           <a:prstGeom prst="rect">
             <a:avLst/>
@@ -13956,7 +16227,7 @@
         <p:spPr>
           <a:xfrm>
             <a:off x="4032000" y="1944000"/>
-            <a:ext cx="1436760" cy="1364760"/>
+            <a:ext cx="1436040" cy="1364040"/>
           </a:xfrm>
           <a:custGeom>
             <a:avLst/>
@@ -14115,7 +16386,7 @@
         <p:spPr>
           <a:xfrm>
             <a:off x="1764000" y="3564000"/>
-            <a:ext cx="7125480" cy="599760"/>
+            <a:ext cx="7124760" cy="599040"/>
           </a:xfrm>
           <a:prstGeom prst="rect">
             <a:avLst/>
@@ -14223,7 +16494,7 @@
         <p:spPr>
           <a:xfrm>
             <a:off x="1945800" y="3636000"/>
-            <a:ext cx="1436760" cy="788760"/>
+            <a:ext cx="1436040" cy="788040"/>
           </a:xfrm>
           <a:prstGeom prst="rect">
             <a:avLst/>
@@ -14298,7 +16569,7 @@
         <p:spPr>
           <a:xfrm>
             <a:off x="6300000" y="3673800"/>
-            <a:ext cx="1436760" cy="788760"/>
+            <a:ext cx="1436040" cy="788040"/>
           </a:xfrm>
           <a:prstGeom prst="rect">
             <a:avLst/>
@@ -14427,7 +16698,7 @@
         <p:spPr>
           <a:xfrm>
             <a:off x="1764000" y="4860000"/>
-            <a:ext cx="7125480" cy="599760"/>
+            <a:ext cx="7124760" cy="599040"/>
           </a:xfrm>
           <a:prstGeom prst="rect">
             <a:avLst/>
@@ -14453,7 +16724,7 @@
         <p:spPr>
           <a:xfrm>
             <a:off x="4140000" y="1080000"/>
-            <a:ext cx="1436760" cy="788760"/>
+            <a:ext cx="1436040" cy="788040"/>
           </a:xfrm>
           <a:prstGeom prst="rect">
             <a:avLst/>
@@ -14508,7 +16779,7 @@
         <p:spPr>
           <a:xfrm>
             <a:off x="4392000" y="2267640"/>
-            <a:ext cx="934560" cy="1006560"/>
+            <a:ext cx="933840" cy="1005840"/>
           </a:xfrm>
           <a:custGeom>
             <a:avLst/>
@@ -14557,7 +16828,7 @@
         <p:spPr>
           <a:xfrm>
             <a:off x="4572000" y="2304000"/>
-            <a:ext cx="646560" cy="344880"/>
+            <a:ext cx="645840" cy="344160"/>
           </a:xfrm>
           <a:prstGeom prst="rect">
             <a:avLst/>
@@ -14689,7 +16960,7 @@
         <p:spPr>
           <a:xfrm>
             <a:off x="2592000" y="432000"/>
-            <a:ext cx="1150560" cy="502560"/>
+            <a:ext cx="1149840" cy="501840"/>
           </a:xfrm>
           <a:prstGeom prst="ellipse">
             <a:avLst/>
@@ -14744,7 +17015,7 @@
         <p:spPr>
           <a:xfrm>
             <a:off x="4104360" y="360360"/>
-            <a:ext cx="1150560" cy="502560"/>
+            <a:ext cx="1149840" cy="501840"/>
           </a:xfrm>
           <a:prstGeom prst="ellipse">
             <a:avLst/>
@@ -14799,7 +17070,7 @@
         <p:spPr>
           <a:xfrm>
             <a:off x="5652720" y="432720"/>
-            <a:ext cx="1150560" cy="502560"/>
+            <a:ext cx="1149840" cy="501840"/>
           </a:xfrm>
           <a:prstGeom prst="ellipse">
             <a:avLst/>
@@ -14854,7 +17125,7 @@
         <p:spPr>
           <a:xfrm>
             <a:off x="3813480" y="4321080"/>
-            <a:ext cx="1150560" cy="502560"/>
+            <a:ext cx="1149840" cy="501840"/>
           </a:xfrm>
           <a:prstGeom prst="ellipse">
             <a:avLst/>
@@ -14909,7 +17180,7 @@
         <p:spPr>
           <a:xfrm>
             <a:off x="2193840" y="4717440"/>
-            <a:ext cx="1150560" cy="502560"/>
+            <a:ext cx="1149840" cy="501840"/>
           </a:xfrm>
           <a:prstGeom prst="ellipse">
             <a:avLst/>
@@ -14964,7 +17235,7 @@
         <p:spPr>
           <a:xfrm>
             <a:off x="682200" y="4501800"/>
-            <a:ext cx="1150560" cy="502560"/>
+            <a:ext cx="1149840" cy="501840"/>
           </a:xfrm>
           <a:prstGeom prst="ellipse">
             <a:avLst/>
@@ -15019,7 +17290,7 @@
         <p:spPr>
           <a:xfrm>
             <a:off x="5434560" y="4574160"/>
-            <a:ext cx="1150560" cy="502560"/>
+            <a:ext cx="1149840" cy="501840"/>
           </a:xfrm>
           <a:prstGeom prst="ellipse">
             <a:avLst/>
@@ -15074,7 +17345,7 @@
         <p:spPr>
           <a:xfrm>
             <a:off x="7634160" y="4574520"/>
-            <a:ext cx="1150560" cy="502560"/>
+            <a:ext cx="1149840" cy="501840"/>
           </a:xfrm>
           <a:prstGeom prst="ellipse">
             <a:avLst/>
@@ -15129,7 +17400,7 @@
         <p:spPr>
           <a:xfrm>
             <a:off x="686520" y="3098880"/>
-            <a:ext cx="1150560" cy="502560"/>
+            <a:ext cx="1149840" cy="501840"/>
           </a:xfrm>
           <a:prstGeom prst="ellipse">
             <a:avLst/>
@@ -15457,7 +17728,7 @@
         <p:spPr>
           <a:xfrm>
             <a:off x="432000" y="72000"/>
-            <a:ext cx="9070560" cy="2518560"/>
+            <a:ext cx="9069840" cy="2517840"/>
           </a:xfrm>
           <a:prstGeom prst="rect">
             <a:avLst/>
@@ -15487,7 +17758,7 @@
         <p:spPr>
           <a:xfrm>
             <a:off x="2016000" y="1188000"/>
-            <a:ext cx="1436760" cy="788760"/>
+            <a:ext cx="1436040" cy="788040"/>
           </a:xfrm>
           <a:prstGeom prst="rect">
             <a:avLst/>
@@ -15542,7 +17813,7 @@
         <p:spPr>
           <a:xfrm>
             <a:off x="6192000" y="1188000"/>
-            <a:ext cx="1436760" cy="788760"/>
+            <a:ext cx="1436040" cy="788040"/>
           </a:xfrm>
           <a:prstGeom prst="rect">
             <a:avLst/>
@@ -15597,7 +17868,7 @@
         <p:spPr>
           <a:xfrm>
             <a:off x="4140000" y="900000"/>
-            <a:ext cx="1436760" cy="1364760"/>
+            <a:ext cx="1436040" cy="1364040"/>
           </a:xfrm>
           <a:custGeom>
             <a:avLst/>
@@ -15756,7 +18027,7 @@
         <p:spPr>
           <a:xfrm>
             <a:off x="-36000" y="3384000"/>
-            <a:ext cx="2626560" cy="599760"/>
+            <a:ext cx="2625840" cy="599040"/>
           </a:xfrm>
           <a:prstGeom prst="rect">
             <a:avLst/>
@@ -15834,7 +18105,7 @@
         <p:spPr>
           <a:xfrm>
             <a:off x="5868360" y="180360"/>
-            <a:ext cx="1150560" cy="502560"/>
+            <a:ext cx="1149840" cy="501840"/>
           </a:xfrm>
           <a:prstGeom prst="ellipse">
             <a:avLst/>
@@ -15889,7 +18160,7 @@
         <p:spPr>
           <a:xfrm>
             <a:off x="7344720" y="216720"/>
-            <a:ext cx="1150560" cy="502560"/>
+            <a:ext cx="1149840" cy="501840"/>
           </a:xfrm>
           <a:prstGeom prst="ellipse">
             <a:avLst/>
@@ -15944,7 +18215,7 @@
         <p:spPr>
           <a:xfrm>
             <a:off x="7921080" y="937080"/>
-            <a:ext cx="1150560" cy="502560"/>
+            <a:ext cx="1149840" cy="501840"/>
           </a:xfrm>
           <a:prstGeom prst="ellipse">
             <a:avLst/>
@@ -15999,7 +18270,7 @@
         <p:spPr>
           <a:xfrm>
             <a:off x="7921440" y="1693440"/>
-            <a:ext cx="1150560" cy="502560"/>
+            <a:ext cx="1149840" cy="501840"/>
           </a:xfrm>
           <a:prstGeom prst="ellipse">
             <a:avLst/>
@@ -16054,7 +18325,7 @@
         <p:spPr>
           <a:xfrm>
             <a:off x="7921440" y="937440"/>
-            <a:ext cx="1150560" cy="502560"/>
+            <a:ext cx="1149840" cy="501840"/>
           </a:xfrm>
           <a:prstGeom prst="ellipse">
             <a:avLst/>
@@ -16109,7 +18380,7 @@
         <p:spPr>
           <a:xfrm>
             <a:off x="2089440" y="433440"/>
-            <a:ext cx="1150560" cy="502560"/>
+            <a:ext cx="1149840" cy="501840"/>
           </a:xfrm>
           <a:prstGeom prst="ellipse">
             <a:avLst/>
@@ -16164,7 +18435,7 @@
         <p:spPr>
           <a:xfrm>
             <a:off x="649800" y="541800"/>
-            <a:ext cx="1150560" cy="502560"/>
+            <a:ext cx="1149840" cy="501840"/>
           </a:xfrm>
           <a:prstGeom prst="ellipse">
             <a:avLst/>
@@ -16219,7 +18490,7 @@
         <p:spPr>
           <a:xfrm>
             <a:off x="4320000" y="3168000"/>
-            <a:ext cx="1040760" cy="790560"/>
+            <a:ext cx="1040040" cy="789840"/>
           </a:xfrm>
           <a:custGeom>
             <a:avLst/>
@@ -16297,7 +18568,7 @@
         <p:spPr>
           <a:xfrm>
             <a:off x="4176000" y="4428000"/>
-            <a:ext cx="1436760" cy="788760"/>
+            <a:ext cx="1436040" cy="788040"/>
           </a:xfrm>
           <a:prstGeom prst="rect">
             <a:avLst/>
@@ -16433,7 +18704,7 @@
         <p:spPr>
           <a:xfrm>
             <a:off x="5870160" y="3782160"/>
-            <a:ext cx="1150560" cy="502560"/>
+            <a:ext cx="1149840" cy="501840"/>
           </a:xfrm>
           <a:prstGeom prst="ellipse">
             <a:avLst/>
@@ -16488,7 +18759,7 @@
         <p:spPr>
           <a:xfrm>
             <a:off x="7380000" y="3115440"/>
-            <a:ext cx="2626560" cy="599760"/>
+            <a:ext cx="2625840" cy="599040"/>
           </a:xfrm>
           <a:prstGeom prst="rect">
             <a:avLst/>

</xml_diff>

<commit_message>
DBMS: File System - 2
</commit_message>
<xml_diff>
--- a/GATE/images/gate_images.pptx
+++ b/GATE/images/gate_images.pptx
@@ -1665,7 +1665,7 @@
         <p:spPr>
           <a:xfrm>
             <a:off x="1836000" y="1332000"/>
-            <a:ext cx="2371680" cy="787680"/>
+            <a:ext cx="2371320" cy="787320"/>
           </a:xfrm>
           <a:prstGeom prst="rect">
             <a:avLst/>
@@ -1720,7 +1720,7 @@
         <p:spPr>
           <a:xfrm>
             <a:off x="1836000" y="2880000"/>
-            <a:ext cx="2371680" cy="787680"/>
+            <a:ext cx="2371320" cy="787320"/>
           </a:xfrm>
           <a:prstGeom prst="rect">
             <a:avLst/>
@@ -1785,7 +1785,7 @@
         <p:spPr>
           <a:xfrm>
             <a:off x="1836000" y="4176000"/>
-            <a:ext cx="2371680" cy="787680"/>
+            <a:ext cx="2371320" cy="787320"/>
           </a:xfrm>
           <a:prstGeom prst="rect">
             <a:avLst/>
@@ -1860,7 +1860,7 @@
         <p:spPr>
           <a:xfrm>
             <a:off x="5292000" y="900000"/>
-            <a:ext cx="2371680" cy="1507680"/>
+            <a:ext cx="2371320" cy="1507320"/>
           </a:xfrm>
           <a:prstGeom prst="rect">
             <a:avLst/>
@@ -1995,7 +1995,7 @@
         <p:spPr>
           <a:xfrm>
             <a:off x="5292000" y="2571480"/>
-            <a:ext cx="2371680" cy="1276200"/>
+            <a:ext cx="2371320" cy="1275840"/>
           </a:xfrm>
           <a:prstGeom prst="rect">
             <a:avLst/>
@@ -2110,7 +2110,7 @@
         <p:spPr>
           <a:xfrm>
             <a:off x="5292000" y="4047480"/>
-            <a:ext cx="2371680" cy="1024200"/>
+            <a:ext cx="2371320" cy="1023840"/>
           </a:xfrm>
           <a:prstGeom prst="rect">
             <a:avLst/>
@@ -2289,7 +2289,7 @@
         <p:spPr>
           <a:xfrm>
             <a:off x="2988000" y="360000"/>
-            <a:ext cx="4387680" cy="342000"/>
+            <a:ext cx="4387320" cy="341640"/>
           </a:xfrm>
           <a:prstGeom prst="rect">
             <a:avLst/>
@@ -2370,7 +2370,7 @@
         <p:spPr>
           <a:xfrm>
             <a:off x="1440000" y="720000"/>
-            <a:ext cx="6765840" cy="1797840"/>
+            <a:ext cx="6765480" cy="1797480"/>
           </a:xfrm>
           <a:prstGeom prst="rect">
             <a:avLst/>
@@ -2400,7 +2400,7 @@
         <p:spPr>
           <a:xfrm>
             <a:off x="2016000" y="1188000"/>
-            <a:ext cx="1436040" cy="788040"/>
+            <a:ext cx="1435680" cy="787680"/>
           </a:xfrm>
           <a:prstGeom prst="rect">
             <a:avLst/>
@@ -2455,7 +2455,7 @@
         <p:spPr>
           <a:xfrm>
             <a:off x="6192000" y="1188000"/>
-            <a:ext cx="1436040" cy="788040"/>
+            <a:ext cx="1435680" cy="787680"/>
           </a:xfrm>
           <a:prstGeom prst="rect">
             <a:avLst/>
@@ -2510,7 +2510,7 @@
         <p:spPr>
           <a:xfrm>
             <a:off x="4140000" y="900000"/>
-            <a:ext cx="1436040" cy="1364040"/>
+            <a:ext cx="1435680" cy="1363680"/>
           </a:xfrm>
           <a:custGeom>
             <a:avLst/>
@@ -2696,7 +2696,7 @@
         <p:spPr>
           <a:xfrm>
             <a:off x="4320000" y="3168000"/>
-            <a:ext cx="1040040" cy="789840"/>
+            <a:ext cx="1039680" cy="789480"/>
           </a:xfrm>
           <a:custGeom>
             <a:avLst/>
@@ -2774,7 +2774,7 @@
         <p:spPr>
           <a:xfrm>
             <a:off x="4176000" y="4428000"/>
-            <a:ext cx="1436040" cy="788040"/>
+            <a:ext cx="1435680" cy="787680"/>
           </a:xfrm>
           <a:prstGeom prst="rect">
             <a:avLst/>
@@ -2856,7 +2856,7 @@
         <p:spPr>
           <a:xfrm>
             <a:off x="5870160" y="3314160"/>
-            <a:ext cx="1149840" cy="501840"/>
+            <a:ext cx="1149480" cy="501480"/>
           </a:xfrm>
           <a:prstGeom prst="ellipse">
             <a:avLst/>
@@ -2995,7 +2995,7 @@
         <p:spPr>
           <a:xfrm>
             <a:off x="1944000" y="900000"/>
-            <a:ext cx="1436040" cy="788040"/>
+            <a:ext cx="1435680" cy="787680"/>
           </a:xfrm>
           <a:prstGeom prst="rect">
             <a:avLst/>
@@ -3050,7 +3050,7 @@
         <p:spPr>
           <a:xfrm>
             <a:off x="6120000" y="900000"/>
-            <a:ext cx="1436040" cy="788040"/>
+            <a:ext cx="1435680" cy="787680"/>
           </a:xfrm>
           <a:prstGeom prst="rect">
             <a:avLst/>
@@ -3105,7 +3105,7 @@
         <p:spPr>
           <a:xfrm>
             <a:off x="4068000" y="612000"/>
-            <a:ext cx="1436040" cy="1364040"/>
+            <a:ext cx="1435680" cy="1363680"/>
           </a:xfrm>
           <a:custGeom>
             <a:avLst/>
@@ -3284,7 +3284,7 @@
         <p:spPr>
           <a:xfrm>
             <a:off x="2592000" y="5904000"/>
-            <a:ext cx="7124760" cy="599040"/>
+            <a:ext cx="7124400" cy="598680"/>
           </a:xfrm>
           <a:prstGeom prst="rect">
             <a:avLst/>
@@ -3355,7 +3355,7 @@
         <p:spPr>
           <a:xfrm>
             <a:off x="360000" y="216360"/>
-            <a:ext cx="1149840" cy="501840"/>
+            <a:ext cx="1149480" cy="501480"/>
           </a:xfrm>
           <a:prstGeom prst="ellipse">
             <a:avLst/>
@@ -3410,7 +3410,7 @@
         <p:spPr>
           <a:xfrm>
             <a:off x="1727640" y="216360"/>
-            <a:ext cx="1149840" cy="501840"/>
+            <a:ext cx="1149480" cy="501480"/>
           </a:xfrm>
           <a:prstGeom prst="ellipse">
             <a:avLst/>
@@ -3465,7 +3465,7 @@
         <p:spPr>
           <a:xfrm>
             <a:off x="359280" y="1008360"/>
-            <a:ext cx="1149840" cy="501840"/>
+            <a:ext cx="1149480" cy="501480"/>
           </a:xfrm>
           <a:prstGeom prst="ellipse">
             <a:avLst/>
@@ -3520,7 +3520,7 @@
         <p:spPr>
           <a:xfrm>
             <a:off x="358920" y="1800360"/>
-            <a:ext cx="1149840" cy="501840"/>
+            <a:ext cx="1149480" cy="501480"/>
           </a:xfrm>
           <a:prstGeom prst="ellipse">
             <a:avLst/>
@@ -3575,7 +3575,7 @@
         <p:spPr>
           <a:xfrm>
             <a:off x="1906560" y="1836360"/>
-            <a:ext cx="1149840" cy="501840"/>
+            <a:ext cx="1149480" cy="501480"/>
           </a:xfrm>
           <a:prstGeom prst="ellipse">
             <a:avLst/>
@@ -3630,7 +3630,7 @@
         <p:spPr>
           <a:xfrm>
             <a:off x="4211280" y="360"/>
-            <a:ext cx="1149840" cy="501840"/>
+            <a:ext cx="1149480" cy="501480"/>
           </a:xfrm>
           <a:prstGeom prst="ellipse">
             <a:avLst/>
@@ -3685,7 +3685,7 @@
         <p:spPr>
           <a:xfrm>
             <a:off x="6226920" y="360"/>
-            <a:ext cx="1149840" cy="501840"/>
+            <a:ext cx="1149480" cy="501480"/>
           </a:xfrm>
           <a:prstGeom prst="ellipse">
             <a:avLst/>
@@ -3740,7 +3740,7 @@
         <p:spPr>
           <a:xfrm>
             <a:off x="4210920" y="360"/>
-            <a:ext cx="1149840" cy="501840"/>
+            <a:ext cx="1149480" cy="501480"/>
           </a:xfrm>
           <a:prstGeom prst="ellipse">
             <a:avLst/>
@@ -3795,7 +3795,7 @@
         <p:spPr>
           <a:xfrm>
             <a:off x="7738920" y="252360"/>
-            <a:ext cx="1149840" cy="501840"/>
+            <a:ext cx="1149480" cy="501480"/>
           </a:xfrm>
           <a:prstGeom prst="ellipse">
             <a:avLst/>
@@ -3850,7 +3850,7 @@
         <p:spPr>
           <a:xfrm>
             <a:off x="7810920" y="936360"/>
-            <a:ext cx="1149840" cy="501840"/>
+            <a:ext cx="1149480" cy="501480"/>
           </a:xfrm>
           <a:prstGeom prst="ellipse">
             <a:avLst/>
@@ -5386,7 +5386,7 @@
         <p:spPr>
           <a:xfrm>
             <a:off x="576000" y="4320000"/>
-            <a:ext cx="2446200" cy="344520"/>
+            <a:ext cx="2445840" cy="344160"/>
           </a:xfrm>
           <a:prstGeom prst="rect">
             <a:avLst/>
@@ -5437,7 +5437,7 @@
         <p:spPr>
           <a:xfrm>
             <a:off x="7092000" y="3672000"/>
-            <a:ext cx="2446200" cy="344520"/>
+            <a:ext cx="2445840" cy="344160"/>
           </a:xfrm>
           <a:prstGeom prst="rect">
             <a:avLst/>
@@ -5488,7 +5488,7 @@
         <p:spPr>
           <a:xfrm>
             <a:off x="3744000" y="5328000"/>
-            <a:ext cx="2446200" cy="344520"/>
+            <a:ext cx="2445840" cy="344160"/>
           </a:xfrm>
           <a:prstGeom prst="rect">
             <a:avLst/>
@@ -5569,7 +5569,7 @@
         <p:spPr>
           <a:xfrm>
             <a:off x="5934960" y="1050480"/>
-            <a:ext cx="1694520" cy="1005480"/>
+            <a:ext cx="1694160" cy="1005120"/>
           </a:xfrm>
           <a:prstGeom prst="rect">
             <a:avLst/>
@@ -5599,7 +5599,7 @@
         <p:spPr>
           <a:xfrm>
             <a:off x="1908000" y="1152000"/>
-            <a:ext cx="1436040" cy="788040"/>
+            <a:ext cx="1435680" cy="787680"/>
           </a:xfrm>
           <a:prstGeom prst="rect">
             <a:avLst/>
@@ -5654,7 +5654,7 @@
         <p:spPr>
           <a:xfrm>
             <a:off x="6084000" y="1152000"/>
-            <a:ext cx="1436040" cy="788040"/>
+            <a:ext cx="1435680" cy="787680"/>
           </a:xfrm>
           <a:prstGeom prst="rect">
             <a:avLst/>
@@ -5709,7 +5709,7 @@
         <p:spPr>
           <a:xfrm>
             <a:off x="4032000" y="864000"/>
-            <a:ext cx="1436040" cy="1364040"/>
+            <a:ext cx="1435680" cy="1363680"/>
           </a:xfrm>
           <a:custGeom>
             <a:avLst/>
@@ -5841,7 +5841,7 @@
         <p:spPr>
           <a:xfrm>
             <a:off x="1548000" y="576000"/>
-            <a:ext cx="2122200" cy="466200"/>
+            <a:ext cx="2121840" cy="465840"/>
           </a:xfrm>
           <a:prstGeom prst="rect">
             <a:avLst/>
@@ -5947,7 +5947,7 @@
         <p:spPr>
           <a:xfrm>
             <a:off x="5760000" y="576000"/>
-            <a:ext cx="2122200" cy="466200"/>
+            <a:ext cx="2121840" cy="465840"/>
           </a:xfrm>
           <a:prstGeom prst="rect">
             <a:avLst/>
@@ -5998,7 +5998,7 @@
         <p:spPr>
           <a:xfrm>
             <a:off x="216000" y="2376000"/>
-            <a:ext cx="2122200" cy="2590200"/>
+            <a:ext cx="2121840" cy="2589840"/>
           </a:xfrm>
           <a:prstGeom prst="rect">
             <a:avLst/>
@@ -6707,7 +6707,7 @@
         <p:spPr>
           <a:xfrm>
             <a:off x="1945800" y="3636000"/>
-            <a:ext cx="1436040" cy="788040"/>
+            <a:ext cx="1435680" cy="787680"/>
           </a:xfrm>
           <a:prstGeom prst="rect">
             <a:avLst/>
@@ -6782,7 +6782,7 @@
         <p:spPr>
           <a:xfrm>
             <a:off x="6300000" y="3673800"/>
-            <a:ext cx="1436040" cy="788040"/>
+            <a:ext cx="1435680" cy="787680"/>
           </a:xfrm>
           <a:prstGeom prst="rect">
             <a:avLst/>
@@ -6911,7 +6911,7 @@
         <p:spPr>
           <a:xfrm>
             <a:off x="1764000" y="4860000"/>
-            <a:ext cx="7124760" cy="599040"/>
+            <a:ext cx="7124400" cy="598680"/>
           </a:xfrm>
           <a:prstGeom prst="rect">
             <a:avLst/>
@@ -6937,7 +6937,7 @@
         <p:spPr>
           <a:xfrm>
             <a:off x="4140000" y="1080000"/>
-            <a:ext cx="1436040" cy="788040"/>
+            <a:ext cx="1435680" cy="787680"/>
           </a:xfrm>
           <a:prstGeom prst="rect">
             <a:avLst/>
@@ -6992,7 +6992,7 @@
         <p:spPr>
           <a:xfrm>
             <a:off x="4392000" y="2267640"/>
-            <a:ext cx="933840" cy="1005840"/>
+            <a:ext cx="933480" cy="1005480"/>
           </a:xfrm>
           <a:custGeom>
             <a:avLst/>
@@ -7041,7 +7041,7 @@
         <p:spPr>
           <a:xfrm>
             <a:off x="4572000" y="2304000"/>
-            <a:ext cx="645840" cy="344160"/>
+            <a:ext cx="645480" cy="343800"/>
           </a:xfrm>
           <a:prstGeom prst="rect">
             <a:avLst/>
@@ -7173,7 +7173,7 @@
         <p:spPr>
           <a:xfrm>
             <a:off x="2592000" y="432000"/>
-            <a:ext cx="1149840" cy="501840"/>
+            <a:ext cx="1149480" cy="501480"/>
           </a:xfrm>
           <a:prstGeom prst="ellipse">
             <a:avLst/>
@@ -7228,7 +7228,7 @@
         <p:spPr>
           <a:xfrm>
             <a:off x="4104360" y="360360"/>
-            <a:ext cx="1149840" cy="501840"/>
+            <a:ext cx="1149480" cy="501480"/>
           </a:xfrm>
           <a:prstGeom prst="ellipse">
             <a:avLst/>
@@ -7283,7 +7283,7 @@
         <p:spPr>
           <a:xfrm>
             <a:off x="5652720" y="432720"/>
-            <a:ext cx="1149840" cy="501840"/>
+            <a:ext cx="1149480" cy="501480"/>
           </a:xfrm>
           <a:prstGeom prst="ellipse">
             <a:avLst/>
@@ -7338,7 +7338,7 @@
         <p:spPr>
           <a:xfrm>
             <a:off x="3813480" y="4321080"/>
-            <a:ext cx="1149840" cy="501840"/>
+            <a:ext cx="1149480" cy="501480"/>
           </a:xfrm>
           <a:prstGeom prst="ellipse">
             <a:avLst/>
@@ -7393,7 +7393,7 @@
         <p:spPr>
           <a:xfrm>
             <a:off x="2193840" y="4717440"/>
-            <a:ext cx="1149840" cy="501840"/>
+            <a:ext cx="1149480" cy="501480"/>
           </a:xfrm>
           <a:prstGeom prst="ellipse">
             <a:avLst/>
@@ -7448,7 +7448,7 @@
         <p:spPr>
           <a:xfrm>
             <a:off x="682200" y="4501800"/>
-            <a:ext cx="1149840" cy="501840"/>
+            <a:ext cx="1149480" cy="501480"/>
           </a:xfrm>
           <a:prstGeom prst="ellipse">
             <a:avLst/>
@@ -7503,7 +7503,7 @@
         <p:spPr>
           <a:xfrm>
             <a:off x="5434560" y="4574160"/>
-            <a:ext cx="1149840" cy="501840"/>
+            <a:ext cx="1149480" cy="501480"/>
           </a:xfrm>
           <a:prstGeom prst="ellipse">
             <a:avLst/>
@@ -7558,7 +7558,7 @@
         <p:spPr>
           <a:xfrm>
             <a:off x="7634160" y="4574520"/>
-            <a:ext cx="1149840" cy="501840"/>
+            <a:ext cx="1149480" cy="501480"/>
           </a:xfrm>
           <a:prstGeom prst="ellipse">
             <a:avLst/>
@@ -7613,7 +7613,7 @@
         <p:spPr>
           <a:xfrm>
             <a:off x="686520" y="3098880"/>
-            <a:ext cx="1149840" cy="501840"/>
+            <a:ext cx="1149480" cy="501480"/>
           </a:xfrm>
           <a:prstGeom prst="ellipse">
             <a:avLst/>
@@ -7911,7 +7911,7 @@
         <p:spPr>
           <a:xfrm>
             <a:off x="216000" y="288000"/>
-            <a:ext cx="2374200" cy="2302200"/>
+            <a:ext cx="2373840" cy="2301840"/>
           </a:xfrm>
           <a:prstGeom prst="rect">
             <a:avLst/>
@@ -8032,7 +8032,7 @@
         <p:spPr>
           <a:xfrm>
             <a:off x="1908000" y="936000"/>
-            <a:ext cx="1436040" cy="788040"/>
+            <a:ext cx="1435680" cy="787680"/>
           </a:xfrm>
           <a:prstGeom prst="rect">
             <a:avLst/>
@@ -8087,7 +8087,7 @@
         <p:spPr>
           <a:xfrm>
             <a:off x="6084000" y="936000"/>
-            <a:ext cx="1436040" cy="788040"/>
+            <a:ext cx="1435680" cy="787680"/>
           </a:xfrm>
           <a:prstGeom prst="rect">
             <a:avLst/>
@@ -8142,7 +8142,7 @@
         <p:spPr>
           <a:xfrm>
             <a:off x="4934160" y="4392000"/>
-            <a:ext cx="1436040" cy="788040"/>
+            <a:ext cx="1435680" cy="787680"/>
           </a:xfrm>
           <a:prstGeom prst="rect">
             <a:avLst/>
@@ -8197,7 +8197,7 @@
         <p:spPr>
           <a:xfrm>
             <a:off x="4032000" y="648000"/>
-            <a:ext cx="1436040" cy="1364040"/>
+            <a:ext cx="1435680" cy="1363680"/>
           </a:xfrm>
           <a:custGeom>
             <a:avLst/>
@@ -8295,7 +8295,7 @@
         <p:spPr>
           <a:xfrm>
             <a:off x="1908000" y="3204360"/>
-            <a:ext cx="1436040" cy="1364040"/>
+            <a:ext cx="1435680" cy="1363680"/>
           </a:xfrm>
           <a:custGeom>
             <a:avLst/>
@@ -8447,7 +8447,7 @@
         <p:spPr>
           <a:xfrm>
             <a:off x="4140000" y="2234160"/>
-            <a:ext cx="1150200" cy="572040"/>
+            <a:ext cx="1149840" cy="571680"/>
           </a:xfrm>
           <a:prstGeom prst="ellipse">
             <a:avLst/>
@@ -8502,7 +8502,7 @@
         <p:spPr>
           <a:xfrm>
             <a:off x="3708360" y="3636360"/>
-            <a:ext cx="1077840" cy="572040"/>
+            <a:ext cx="1077480" cy="571680"/>
           </a:xfrm>
           <a:prstGeom prst="ellipse">
             <a:avLst/>
@@ -8611,7 +8611,7 @@
         <p:spPr>
           <a:xfrm>
             <a:off x="504000" y="396000"/>
-            <a:ext cx="1150200" cy="572040"/>
+            <a:ext cx="1149840" cy="571680"/>
           </a:xfrm>
           <a:prstGeom prst="ellipse">
             <a:avLst/>
@@ -8666,7 +8666,7 @@
         <p:spPr>
           <a:xfrm>
             <a:off x="1944000" y="180000"/>
-            <a:ext cx="1150200" cy="572040"/>
+            <a:ext cx="1149840" cy="571680"/>
           </a:xfrm>
           <a:prstGeom prst="ellipse">
             <a:avLst/>
@@ -8721,7 +8721,7 @@
         <p:spPr>
           <a:xfrm>
             <a:off x="288000" y="1152000"/>
-            <a:ext cx="1150200" cy="572040"/>
+            <a:ext cx="1149840" cy="571680"/>
           </a:xfrm>
           <a:prstGeom prst="ellipse">
             <a:avLst/>
@@ -8776,7 +8776,7 @@
         <p:spPr>
           <a:xfrm>
             <a:off x="5940000" y="180000"/>
-            <a:ext cx="1150200" cy="572040"/>
+            <a:ext cx="1149840" cy="571680"/>
           </a:xfrm>
           <a:prstGeom prst="ellipse">
             <a:avLst/>
@@ -8831,7 +8831,7 @@
         <p:spPr>
           <a:xfrm>
             <a:off x="7560000" y="180000"/>
-            <a:ext cx="1150200" cy="572040"/>
+            <a:ext cx="1149840" cy="571680"/>
           </a:xfrm>
           <a:prstGeom prst="ellipse">
             <a:avLst/>
@@ -8886,7 +8886,7 @@
         <p:spPr>
           <a:xfrm>
             <a:off x="7992000" y="972000"/>
-            <a:ext cx="1150200" cy="572040"/>
+            <a:ext cx="1149840" cy="571680"/>
           </a:xfrm>
           <a:prstGeom prst="ellipse">
             <a:avLst/>
@@ -8968,7 +8968,7 @@
         <p:spPr>
           <a:xfrm>
             <a:off x="432000" y="3636360"/>
-            <a:ext cx="1077840" cy="572040"/>
+            <a:ext cx="1077480" cy="571680"/>
           </a:xfrm>
           <a:prstGeom prst="ellipse">
             <a:avLst/>
@@ -9023,7 +9023,7 @@
         <p:spPr>
           <a:xfrm>
             <a:off x="6803640" y="4068360"/>
-            <a:ext cx="1077840" cy="572040"/>
+            <a:ext cx="1077480" cy="571680"/>
           </a:xfrm>
           <a:prstGeom prst="ellipse">
             <a:avLst/>
@@ -9078,7 +9078,7 @@
         <p:spPr>
           <a:xfrm>
             <a:off x="6839280" y="4752360"/>
-            <a:ext cx="1077840" cy="572040"/>
+            <a:ext cx="1077480" cy="571680"/>
           </a:xfrm>
           <a:prstGeom prst="ellipse">
             <a:avLst/>
@@ -9488,7 +9488,7 @@
         <p:spPr>
           <a:xfrm>
             <a:off x="2556000" y="1152000"/>
-            <a:ext cx="4534560" cy="358560"/>
+            <a:ext cx="4534200" cy="358200"/>
           </a:xfrm>
           <a:prstGeom prst="rect">
             <a:avLst/>
@@ -10338,7 +10338,7 @@
         <p:spPr>
           <a:xfrm>
             <a:off x="3492000" y="3541680"/>
-            <a:ext cx="3023640" cy="345960"/>
+            <a:ext cx="3023280" cy="345600"/>
           </a:xfrm>
           <a:prstGeom prst="rect">
             <a:avLst/>
@@ -10366,7 +10366,11 @@
             </a:pPr>
             <a:r>
               <a:rPr b="0" lang="en-IN" sz="1800" spc="-1" strike="noStrike">
+                <a:solidFill>
+                  <a:srgbClr val="000000"/>
+                </a:solidFill>
                 <a:latin typeface="Arial"/>
+                <a:ea typeface="DejaVu Sans"/>
               </a:rPr>
               <a:t>Inter block gap</a:t>
             </a:r>
@@ -10385,7 +10389,7 @@
         <p:spPr>
           <a:xfrm>
             <a:off x="144000" y="3564000"/>
-            <a:ext cx="3023640" cy="345960"/>
+            <a:ext cx="3023280" cy="345600"/>
           </a:xfrm>
           <a:prstGeom prst="rect">
             <a:avLst/>
@@ -10413,7 +10417,11 @@
             </a:pPr>
             <a:r>
               <a:rPr b="0" lang="en-IN" sz="1800" spc="-1" strike="noStrike">
+                <a:solidFill>
+                  <a:srgbClr val="000000"/>
+                </a:solidFill>
                 <a:latin typeface="Arial"/>
+                <a:ea typeface="DejaVu Sans"/>
               </a:rPr>
               <a:t>Track Begin</a:t>
             </a:r>
@@ -10432,7 +10440,7 @@
         <p:spPr>
           <a:xfrm>
             <a:off x="7308000" y="3528000"/>
-            <a:ext cx="3023640" cy="345960"/>
+            <a:ext cx="3023280" cy="345600"/>
           </a:xfrm>
           <a:prstGeom prst="rect">
             <a:avLst/>
@@ -10460,7 +10468,11 @@
             </a:pPr>
             <a:r>
               <a:rPr b="0" lang="en-IN" sz="1800" spc="-1" strike="noStrike">
+                <a:solidFill>
+                  <a:srgbClr val="000000"/>
+                </a:solidFill>
                 <a:latin typeface="Arial"/>
+                <a:ea typeface="DejaVu Sans"/>
               </a:rPr>
               <a:t>Track End</a:t>
             </a:r>
@@ -10620,7 +10632,7 @@
         </p:nvGraphicFramePr>
         <p:xfrm>
           <a:off x="648720" y="2160000"/>
-          <a:ext cx="8783640" cy="791640"/>
+          <a:ext cx="8783640" cy="791280"/>
         </p:xfrm>
         <a:graphic>
           <a:graphicData uri="http://schemas.openxmlformats.org/drawingml/2006/table">
@@ -10881,7 +10893,7 @@
         <p:spPr>
           <a:xfrm>
             <a:off x="3492000" y="3541680"/>
-            <a:ext cx="3023640" cy="345960"/>
+            <a:ext cx="3023280" cy="345600"/>
           </a:xfrm>
           <a:prstGeom prst="rect">
             <a:avLst/>
@@ -10909,7 +10921,11 @@
             </a:pPr>
             <a:r>
               <a:rPr b="0" lang="en-IN" sz="1800" spc="-1" strike="noStrike">
+                <a:solidFill>
+                  <a:srgbClr val="000000"/>
+                </a:solidFill>
                 <a:latin typeface="Arial"/>
+                <a:ea typeface="DejaVu Sans"/>
               </a:rPr>
               <a:t>Inter block gap</a:t>
             </a:r>
@@ -10928,7 +10944,7 @@
         <p:spPr>
           <a:xfrm>
             <a:off x="144000" y="3564000"/>
-            <a:ext cx="3023640" cy="345960"/>
+            <a:ext cx="3023280" cy="345600"/>
           </a:xfrm>
           <a:prstGeom prst="rect">
             <a:avLst/>
@@ -10956,7 +10972,11 @@
             </a:pPr>
             <a:r>
               <a:rPr b="0" lang="en-IN" sz="1800" spc="-1" strike="noStrike">
+                <a:solidFill>
+                  <a:srgbClr val="000000"/>
+                </a:solidFill>
                 <a:latin typeface="Arial"/>
+                <a:ea typeface="DejaVu Sans"/>
               </a:rPr>
               <a:t>Track Begin</a:t>
             </a:r>
@@ -10975,7 +10995,7 @@
         <p:spPr>
           <a:xfrm>
             <a:off x="7308000" y="3528000"/>
-            <a:ext cx="3023640" cy="345960"/>
+            <a:ext cx="3023280" cy="345600"/>
           </a:xfrm>
           <a:prstGeom prst="rect">
             <a:avLst/>
@@ -11003,7 +11023,11 @@
             </a:pPr>
             <a:r>
               <a:rPr b="0" lang="en-IN" sz="1800" spc="-1" strike="noStrike">
+                <a:solidFill>
+                  <a:srgbClr val="000000"/>
+                </a:solidFill>
                 <a:latin typeface="Arial"/>
+                <a:ea typeface="DejaVu Sans"/>
               </a:rPr>
               <a:t>Track End</a:t>
             </a:r>
@@ -11163,7 +11187,7 @@
         </p:nvGraphicFramePr>
         <p:xfrm>
           <a:off x="587520" y="2302920"/>
-          <a:ext cx="5075280" cy="2879280"/>
+          <a:ext cx="3229560" cy="1550880"/>
         </p:xfrm>
         <a:graphic>
           <a:graphicData uri="http://schemas.openxmlformats.org/drawingml/2006/table">
@@ -11177,10 +11201,15 @@
               <a:tr h="405360">
                 <a:tc>
                   <a:txBody>
-                    <a:bodyPr lIns="90000" rIns="90000" tIns="46800" bIns="46800">
+                    <a:bodyPr lIns="90000" rIns="90000">
                       <a:noAutofit/>
                     </a:bodyPr>
                     <a:p>
+                      <a:pPr>
+                        <a:lnSpc>
+                          <a:spcPct val="100000"/>
+                        </a:lnSpc>
+                      </a:pPr>
                       <a:r>
                         <a:rPr b="0" lang="en-IN" sz="1800" spc="-1" strike="noStrike">
                           <a:latin typeface="Arial"/>
@@ -11220,10 +11249,15 @@
                 </a:tc>
                 <a:tc>
                   <a:txBody>
-                    <a:bodyPr lIns="90000" rIns="90000" tIns="46800" bIns="46800">
+                    <a:bodyPr lIns="90000" rIns="90000">
                       <a:noAutofit/>
                     </a:bodyPr>
                     <a:p>
+                      <a:pPr>
+                        <a:lnSpc>
+                          <a:spcPct val="100000"/>
+                        </a:lnSpc>
+                      </a:pPr>
                       <a:r>
                         <a:rPr b="0" lang="en-IN" sz="1800" spc="-1" strike="noStrike">
                           <a:latin typeface="Arial"/>
@@ -11263,10 +11297,15 @@
                 </a:tc>
                 <a:tc>
                   <a:txBody>
-                    <a:bodyPr lIns="90000" rIns="90000" tIns="46800" bIns="46800">
+                    <a:bodyPr lIns="90000" rIns="90000">
                       <a:noAutofit/>
                     </a:bodyPr>
                     <a:p>
+                      <a:pPr>
+                        <a:lnSpc>
+                          <a:spcPct val="100000"/>
+                        </a:lnSpc>
+                      </a:pPr>
                       <a:r>
                         <a:rPr b="0" lang="en-IN" sz="1800" spc="-1" strike="noStrike">
                           <a:latin typeface="Arial"/>
@@ -11566,7 +11605,7 @@
         </p:nvGraphicFramePr>
         <p:xfrm>
           <a:off x="5497200" y="2705040"/>
-          <a:ext cx="5075280" cy="2879280"/>
+          <a:ext cx="2664000" cy="1580760"/>
         </p:xfrm>
         <a:graphic>
           <a:graphicData uri="http://schemas.openxmlformats.org/drawingml/2006/table">
@@ -11580,10 +11619,15 @@
               <a:tr h="420480">
                 <a:tc>
                   <a:txBody>
-                    <a:bodyPr lIns="90000" rIns="90000" tIns="46800" bIns="46800">
+                    <a:bodyPr lIns="90000" rIns="90000">
                       <a:noAutofit/>
                     </a:bodyPr>
                     <a:p>
+                      <a:pPr>
+                        <a:lnSpc>
+                          <a:spcPct val="100000"/>
+                        </a:lnSpc>
+                      </a:pPr>
                       <a:r>
                         <a:rPr b="0" lang="en-IN" sz="1800" spc="-1" strike="noStrike">
                           <a:latin typeface="Arial"/>
@@ -11623,10 +11667,15 @@
                 </a:tc>
                 <a:tc>
                   <a:txBody>
-                    <a:bodyPr lIns="90000" rIns="90000" tIns="46800" bIns="46800">
+                    <a:bodyPr lIns="90000" rIns="90000">
                       <a:noAutofit/>
                     </a:bodyPr>
                     <a:p>
+                      <a:pPr>
+                        <a:lnSpc>
+                          <a:spcPct val="100000"/>
+                        </a:lnSpc>
+                      </a:pPr>
                       <a:r>
                         <a:rPr b="0" lang="en-IN" sz="1800" spc="-1" strike="noStrike">
                           <a:latin typeface="Arial"/>
@@ -11666,10 +11715,15 @@
                 </a:tc>
                 <a:tc>
                   <a:txBody>
-                    <a:bodyPr lIns="90000" rIns="90000" tIns="46800" bIns="46800">
+                    <a:bodyPr lIns="90000" rIns="90000">
                       <a:noAutofit/>
                     </a:bodyPr>
                     <a:p>
+                      <a:pPr>
+                        <a:lnSpc>
+                          <a:spcPct val="100000"/>
+                        </a:lnSpc>
+                      </a:pPr>
                       <a:r>
                         <a:rPr b="0" lang="en-IN" sz="1800" spc="-1" strike="noStrike">
                           <a:latin typeface="Arial"/>
@@ -11963,14 +12017,14 @@
       </p:graphicFrame>
       <p:sp>
         <p:nvSpPr>
-          <p:cNvPr id="345" name="TextShape 3"/>
-          <p:cNvSpPr txBox="1"/>
+          <p:cNvPr id="345" name="CustomShape 3"/>
+          <p:cNvSpPr/>
           <p:nvPr/>
         </p:nvSpPr>
         <p:spPr>
           <a:xfrm>
             <a:off x="3456000" y="1008000"/>
-            <a:ext cx="3240000" cy="346320"/>
+            <a:ext cx="3239640" cy="345960"/>
           </a:xfrm>
           <a:prstGeom prst="rect">
             <a:avLst/>
@@ -11980,11 +12034,22 @@
             <a:noFill/>
           </a:ln>
         </p:spPr>
+        <p:style>
+          <a:lnRef idx="0"/>
+          <a:fillRef idx="0"/>
+          <a:effectRef idx="0"/>
+          <a:fontRef idx="minor"/>
+        </p:style>
         <p:txBody>
           <a:bodyPr lIns="90000" rIns="90000" tIns="45000" bIns="45000">
             <a:noAutofit/>
           </a:bodyPr>
           <a:p>
+            <a:pPr>
+              <a:lnSpc>
+                <a:spcPct val="100000"/>
+              </a:lnSpc>
+            </a:pPr>
             <a:r>
               <a:rPr b="0" lang="en-IN" sz="1800" spc="-1" strike="noStrike">
                 <a:latin typeface="Arial"/>
@@ -11999,14 +12064,14 @@
       </p:sp>
       <p:sp>
         <p:nvSpPr>
-          <p:cNvPr id="346" name="TextShape 4"/>
-          <p:cNvSpPr txBox="1"/>
+          <p:cNvPr id="346" name="CustomShape 4"/>
+          <p:cNvSpPr/>
           <p:nvPr/>
         </p:nvSpPr>
         <p:spPr>
           <a:xfrm>
             <a:off x="648000" y="1836000"/>
-            <a:ext cx="3240000" cy="346320"/>
+            <a:ext cx="3239640" cy="345960"/>
           </a:xfrm>
           <a:prstGeom prst="rect">
             <a:avLst/>
@@ -12016,11 +12081,22 @@
             <a:noFill/>
           </a:ln>
         </p:spPr>
+        <p:style>
+          <a:lnRef idx="0"/>
+          <a:fillRef idx="0"/>
+          <a:effectRef idx="0"/>
+          <a:fontRef idx="minor"/>
+        </p:style>
         <p:txBody>
           <a:bodyPr lIns="90000" rIns="90000" tIns="45000" bIns="45000">
             <a:noAutofit/>
           </a:bodyPr>
           <a:p>
+            <a:pPr>
+              <a:lnSpc>
+                <a:spcPct val="100000"/>
+              </a:lnSpc>
+            </a:pPr>
             <a:r>
               <a:rPr b="0" lang="en-IN" sz="1800" spc="-1" strike="noStrike">
                 <a:latin typeface="Arial"/>
@@ -12035,14 +12111,14 @@
       </p:sp>
       <p:sp>
         <p:nvSpPr>
-          <p:cNvPr id="347" name="TextShape 5"/>
-          <p:cNvSpPr txBox="1"/>
+          <p:cNvPr id="347" name="CustomShape 5"/>
+          <p:cNvSpPr/>
           <p:nvPr/>
         </p:nvSpPr>
         <p:spPr>
           <a:xfrm>
             <a:off x="5436000" y="2160000"/>
-            <a:ext cx="3240000" cy="346320"/>
+            <a:ext cx="3239640" cy="345960"/>
           </a:xfrm>
           <a:prstGeom prst="rect">
             <a:avLst/>
@@ -12052,11 +12128,22 @@
             <a:noFill/>
           </a:ln>
         </p:spPr>
+        <p:style>
+          <a:lnRef idx="0"/>
+          <a:fillRef idx="0"/>
+          <a:effectRef idx="0"/>
+          <a:fontRef idx="minor"/>
+        </p:style>
         <p:txBody>
           <a:bodyPr lIns="90000" rIns="90000" tIns="45000" bIns="45000">
             <a:noAutofit/>
           </a:bodyPr>
           <a:p>
+            <a:pPr>
+              <a:lnSpc>
+                <a:spcPct val="100000"/>
+              </a:lnSpc>
+            </a:pPr>
             <a:r>
               <a:rPr b="0" lang="en-IN" sz="1800" spc="-1" strike="noStrike">
                 <a:latin typeface="Arial"/>
@@ -12098,14 +12185,14 @@
       </p:sp>
       <p:sp>
         <p:nvSpPr>
-          <p:cNvPr id="349" name="TextShape 7"/>
-          <p:cNvSpPr txBox="1"/>
+          <p:cNvPr id="349" name="CustomShape 7"/>
+          <p:cNvSpPr/>
           <p:nvPr/>
         </p:nvSpPr>
         <p:spPr>
           <a:xfrm>
             <a:off x="8676000" y="2988000"/>
-            <a:ext cx="1044000" cy="756000"/>
+            <a:ext cx="1043640" cy="755640"/>
           </a:xfrm>
           <a:prstGeom prst="rect">
             <a:avLst/>
@@ -12115,11 +12202,22 @@
             <a:noFill/>
           </a:ln>
         </p:spPr>
+        <p:style>
+          <a:lnRef idx="0"/>
+          <a:fillRef idx="0"/>
+          <a:effectRef idx="0"/>
+          <a:fontRef idx="minor"/>
+        </p:style>
         <p:txBody>
           <a:bodyPr lIns="90000" rIns="90000" tIns="45000" bIns="45000">
             <a:noAutofit/>
           </a:bodyPr>
           <a:p>
+            <a:pPr>
+              <a:lnSpc>
+                <a:spcPct val="100000"/>
+              </a:lnSpc>
+            </a:pPr>
             <a:r>
               <a:rPr b="0" lang="en-IN" sz="1800" spc="-1" strike="noStrike">
                 <a:latin typeface="Arial"/>
@@ -12221,14 +12319,14 @@
       </p:sp>
       <p:sp>
         <p:nvSpPr>
-          <p:cNvPr id="353" name="TextShape 11"/>
-          <p:cNvSpPr txBox="1"/>
+          <p:cNvPr id="353" name="CustomShape 11"/>
+          <p:cNvSpPr/>
           <p:nvPr/>
         </p:nvSpPr>
         <p:spPr>
           <a:xfrm>
             <a:off x="2448000" y="4464000"/>
-            <a:ext cx="5832000" cy="756000"/>
+            <a:ext cx="5831640" cy="755640"/>
           </a:xfrm>
           <a:prstGeom prst="rect">
             <a:avLst/>
@@ -12238,11 +12336,22 @@
             <a:noFill/>
           </a:ln>
         </p:spPr>
+        <p:style>
+          <a:lnRef idx="0"/>
+          <a:fillRef idx="0"/>
+          <a:effectRef idx="0"/>
+          <a:fontRef idx="minor"/>
+        </p:style>
         <p:txBody>
           <a:bodyPr lIns="90000" rIns="90000" tIns="45000" bIns="45000">
             <a:noAutofit/>
           </a:bodyPr>
           <a:p>
+            <a:pPr>
+              <a:lnSpc>
+                <a:spcPct val="100000"/>
+              </a:lnSpc>
+            </a:pPr>
             <a:r>
               <a:rPr b="0" lang="en-IN" sz="1800" spc="-1" strike="noStrike">
                 <a:latin typeface="Arial"/>
@@ -12285,6 +12394,1794 @@
           <a:chExt cx="0" cy="0"/>
         </a:xfrm>
       </p:grpSpPr>
+      <p:graphicFrame>
+        <p:nvGraphicFramePr>
+          <p:cNvPr id="354" name="Table 1"/>
+          <p:cNvGraphicFramePr/>
+          <p:nvPr/>
+        </p:nvGraphicFramePr>
+        <p:xfrm>
+          <a:off x="5669280" y="1124640"/>
+          <a:ext cx="5075280" cy="5670000"/>
+        </p:xfrm>
+        <a:graphic>
+          <a:graphicData uri="http://schemas.openxmlformats.org/drawingml/2006/table">
+            <a:tbl>
+              <a:tblPr/>
+              <a:tblGrid>
+                <a:gridCol w="1101960"/>
+                <a:gridCol w="758880"/>
+                <a:gridCol w="758880"/>
+                <a:gridCol w="640080"/>
+              </a:tblGrid>
+              <a:tr h="387000">
+                <a:tc>
+                  <a:txBody>
+                    <a:bodyPr lIns="90000" rIns="90000" tIns="46800" bIns="46800">
+                      <a:noAutofit/>
+                    </a:bodyPr>
+                    <a:p>
+                      <a:r>
+                        <a:rPr b="0" lang="en-IN" sz="1800" spc="-1" strike="noStrike">
+                          <a:latin typeface="Arial"/>
+                        </a:rPr>
+                        <a:t>5721</a:t>
+                      </a:r>
+                      <a:endParaRPr b="0" lang="en-IN" sz="1800" spc="-1" strike="noStrike">
+                        <a:latin typeface="Arial"/>
+                      </a:endParaRPr>
+                    </a:p>
+                  </a:txBody>
+                  <a:tcPr marL="90000" marR="90000">
+                    <a:lnL w="720">
+                      <a:solidFill>
+                        <a:srgbClr val="ffffff"/>
+                      </a:solidFill>
+                    </a:lnL>
+                    <a:lnR w="720">
+                      <a:solidFill>
+                        <a:srgbClr val="ffffff"/>
+                      </a:solidFill>
+                    </a:lnR>
+                    <a:lnT w="720">
+                      <a:solidFill>
+                        <a:srgbClr val="ffffff"/>
+                      </a:solidFill>
+                    </a:lnT>
+                    <a:lnB w="720">
+                      <a:solidFill>
+                        <a:srgbClr val="ffffff"/>
+                      </a:solidFill>
+                    </a:lnB>
+                    <a:solidFill>
+                      <a:srgbClr val="b3b3b3"/>
+                    </a:solidFill>
+                  </a:tcPr>
+                </a:tc>
+                <a:tc>
+                  <a:tcPr marL="90000" marR="90000">
+                    <a:lnL w="720">
+                      <a:solidFill>
+                        <a:srgbClr val="ffffff"/>
+                      </a:solidFill>
+                    </a:lnL>
+                    <a:lnR w="720">
+                      <a:solidFill>
+                        <a:srgbClr val="ffffff"/>
+                      </a:solidFill>
+                    </a:lnR>
+                    <a:lnT w="720">
+                      <a:solidFill>
+                        <a:srgbClr val="ffffff"/>
+                      </a:solidFill>
+                    </a:lnT>
+                    <a:lnB w="720">
+                      <a:solidFill>
+                        <a:srgbClr val="ffffff"/>
+                      </a:solidFill>
+                    </a:lnB>
+                    <a:solidFill>
+                      <a:srgbClr val="b3b3b3"/>
+                    </a:solidFill>
+                  </a:tcPr>
+                </a:tc>
+                <a:tc>
+                  <a:tcPr marL="90000" marR="90000">
+                    <a:lnL w="720">
+                      <a:solidFill>
+                        <a:srgbClr val="ffffff"/>
+                      </a:solidFill>
+                    </a:lnL>
+                    <a:lnR w="720">
+                      <a:solidFill>
+                        <a:srgbClr val="ffffff"/>
+                      </a:solidFill>
+                    </a:lnR>
+                    <a:lnT w="720">
+                      <a:solidFill>
+                        <a:srgbClr val="ffffff"/>
+                      </a:solidFill>
+                    </a:lnT>
+                    <a:lnB w="720">
+                      <a:solidFill>
+                        <a:srgbClr val="ffffff"/>
+                      </a:solidFill>
+                    </a:lnB>
+                    <a:solidFill>
+                      <a:srgbClr val="b3b3b3"/>
+                    </a:solidFill>
+                  </a:tcPr>
+                </a:tc>
+                <a:tc>
+                  <a:tcPr marL="90000" marR="90000">
+                    <a:lnL w="720">
+                      <a:solidFill>
+                        <a:srgbClr val="ffffff"/>
+                      </a:solidFill>
+                    </a:lnL>
+                    <a:lnR w="720">
+                      <a:solidFill>
+                        <a:srgbClr val="ffffff"/>
+                      </a:solidFill>
+                    </a:lnR>
+                    <a:lnT w="720">
+                      <a:solidFill>
+                        <a:srgbClr val="ffffff"/>
+                      </a:solidFill>
+                    </a:lnT>
+                    <a:lnB w="720">
+                      <a:solidFill>
+                        <a:srgbClr val="ffffff"/>
+                      </a:solidFill>
+                    </a:lnB>
+                    <a:solidFill>
+                      <a:srgbClr val="b3b3b3"/>
+                    </a:solidFill>
+                  </a:tcPr>
+                </a:tc>
+              </a:tr>
+              <a:tr h="371880">
+                <a:tc>
+                  <a:txBody>
+                    <a:bodyPr lIns="90000" rIns="90000" tIns="46800" bIns="46800">
+                      <a:noAutofit/>
+                    </a:bodyPr>
+                    <a:p>
+                      <a:r>
+                        <a:rPr b="0" lang="en-IN" sz="1800" spc="-1" strike="noStrike">
+                          <a:latin typeface="Arial"/>
+                        </a:rPr>
+                        <a:t>5722</a:t>
+                      </a:r>
+                      <a:endParaRPr b="0" lang="en-IN" sz="1800" spc="-1" strike="noStrike">
+                        <a:latin typeface="Arial"/>
+                      </a:endParaRPr>
+                    </a:p>
+                  </a:txBody>
+                  <a:tcPr marL="90000" marR="90000">
+                    <a:lnL w="720">
+                      <a:solidFill>
+                        <a:srgbClr val="ffffff"/>
+                      </a:solidFill>
+                    </a:lnL>
+                    <a:lnR w="720">
+                      <a:solidFill>
+                        <a:srgbClr val="ffffff"/>
+                      </a:solidFill>
+                    </a:lnR>
+                    <a:lnT w="720">
+                      <a:solidFill>
+                        <a:srgbClr val="ffffff"/>
+                      </a:solidFill>
+                    </a:lnT>
+                    <a:lnB w="720">
+                      <a:solidFill>
+                        <a:srgbClr val="ffffff"/>
+                      </a:solidFill>
+                    </a:lnB>
+                    <a:solidFill>
+                      <a:srgbClr val="cccccc"/>
+                    </a:solidFill>
+                  </a:tcPr>
+                </a:tc>
+                <a:tc>
+                  <a:tcPr marL="90000" marR="90000">
+                    <a:lnL w="720">
+                      <a:solidFill>
+                        <a:srgbClr val="ffffff"/>
+                      </a:solidFill>
+                    </a:lnL>
+                    <a:lnR w="720">
+                      <a:solidFill>
+                        <a:srgbClr val="ffffff"/>
+                      </a:solidFill>
+                    </a:lnR>
+                    <a:lnT w="720">
+                      <a:solidFill>
+                        <a:srgbClr val="ffffff"/>
+                      </a:solidFill>
+                    </a:lnT>
+                    <a:lnB w="720">
+                      <a:solidFill>
+                        <a:srgbClr val="ffffff"/>
+                      </a:solidFill>
+                    </a:lnB>
+                    <a:solidFill>
+                      <a:srgbClr val="cccccc"/>
+                    </a:solidFill>
+                  </a:tcPr>
+                </a:tc>
+                <a:tc>
+                  <a:tcPr marL="90000" marR="90000">
+                    <a:lnL w="720">
+                      <a:solidFill>
+                        <a:srgbClr val="ffffff"/>
+                      </a:solidFill>
+                    </a:lnL>
+                    <a:lnR w="720">
+                      <a:solidFill>
+                        <a:srgbClr val="ffffff"/>
+                      </a:solidFill>
+                    </a:lnR>
+                    <a:lnT w="720">
+                      <a:solidFill>
+                        <a:srgbClr val="ffffff"/>
+                      </a:solidFill>
+                    </a:lnT>
+                    <a:lnB w="720">
+                      <a:solidFill>
+                        <a:srgbClr val="ffffff"/>
+                      </a:solidFill>
+                    </a:lnB>
+                    <a:solidFill>
+                      <a:srgbClr val="cccccc"/>
+                    </a:solidFill>
+                  </a:tcPr>
+                </a:tc>
+                <a:tc>
+                  <a:tcPr marL="90000" marR="90000">
+                    <a:lnL w="720">
+                      <a:solidFill>
+                        <a:srgbClr val="ffffff"/>
+                      </a:solidFill>
+                    </a:lnL>
+                    <a:lnR w="720">
+                      <a:solidFill>
+                        <a:srgbClr val="ffffff"/>
+                      </a:solidFill>
+                    </a:lnR>
+                    <a:lnT w="720">
+                      <a:solidFill>
+                        <a:srgbClr val="ffffff"/>
+                      </a:solidFill>
+                    </a:lnT>
+                    <a:lnB w="720">
+                      <a:solidFill>
+                        <a:srgbClr val="ffffff"/>
+                      </a:solidFill>
+                    </a:lnB>
+                    <a:solidFill>
+                      <a:srgbClr val="cccccc"/>
+                    </a:solidFill>
+                  </a:tcPr>
+                </a:tc>
+              </a:tr>
+              <a:tr h="327600">
+                <a:tc>
+                  <a:txBody>
+                    <a:bodyPr lIns="90000" rIns="90000" tIns="46800" bIns="46800">
+                      <a:noAutofit/>
+                    </a:bodyPr>
+                    <a:p>
+                      <a:r>
+                        <a:rPr b="0" lang="en-IN" sz="1800" spc="-1" strike="noStrike">
+                          <a:latin typeface="Arial"/>
+                        </a:rPr>
+                        <a:t>5724</a:t>
+                      </a:r>
+                      <a:endParaRPr b="0" lang="en-IN" sz="1800" spc="-1" strike="noStrike">
+                        <a:latin typeface="Arial"/>
+                      </a:endParaRPr>
+                    </a:p>
+                  </a:txBody>
+                  <a:tcPr marL="90000" marR="90000">
+                    <a:lnL w="720">
+                      <a:solidFill>
+                        <a:srgbClr val="ffffff"/>
+                      </a:solidFill>
+                    </a:lnL>
+                    <a:lnR w="720">
+                      <a:solidFill>
+                        <a:srgbClr val="ffffff"/>
+                      </a:solidFill>
+                    </a:lnR>
+                    <a:lnT w="720">
+                      <a:solidFill>
+                        <a:srgbClr val="ffffff"/>
+                      </a:solidFill>
+                    </a:lnT>
+                    <a:lnB w="720">
+                      <a:solidFill>
+                        <a:srgbClr val="ffffff"/>
+                      </a:solidFill>
+                    </a:lnB>
+                    <a:solidFill>
+                      <a:srgbClr val="e6e6e6"/>
+                    </a:solidFill>
+                  </a:tcPr>
+                </a:tc>
+                <a:tc>
+                  <a:tcPr marL="90000" marR="90000">
+                    <a:lnL w="720">
+                      <a:solidFill>
+                        <a:srgbClr val="ffffff"/>
+                      </a:solidFill>
+                    </a:lnL>
+                    <a:lnR w="720">
+                      <a:solidFill>
+                        <a:srgbClr val="ffffff"/>
+                      </a:solidFill>
+                    </a:lnR>
+                    <a:lnT w="720">
+                      <a:solidFill>
+                        <a:srgbClr val="ffffff"/>
+                      </a:solidFill>
+                    </a:lnT>
+                    <a:lnB w="720">
+                      <a:solidFill>
+                        <a:srgbClr val="ffffff"/>
+                      </a:solidFill>
+                    </a:lnB>
+                    <a:solidFill>
+                      <a:srgbClr val="e6e6e6"/>
+                    </a:solidFill>
+                  </a:tcPr>
+                </a:tc>
+                <a:tc>
+                  <a:tcPr marL="90000" marR="90000">
+                    <a:lnL w="720">
+                      <a:solidFill>
+                        <a:srgbClr val="ffffff"/>
+                      </a:solidFill>
+                    </a:lnL>
+                    <a:lnR w="720">
+                      <a:solidFill>
+                        <a:srgbClr val="ffffff"/>
+                      </a:solidFill>
+                    </a:lnR>
+                    <a:lnT w="720">
+                      <a:solidFill>
+                        <a:srgbClr val="ffffff"/>
+                      </a:solidFill>
+                    </a:lnT>
+                    <a:lnB w="720">
+                      <a:solidFill>
+                        <a:srgbClr val="ffffff"/>
+                      </a:solidFill>
+                    </a:lnB>
+                    <a:solidFill>
+                      <a:srgbClr val="e6e6e6"/>
+                    </a:solidFill>
+                  </a:tcPr>
+                </a:tc>
+                <a:tc>
+                  <a:tcPr marL="90000" marR="90000">
+                    <a:lnL w="720">
+                      <a:solidFill>
+                        <a:srgbClr val="ffffff"/>
+                      </a:solidFill>
+                    </a:lnL>
+                    <a:lnR w="720">
+                      <a:solidFill>
+                        <a:srgbClr val="ffffff"/>
+                      </a:solidFill>
+                    </a:lnR>
+                    <a:lnT w="720">
+                      <a:solidFill>
+                        <a:srgbClr val="ffffff"/>
+                      </a:solidFill>
+                    </a:lnT>
+                    <a:lnB w="720">
+                      <a:solidFill>
+                        <a:srgbClr val="ffffff"/>
+                      </a:solidFill>
+                    </a:lnB>
+                    <a:solidFill>
+                      <a:srgbClr val="e6e6e6"/>
+                    </a:solidFill>
+                  </a:tcPr>
+                </a:tc>
+              </a:tr>
+              <a:tr h="320040">
+                <a:tc>
+                  <a:txBody>
+                    <a:bodyPr lIns="90000" rIns="90000" tIns="46800" bIns="46800">
+                      <a:noAutofit/>
+                    </a:bodyPr>
+                    <a:p>
+                      <a:r>
+                        <a:rPr b="0" lang="en-IN" sz="1800" spc="-1" strike="noStrike">
+                          <a:latin typeface="Arial"/>
+                        </a:rPr>
+                        <a:t>5728</a:t>
+                      </a:r>
+                      <a:endParaRPr b="0" lang="en-IN" sz="1800" spc="-1" strike="noStrike">
+                        <a:latin typeface="Arial"/>
+                      </a:endParaRPr>
+                    </a:p>
+                  </a:txBody>
+                  <a:tcPr marL="90000" marR="90000">
+                    <a:lnL w="720">
+                      <a:solidFill>
+                        <a:srgbClr val="ffffff"/>
+                      </a:solidFill>
+                    </a:lnL>
+                    <a:lnR w="720">
+                      <a:solidFill>
+                        <a:srgbClr val="ffffff"/>
+                      </a:solidFill>
+                    </a:lnR>
+                    <a:lnT w="720">
+                      <a:solidFill>
+                        <a:srgbClr val="ffffff"/>
+                      </a:solidFill>
+                    </a:lnT>
+                    <a:lnB w="720">
+                      <a:solidFill>
+                        <a:srgbClr val="ffffff"/>
+                      </a:solidFill>
+                    </a:lnB>
+                    <a:solidFill>
+                      <a:srgbClr val="cccccc"/>
+                    </a:solidFill>
+                  </a:tcPr>
+                </a:tc>
+                <a:tc>
+                  <a:tcPr marL="90000" marR="90000">
+                    <a:lnL w="720">
+                      <a:solidFill>
+                        <a:srgbClr val="ffffff"/>
+                      </a:solidFill>
+                    </a:lnL>
+                    <a:lnR w="720">
+                      <a:solidFill>
+                        <a:srgbClr val="ffffff"/>
+                      </a:solidFill>
+                    </a:lnR>
+                    <a:lnT w="720">
+                      <a:solidFill>
+                        <a:srgbClr val="ffffff"/>
+                      </a:solidFill>
+                    </a:lnT>
+                    <a:lnB w="720">
+                      <a:solidFill>
+                        <a:srgbClr val="ffffff"/>
+                      </a:solidFill>
+                    </a:lnB>
+                    <a:solidFill>
+                      <a:srgbClr val="cccccc"/>
+                    </a:solidFill>
+                  </a:tcPr>
+                </a:tc>
+                <a:tc>
+                  <a:tcPr marL="90000" marR="90000">
+                    <a:lnL w="720">
+                      <a:solidFill>
+                        <a:srgbClr val="ffffff"/>
+                      </a:solidFill>
+                    </a:lnL>
+                    <a:lnR w="720">
+                      <a:solidFill>
+                        <a:srgbClr val="ffffff"/>
+                      </a:solidFill>
+                    </a:lnR>
+                    <a:lnT w="720">
+                      <a:solidFill>
+                        <a:srgbClr val="ffffff"/>
+                      </a:solidFill>
+                    </a:lnT>
+                    <a:lnB w="720">
+                      <a:solidFill>
+                        <a:srgbClr val="ffffff"/>
+                      </a:solidFill>
+                    </a:lnB>
+                    <a:solidFill>
+                      <a:srgbClr val="cccccc"/>
+                    </a:solidFill>
+                  </a:tcPr>
+                </a:tc>
+                <a:tc>
+                  <a:tcPr marL="90000" marR="90000">
+                    <a:lnL w="720">
+                      <a:solidFill>
+                        <a:srgbClr val="ffffff"/>
+                      </a:solidFill>
+                    </a:lnL>
+                    <a:lnR w="720">
+                      <a:solidFill>
+                        <a:srgbClr val="ffffff"/>
+                      </a:solidFill>
+                    </a:lnR>
+                    <a:lnT w="720">
+                      <a:solidFill>
+                        <a:srgbClr val="ffffff"/>
+                      </a:solidFill>
+                    </a:lnT>
+                    <a:lnB w="720">
+                      <a:solidFill>
+                        <a:srgbClr val="ffffff"/>
+                      </a:solidFill>
+                    </a:lnB>
+                    <a:solidFill>
+                      <a:srgbClr val="cccccc"/>
+                    </a:solidFill>
+                  </a:tcPr>
+                </a:tc>
+              </a:tr>
+              <a:tr h="327240">
+                <a:tc>
+                  <a:txBody>
+                    <a:bodyPr lIns="90000" rIns="90000" tIns="46800" bIns="46800">
+                      <a:noAutofit/>
+                    </a:bodyPr>
+                    <a:p>
+                      <a:r>
+                        <a:rPr b="0" lang="en-IN" sz="1800" spc="-1" strike="noStrike">
+                          <a:latin typeface="Arial"/>
+                        </a:rPr>
+                        <a:t>5733</a:t>
+                      </a:r>
+                      <a:endParaRPr b="0" lang="en-IN" sz="1800" spc="-1" strike="noStrike">
+                        <a:latin typeface="Arial"/>
+                      </a:endParaRPr>
+                    </a:p>
+                  </a:txBody>
+                  <a:tcPr marL="90000" marR="90000">
+                    <a:lnL w="720">
+                      <a:solidFill>
+                        <a:srgbClr val="ffffff"/>
+                      </a:solidFill>
+                    </a:lnL>
+                    <a:lnR w="720">
+                      <a:solidFill>
+                        <a:srgbClr val="ffffff"/>
+                      </a:solidFill>
+                    </a:lnR>
+                    <a:lnT w="720">
+                      <a:solidFill>
+                        <a:srgbClr val="ffffff"/>
+                      </a:solidFill>
+                    </a:lnT>
+                    <a:lnB w="720">
+                      <a:solidFill>
+                        <a:srgbClr val="ffffff"/>
+                      </a:solidFill>
+                    </a:lnB>
+                    <a:solidFill>
+                      <a:srgbClr val="e6e6e6"/>
+                    </a:solidFill>
+                  </a:tcPr>
+                </a:tc>
+                <a:tc>
+                  <a:tcPr marL="90000" marR="90000">
+                    <a:lnL w="720">
+                      <a:solidFill>
+                        <a:srgbClr val="ffffff"/>
+                      </a:solidFill>
+                    </a:lnL>
+                    <a:lnR w="720">
+                      <a:solidFill>
+                        <a:srgbClr val="ffffff"/>
+                      </a:solidFill>
+                    </a:lnR>
+                    <a:lnT w="720">
+                      <a:solidFill>
+                        <a:srgbClr val="ffffff"/>
+                      </a:solidFill>
+                    </a:lnT>
+                    <a:lnB w="720">
+                      <a:solidFill>
+                        <a:srgbClr val="ffffff"/>
+                      </a:solidFill>
+                    </a:lnB>
+                    <a:solidFill>
+                      <a:srgbClr val="e6e6e6"/>
+                    </a:solidFill>
+                  </a:tcPr>
+                </a:tc>
+                <a:tc>
+                  <a:tcPr marL="90000" marR="90000">
+                    <a:lnL w="720">
+                      <a:solidFill>
+                        <a:srgbClr val="ffffff"/>
+                      </a:solidFill>
+                    </a:lnL>
+                    <a:lnR w="720">
+                      <a:solidFill>
+                        <a:srgbClr val="ffffff"/>
+                      </a:solidFill>
+                    </a:lnR>
+                    <a:lnT w="720">
+                      <a:solidFill>
+                        <a:srgbClr val="ffffff"/>
+                      </a:solidFill>
+                    </a:lnT>
+                    <a:lnB w="720">
+                      <a:solidFill>
+                        <a:srgbClr val="ffffff"/>
+                      </a:solidFill>
+                    </a:lnB>
+                    <a:solidFill>
+                      <a:srgbClr val="e6e6e6"/>
+                    </a:solidFill>
+                  </a:tcPr>
+                </a:tc>
+                <a:tc>
+                  <a:tcPr marL="90000" marR="90000">
+                    <a:lnL w="720">
+                      <a:solidFill>
+                        <a:srgbClr val="ffffff"/>
+                      </a:solidFill>
+                    </a:lnL>
+                    <a:lnR w="720">
+                      <a:solidFill>
+                        <a:srgbClr val="ffffff"/>
+                      </a:solidFill>
+                    </a:lnR>
+                    <a:lnT w="720">
+                      <a:solidFill>
+                        <a:srgbClr val="ffffff"/>
+                      </a:solidFill>
+                    </a:lnT>
+                    <a:lnB w="720">
+                      <a:solidFill>
+                        <a:srgbClr val="ffffff"/>
+                      </a:solidFill>
+                    </a:lnB>
+                    <a:solidFill>
+                      <a:srgbClr val="e6e6e6"/>
+                    </a:solidFill>
+                  </a:tcPr>
+                </a:tc>
+              </a:tr>
+              <a:tr h="349200">
+                <a:tc>
+                  <a:txBody>
+                    <a:bodyPr lIns="90000" rIns="90000" tIns="46800" bIns="46800">
+                      <a:noAutofit/>
+                    </a:bodyPr>
+                    <a:p>
+                      <a:r>
+                        <a:rPr b="0" lang="en-IN" sz="1800" spc="-1" strike="noStrike">
+                          <a:latin typeface="Arial"/>
+                        </a:rPr>
+                        <a:t>5740</a:t>
+                      </a:r>
+                      <a:endParaRPr b="0" lang="en-IN" sz="1800" spc="-1" strike="noStrike">
+                        <a:latin typeface="Arial"/>
+                      </a:endParaRPr>
+                    </a:p>
+                  </a:txBody>
+                  <a:tcPr marL="90000" marR="90000">
+                    <a:lnL w="720">
+                      <a:solidFill>
+                        <a:srgbClr val="ffffff"/>
+                      </a:solidFill>
+                    </a:lnL>
+                    <a:lnR w="720">
+                      <a:solidFill>
+                        <a:srgbClr val="ffffff"/>
+                      </a:solidFill>
+                    </a:lnR>
+                    <a:lnT w="720">
+                      <a:solidFill>
+                        <a:srgbClr val="ffffff"/>
+                      </a:solidFill>
+                    </a:lnT>
+                    <a:lnB w="720">
+                      <a:solidFill>
+                        <a:srgbClr val="ffffff"/>
+                      </a:solidFill>
+                    </a:lnB>
+                    <a:solidFill>
+                      <a:srgbClr val="cccccc"/>
+                    </a:solidFill>
+                  </a:tcPr>
+                </a:tc>
+                <a:tc>
+                  <a:tcPr marL="90000" marR="90000">
+                    <a:lnL w="720">
+                      <a:solidFill>
+                        <a:srgbClr val="ffffff"/>
+                      </a:solidFill>
+                    </a:lnL>
+                    <a:lnR w="720">
+                      <a:solidFill>
+                        <a:srgbClr val="ffffff"/>
+                      </a:solidFill>
+                    </a:lnR>
+                    <a:lnT w="720">
+                      <a:solidFill>
+                        <a:srgbClr val="ffffff"/>
+                      </a:solidFill>
+                    </a:lnT>
+                    <a:lnB w="720">
+                      <a:solidFill>
+                        <a:srgbClr val="ffffff"/>
+                      </a:solidFill>
+                    </a:lnB>
+                    <a:solidFill>
+                      <a:srgbClr val="cccccc"/>
+                    </a:solidFill>
+                  </a:tcPr>
+                </a:tc>
+                <a:tc>
+                  <a:tcPr marL="90000" marR="90000">
+                    <a:lnL w="720">
+                      <a:solidFill>
+                        <a:srgbClr val="ffffff"/>
+                      </a:solidFill>
+                    </a:lnL>
+                    <a:lnR w="720">
+                      <a:solidFill>
+                        <a:srgbClr val="ffffff"/>
+                      </a:solidFill>
+                    </a:lnR>
+                    <a:lnT w="720">
+                      <a:solidFill>
+                        <a:srgbClr val="ffffff"/>
+                      </a:solidFill>
+                    </a:lnT>
+                    <a:lnB w="720">
+                      <a:solidFill>
+                        <a:srgbClr val="ffffff"/>
+                      </a:solidFill>
+                    </a:lnB>
+                    <a:solidFill>
+                      <a:srgbClr val="cccccc"/>
+                    </a:solidFill>
+                  </a:tcPr>
+                </a:tc>
+                <a:tc>
+                  <a:tcPr marL="90000" marR="90000">
+                    <a:lnL w="720">
+                      <a:solidFill>
+                        <a:srgbClr val="ffffff"/>
+                      </a:solidFill>
+                    </a:lnL>
+                    <a:lnR w="720">
+                      <a:solidFill>
+                        <a:srgbClr val="ffffff"/>
+                      </a:solidFill>
+                    </a:lnR>
+                    <a:lnT w="720">
+                      <a:solidFill>
+                        <a:srgbClr val="ffffff"/>
+                      </a:solidFill>
+                    </a:lnT>
+                    <a:lnB w="720">
+                      <a:solidFill>
+                        <a:srgbClr val="ffffff"/>
+                      </a:solidFill>
+                    </a:lnB>
+                    <a:solidFill>
+                      <a:srgbClr val="cccccc"/>
+                    </a:solidFill>
+                  </a:tcPr>
+                </a:tc>
+              </a:tr>
+              <a:tr h="326880">
+                <a:tc>
+                  <a:txBody>
+                    <a:bodyPr lIns="90000" rIns="90000" tIns="46800" bIns="46800">
+                      <a:noAutofit/>
+                    </a:bodyPr>
+                    <a:p>
+                      <a:r>
+                        <a:rPr b="0" lang="en-IN" sz="1800" spc="-1" strike="noStrike">
+                          <a:latin typeface="Arial"/>
+                        </a:rPr>
+                        <a:t>5746</a:t>
+                      </a:r>
+                      <a:endParaRPr b="0" lang="en-IN" sz="1800" spc="-1" strike="noStrike">
+                        <a:latin typeface="Arial"/>
+                      </a:endParaRPr>
+                    </a:p>
+                  </a:txBody>
+                  <a:tcPr marL="90000" marR="90000">
+                    <a:lnL w="720">
+                      <a:solidFill>
+                        <a:srgbClr val="ffffff"/>
+                      </a:solidFill>
+                    </a:lnL>
+                    <a:lnR w="720">
+                      <a:solidFill>
+                        <a:srgbClr val="ffffff"/>
+                      </a:solidFill>
+                    </a:lnR>
+                    <a:lnT w="720">
+                      <a:solidFill>
+                        <a:srgbClr val="ffffff"/>
+                      </a:solidFill>
+                    </a:lnT>
+                    <a:lnB w="720">
+                      <a:solidFill>
+                        <a:srgbClr val="ffffff"/>
+                      </a:solidFill>
+                    </a:lnB>
+                    <a:solidFill>
+                      <a:srgbClr val="e6e6e6"/>
+                    </a:solidFill>
+                  </a:tcPr>
+                </a:tc>
+                <a:tc>
+                  <a:tcPr marL="90000" marR="90000">
+                    <a:lnL w="720">
+                      <a:solidFill>
+                        <a:srgbClr val="ffffff"/>
+                      </a:solidFill>
+                    </a:lnL>
+                    <a:lnR w="720">
+                      <a:solidFill>
+                        <a:srgbClr val="ffffff"/>
+                      </a:solidFill>
+                    </a:lnR>
+                    <a:lnT w="720">
+                      <a:solidFill>
+                        <a:srgbClr val="ffffff"/>
+                      </a:solidFill>
+                    </a:lnT>
+                    <a:lnB w="720">
+                      <a:solidFill>
+                        <a:srgbClr val="ffffff"/>
+                      </a:solidFill>
+                    </a:lnB>
+                    <a:solidFill>
+                      <a:srgbClr val="e6e6e6"/>
+                    </a:solidFill>
+                  </a:tcPr>
+                </a:tc>
+                <a:tc>
+                  <a:tcPr marL="90000" marR="90000">
+                    <a:lnL w="720">
+                      <a:solidFill>
+                        <a:srgbClr val="ffffff"/>
+                      </a:solidFill>
+                    </a:lnL>
+                    <a:lnR w="720">
+                      <a:solidFill>
+                        <a:srgbClr val="ffffff"/>
+                      </a:solidFill>
+                    </a:lnR>
+                    <a:lnT w="720">
+                      <a:solidFill>
+                        <a:srgbClr val="ffffff"/>
+                      </a:solidFill>
+                    </a:lnT>
+                    <a:lnB w="720">
+                      <a:solidFill>
+                        <a:srgbClr val="ffffff"/>
+                      </a:solidFill>
+                    </a:lnB>
+                    <a:solidFill>
+                      <a:srgbClr val="e6e6e6"/>
+                    </a:solidFill>
+                  </a:tcPr>
+                </a:tc>
+                <a:tc>
+                  <a:tcPr marL="90000" marR="90000">
+                    <a:lnL w="720">
+                      <a:solidFill>
+                        <a:srgbClr val="ffffff"/>
+                      </a:solidFill>
+                    </a:lnL>
+                    <a:lnR w="720">
+                      <a:solidFill>
+                        <a:srgbClr val="ffffff"/>
+                      </a:solidFill>
+                    </a:lnR>
+                    <a:lnT w="720">
+                      <a:solidFill>
+                        <a:srgbClr val="ffffff"/>
+                      </a:solidFill>
+                    </a:lnT>
+                    <a:lnB w="720">
+                      <a:solidFill>
+                        <a:srgbClr val="ffffff"/>
+                      </a:solidFill>
+                    </a:lnB>
+                    <a:solidFill>
+                      <a:srgbClr val="e6e6e6"/>
+                    </a:solidFill>
+                  </a:tcPr>
+                </a:tc>
+              </a:tr>
+              <a:tr h="342360">
+                <a:tc>
+                  <a:txBody>
+                    <a:bodyPr lIns="90000" rIns="90000" tIns="46800" bIns="46800">
+                      <a:noAutofit/>
+                    </a:bodyPr>
+                    <a:p>
+                      <a:r>
+                        <a:rPr b="0" lang="en-IN" sz="1800" spc="-1" strike="noStrike">
+                          <a:latin typeface="Arial"/>
+                        </a:rPr>
+                        <a:t>5748</a:t>
+                      </a:r>
+                      <a:endParaRPr b="0" lang="en-IN" sz="1800" spc="-1" strike="noStrike">
+                        <a:latin typeface="Arial"/>
+                      </a:endParaRPr>
+                    </a:p>
+                  </a:txBody>
+                  <a:tcPr marL="90000" marR="90000">
+                    <a:lnL w="720">
+                      <a:solidFill>
+                        <a:srgbClr val="ffffff"/>
+                      </a:solidFill>
+                    </a:lnL>
+                    <a:lnR w="720">
+                      <a:solidFill>
+                        <a:srgbClr val="ffffff"/>
+                      </a:solidFill>
+                    </a:lnR>
+                    <a:lnT w="720">
+                      <a:solidFill>
+                        <a:srgbClr val="ffffff"/>
+                      </a:solidFill>
+                    </a:lnT>
+                    <a:lnB w="720">
+                      <a:solidFill>
+                        <a:srgbClr val="ffffff"/>
+                      </a:solidFill>
+                    </a:lnB>
+                    <a:solidFill>
+                      <a:srgbClr val="cccccc"/>
+                    </a:solidFill>
+                  </a:tcPr>
+                </a:tc>
+                <a:tc>
+                  <a:tcPr marL="90000" marR="90000">
+                    <a:lnL w="720">
+                      <a:solidFill>
+                        <a:srgbClr val="ffffff"/>
+                      </a:solidFill>
+                    </a:lnL>
+                    <a:lnR w="720">
+                      <a:solidFill>
+                        <a:srgbClr val="ffffff"/>
+                      </a:solidFill>
+                    </a:lnR>
+                    <a:lnT w="720">
+                      <a:solidFill>
+                        <a:srgbClr val="ffffff"/>
+                      </a:solidFill>
+                    </a:lnT>
+                    <a:lnB w="720">
+                      <a:solidFill>
+                        <a:srgbClr val="ffffff"/>
+                      </a:solidFill>
+                    </a:lnB>
+                    <a:solidFill>
+                      <a:srgbClr val="cccccc"/>
+                    </a:solidFill>
+                  </a:tcPr>
+                </a:tc>
+                <a:tc>
+                  <a:tcPr marL="90000" marR="90000">
+                    <a:lnL w="720">
+                      <a:solidFill>
+                        <a:srgbClr val="ffffff"/>
+                      </a:solidFill>
+                    </a:lnL>
+                    <a:lnR w="720">
+                      <a:solidFill>
+                        <a:srgbClr val="ffffff"/>
+                      </a:solidFill>
+                    </a:lnR>
+                    <a:lnT w="720">
+                      <a:solidFill>
+                        <a:srgbClr val="ffffff"/>
+                      </a:solidFill>
+                    </a:lnT>
+                    <a:lnB w="720">
+                      <a:solidFill>
+                        <a:srgbClr val="ffffff"/>
+                      </a:solidFill>
+                    </a:lnB>
+                    <a:solidFill>
+                      <a:srgbClr val="cccccc"/>
+                    </a:solidFill>
+                  </a:tcPr>
+                </a:tc>
+                <a:tc>
+                  <a:tcPr marL="90000" marR="90000">
+                    <a:lnL w="720">
+                      <a:solidFill>
+                        <a:srgbClr val="ffffff"/>
+                      </a:solidFill>
+                    </a:lnL>
+                    <a:lnR w="720">
+                      <a:solidFill>
+                        <a:srgbClr val="ffffff"/>
+                      </a:solidFill>
+                    </a:lnR>
+                    <a:lnT w="720">
+                      <a:solidFill>
+                        <a:srgbClr val="ffffff"/>
+                      </a:solidFill>
+                    </a:lnT>
+                    <a:lnB w="720">
+                      <a:solidFill>
+                        <a:srgbClr val="ffffff"/>
+                      </a:solidFill>
+                    </a:lnB>
+                    <a:solidFill>
+                      <a:srgbClr val="cccccc"/>
+                    </a:solidFill>
+                  </a:tcPr>
+                </a:tc>
+              </a:tr>
+              <a:tr h="371160">
+                <a:tc>
+                  <a:txBody>
+                    <a:bodyPr lIns="90000" rIns="90000" tIns="46800" bIns="46800">
+                      <a:noAutofit/>
+                    </a:bodyPr>
+                    <a:p>
+                      <a:r>
+                        <a:rPr b="0" lang="en-IN" sz="1800" spc="-1" strike="noStrike">
+                          <a:latin typeface="Arial"/>
+                        </a:rPr>
+                        <a:t>5749</a:t>
+                      </a:r>
+                      <a:endParaRPr b="0" lang="en-IN" sz="1800" spc="-1" strike="noStrike">
+                        <a:latin typeface="Arial"/>
+                      </a:endParaRPr>
+                    </a:p>
+                  </a:txBody>
+                  <a:tcPr marL="90000" marR="90000">
+                    <a:lnL w="720">
+                      <a:solidFill>
+                        <a:srgbClr val="ffffff"/>
+                      </a:solidFill>
+                    </a:lnL>
+                    <a:lnR w="720">
+                      <a:solidFill>
+                        <a:srgbClr val="ffffff"/>
+                      </a:solidFill>
+                    </a:lnR>
+                    <a:lnT w="720">
+                      <a:solidFill>
+                        <a:srgbClr val="ffffff"/>
+                      </a:solidFill>
+                    </a:lnT>
+                    <a:lnB w="720">
+                      <a:solidFill>
+                        <a:srgbClr val="ffffff"/>
+                      </a:solidFill>
+                    </a:lnB>
+                    <a:solidFill>
+                      <a:srgbClr val="e6e6e6"/>
+                    </a:solidFill>
+                  </a:tcPr>
+                </a:tc>
+                <a:tc>
+                  <a:tcPr marL="90000" marR="90000">
+                    <a:lnL w="720">
+                      <a:solidFill>
+                        <a:srgbClr val="ffffff"/>
+                      </a:solidFill>
+                    </a:lnL>
+                    <a:lnR w="720">
+                      <a:solidFill>
+                        <a:srgbClr val="ffffff"/>
+                      </a:solidFill>
+                    </a:lnR>
+                    <a:lnT w="720">
+                      <a:solidFill>
+                        <a:srgbClr val="ffffff"/>
+                      </a:solidFill>
+                    </a:lnT>
+                    <a:lnB w="720">
+                      <a:solidFill>
+                        <a:srgbClr val="ffffff"/>
+                      </a:solidFill>
+                    </a:lnB>
+                    <a:solidFill>
+                      <a:srgbClr val="e6e6e6"/>
+                    </a:solidFill>
+                  </a:tcPr>
+                </a:tc>
+                <a:tc>
+                  <a:tcPr marL="90000" marR="90000">
+                    <a:lnL w="720">
+                      <a:solidFill>
+                        <a:srgbClr val="ffffff"/>
+                      </a:solidFill>
+                    </a:lnL>
+                    <a:lnR w="720">
+                      <a:solidFill>
+                        <a:srgbClr val="ffffff"/>
+                      </a:solidFill>
+                    </a:lnR>
+                    <a:lnT w="720">
+                      <a:solidFill>
+                        <a:srgbClr val="ffffff"/>
+                      </a:solidFill>
+                    </a:lnT>
+                    <a:lnB w="720">
+                      <a:solidFill>
+                        <a:srgbClr val="ffffff"/>
+                      </a:solidFill>
+                    </a:lnB>
+                    <a:solidFill>
+                      <a:srgbClr val="e6e6e6"/>
+                    </a:solidFill>
+                  </a:tcPr>
+                </a:tc>
+                <a:tc>
+                  <a:tcPr marL="90000" marR="90000">
+                    <a:lnL w="720">
+                      <a:solidFill>
+                        <a:srgbClr val="ffffff"/>
+                      </a:solidFill>
+                    </a:lnL>
+                    <a:lnR w="720">
+                      <a:solidFill>
+                        <a:srgbClr val="ffffff"/>
+                      </a:solidFill>
+                    </a:lnR>
+                    <a:lnT w="720">
+                      <a:solidFill>
+                        <a:srgbClr val="ffffff"/>
+                      </a:solidFill>
+                    </a:lnT>
+                    <a:lnB w="720">
+                      <a:solidFill>
+                        <a:srgbClr val="ffffff"/>
+                      </a:solidFill>
+                    </a:lnB>
+                    <a:solidFill>
+                      <a:srgbClr val="e6e6e6"/>
+                    </a:solidFill>
+                  </a:tcPr>
+                </a:tc>
+              </a:tr>
+              <a:tr h="371880">
+                <a:tc>
+                  <a:txBody>
+                    <a:bodyPr lIns="90000" rIns="90000" tIns="46800" bIns="46800">
+                      <a:noAutofit/>
+                    </a:bodyPr>
+                    <a:p>
+                      <a:r>
+                        <a:rPr b="0" lang="en-IN" sz="1800" spc="-1" strike="noStrike">
+                          <a:latin typeface="Arial"/>
+                        </a:rPr>
+                        <a:t>5790</a:t>
+                      </a:r>
+                      <a:endParaRPr b="0" lang="en-IN" sz="1800" spc="-1" strike="noStrike">
+                        <a:latin typeface="Arial"/>
+                      </a:endParaRPr>
+                    </a:p>
+                  </a:txBody>
+                  <a:tcPr marL="90000" marR="90000">
+                    <a:lnL w="720">
+                      <a:solidFill>
+                        <a:srgbClr val="ffffff"/>
+                      </a:solidFill>
+                    </a:lnL>
+                    <a:lnR w="720">
+                      <a:solidFill>
+                        <a:srgbClr val="ffffff"/>
+                      </a:solidFill>
+                    </a:lnR>
+                    <a:lnT w="720">
+                      <a:solidFill>
+                        <a:srgbClr val="ffffff"/>
+                      </a:solidFill>
+                    </a:lnT>
+                    <a:lnB w="720">
+                      <a:solidFill>
+                        <a:srgbClr val="ffffff"/>
+                      </a:solidFill>
+                    </a:lnB>
+                    <a:solidFill>
+                      <a:srgbClr val="cccccc"/>
+                    </a:solidFill>
+                  </a:tcPr>
+                </a:tc>
+                <a:tc>
+                  <a:tcPr marL="90000" marR="90000">
+                    <a:lnL w="720">
+                      <a:solidFill>
+                        <a:srgbClr val="ffffff"/>
+                      </a:solidFill>
+                    </a:lnL>
+                    <a:lnR w="720">
+                      <a:solidFill>
+                        <a:srgbClr val="ffffff"/>
+                      </a:solidFill>
+                    </a:lnR>
+                    <a:lnT w="720">
+                      <a:solidFill>
+                        <a:srgbClr val="ffffff"/>
+                      </a:solidFill>
+                    </a:lnT>
+                    <a:lnB w="720">
+                      <a:solidFill>
+                        <a:srgbClr val="ffffff"/>
+                      </a:solidFill>
+                    </a:lnB>
+                    <a:solidFill>
+                      <a:srgbClr val="cccccc"/>
+                    </a:solidFill>
+                  </a:tcPr>
+                </a:tc>
+                <a:tc>
+                  <a:tcPr marL="90000" marR="90000">
+                    <a:lnL w="720">
+                      <a:solidFill>
+                        <a:srgbClr val="ffffff"/>
+                      </a:solidFill>
+                    </a:lnL>
+                    <a:lnR w="720">
+                      <a:solidFill>
+                        <a:srgbClr val="ffffff"/>
+                      </a:solidFill>
+                    </a:lnR>
+                    <a:lnT w="720">
+                      <a:solidFill>
+                        <a:srgbClr val="ffffff"/>
+                      </a:solidFill>
+                    </a:lnT>
+                    <a:lnB w="720">
+                      <a:solidFill>
+                        <a:srgbClr val="ffffff"/>
+                      </a:solidFill>
+                    </a:lnB>
+                    <a:solidFill>
+                      <a:srgbClr val="cccccc"/>
+                    </a:solidFill>
+                  </a:tcPr>
+                </a:tc>
+                <a:tc>
+                  <a:tcPr marL="90000" marR="90000">
+                    <a:lnL w="720">
+                      <a:solidFill>
+                        <a:srgbClr val="ffffff"/>
+                      </a:solidFill>
+                    </a:lnL>
+                    <a:lnR w="720">
+                      <a:solidFill>
+                        <a:srgbClr val="ffffff"/>
+                      </a:solidFill>
+                    </a:lnR>
+                    <a:lnT w="720">
+                      <a:solidFill>
+                        <a:srgbClr val="ffffff"/>
+                      </a:solidFill>
+                    </a:lnT>
+                    <a:lnB w="720">
+                      <a:solidFill>
+                        <a:srgbClr val="ffffff"/>
+                      </a:solidFill>
+                    </a:lnB>
+                    <a:solidFill>
+                      <a:srgbClr val="cccccc"/>
+                    </a:solidFill>
+                  </a:tcPr>
+                </a:tc>
+              </a:tr>
+              <a:tr h="342360">
+                <a:tc>
+                  <a:tcPr marL="90000" marR="90000">
+                    <a:lnL w="720">
+                      <a:solidFill>
+                        <a:srgbClr val="ffffff"/>
+                      </a:solidFill>
+                    </a:lnL>
+                    <a:lnR w="720">
+                      <a:solidFill>
+                        <a:srgbClr val="ffffff"/>
+                      </a:solidFill>
+                    </a:lnR>
+                    <a:lnT w="720">
+                      <a:solidFill>
+                        <a:srgbClr val="ffffff"/>
+                      </a:solidFill>
+                    </a:lnT>
+                    <a:lnB w="720">
+                      <a:solidFill>
+                        <a:srgbClr val="ffffff"/>
+                      </a:solidFill>
+                    </a:lnB>
+                    <a:solidFill>
+                      <a:srgbClr val="e6e6e6"/>
+                    </a:solidFill>
+                  </a:tcPr>
+                </a:tc>
+                <a:tc>
+                  <a:tcPr marL="90000" marR="90000">
+                    <a:lnL w="720">
+                      <a:solidFill>
+                        <a:srgbClr val="ffffff"/>
+                      </a:solidFill>
+                    </a:lnL>
+                    <a:lnR w="720">
+                      <a:solidFill>
+                        <a:srgbClr val="ffffff"/>
+                      </a:solidFill>
+                    </a:lnR>
+                    <a:lnT w="720">
+                      <a:solidFill>
+                        <a:srgbClr val="ffffff"/>
+                      </a:solidFill>
+                    </a:lnT>
+                    <a:lnB w="720">
+                      <a:solidFill>
+                        <a:srgbClr val="ffffff"/>
+                      </a:solidFill>
+                    </a:lnB>
+                    <a:solidFill>
+                      <a:srgbClr val="e6e6e6"/>
+                    </a:solidFill>
+                  </a:tcPr>
+                </a:tc>
+                <a:tc>
+                  <a:tcPr marL="90000" marR="90000">
+                    <a:lnL w="720">
+                      <a:solidFill>
+                        <a:srgbClr val="ffffff"/>
+                      </a:solidFill>
+                    </a:lnL>
+                    <a:lnR w="720">
+                      <a:solidFill>
+                        <a:srgbClr val="ffffff"/>
+                      </a:solidFill>
+                    </a:lnR>
+                    <a:lnT w="720">
+                      <a:solidFill>
+                        <a:srgbClr val="ffffff"/>
+                      </a:solidFill>
+                    </a:lnT>
+                    <a:lnB w="720">
+                      <a:solidFill>
+                        <a:srgbClr val="ffffff"/>
+                      </a:solidFill>
+                    </a:lnB>
+                    <a:solidFill>
+                      <a:srgbClr val="e6e6e6"/>
+                    </a:solidFill>
+                  </a:tcPr>
+                </a:tc>
+                <a:tc>
+                  <a:tcPr marL="90000" marR="90000">
+                    <a:lnL w="720">
+                      <a:solidFill>
+                        <a:srgbClr val="ffffff"/>
+                      </a:solidFill>
+                    </a:lnL>
+                    <a:lnR w="720">
+                      <a:solidFill>
+                        <a:srgbClr val="ffffff"/>
+                      </a:solidFill>
+                    </a:lnR>
+                    <a:lnT w="720">
+                      <a:solidFill>
+                        <a:srgbClr val="ffffff"/>
+                      </a:solidFill>
+                    </a:lnT>
+                    <a:lnB w="720">
+                      <a:solidFill>
+                        <a:srgbClr val="ffffff"/>
+                      </a:solidFill>
+                    </a:lnB>
+                    <a:solidFill>
+                      <a:srgbClr val="e6e6e6"/>
+                    </a:solidFill>
+                  </a:tcPr>
+                </a:tc>
+              </a:tr>
+            </a:tbl>
+          </a:graphicData>
+        </a:graphic>
+      </p:graphicFrame>
+      <p:graphicFrame>
+        <p:nvGraphicFramePr>
+          <p:cNvPr id="355" name="Table 2"/>
+          <p:cNvGraphicFramePr/>
+          <p:nvPr/>
+        </p:nvGraphicFramePr>
+        <p:xfrm>
+          <a:off x="1026360" y="2240640"/>
+          <a:ext cx="5075280" cy="2159280"/>
+        </p:xfrm>
+        <a:graphic>
+          <a:graphicData uri="http://schemas.openxmlformats.org/drawingml/2006/table">
+            <a:tbl>
+              <a:tblPr/>
+              <a:tblGrid>
+                <a:gridCol w="1310040"/>
+                <a:gridCol w="1116360"/>
+              </a:tblGrid>
+              <a:tr h="371880">
+                <a:tc>
+                  <a:txBody>
+                    <a:bodyPr lIns="90000" rIns="90000" tIns="46800" bIns="46800">
+                      <a:noAutofit/>
+                    </a:bodyPr>
+                    <a:p>
+                      <a:r>
+                        <a:rPr b="0" lang="en-IN" sz="1800" spc="-1" strike="noStrike">
+                          <a:latin typeface="Arial"/>
+                        </a:rPr>
+                        <a:t>5721</a:t>
+                      </a:r>
+                      <a:endParaRPr b="0" lang="en-IN" sz="1800" spc="-1" strike="noStrike">
+                        <a:latin typeface="Arial"/>
+                      </a:endParaRPr>
+                    </a:p>
+                  </a:txBody>
+                  <a:tcPr marL="90000" marR="90000">
+                    <a:lnL w="720">
+                      <a:solidFill>
+                        <a:srgbClr val="ffffff"/>
+                      </a:solidFill>
+                    </a:lnL>
+                    <a:lnR w="720">
+                      <a:solidFill>
+                        <a:srgbClr val="ffffff"/>
+                      </a:solidFill>
+                    </a:lnR>
+                    <a:lnT w="720">
+                      <a:solidFill>
+                        <a:srgbClr val="ffffff"/>
+                      </a:solidFill>
+                    </a:lnT>
+                    <a:lnB w="720">
+                      <a:solidFill>
+                        <a:srgbClr val="ffffff"/>
+                      </a:solidFill>
+                    </a:lnB>
+                    <a:solidFill>
+                      <a:srgbClr val="b3b3b3"/>
+                    </a:solidFill>
+                  </a:tcPr>
+                </a:tc>
+                <a:tc>
+                  <a:tcPr marL="90000" marR="90000">
+                    <a:lnL w="720">
+                      <a:solidFill>
+                        <a:srgbClr val="ffffff"/>
+                      </a:solidFill>
+                    </a:lnL>
+                    <a:lnR w="720">
+                      <a:solidFill>
+                        <a:srgbClr val="ffffff"/>
+                      </a:solidFill>
+                    </a:lnR>
+                    <a:lnT w="720">
+                      <a:solidFill>
+                        <a:srgbClr val="ffffff"/>
+                      </a:solidFill>
+                    </a:lnT>
+                    <a:lnB w="720">
+                      <a:solidFill>
+                        <a:srgbClr val="ffffff"/>
+                      </a:solidFill>
+                    </a:lnB>
+                    <a:solidFill>
+                      <a:srgbClr val="b3b3b3"/>
+                    </a:solidFill>
+                  </a:tcPr>
+                </a:tc>
+              </a:tr>
+              <a:tr h="416880">
+                <a:tc>
+                  <a:txBody>
+                    <a:bodyPr lIns="90000" rIns="90000" tIns="46800" bIns="46800">
+                      <a:noAutofit/>
+                    </a:bodyPr>
+                    <a:p>
+                      <a:r>
+                        <a:rPr b="0" lang="en-IN" sz="1800" spc="-1" strike="noStrike">
+                          <a:latin typeface="Arial"/>
+                        </a:rPr>
+                        <a:t>5733</a:t>
+                      </a:r>
+                      <a:endParaRPr b="0" lang="en-IN" sz="1800" spc="-1" strike="noStrike">
+                        <a:latin typeface="Arial"/>
+                      </a:endParaRPr>
+                    </a:p>
+                  </a:txBody>
+                  <a:tcPr marL="90000" marR="90000">
+                    <a:lnL w="720">
+                      <a:solidFill>
+                        <a:srgbClr val="ffffff"/>
+                      </a:solidFill>
+                    </a:lnL>
+                    <a:lnR w="720">
+                      <a:solidFill>
+                        <a:srgbClr val="ffffff"/>
+                      </a:solidFill>
+                    </a:lnR>
+                    <a:lnT w="720">
+                      <a:solidFill>
+                        <a:srgbClr val="ffffff"/>
+                      </a:solidFill>
+                    </a:lnT>
+                    <a:lnB w="720">
+                      <a:solidFill>
+                        <a:srgbClr val="ffffff"/>
+                      </a:solidFill>
+                    </a:lnB>
+                    <a:solidFill>
+                      <a:srgbClr val="cccccc"/>
+                    </a:solidFill>
+                  </a:tcPr>
+                </a:tc>
+                <a:tc>
+                  <a:tcPr marL="90000" marR="90000">
+                    <a:lnL w="720">
+                      <a:solidFill>
+                        <a:srgbClr val="ffffff"/>
+                      </a:solidFill>
+                    </a:lnL>
+                    <a:lnR w="720">
+                      <a:solidFill>
+                        <a:srgbClr val="ffffff"/>
+                      </a:solidFill>
+                    </a:lnR>
+                    <a:lnT w="720">
+                      <a:solidFill>
+                        <a:srgbClr val="ffffff"/>
+                      </a:solidFill>
+                    </a:lnT>
+                    <a:lnB w="720">
+                      <a:solidFill>
+                        <a:srgbClr val="ffffff"/>
+                      </a:solidFill>
+                    </a:lnB>
+                    <a:solidFill>
+                      <a:srgbClr val="cccccc"/>
+                    </a:solidFill>
+                  </a:tcPr>
+                </a:tc>
+              </a:tr>
+              <a:tr h="342360">
+                <a:tc>
+                  <a:txBody>
+                    <a:bodyPr lIns="90000" rIns="90000" tIns="46800" bIns="46800">
+                      <a:noAutofit/>
+                    </a:bodyPr>
+                    <a:p>
+                      <a:r>
+                        <a:rPr b="0" lang="en-IN" sz="1800" spc="-1" strike="noStrike">
+                          <a:latin typeface="Arial"/>
+                        </a:rPr>
+                        <a:t>5749</a:t>
+                      </a:r>
+                      <a:endParaRPr b="0" lang="en-IN" sz="1800" spc="-1" strike="noStrike">
+                        <a:latin typeface="Arial"/>
+                      </a:endParaRPr>
+                    </a:p>
+                  </a:txBody>
+                  <a:tcPr marL="90000" marR="90000">
+                    <a:lnL w="720">
+                      <a:solidFill>
+                        <a:srgbClr val="ffffff"/>
+                      </a:solidFill>
+                    </a:lnL>
+                    <a:lnR w="720">
+                      <a:solidFill>
+                        <a:srgbClr val="ffffff"/>
+                      </a:solidFill>
+                    </a:lnR>
+                    <a:lnT w="720">
+                      <a:solidFill>
+                        <a:srgbClr val="ffffff"/>
+                      </a:solidFill>
+                    </a:lnT>
+                    <a:lnB w="720">
+                      <a:solidFill>
+                        <a:srgbClr val="ffffff"/>
+                      </a:solidFill>
+                    </a:lnB>
+                    <a:solidFill>
+                      <a:srgbClr val="e6e6e6"/>
+                    </a:solidFill>
+                  </a:tcPr>
+                </a:tc>
+                <a:tc>
+                  <a:tcPr marL="90000" marR="90000">
+                    <a:lnL w="720">
+                      <a:solidFill>
+                        <a:srgbClr val="ffffff"/>
+                      </a:solidFill>
+                    </a:lnL>
+                    <a:lnR w="720">
+                      <a:solidFill>
+                        <a:srgbClr val="ffffff"/>
+                      </a:solidFill>
+                    </a:lnR>
+                    <a:lnT w="720">
+                      <a:solidFill>
+                        <a:srgbClr val="ffffff"/>
+                      </a:solidFill>
+                    </a:lnT>
+                    <a:lnB w="720">
+                      <a:solidFill>
+                        <a:srgbClr val="ffffff"/>
+                      </a:solidFill>
+                    </a:lnB>
+                    <a:solidFill>
+                      <a:srgbClr val="e6e6e6"/>
+                    </a:solidFill>
+                  </a:tcPr>
+                </a:tc>
+              </a:tr>
+            </a:tbl>
+          </a:graphicData>
+        </a:graphic>
+      </p:graphicFrame>
+      <p:sp>
+        <p:nvSpPr>
+          <p:cNvPr id="356" name="Line 3"/>
+          <p:cNvSpPr/>
+          <p:nvPr/>
+        </p:nvSpPr>
+        <p:spPr>
+          <a:xfrm flipV="1">
+            <a:off x="3168000" y="1368000"/>
+            <a:ext cx="2501280" cy="1080000"/>
+          </a:xfrm>
+          <a:prstGeom prst="line">
+            <a:avLst/>
+          </a:prstGeom>
+          <a:ln>
+            <a:solidFill>
+              <a:srgbClr val="3465a4"/>
+            </a:solidFill>
+            <a:tailEnd len="med" type="triangle" w="med"/>
+          </a:ln>
+        </p:spPr>
+        <p:style>
+          <a:lnRef idx="0"/>
+          <a:fillRef idx="0"/>
+          <a:effectRef idx="0"/>
+          <a:fontRef idx="minor"/>
+        </p:style>
+      </p:sp>
+      <p:sp>
+        <p:nvSpPr>
+          <p:cNvPr id="357" name="Line 4"/>
+          <p:cNvSpPr/>
+          <p:nvPr/>
+        </p:nvSpPr>
+        <p:spPr>
+          <a:xfrm flipV="1">
+            <a:off x="3096000" y="2736000"/>
+            <a:ext cx="2573280" cy="72000"/>
+          </a:xfrm>
+          <a:prstGeom prst="line">
+            <a:avLst/>
+          </a:prstGeom>
+          <a:ln>
+            <a:solidFill>
+              <a:srgbClr val="3465a4"/>
+            </a:solidFill>
+            <a:tailEnd len="med" type="triangle" w="med"/>
+          </a:ln>
+        </p:spPr>
+        <p:style>
+          <a:lnRef idx="0"/>
+          <a:fillRef idx="0"/>
+          <a:effectRef idx="0"/>
+          <a:fontRef idx="minor"/>
+        </p:style>
+      </p:sp>
+      <p:sp>
+        <p:nvSpPr>
+          <p:cNvPr id="358" name="Line 5"/>
+          <p:cNvSpPr/>
+          <p:nvPr/>
+        </p:nvSpPr>
+        <p:spPr>
+          <a:xfrm>
+            <a:off x="3240000" y="3240000"/>
+            <a:ext cx="2429280" cy="864000"/>
+          </a:xfrm>
+          <a:prstGeom prst="line">
+            <a:avLst/>
+          </a:prstGeom>
+          <a:ln>
+            <a:solidFill>
+              <a:srgbClr val="3465a4"/>
+            </a:solidFill>
+            <a:tailEnd len="med" type="triangle" w="med"/>
+          </a:ln>
+        </p:spPr>
+        <p:style>
+          <a:lnRef idx="0"/>
+          <a:fillRef idx="0"/>
+          <a:effectRef idx="0"/>
+          <a:fontRef idx="minor"/>
+        </p:style>
+      </p:sp>
+      <p:sp>
+        <p:nvSpPr>
+          <p:cNvPr id="359" name="TextShape 6"/>
+          <p:cNvSpPr txBox="1"/>
+          <p:nvPr/>
+        </p:nvSpPr>
+        <p:spPr>
+          <a:xfrm>
+            <a:off x="1728000" y="1741680"/>
+            <a:ext cx="1152000" cy="346320"/>
+          </a:xfrm>
+          <a:prstGeom prst="rect">
+            <a:avLst/>
+          </a:prstGeom>
+          <a:noFill/>
+          <a:ln>
+            <a:noFill/>
+          </a:ln>
+        </p:spPr>
+        <p:txBody>
+          <a:bodyPr lIns="90000" rIns="90000" tIns="45000" bIns="45000">
+            <a:noAutofit/>
+          </a:bodyPr>
+          <a:p>
+            <a:r>
+              <a:rPr b="0" lang="en-IN" sz="1800" spc="-1" strike="noStrike">
+                <a:latin typeface="Arial"/>
+              </a:rPr>
+              <a:t>Index file</a:t>
+            </a:r>
+            <a:endParaRPr b="0" lang="en-IN" sz="1800" spc="-1" strike="noStrike">
+              <a:latin typeface="Arial"/>
+            </a:endParaRPr>
+          </a:p>
+        </p:txBody>
+      </p:sp>
+      <p:sp>
+        <p:nvSpPr>
+          <p:cNvPr id="360" name="TextShape 7"/>
+          <p:cNvSpPr txBox="1"/>
+          <p:nvPr/>
+        </p:nvSpPr>
+        <p:spPr>
+          <a:xfrm>
+            <a:off x="6480000" y="648000"/>
+            <a:ext cx="1692000" cy="346320"/>
+          </a:xfrm>
+          <a:prstGeom prst="rect">
+            <a:avLst/>
+          </a:prstGeom>
+          <a:noFill/>
+          <a:ln>
+            <a:noFill/>
+          </a:ln>
+        </p:spPr>
+        <p:txBody>
+          <a:bodyPr lIns="90000" rIns="90000" tIns="45000" bIns="45000">
+            <a:noAutofit/>
+          </a:bodyPr>
+          <a:p>
+            <a:r>
+              <a:rPr b="0" lang="en-IN" sz="1800" spc="-1" strike="noStrike">
+                <a:latin typeface="Arial"/>
+              </a:rPr>
+              <a:t>Sequential file</a:t>
+            </a:r>
+            <a:endParaRPr b="0" lang="en-IN" sz="1800" spc="-1" strike="noStrike">
+              <a:latin typeface="Arial"/>
+            </a:endParaRPr>
+          </a:p>
+        </p:txBody>
+      </p:sp>
     </p:spTree>
   </p:cSld>
   <mc:AlternateContent>
@@ -12324,7 +14221,7 @@
         <p:spPr>
           <a:xfrm>
             <a:off x="1908000" y="936000"/>
-            <a:ext cx="1436040" cy="788040"/>
+            <a:ext cx="1435680" cy="787680"/>
           </a:xfrm>
           <a:prstGeom prst="rect">
             <a:avLst/>
@@ -12379,7 +14276,7 @@
         <p:spPr>
           <a:xfrm>
             <a:off x="6084000" y="936000"/>
-            <a:ext cx="1436040" cy="788040"/>
+            <a:ext cx="1435680" cy="787680"/>
           </a:xfrm>
           <a:prstGeom prst="rect">
             <a:avLst/>
@@ -12434,7 +14331,7 @@
         <p:spPr>
           <a:xfrm>
             <a:off x="1908000" y="4068000"/>
-            <a:ext cx="1436040" cy="788040"/>
+            <a:ext cx="1435680" cy="787680"/>
           </a:xfrm>
           <a:prstGeom prst="rect">
             <a:avLst/>
@@ -12489,7 +14386,7 @@
         <p:spPr>
           <a:xfrm>
             <a:off x="4032000" y="648000"/>
-            <a:ext cx="1436040" cy="1364040"/>
+            <a:ext cx="1435680" cy="1363680"/>
           </a:xfrm>
           <a:custGeom>
             <a:avLst/>
@@ -12587,7 +14484,7 @@
         <p:spPr>
           <a:xfrm>
             <a:off x="1872000" y="2232360"/>
-            <a:ext cx="1436040" cy="1364040"/>
+            <a:ext cx="1435680" cy="1363680"/>
           </a:xfrm>
           <a:custGeom>
             <a:avLst/>
@@ -12793,7 +14690,7 @@
         <p:spPr>
           <a:xfrm>
             <a:off x="5184000" y="2340000"/>
-            <a:ext cx="2012040" cy="572040"/>
+            <a:ext cx="2011680" cy="571680"/>
           </a:xfrm>
           <a:prstGeom prst="ellipse">
             <a:avLst/>
@@ -12848,7 +14745,7 @@
         <p:spPr>
           <a:xfrm>
             <a:off x="3960360" y="3240360"/>
-            <a:ext cx="2012040" cy="572040"/>
+            <a:ext cx="2011680" cy="571680"/>
           </a:xfrm>
           <a:prstGeom prst="ellipse">
             <a:avLst/>
@@ -12987,7 +14884,7 @@
         <p:spPr>
           <a:xfrm>
             <a:off x="3060000" y="2268000"/>
-            <a:ext cx="1436040" cy="788040"/>
+            <a:ext cx="1435680" cy="787680"/>
           </a:xfrm>
           <a:prstGeom prst="rect">
             <a:avLst/>
@@ -13042,7 +14939,7 @@
         <p:spPr>
           <a:xfrm>
             <a:off x="5832000" y="1980000"/>
-            <a:ext cx="1436040" cy="1364040"/>
+            <a:ext cx="1435680" cy="1363680"/>
           </a:xfrm>
           <a:custGeom>
             <a:avLst/>
@@ -13194,7 +15091,7 @@
         <p:spPr>
           <a:xfrm>
             <a:off x="2376000" y="1044000"/>
-            <a:ext cx="1148040" cy="680040"/>
+            <a:ext cx="1147680" cy="679680"/>
           </a:xfrm>
           <a:prstGeom prst="ellipse">
             <a:avLst/>
@@ -13249,7 +15146,7 @@
         <p:spPr>
           <a:xfrm>
             <a:off x="3780360" y="1044360"/>
-            <a:ext cx="1148040" cy="680040"/>
+            <a:ext cx="1147680" cy="679680"/>
           </a:xfrm>
           <a:prstGeom prst="ellipse">
             <a:avLst/>
@@ -13304,7 +15201,7 @@
         <p:spPr>
           <a:xfrm>
             <a:off x="2376360" y="1044360"/>
-            <a:ext cx="1148040" cy="680040"/>
+            <a:ext cx="1147680" cy="679680"/>
           </a:xfrm>
           <a:prstGeom prst="ellipse">
             <a:avLst/>
@@ -13359,7 +15256,7 @@
         <p:spPr>
           <a:xfrm>
             <a:off x="1512720" y="2160720"/>
-            <a:ext cx="1148040" cy="680040"/>
+            <a:ext cx="1147680" cy="679680"/>
           </a:xfrm>
           <a:prstGeom prst="ellipse">
             <a:avLst/>
@@ -13495,7 +15392,7 @@
         <p:spPr>
           <a:xfrm>
             <a:off x="4500000" y="2376000"/>
-            <a:ext cx="1400040" cy="598320"/>
+            <a:ext cx="1399680" cy="597960"/>
           </a:xfrm>
           <a:prstGeom prst="rect">
             <a:avLst/>
@@ -13546,7 +15443,7 @@
         <p:spPr>
           <a:xfrm>
             <a:off x="4320000" y="3204360"/>
-            <a:ext cx="1400040" cy="598320"/>
+            <a:ext cx="1399680" cy="597960"/>
           </a:xfrm>
           <a:prstGeom prst="rect">
             <a:avLst/>
@@ -13627,7 +15524,7 @@
         <p:spPr>
           <a:xfrm>
             <a:off x="504000" y="576000"/>
-            <a:ext cx="428400" cy="1652400"/>
+            <a:ext cx="428040" cy="1652040"/>
           </a:xfrm>
           <a:prstGeom prst="ellipse">
             <a:avLst/>
@@ -13657,7 +15554,7 @@
         <p:spPr>
           <a:xfrm>
             <a:off x="1440360" y="576360"/>
-            <a:ext cx="428400" cy="1652400"/>
+            <a:ext cx="428040" cy="1652040"/>
           </a:xfrm>
           <a:prstGeom prst="ellipse">
             <a:avLst/>
@@ -13687,7 +15584,7 @@
         <p:spPr>
           <a:xfrm>
             <a:off x="3204720" y="612720"/>
-            <a:ext cx="428400" cy="1652400"/>
+            <a:ext cx="428040" cy="1652040"/>
           </a:xfrm>
           <a:prstGeom prst="ellipse">
             <a:avLst/>
@@ -13717,7 +15614,7 @@
         <p:spPr>
           <a:xfrm>
             <a:off x="4068720" y="576720"/>
-            <a:ext cx="428400" cy="1652400"/>
+            <a:ext cx="428040" cy="1652040"/>
           </a:xfrm>
           <a:prstGeom prst="ellipse">
             <a:avLst/>
@@ -13747,7 +15644,7 @@
         <p:spPr>
           <a:xfrm>
             <a:off x="504720" y="3204720"/>
-            <a:ext cx="428400" cy="1652400"/>
+            <a:ext cx="428040" cy="1652040"/>
           </a:xfrm>
           <a:prstGeom prst="ellipse">
             <a:avLst/>
@@ -13777,7 +15674,7 @@
         <p:spPr>
           <a:xfrm>
             <a:off x="1440720" y="3168720"/>
-            <a:ext cx="428400" cy="1652400"/>
+            <a:ext cx="428040" cy="1652040"/>
           </a:xfrm>
           <a:prstGeom prst="ellipse">
             <a:avLst/>
@@ -13807,7 +15704,7 @@
         <p:spPr>
           <a:xfrm>
             <a:off x="3240720" y="3168720"/>
-            <a:ext cx="428400" cy="1652400"/>
+            <a:ext cx="428040" cy="1652040"/>
           </a:xfrm>
           <a:prstGeom prst="ellipse">
             <a:avLst/>
@@ -13837,7 +15734,7 @@
         <p:spPr>
           <a:xfrm>
             <a:off x="4068720" y="3168720"/>
-            <a:ext cx="428400" cy="1652400"/>
+            <a:ext cx="428040" cy="1652040"/>
           </a:xfrm>
           <a:prstGeom prst="ellipse">
             <a:avLst/>
@@ -13867,7 +15764,7 @@
         <p:spPr>
           <a:xfrm>
             <a:off x="540000" y="936000"/>
-            <a:ext cx="500400" cy="342720"/>
+            <a:ext cx="500040" cy="342360"/>
           </a:xfrm>
           <a:prstGeom prst="rect">
             <a:avLst/>
@@ -13918,7 +15815,7 @@
         <p:spPr>
           <a:xfrm>
             <a:off x="540000" y="1512000"/>
-            <a:ext cx="500400" cy="342720"/>
+            <a:ext cx="500040" cy="342360"/>
           </a:xfrm>
           <a:prstGeom prst="rect">
             <a:avLst/>
@@ -13969,7 +15866,7 @@
         <p:spPr>
           <a:xfrm>
             <a:off x="1512000" y="1512000"/>
-            <a:ext cx="500400" cy="342720"/>
+            <a:ext cx="500040" cy="342360"/>
           </a:xfrm>
           <a:prstGeom prst="rect">
             <a:avLst/>
@@ -14020,7 +15917,7 @@
         <p:spPr>
           <a:xfrm>
             <a:off x="1512000" y="900000"/>
-            <a:ext cx="500400" cy="342720"/>
+            <a:ext cx="500040" cy="342360"/>
           </a:xfrm>
           <a:prstGeom prst="rect">
             <a:avLst/>
@@ -14071,7 +15968,7 @@
         <p:spPr>
           <a:xfrm>
             <a:off x="540000" y="1260000"/>
-            <a:ext cx="500400" cy="342720"/>
+            <a:ext cx="500040" cy="342360"/>
           </a:xfrm>
           <a:prstGeom prst="rect">
             <a:avLst/>
@@ -14122,7 +16019,7 @@
         <p:spPr>
           <a:xfrm>
             <a:off x="1512000" y="1224000"/>
-            <a:ext cx="500400" cy="342720"/>
+            <a:ext cx="500040" cy="342360"/>
           </a:xfrm>
           <a:prstGeom prst="rect">
             <a:avLst/>
@@ -14173,7 +16070,7 @@
         <p:spPr>
           <a:xfrm>
             <a:off x="3240000" y="900000"/>
-            <a:ext cx="500400" cy="342720"/>
+            <a:ext cx="500040" cy="342360"/>
           </a:xfrm>
           <a:prstGeom prst="rect">
             <a:avLst/>
@@ -14224,7 +16121,7 @@
         <p:spPr>
           <a:xfrm>
             <a:off x="4104000" y="900000"/>
-            <a:ext cx="500400" cy="342720"/>
+            <a:ext cx="500040" cy="342360"/>
           </a:xfrm>
           <a:prstGeom prst="rect">
             <a:avLst/>
@@ -14275,7 +16172,7 @@
         <p:spPr>
           <a:xfrm>
             <a:off x="4104000" y="1224000"/>
-            <a:ext cx="500400" cy="342720"/>
+            <a:ext cx="500040" cy="342360"/>
           </a:xfrm>
           <a:prstGeom prst="rect">
             <a:avLst/>
@@ -14326,7 +16223,7 @@
         <p:spPr>
           <a:xfrm>
             <a:off x="4104000" y="1620000"/>
-            <a:ext cx="500400" cy="342720"/>
+            <a:ext cx="500040" cy="342360"/>
           </a:xfrm>
           <a:prstGeom prst="rect">
             <a:avLst/>
@@ -14377,7 +16274,7 @@
         <p:spPr>
           <a:xfrm>
             <a:off x="576000" y="3492000"/>
-            <a:ext cx="500400" cy="342720"/>
+            <a:ext cx="500040" cy="342360"/>
           </a:xfrm>
           <a:prstGeom prst="rect">
             <a:avLst/>
@@ -14428,7 +16325,7 @@
         <p:spPr>
           <a:xfrm>
             <a:off x="576000" y="3852000"/>
-            <a:ext cx="500400" cy="342720"/>
+            <a:ext cx="500040" cy="342360"/>
           </a:xfrm>
           <a:prstGeom prst="rect">
             <a:avLst/>
@@ -14479,7 +16376,7 @@
         <p:spPr>
           <a:xfrm>
             <a:off x="576000" y="4176000"/>
-            <a:ext cx="500400" cy="342720"/>
+            <a:ext cx="500040" cy="342360"/>
           </a:xfrm>
           <a:prstGeom prst="rect">
             <a:avLst/>
@@ -14530,7 +16427,7 @@
         <p:spPr>
           <a:xfrm>
             <a:off x="1476000" y="3492000"/>
-            <a:ext cx="500400" cy="342720"/>
+            <a:ext cx="500040" cy="342360"/>
           </a:xfrm>
           <a:prstGeom prst="rect">
             <a:avLst/>
@@ -14581,7 +16478,7 @@
         <p:spPr>
           <a:xfrm>
             <a:off x="3240000" y="3492000"/>
-            <a:ext cx="500400" cy="342720"/>
+            <a:ext cx="500040" cy="342360"/>
           </a:xfrm>
           <a:prstGeom prst="rect">
             <a:avLst/>
@@ -14632,7 +16529,7 @@
         <p:spPr>
           <a:xfrm>
             <a:off x="3276000" y="3960000"/>
-            <a:ext cx="500400" cy="342720"/>
+            <a:ext cx="500040" cy="342360"/>
           </a:xfrm>
           <a:prstGeom prst="rect">
             <a:avLst/>
@@ -14683,7 +16580,7 @@
         <p:spPr>
           <a:xfrm>
             <a:off x="4140000" y="3492000"/>
-            <a:ext cx="500400" cy="342720"/>
+            <a:ext cx="500040" cy="342360"/>
           </a:xfrm>
           <a:prstGeom prst="rect">
             <a:avLst/>
@@ -14734,7 +16631,7 @@
         <p:spPr>
           <a:xfrm>
             <a:off x="4140000" y="3924000"/>
-            <a:ext cx="500400" cy="342720"/>
+            <a:ext cx="500040" cy="342360"/>
           </a:xfrm>
           <a:prstGeom prst="rect">
             <a:avLst/>
@@ -15082,7 +16979,7 @@
         <p:spPr>
           <a:xfrm>
             <a:off x="540000" y="2412000"/>
-            <a:ext cx="1292400" cy="342720"/>
+            <a:ext cx="1292040" cy="342360"/>
           </a:xfrm>
           <a:prstGeom prst="rect">
             <a:avLst/>
@@ -15133,7 +17030,7 @@
         <p:spPr>
           <a:xfrm>
             <a:off x="3168000" y="2412000"/>
-            <a:ext cx="1436400" cy="392400"/>
+            <a:ext cx="1436040" cy="392040"/>
           </a:xfrm>
           <a:prstGeom prst="rect">
             <a:avLst/>
@@ -15184,7 +17081,7 @@
         <p:spPr>
           <a:xfrm>
             <a:off x="3168000" y="4968000"/>
-            <a:ext cx="1580400" cy="356400"/>
+            <a:ext cx="1580040" cy="356040"/>
           </a:xfrm>
           <a:prstGeom prst="rect">
             <a:avLst/>
@@ -15235,7 +17132,7 @@
         <p:spPr>
           <a:xfrm>
             <a:off x="504000" y="4968000"/>
-            <a:ext cx="1436400" cy="356400"/>
+            <a:ext cx="1436040" cy="356040"/>
           </a:xfrm>
           <a:prstGeom prst="rect">
             <a:avLst/>
@@ -15316,7 +17213,7 @@
         <p:spPr>
           <a:xfrm>
             <a:off x="1872000" y="1008000"/>
-            <a:ext cx="2084760" cy="788760"/>
+            <a:ext cx="2084400" cy="788400"/>
           </a:xfrm>
           <a:prstGeom prst="rect">
             <a:avLst/>
@@ -15346,7 +17243,7 @@
         <p:spPr>
           <a:xfrm>
             <a:off x="5328000" y="756000"/>
-            <a:ext cx="1652760" cy="1220760"/>
+            <a:ext cx="1652400" cy="1220400"/>
           </a:xfrm>
           <a:custGeom>
             <a:avLst/>
@@ -15399,7 +17296,7 @@
         <p:spPr>
           <a:xfrm>
             <a:off x="1872360" y="3672360"/>
-            <a:ext cx="2084760" cy="788760"/>
+            <a:ext cx="2084400" cy="788400"/>
           </a:xfrm>
           <a:prstGeom prst="rect">
             <a:avLst/>
@@ -15429,7 +17326,7 @@
         <p:spPr>
           <a:xfrm>
             <a:off x="5328360" y="3420360"/>
-            <a:ext cx="1652760" cy="1220760"/>
+            <a:ext cx="1652400" cy="1220400"/>
           </a:xfrm>
           <a:custGeom>
             <a:avLst/>
@@ -15537,7 +17434,7 @@
         <p:spPr>
           <a:xfrm>
             <a:off x="1188000" y="2304000"/>
-            <a:ext cx="6908760" cy="343080"/>
+            <a:ext cx="6908400" cy="342720"/>
           </a:xfrm>
           <a:prstGeom prst="rect">
             <a:avLst/>
@@ -15588,7 +17485,7 @@
         <p:spPr>
           <a:xfrm>
             <a:off x="1080000" y="4788000"/>
-            <a:ext cx="7160760" cy="599040"/>
+            <a:ext cx="7160400" cy="598680"/>
           </a:xfrm>
           <a:prstGeom prst="rect">
             <a:avLst/>
@@ -15669,7 +17566,7 @@
         <p:spPr>
           <a:xfrm>
             <a:off x="1908000" y="2232000"/>
-            <a:ext cx="1436040" cy="788040"/>
+            <a:ext cx="1435680" cy="787680"/>
           </a:xfrm>
           <a:prstGeom prst="rect">
             <a:avLst/>
@@ -15724,7 +17621,7 @@
         <p:spPr>
           <a:xfrm>
             <a:off x="6084000" y="2232000"/>
-            <a:ext cx="1436040" cy="788040"/>
+            <a:ext cx="1435680" cy="787680"/>
           </a:xfrm>
           <a:prstGeom prst="rect">
             <a:avLst/>
@@ -15779,7 +17676,7 @@
         <p:spPr>
           <a:xfrm>
             <a:off x="4032000" y="1944000"/>
-            <a:ext cx="1436040" cy="1364040"/>
+            <a:ext cx="1435680" cy="1363680"/>
           </a:xfrm>
           <a:custGeom>
             <a:avLst/>
@@ -15986,7 +17883,7 @@
         <p:spPr>
           <a:xfrm>
             <a:off x="2592000" y="3636000"/>
-            <a:ext cx="7124760" cy="599040"/>
+            <a:ext cx="7124400" cy="598680"/>
           </a:xfrm>
           <a:prstGeom prst="rect">
             <a:avLst/>
@@ -16087,7 +17984,7 @@
         <p:spPr>
           <a:xfrm>
             <a:off x="5934960" y="2130480"/>
-            <a:ext cx="1694520" cy="1005480"/>
+            <a:ext cx="1694160" cy="1005120"/>
           </a:xfrm>
           <a:prstGeom prst="rect">
             <a:avLst/>
@@ -16117,7 +18014,7 @@
         <p:spPr>
           <a:xfrm>
             <a:off x="1908000" y="2232000"/>
-            <a:ext cx="1436040" cy="788040"/>
+            <a:ext cx="1435680" cy="787680"/>
           </a:xfrm>
           <a:prstGeom prst="rect">
             <a:avLst/>
@@ -16172,7 +18069,7 @@
         <p:spPr>
           <a:xfrm>
             <a:off x="6084000" y="2232000"/>
-            <a:ext cx="1436040" cy="788040"/>
+            <a:ext cx="1435680" cy="787680"/>
           </a:xfrm>
           <a:prstGeom prst="rect">
             <a:avLst/>
@@ -16227,7 +18124,7 @@
         <p:spPr>
           <a:xfrm>
             <a:off x="4032000" y="1944000"/>
-            <a:ext cx="1436040" cy="1364040"/>
+            <a:ext cx="1435680" cy="1363680"/>
           </a:xfrm>
           <a:custGeom>
             <a:avLst/>
@@ -16386,7 +18283,7 @@
         <p:spPr>
           <a:xfrm>
             <a:off x="1764000" y="3564000"/>
-            <a:ext cx="7124760" cy="599040"/>
+            <a:ext cx="7124400" cy="598680"/>
           </a:xfrm>
           <a:prstGeom prst="rect">
             <a:avLst/>
@@ -16494,7 +18391,7 @@
         <p:spPr>
           <a:xfrm>
             <a:off x="1945800" y="3636000"/>
-            <a:ext cx="1436040" cy="788040"/>
+            <a:ext cx="1435680" cy="787680"/>
           </a:xfrm>
           <a:prstGeom prst="rect">
             <a:avLst/>
@@ -16569,7 +18466,7 @@
         <p:spPr>
           <a:xfrm>
             <a:off x="6300000" y="3673800"/>
-            <a:ext cx="1436040" cy="788040"/>
+            <a:ext cx="1435680" cy="787680"/>
           </a:xfrm>
           <a:prstGeom prst="rect">
             <a:avLst/>
@@ -16698,7 +18595,7 @@
         <p:spPr>
           <a:xfrm>
             <a:off x="1764000" y="4860000"/>
-            <a:ext cx="7124760" cy="599040"/>
+            <a:ext cx="7124400" cy="598680"/>
           </a:xfrm>
           <a:prstGeom prst="rect">
             <a:avLst/>
@@ -16724,7 +18621,7 @@
         <p:spPr>
           <a:xfrm>
             <a:off x="4140000" y="1080000"/>
-            <a:ext cx="1436040" cy="788040"/>
+            <a:ext cx="1435680" cy="787680"/>
           </a:xfrm>
           <a:prstGeom prst="rect">
             <a:avLst/>
@@ -16779,7 +18676,7 @@
         <p:spPr>
           <a:xfrm>
             <a:off x="4392000" y="2267640"/>
-            <a:ext cx="933840" cy="1005840"/>
+            <a:ext cx="933480" cy="1005480"/>
           </a:xfrm>
           <a:custGeom>
             <a:avLst/>
@@ -16828,7 +18725,7 @@
         <p:spPr>
           <a:xfrm>
             <a:off x="4572000" y="2304000"/>
-            <a:ext cx="645840" cy="344160"/>
+            <a:ext cx="645480" cy="343800"/>
           </a:xfrm>
           <a:prstGeom prst="rect">
             <a:avLst/>
@@ -16960,7 +18857,7 @@
         <p:spPr>
           <a:xfrm>
             <a:off x="2592000" y="432000"/>
-            <a:ext cx="1149840" cy="501840"/>
+            <a:ext cx="1149480" cy="501480"/>
           </a:xfrm>
           <a:prstGeom prst="ellipse">
             <a:avLst/>
@@ -17015,7 +18912,7 @@
         <p:spPr>
           <a:xfrm>
             <a:off x="4104360" y="360360"/>
-            <a:ext cx="1149840" cy="501840"/>
+            <a:ext cx="1149480" cy="501480"/>
           </a:xfrm>
           <a:prstGeom prst="ellipse">
             <a:avLst/>
@@ -17070,7 +18967,7 @@
         <p:spPr>
           <a:xfrm>
             <a:off x="5652720" y="432720"/>
-            <a:ext cx="1149840" cy="501840"/>
+            <a:ext cx="1149480" cy="501480"/>
           </a:xfrm>
           <a:prstGeom prst="ellipse">
             <a:avLst/>
@@ -17125,7 +19022,7 @@
         <p:spPr>
           <a:xfrm>
             <a:off x="3813480" y="4321080"/>
-            <a:ext cx="1149840" cy="501840"/>
+            <a:ext cx="1149480" cy="501480"/>
           </a:xfrm>
           <a:prstGeom prst="ellipse">
             <a:avLst/>
@@ -17180,7 +19077,7 @@
         <p:spPr>
           <a:xfrm>
             <a:off x="2193840" y="4717440"/>
-            <a:ext cx="1149840" cy="501840"/>
+            <a:ext cx="1149480" cy="501480"/>
           </a:xfrm>
           <a:prstGeom prst="ellipse">
             <a:avLst/>
@@ -17235,7 +19132,7 @@
         <p:spPr>
           <a:xfrm>
             <a:off x="682200" y="4501800"/>
-            <a:ext cx="1149840" cy="501840"/>
+            <a:ext cx="1149480" cy="501480"/>
           </a:xfrm>
           <a:prstGeom prst="ellipse">
             <a:avLst/>
@@ -17290,7 +19187,7 @@
         <p:spPr>
           <a:xfrm>
             <a:off x="5434560" y="4574160"/>
-            <a:ext cx="1149840" cy="501840"/>
+            <a:ext cx="1149480" cy="501480"/>
           </a:xfrm>
           <a:prstGeom prst="ellipse">
             <a:avLst/>
@@ -17345,7 +19242,7 @@
         <p:spPr>
           <a:xfrm>
             <a:off x="7634160" y="4574520"/>
-            <a:ext cx="1149840" cy="501840"/>
+            <a:ext cx="1149480" cy="501480"/>
           </a:xfrm>
           <a:prstGeom prst="ellipse">
             <a:avLst/>
@@ -17400,7 +19297,7 @@
         <p:spPr>
           <a:xfrm>
             <a:off x="686520" y="3098880"/>
-            <a:ext cx="1149840" cy="501840"/>
+            <a:ext cx="1149480" cy="501480"/>
           </a:xfrm>
           <a:prstGeom prst="ellipse">
             <a:avLst/>
@@ -17728,7 +19625,7 @@
         <p:spPr>
           <a:xfrm>
             <a:off x="432000" y="72000"/>
-            <a:ext cx="9069840" cy="2517840"/>
+            <a:ext cx="9069480" cy="2517480"/>
           </a:xfrm>
           <a:prstGeom prst="rect">
             <a:avLst/>
@@ -17758,7 +19655,7 @@
         <p:spPr>
           <a:xfrm>
             <a:off x="2016000" y="1188000"/>
-            <a:ext cx="1436040" cy="788040"/>
+            <a:ext cx="1435680" cy="787680"/>
           </a:xfrm>
           <a:prstGeom prst="rect">
             <a:avLst/>
@@ -17813,7 +19710,7 @@
         <p:spPr>
           <a:xfrm>
             <a:off x="6192000" y="1188000"/>
-            <a:ext cx="1436040" cy="788040"/>
+            <a:ext cx="1435680" cy="787680"/>
           </a:xfrm>
           <a:prstGeom prst="rect">
             <a:avLst/>
@@ -17868,7 +19765,7 @@
         <p:spPr>
           <a:xfrm>
             <a:off x="4140000" y="900000"/>
-            <a:ext cx="1436040" cy="1364040"/>
+            <a:ext cx="1435680" cy="1363680"/>
           </a:xfrm>
           <a:custGeom>
             <a:avLst/>
@@ -18027,7 +19924,7 @@
         <p:spPr>
           <a:xfrm>
             <a:off x="-36000" y="3384000"/>
-            <a:ext cx="2625840" cy="599040"/>
+            <a:ext cx="2625480" cy="598680"/>
           </a:xfrm>
           <a:prstGeom prst="rect">
             <a:avLst/>
@@ -18105,7 +20002,7 @@
         <p:spPr>
           <a:xfrm>
             <a:off x="5868360" y="180360"/>
-            <a:ext cx="1149840" cy="501840"/>
+            <a:ext cx="1149480" cy="501480"/>
           </a:xfrm>
           <a:prstGeom prst="ellipse">
             <a:avLst/>
@@ -18160,7 +20057,7 @@
         <p:spPr>
           <a:xfrm>
             <a:off x="7344720" y="216720"/>
-            <a:ext cx="1149840" cy="501840"/>
+            <a:ext cx="1149480" cy="501480"/>
           </a:xfrm>
           <a:prstGeom prst="ellipse">
             <a:avLst/>
@@ -18215,7 +20112,7 @@
         <p:spPr>
           <a:xfrm>
             <a:off x="7921080" y="937080"/>
-            <a:ext cx="1149840" cy="501840"/>
+            <a:ext cx="1149480" cy="501480"/>
           </a:xfrm>
           <a:prstGeom prst="ellipse">
             <a:avLst/>
@@ -18270,7 +20167,7 @@
         <p:spPr>
           <a:xfrm>
             <a:off x="7921440" y="1693440"/>
-            <a:ext cx="1149840" cy="501840"/>
+            <a:ext cx="1149480" cy="501480"/>
           </a:xfrm>
           <a:prstGeom prst="ellipse">
             <a:avLst/>
@@ -18325,7 +20222,7 @@
         <p:spPr>
           <a:xfrm>
             <a:off x="7921440" y="937440"/>
-            <a:ext cx="1149840" cy="501840"/>
+            <a:ext cx="1149480" cy="501480"/>
           </a:xfrm>
           <a:prstGeom prst="ellipse">
             <a:avLst/>
@@ -18380,7 +20277,7 @@
         <p:spPr>
           <a:xfrm>
             <a:off x="2089440" y="433440"/>
-            <a:ext cx="1149840" cy="501840"/>
+            <a:ext cx="1149480" cy="501480"/>
           </a:xfrm>
           <a:prstGeom prst="ellipse">
             <a:avLst/>
@@ -18435,7 +20332,7 @@
         <p:spPr>
           <a:xfrm>
             <a:off x="649800" y="541800"/>
-            <a:ext cx="1149840" cy="501840"/>
+            <a:ext cx="1149480" cy="501480"/>
           </a:xfrm>
           <a:prstGeom prst="ellipse">
             <a:avLst/>
@@ -18490,7 +20387,7 @@
         <p:spPr>
           <a:xfrm>
             <a:off x="4320000" y="3168000"/>
-            <a:ext cx="1040040" cy="789840"/>
+            <a:ext cx="1039680" cy="789480"/>
           </a:xfrm>
           <a:custGeom>
             <a:avLst/>
@@ -18568,7 +20465,7 @@
         <p:spPr>
           <a:xfrm>
             <a:off x="4176000" y="4428000"/>
-            <a:ext cx="1436040" cy="788040"/>
+            <a:ext cx="1435680" cy="787680"/>
           </a:xfrm>
           <a:prstGeom prst="rect">
             <a:avLst/>
@@ -18704,7 +20601,7 @@
         <p:spPr>
           <a:xfrm>
             <a:off x="5870160" y="3782160"/>
-            <a:ext cx="1149840" cy="501840"/>
+            <a:ext cx="1149480" cy="501480"/>
           </a:xfrm>
           <a:prstGeom prst="ellipse">
             <a:avLst/>
@@ -18759,7 +20656,7 @@
         <p:spPr>
           <a:xfrm>
             <a:off x="7380000" y="3115440"/>
-            <a:ext cx="2625840" cy="599040"/>
+            <a:ext cx="2625480" cy="598680"/>
           </a:xfrm>
           <a:prstGeom prst="rect">
             <a:avLst/>

</xml_diff>

<commit_message>
DBMS: File System - 5 (Notes need to be added)
</commit_message>
<xml_diff>
--- a/GATE/images/gate_images.pptx
+++ b/GATE/images/gate_images.pptx
@@ -1670,7 +1670,7 @@
         <p:spPr>
           <a:xfrm>
             <a:off x="1836000" y="1332000"/>
-            <a:ext cx="2370240" cy="786240"/>
+            <a:ext cx="2369880" cy="785880"/>
           </a:xfrm>
           <a:prstGeom prst="rect">
             <a:avLst/>
@@ -1725,7 +1725,7 @@
         <p:spPr>
           <a:xfrm>
             <a:off x="1836000" y="2880000"/>
-            <a:ext cx="2370240" cy="786240"/>
+            <a:ext cx="2369880" cy="785880"/>
           </a:xfrm>
           <a:prstGeom prst="rect">
             <a:avLst/>
@@ -1790,7 +1790,7 @@
         <p:spPr>
           <a:xfrm>
             <a:off x="1836000" y="4176000"/>
-            <a:ext cx="2370240" cy="786240"/>
+            <a:ext cx="2369880" cy="785880"/>
           </a:xfrm>
           <a:prstGeom prst="rect">
             <a:avLst/>
@@ -1865,7 +1865,7 @@
         <p:spPr>
           <a:xfrm>
             <a:off x="5292000" y="900000"/>
-            <a:ext cx="2370240" cy="1506240"/>
+            <a:ext cx="2369880" cy="1505880"/>
           </a:xfrm>
           <a:prstGeom prst="rect">
             <a:avLst/>
@@ -2000,7 +2000,7 @@
         <p:spPr>
           <a:xfrm>
             <a:off x="5292000" y="2571480"/>
-            <a:ext cx="2370240" cy="1274760"/>
+            <a:ext cx="2369880" cy="1274400"/>
           </a:xfrm>
           <a:prstGeom prst="rect">
             <a:avLst/>
@@ -2115,7 +2115,7 @@
         <p:spPr>
           <a:xfrm>
             <a:off x="5292000" y="4047480"/>
-            <a:ext cx="2370240" cy="1022760"/>
+            <a:ext cx="2369880" cy="1022400"/>
           </a:xfrm>
           <a:prstGeom prst="rect">
             <a:avLst/>
@@ -2294,7 +2294,7 @@
         <p:spPr>
           <a:xfrm>
             <a:off x="2988000" y="360000"/>
-            <a:ext cx="4386240" cy="340560"/>
+            <a:ext cx="4385880" cy="340200"/>
           </a:xfrm>
           <a:prstGeom prst="rect">
             <a:avLst/>
@@ -2375,7 +2375,7 @@
         <p:spPr>
           <a:xfrm>
             <a:off x="1440000" y="720000"/>
-            <a:ext cx="6764400" cy="1796400"/>
+            <a:ext cx="6764040" cy="1796040"/>
           </a:xfrm>
           <a:prstGeom prst="rect">
             <a:avLst/>
@@ -2405,7 +2405,7 @@
         <p:spPr>
           <a:xfrm>
             <a:off x="2016000" y="1188000"/>
-            <a:ext cx="1434600" cy="786600"/>
+            <a:ext cx="1434240" cy="786240"/>
           </a:xfrm>
           <a:prstGeom prst="rect">
             <a:avLst/>
@@ -2460,7 +2460,7 @@
         <p:spPr>
           <a:xfrm>
             <a:off x="6192000" y="1188000"/>
-            <a:ext cx="1434600" cy="786600"/>
+            <a:ext cx="1434240" cy="786240"/>
           </a:xfrm>
           <a:prstGeom prst="rect">
             <a:avLst/>
@@ -2515,7 +2515,7 @@
         <p:spPr>
           <a:xfrm>
             <a:off x="4140000" y="900000"/>
-            <a:ext cx="1434600" cy="1362600"/>
+            <a:ext cx="1434240" cy="1362240"/>
           </a:xfrm>
           <a:custGeom>
             <a:avLst/>
@@ -2701,7 +2701,7 @@
         <p:spPr>
           <a:xfrm>
             <a:off x="4320000" y="3168000"/>
-            <a:ext cx="1038600" cy="788400"/>
+            <a:ext cx="1038240" cy="788040"/>
           </a:xfrm>
           <a:custGeom>
             <a:avLst/>
@@ -2779,7 +2779,7 @@
         <p:spPr>
           <a:xfrm>
             <a:off x="4176000" y="4428000"/>
-            <a:ext cx="1434600" cy="786600"/>
+            <a:ext cx="1434240" cy="786240"/>
           </a:xfrm>
           <a:prstGeom prst="rect">
             <a:avLst/>
@@ -2861,7 +2861,7 @@
         <p:spPr>
           <a:xfrm>
             <a:off x="5870160" y="3314160"/>
-            <a:ext cx="1148400" cy="500400"/>
+            <a:ext cx="1148040" cy="500040"/>
           </a:xfrm>
           <a:prstGeom prst="ellipse">
             <a:avLst/>
@@ -3000,7 +3000,7 @@
         <p:spPr>
           <a:xfrm>
             <a:off x="1944000" y="900000"/>
-            <a:ext cx="1434600" cy="786600"/>
+            <a:ext cx="1434240" cy="786240"/>
           </a:xfrm>
           <a:prstGeom prst="rect">
             <a:avLst/>
@@ -3055,7 +3055,7 @@
         <p:spPr>
           <a:xfrm>
             <a:off x="6120000" y="900000"/>
-            <a:ext cx="1434600" cy="786600"/>
+            <a:ext cx="1434240" cy="786240"/>
           </a:xfrm>
           <a:prstGeom prst="rect">
             <a:avLst/>
@@ -3110,7 +3110,7 @@
         <p:spPr>
           <a:xfrm>
             <a:off x="4068000" y="612000"/>
-            <a:ext cx="1434600" cy="1362600"/>
+            <a:ext cx="1434240" cy="1362240"/>
           </a:xfrm>
           <a:custGeom>
             <a:avLst/>
@@ -3289,7 +3289,7 @@
         <p:spPr>
           <a:xfrm>
             <a:off x="2592000" y="5904000"/>
-            <a:ext cx="7123320" cy="597600"/>
+            <a:ext cx="7122960" cy="597240"/>
           </a:xfrm>
           <a:prstGeom prst="rect">
             <a:avLst/>
@@ -3360,7 +3360,7 @@
         <p:spPr>
           <a:xfrm>
             <a:off x="360000" y="216360"/>
-            <a:ext cx="1148400" cy="500400"/>
+            <a:ext cx="1148040" cy="500040"/>
           </a:xfrm>
           <a:prstGeom prst="ellipse">
             <a:avLst/>
@@ -3415,7 +3415,7 @@
         <p:spPr>
           <a:xfrm>
             <a:off x="1727640" y="216360"/>
-            <a:ext cx="1148400" cy="500400"/>
+            <a:ext cx="1148040" cy="500040"/>
           </a:xfrm>
           <a:prstGeom prst="ellipse">
             <a:avLst/>
@@ -3470,7 +3470,7 @@
         <p:spPr>
           <a:xfrm>
             <a:off x="359280" y="1008360"/>
-            <a:ext cx="1148400" cy="500400"/>
+            <a:ext cx="1148040" cy="500040"/>
           </a:xfrm>
           <a:prstGeom prst="ellipse">
             <a:avLst/>
@@ -3525,7 +3525,7 @@
         <p:spPr>
           <a:xfrm>
             <a:off x="358920" y="1800360"/>
-            <a:ext cx="1148400" cy="500400"/>
+            <a:ext cx="1148040" cy="500040"/>
           </a:xfrm>
           <a:prstGeom prst="ellipse">
             <a:avLst/>
@@ -3580,7 +3580,7 @@
         <p:spPr>
           <a:xfrm>
             <a:off x="1906560" y="1836360"/>
-            <a:ext cx="1148400" cy="500400"/>
+            <a:ext cx="1148040" cy="500040"/>
           </a:xfrm>
           <a:prstGeom prst="ellipse">
             <a:avLst/>
@@ -3635,7 +3635,7 @@
         <p:spPr>
           <a:xfrm>
             <a:off x="4211280" y="360"/>
-            <a:ext cx="1148400" cy="500400"/>
+            <a:ext cx="1148040" cy="500040"/>
           </a:xfrm>
           <a:prstGeom prst="ellipse">
             <a:avLst/>
@@ -3690,7 +3690,7 @@
         <p:spPr>
           <a:xfrm>
             <a:off x="6226920" y="360"/>
-            <a:ext cx="1148400" cy="500400"/>
+            <a:ext cx="1148040" cy="500040"/>
           </a:xfrm>
           <a:prstGeom prst="ellipse">
             <a:avLst/>
@@ -3745,7 +3745,7 @@
         <p:spPr>
           <a:xfrm>
             <a:off x="4210920" y="360"/>
-            <a:ext cx="1148400" cy="500400"/>
+            <a:ext cx="1148040" cy="500040"/>
           </a:xfrm>
           <a:prstGeom prst="ellipse">
             <a:avLst/>
@@ -3800,7 +3800,7 @@
         <p:spPr>
           <a:xfrm>
             <a:off x="7738920" y="252360"/>
-            <a:ext cx="1148400" cy="500400"/>
+            <a:ext cx="1148040" cy="500040"/>
           </a:xfrm>
           <a:prstGeom prst="ellipse">
             <a:avLst/>
@@ -3855,7 +3855,7 @@
         <p:spPr>
           <a:xfrm>
             <a:off x="7810920" y="936360"/>
-            <a:ext cx="1148400" cy="500400"/>
+            <a:ext cx="1148040" cy="500040"/>
           </a:xfrm>
           <a:prstGeom prst="ellipse">
             <a:avLst/>
@@ -5391,7 +5391,7 @@
         <p:spPr>
           <a:xfrm>
             <a:off x="576000" y="4320000"/>
-            <a:ext cx="2444760" cy="343080"/>
+            <a:ext cx="2444400" cy="342720"/>
           </a:xfrm>
           <a:prstGeom prst="rect">
             <a:avLst/>
@@ -5442,7 +5442,7 @@
         <p:spPr>
           <a:xfrm>
             <a:off x="7092000" y="3672000"/>
-            <a:ext cx="2444760" cy="343080"/>
+            <a:ext cx="2444400" cy="342720"/>
           </a:xfrm>
           <a:prstGeom prst="rect">
             <a:avLst/>
@@ -5493,7 +5493,7 @@
         <p:spPr>
           <a:xfrm>
             <a:off x="3744000" y="5328000"/>
-            <a:ext cx="2444760" cy="343080"/>
+            <a:ext cx="2444400" cy="342720"/>
           </a:xfrm>
           <a:prstGeom prst="rect">
             <a:avLst/>
@@ -5574,7 +5574,7 @@
         <p:spPr>
           <a:xfrm>
             <a:off x="5934960" y="1050480"/>
-            <a:ext cx="1693080" cy="1004040"/>
+            <a:ext cx="1692720" cy="1003680"/>
           </a:xfrm>
           <a:prstGeom prst="rect">
             <a:avLst/>
@@ -5604,7 +5604,7 @@
         <p:spPr>
           <a:xfrm>
             <a:off x="1908000" y="1152000"/>
-            <a:ext cx="1434600" cy="786600"/>
+            <a:ext cx="1434240" cy="786240"/>
           </a:xfrm>
           <a:prstGeom prst="rect">
             <a:avLst/>
@@ -5659,7 +5659,7 @@
         <p:spPr>
           <a:xfrm>
             <a:off x="6084000" y="1152000"/>
-            <a:ext cx="1434600" cy="786600"/>
+            <a:ext cx="1434240" cy="786240"/>
           </a:xfrm>
           <a:prstGeom prst="rect">
             <a:avLst/>
@@ -5714,7 +5714,7 @@
         <p:spPr>
           <a:xfrm>
             <a:off x="4032000" y="864000"/>
-            <a:ext cx="1434600" cy="1362600"/>
+            <a:ext cx="1434240" cy="1362240"/>
           </a:xfrm>
           <a:custGeom>
             <a:avLst/>
@@ -5846,7 +5846,7 @@
         <p:spPr>
           <a:xfrm>
             <a:off x="1548000" y="576000"/>
-            <a:ext cx="2120760" cy="464760"/>
+            <a:ext cx="2120400" cy="464400"/>
           </a:xfrm>
           <a:prstGeom prst="rect">
             <a:avLst/>
@@ -5952,7 +5952,7 @@
         <p:spPr>
           <a:xfrm>
             <a:off x="5760000" y="576000"/>
-            <a:ext cx="2120760" cy="464760"/>
+            <a:ext cx="2120400" cy="464400"/>
           </a:xfrm>
           <a:prstGeom prst="rect">
             <a:avLst/>
@@ -6003,7 +6003,7 @@
         <p:spPr>
           <a:xfrm>
             <a:off x="216000" y="2376000"/>
-            <a:ext cx="2120760" cy="2588760"/>
+            <a:ext cx="2120400" cy="2588400"/>
           </a:xfrm>
           <a:prstGeom prst="rect">
             <a:avLst/>
@@ -6712,7 +6712,7 @@
         <p:spPr>
           <a:xfrm>
             <a:off x="1945800" y="3636000"/>
-            <a:ext cx="1434600" cy="786600"/>
+            <a:ext cx="1434240" cy="786240"/>
           </a:xfrm>
           <a:prstGeom prst="rect">
             <a:avLst/>
@@ -6787,7 +6787,7 @@
         <p:spPr>
           <a:xfrm>
             <a:off x="6300000" y="3673800"/>
-            <a:ext cx="1434600" cy="786600"/>
+            <a:ext cx="1434240" cy="786240"/>
           </a:xfrm>
           <a:prstGeom prst="rect">
             <a:avLst/>
@@ -6916,7 +6916,7 @@
         <p:spPr>
           <a:xfrm>
             <a:off x="1764000" y="4860000"/>
-            <a:ext cx="7123320" cy="597600"/>
+            <a:ext cx="7122960" cy="597240"/>
           </a:xfrm>
           <a:prstGeom prst="rect">
             <a:avLst/>
@@ -6942,7 +6942,7 @@
         <p:spPr>
           <a:xfrm>
             <a:off x="4140000" y="1080000"/>
-            <a:ext cx="1434600" cy="786600"/>
+            <a:ext cx="1434240" cy="786240"/>
           </a:xfrm>
           <a:prstGeom prst="rect">
             <a:avLst/>
@@ -6997,7 +6997,7 @@
         <p:spPr>
           <a:xfrm>
             <a:off x="4392000" y="2267640"/>
-            <a:ext cx="932400" cy="1004400"/>
+            <a:ext cx="932040" cy="1004040"/>
           </a:xfrm>
           <a:custGeom>
             <a:avLst/>
@@ -7046,7 +7046,7 @@
         <p:spPr>
           <a:xfrm>
             <a:off x="4572000" y="2304000"/>
-            <a:ext cx="644400" cy="342720"/>
+            <a:ext cx="644040" cy="342360"/>
           </a:xfrm>
           <a:prstGeom prst="rect">
             <a:avLst/>
@@ -7178,7 +7178,7 @@
         <p:spPr>
           <a:xfrm>
             <a:off x="2592000" y="432000"/>
-            <a:ext cx="1148400" cy="500400"/>
+            <a:ext cx="1148040" cy="500040"/>
           </a:xfrm>
           <a:prstGeom prst="ellipse">
             <a:avLst/>
@@ -7233,7 +7233,7 @@
         <p:spPr>
           <a:xfrm>
             <a:off x="4104360" y="360360"/>
-            <a:ext cx="1148400" cy="500400"/>
+            <a:ext cx="1148040" cy="500040"/>
           </a:xfrm>
           <a:prstGeom prst="ellipse">
             <a:avLst/>
@@ -7288,7 +7288,7 @@
         <p:spPr>
           <a:xfrm>
             <a:off x="5652720" y="432720"/>
-            <a:ext cx="1148400" cy="500400"/>
+            <a:ext cx="1148040" cy="500040"/>
           </a:xfrm>
           <a:prstGeom prst="ellipse">
             <a:avLst/>
@@ -7343,7 +7343,7 @@
         <p:spPr>
           <a:xfrm>
             <a:off x="3813480" y="4321080"/>
-            <a:ext cx="1148400" cy="500400"/>
+            <a:ext cx="1148040" cy="500040"/>
           </a:xfrm>
           <a:prstGeom prst="ellipse">
             <a:avLst/>
@@ -7398,7 +7398,7 @@
         <p:spPr>
           <a:xfrm>
             <a:off x="2193840" y="4717440"/>
-            <a:ext cx="1148400" cy="500400"/>
+            <a:ext cx="1148040" cy="500040"/>
           </a:xfrm>
           <a:prstGeom prst="ellipse">
             <a:avLst/>
@@ -7453,7 +7453,7 @@
         <p:spPr>
           <a:xfrm>
             <a:off x="682200" y="4501800"/>
-            <a:ext cx="1148400" cy="500400"/>
+            <a:ext cx="1148040" cy="500040"/>
           </a:xfrm>
           <a:prstGeom prst="ellipse">
             <a:avLst/>
@@ -7508,7 +7508,7 @@
         <p:spPr>
           <a:xfrm>
             <a:off x="5434560" y="4574160"/>
-            <a:ext cx="1148400" cy="500400"/>
+            <a:ext cx="1148040" cy="500040"/>
           </a:xfrm>
           <a:prstGeom prst="ellipse">
             <a:avLst/>
@@ -7563,7 +7563,7 @@
         <p:spPr>
           <a:xfrm>
             <a:off x="7634160" y="4574520"/>
-            <a:ext cx="1148400" cy="500400"/>
+            <a:ext cx="1148040" cy="500040"/>
           </a:xfrm>
           <a:prstGeom prst="ellipse">
             <a:avLst/>
@@ -7618,7 +7618,7 @@
         <p:spPr>
           <a:xfrm>
             <a:off x="686520" y="3098880"/>
-            <a:ext cx="1148400" cy="500400"/>
+            <a:ext cx="1148040" cy="500040"/>
           </a:xfrm>
           <a:prstGeom prst="ellipse">
             <a:avLst/>
@@ -7916,7 +7916,7 @@
         <p:spPr>
           <a:xfrm>
             <a:off x="216000" y="288000"/>
-            <a:ext cx="2372760" cy="2300760"/>
+            <a:ext cx="2372400" cy="2300400"/>
           </a:xfrm>
           <a:prstGeom prst="rect">
             <a:avLst/>
@@ -8037,7 +8037,7 @@
         <p:spPr>
           <a:xfrm>
             <a:off x="1908000" y="936000"/>
-            <a:ext cx="1434600" cy="786600"/>
+            <a:ext cx="1434240" cy="786240"/>
           </a:xfrm>
           <a:prstGeom prst="rect">
             <a:avLst/>
@@ -8092,7 +8092,7 @@
         <p:spPr>
           <a:xfrm>
             <a:off x="6084000" y="936000"/>
-            <a:ext cx="1434600" cy="786600"/>
+            <a:ext cx="1434240" cy="786240"/>
           </a:xfrm>
           <a:prstGeom prst="rect">
             <a:avLst/>
@@ -8147,7 +8147,7 @@
         <p:spPr>
           <a:xfrm>
             <a:off x="4934160" y="4392000"/>
-            <a:ext cx="1434600" cy="786600"/>
+            <a:ext cx="1434240" cy="786240"/>
           </a:xfrm>
           <a:prstGeom prst="rect">
             <a:avLst/>
@@ -8202,7 +8202,7 @@
         <p:spPr>
           <a:xfrm>
             <a:off x="4032000" y="648000"/>
-            <a:ext cx="1434600" cy="1362600"/>
+            <a:ext cx="1434240" cy="1362240"/>
           </a:xfrm>
           <a:custGeom>
             <a:avLst/>
@@ -8300,7 +8300,7 @@
         <p:spPr>
           <a:xfrm>
             <a:off x="1908000" y="3204360"/>
-            <a:ext cx="1434600" cy="1362600"/>
+            <a:ext cx="1434240" cy="1362240"/>
           </a:xfrm>
           <a:custGeom>
             <a:avLst/>
@@ -8452,7 +8452,7 @@
         <p:spPr>
           <a:xfrm>
             <a:off x="4140000" y="2234160"/>
-            <a:ext cx="1148760" cy="570600"/>
+            <a:ext cx="1148400" cy="570240"/>
           </a:xfrm>
           <a:prstGeom prst="ellipse">
             <a:avLst/>
@@ -8507,7 +8507,7 @@
         <p:spPr>
           <a:xfrm>
             <a:off x="3708360" y="3636360"/>
-            <a:ext cx="1076400" cy="570600"/>
+            <a:ext cx="1076040" cy="570240"/>
           </a:xfrm>
           <a:prstGeom prst="ellipse">
             <a:avLst/>
@@ -8616,7 +8616,7 @@
         <p:spPr>
           <a:xfrm>
             <a:off x="504000" y="396000"/>
-            <a:ext cx="1148760" cy="570600"/>
+            <a:ext cx="1148400" cy="570240"/>
           </a:xfrm>
           <a:prstGeom prst="ellipse">
             <a:avLst/>
@@ -8671,7 +8671,7 @@
         <p:spPr>
           <a:xfrm>
             <a:off x="1944000" y="180000"/>
-            <a:ext cx="1148760" cy="570600"/>
+            <a:ext cx="1148400" cy="570240"/>
           </a:xfrm>
           <a:prstGeom prst="ellipse">
             <a:avLst/>
@@ -8726,7 +8726,7 @@
         <p:spPr>
           <a:xfrm>
             <a:off x="288000" y="1152000"/>
-            <a:ext cx="1148760" cy="570600"/>
+            <a:ext cx="1148400" cy="570240"/>
           </a:xfrm>
           <a:prstGeom prst="ellipse">
             <a:avLst/>
@@ -8781,7 +8781,7 @@
         <p:spPr>
           <a:xfrm>
             <a:off x="5940000" y="180000"/>
-            <a:ext cx="1148760" cy="570600"/>
+            <a:ext cx="1148400" cy="570240"/>
           </a:xfrm>
           <a:prstGeom prst="ellipse">
             <a:avLst/>
@@ -8836,7 +8836,7 @@
         <p:spPr>
           <a:xfrm>
             <a:off x="7560000" y="180000"/>
-            <a:ext cx="1148760" cy="570600"/>
+            <a:ext cx="1148400" cy="570240"/>
           </a:xfrm>
           <a:prstGeom prst="ellipse">
             <a:avLst/>
@@ -8891,7 +8891,7 @@
         <p:spPr>
           <a:xfrm>
             <a:off x="7992000" y="972000"/>
-            <a:ext cx="1148760" cy="570600"/>
+            <a:ext cx="1148400" cy="570240"/>
           </a:xfrm>
           <a:prstGeom prst="ellipse">
             <a:avLst/>
@@ -8973,7 +8973,7 @@
         <p:spPr>
           <a:xfrm>
             <a:off x="432000" y="3636360"/>
-            <a:ext cx="1076400" cy="570600"/>
+            <a:ext cx="1076040" cy="570240"/>
           </a:xfrm>
           <a:prstGeom prst="ellipse">
             <a:avLst/>
@@ -9028,7 +9028,7 @@
         <p:spPr>
           <a:xfrm>
             <a:off x="6803640" y="4068360"/>
-            <a:ext cx="1076400" cy="570600"/>
+            <a:ext cx="1076040" cy="570240"/>
           </a:xfrm>
           <a:prstGeom prst="ellipse">
             <a:avLst/>
@@ -9083,7 +9083,7 @@
         <p:spPr>
           <a:xfrm>
             <a:off x="6839280" y="4752360"/>
-            <a:ext cx="1076400" cy="570600"/>
+            <a:ext cx="1076040" cy="570240"/>
           </a:xfrm>
           <a:prstGeom prst="ellipse">
             <a:avLst/>
@@ -9493,7 +9493,7 @@
         <p:spPr>
           <a:xfrm>
             <a:off x="2556000" y="1152000"/>
-            <a:ext cx="4533120" cy="357120"/>
+            <a:ext cx="4532760" cy="356760"/>
           </a:xfrm>
           <a:prstGeom prst="rect">
             <a:avLst/>
@@ -10343,7 +10343,7 @@
         <p:spPr>
           <a:xfrm>
             <a:off x="3492000" y="3541680"/>
-            <a:ext cx="3022200" cy="344520"/>
+            <a:ext cx="3021840" cy="344160"/>
           </a:xfrm>
           <a:prstGeom prst="rect">
             <a:avLst/>
@@ -10394,7 +10394,7 @@
         <p:spPr>
           <a:xfrm>
             <a:off x="144000" y="3564000"/>
-            <a:ext cx="3022200" cy="344520"/>
+            <a:ext cx="3021840" cy="344160"/>
           </a:xfrm>
           <a:prstGeom prst="rect">
             <a:avLst/>
@@ -10445,7 +10445,7 @@
         <p:spPr>
           <a:xfrm>
             <a:off x="7308000" y="3528000"/>
-            <a:ext cx="3022200" cy="344520"/>
+            <a:ext cx="3021840" cy="344160"/>
           </a:xfrm>
           <a:prstGeom prst="rect">
             <a:avLst/>
@@ -10898,7 +10898,7 @@
         <p:spPr>
           <a:xfrm>
             <a:off x="3492000" y="3541680"/>
-            <a:ext cx="3022200" cy="344520"/>
+            <a:ext cx="3021840" cy="344160"/>
           </a:xfrm>
           <a:prstGeom prst="rect">
             <a:avLst/>
@@ -10949,7 +10949,7 @@
         <p:spPr>
           <a:xfrm>
             <a:off x="144000" y="3564000"/>
-            <a:ext cx="3022200" cy="344520"/>
+            <a:ext cx="3021840" cy="344160"/>
           </a:xfrm>
           <a:prstGeom prst="rect">
             <a:avLst/>
@@ -11000,7 +11000,7 @@
         <p:spPr>
           <a:xfrm>
             <a:off x="7308000" y="3528000"/>
-            <a:ext cx="3022200" cy="344520"/>
+            <a:ext cx="3021840" cy="344160"/>
           </a:xfrm>
           <a:prstGeom prst="rect">
             <a:avLst/>
@@ -12029,7 +12029,7 @@
         <p:spPr>
           <a:xfrm>
             <a:off x="3456000" y="1008000"/>
-            <a:ext cx="3238560" cy="344880"/>
+            <a:ext cx="3238200" cy="344520"/>
           </a:xfrm>
           <a:prstGeom prst="rect">
             <a:avLst/>
@@ -12080,7 +12080,7 @@
         <p:spPr>
           <a:xfrm>
             <a:off x="648000" y="1836000"/>
-            <a:ext cx="3238560" cy="344880"/>
+            <a:ext cx="3238200" cy="344520"/>
           </a:xfrm>
           <a:prstGeom prst="rect">
             <a:avLst/>
@@ -12131,7 +12131,7 @@
         <p:spPr>
           <a:xfrm>
             <a:off x="5436000" y="2160000"/>
-            <a:ext cx="3238560" cy="344880"/>
+            <a:ext cx="3238200" cy="344520"/>
           </a:xfrm>
           <a:prstGeom prst="rect">
             <a:avLst/>
@@ -12209,7 +12209,7 @@
         <p:spPr>
           <a:xfrm>
             <a:off x="8676000" y="2988000"/>
-            <a:ext cx="1042560" cy="754560"/>
+            <a:ext cx="1042200" cy="754200"/>
           </a:xfrm>
           <a:prstGeom prst="rect">
             <a:avLst/>
@@ -12347,7 +12347,7 @@
         <p:spPr>
           <a:xfrm>
             <a:off x="2448000" y="4464000"/>
-            <a:ext cx="5830560" cy="754560"/>
+            <a:ext cx="5830200" cy="754200"/>
           </a:xfrm>
           <a:prstGeom prst="rect">
             <a:avLst/>
@@ -14209,7 +14209,7 @@
         <p:spPr>
           <a:xfrm>
             <a:off x="1728000" y="1741680"/>
-            <a:ext cx="1150920" cy="345240"/>
+            <a:ext cx="1150560" cy="344880"/>
           </a:xfrm>
           <a:prstGeom prst="rect">
             <a:avLst/>
@@ -14260,7 +14260,7 @@
         <p:spPr>
           <a:xfrm>
             <a:off x="6480000" y="648000"/>
-            <a:ext cx="1690920" cy="345240"/>
+            <a:ext cx="1690560" cy="344880"/>
           </a:xfrm>
           <a:prstGeom prst="rect">
             <a:avLst/>
@@ -14341,7 +14341,7 @@
         <p:spPr>
           <a:xfrm>
             <a:off x="1908000" y="936000"/>
-            <a:ext cx="1434600" cy="786600"/>
+            <a:ext cx="1434240" cy="786240"/>
           </a:xfrm>
           <a:prstGeom prst="rect">
             <a:avLst/>
@@ -14396,7 +14396,7 @@
         <p:spPr>
           <a:xfrm>
             <a:off x="6084000" y="936000"/>
-            <a:ext cx="1434600" cy="786600"/>
+            <a:ext cx="1434240" cy="786240"/>
           </a:xfrm>
           <a:prstGeom prst="rect">
             <a:avLst/>
@@ -14451,7 +14451,7 @@
         <p:spPr>
           <a:xfrm>
             <a:off x="1908000" y="4068000"/>
-            <a:ext cx="1434600" cy="786600"/>
+            <a:ext cx="1434240" cy="786240"/>
           </a:xfrm>
           <a:prstGeom prst="rect">
             <a:avLst/>
@@ -14506,7 +14506,7 @@
         <p:spPr>
           <a:xfrm>
             <a:off x="4032000" y="648000"/>
-            <a:ext cx="1434600" cy="1362600"/>
+            <a:ext cx="1434240" cy="1362240"/>
           </a:xfrm>
           <a:custGeom>
             <a:avLst/>
@@ -14604,7 +14604,7 @@
         <p:spPr>
           <a:xfrm>
             <a:off x="1872000" y="2232360"/>
-            <a:ext cx="1434600" cy="1362600"/>
+            <a:ext cx="1434240" cy="1362240"/>
           </a:xfrm>
           <a:custGeom>
             <a:avLst/>
@@ -14810,7 +14810,7 @@
         <p:spPr>
           <a:xfrm>
             <a:off x="5184000" y="2340000"/>
-            <a:ext cx="2010600" cy="570600"/>
+            <a:ext cx="2010240" cy="570240"/>
           </a:xfrm>
           <a:prstGeom prst="ellipse">
             <a:avLst/>
@@ -14865,7 +14865,7 @@
         <p:spPr>
           <a:xfrm>
             <a:off x="3960360" y="3240360"/>
-            <a:ext cx="2010600" cy="570600"/>
+            <a:ext cx="2010240" cy="570240"/>
           </a:xfrm>
           <a:prstGeom prst="ellipse">
             <a:avLst/>
@@ -15208,7 +15208,7 @@
         <p:spPr>
           <a:xfrm>
             <a:off x="144000" y="2057400"/>
-            <a:ext cx="2513880" cy="601560"/>
+            <a:ext cx="2513520" cy="601200"/>
           </a:xfrm>
           <a:prstGeom prst="rect">
             <a:avLst/>
@@ -15259,7 +15259,7 @@
         <p:spPr>
           <a:xfrm>
             <a:off x="3405600" y="976680"/>
-            <a:ext cx="2971080" cy="345600"/>
+            <a:ext cx="2970720" cy="345240"/>
           </a:xfrm>
           <a:prstGeom prst="rect">
             <a:avLst/>
@@ -15394,7 +15394,7 @@
         <p:spPr>
           <a:xfrm>
             <a:off x="457200" y="3742200"/>
-            <a:ext cx="2971080" cy="857520"/>
+            <a:ext cx="2970720" cy="857160"/>
           </a:xfrm>
           <a:prstGeom prst="rect">
             <a:avLst/>
@@ -15445,7 +15445,7 @@
         <p:spPr>
           <a:xfrm>
             <a:off x="3866400" y="3742200"/>
-            <a:ext cx="2533680" cy="1113480"/>
+            <a:ext cx="2533320" cy="1113120"/>
           </a:xfrm>
           <a:prstGeom prst="rect">
             <a:avLst/>
@@ -15496,7 +15496,7 @@
         <p:spPr>
           <a:xfrm>
             <a:off x="7086600" y="3706200"/>
-            <a:ext cx="2742480" cy="1093680"/>
+            <a:ext cx="2742120" cy="1093320"/>
           </a:xfrm>
           <a:prstGeom prst="rect">
             <a:avLst/>
@@ -15547,7 +15547,7 @@
         <p:spPr>
           <a:xfrm>
             <a:off x="7488360" y="2057760"/>
-            <a:ext cx="2513880" cy="345600"/>
+            <a:ext cx="2513520" cy="345240"/>
           </a:xfrm>
           <a:prstGeom prst="rect">
             <a:avLst/>
@@ -15909,7 +15909,7 @@
         <p:spPr>
           <a:xfrm>
             <a:off x="144000" y="2057400"/>
-            <a:ext cx="2513880" cy="601560"/>
+            <a:ext cx="2513520" cy="601200"/>
           </a:xfrm>
           <a:prstGeom prst="rect">
             <a:avLst/>
@@ -15960,7 +15960,7 @@
         <p:spPr>
           <a:xfrm>
             <a:off x="3405600" y="976680"/>
-            <a:ext cx="2971080" cy="345600"/>
+            <a:ext cx="2970720" cy="345240"/>
           </a:xfrm>
           <a:prstGeom prst="rect">
             <a:avLst/>
@@ -16095,7 +16095,7 @@
         <p:spPr>
           <a:xfrm>
             <a:off x="842400" y="3742200"/>
-            <a:ext cx="1696680" cy="1113480"/>
+            <a:ext cx="1696320" cy="1113120"/>
           </a:xfrm>
           <a:prstGeom prst="rect">
             <a:avLst/>
@@ -16146,7 +16146,7 @@
         <p:spPr>
           <a:xfrm>
             <a:off x="2822400" y="3742200"/>
-            <a:ext cx="2209680" cy="857520"/>
+            <a:ext cx="2209320" cy="857160"/>
           </a:xfrm>
           <a:prstGeom prst="rect">
             <a:avLst/>
@@ -16197,7 +16197,7 @@
         <p:spPr>
           <a:xfrm>
             <a:off x="7772400" y="3706200"/>
-            <a:ext cx="2056680" cy="636480"/>
+            <a:ext cx="2056320" cy="636120"/>
           </a:xfrm>
           <a:prstGeom prst="rect">
             <a:avLst/>
@@ -16248,7 +16248,7 @@
         <p:spPr>
           <a:xfrm>
             <a:off x="7488360" y="2057760"/>
-            <a:ext cx="2513880" cy="345600"/>
+            <a:ext cx="2513520" cy="345240"/>
           </a:xfrm>
           <a:prstGeom prst="rect">
             <a:avLst/>
@@ -16327,7 +16327,7 @@
         <p:spPr>
           <a:xfrm>
             <a:off x="5090400" y="3742200"/>
-            <a:ext cx="2209680" cy="857520"/>
+            <a:ext cx="2209320" cy="857160"/>
           </a:xfrm>
           <a:prstGeom prst="rect">
             <a:avLst/>
@@ -16408,7 +16408,7 @@
         <p:spPr>
           <a:xfrm>
             <a:off x="1564920" y="685800"/>
-            <a:ext cx="180360" cy="345960"/>
+            <a:ext cx="180000" cy="345600"/>
           </a:xfrm>
           <a:prstGeom prst="rect">
             <a:avLst/>
@@ -16434,7 +16434,7 @@
         <p:spPr>
           <a:xfrm>
             <a:off x="228600" y="228600"/>
-            <a:ext cx="1142640" cy="345960"/>
+            <a:ext cx="1142280" cy="345600"/>
           </a:xfrm>
           <a:prstGeom prst="rect">
             <a:avLst/>
@@ -16462,7 +16462,11 @@
             </a:pPr>
             <a:r>
               <a:rPr b="0" lang="en-US" sz="1800" spc="-1" strike="noStrike">
+                <a:solidFill>
+                  <a:srgbClr val="000000"/>
+                </a:solidFill>
                 <a:latin typeface="Arial"/>
+                <a:ea typeface="DejaVu Sans"/>
               </a:rPr>
               <a:t>Insertion:</a:t>
             </a:r>
@@ -16481,7 +16485,7 @@
         <p:spPr>
           <a:xfrm>
             <a:off x="169200" y="950400"/>
-            <a:ext cx="2057040" cy="456840"/>
+            <a:ext cx="2056680" cy="456480"/>
           </a:xfrm>
           <a:prstGeom prst="rect">
             <a:avLst/>
@@ -16509,7 +16513,11 @@
             </a:pPr>
             <a:r>
               <a:rPr b="0" lang="en-US" sz="1800" spc="-1" strike="noStrike">
+                <a:solidFill>
+                  <a:srgbClr val="000000"/>
+                </a:solidFill>
                 <a:latin typeface="Arial"/>
+                <a:ea typeface="DejaVu Sans"/>
               </a:rPr>
               <a:t>Inital: Empty Tree</a:t>
             </a:r>
@@ -16890,7 +16898,7 @@
                       <a:noAutofit/>
                     </a:bodyPr>
                     <a:p>
-                      <a:pPr marL="216000" indent="-215640">
+                      <a:pPr marL="216000" indent="-215280">
                         <a:lnSpc>
                           <a:spcPct val="100000"/>
                         </a:lnSpc>
@@ -17213,7 +17221,7 @@
                       <a:noAutofit/>
                     </a:bodyPr>
                     <a:p>
-                      <a:pPr marL="216000" indent="-215640">
+                      <a:pPr marL="216000" indent="-215280">
                         <a:lnSpc>
                           <a:spcPct val="100000"/>
                         </a:lnSpc>
@@ -17693,7 +17701,7 @@
                       <a:noAutofit/>
                     </a:bodyPr>
                     <a:p>
-                      <a:pPr marL="216000" indent="-215640">
+                      <a:pPr marL="216000" indent="-215280">
                         <a:lnSpc>
                           <a:spcPct val="100000"/>
                         </a:lnSpc>
@@ -17989,7 +17997,7 @@
                       <a:noAutofit/>
                     </a:bodyPr>
                     <a:p>
-                      <a:pPr marL="216000" indent="-215640">
+                      <a:pPr marL="216000" indent="-215280">
                         <a:lnSpc>
                           <a:spcPct val="100000"/>
                         </a:lnSpc>
@@ -18257,7 +18265,7 @@
                       <a:noAutofit/>
                     </a:bodyPr>
                     <a:p>
-                      <a:pPr marL="216000" indent="-215640">
+                      <a:pPr marL="216000" indent="-215280">
                         <a:lnSpc>
                           <a:spcPct val="100000"/>
                         </a:lnSpc>
@@ -18496,7 +18504,7 @@
                       <a:noAutofit/>
                     </a:bodyPr>
                     <a:p>
-                      <a:pPr marL="216000" indent="-215640">
+                      <a:pPr marL="216000" indent="-215280">
                         <a:lnSpc>
                           <a:spcPct val="100000"/>
                         </a:lnSpc>
@@ -18635,14 +18643,14 @@
       </p:sp>
       <p:sp>
         <p:nvSpPr>
-          <p:cNvPr id="411" name="TextShape 29"/>
-          <p:cNvSpPr txBox="1"/>
+          <p:cNvPr id="411" name="CustomShape 29"/>
+          <p:cNvSpPr/>
           <p:nvPr/>
         </p:nvSpPr>
         <p:spPr>
           <a:xfrm>
             <a:off x="2057400" y="685800"/>
-            <a:ext cx="1143000" cy="346320"/>
+            <a:ext cx="1142640" cy="345960"/>
           </a:xfrm>
           <a:prstGeom prst="rect">
             <a:avLst/>
@@ -18652,11 +18660,22 @@
             <a:noFill/>
           </a:ln>
         </p:spPr>
+        <p:style>
+          <a:lnRef idx="0"/>
+          <a:fillRef idx="0"/>
+          <a:effectRef idx="0"/>
+          <a:fontRef idx="minor"/>
+        </p:style>
         <p:txBody>
           <a:bodyPr lIns="90000" rIns="90000" tIns="45000" bIns="45000">
             <a:noAutofit/>
           </a:bodyPr>
           <a:p>
+            <a:pPr>
+              <a:lnSpc>
+                <a:spcPct val="100000"/>
+              </a:lnSpc>
+            </a:pPr>
             <a:r>
               <a:rPr b="0" lang="en-US" sz="1800" spc="-1" strike="noStrike">
                 <a:latin typeface="Arial"/>
@@ -18671,14 +18690,14 @@
       </p:sp>
       <p:sp>
         <p:nvSpPr>
-          <p:cNvPr id="412" name="TextShape 30"/>
-          <p:cNvSpPr txBox="1"/>
+          <p:cNvPr id="412" name="CustomShape 30"/>
+          <p:cNvSpPr/>
           <p:nvPr/>
         </p:nvSpPr>
         <p:spPr>
           <a:xfrm>
             <a:off x="5670720" y="685800"/>
-            <a:ext cx="1143000" cy="346320"/>
+            <a:ext cx="1142640" cy="345960"/>
           </a:xfrm>
           <a:prstGeom prst="rect">
             <a:avLst/>
@@ -18688,6 +18707,12 @@
             <a:noFill/>
           </a:ln>
         </p:spPr>
+        <p:style>
+          <a:lnRef idx="0"/>
+          <a:fillRef idx="0"/>
+          <a:effectRef idx="0"/>
+          <a:fontRef idx="minor"/>
+        </p:style>
         <p:txBody>
           <a:bodyPr lIns="90000" rIns="90000" tIns="45000" bIns="45000">
             <a:noAutofit/>
@@ -18713,14 +18738,14 @@
       </p:sp>
       <p:sp>
         <p:nvSpPr>
-          <p:cNvPr id="413" name="TextShape 31"/>
-          <p:cNvSpPr txBox="1"/>
+          <p:cNvPr id="413" name="CustomShape 31"/>
+          <p:cNvSpPr/>
           <p:nvPr/>
         </p:nvSpPr>
         <p:spPr>
           <a:xfrm>
             <a:off x="8229600" y="2168280"/>
-            <a:ext cx="1143000" cy="346320"/>
+            <a:ext cx="1142640" cy="345960"/>
           </a:xfrm>
           <a:prstGeom prst="rect">
             <a:avLst/>
@@ -18730,6 +18755,12 @@
             <a:noFill/>
           </a:ln>
         </p:spPr>
+        <p:style>
+          <a:lnRef idx="0"/>
+          <a:fillRef idx="0"/>
+          <a:effectRef idx="0"/>
+          <a:fontRef idx="minor"/>
+        </p:style>
         <p:txBody>
           <a:bodyPr lIns="90000" rIns="90000" tIns="45000" bIns="45000">
             <a:noAutofit/>
@@ -18755,14 +18786,14 @@
       </p:sp>
       <p:sp>
         <p:nvSpPr>
-          <p:cNvPr id="414" name="TextShape 32"/>
-          <p:cNvSpPr txBox="1"/>
+          <p:cNvPr id="414" name="CustomShape 32"/>
+          <p:cNvSpPr/>
           <p:nvPr/>
         </p:nvSpPr>
         <p:spPr>
           <a:xfrm>
             <a:off x="4572000" y="3311280"/>
-            <a:ext cx="1143000" cy="346320"/>
+            <a:ext cx="1142640" cy="345960"/>
           </a:xfrm>
           <a:prstGeom prst="rect">
             <a:avLst/>
@@ -18772,6 +18803,12 @@
             <a:noFill/>
           </a:ln>
         </p:spPr>
+        <p:style>
+          <a:lnRef idx="0"/>
+          <a:fillRef idx="0"/>
+          <a:effectRef idx="0"/>
+          <a:fontRef idx="minor"/>
+        </p:style>
         <p:txBody>
           <a:bodyPr lIns="90000" rIns="90000" tIns="45000" bIns="45000">
             <a:noAutofit/>
@@ -18890,7 +18927,7 @@
         <p:spPr>
           <a:xfrm>
             <a:off x="1564920" y="685800"/>
-            <a:ext cx="180360" cy="345960"/>
+            <a:ext cx="180000" cy="345600"/>
           </a:xfrm>
           <a:prstGeom prst="rect">
             <a:avLst/>
@@ -18916,7 +18953,7 @@
         <p:spPr>
           <a:xfrm>
             <a:off x="228600" y="228600"/>
-            <a:ext cx="1142640" cy="345960"/>
+            <a:ext cx="1142280" cy="345600"/>
           </a:xfrm>
           <a:prstGeom prst="rect">
             <a:avLst/>
@@ -18944,7 +18981,11 @@
             </a:pPr>
             <a:r>
               <a:rPr b="0" lang="en-US" sz="1800" spc="-1" strike="noStrike">
+                <a:solidFill>
+                  <a:srgbClr val="000000"/>
+                </a:solidFill>
                 <a:latin typeface="Arial"/>
+                <a:ea typeface="DejaVu Sans"/>
               </a:rPr>
               <a:t>Insertion:</a:t>
             </a:r>
@@ -19085,7 +19126,7 @@
                       <a:noAutofit/>
                     </a:bodyPr>
                     <a:p>
-                      <a:pPr marL="216000" indent="-215640">
+                      <a:pPr marL="216000" indent="-215280">
                         <a:lnSpc>
                           <a:spcPct val="100000"/>
                         </a:lnSpc>
@@ -19565,7 +19606,7 @@
                       <a:noAutofit/>
                     </a:bodyPr>
                     <a:p>
-                      <a:pPr marL="216000" indent="-215640">
+                      <a:pPr marL="216000" indent="-215280">
                         <a:lnSpc>
                           <a:spcPct val="100000"/>
                         </a:lnSpc>
@@ -19833,7 +19874,7 @@
                       <a:noAutofit/>
                     </a:bodyPr>
                     <a:p>
-                      <a:pPr marL="216000" indent="-215640">
+                      <a:pPr marL="216000" indent="-215280">
                         <a:lnSpc>
                           <a:spcPct val="100000"/>
                         </a:lnSpc>
@@ -20101,7 +20142,7 @@
                       <a:noAutofit/>
                     </a:bodyPr>
                     <a:p>
-                      <a:pPr marL="216000" indent="-215640">
+                      <a:pPr marL="216000" indent="-215280">
                         <a:lnSpc>
                           <a:spcPct val="100000"/>
                         </a:lnSpc>
@@ -20340,7 +20381,7 @@
                       <a:noAutofit/>
                     </a:bodyPr>
                     <a:p>
-                      <a:pPr marL="216000" indent="-215640">
+                      <a:pPr marL="216000" indent="-215280">
                         <a:lnSpc>
                           <a:spcPct val="100000"/>
                         </a:lnSpc>
@@ -20608,7 +20649,7 @@
                       <a:noAutofit/>
                     </a:bodyPr>
                     <a:p>
-                      <a:pPr marL="216000" indent="-215640">
+                      <a:pPr marL="216000" indent="-215280">
                         <a:lnSpc>
                           <a:spcPct val="100000"/>
                         </a:lnSpc>
@@ -20745,12 +20786,12 @@
           <a:fontRef idx="minor"/>
         </p:style>
       </p:sp>
-      <p:cxnSp>
-        <p:nvCxnSpPr>
+      <p:sp>
+        <p:nvSpPr>
           <p:cNvPr id="438" name="Line 22"/>
-          <p:cNvCxnSpPr/>
-          <p:nvPr/>
-        </p:nvCxnSpPr>
+          <p:cNvSpPr/>
+          <p:nvPr/>
+        </p:nvSpPr>
         <p:spPr>
           <a:xfrm>
             <a:off x="0" y="0"/>
@@ -20766,17 +20807,23 @@
             <a:tailEnd len="med" type="triangle" w="med"/>
           </a:ln>
         </p:spPr>
-      </p:cxnSp>
-      <p:sp>
-        <p:nvSpPr>
-          <p:cNvPr id="439" name="TextShape 23"/>
-          <p:cNvSpPr txBox="1"/>
+        <p:style>
+          <a:lnRef idx="0"/>
+          <a:fillRef idx="0"/>
+          <a:effectRef idx="0"/>
+          <a:fontRef idx="minor"/>
+        </p:style>
+      </p:sp>
+      <p:sp>
+        <p:nvSpPr>
+          <p:cNvPr id="439" name="CustomShape 23"/>
+          <p:cNvSpPr/>
           <p:nvPr/>
         </p:nvSpPr>
         <p:spPr>
           <a:xfrm>
             <a:off x="6436080" y="1371600"/>
-            <a:ext cx="1143000" cy="346320"/>
+            <a:ext cx="1142640" cy="345960"/>
           </a:xfrm>
           <a:prstGeom prst="rect">
             <a:avLst/>
@@ -20786,6 +20833,12 @@
             <a:noFill/>
           </a:ln>
         </p:spPr>
+        <p:style>
+          <a:lnRef idx="0"/>
+          <a:fillRef idx="0"/>
+          <a:effectRef idx="0"/>
+          <a:fontRef idx="minor"/>
+        </p:style>
         <p:txBody>
           <a:bodyPr lIns="90000" rIns="90000" tIns="45000" bIns="45000">
             <a:noAutofit/>
@@ -20932,7 +20985,7 @@
         <p:spPr>
           <a:xfrm>
             <a:off x="1564920" y="685800"/>
-            <a:ext cx="180360" cy="345960"/>
+            <a:ext cx="180000" cy="345600"/>
           </a:xfrm>
           <a:prstGeom prst="rect">
             <a:avLst/>
@@ -20958,7 +21011,7 @@
         <p:spPr>
           <a:xfrm>
             <a:off x="228600" y="228600"/>
-            <a:ext cx="1142640" cy="345960"/>
+            <a:ext cx="1142280" cy="345600"/>
           </a:xfrm>
           <a:prstGeom prst="rect">
             <a:avLst/>
@@ -20986,7 +21039,11 @@
             </a:pPr>
             <a:r>
               <a:rPr b="0" lang="en-US" sz="1800" spc="-1" strike="noStrike">
+                <a:solidFill>
+                  <a:srgbClr val="000000"/>
+                </a:solidFill>
                 <a:latin typeface="Arial"/>
+                <a:ea typeface="DejaVu Sans"/>
               </a:rPr>
               <a:t>Insertion:</a:t>
             </a:r>
@@ -21127,7 +21184,7 @@
                       <a:noAutofit/>
                     </a:bodyPr>
                     <a:p>
-                      <a:pPr marL="216000" indent="-215640">
+                      <a:pPr marL="216000" indent="-215280">
                         <a:lnSpc>
                           <a:spcPct val="100000"/>
                         </a:lnSpc>
@@ -21607,7 +21664,7 @@
                       <a:noAutofit/>
                     </a:bodyPr>
                     <a:p>
-                      <a:pPr marL="216000" indent="-215640">
+                      <a:pPr marL="216000" indent="-215280">
                         <a:lnSpc>
                           <a:spcPct val="100000"/>
                         </a:lnSpc>
@@ -21875,7 +21932,7 @@
                       <a:noAutofit/>
                     </a:bodyPr>
                     <a:p>
-                      <a:pPr marL="216000" indent="-215640">
+                      <a:pPr marL="216000" indent="-215280">
                         <a:lnSpc>
                           <a:spcPct val="100000"/>
                         </a:lnSpc>
@@ -22021,7 +22078,7 @@
         <p:spPr>
           <a:xfrm>
             <a:off x="799920" y="4158720"/>
-            <a:ext cx="180360" cy="426960"/>
+            <a:ext cx="180000" cy="426600"/>
           </a:xfrm>
           <a:prstGeom prst="rect">
             <a:avLst/>
@@ -22169,7 +22226,7 @@
                       <a:noAutofit/>
                     </a:bodyPr>
                     <a:p>
-                      <a:pPr marL="216000" indent="-215640">
+                      <a:pPr marL="216000" indent="-215280">
                         <a:lnSpc>
                           <a:spcPct val="100000"/>
                         </a:lnSpc>
@@ -22621,7 +22678,7 @@
                       <a:noAutofit/>
                     </a:bodyPr>
                     <a:p>
-                      <a:pPr marL="216000" indent="-215640">
+                      <a:pPr marL="216000" indent="-215280">
                         <a:lnSpc>
                           <a:spcPct val="100000"/>
                         </a:lnSpc>
@@ -22889,7 +22946,7 @@
                       <a:noAutofit/>
                     </a:bodyPr>
                     <a:p>
-                      <a:pPr marL="216000" indent="-215640">
+                      <a:pPr marL="216000" indent="-215280">
                         <a:lnSpc>
                           <a:spcPct val="100000"/>
                         </a:lnSpc>
@@ -23025,6 +23082,11 @@
                       <a:noAutofit/>
                     </a:bodyPr>
                     <a:p>
+                      <a:pPr>
+                        <a:lnSpc>
+                          <a:spcPct val="100000"/>
+                        </a:lnSpc>
+                      </a:pPr>
                       <a:r>
                         <a:rPr b="0" lang="en-US" sz="1800" spc="-1" strike="noStrike">
                           <a:latin typeface="Arial"/>
@@ -23227,7 +23289,7 @@
                 </a:tc>
                 <a:tc>
                   <a:txBody>
-                    <a:bodyPr lIns="90000" rIns="90000" tIns="46800" bIns="46800">
+                    <a:bodyPr lIns="90000" rIns="90000">
                       <a:noAutofit/>
                     </a:bodyPr>
                     <a:p>
@@ -23424,7 +23486,7 @@
         </p:nvGraphicFramePr>
         <p:xfrm>
           <a:off x="8000640" y="5139360"/>
-          <a:ext cx="2286360" cy="349560"/>
+          <a:ext cx="1816560" cy="349560"/>
         </p:xfrm>
         <a:graphic>
           <a:graphicData uri="http://schemas.openxmlformats.org/drawingml/2006/table">
@@ -23467,10 +23529,15 @@
                 </a:tc>
                 <a:tc>
                   <a:txBody>
-                    <a:bodyPr lIns="90000" rIns="90000" tIns="46800" bIns="46800">
+                    <a:bodyPr lIns="90000" rIns="90000">
                       <a:noAutofit/>
                     </a:bodyPr>
                     <a:p>
+                      <a:pPr>
+                        <a:lnSpc>
+                          <a:spcPct val="100000"/>
+                        </a:lnSpc>
+                      </a:pPr>
                       <a:r>
                         <a:rPr b="0" lang="en-US" sz="1800" spc="-1" strike="noStrike">
                           <a:latin typeface="Arial"/>
@@ -23624,14 +23691,14 @@
       </p:sp>
       <p:sp>
         <p:nvSpPr>
-          <p:cNvPr id="472" name="TextShape 30"/>
-          <p:cNvSpPr txBox="1"/>
+          <p:cNvPr id="472" name="CustomShape 30"/>
+          <p:cNvSpPr/>
           <p:nvPr/>
         </p:nvSpPr>
         <p:spPr>
           <a:xfrm>
             <a:off x="5257800" y="2625480"/>
-            <a:ext cx="1143000" cy="346320"/>
+            <a:ext cx="1142640" cy="345960"/>
           </a:xfrm>
           <a:prstGeom prst="rect">
             <a:avLst/>
@@ -23641,6 +23708,12 @@
             <a:noFill/>
           </a:ln>
         </p:spPr>
+        <p:style>
+          <a:lnRef idx="0"/>
+          <a:fillRef idx="0"/>
+          <a:effectRef idx="0"/>
+          <a:fontRef idx="minor"/>
+        </p:style>
         <p:txBody>
           <a:bodyPr lIns="90000" rIns="90000" tIns="45000" bIns="45000">
             <a:noAutofit/>
@@ -23843,7 +23916,7 @@
         <p:spPr>
           <a:xfrm>
             <a:off x="3060000" y="2268000"/>
-            <a:ext cx="1434600" cy="786600"/>
+            <a:ext cx="1434240" cy="786240"/>
           </a:xfrm>
           <a:prstGeom prst="rect">
             <a:avLst/>
@@ -23898,7 +23971,7 @@
         <p:spPr>
           <a:xfrm>
             <a:off x="5832000" y="1980000"/>
-            <a:ext cx="1434600" cy="1362600"/>
+            <a:ext cx="1434240" cy="1362240"/>
           </a:xfrm>
           <a:custGeom>
             <a:avLst/>
@@ -24050,7 +24123,7 @@
         <p:spPr>
           <a:xfrm>
             <a:off x="2376000" y="1044000"/>
-            <a:ext cx="1146600" cy="678600"/>
+            <a:ext cx="1146240" cy="678240"/>
           </a:xfrm>
           <a:prstGeom prst="ellipse">
             <a:avLst/>
@@ -24105,7 +24178,7 @@
         <p:spPr>
           <a:xfrm>
             <a:off x="3780360" y="1044360"/>
-            <a:ext cx="1146600" cy="678600"/>
+            <a:ext cx="1146240" cy="678240"/>
           </a:xfrm>
           <a:prstGeom prst="ellipse">
             <a:avLst/>
@@ -24160,7 +24233,7 @@
         <p:spPr>
           <a:xfrm>
             <a:off x="2376360" y="1044360"/>
-            <a:ext cx="1146600" cy="678600"/>
+            <a:ext cx="1146240" cy="678240"/>
           </a:xfrm>
           <a:prstGeom prst="ellipse">
             <a:avLst/>
@@ -24215,7 +24288,7 @@
         <p:spPr>
           <a:xfrm>
             <a:off x="1512720" y="2160720"/>
-            <a:ext cx="1146600" cy="678600"/>
+            <a:ext cx="1146240" cy="678240"/>
           </a:xfrm>
           <a:prstGeom prst="ellipse">
             <a:avLst/>
@@ -24351,7 +24424,7 @@
         <p:spPr>
           <a:xfrm>
             <a:off x="4500000" y="2376000"/>
-            <a:ext cx="1398600" cy="596880"/>
+            <a:ext cx="1398240" cy="596520"/>
           </a:xfrm>
           <a:prstGeom prst="rect">
             <a:avLst/>
@@ -24402,7 +24475,7 @@
         <p:spPr>
           <a:xfrm>
             <a:off x="4320000" y="3204360"/>
-            <a:ext cx="1398600" cy="596880"/>
+            <a:ext cx="1398240" cy="596520"/>
           </a:xfrm>
           <a:prstGeom prst="rect">
             <a:avLst/>
@@ -24483,7 +24556,7 @@
         <p:spPr>
           <a:xfrm>
             <a:off x="504000" y="576000"/>
-            <a:ext cx="426960" cy="1650960"/>
+            <a:ext cx="426600" cy="1650600"/>
           </a:xfrm>
           <a:prstGeom prst="ellipse">
             <a:avLst/>
@@ -24513,7 +24586,7 @@
         <p:spPr>
           <a:xfrm>
             <a:off x="1440360" y="576360"/>
-            <a:ext cx="426960" cy="1650960"/>
+            <a:ext cx="426600" cy="1650600"/>
           </a:xfrm>
           <a:prstGeom prst="ellipse">
             <a:avLst/>
@@ -24543,7 +24616,7 @@
         <p:spPr>
           <a:xfrm>
             <a:off x="3204720" y="612720"/>
-            <a:ext cx="426960" cy="1650960"/>
+            <a:ext cx="426600" cy="1650600"/>
           </a:xfrm>
           <a:prstGeom prst="ellipse">
             <a:avLst/>
@@ -24573,7 +24646,7 @@
         <p:spPr>
           <a:xfrm>
             <a:off x="4068720" y="576720"/>
-            <a:ext cx="426960" cy="1650960"/>
+            <a:ext cx="426600" cy="1650600"/>
           </a:xfrm>
           <a:prstGeom prst="ellipse">
             <a:avLst/>
@@ -24603,7 +24676,7 @@
         <p:spPr>
           <a:xfrm>
             <a:off x="504720" y="3204720"/>
-            <a:ext cx="426960" cy="1650960"/>
+            <a:ext cx="426600" cy="1650600"/>
           </a:xfrm>
           <a:prstGeom prst="ellipse">
             <a:avLst/>
@@ -24633,7 +24706,7 @@
         <p:spPr>
           <a:xfrm>
             <a:off x="1440720" y="3168720"/>
-            <a:ext cx="426960" cy="1650960"/>
+            <a:ext cx="426600" cy="1650600"/>
           </a:xfrm>
           <a:prstGeom prst="ellipse">
             <a:avLst/>
@@ -24663,7 +24736,7 @@
         <p:spPr>
           <a:xfrm>
             <a:off x="3240720" y="3168720"/>
-            <a:ext cx="426960" cy="1650960"/>
+            <a:ext cx="426600" cy="1650600"/>
           </a:xfrm>
           <a:prstGeom prst="ellipse">
             <a:avLst/>
@@ -24693,7 +24766,7 @@
         <p:spPr>
           <a:xfrm>
             <a:off x="4068720" y="3168720"/>
-            <a:ext cx="426960" cy="1650960"/>
+            <a:ext cx="426600" cy="1650600"/>
           </a:xfrm>
           <a:prstGeom prst="ellipse">
             <a:avLst/>
@@ -24723,7 +24796,7 @@
         <p:spPr>
           <a:xfrm>
             <a:off x="540000" y="936000"/>
-            <a:ext cx="498960" cy="341280"/>
+            <a:ext cx="498600" cy="340920"/>
           </a:xfrm>
           <a:prstGeom prst="rect">
             <a:avLst/>
@@ -24774,7 +24847,7 @@
         <p:spPr>
           <a:xfrm>
             <a:off x="540000" y="1512000"/>
-            <a:ext cx="498960" cy="341280"/>
+            <a:ext cx="498600" cy="340920"/>
           </a:xfrm>
           <a:prstGeom prst="rect">
             <a:avLst/>
@@ -24825,7 +24898,7 @@
         <p:spPr>
           <a:xfrm>
             <a:off x="1512000" y="1512000"/>
-            <a:ext cx="498960" cy="341280"/>
+            <a:ext cx="498600" cy="340920"/>
           </a:xfrm>
           <a:prstGeom prst="rect">
             <a:avLst/>
@@ -24876,7 +24949,7 @@
         <p:spPr>
           <a:xfrm>
             <a:off x="1512000" y="900000"/>
-            <a:ext cx="498960" cy="341280"/>
+            <a:ext cx="498600" cy="340920"/>
           </a:xfrm>
           <a:prstGeom prst="rect">
             <a:avLst/>
@@ -24927,7 +25000,7 @@
         <p:spPr>
           <a:xfrm>
             <a:off x="540000" y="1260000"/>
-            <a:ext cx="498960" cy="341280"/>
+            <a:ext cx="498600" cy="340920"/>
           </a:xfrm>
           <a:prstGeom prst="rect">
             <a:avLst/>
@@ -24978,7 +25051,7 @@
         <p:spPr>
           <a:xfrm>
             <a:off x="1512000" y="1224000"/>
-            <a:ext cx="498960" cy="341280"/>
+            <a:ext cx="498600" cy="340920"/>
           </a:xfrm>
           <a:prstGeom prst="rect">
             <a:avLst/>
@@ -25029,7 +25102,7 @@
         <p:spPr>
           <a:xfrm>
             <a:off x="3240000" y="900000"/>
-            <a:ext cx="498960" cy="341280"/>
+            <a:ext cx="498600" cy="340920"/>
           </a:xfrm>
           <a:prstGeom prst="rect">
             <a:avLst/>
@@ -25080,7 +25153,7 @@
         <p:spPr>
           <a:xfrm>
             <a:off x="4104000" y="900000"/>
-            <a:ext cx="498960" cy="341280"/>
+            <a:ext cx="498600" cy="340920"/>
           </a:xfrm>
           <a:prstGeom prst="rect">
             <a:avLst/>
@@ -25131,7 +25204,7 @@
         <p:spPr>
           <a:xfrm>
             <a:off x="4104000" y="1224000"/>
-            <a:ext cx="498960" cy="341280"/>
+            <a:ext cx="498600" cy="340920"/>
           </a:xfrm>
           <a:prstGeom prst="rect">
             <a:avLst/>
@@ -25182,7 +25255,7 @@
         <p:spPr>
           <a:xfrm>
             <a:off x="4104000" y="1620000"/>
-            <a:ext cx="498960" cy="341280"/>
+            <a:ext cx="498600" cy="340920"/>
           </a:xfrm>
           <a:prstGeom prst="rect">
             <a:avLst/>
@@ -25233,7 +25306,7 @@
         <p:spPr>
           <a:xfrm>
             <a:off x="576000" y="3492000"/>
-            <a:ext cx="498960" cy="341280"/>
+            <a:ext cx="498600" cy="340920"/>
           </a:xfrm>
           <a:prstGeom prst="rect">
             <a:avLst/>
@@ -25284,7 +25357,7 @@
         <p:spPr>
           <a:xfrm>
             <a:off x="576000" y="3852000"/>
-            <a:ext cx="498960" cy="341280"/>
+            <a:ext cx="498600" cy="340920"/>
           </a:xfrm>
           <a:prstGeom prst="rect">
             <a:avLst/>
@@ -25335,7 +25408,7 @@
         <p:spPr>
           <a:xfrm>
             <a:off x="576000" y="4176000"/>
-            <a:ext cx="498960" cy="341280"/>
+            <a:ext cx="498600" cy="340920"/>
           </a:xfrm>
           <a:prstGeom prst="rect">
             <a:avLst/>
@@ -25386,7 +25459,7 @@
         <p:spPr>
           <a:xfrm>
             <a:off x="1476000" y="3492000"/>
-            <a:ext cx="498960" cy="341280"/>
+            <a:ext cx="498600" cy="340920"/>
           </a:xfrm>
           <a:prstGeom prst="rect">
             <a:avLst/>
@@ -25437,7 +25510,7 @@
         <p:spPr>
           <a:xfrm>
             <a:off x="3240000" y="3492000"/>
-            <a:ext cx="498960" cy="341280"/>
+            <a:ext cx="498600" cy="340920"/>
           </a:xfrm>
           <a:prstGeom prst="rect">
             <a:avLst/>
@@ -25488,7 +25561,7 @@
         <p:spPr>
           <a:xfrm>
             <a:off x="3276000" y="3960000"/>
-            <a:ext cx="498960" cy="341280"/>
+            <a:ext cx="498600" cy="340920"/>
           </a:xfrm>
           <a:prstGeom prst="rect">
             <a:avLst/>
@@ -25539,7 +25612,7 @@
         <p:spPr>
           <a:xfrm>
             <a:off x="4140000" y="3492000"/>
-            <a:ext cx="498960" cy="341280"/>
+            <a:ext cx="498600" cy="340920"/>
           </a:xfrm>
           <a:prstGeom prst="rect">
             <a:avLst/>
@@ -25590,7 +25663,7 @@
         <p:spPr>
           <a:xfrm>
             <a:off x="4140000" y="3924000"/>
-            <a:ext cx="498960" cy="341280"/>
+            <a:ext cx="498600" cy="340920"/>
           </a:xfrm>
           <a:prstGeom prst="rect">
             <a:avLst/>
@@ -25938,7 +26011,7 @@
         <p:spPr>
           <a:xfrm>
             <a:off x="540000" y="2412000"/>
-            <a:ext cx="1290960" cy="341280"/>
+            <a:ext cx="1290600" cy="340920"/>
           </a:xfrm>
           <a:prstGeom prst="rect">
             <a:avLst/>
@@ -25989,7 +26062,7 @@
         <p:spPr>
           <a:xfrm>
             <a:off x="3168000" y="2412000"/>
-            <a:ext cx="1434960" cy="390960"/>
+            <a:ext cx="1434600" cy="390600"/>
           </a:xfrm>
           <a:prstGeom prst="rect">
             <a:avLst/>
@@ -26040,7 +26113,7 @@
         <p:spPr>
           <a:xfrm>
             <a:off x="3168000" y="4968000"/>
-            <a:ext cx="1578960" cy="354960"/>
+            <a:ext cx="1578600" cy="354600"/>
           </a:xfrm>
           <a:prstGeom prst="rect">
             <a:avLst/>
@@ -26091,7 +26164,7 @@
         <p:spPr>
           <a:xfrm>
             <a:off x="504000" y="4968000"/>
-            <a:ext cx="1434960" cy="354960"/>
+            <a:ext cx="1434600" cy="354600"/>
           </a:xfrm>
           <a:prstGeom prst="rect">
             <a:avLst/>
@@ -26172,7 +26245,7 @@
         <p:spPr>
           <a:xfrm>
             <a:off x="1872000" y="1008000"/>
-            <a:ext cx="2083320" cy="787320"/>
+            <a:ext cx="2082960" cy="786960"/>
           </a:xfrm>
           <a:prstGeom prst="rect">
             <a:avLst/>
@@ -26202,7 +26275,7 @@
         <p:spPr>
           <a:xfrm>
             <a:off x="5328000" y="756000"/>
-            <a:ext cx="1651320" cy="1219320"/>
+            <a:ext cx="1650960" cy="1218960"/>
           </a:xfrm>
           <a:custGeom>
             <a:avLst/>
@@ -26255,7 +26328,7 @@
         <p:spPr>
           <a:xfrm>
             <a:off x="1872360" y="3672360"/>
-            <a:ext cx="2083320" cy="787320"/>
+            <a:ext cx="2082960" cy="786960"/>
           </a:xfrm>
           <a:prstGeom prst="rect">
             <a:avLst/>
@@ -26285,7 +26358,7 @@
         <p:spPr>
           <a:xfrm>
             <a:off x="5328360" y="3420360"/>
-            <a:ext cx="1651320" cy="1219320"/>
+            <a:ext cx="1650960" cy="1218960"/>
           </a:xfrm>
           <a:custGeom>
             <a:avLst/>
@@ -26393,7 +26466,7 @@
         <p:spPr>
           <a:xfrm>
             <a:off x="1188000" y="2304000"/>
-            <a:ext cx="6907320" cy="341640"/>
+            <a:ext cx="6906960" cy="341280"/>
           </a:xfrm>
           <a:prstGeom prst="rect">
             <a:avLst/>
@@ -26444,7 +26517,7 @@
         <p:spPr>
           <a:xfrm>
             <a:off x="1080000" y="4788000"/>
-            <a:ext cx="7159320" cy="597600"/>
+            <a:ext cx="7158960" cy="597240"/>
           </a:xfrm>
           <a:prstGeom prst="rect">
             <a:avLst/>
@@ -26525,7 +26598,7 @@
         <p:spPr>
           <a:xfrm>
             <a:off x="1908000" y="2232000"/>
-            <a:ext cx="1434600" cy="786600"/>
+            <a:ext cx="1434240" cy="786240"/>
           </a:xfrm>
           <a:prstGeom prst="rect">
             <a:avLst/>
@@ -26580,7 +26653,7 @@
         <p:spPr>
           <a:xfrm>
             <a:off x="6084000" y="2232000"/>
-            <a:ext cx="1434600" cy="786600"/>
+            <a:ext cx="1434240" cy="786240"/>
           </a:xfrm>
           <a:prstGeom prst="rect">
             <a:avLst/>
@@ -26635,7 +26708,7 @@
         <p:spPr>
           <a:xfrm>
             <a:off x="4032000" y="1944000"/>
-            <a:ext cx="1434600" cy="1362600"/>
+            <a:ext cx="1434240" cy="1362240"/>
           </a:xfrm>
           <a:custGeom>
             <a:avLst/>
@@ -26842,7 +26915,7 @@
         <p:spPr>
           <a:xfrm>
             <a:off x="2592000" y="3636000"/>
-            <a:ext cx="7123320" cy="597600"/>
+            <a:ext cx="7122960" cy="597240"/>
           </a:xfrm>
           <a:prstGeom prst="rect">
             <a:avLst/>
@@ -26943,7 +27016,7 @@
         <p:spPr>
           <a:xfrm>
             <a:off x="5934960" y="2130480"/>
-            <a:ext cx="1693080" cy="1004040"/>
+            <a:ext cx="1692720" cy="1003680"/>
           </a:xfrm>
           <a:prstGeom prst="rect">
             <a:avLst/>
@@ -26973,7 +27046,7 @@
         <p:spPr>
           <a:xfrm>
             <a:off x="1908000" y="2232000"/>
-            <a:ext cx="1434600" cy="786600"/>
+            <a:ext cx="1434240" cy="786240"/>
           </a:xfrm>
           <a:prstGeom prst="rect">
             <a:avLst/>
@@ -27028,7 +27101,7 @@
         <p:spPr>
           <a:xfrm>
             <a:off x="6084000" y="2232000"/>
-            <a:ext cx="1434600" cy="786600"/>
+            <a:ext cx="1434240" cy="786240"/>
           </a:xfrm>
           <a:prstGeom prst="rect">
             <a:avLst/>
@@ -27083,7 +27156,7 @@
         <p:spPr>
           <a:xfrm>
             <a:off x="4032000" y="1944000"/>
-            <a:ext cx="1434600" cy="1362600"/>
+            <a:ext cx="1434240" cy="1362240"/>
           </a:xfrm>
           <a:custGeom>
             <a:avLst/>
@@ -27242,7 +27315,7 @@
         <p:spPr>
           <a:xfrm>
             <a:off x="1764000" y="3564000"/>
-            <a:ext cx="7123320" cy="597600"/>
+            <a:ext cx="7122960" cy="597240"/>
           </a:xfrm>
           <a:prstGeom prst="rect">
             <a:avLst/>
@@ -27350,7 +27423,7 @@
         <p:spPr>
           <a:xfrm>
             <a:off x="1945800" y="3636000"/>
-            <a:ext cx="1434600" cy="786600"/>
+            <a:ext cx="1434240" cy="786240"/>
           </a:xfrm>
           <a:prstGeom prst="rect">
             <a:avLst/>
@@ -27425,7 +27498,7 @@
         <p:spPr>
           <a:xfrm>
             <a:off x="6300000" y="3673800"/>
-            <a:ext cx="1434600" cy="786600"/>
+            <a:ext cx="1434240" cy="786240"/>
           </a:xfrm>
           <a:prstGeom prst="rect">
             <a:avLst/>
@@ -27554,7 +27627,7 @@
         <p:spPr>
           <a:xfrm>
             <a:off x="1764000" y="4860000"/>
-            <a:ext cx="7123320" cy="597600"/>
+            <a:ext cx="7122960" cy="597240"/>
           </a:xfrm>
           <a:prstGeom prst="rect">
             <a:avLst/>
@@ -27580,7 +27653,7 @@
         <p:spPr>
           <a:xfrm>
             <a:off x="4140000" y="1080000"/>
-            <a:ext cx="1434600" cy="786600"/>
+            <a:ext cx="1434240" cy="786240"/>
           </a:xfrm>
           <a:prstGeom prst="rect">
             <a:avLst/>
@@ -27635,7 +27708,7 @@
         <p:spPr>
           <a:xfrm>
             <a:off x="4392000" y="2267640"/>
-            <a:ext cx="932400" cy="1004400"/>
+            <a:ext cx="932040" cy="1004040"/>
           </a:xfrm>
           <a:custGeom>
             <a:avLst/>
@@ -27684,7 +27757,7 @@
         <p:spPr>
           <a:xfrm>
             <a:off x="4572000" y="2304000"/>
-            <a:ext cx="644400" cy="342720"/>
+            <a:ext cx="644040" cy="342360"/>
           </a:xfrm>
           <a:prstGeom prst="rect">
             <a:avLst/>
@@ -27816,7 +27889,7 @@
         <p:spPr>
           <a:xfrm>
             <a:off x="2592000" y="432000"/>
-            <a:ext cx="1148400" cy="500400"/>
+            <a:ext cx="1148040" cy="500040"/>
           </a:xfrm>
           <a:prstGeom prst="ellipse">
             <a:avLst/>
@@ -27871,7 +27944,7 @@
         <p:spPr>
           <a:xfrm>
             <a:off x="4104360" y="360360"/>
-            <a:ext cx="1148400" cy="500400"/>
+            <a:ext cx="1148040" cy="500040"/>
           </a:xfrm>
           <a:prstGeom prst="ellipse">
             <a:avLst/>
@@ -27926,7 +27999,7 @@
         <p:spPr>
           <a:xfrm>
             <a:off x="5652720" y="432720"/>
-            <a:ext cx="1148400" cy="500400"/>
+            <a:ext cx="1148040" cy="500040"/>
           </a:xfrm>
           <a:prstGeom prst="ellipse">
             <a:avLst/>
@@ -27981,7 +28054,7 @@
         <p:spPr>
           <a:xfrm>
             <a:off x="3813480" y="4321080"/>
-            <a:ext cx="1148400" cy="500400"/>
+            <a:ext cx="1148040" cy="500040"/>
           </a:xfrm>
           <a:prstGeom prst="ellipse">
             <a:avLst/>
@@ -28036,7 +28109,7 @@
         <p:spPr>
           <a:xfrm>
             <a:off x="2193840" y="4717440"/>
-            <a:ext cx="1148400" cy="500400"/>
+            <a:ext cx="1148040" cy="500040"/>
           </a:xfrm>
           <a:prstGeom prst="ellipse">
             <a:avLst/>
@@ -28091,7 +28164,7 @@
         <p:spPr>
           <a:xfrm>
             <a:off x="682200" y="4501800"/>
-            <a:ext cx="1148400" cy="500400"/>
+            <a:ext cx="1148040" cy="500040"/>
           </a:xfrm>
           <a:prstGeom prst="ellipse">
             <a:avLst/>
@@ -28146,7 +28219,7 @@
         <p:spPr>
           <a:xfrm>
             <a:off x="5434560" y="4574160"/>
-            <a:ext cx="1148400" cy="500400"/>
+            <a:ext cx="1148040" cy="500040"/>
           </a:xfrm>
           <a:prstGeom prst="ellipse">
             <a:avLst/>
@@ -28201,7 +28274,7 @@
         <p:spPr>
           <a:xfrm>
             <a:off x="7634160" y="4574520"/>
-            <a:ext cx="1148400" cy="500400"/>
+            <a:ext cx="1148040" cy="500040"/>
           </a:xfrm>
           <a:prstGeom prst="ellipse">
             <a:avLst/>
@@ -28256,7 +28329,7 @@
         <p:spPr>
           <a:xfrm>
             <a:off x="686520" y="3098880"/>
-            <a:ext cx="1148400" cy="500400"/>
+            <a:ext cx="1148040" cy="500040"/>
           </a:xfrm>
           <a:prstGeom prst="ellipse">
             <a:avLst/>
@@ -28584,7 +28657,7 @@
         <p:spPr>
           <a:xfrm>
             <a:off x="432000" y="72000"/>
-            <a:ext cx="9068400" cy="2516400"/>
+            <a:ext cx="9068040" cy="2516040"/>
           </a:xfrm>
           <a:prstGeom prst="rect">
             <a:avLst/>
@@ -28614,7 +28687,7 @@
         <p:spPr>
           <a:xfrm>
             <a:off x="2016000" y="1188000"/>
-            <a:ext cx="1434600" cy="786600"/>
+            <a:ext cx="1434240" cy="786240"/>
           </a:xfrm>
           <a:prstGeom prst="rect">
             <a:avLst/>
@@ -28669,7 +28742,7 @@
         <p:spPr>
           <a:xfrm>
             <a:off x="6192000" y="1188000"/>
-            <a:ext cx="1434600" cy="786600"/>
+            <a:ext cx="1434240" cy="786240"/>
           </a:xfrm>
           <a:prstGeom prst="rect">
             <a:avLst/>
@@ -28724,7 +28797,7 @@
         <p:spPr>
           <a:xfrm>
             <a:off x="4140000" y="900000"/>
-            <a:ext cx="1434600" cy="1362600"/>
+            <a:ext cx="1434240" cy="1362240"/>
           </a:xfrm>
           <a:custGeom>
             <a:avLst/>
@@ -28883,7 +28956,7 @@
         <p:spPr>
           <a:xfrm>
             <a:off x="-36000" y="3384000"/>
-            <a:ext cx="2624400" cy="597600"/>
+            <a:ext cx="2624040" cy="597240"/>
           </a:xfrm>
           <a:prstGeom prst="rect">
             <a:avLst/>
@@ -28961,7 +29034,7 @@
         <p:spPr>
           <a:xfrm>
             <a:off x="5868360" y="180360"/>
-            <a:ext cx="1148400" cy="500400"/>
+            <a:ext cx="1148040" cy="500040"/>
           </a:xfrm>
           <a:prstGeom prst="ellipse">
             <a:avLst/>
@@ -29016,7 +29089,7 @@
         <p:spPr>
           <a:xfrm>
             <a:off x="7344720" y="216720"/>
-            <a:ext cx="1148400" cy="500400"/>
+            <a:ext cx="1148040" cy="500040"/>
           </a:xfrm>
           <a:prstGeom prst="ellipse">
             <a:avLst/>
@@ -29071,7 +29144,7 @@
         <p:spPr>
           <a:xfrm>
             <a:off x="7921080" y="937080"/>
-            <a:ext cx="1148400" cy="500400"/>
+            <a:ext cx="1148040" cy="500040"/>
           </a:xfrm>
           <a:prstGeom prst="ellipse">
             <a:avLst/>
@@ -29126,7 +29199,7 @@
         <p:spPr>
           <a:xfrm>
             <a:off x="7921440" y="1693440"/>
-            <a:ext cx="1148400" cy="500400"/>
+            <a:ext cx="1148040" cy="500040"/>
           </a:xfrm>
           <a:prstGeom prst="ellipse">
             <a:avLst/>
@@ -29181,7 +29254,7 @@
         <p:spPr>
           <a:xfrm>
             <a:off x="7921440" y="937440"/>
-            <a:ext cx="1148400" cy="500400"/>
+            <a:ext cx="1148040" cy="500040"/>
           </a:xfrm>
           <a:prstGeom prst="ellipse">
             <a:avLst/>
@@ -29236,7 +29309,7 @@
         <p:spPr>
           <a:xfrm>
             <a:off x="2089440" y="433440"/>
-            <a:ext cx="1148400" cy="500400"/>
+            <a:ext cx="1148040" cy="500040"/>
           </a:xfrm>
           <a:prstGeom prst="ellipse">
             <a:avLst/>
@@ -29291,7 +29364,7 @@
         <p:spPr>
           <a:xfrm>
             <a:off x="649800" y="541800"/>
-            <a:ext cx="1148400" cy="500400"/>
+            <a:ext cx="1148040" cy="500040"/>
           </a:xfrm>
           <a:prstGeom prst="ellipse">
             <a:avLst/>
@@ -29346,7 +29419,7 @@
         <p:spPr>
           <a:xfrm>
             <a:off x="4320000" y="3168000"/>
-            <a:ext cx="1038600" cy="788400"/>
+            <a:ext cx="1038240" cy="788040"/>
           </a:xfrm>
           <a:custGeom>
             <a:avLst/>
@@ -29424,7 +29497,7 @@
         <p:spPr>
           <a:xfrm>
             <a:off x="4176000" y="4428000"/>
-            <a:ext cx="1434600" cy="786600"/>
+            <a:ext cx="1434240" cy="786240"/>
           </a:xfrm>
           <a:prstGeom prst="rect">
             <a:avLst/>
@@ -29560,7 +29633,7 @@
         <p:spPr>
           <a:xfrm>
             <a:off x="5870160" y="3782160"/>
-            <a:ext cx="1148400" cy="500400"/>
+            <a:ext cx="1148040" cy="500040"/>
           </a:xfrm>
           <a:prstGeom prst="ellipse">
             <a:avLst/>
@@ -29615,7 +29688,7 @@
         <p:spPr>
           <a:xfrm>
             <a:off x="7380000" y="3115440"/>
-            <a:ext cx="2624400" cy="597600"/>
+            <a:ext cx="2624040" cy="597240"/>
           </a:xfrm>
           <a:prstGeom prst="rect">
             <a:avLst/>

</xml_diff>

<commit_message>
DBMS: Recovery Failure - 1
</commit_message>
<xml_diff>
--- a/GATE/images/gate_images.pptx
+++ b/GATE/images/gate_images.pptx
@@ -29,6 +29,7 @@
     <p:sldId id="277" r:id="rId24"/>
     <p:sldId id="278" r:id="rId25"/>
     <p:sldId id="279" r:id="rId26"/>
+    <p:sldId id="280" r:id="rId27"/>
   </p:sldIdLst>
   <p:sldSz cx="10080625" cy="5670550"/>
   <p:notesSz cx="7772400" cy="10058400"/>
@@ -1670,7 +1671,7 @@
         <p:spPr>
           <a:xfrm>
             <a:off x="1836000" y="1332000"/>
-            <a:ext cx="2369880" cy="785880"/>
+            <a:ext cx="2369520" cy="785520"/>
           </a:xfrm>
           <a:prstGeom prst="rect">
             <a:avLst/>
@@ -1725,7 +1726,7 @@
         <p:spPr>
           <a:xfrm>
             <a:off x="1836000" y="2880000"/>
-            <a:ext cx="2369880" cy="785880"/>
+            <a:ext cx="2369520" cy="785520"/>
           </a:xfrm>
           <a:prstGeom prst="rect">
             <a:avLst/>
@@ -1790,7 +1791,7 @@
         <p:spPr>
           <a:xfrm>
             <a:off x="1836000" y="4176000"/>
-            <a:ext cx="2369880" cy="785880"/>
+            <a:ext cx="2369520" cy="785520"/>
           </a:xfrm>
           <a:prstGeom prst="rect">
             <a:avLst/>
@@ -1865,7 +1866,7 @@
         <p:spPr>
           <a:xfrm>
             <a:off x="5292000" y="900000"/>
-            <a:ext cx="2369880" cy="1505880"/>
+            <a:ext cx="2369520" cy="1505520"/>
           </a:xfrm>
           <a:prstGeom prst="rect">
             <a:avLst/>
@@ -2000,7 +2001,7 @@
         <p:spPr>
           <a:xfrm>
             <a:off x="5292000" y="2571480"/>
-            <a:ext cx="2369880" cy="1274400"/>
+            <a:ext cx="2369520" cy="1274040"/>
           </a:xfrm>
           <a:prstGeom prst="rect">
             <a:avLst/>
@@ -2115,7 +2116,7 @@
         <p:spPr>
           <a:xfrm>
             <a:off x="5292000" y="4047480"/>
-            <a:ext cx="2369880" cy="1022400"/>
+            <a:ext cx="2369520" cy="1022040"/>
           </a:xfrm>
           <a:prstGeom prst="rect">
             <a:avLst/>
@@ -2294,7 +2295,7 @@
         <p:spPr>
           <a:xfrm>
             <a:off x="2988000" y="360000"/>
-            <a:ext cx="4385880" cy="340200"/>
+            <a:ext cx="4385520" cy="339840"/>
           </a:xfrm>
           <a:prstGeom prst="rect">
             <a:avLst/>
@@ -2375,7 +2376,7 @@
         <p:spPr>
           <a:xfrm>
             <a:off x="1440000" y="720000"/>
-            <a:ext cx="6764040" cy="1796040"/>
+            <a:ext cx="6763680" cy="1795680"/>
           </a:xfrm>
           <a:prstGeom prst="rect">
             <a:avLst/>
@@ -2405,7 +2406,7 @@
         <p:spPr>
           <a:xfrm>
             <a:off x="2016000" y="1188000"/>
-            <a:ext cx="1434240" cy="786240"/>
+            <a:ext cx="1433880" cy="785880"/>
           </a:xfrm>
           <a:prstGeom prst="rect">
             <a:avLst/>
@@ -2460,7 +2461,7 @@
         <p:spPr>
           <a:xfrm>
             <a:off x="6192000" y="1188000"/>
-            <a:ext cx="1434240" cy="786240"/>
+            <a:ext cx="1433880" cy="785880"/>
           </a:xfrm>
           <a:prstGeom prst="rect">
             <a:avLst/>
@@ -2515,7 +2516,7 @@
         <p:spPr>
           <a:xfrm>
             <a:off x="4140000" y="900000"/>
-            <a:ext cx="1434240" cy="1362240"/>
+            <a:ext cx="1433880" cy="1361880"/>
           </a:xfrm>
           <a:custGeom>
             <a:avLst/>
@@ -2701,7 +2702,7 @@
         <p:spPr>
           <a:xfrm>
             <a:off x="4320000" y="3168000"/>
-            <a:ext cx="1038240" cy="788040"/>
+            <a:ext cx="1037880" cy="787680"/>
           </a:xfrm>
           <a:custGeom>
             <a:avLst/>
@@ -2779,7 +2780,7 @@
         <p:spPr>
           <a:xfrm>
             <a:off x="4176000" y="4428000"/>
-            <a:ext cx="1434240" cy="786240"/>
+            <a:ext cx="1433880" cy="785880"/>
           </a:xfrm>
           <a:prstGeom prst="rect">
             <a:avLst/>
@@ -2861,7 +2862,7 @@
         <p:spPr>
           <a:xfrm>
             <a:off x="5870160" y="3314160"/>
-            <a:ext cx="1148040" cy="500040"/>
+            <a:ext cx="1147680" cy="499680"/>
           </a:xfrm>
           <a:prstGeom prst="ellipse">
             <a:avLst/>
@@ -3000,7 +3001,7 @@
         <p:spPr>
           <a:xfrm>
             <a:off x="1944000" y="900000"/>
-            <a:ext cx="1434240" cy="786240"/>
+            <a:ext cx="1433880" cy="785880"/>
           </a:xfrm>
           <a:prstGeom prst="rect">
             <a:avLst/>
@@ -3055,7 +3056,7 @@
         <p:spPr>
           <a:xfrm>
             <a:off x="6120000" y="900000"/>
-            <a:ext cx="1434240" cy="786240"/>
+            <a:ext cx="1433880" cy="785880"/>
           </a:xfrm>
           <a:prstGeom prst="rect">
             <a:avLst/>
@@ -3110,7 +3111,7 @@
         <p:spPr>
           <a:xfrm>
             <a:off x="4068000" y="612000"/>
-            <a:ext cx="1434240" cy="1362240"/>
+            <a:ext cx="1433880" cy="1361880"/>
           </a:xfrm>
           <a:custGeom>
             <a:avLst/>
@@ -3289,7 +3290,7 @@
         <p:spPr>
           <a:xfrm>
             <a:off x="2592000" y="5904000"/>
-            <a:ext cx="7122960" cy="597240"/>
+            <a:ext cx="7122600" cy="596880"/>
           </a:xfrm>
           <a:prstGeom prst="rect">
             <a:avLst/>
@@ -3360,7 +3361,7 @@
         <p:spPr>
           <a:xfrm>
             <a:off x="360000" y="216360"/>
-            <a:ext cx="1148040" cy="500040"/>
+            <a:ext cx="1147680" cy="499680"/>
           </a:xfrm>
           <a:prstGeom prst="ellipse">
             <a:avLst/>
@@ -3415,7 +3416,7 @@
         <p:spPr>
           <a:xfrm>
             <a:off x="1727640" y="216360"/>
-            <a:ext cx="1148040" cy="500040"/>
+            <a:ext cx="1147680" cy="499680"/>
           </a:xfrm>
           <a:prstGeom prst="ellipse">
             <a:avLst/>
@@ -3470,7 +3471,7 @@
         <p:spPr>
           <a:xfrm>
             <a:off x="359280" y="1008360"/>
-            <a:ext cx="1148040" cy="500040"/>
+            <a:ext cx="1147680" cy="499680"/>
           </a:xfrm>
           <a:prstGeom prst="ellipse">
             <a:avLst/>
@@ -3525,7 +3526,7 @@
         <p:spPr>
           <a:xfrm>
             <a:off x="358920" y="1800360"/>
-            <a:ext cx="1148040" cy="500040"/>
+            <a:ext cx="1147680" cy="499680"/>
           </a:xfrm>
           <a:prstGeom prst="ellipse">
             <a:avLst/>
@@ -3580,7 +3581,7 @@
         <p:spPr>
           <a:xfrm>
             <a:off x="1906560" y="1836360"/>
-            <a:ext cx="1148040" cy="500040"/>
+            <a:ext cx="1147680" cy="499680"/>
           </a:xfrm>
           <a:prstGeom prst="ellipse">
             <a:avLst/>
@@ -3635,7 +3636,7 @@
         <p:spPr>
           <a:xfrm>
             <a:off x="4211280" y="360"/>
-            <a:ext cx="1148040" cy="500040"/>
+            <a:ext cx="1147680" cy="499680"/>
           </a:xfrm>
           <a:prstGeom prst="ellipse">
             <a:avLst/>
@@ -3690,7 +3691,7 @@
         <p:spPr>
           <a:xfrm>
             <a:off x="6226920" y="360"/>
-            <a:ext cx="1148040" cy="500040"/>
+            <a:ext cx="1147680" cy="499680"/>
           </a:xfrm>
           <a:prstGeom prst="ellipse">
             <a:avLst/>
@@ -3745,7 +3746,7 @@
         <p:spPr>
           <a:xfrm>
             <a:off x="4210920" y="360"/>
-            <a:ext cx="1148040" cy="500040"/>
+            <a:ext cx="1147680" cy="499680"/>
           </a:xfrm>
           <a:prstGeom prst="ellipse">
             <a:avLst/>
@@ -3800,7 +3801,7 @@
         <p:spPr>
           <a:xfrm>
             <a:off x="7738920" y="252360"/>
-            <a:ext cx="1148040" cy="500040"/>
+            <a:ext cx="1147680" cy="499680"/>
           </a:xfrm>
           <a:prstGeom prst="ellipse">
             <a:avLst/>
@@ -3855,7 +3856,7 @@
         <p:spPr>
           <a:xfrm>
             <a:off x="7810920" y="936360"/>
-            <a:ext cx="1148040" cy="500040"/>
+            <a:ext cx="1147680" cy="499680"/>
           </a:xfrm>
           <a:prstGeom prst="ellipse">
             <a:avLst/>
@@ -5391,7 +5392,7 @@
         <p:spPr>
           <a:xfrm>
             <a:off x="576000" y="4320000"/>
-            <a:ext cx="2444400" cy="342720"/>
+            <a:ext cx="2444040" cy="342360"/>
           </a:xfrm>
           <a:prstGeom prst="rect">
             <a:avLst/>
@@ -5442,7 +5443,7 @@
         <p:spPr>
           <a:xfrm>
             <a:off x="7092000" y="3672000"/>
-            <a:ext cx="2444400" cy="342720"/>
+            <a:ext cx="2444040" cy="342360"/>
           </a:xfrm>
           <a:prstGeom prst="rect">
             <a:avLst/>
@@ -5493,7 +5494,7 @@
         <p:spPr>
           <a:xfrm>
             <a:off x="3744000" y="5328000"/>
-            <a:ext cx="2444400" cy="342720"/>
+            <a:ext cx="2444040" cy="342360"/>
           </a:xfrm>
           <a:prstGeom prst="rect">
             <a:avLst/>
@@ -5574,7 +5575,7 @@
         <p:spPr>
           <a:xfrm>
             <a:off x="5934960" y="1050480"/>
-            <a:ext cx="1692720" cy="1003680"/>
+            <a:ext cx="1692360" cy="1003320"/>
           </a:xfrm>
           <a:prstGeom prst="rect">
             <a:avLst/>
@@ -5604,7 +5605,7 @@
         <p:spPr>
           <a:xfrm>
             <a:off x="1908000" y="1152000"/>
-            <a:ext cx="1434240" cy="786240"/>
+            <a:ext cx="1433880" cy="785880"/>
           </a:xfrm>
           <a:prstGeom prst="rect">
             <a:avLst/>
@@ -5659,7 +5660,7 @@
         <p:spPr>
           <a:xfrm>
             <a:off x="6084000" y="1152000"/>
-            <a:ext cx="1434240" cy="786240"/>
+            <a:ext cx="1433880" cy="785880"/>
           </a:xfrm>
           <a:prstGeom prst="rect">
             <a:avLst/>
@@ -5714,7 +5715,7 @@
         <p:spPr>
           <a:xfrm>
             <a:off x="4032000" y="864000"/>
-            <a:ext cx="1434240" cy="1362240"/>
+            <a:ext cx="1433880" cy="1361880"/>
           </a:xfrm>
           <a:custGeom>
             <a:avLst/>
@@ -5846,7 +5847,7 @@
         <p:spPr>
           <a:xfrm>
             <a:off x="1548000" y="576000"/>
-            <a:ext cx="2120400" cy="464400"/>
+            <a:ext cx="2120040" cy="464040"/>
           </a:xfrm>
           <a:prstGeom prst="rect">
             <a:avLst/>
@@ -5952,7 +5953,7 @@
         <p:spPr>
           <a:xfrm>
             <a:off x="5760000" y="576000"/>
-            <a:ext cx="2120400" cy="464400"/>
+            <a:ext cx="2120040" cy="464040"/>
           </a:xfrm>
           <a:prstGeom prst="rect">
             <a:avLst/>
@@ -6003,7 +6004,7 @@
         <p:spPr>
           <a:xfrm>
             <a:off x="216000" y="2376000"/>
-            <a:ext cx="2120400" cy="2588400"/>
+            <a:ext cx="2120040" cy="2588040"/>
           </a:xfrm>
           <a:prstGeom prst="rect">
             <a:avLst/>
@@ -6712,7 +6713,7 @@
         <p:spPr>
           <a:xfrm>
             <a:off x="1945800" y="3636000"/>
-            <a:ext cx="1434240" cy="786240"/>
+            <a:ext cx="1433880" cy="785880"/>
           </a:xfrm>
           <a:prstGeom prst="rect">
             <a:avLst/>
@@ -6787,7 +6788,7 @@
         <p:spPr>
           <a:xfrm>
             <a:off x="6300000" y="3673800"/>
-            <a:ext cx="1434240" cy="786240"/>
+            <a:ext cx="1433880" cy="785880"/>
           </a:xfrm>
           <a:prstGeom prst="rect">
             <a:avLst/>
@@ -6916,7 +6917,7 @@
         <p:spPr>
           <a:xfrm>
             <a:off x="1764000" y="4860000"/>
-            <a:ext cx="7122960" cy="597240"/>
+            <a:ext cx="7122600" cy="596880"/>
           </a:xfrm>
           <a:prstGeom prst="rect">
             <a:avLst/>
@@ -6942,7 +6943,7 @@
         <p:spPr>
           <a:xfrm>
             <a:off x="4140000" y="1080000"/>
-            <a:ext cx="1434240" cy="786240"/>
+            <a:ext cx="1433880" cy="785880"/>
           </a:xfrm>
           <a:prstGeom prst="rect">
             <a:avLst/>
@@ -6997,7 +6998,7 @@
         <p:spPr>
           <a:xfrm>
             <a:off x="4392000" y="2267640"/>
-            <a:ext cx="932040" cy="1004040"/>
+            <a:ext cx="931680" cy="1003680"/>
           </a:xfrm>
           <a:custGeom>
             <a:avLst/>
@@ -7046,7 +7047,7 @@
         <p:spPr>
           <a:xfrm>
             <a:off x="4572000" y="2304000"/>
-            <a:ext cx="644040" cy="342360"/>
+            <a:ext cx="643680" cy="342000"/>
           </a:xfrm>
           <a:prstGeom prst="rect">
             <a:avLst/>
@@ -7178,7 +7179,7 @@
         <p:spPr>
           <a:xfrm>
             <a:off x="2592000" y="432000"/>
-            <a:ext cx="1148040" cy="500040"/>
+            <a:ext cx="1147680" cy="499680"/>
           </a:xfrm>
           <a:prstGeom prst="ellipse">
             <a:avLst/>
@@ -7233,7 +7234,7 @@
         <p:spPr>
           <a:xfrm>
             <a:off x="4104360" y="360360"/>
-            <a:ext cx="1148040" cy="500040"/>
+            <a:ext cx="1147680" cy="499680"/>
           </a:xfrm>
           <a:prstGeom prst="ellipse">
             <a:avLst/>
@@ -7288,7 +7289,7 @@
         <p:spPr>
           <a:xfrm>
             <a:off x="5652720" y="432720"/>
-            <a:ext cx="1148040" cy="500040"/>
+            <a:ext cx="1147680" cy="499680"/>
           </a:xfrm>
           <a:prstGeom prst="ellipse">
             <a:avLst/>
@@ -7343,7 +7344,7 @@
         <p:spPr>
           <a:xfrm>
             <a:off x="3813480" y="4321080"/>
-            <a:ext cx="1148040" cy="500040"/>
+            <a:ext cx="1147680" cy="499680"/>
           </a:xfrm>
           <a:prstGeom prst="ellipse">
             <a:avLst/>
@@ -7398,7 +7399,7 @@
         <p:spPr>
           <a:xfrm>
             <a:off x="2193840" y="4717440"/>
-            <a:ext cx="1148040" cy="500040"/>
+            <a:ext cx="1147680" cy="499680"/>
           </a:xfrm>
           <a:prstGeom prst="ellipse">
             <a:avLst/>
@@ -7453,7 +7454,7 @@
         <p:spPr>
           <a:xfrm>
             <a:off x="682200" y="4501800"/>
-            <a:ext cx="1148040" cy="500040"/>
+            <a:ext cx="1147680" cy="499680"/>
           </a:xfrm>
           <a:prstGeom prst="ellipse">
             <a:avLst/>
@@ -7508,7 +7509,7 @@
         <p:spPr>
           <a:xfrm>
             <a:off x="5434560" y="4574160"/>
-            <a:ext cx="1148040" cy="500040"/>
+            <a:ext cx="1147680" cy="499680"/>
           </a:xfrm>
           <a:prstGeom prst="ellipse">
             <a:avLst/>
@@ -7563,7 +7564,7 @@
         <p:spPr>
           <a:xfrm>
             <a:off x="7634160" y="4574520"/>
-            <a:ext cx="1148040" cy="500040"/>
+            <a:ext cx="1147680" cy="499680"/>
           </a:xfrm>
           <a:prstGeom prst="ellipse">
             <a:avLst/>
@@ -7618,7 +7619,7 @@
         <p:spPr>
           <a:xfrm>
             <a:off x="686520" y="3098880"/>
-            <a:ext cx="1148040" cy="500040"/>
+            <a:ext cx="1147680" cy="499680"/>
           </a:xfrm>
           <a:prstGeom prst="ellipse">
             <a:avLst/>
@@ -7916,7 +7917,7 @@
         <p:spPr>
           <a:xfrm>
             <a:off x="216000" y="288000"/>
-            <a:ext cx="2372400" cy="2300400"/>
+            <a:ext cx="2372040" cy="2300040"/>
           </a:xfrm>
           <a:prstGeom prst="rect">
             <a:avLst/>
@@ -8037,7 +8038,7 @@
         <p:spPr>
           <a:xfrm>
             <a:off x="1908000" y="936000"/>
-            <a:ext cx="1434240" cy="786240"/>
+            <a:ext cx="1433880" cy="785880"/>
           </a:xfrm>
           <a:prstGeom prst="rect">
             <a:avLst/>
@@ -8092,7 +8093,7 @@
         <p:spPr>
           <a:xfrm>
             <a:off x="6084000" y="936000"/>
-            <a:ext cx="1434240" cy="786240"/>
+            <a:ext cx="1433880" cy="785880"/>
           </a:xfrm>
           <a:prstGeom prst="rect">
             <a:avLst/>
@@ -8147,7 +8148,7 @@
         <p:spPr>
           <a:xfrm>
             <a:off x="4934160" y="4392000"/>
-            <a:ext cx="1434240" cy="786240"/>
+            <a:ext cx="1433880" cy="785880"/>
           </a:xfrm>
           <a:prstGeom prst="rect">
             <a:avLst/>
@@ -8202,7 +8203,7 @@
         <p:spPr>
           <a:xfrm>
             <a:off x="4032000" y="648000"/>
-            <a:ext cx="1434240" cy="1362240"/>
+            <a:ext cx="1433880" cy="1361880"/>
           </a:xfrm>
           <a:custGeom>
             <a:avLst/>
@@ -8300,7 +8301,7 @@
         <p:spPr>
           <a:xfrm>
             <a:off x="1908000" y="3204360"/>
-            <a:ext cx="1434240" cy="1362240"/>
+            <a:ext cx="1433880" cy="1361880"/>
           </a:xfrm>
           <a:custGeom>
             <a:avLst/>
@@ -8452,7 +8453,7 @@
         <p:spPr>
           <a:xfrm>
             <a:off x="4140000" y="2234160"/>
-            <a:ext cx="1148400" cy="570240"/>
+            <a:ext cx="1148040" cy="569880"/>
           </a:xfrm>
           <a:prstGeom prst="ellipse">
             <a:avLst/>
@@ -8507,7 +8508,7 @@
         <p:spPr>
           <a:xfrm>
             <a:off x="3708360" y="3636360"/>
-            <a:ext cx="1076040" cy="570240"/>
+            <a:ext cx="1075680" cy="569880"/>
           </a:xfrm>
           <a:prstGeom prst="ellipse">
             <a:avLst/>
@@ -8616,7 +8617,7 @@
         <p:spPr>
           <a:xfrm>
             <a:off x="504000" y="396000"/>
-            <a:ext cx="1148400" cy="570240"/>
+            <a:ext cx="1148040" cy="569880"/>
           </a:xfrm>
           <a:prstGeom prst="ellipse">
             <a:avLst/>
@@ -8671,7 +8672,7 @@
         <p:spPr>
           <a:xfrm>
             <a:off x="1944000" y="180000"/>
-            <a:ext cx="1148400" cy="570240"/>
+            <a:ext cx="1148040" cy="569880"/>
           </a:xfrm>
           <a:prstGeom prst="ellipse">
             <a:avLst/>
@@ -8726,7 +8727,7 @@
         <p:spPr>
           <a:xfrm>
             <a:off x="288000" y="1152000"/>
-            <a:ext cx="1148400" cy="570240"/>
+            <a:ext cx="1148040" cy="569880"/>
           </a:xfrm>
           <a:prstGeom prst="ellipse">
             <a:avLst/>
@@ -8781,7 +8782,7 @@
         <p:spPr>
           <a:xfrm>
             <a:off x="5940000" y="180000"/>
-            <a:ext cx="1148400" cy="570240"/>
+            <a:ext cx="1148040" cy="569880"/>
           </a:xfrm>
           <a:prstGeom prst="ellipse">
             <a:avLst/>
@@ -8836,7 +8837,7 @@
         <p:spPr>
           <a:xfrm>
             <a:off x="7560000" y="180000"/>
-            <a:ext cx="1148400" cy="570240"/>
+            <a:ext cx="1148040" cy="569880"/>
           </a:xfrm>
           <a:prstGeom prst="ellipse">
             <a:avLst/>
@@ -8891,7 +8892,7 @@
         <p:spPr>
           <a:xfrm>
             <a:off x="7992000" y="972000"/>
-            <a:ext cx="1148400" cy="570240"/>
+            <a:ext cx="1148040" cy="569880"/>
           </a:xfrm>
           <a:prstGeom prst="ellipse">
             <a:avLst/>
@@ -8973,7 +8974,7 @@
         <p:spPr>
           <a:xfrm>
             <a:off x="432000" y="3636360"/>
-            <a:ext cx="1076040" cy="570240"/>
+            <a:ext cx="1075680" cy="569880"/>
           </a:xfrm>
           <a:prstGeom prst="ellipse">
             <a:avLst/>
@@ -9028,7 +9029,7 @@
         <p:spPr>
           <a:xfrm>
             <a:off x="6803640" y="4068360"/>
-            <a:ext cx="1076040" cy="570240"/>
+            <a:ext cx="1075680" cy="569880"/>
           </a:xfrm>
           <a:prstGeom prst="ellipse">
             <a:avLst/>
@@ -9083,7 +9084,7 @@
         <p:spPr>
           <a:xfrm>
             <a:off x="6839280" y="4752360"/>
-            <a:ext cx="1076040" cy="570240"/>
+            <a:ext cx="1075680" cy="569880"/>
           </a:xfrm>
           <a:prstGeom prst="ellipse">
             <a:avLst/>
@@ -9493,7 +9494,7 @@
         <p:spPr>
           <a:xfrm>
             <a:off x="2556000" y="1152000"/>
-            <a:ext cx="4532760" cy="356760"/>
+            <a:ext cx="4532400" cy="356400"/>
           </a:xfrm>
           <a:prstGeom prst="rect">
             <a:avLst/>
@@ -10343,7 +10344,7 @@
         <p:spPr>
           <a:xfrm>
             <a:off x="3492000" y="3541680"/>
-            <a:ext cx="3021840" cy="344160"/>
+            <a:ext cx="3021480" cy="343800"/>
           </a:xfrm>
           <a:prstGeom prst="rect">
             <a:avLst/>
@@ -10394,7 +10395,7 @@
         <p:spPr>
           <a:xfrm>
             <a:off x="144000" y="3564000"/>
-            <a:ext cx="3021840" cy="344160"/>
+            <a:ext cx="3021480" cy="343800"/>
           </a:xfrm>
           <a:prstGeom prst="rect">
             <a:avLst/>
@@ -10445,7 +10446,7 @@
         <p:spPr>
           <a:xfrm>
             <a:off x="7308000" y="3528000"/>
-            <a:ext cx="3021840" cy="344160"/>
+            <a:ext cx="3021480" cy="343800"/>
           </a:xfrm>
           <a:prstGeom prst="rect">
             <a:avLst/>
@@ -10898,7 +10899,7 @@
         <p:spPr>
           <a:xfrm>
             <a:off x="3492000" y="3541680"/>
-            <a:ext cx="3021840" cy="344160"/>
+            <a:ext cx="3021480" cy="343800"/>
           </a:xfrm>
           <a:prstGeom prst="rect">
             <a:avLst/>
@@ -10949,7 +10950,7 @@
         <p:spPr>
           <a:xfrm>
             <a:off x="144000" y="3564000"/>
-            <a:ext cx="3021840" cy="344160"/>
+            <a:ext cx="3021480" cy="343800"/>
           </a:xfrm>
           <a:prstGeom prst="rect">
             <a:avLst/>
@@ -11000,7 +11001,7 @@
         <p:spPr>
           <a:xfrm>
             <a:off x="7308000" y="3528000"/>
-            <a:ext cx="3021840" cy="344160"/>
+            <a:ext cx="3021480" cy="343800"/>
           </a:xfrm>
           <a:prstGeom prst="rect">
             <a:avLst/>
@@ -12029,7 +12030,7 @@
         <p:spPr>
           <a:xfrm>
             <a:off x="3456000" y="1008000"/>
-            <a:ext cx="3238200" cy="344520"/>
+            <a:ext cx="3237840" cy="344160"/>
           </a:xfrm>
           <a:prstGeom prst="rect">
             <a:avLst/>
@@ -12080,7 +12081,7 @@
         <p:spPr>
           <a:xfrm>
             <a:off x="648000" y="1836000"/>
-            <a:ext cx="3238200" cy="344520"/>
+            <a:ext cx="3237840" cy="344160"/>
           </a:xfrm>
           <a:prstGeom prst="rect">
             <a:avLst/>
@@ -12131,7 +12132,7 @@
         <p:spPr>
           <a:xfrm>
             <a:off x="5436000" y="2160000"/>
-            <a:ext cx="3238200" cy="344520"/>
+            <a:ext cx="3237840" cy="344160"/>
           </a:xfrm>
           <a:prstGeom prst="rect">
             <a:avLst/>
@@ -12209,7 +12210,7 @@
         <p:spPr>
           <a:xfrm>
             <a:off x="8676000" y="2988000"/>
-            <a:ext cx="1042200" cy="754200"/>
+            <a:ext cx="1041840" cy="753840"/>
           </a:xfrm>
           <a:prstGeom prst="rect">
             <a:avLst/>
@@ -12347,7 +12348,7 @@
         <p:spPr>
           <a:xfrm>
             <a:off x="2448000" y="4464000"/>
-            <a:ext cx="5830200" cy="754200"/>
+            <a:ext cx="5829840" cy="753840"/>
           </a:xfrm>
           <a:prstGeom prst="rect">
             <a:avLst/>
@@ -14209,7 +14210,7 @@
         <p:spPr>
           <a:xfrm>
             <a:off x="1728000" y="1741680"/>
-            <a:ext cx="1150560" cy="344880"/>
+            <a:ext cx="1150200" cy="344520"/>
           </a:xfrm>
           <a:prstGeom prst="rect">
             <a:avLst/>
@@ -14260,7 +14261,7 @@
         <p:spPr>
           <a:xfrm>
             <a:off x="6480000" y="648000"/>
-            <a:ext cx="1690560" cy="344880"/>
+            <a:ext cx="1690200" cy="344520"/>
           </a:xfrm>
           <a:prstGeom prst="rect">
             <a:avLst/>
@@ -14341,7 +14342,7 @@
         <p:spPr>
           <a:xfrm>
             <a:off x="1908000" y="936000"/>
-            <a:ext cx="1434240" cy="786240"/>
+            <a:ext cx="1433880" cy="785880"/>
           </a:xfrm>
           <a:prstGeom prst="rect">
             <a:avLst/>
@@ -14396,7 +14397,7 @@
         <p:spPr>
           <a:xfrm>
             <a:off x="6084000" y="936000"/>
-            <a:ext cx="1434240" cy="786240"/>
+            <a:ext cx="1433880" cy="785880"/>
           </a:xfrm>
           <a:prstGeom prst="rect">
             <a:avLst/>
@@ -14451,7 +14452,7 @@
         <p:spPr>
           <a:xfrm>
             <a:off x="1908000" y="4068000"/>
-            <a:ext cx="1434240" cy="786240"/>
+            <a:ext cx="1433880" cy="785880"/>
           </a:xfrm>
           <a:prstGeom prst="rect">
             <a:avLst/>
@@ -14506,7 +14507,7 @@
         <p:spPr>
           <a:xfrm>
             <a:off x="4032000" y="648000"/>
-            <a:ext cx="1434240" cy="1362240"/>
+            <a:ext cx="1433880" cy="1361880"/>
           </a:xfrm>
           <a:custGeom>
             <a:avLst/>
@@ -14604,7 +14605,7 @@
         <p:spPr>
           <a:xfrm>
             <a:off x="1872000" y="2232360"/>
-            <a:ext cx="1434240" cy="1362240"/>
+            <a:ext cx="1433880" cy="1361880"/>
           </a:xfrm>
           <a:custGeom>
             <a:avLst/>
@@ -14810,7 +14811,7 @@
         <p:spPr>
           <a:xfrm>
             <a:off x="5184000" y="2340000"/>
-            <a:ext cx="2010240" cy="570240"/>
+            <a:ext cx="2009880" cy="569880"/>
           </a:xfrm>
           <a:prstGeom prst="ellipse">
             <a:avLst/>
@@ -14865,7 +14866,7 @@
         <p:spPr>
           <a:xfrm>
             <a:off x="3960360" y="3240360"/>
-            <a:ext cx="2010240" cy="570240"/>
+            <a:ext cx="2009880" cy="569880"/>
           </a:xfrm>
           <a:prstGeom prst="ellipse">
             <a:avLst/>
@@ -15208,7 +15209,7 @@
         <p:spPr>
           <a:xfrm>
             <a:off x="144000" y="2057400"/>
-            <a:ext cx="2513520" cy="601200"/>
+            <a:ext cx="2513160" cy="600840"/>
           </a:xfrm>
           <a:prstGeom prst="rect">
             <a:avLst/>
@@ -15259,7 +15260,7 @@
         <p:spPr>
           <a:xfrm>
             <a:off x="3405600" y="976680"/>
-            <a:ext cx="2970720" cy="345240"/>
+            <a:ext cx="2970360" cy="344880"/>
           </a:xfrm>
           <a:prstGeom prst="rect">
             <a:avLst/>
@@ -15394,7 +15395,7 @@
         <p:spPr>
           <a:xfrm>
             <a:off x="457200" y="3742200"/>
-            <a:ext cx="2970720" cy="857160"/>
+            <a:ext cx="2970360" cy="856800"/>
           </a:xfrm>
           <a:prstGeom prst="rect">
             <a:avLst/>
@@ -15445,7 +15446,7 @@
         <p:spPr>
           <a:xfrm>
             <a:off x="3866400" y="3742200"/>
-            <a:ext cx="2533320" cy="1113120"/>
+            <a:ext cx="2532960" cy="1112760"/>
           </a:xfrm>
           <a:prstGeom prst="rect">
             <a:avLst/>
@@ -15496,7 +15497,7 @@
         <p:spPr>
           <a:xfrm>
             <a:off x="7086600" y="3706200"/>
-            <a:ext cx="2742120" cy="1093320"/>
+            <a:ext cx="2741760" cy="1092960"/>
           </a:xfrm>
           <a:prstGeom prst="rect">
             <a:avLst/>
@@ -15547,7 +15548,7 @@
         <p:spPr>
           <a:xfrm>
             <a:off x="7488360" y="2057760"/>
-            <a:ext cx="2513520" cy="345240"/>
+            <a:ext cx="2513160" cy="344880"/>
           </a:xfrm>
           <a:prstGeom prst="rect">
             <a:avLst/>
@@ -15909,7 +15910,7 @@
         <p:spPr>
           <a:xfrm>
             <a:off x="144000" y="2057400"/>
-            <a:ext cx="2513520" cy="601200"/>
+            <a:ext cx="2513160" cy="600840"/>
           </a:xfrm>
           <a:prstGeom prst="rect">
             <a:avLst/>
@@ -15960,7 +15961,7 @@
         <p:spPr>
           <a:xfrm>
             <a:off x="3405600" y="976680"/>
-            <a:ext cx="2970720" cy="345240"/>
+            <a:ext cx="2970360" cy="344880"/>
           </a:xfrm>
           <a:prstGeom prst="rect">
             <a:avLst/>
@@ -16095,7 +16096,7 @@
         <p:spPr>
           <a:xfrm>
             <a:off x="842400" y="3742200"/>
-            <a:ext cx="1696320" cy="1113120"/>
+            <a:ext cx="1695960" cy="1112760"/>
           </a:xfrm>
           <a:prstGeom prst="rect">
             <a:avLst/>
@@ -16146,7 +16147,7 @@
         <p:spPr>
           <a:xfrm>
             <a:off x="2822400" y="3742200"/>
-            <a:ext cx="2209320" cy="857160"/>
+            <a:ext cx="2208960" cy="856800"/>
           </a:xfrm>
           <a:prstGeom prst="rect">
             <a:avLst/>
@@ -16197,7 +16198,7 @@
         <p:spPr>
           <a:xfrm>
             <a:off x="7772400" y="3706200"/>
-            <a:ext cx="2056320" cy="636120"/>
+            <a:ext cx="2055960" cy="635760"/>
           </a:xfrm>
           <a:prstGeom prst="rect">
             <a:avLst/>
@@ -16248,7 +16249,7 @@
         <p:spPr>
           <a:xfrm>
             <a:off x="7488360" y="2057760"/>
-            <a:ext cx="2513520" cy="345240"/>
+            <a:ext cx="2513160" cy="344880"/>
           </a:xfrm>
           <a:prstGeom prst="rect">
             <a:avLst/>
@@ -16327,7 +16328,7 @@
         <p:spPr>
           <a:xfrm>
             <a:off x="5090400" y="3742200"/>
-            <a:ext cx="2209320" cy="857160"/>
+            <a:ext cx="2208960" cy="856800"/>
           </a:xfrm>
           <a:prstGeom prst="rect">
             <a:avLst/>
@@ -16408,7 +16409,7 @@
         <p:spPr>
           <a:xfrm>
             <a:off x="1564920" y="685800"/>
-            <a:ext cx="180000" cy="345600"/>
+            <a:ext cx="179640" cy="345240"/>
           </a:xfrm>
           <a:prstGeom prst="rect">
             <a:avLst/>
@@ -16434,7 +16435,7 @@
         <p:spPr>
           <a:xfrm>
             <a:off x="228600" y="228600"/>
-            <a:ext cx="1142280" cy="345600"/>
+            <a:ext cx="1141920" cy="345240"/>
           </a:xfrm>
           <a:prstGeom prst="rect">
             <a:avLst/>
@@ -16485,7 +16486,7 @@
         <p:spPr>
           <a:xfrm>
             <a:off x="169200" y="950400"/>
-            <a:ext cx="2056680" cy="456480"/>
+            <a:ext cx="2056320" cy="456120"/>
           </a:xfrm>
           <a:prstGeom prst="rect">
             <a:avLst/>
@@ -16898,7 +16899,7 @@
                       <a:noAutofit/>
                     </a:bodyPr>
                     <a:p>
-                      <a:pPr marL="216000" indent="-215280">
+                      <a:pPr marL="216000" indent="-214920">
                         <a:lnSpc>
                           <a:spcPct val="100000"/>
                         </a:lnSpc>
@@ -17221,7 +17222,7 @@
                       <a:noAutofit/>
                     </a:bodyPr>
                     <a:p>
-                      <a:pPr marL="216000" indent="-215280">
+                      <a:pPr marL="216000" indent="-214920">
                         <a:lnSpc>
                           <a:spcPct val="100000"/>
                         </a:lnSpc>
@@ -17701,7 +17702,7 @@
                       <a:noAutofit/>
                     </a:bodyPr>
                     <a:p>
-                      <a:pPr marL="216000" indent="-215280">
+                      <a:pPr marL="216000" indent="-214920">
                         <a:lnSpc>
                           <a:spcPct val="100000"/>
                         </a:lnSpc>
@@ -17997,7 +17998,7 @@
                       <a:noAutofit/>
                     </a:bodyPr>
                     <a:p>
-                      <a:pPr marL="216000" indent="-215280">
+                      <a:pPr marL="216000" indent="-214920">
                         <a:lnSpc>
                           <a:spcPct val="100000"/>
                         </a:lnSpc>
@@ -18265,7 +18266,7 @@
                       <a:noAutofit/>
                     </a:bodyPr>
                     <a:p>
-                      <a:pPr marL="216000" indent="-215280">
+                      <a:pPr marL="216000" indent="-214920">
                         <a:lnSpc>
                           <a:spcPct val="100000"/>
                         </a:lnSpc>
@@ -18504,7 +18505,7 @@
                       <a:noAutofit/>
                     </a:bodyPr>
                     <a:p>
-                      <a:pPr marL="216000" indent="-215280">
+                      <a:pPr marL="216000" indent="-214920">
                         <a:lnSpc>
                           <a:spcPct val="100000"/>
                         </a:lnSpc>
@@ -18650,7 +18651,7 @@
         <p:spPr>
           <a:xfrm>
             <a:off x="2057400" y="685800"/>
-            <a:ext cx="1142640" cy="345960"/>
+            <a:ext cx="1142280" cy="345600"/>
           </a:xfrm>
           <a:prstGeom prst="rect">
             <a:avLst/>
@@ -18678,7 +18679,11 @@
             </a:pPr>
             <a:r>
               <a:rPr b="0" lang="en-US" sz="1800" spc="-1" strike="noStrike">
+                <a:solidFill>
+                  <a:srgbClr val="000000"/>
+                </a:solidFill>
                 <a:latin typeface="Arial"/>
+                <a:ea typeface="DejaVu Sans"/>
               </a:rPr>
               <a:t>Insert 10</a:t>
             </a:r>
@@ -18697,7 +18702,7 @@
         <p:spPr>
           <a:xfrm>
             <a:off x="5670720" y="685800"/>
-            <a:ext cx="1142640" cy="345960"/>
+            <a:ext cx="1142280" cy="345600"/>
           </a:xfrm>
           <a:prstGeom prst="rect">
             <a:avLst/>
@@ -18725,6 +18730,9 @@
             </a:pPr>
             <a:r>
               <a:rPr b="0" lang="en-US" sz="1800" spc="-1" strike="noStrike">
+                <a:solidFill>
+                  <a:srgbClr val="000000"/>
+                </a:solidFill>
                 <a:latin typeface="Arial"/>
                 <a:ea typeface="Noto Sans"/>
               </a:rPr>
@@ -18745,7 +18753,7 @@
         <p:spPr>
           <a:xfrm>
             <a:off x="8229600" y="2168280"/>
-            <a:ext cx="1142640" cy="345960"/>
+            <a:ext cx="1142280" cy="345600"/>
           </a:xfrm>
           <a:prstGeom prst="rect">
             <a:avLst/>
@@ -18773,6 +18781,9 @@
             </a:pPr>
             <a:r>
               <a:rPr b="0" lang="en-US" sz="1800" spc="-1" strike="noStrike">
+                <a:solidFill>
+                  <a:srgbClr val="000000"/>
+                </a:solidFill>
                 <a:latin typeface="Arial"/>
                 <a:ea typeface="Noto Sans"/>
               </a:rPr>
@@ -18793,7 +18804,7 @@
         <p:spPr>
           <a:xfrm>
             <a:off x="4572000" y="3311280"/>
-            <a:ext cx="1142640" cy="345960"/>
+            <a:ext cx="1142280" cy="345600"/>
           </a:xfrm>
           <a:prstGeom prst="rect">
             <a:avLst/>
@@ -18821,6 +18832,9 @@
             </a:pPr>
             <a:r>
               <a:rPr b="0" lang="en-US" sz="1800" spc="-1" strike="noStrike">
+                <a:solidFill>
+                  <a:srgbClr val="000000"/>
+                </a:solidFill>
                 <a:latin typeface="Arial"/>
                 <a:ea typeface="Noto Sans"/>
               </a:rPr>
@@ -18927,7 +18941,7 @@
         <p:spPr>
           <a:xfrm>
             <a:off x="1564920" y="685800"/>
-            <a:ext cx="180000" cy="345600"/>
+            <a:ext cx="179640" cy="345240"/>
           </a:xfrm>
           <a:prstGeom prst="rect">
             <a:avLst/>
@@ -18953,7 +18967,7 @@
         <p:spPr>
           <a:xfrm>
             <a:off x="228600" y="228600"/>
-            <a:ext cx="1142280" cy="345600"/>
+            <a:ext cx="1141920" cy="345240"/>
           </a:xfrm>
           <a:prstGeom prst="rect">
             <a:avLst/>
@@ -19126,7 +19140,7 @@
                       <a:noAutofit/>
                     </a:bodyPr>
                     <a:p>
-                      <a:pPr marL="216000" indent="-215280">
+                      <a:pPr marL="216000" indent="-214920">
                         <a:lnSpc>
                           <a:spcPct val="100000"/>
                         </a:lnSpc>
@@ -19606,7 +19620,7 @@
                       <a:noAutofit/>
                     </a:bodyPr>
                     <a:p>
-                      <a:pPr marL="216000" indent="-215280">
+                      <a:pPr marL="216000" indent="-214920">
                         <a:lnSpc>
                           <a:spcPct val="100000"/>
                         </a:lnSpc>
@@ -19874,7 +19888,7 @@
                       <a:noAutofit/>
                     </a:bodyPr>
                     <a:p>
-                      <a:pPr marL="216000" indent="-215280">
+                      <a:pPr marL="216000" indent="-214920">
                         <a:lnSpc>
                           <a:spcPct val="100000"/>
                         </a:lnSpc>
@@ -20142,7 +20156,7 @@
                       <a:noAutofit/>
                     </a:bodyPr>
                     <a:p>
-                      <a:pPr marL="216000" indent="-215280">
+                      <a:pPr marL="216000" indent="-214920">
                         <a:lnSpc>
                           <a:spcPct val="100000"/>
                         </a:lnSpc>
@@ -20381,7 +20395,7 @@
                       <a:noAutofit/>
                     </a:bodyPr>
                     <a:p>
-                      <a:pPr marL="216000" indent="-215280">
+                      <a:pPr marL="216000" indent="-214920">
                         <a:lnSpc>
                           <a:spcPct val="100000"/>
                         </a:lnSpc>
@@ -20649,7 +20663,7 @@
                       <a:noAutofit/>
                     </a:bodyPr>
                     <a:p>
-                      <a:pPr marL="216000" indent="-215280">
+                      <a:pPr marL="216000" indent="-214920">
                         <a:lnSpc>
                           <a:spcPct val="100000"/>
                         </a:lnSpc>
@@ -20823,7 +20837,7 @@
         <p:spPr>
           <a:xfrm>
             <a:off x="6436080" y="1371600"/>
-            <a:ext cx="1142640" cy="345960"/>
+            <a:ext cx="1142280" cy="345600"/>
           </a:xfrm>
           <a:prstGeom prst="rect">
             <a:avLst/>
@@ -20851,6 +20865,9 @@
             </a:pPr>
             <a:r>
               <a:rPr b="0" lang="en-US" sz="1800" spc="-1" strike="noStrike">
+                <a:solidFill>
+                  <a:srgbClr val="000000"/>
+                </a:solidFill>
                 <a:latin typeface="Arial"/>
                 <a:ea typeface="Noto Sans"/>
               </a:rPr>
@@ -20985,7 +21002,7 @@
         <p:spPr>
           <a:xfrm>
             <a:off x="1564920" y="685800"/>
-            <a:ext cx="180000" cy="345600"/>
+            <a:ext cx="179640" cy="345240"/>
           </a:xfrm>
           <a:prstGeom prst="rect">
             <a:avLst/>
@@ -21011,7 +21028,7 @@
         <p:spPr>
           <a:xfrm>
             <a:off x="228600" y="228600"/>
-            <a:ext cx="1142280" cy="345600"/>
+            <a:ext cx="1141920" cy="345240"/>
           </a:xfrm>
           <a:prstGeom prst="rect">
             <a:avLst/>
@@ -21184,7 +21201,7 @@
                       <a:noAutofit/>
                     </a:bodyPr>
                     <a:p>
-                      <a:pPr marL="216000" indent="-215280">
+                      <a:pPr marL="216000" indent="-214920">
                         <a:lnSpc>
                           <a:spcPct val="100000"/>
                         </a:lnSpc>
@@ -21664,7 +21681,7 @@
                       <a:noAutofit/>
                     </a:bodyPr>
                     <a:p>
-                      <a:pPr marL="216000" indent="-215280">
+                      <a:pPr marL="216000" indent="-214920">
                         <a:lnSpc>
                           <a:spcPct val="100000"/>
                         </a:lnSpc>
@@ -21932,7 +21949,7 @@
                       <a:noAutofit/>
                     </a:bodyPr>
                     <a:p>
-                      <a:pPr marL="216000" indent="-215280">
+                      <a:pPr marL="216000" indent="-214920">
                         <a:lnSpc>
                           <a:spcPct val="100000"/>
                         </a:lnSpc>
@@ -22078,7 +22095,7 @@
         <p:spPr>
           <a:xfrm>
             <a:off x="799920" y="4158720"/>
-            <a:ext cx="180000" cy="426600"/>
+            <a:ext cx="179640" cy="426240"/>
           </a:xfrm>
           <a:prstGeom prst="rect">
             <a:avLst/>
@@ -22226,7 +22243,7 @@
                       <a:noAutofit/>
                     </a:bodyPr>
                     <a:p>
-                      <a:pPr marL="216000" indent="-215280">
+                      <a:pPr marL="216000" indent="-214920">
                         <a:lnSpc>
                           <a:spcPct val="100000"/>
                         </a:lnSpc>
@@ -22678,7 +22695,7 @@
                       <a:noAutofit/>
                     </a:bodyPr>
                     <a:p>
-                      <a:pPr marL="216000" indent="-215280">
+                      <a:pPr marL="216000" indent="-214920">
                         <a:lnSpc>
                           <a:spcPct val="100000"/>
                         </a:lnSpc>
@@ -22946,7 +22963,7 @@
                       <a:noAutofit/>
                     </a:bodyPr>
                     <a:p>
-                      <a:pPr marL="216000" indent="-215280">
+                      <a:pPr marL="216000" indent="-214920">
                         <a:lnSpc>
                           <a:spcPct val="100000"/>
                         </a:lnSpc>
@@ -23698,7 +23715,7 @@
         <p:spPr>
           <a:xfrm>
             <a:off x="5257800" y="2625480"/>
-            <a:ext cx="1142640" cy="345960"/>
+            <a:ext cx="1142280" cy="345600"/>
           </a:xfrm>
           <a:prstGeom prst="rect">
             <a:avLst/>
@@ -23726,6 +23743,9 @@
             </a:pPr>
             <a:r>
               <a:rPr b="0" lang="en-US" sz="1800" spc="-1" strike="noStrike">
+                <a:solidFill>
+                  <a:srgbClr val="000000"/>
+                </a:solidFill>
                 <a:latin typeface="Arial"/>
                 <a:ea typeface="Noto Sans"/>
               </a:rPr>
@@ -23859,6 +23879,479 @@
           <a:xfrm>
             <a:off x="7610040" y="5283360"/>
             <a:ext cx="457200" cy="0"/>
+          </a:xfrm>
+          <a:prstGeom prst="line">
+            <a:avLst/>
+          </a:prstGeom>
+          <a:ln w="0">
+            <a:solidFill>
+              <a:srgbClr val="3465a4"/>
+            </a:solidFill>
+            <a:tailEnd len="med" type="triangle" w="med"/>
+          </a:ln>
+        </p:spPr>
+        <p:style>
+          <a:lnRef idx="0"/>
+          <a:fillRef idx="0"/>
+          <a:effectRef idx="0"/>
+          <a:fontRef idx="minor"/>
+        </p:style>
+      </p:sp>
+    </p:spTree>
+  </p:cSld>
+  <mc:AlternateContent>
+    <mc:Choice Requires="p14">
+      <p:transition spd="slow" p14:dur="2000"/>
+    </mc:Choice>
+    <mc:Fallback>
+      <p:transition spd="slow"/>
+    </mc:Fallback>
+  </mc:AlternateContent>
+</p:sld>
+</file>
+
+<file path=ppt/slides/slide25.xml><?xml version="1.0" encoding="utf-8"?>
+<p:sld xmlns:a="http://schemas.openxmlformats.org/drawingml/2006/main" xmlns:p="http://schemas.openxmlformats.org/presentationml/2006/main" xmlns:r="http://schemas.openxmlformats.org/officeDocument/2006/relationships" xmlns:p14="http://schemas.microsoft.com/office/powerpoint/2010/main" xmlns:p15="http://schemas.microsoft.com/office/powerpoint/2012/main" xmlns:mc="http://schemas.openxmlformats.org/markup-compatibility/2006">
+  <p:cSld>
+    <p:spTree>
+      <p:nvGrpSpPr>
+        <p:cNvPr id="1" name=""/>
+        <p:cNvGrpSpPr/>
+        <p:nvPr/>
+      </p:nvGrpSpPr>
+      <p:grpSpPr>
+        <a:xfrm>
+          <a:off x="0" y="0"/>
+          <a:ext cx="0" cy="0"/>
+          <a:chOff x="0" y="0"/>
+          <a:chExt cx="0" cy="0"/>
+        </a:xfrm>
+      </p:grpSpPr>
+      <p:sp>
+        <p:nvSpPr>
+          <p:cNvPr id="478" name="TextShape 1"/>
+          <p:cNvSpPr txBox="1"/>
+          <p:nvPr/>
+        </p:nvSpPr>
+        <p:spPr>
+          <a:xfrm>
+            <a:off x="685800" y="685800"/>
+            <a:ext cx="4114800" cy="346320"/>
+          </a:xfrm>
+          <a:prstGeom prst="rect">
+            <a:avLst/>
+          </a:prstGeom>
+          <a:noFill/>
+          <a:ln w="0">
+            <a:noFill/>
+          </a:ln>
+        </p:spPr>
+        <p:txBody>
+          <a:bodyPr lIns="90000" rIns="90000" tIns="45000" bIns="45000">
+            <a:noAutofit/>
+          </a:bodyPr>
+          <a:p>
+            <a:r>
+              <a:rPr b="0" lang="en-US" sz="1800" spc="-1" strike="noStrike">
+                <a:latin typeface="Arial"/>
+              </a:rPr>
+              <a:t>State Diagram of a Transaction:</a:t>
+            </a:r>
+            <a:endParaRPr b="0" lang="en-US" sz="1800" spc="-1" strike="noStrike">
+              <a:latin typeface="Arial"/>
+            </a:endParaRPr>
+          </a:p>
+        </p:txBody>
+      </p:sp>
+      <p:sp>
+        <p:nvSpPr>
+          <p:cNvPr id="479" name="CustomShape 2"/>
+          <p:cNvSpPr/>
+          <p:nvPr/>
+        </p:nvSpPr>
+        <p:spPr>
+          <a:xfrm>
+            <a:off x="3988800" y="1636200"/>
+            <a:ext cx="914400" cy="914400"/>
+          </a:xfrm>
+          <a:prstGeom prst="ellipse">
+            <a:avLst/>
+          </a:prstGeom>
+          <a:solidFill>
+            <a:srgbClr val="729fcf"/>
+          </a:solidFill>
+          <a:ln w="0">
+            <a:solidFill>
+              <a:srgbClr val="3465a4"/>
+            </a:solidFill>
+          </a:ln>
+        </p:spPr>
+        <p:style>
+          <a:lnRef idx="0"/>
+          <a:fillRef idx="0"/>
+          <a:effectRef idx="0"/>
+          <a:fontRef idx="minor"/>
+        </p:style>
+        <p:txBody>
+          <a:bodyPr wrap="none" lIns="90000" rIns="90000" tIns="45000" bIns="45000" anchor="ctr">
+            <a:noAutofit/>
+          </a:bodyPr>
+          <a:p>
+            <a:pPr algn="ctr"/>
+            <a:r>
+              <a:rPr b="0" lang="en-US" sz="1800" spc="-1" strike="noStrike">
+                <a:latin typeface="Arial"/>
+              </a:rPr>
+              <a:t>Partially</a:t>
+            </a:r>
+            <a:endParaRPr b="0" lang="en-US" sz="1800" spc="-1" strike="noStrike">
+              <a:latin typeface="Arial"/>
+            </a:endParaRPr>
+          </a:p>
+          <a:p>
+            <a:pPr algn="ctr"/>
+            <a:r>
+              <a:rPr b="0" lang="en-US" sz="1800" spc="-1" strike="noStrike">
+                <a:latin typeface="Arial"/>
+              </a:rPr>
+              <a:t>Committed</a:t>
+            </a:r>
+            <a:endParaRPr b="0" lang="en-US" sz="1800" spc="-1" strike="noStrike">
+              <a:latin typeface="Arial"/>
+            </a:endParaRPr>
+          </a:p>
+        </p:txBody>
+      </p:sp>
+      <p:sp>
+        <p:nvSpPr>
+          <p:cNvPr id="480" name="CustomShape 3"/>
+          <p:cNvSpPr/>
+          <p:nvPr/>
+        </p:nvSpPr>
+        <p:spPr>
+          <a:xfrm>
+            <a:off x="6841440" y="1622160"/>
+            <a:ext cx="914400" cy="914400"/>
+          </a:xfrm>
+          <a:prstGeom prst="ellipse">
+            <a:avLst/>
+          </a:prstGeom>
+          <a:solidFill>
+            <a:srgbClr val="729fcf"/>
+          </a:solidFill>
+          <a:ln w="0">
+            <a:solidFill>
+              <a:srgbClr val="3465a4"/>
+            </a:solidFill>
+          </a:ln>
+        </p:spPr>
+        <p:style>
+          <a:lnRef idx="0"/>
+          <a:fillRef idx="0"/>
+          <a:effectRef idx="0"/>
+          <a:fontRef idx="minor"/>
+        </p:style>
+        <p:txBody>
+          <a:bodyPr wrap="none" lIns="90000" rIns="90000" tIns="45000" bIns="45000" anchor="ctr">
+            <a:noAutofit/>
+          </a:bodyPr>
+          <a:p>
+            <a:pPr algn="ctr">
+              <a:lnSpc>
+                <a:spcPct val="100000"/>
+              </a:lnSpc>
+            </a:pPr>
+            <a:r>
+              <a:rPr b="0" lang="en-US" sz="1800" spc="-1" strike="noStrike">
+                <a:latin typeface="Arial"/>
+              </a:rPr>
+              <a:t>Committed</a:t>
+            </a:r>
+            <a:endParaRPr b="0" lang="en-US" sz="1800" spc="-1" strike="noStrike">
+              <a:latin typeface="Arial"/>
+              <a:ea typeface="Noto Sans"/>
+            </a:endParaRPr>
+          </a:p>
+        </p:txBody>
+      </p:sp>
+      <p:sp>
+        <p:nvSpPr>
+          <p:cNvPr id="481" name="CustomShape 4"/>
+          <p:cNvSpPr/>
+          <p:nvPr/>
+        </p:nvSpPr>
+        <p:spPr>
+          <a:xfrm>
+            <a:off x="1945440" y="2594160"/>
+            <a:ext cx="914400" cy="914400"/>
+          </a:xfrm>
+          <a:prstGeom prst="ellipse">
+            <a:avLst/>
+          </a:prstGeom>
+          <a:solidFill>
+            <a:srgbClr val="729fcf"/>
+          </a:solidFill>
+          <a:ln w="0">
+            <a:solidFill>
+              <a:srgbClr val="3465a4"/>
+            </a:solidFill>
+          </a:ln>
+        </p:spPr>
+        <p:style>
+          <a:lnRef idx="0"/>
+          <a:fillRef idx="0"/>
+          <a:effectRef idx="0"/>
+          <a:fontRef idx="minor"/>
+        </p:style>
+        <p:txBody>
+          <a:bodyPr wrap="none" lIns="90000" rIns="90000" tIns="45000" bIns="45000" anchor="ctr">
+            <a:noAutofit/>
+          </a:bodyPr>
+          <a:p>
+            <a:pPr algn="ctr">
+              <a:lnSpc>
+                <a:spcPct val="100000"/>
+              </a:lnSpc>
+            </a:pPr>
+            <a:r>
+              <a:rPr b="0" lang="en-US" sz="1800" spc="-1" strike="noStrike">
+                <a:latin typeface="Arial"/>
+              </a:rPr>
+              <a:t>Active</a:t>
+            </a:r>
+            <a:endParaRPr b="0" lang="en-US" sz="1800" spc="-1" strike="noStrike">
+              <a:latin typeface="Arial"/>
+              <a:ea typeface="Noto Sans"/>
+            </a:endParaRPr>
+          </a:p>
+        </p:txBody>
+      </p:sp>
+      <p:sp>
+        <p:nvSpPr>
+          <p:cNvPr id="482" name="CustomShape 5"/>
+          <p:cNvSpPr/>
+          <p:nvPr/>
+        </p:nvSpPr>
+        <p:spPr>
+          <a:xfrm>
+            <a:off x="6877440" y="3638160"/>
+            <a:ext cx="914400" cy="914400"/>
+          </a:xfrm>
+          <a:prstGeom prst="ellipse">
+            <a:avLst/>
+          </a:prstGeom>
+          <a:solidFill>
+            <a:srgbClr val="729fcf"/>
+          </a:solidFill>
+          <a:ln w="0">
+            <a:solidFill>
+              <a:srgbClr val="3465a4"/>
+            </a:solidFill>
+          </a:ln>
+        </p:spPr>
+        <p:style>
+          <a:lnRef idx="0"/>
+          <a:fillRef idx="0"/>
+          <a:effectRef idx="0"/>
+          <a:fontRef idx="minor"/>
+        </p:style>
+        <p:txBody>
+          <a:bodyPr wrap="none" lIns="90000" rIns="90000" tIns="45000" bIns="45000" anchor="ctr">
+            <a:noAutofit/>
+          </a:bodyPr>
+          <a:p>
+            <a:pPr algn="ctr">
+              <a:lnSpc>
+                <a:spcPct val="100000"/>
+              </a:lnSpc>
+            </a:pPr>
+            <a:r>
+              <a:rPr b="0" lang="en-US" sz="1800" spc="-1" strike="noStrike">
+                <a:latin typeface="Arial"/>
+              </a:rPr>
+              <a:t>Aborted</a:t>
+            </a:r>
+            <a:endParaRPr b="0" lang="en-US" sz="1800" spc="-1" strike="noStrike">
+              <a:latin typeface="Arial"/>
+              <a:ea typeface="Noto Sans"/>
+            </a:endParaRPr>
+          </a:p>
+        </p:txBody>
+      </p:sp>
+      <p:sp>
+        <p:nvSpPr>
+          <p:cNvPr id="483" name="CustomShape 6"/>
+          <p:cNvSpPr/>
+          <p:nvPr/>
+        </p:nvSpPr>
+        <p:spPr>
+          <a:xfrm>
+            <a:off x="3997440" y="3638160"/>
+            <a:ext cx="914400" cy="914400"/>
+          </a:xfrm>
+          <a:prstGeom prst="ellipse">
+            <a:avLst/>
+          </a:prstGeom>
+          <a:solidFill>
+            <a:srgbClr val="729fcf"/>
+          </a:solidFill>
+          <a:ln w="0">
+            <a:solidFill>
+              <a:srgbClr val="3465a4"/>
+            </a:solidFill>
+          </a:ln>
+        </p:spPr>
+        <p:style>
+          <a:lnRef idx="0"/>
+          <a:fillRef idx="0"/>
+          <a:effectRef idx="0"/>
+          <a:fontRef idx="minor"/>
+        </p:style>
+        <p:txBody>
+          <a:bodyPr wrap="none" lIns="90000" rIns="90000" tIns="45000" bIns="45000" anchor="ctr">
+            <a:noAutofit/>
+          </a:bodyPr>
+          <a:p>
+            <a:pPr algn="ctr">
+              <a:lnSpc>
+                <a:spcPct val="100000"/>
+              </a:lnSpc>
+            </a:pPr>
+            <a:r>
+              <a:rPr b="0" lang="en-US" sz="1800" spc="-1" strike="noStrike">
+                <a:latin typeface="Arial"/>
+              </a:rPr>
+              <a:t>Failed</a:t>
+            </a:r>
+            <a:endParaRPr b="0" lang="en-US" sz="1800" spc="-1" strike="noStrike">
+              <a:latin typeface="Arial"/>
+              <a:ea typeface="Noto Sans"/>
+            </a:endParaRPr>
+          </a:p>
+        </p:txBody>
+      </p:sp>
+      <p:sp>
+        <p:nvSpPr>
+          <p:cNvPr id="484" name="Line 7"/>
+          <p:cNvSpPr/>
+          <p:nvPr/>
+        </p:nvSpPr>
+        <p:spPr>
+          <a:xfrm flipV="1">
+            <a:off x="2743200" y="2057400"/>
+            <a:ext cx="1245600" cy="685800"/>
+          </a:xfrm>
+          <a:prstGeom prst="line">
+            <a:avLst/>
+          </a:prstGeom>
+          <a:ln w="0">
+            <a:solidFill>
+              <a:srgbClr val="3465a4"/>
+            </a:solidFill>
+            <a:tailEnd len="med" type="triangle" w="med"/>
+          </a:ln>
+        </p:spPr>
+        <p:style>
+          <a:lnRef idx="0"/>
+          <a:fillRef idx="0"/>
+          <a:effectRef idx="0"/>
+          <a:fontRef idx="minor"/>
+        </p:style>
+      </p:sp>
+      <p:sp>
+        <p:nvSpPr>
+          <p:cNvPr id="485" name="Line 8"/>
+          <p:cNvSpPr/>
+          <p:nvPr/>
+        </p:nvSpPr>
+        <p:spPr>
+          <a:xfrm>
+            <a:off x="2743200" y="3357000"/>
+            <a:ext cx="1254240" cy="685800"/>
+          </a:xfrm>
+          <a:prstGeom prst="line">
+            <a:avLst/>
+          </a:prstGeom>
+          <a:ln w="0">
+            <a:solidFill>
+              <a:srgbClr val="3465a4"/>
+            </a:solidFill>
+            <a:tailEnd len="med" type="triangle" w="med"/>
+          </a:ln>
+        </p:spPr>
+        <p:style>
+          <a:lnRef idx="0"/>
+          <a:fillRef idx="0"/>
+          <a:effectRef idx="0"/>
+          <a:fontRef idx="minor"/>
+        </p:style>
+      </p:sp>
+      <p:sp>
+        <p:nvSpPr>
+          <p:cNvPr id="486" name="Line 9"/>
+          <p:cNvSpPr/>
+          <p:nvPr/>
+        </p:nvSpPr>
+        <p:spPr>
+          <a:xfrm>
+            <a:off x="4451400" y="2550600"/>
+            <a:ext cx="0" cy="1087560"/>
+          </a:xfrm>
+          <a:prstGeom prst="line">
+            <a:avLst/>
+          </a:prstGeom>
+          <a:ln w="0">
+            <a:solidFill>
+              <a:srgbClr val="3465a4"/>
+            </a:solidFill>
+            <a:tailEnd len="med" type="triangle" w="med"/>
+          </a:ln>
+        </p:spPr>
+        <p:style>
+          <a:lnRef idx="0"/>
+          <a:fillRef idx="0"/>
+          <a:effectRef idx="0"/>
+          <a:fontRef idx="minor"/>
+        </p:style>
+      </p:sp>
+      <p:sp>
+        <p:nvSpPr>
+          <p:cNvPr id="487" name="Line 10"/>
+          <p:cNvSpPr/>
+          <p:nvPr/>
+        </p:nvSpPr>
+        <p:spPr>
+          <a:xfrm>
+            <a:off x="4903200" y="2057400"/>
+            <a:ext cx="1938240" cy="0"/>
+          </a:xfrm>
+          <a:prstGeom prst="line">
+            <a:avLst/>
+          </a:prstGeom>
+          <a:ln w="0">
+            <a:solidFill>
+              <a:srgbClr val="3465a4"/>
+            </a:solidFill>
+            <a:tailEnd len="med" type="triangle" w="med"/>
+          </a:ln>
+        </p:spPr>
+        <p:style>
+          <a:lnRef idx="0"/>
+          <a:fillRef idx="0"/>
+          <a:effectRef idx="0"/>
+          <a:fontRef idx="minor"/>
+        </p:style>
+      </p:sp>
+      <p:sp>
+        <p:nvSpPr>
+          <p:cNvPr id="488" name="Line 11"/>
+          <p:cNvSpPr/>
+          <p:nvPr/>
+        </p:nvSpPr>
+        <p:spPr>
+          <a:xfrm>
+            <a:off x="4925520" y="4095360"/>
+            <a:ext cx="1938240" cy="0"/>
           </a:xfrm>
           <a:prstGeom prst="line">
             <a:avLst/>
@@ -23916,7 +24409,7 @@
         <p:spPr>
           <a:xfrm>
             <a:off x="3060000" y="2268000"/>
-            <a:ext cx="1434240" cy="786240"/>
+            <a:ext cx="1433880" cy="785880"/>
           </a:xfrm>
           <a:prstGeom prst="rect">
             <a:avLst/>
@@ -23971,7 +24464,7 @@
         <p:spPr>
           <a:xfrm>
             <a:off x="5832000" y="1980000"/>
-            <a:ext cx="1434240" cy="1362240"/>
+            <a:ext cx="1433880" cy="1361880"/>
           </a:xfrm>
           <a:custGeom>
             <a:avLst/>
@@ -24123,7 +24616,7 @@
         <p:spPr>
           <a:xfrm>
             <a:off x="2376000" y="1044000"/>
-            <a:ext cx="1146240" cy="678240"/>
+            <a:ext cx="1145880" cy="677880"/>
           </a:xfrm>
           <a:prstGeom prst="ellipse">
             <a:avLst/>
@@ -24178,7 +24671,7 @@
         <p:spPr>
           <a:xfrm>
             <a:off x="3780360" y="1044360"/>
-            <a:ext cx="1146240" cy="678240"/>
+            <a:ext cx="1145880" cy="677880"/>
           </a:xfrm>
           <a:prstGeom prst="ellipse">
             <a:avLst/>
@@ -24233,7 +24726,7 @@
         <p:spPr>
           <a:xfrm>
             <a:off x="2376360" y="1044360"/>
-            <a:ext cx="1146240" cy="678240"/>
+            <a:ext cx="1145880" cy="677880"/>
           </a:xfrm>
           <a:prstGeom prst="ellipse">
             <a:avLst/>
@@ -24288,7 +24781,7 @@
         <p:spPr>
           <a:xfrm>
             <a:off x="1512720" y="2160720"/>
-            <a:ext cx="1146240" cy="678240"/>
+            <a:ext cx="1145880" cy="677880"/>
           </a:xfrm>
           <a:prstGeom prst="ellipse">
             <a:avLst/>
@@ -24424,7 +24917,7 @@
         <p:spPr>
           <a:xfrm>
             <a:off x="4500000" y="2376000"/>
-            <a:ext cx="1398240" cy="596520"/>
+            <a:ext cx="1397880" cy="596160"/>
           </a:xfrm>
           <a:prstGeom prst="rect">
             <a:avLst/>
@@ -24475,7 +24968,7 @@
         <p:spPr>
           <a:xfrm>
             <a:off x="4320000" y="3204360"/>
-            <a:ext cx="1398240" cy="596520"/>
+            <a:ext cx="1397880" cy="596160"/>
           </a:xfrm>
           <a:prstGeom prst="rect">
             <a:avLst/>
@@ -24556,7 +25049,7 @@
         <p:spPr>
           <a:xfrm>
             <a:off x="504000" y="576000"/>
-            <a:ext cx="426600" cy="1650600"/>
+            <a:ext cx="426240" cy="1650240"/>
           </a:xfrm>
           <a:prstGeom prst="ellipse">
             <a:avLst/>
@@ -24586,7 +25079,7 @@
         <p:spPr>
           <a:xfrm>
             <a:off x="1440360" y="576360"/>
-            <a:ext cx="426600" cy="1650600"/>
+            <a:ext cx="426240" cy="1650240"/>
           </a:xfrm>
           <a:prstGeom prst="ellipse">
             <a:avLst/>
@@ -24616,7 +25109,7 @@
         <p:spPr>
           <a:xfrm>
             <a:off x="3204720" y="612720"/>
-            <a:ext cx="426600" cy="1650600"/>
+            <a:ext cx="426240" cy="1650240"/>
           </a:xfrm>
           <a:prstGeom prst="ellipse">
             <a:avLst/>
@@ -24646,7 +25139,7 @@
         <p:spPr>
           <a:xfrm>
             <a:off x="4068720" y="576720"/>
-            <a:ext cx="426600" cy="1650600"/>
+            <a:ext cx="426240" cy="1650240"/>
           </a:xfrm>
           <a:prstGeom prst="ellipse">
             <a:avLst/>
@@ -24676,7 +25169,7 @@
         <p:spPr>
           <a:xfrm>
             <a:off x="504720" y="3204720"/>
-            <a:ext cx="426600" cy="1650600"/>
+            <a:ext cx="426240" cy="1650240"/>
           </a:xfrm>
           <a:prstGeom prst="ellipse">
             <a:avLst/>
@@ -24706,7 +25199,7 @@
         <p:spPr>
           <a:xfrm>
             <a:off x="1440720" y="3168720"/>
-            <a:ext cx="426600" cy="1650600"/>
+            <a:ext cx="426240" cy="1650240"/>
           </a:xfrm>
           <a:prstGeom prst="ellipse">
             <a:avLst/>
@@ -24736,7 +25229,7 @@
         <p:spPr>
           <a:xfrm>
             <a:off x="3240720" y="3168720"/>
-            <a:ext cx="426600" cy="1650600"/>
+            <a:ext cx="426240" cy="1650240"/>
           </a:xfrm>
           <a:prstGeom prst="ellipse">
             <a:avLst/>
@@ -24766,7 +25259,7 @@
         <p:spPr>
           <a:xfrm>
             <a:off x="4068720" y="3168720"/>
-            <a:ext cx="426600" cy="1650600"/>
+            <a:ext cx="426240" cy="1650240"/>
           </a:xfrm>
           <a:prstGeom prst="ellipse">
             <a:avLst/>
@@ -24796,7 +25289,7 @@
         <p:spPr>
           <a:xfrm>
             <a:off x="540000" y="936000"/>
-            <a:ext cx="498600" cy="340920"/>
+            <a:ext cx="498240" cy="340560"/>
           </a:xfrm>
           <a:prstGeom prst="rect">
             <a:avLst/>
@@ -24847,7 +25340,7 @@
         <p:spPr>
           <a:xfrm>
             <a:off x="540000" y="1512000"/>
-            <a:ext cx="498600" cy="340920"/>
+            <a:ext cx="498240" cy="340560"/>
           </a:xfrm>
           <a:prstGeom prst="rect">
             <a:avLst/>
@@ -24898,7 +25391,7 @@
         <p:spPr>
           <a:xfrm>
             <a:off x="1512000" y="1512000"/>
-            <a:ext cx="498600" cy="340920"/>
+            <a:ext cx="498240" cy="340560"/>
           </a:xfrm>
           <a:prstGeom prst="rect">
             <a:avLst/>
@@ -24949,7 +25442,7 @@
         <p:spPr>
           <a:xfrm>
             <a:off x="1512000" y="900000"/>
-            <a:ext cx="498600" cy="340920"/>
+            <a:ext cx="498240" cy="340560"/>
           </a:xfrm>
           <a:prstGeom prst="rect">
             <a:avLst/>
@@ -25000,7 +25493,7 @@
         <p:spPr>
           <a:xfrm>
             <a:off x="540000" y="1260000"/>
-            <a:ext cx="498600" cy="340920"/>
+            <a:ext cx="498240" cy="340560"/>
           </a:xfrm>
           <a:prstGeom prst="rect">
             <a:avLst/>
@@ -25051,7 +25544,7 @@
         <p:spPr>
           <a:xfrm>
             <a:off x="1512000" y="1224000"/>
-            <a:ext cx="498600" cy="340920"/>
+            <a:ext cx="498240" cy="340560"/>
           </a:xfrm>
           <a:prstGeom prst="rect">
             <a:avLst/>
@@ -25102,7 +25595,7 @@
         <p:spPr>
           <a:xfrm>
             <a:off x="3240000" y="900000"/>
-            <a:ext cx="498600" cy="340920"/>
+            <a:ext cx="498240" cy="340560"/>
           </a:xfrm>
           <a:prstGeom prst="rect">
             <a:avLst/>
@@ -25153,7 +25646,7 @@
         <p:spPr>
           <a:xfrm>
             <a:off x="4104000" y="900000"/>
-            <a:ext cx="498600" cy="340920"/>
+            <a:ext cx="498240" cy="340560"/>
           </a:xfrm>
           <a:prstGeom prst="rect">
             <a:avLst/>
@@ -25204,7 +25697,7 @@
         <p:spPr>
           <a:xfrm>
             <a:off x="4104000" y="1224000"/>
-            <a:ext cx="498600" cy="340920"/>
+            <a:ext cx="498240" cy="340560"/>
           </a:xfrm>
           <a:prstGeom prst="rect">
             <a:avLst/>
@@ -25255,7 +25748,7 @@
         <p:spPr>
           <a:xfrm>
             <a:off x="4104000" y="1620000"/>
-            <a:ext cx="498600" cy="340920"/>
+            <a:ext cx="498240" cy="340560"/>
           </a:xfrm>
           <a:prstGeom prst="rect">
             <a:avLst/>
@@ -25306,7 +25799,7 @@
         <p:spPr>
           <a:xfrm>
             <a:off x="576000" y="3492000"/>
-            <a:ext cx="498600" cy="340920"/>
+            <a:ext cx="498240" cy="340560"/>
           </a:xfrm>
           <a:prstGeom prst="rect">
             <a:avLst/>
@@ -25357,7 +25850,7 @@
         <p:spPr>
           <a:xfrm>
             <a:off x="576000" y="3852000"/>
-            <a:ext cx="498600" cy="340920"/>
+            <a:ext cx="498240" cy="340560"/>
           </a:xfrm>
           <a:prstGeom prst="rect">
             <a:avLst/>
@@ -25408,7 +25901,7 @@
         <p:spPr>
           <a:xfrm>
             <a:off x="576000" y="4176000"/>
-            <a:ext cx="498600" cy="340920"/>
+            <a:ext cx="498240" cy="340560"/>
           </a:xfrm>
           <a:prstGeom prst="rect">
             <a:avLst/>
@@ -25459,7 +25952,7 @@
         <p:spPr>
           <a:xfrm>
             <a:off x="1476000" y="3492000"/>
-            <a:ext cx="498600" cy="340920"/>
+            <a:ext cx="498240" cy="340560"/>
           </a:xfrm>
           <a:prstGeom prst="rect">
             <a:avLst/>
@@ -25510,7 +26003,7 @@
         <p:spPr>
           <a:xfrm>
             <a:off x="3240000" y="3492000"/>
-            <a:ext cx="498600" cy="340920"/>
+            <a:ext cx="498240" cy="340560"/>
           </a:xfrm>
           <a:prstGeom prst="rect">
             <a:avLst/>
@@ -25561,7 +26054,7 @@
         <p:spPr>
           <a:xfrm>
             <a:off x="3276000" y="3960000"/>
-            <a:ext cx="498600" cy="340920"/>
+            <a:ext cx="498240" cy="340560"/>
           </a:xfrm>
           <a:prstGeom prst="rect">
             <a:avLst/>
@@ -25612,7 +26105,7 @@
         <p:spPr>
           <a:xfrm>
             <a:off x="4140000" y="3492000"/>
-            <a:ext cx="498600" cy="340920"/>
+            <a:ext cx="498240" cy="340560"/>
           </a:xfrm>
           <a:prstGeom prst="rect">
             <a:avLst/>
@@ -25663,7 +26156,7 @@
         <p:spPr>
           <a:xfrm>
             <a:off x="4140000" y="3924000"/>
-            <a:ext cx="498600" cy="340920"/>
+            <a:ext cx="498240" cy="340560"/>
           </a:xfrm>
           <a:prstGeom prst="rect">
             <a:avLst/>
@@ -26011,7 +26504,7 @@
         <p:spPr>
           <a:xfrm>
             <a:off x="540000" y="2412000"/>
-            <a:ext cx="1290600" cy="340920"/>
+            <a:ext cx="1290240" cy="340560"/>
           </a:xfrm>
           <a:prstGeom prst="rect">
             <a:avLst/>
@@ -26062,7 +26555,7 @@
         <p:spPr>
           <a:xfrm>
             <a:off x="3168000" y="2412000"/>
-            <a:ext cx="1434600" cy="390600"/>
+            <a:ext cx="1434240" cy="390240"/>
           </a:xfrm>
           <a:prstGeom prst="rect">
             <a:avLst/>
@@ -26113,7 +26606,7 @@
         <p:spPr>
           <a:xfrm>
             <a:off x="3168000" y="4968000"/>
-            <a:ext cx="1578600" cy="354600"/>
+            <a:ext cx="1578240" cy="354240"/>
           </a:xfrm>
           <a:prstGeom prst="rect">
             <a:avLst/>
@@ -26164,7 +26657,7 @@
         <p:spPr>
           <a:xfrm>
             <a:off x="504000" y="4968000"/>
-            <a:ext cx="1434600" cy="354600"/>
+            <a:ext cx="1434240" cy="354240"/>
           </a:xfrm>
           <a:prstGeom prst="rect">
             <a:avLst/>
@@ -26245,7 +26738,7 @@
         <p:spPr>
           <a:xfrm>
             <a:off x="1872000" y="1008000"/>
-            <a:ext cx="2082960" cy="786960"/>
+            <a:ext cx="2082600" cy="786600"/>
           </a:xfrm>
           <a:prstGeom prst="rect">
             <a:avLst/>
@@ -26275,7 +26768,7 @@
         <p:spPr>
           <a:xfrm>
             <a:off x="5328000" y="756000"/>
-            <a:ext cx="1650960" cy="1218960"/>
+            <a:ext cx="1650600" cy="1218600"/>
           </a:xfrm>
           <a:custGeom>
             <a:avLst/>
@@ -26328,7 +26821,7 @@
         <p:spPr>
           <a:xfrm>
             <a:off x="1872360" y="3672360"/>
-            <a:ext cx="2082960" cy="786960"/>
+            <a:ext cx="2082600" cy="786600"/>
           </a:xfrm>
           <a:prstGeom prst="rect">
             <a:avLst/>
@@ -26358,7 +26851,7 @@
         <p:spPr>
           <a:xfrm>
             <a:off x="5328360" y="3420360"/>
-            <a:ext cx="1650960" cy="1218960"/>
+            <a:ext cx="1650600" cy="1218600"/>
           </a:xfrm>
           <a:custGeom>
             <a:avLst/>
@@ -26466,7 +26959,7 @@
         <p:spPr>
           <a:xfrm>
             <a:off x="1188000" y="2304000"/>
-            <a:ext cx="6906960" cy="341280"/>
+            <a:ext cx="6906600" cy="340920"/>
           </a:xfrm>
           <a:prstGeom prst="rect">
             <a:avLst/>
@@ -26517,7 +27010,7 @@
         <p:spPr>
           <a:xfrm>
             <a:off x="1080000" y="4788000"/>
-            <a:ext cx="7158960" cy="597240"/>
+            <a:ext cx="7158600" cy="596880"/>
           </a:xfrm>
           <a:prstGeom prst="rect">
             <a:avLst/>
@@ -26598,7 +27091,7 @@
         <p:spPr>
           <a:xfrm>
             <a:off x="1908000" y="2232000"/>
-            <a:ext cx="1434240" cy="786240"/>
+            <a:ext cx="1433880" cy="785880"/>
           </a:xfrm>
           <a:prstGeom prst="rect">
             <a:avLst/>
@@ -26653,7 +27146,7 @@
         <p:spPr>
           <a:xfrm>
             <a:off x="6084000" y="2232000"/>
-            <a:ext cx="1434240" cy="786240"/>
+            <a:ext cx="1433880" cy="785880"/>
           </a:xfrm>
           <a:prstGeom prst="rect">
             <a:avLst/>
@@ -26708,7 +27201,7 @@
         <p:spPr>
           <a:xfrm>
             <a:off x="4032000" y="1944000"/>
-            <a:ext cx="1434240" cy="1362240"/>
+            <a:ext cx="1433880" cy="1361880"/>
           </a:xfrm>
           <a:custGeom>
             <a:avLst/>
@@ -26915,7 +27408,7 @@
         <p:spPr>
           <a:xfrm>
             <a:off x="2592000" y="3636000"/>
-            <a:ext cx="7122960" cy="597240"/>
+            <a:ext cx="7122600" cy="596880"/>
           </a:xfrm>
           <a:prstGeom prst="rect">
             <a:avLst/>
@@ -27016,7 +27509,7 @@
         <p:spPr>
           <a:xfrm>
             <a:off x="5934960" y="2130480"/>
-            <a:ext cx="1692720" cy="1003680"/>
+            <a:ext cx="1692360" cy="1003320"/>
           </a:xfrm>
           <a:prstGeom prst="rect">
             <a:avLst/>
@@ -27046,7 +27539,7 @@
         <p:spPr>
           <a:xfrm>
             <a:off x="1908000" y="2232000"/>
-            <a:ext cx="1434240" cy="786240"/>
+            <a:ext cx="1433880" cy="785880"/>
           </a:xfrm>
           <a:prstGeom prst="rect">
             <a:avLst/>
@@ -27101,7 +27594,7 @@
         <p:spPr>
           <a:xfrm>
             <a:off x="6084000" y="2232000"/>
-            <a:ext cx="1434240" cy="786240"/>
+            <a:ext cx="1433880" cy="785880"/>
           </a:xfrm>
           <a:prstGeom prst="rect">
             <a:avLst/>
@@ -27156,7 +27649,7 @@
         <p:spPr>
           <a:xfrm>
             <a:off x="4032000" y="1944000"/>
-            <a:ext cx="1434240" cy="1362240"/>
+            <a:ext cx="1433880" cy="1361880"/>
           </a:xfrm>
           <a:custGeom>
             <a:avLst/>
@@ -27315,7 +27808,7 @@
         <p:spPr>
           <a:xfrm>
             <a:off x="1764000" y="3564000"/>
-            <a:ext cx="7122960" cy="597240"/>
+            <a:ext cx="7122600" cy="596880"/>
           </a:xfrm>
           <a:prstGeom prst="rect">
             <a:avLst/>
@@ -27423,7 +27916,7 @@
         <p:spPr>
           <a:xfrm>
             <a:off x="1945800" y="3636000"/>
-            <a:ext cx="1434240" cy="786240"/>
+            <a:ext cx="1433880" cy="785880"/>
           </a:xfrm>
           <a:prstGeom prst="rect">
             <a:avLst/>
@@ -27498,7 +27991,7 @@
         <p:spPr>
           <a:xfrm>
             <a:off x="6300000" y="3673800"/>
-            <a:ext cx="1434240" cy="786240"/>
+            <a:ext cx="1433880" cy="785880"/>
           </a:xfrm>
           <a:prstGeom prst="rect">
             <a:avLst/>
@@ -27627,7 +28120,7 @@
         <p:spPr>
           <a:xfrm>
             <a:off x="1764000" y="4860000"/>
-            <a:ext cx="7122960" cy="597240"/>
+            <a:ext cx="7122600" cy="596880"/>
           </a:xfrm>
           <a:prstGeom prst="rect">
             <a:avLst/>
@@ -27653,7 +28146,7 @@
         <p:spPr>
           <a:xfrm>
             <a:off x="4140000" y="1080000"/>
-            <a:ext cx="1434240" cy="786240"/>
+            <a:ext cx="1433880" cy="785880"/>
           </a:xfrm>
           <a:prstGeom prst="rect">
             <a:avLst/>
@@ -27708,7 +28201,7 @@
         <p:spPr>
           <a:xfrm>
             <a:off x="4392000" y="2267640"/>
-            <a:ext cx="932040" cy="1004040"/>
+            <a:ext cx="931680" cy="1003680"/>
           </a:xfrm>
           <a:custGeom>
             <a:avLst/>
@@ -27757,7 +28250,7 @@
         <p:spPr>
           <a:xfrm>
             <a:off x="4572000" y="2304000"/>
-            <a:ext cx="644040" cy="342360"/>
+            <a:ext cx="643680" cy="342000"/>
           </a:xfrm>
           <a:prstGeom prst="rect">
             <a:avLst/>
@@ -27889,7 +28382,7 @@
         <p:spPr>
           <a:xfrm>
             <a:off x="2592000" y="432000"/>
-            <a:ext cx="1148040" cy="500040"/>
+            <a:ext cx="1147680" cy="499680"/>
           </a:xfrm>
           <a:prstGeom prst="ellipse">
             <a:avLst/>
@@ -27944,7 +28437,7 @@
         <p:spPr>
           <a:xfrm>
             <a:off x="4104360" y="360360"/>
-            <a:ext cx="1148040" cy="500040"/>
+            <a:ext cx="1147680" cy="499680"/>
           </a:xfrm>
           <a:prstGeom prst="ellipse">
             <a:avLst/>
@@ -27999,7 +28492,7 @@
         <p:spPr>
           <a:xfrm>
             <a:off x="5652720" y="432720"/>
-            <a:ext cx="1148040" cy="500040"/>
+            <a:ext cx="1147680" cy="499680"/>
           </a:xfrm>
           <a:prstGeom prst="ellipse">
             <a:avLst/>
@@ -28054,7 +28547,7 @@
         <p:spPr>
           <a:xfrm>
             <a:off x="3813480" y="4321080"/>
-            <a:ext cx="1148040" cy="500040"/>
+            <a:ext cx="1147680" cy="499680"/>
           </a:xfrm>
           <a:prstGeom prst="ellipse">
             <a:avLst/>
@@ -28109,7 +28602,7 @@
         <p:spPr>
           <a:xfrm>
             <a:off x="2193840" y="4717440"/>
-            <a:ext cx="1148040" cy="500040"/>
+            <a:ext cx="1147680" cy="499680"/>
           </a:xfrm>
           <a:prstGeom prst="ellipse">
             <a:avLst/>
@@ -28164,7 +28657,7 @@
         <p:spPr>
           <a:xfrm>
             <a:off x="682200" y="4501800"/>
-            <a:ext cx="1148040" cy="500040"/>
+            <a:ext cx="1147680" cy="499680"/>
           </a:xfrm>
           <a:prstGeom prst="ellipse">
             <a:avLst/>
@@ -28219,7 +28712,7 @@
         <p:spPr>
           <a:xfrm>
             <a:off x="5434560" y="4574160"/>
-            <a:ext cx="1148040" cy="500040"/>
+            <a:ext cx="1147680" cy="499680"/>
           </a:xfrm>
           <a:prstGeom prst="ellipse">
             <a:avLst/>
@@ -28274,7 +28767,7 @@
         <p:spPr>
           <a:xfrm>
             <a:off x="7634160" y="4574520"/>
-            <a:ext cx="1148040" cy="500040"/>
+            <a:ext cx="1147680" cy="499680"/>
           </a:xfrm>
           <a:prstGeom prst="ellipse">
             <a:avLst/>
@@ -28329,7 +28822,7 @@
         <p:spPr>
           <a:xfrm>
             <a:off x="686520" y="3098880"/>
-            <a:ext cx="1148040" cy="500040"/>
+            <a:ext cx="1147680" cy="499680"/>
           </a:xfrm>
           <a:prstGeom prst="ellipse">
             <a:avLst/>
@@ -28657,7 +29150,7 @@
         <p:spPr>
           <a:xfrm>
             <a:off x="432000" y="72000"/>
-            <a:ext cx="9068040" cy="2516040"/>
+            <a:ext cx="9067680" cy="2515680"/>
           </a:xfrm>
           <a:prstGeom prst="rect">
             <a:avLst/>
@@ -28687,7 +29180,7 @@
         <p:spPr>
           <a:xfrm>
             <a:off x="2016000" y="1188000"/>
-            <a:ext cx="1434240" cy="786240"/>
+            <a:ext cx="1433880" cy="785880"/>
           </a:xfrm>
           <a:prstGeom prst="rect">
             <a:avLst/>
@@ -28742,7 +29235,7 @@
         <p:spPr>
           <a:xfrm>
             <a:off x="6192000" y="1188000"/>
-            <a:ext cx="1434240" cy="786240"/>
+            <a:ext cx="1433880" cy="785880"/>
           </a:xfrm>
           <a:prstGeom prst="rect">
             <a:avLst/>
@@ -28797,7 +29290,7 @@
         <p:spPr>
           <a:xfrm>
             <a:off x="4140000" y="900000"/>
-            <a:ext cx="1434240" cy="1362240"/>
+            <a:ext cx="1433880" cy="1361880"/>
           </a:xfrm>
           <a:custGeom>
             <a:avLst/>
@@ -28956,7 +29449,7 @@
         <p:spPr>
           <a:xfrm>
             <a:off x="-36000" y="3384000"/>
-            <a:ext cx="2624040" cy="597240"/>
+            <a:ext cx="2623680" cy="596880"/>
           </a:xfrm>
           <a:prstGeom prst="rect">
             <a:avLst/>
@@ -29034,7 +29527,7 @@
         <p:spPr>
           <a:xfrm>
             <a:off x="5868360" y="180360"/>
-            <a:ext cx="1148040" cy="500040"/>
+            <a:ext cx="1147680" cy="499680"/>
           </a:xfrm>
           <a:prstGeom prst="ellipse">
             <a:avLst/>
@@ -29089,7 +29582,7 @@
         <p:spPr>
           <a:xfrm>
             <a:off x="7344720" y="216720"/>
-            <a:ext cx="1148040" cy="500040"/>
+            <a:ext cx="1147680" cy="499680"/>
           </a:xfrm>
           <a:prstGeom prst="ellipse">
             <a:avLst/>
@@ -29144,7 +29637,7 @@
         <p:spPr>
           <a:xfrm>
             <a:off x="7921080" y="937080"/>
-            <a:ext cx="1148040" cy="500040"/>
+            <a:ext cx="1147680" cy="499680"/>
           </a:xfrm>
           <a:prstGeom prst="ellipse">
             <a:avLst/>
@@ -29199,7 +29692,7 @@
         <p:spPr>
           <a:xfrm>
             <a:off x="7921440" y="1693440"/>
-            <a:ext cx="1148040" cy="500040"/>
+            <a:ext cx="1147680" cy="499680"/>
           </a:xfrm>
           <a:prstGeom prst="ellipse">
             <a:avLst/>
@@ -29254,7 +29747,7 @@
         <p:spPr>
           <a:xfrm>
             <a:off x="7921440" y="937440"/>
-            <a:ext cx="1148040" cy="500040"/>
+            <a:ext cx="1147680" cy="499680"/>
           </a:xfrm>
           <a:prstGeom prst="ellipse">
             <a:avLst/>
@@ -29309,7 +29802,7 @@
         <p:spPr>
           <a:xfrm>
             <a:off x="2089440" y="433440"/>
-            <a:ext cx="1148040" cy="500040"/>
+            <a:ext cx="1147680" cy="499680"/>
           </a:xfrm>
           <a:prstGeom prst="ellipse">
             <a:avLst/>
@@ -29364,7 +29857,7 @@
         <p:spPr>
           <a:xfrm>
             <a:off x="649800" y="541800"/>
-            <a:ext cx="1148040" cy="500040"/>
+            <a:ext cx="1147680" cy="499680"/>
           </a:xfrm>
           <a:prstGeom prst="ellipse">
             <a:avLst/>
@@ -29419,7 +29912,7 @@
         <p:spPr>
           <a:xfrm>
             <a:off x="4320000" y="3168000"/>
-            <a:ext cx="1038240" cy="788040"/>
+            <a:ext cx="1037880" cy="787680"/>
           </a:xfrm>
           <a:custGeom>
             <a:avLst/>
@@ -29497,7 +29990,7 @@
         <p:spPr>
           <a:xfrm>
             <a:off x="4176000" y="4428000"/>
-            <a:ext cx="1434240" cy="786240"/>
+            <a:ext cx="1433880" cy="785880"/>
           </a:xfrm>
           <a:prstGeom prst="rect">
             <a:avLst/>
@@ -29633,7 +30126,7 @@
         <p:spPr>
           <a:xfrm>
             <a:off x="5870160" y="3782160"/>
-            <a:ext cx="1148040" cy="500040"/>
+            <a:ext cx="1147680" cy="499680"/>
           </a:xfrm>
           <a:prstGeom prst="ellipse">
             <a:avLst/>
@@ -29688,7 +30181,7 @@
         <p:spPr>
           <a:xfrm>
             <a:off x="7380000" y="3115440"/>
-            <a:ext cx="2624040" cy="597240"/>
+            <a:ext cx="2623680" cy="596880"/>
           </a:xfrm>
           <a:prstGeom prst="rect">
             <a:avLst/>

</xml_diff>

<commit_message>
Added Von-neumann arch image
</commit_message>
<xml_diff>
--- a/GATE/images/gate_images.pptx
+++ b/GATE/images/gate_images.pptx
@@ -34,6 +34,7 @@
     <p:sldId id="281" r:id="rId29"/>
     <p:sldId id="282" r:id="rId30"/>
     <p:sldId id="283" r:id="rId31"/>
+    <p:sldId id="284" r:id="rId32"/>
   </p:sldIdLst>
   <p:sldSz cx="10080625" cy="5670550"/>
   <p:notesSz cx="7559675" cy="10691812"/>
@@ -2809,6 +2810,259 @@
       <p:sp>
         <p:nvSpPr>
           <p:cNvPr id="1" name="PlaceHolder 2"/>
+          <p:cNvSpPr>
+            <a:spLocks noGrp="1"/>
+          </p:cNvSpPr>
+          <p:nvPr>
+            <p:ph type="body"/>
+          </p:nvPr>
+        </p:nvSpPr>
+        <p:spPr>
+          <a:xfrm>
+            <a:off x="504000" y="1326600"/>
+            <a:ext cx="9071640" cy="3288240"/>
+          </a:xfrm>
+          <a:prstGeom prst="rect">
+            <a:avLst/>
+          </a:prstGeom>
+        </p:spPr>
+        <p:txBody>
+          <a:bodyPr lIns="0" rIns="0" tIns="0" bIns="0">
+            <a:normAutofit/>
+          </a:bodyPr>
+          <a:p>
+            <a:pPr marL="432000" indent="-324000" algn="ctr">
+              <a:spcBef>
+                <a:spcPts val="1417"/>
+              </a:spcBef>
+              <a:buClr>
+                <a:srgbClr val="000000"/>
+              </a:buClr>
+              <a:buSzPct val="45000"/>
+              <a:buFont typeface="Wingdings" charset="2"/>
+              <a:buChar char=""/>
+            </a:pPr>
+            <a:r>
+              <a:rPr b="0" lang="en-IN" sz="1800" spc="-1" strike="noStrike">
+                <a:latin typeface="Arial"/>
+              </a:rPr>
+              <a:t>Click to edit the outline text format</a:t>
+            </a:r>
+            <a:endParaRPr b="0" lang="en-IN" sz="1800" spc="-1" strike="noStrike">
+              <a:latin typeface="Arial"/>
+            </a:endParaRPr>
+          </a:p>
+          <a:p>
+            <a:pPr lvl="1" marL="864000" indent="-324000" algn="ctr">
+              <a:spcBef>
+                <a:spcPts val="1134"/>
+              </a:spcBef>
+              <a:buClr>
+                <a:srgbClr val="000000"/>
+              </a:buClr>
+              <a:buSzPct val="75000"/>
+              <a:buFont typeface="Symbol" charset="2"/>
+              <a:buChar char=""/>
+            </a:pPr>
+            <a:r>
+              <a:rPr b="0" lang="en-IN" sz="1800" spc="-1" strike="noStrike">
+                <a:latin typeface="Arial"/>
+              </a:rPr>
+              <a:t>Second Outline Level</a:t>
+            </a:r>
+            <a:endParaRPr b="0" lang="en-IN" sz="1800" spc="-1" strike="noStrike">
+              <a:latin typeface="Arial"/>
+            </a:endParaRPr>
+          </a:p>
+          <a:p>
+            <a:pPr lvl="2" marL="1296000" indent="-288000" algn="ctr">
+              <a:spcBef>
+                <a:spcPts val="850"/>
+              </a:spcBef>
+              <a:buClr>
+                <a:srgbClr val="000000"/>
+              </a:buClr>
+              <a:buSzPct val="45000"/>
+              <a:buFont typeface="Wingdings" charset="2"/>
+              <a:buChar char=""/>
+            </a:pPr>
+            <a:r>
+              <a:rPr b="0" lang="en-IN" sz="1800" spc="-1" strike="noStrike">
+                <a:latin typeface="Arial"/>
+              </a:rPr>
+              <a:t>Third Outline Level</a:t>
+            </a:r>
+            <a:endParaRPr b="0" lang="en-IN" sz="1800" spc="-1" strike="noStrike">
+              <a:latin typeface="Arial"/>
+            </a:endParaRPr>
+          </a:p>
+          <a:p>
+            <a:pPr lvl="3" marL="1728000" indent="-216000" algn="ctr">
+              <a:spcBef>
+                <a:spcPts val="567"/>
+              </a:spcBef>
+              <a:buClr>
+                <a:srgbClr val="000000"/>
+              </a:buClr>
+              <a:buSzPct val="75000"/>
+              <a:buFont typeface="Symbol" charset="2"/>
+              <a:buChar char=""/>
+            </a:pPr>
+            <a:r>
+              <a:rPr b="0" lang="en-IN" sz="1800" spc="-1" strike="noStrike">
+                <a:latin typeface="Arial"/>
+              </a:rPr>
+              <a:t>Fourth Outline Level</a:t>
+            </a:r>
+            <a:endParaRPr b="0" lang="en-IN" sz="1800" spc="-1" strike="noStrike">
+              <a:latin typeface="Arial"/>
+            </a:endParaRPr>
+          </a:p>
+          <a:p>
+            <a:pPr lvl="4" marL="2160000" indent="-216000" algn="ctr">
+              <a:spcBef>
+                <a:spcPts val="283"/>
+              </a:spcBef>
+              <a:buClr>
+                <a:srgbClr val="000000"/>
+              </a:buClr>
+              <a:buSzPct val="45000"/>
+              <a:buFont typeface="Wingdings" charset="2"/>
+              <a:buChar char=""/>
+            </a:pPr>
+            <a:r>
+              <a:rPr b="0" lang="en-IN" sz="1800" spc="-1" strike="noStrike">
+                <a:latin typeface="Arial"/>
+              </a:rPr>
+              <a:t>Fifth Outline Level</a:t>
+            </a:r>
+            <a:endParaRPr b="0" lang="en-IN" sz="1800" spc="-1" strike="noStrike">
+              <a:latin typeface="Arial"/>
+            </a:endParaRPr>
+          </a:p>
+          <a:p>
+            <a:pPr lvl="5" marL="2592000" indent="-216000" algn="ctr">
+              <a:spcBef>
+                <a:spcPts val="283"/>
+              </a:spcBef>
+              <a:buClr>
+                <a:srgbClr val="000000"/>
+              </a:buClr>
+              <a:buSzPct val="45000"/>
+              <a:buFont typeface="Wingdings" charset="2"/>
+              <a:buChar char=""/>
+            </a:pPr>
+            <a:r>
+              <a:rPr b="0" lang="en-IN" sz="1800" spc="-1" strike="noStrike">
+                <a:latin typeface="Arial"/>
+              </a:rPr>
+              <a:t>Sixth Outline Level</a:t>
+            </a:r>
+            <a:endParaRPr b="0" lang="en-IN" sz="1800" spc="-1" strike="noStrike">
+              <a:latin typeface="Arial"/>
+            </a:endParaRPr>
+          </a:p>
+          <a:p>
+            <a:pPr lvl="6" marL="3024000" indent="-216000" algn="ctr">
+              <a:spcBef>
+                <a:spcPts val="283"/>
+              </a:spcBef>
+              <a:buClr>
+                <a:srgbClr val="000000"/>
+              </a:buClr>
+              <a:buSzPct val="45000"/>
+              <a:buFont typeface="Wingdings" charset="2"/>
+              <a:buChar char=""/>
+            </a:pPr>
+            <a:r>
+              <a:rPr b="0" lang="en-IN" sz="1800" spc="-1" strike="noStrike">
+                <a:latin typeface="Arial"/>
+              </a:rPr>
+              <a:t>Seventh Outline Level</a:t>
+            </a:r>
+            <a:endParaRPr b="0" lang="en-IN" sz="1800" spc="-1" strike="noStrike">
+              <a:latin typeface="Arial"/>
+            </a:endParaRPr>
+          </a:p>
+        </p:txBody>
+      </p:sp>
+    </p:spTree>
+  </p:cSld>
+  <p:clrMap bg1="lt1" bg2="lt2" tx1="dk1" tx2="dk2" accent1="accent1" accent2="accent2" accent3="accent3" accent4="accent4" accent5="accent5" accent6="accent6" hlink="hlink" folHlink="folHlink"/>
+  <p:sldLayoutIdLst>
+    <p:sldLayoutId id="2147483649" r:id="rId2"/>
+    <p:sldLayoutId id="2147483650" r:id="rId3"/>
+    <p:sldLayoutId id="2147483651" r:id="rId4"/>
+    <p:sldLayoutId id="2147483652" r:id="rId5"/>
+    <p:sldLayoutId id="2147483653" r:id="rId6"/>
+    <p:sldLayoutId id="2147483654" r:id="rId7"/>
+    <p:sldLayoutId id="2147483655" r:id="rId8"/>
+    <p:sldLayoutId id="2147483656" r:id="rId9"/>
+    <p:sldLayoutId id="2147483657" r:id="rId10"/>
+    <p:sldLayoutId id="2147483658" r:id="rId11"/>
+    <p:sldLayoutId id="2147483659" r:id="rId12"/>
+    <p:sldLayoutId id="2147483660" r:id="rId13"/>
+  </p:sldLayoutIdLst>
+</p:sldMaster>
+</file>
+
+<file path=ppt/slideMasters/slideMaster2.xml><?xml version="1.0" encoding="utf-8"?>
+<p:sldMaster xmlns:a="http://schemas.openxmlformats.org/drawingml/2006/main" xmlns:p="http://schemas.openxmlformats.org/presentationml/2006/main" xmlns:r="http://schemas.openxmlformats.org/officeDocument/2006/relationships" xmlns:p14="http://schemas.microsoft.com/office/powerpoint/2010/main" xmlns:p15="http://schemas.microsoft.com/office/powerpoint/2012/main" xmlns:mc="http://schemas.openxmlformats.org/markup-compatibility/2006">
+  <p:cSld>
+    <p:spTree>
+      <p:nvGrpSpPr>
+        <p:cNvPr id="1" name=""/>
+        <p:cNvGrpSpPr/>
+        <p:nvPr/>
+      </p:nvGrpSpPr>
+      <p:grpSpPr>
+        <a:xfrm>
+          <a:off x="0" y="0"/>
+          <a:ext cx="0" cy="0"/>
+          <a:chOff x="0" y="0"/>
+          <a:chExt cx="0" cy="0"/>
+        </a:xfrm>
+      </p:grpSpPr>
+      <p:sp>
+        <p:nvSpPr>
+          <p:cNvPr id="38" name="PlaceHolder 1"/>
+          <p:cNvSpPr>
+            <a:spLocks noGrp="1"/>
+          </p:cNvSpPr>
+          <p:nvPr>
+            <p:ph type="title"/>
+          </p:nvPr>
+        </p:nvSpPr>
+        <p:spPr>
+          <a:xfrm>
+            <a:off x="504000" y="226080"/>
+            <a:ext cx="9072000" cy="946440"/>
+          </a:xfrm>
+          <a:prstGeom prst="rect">
+            <a:avLst/>
+          </a:prstGeom>
+        </p:spPr>
+        <p:txBody>
+          <a:bodyPr lIns="0" rIns="0" tIns="0" bIns="0" anchor="ctr">
+            <a:noAutofit/>
+          </a:bodyPr>
+          <a:p>
+            <a:pPr algn="ctr"/>
+            <a:r>
+              <a:rPr b="0" lang="en-IN" sz="4400" spc="-1" strike="noStrike">
+                <a:latin typeface="Arial"/>
+              </a:rPr>
+              <a:t>Click to edit the title text format</a:t>
+            </a:r>
+            <a:endParaRPr b="0" lang="en-IN" sz="4400" spc="-1" strike="noStrike">
+              <a:latin typeface="Arial"/>
+            </a:endParaRPr>
+          </a:p>
+        </p:txBody>
+      </p:sp>
+      <p:sp>
+        <p:nvSpPr>
+          <p:cNvPr id="39" name="PlaceHolder 2"/>
           <p:cNvSpPr>
             <a:spLocks noGrp="1"/>
           </p:cNvSpPr>
@@ -2989,259 +3243,6 @@
   </p:cSld>
   <p:clrMap bg1="lt1" bg2="lt2" tx1="dk1" tx2="dk2" accent1="accent1" accent2="accent2" accent3="accent3" accent4="accent4" accent5="accent5" accent6="accent6" hlink="hlink" folHlink="folHlink"/>
   <p:sldLayoutIdLst>
-    <p:sldLayoutId id="2147483649" r:id="rId2"/>
-    <p:sldLayoutId id="2147483650" r:id="rId3"/>
-    <p:sldLayoutId id="2147483651" r:id="rId4"/>
-    <p:sldLayoutId id="2147483652" r:id="rId5"/>
-    <p:sldLayoutId id="2147483653" r:id="rId6"/>
-    <p:sldLayoutId id="2147483654" r:id="rId7"/>
-    <p:sldLayoutId id="2147483655" r:id="rId8"/>
-    <p:sldLayoutId id="2147483656" r:id="rId9"/>
-    <p:sldLayoutId id="2147483657" r:id="rId10"/>
-    <p:sldLayoutId id="2147483658" r:id="rId11"/>
-    <p:sldLayoutId id="2147483659" r:id="rId12"/>
-    <p:sldLayoutId id="2147483660" r:id="rId13"/>
-  </p:sldLayoutIdLst>
-</p:sldMaster>
-</file>
-
-<file path=ppt/slideMasters/slideMaster2.xml><?xml version="1.0" encoding="utf-8"?>
-<p:sldMaster xmlns:a="http://schemas.openxmlformats.org/drawingml/2006/main" xmlns:p="http://schemas.openxmlformats.org/presentationml/2006/main" xmlns:r="http://schemas.openxmlformats.org/officeDocument/2006/relationships" xmlns:p14="http://schemas.microsoft.com/office/powerpoint/2010/main" xmlns:p15="http://schemas.microsoft.com/office/powerpoint/2012/main" xmlns:mc="http://schemas.openxmlformats.org/markup-compatibility/2006">
-  <p:cSld>
-    <p:spTree>
-      <p:nvGrpSpPr>
-        <p:cNvPr id="1" name=""/>
-        <p:cNvGrpSpPr/>
-        <p:nvPr/>
-      </p:nvGrpSpPr>
-      <p:grpSpPr>
-        <a:xfrm>
-          <a:off x="0" y="0"/>
-          <a:ext cx="0" cy="0"/>
-          <a:chOff x="0" y="0"/>
-          <a:chExt cx="0" cy="0"/>
-        </a:xfrm>
-      </p:grpSpPr>
-      <p:sp>
-        <p:nvSpPr>
-          <p:cNvPr id="38" name="PlaceHolder 1"/>
-          <p:cNvSpPr>
-            <a:spLocks noGrp="1"/>
-          </p:cNvSpPr>
-          <p:nvPr>
-            <p:ph type="title"/>
-          </p:nvPr>
-        </p:nvSpPr>
-        <p:spPr>
-          <a:xfrm>
-            <a:off x="504000" y="226080"/>
-            <a:ext cx="9072000" cy="946440"/>
-          </a:xfrm>
-          <a:prstGeom prst="rect">
-            <a:avLst/>
-          </a:prstGeom>
-        </p:spPr>
-        <p:txBody>
-          <a:bodyPr lIns="0" rIns="0" tIns="0" bIns="0" anchor="ctr">
-            <a:noAutofit/>
-          </a:bodyPr>
-          <a:p>
-            <a:pPr algn="ctr"/>
-            <a:r>
-              <a:rPr b="0" lang="en-IN" sz="4400" spc="-1" strike="noStrike">
-                <a:latin typeface="Arial"/>
-              </a:rPr>
-              <a:t>Click to edit the title text format</a:t>
-            </a:r>
-            <a:endParaRPr b="0" lang="en-IN" sz="4400" spc="-1" strike="noStrike">
-              <a:latin typeface="Arial"/>
-            </a:endParaRPr>
-          </a:p>
-        </p:txBody>
-      </p:sp>
-      <p:sp>
-        <p:nvSpPr>
-          <p:cNvPr id="39" name="PlaceHolder 2"/>
-          <p:cNvSpPr>
-            <a:spLocks noGrp="1"/>
-          </p:cNvSpPr>
-          <p:nvPr>
-            <p:ph type="body"/>
-          </p:nvPr>
-        </p:nvSpPr>
-        <p:spPr>
-          <a:xfrm>
-            <a:off x="504000" y="1326600"/>
-            <a:ext cx="9072000" cy="3288600"/>
-          </a:xfrm>
-          <a:prstGeom prst="rect">
-            <a:avLst/>
-          </a:prstGeom>
-        </p:spPr>
-        <p:txBody>
-          <a:bodyPr lIns="0" rIns="0" tIns="0" bIns="0">
-            <a:normAutofit/>
-          </a:bodyPr>
-          <a:p>
-            <a:pPr marL="432000" indent="-324000">
-              <a:spcBef>
-                <a:spcPts val="1417"/>
-              </a:spcBef>
-              <a:buClr>
-                <a:srgbClr val="000000"/>
-              </a:buClr>
-              <a:buSzPct val="45000"/>
-              <a:buFont typeface="Wingdings" charset="2"/>
-              <a:buChar char=""/>
-            </a:pPr>
-            <a:r>
-              <a:rPr b="0" lang="en-IN" sz="3200" spc="-1" strike="noStrike">
-                <a:latin typeface="Arial"/>
-              </a:rPr>
-              <a:t>Click to edit the outline text format</a:t>
-            </a:r>
-            <a:endParaRPr b="0" lang="en-IN" sz="3200" spc="-1" strike="noStrike">
-              <a:latin typeface="Arial"/>
-            </a:endParaRPr>
-          </a:p>
-          <a:p>
-            <a:pPr lvl="1" marL="864000" indent="-324000">
-              <a:spcBef>
-                <a:spcPts val="1134"/>
-              </a:spcBef>
-              <a:buClr>
-                <a:srgbClr val="000000"/>
-              </a:buClr>
-              <a:buSzPct val="75000"/>
-              <a:buFont typeface="Symbol" charset="2"/>
-              <a:buChar char=""/>
-            </a:pPr>
-            <a:r>
-              <a:rPr b="0" lang="en-IN" sz="2800" spc="-1" strike="noStrike">
-                <a:latin typeface="Arial"/>
-              </a:rPr>
-              <a:t>Second Outline Level</a:t>
-            </a:r>
-            <a:endParaRPr b="0" lang="en-IN" sz="2800" spc="-1" strike="noStrike">
-              <a:latin typeface="Arial"/>
-            </a:endParaRPr>
-          </a:p>
-          <a:p>
-            <a:pPr lvl="2" marL="1296000" indent="-288000">
-              <a:spcBef>
-                <a:spcPts val="850"/>
-              </a:spcBef>
-              <a:buClr>
-                <a:srgbClr val="000000"/>
-              </a:buClr>
-              <a:buSzPct val="45000"/>
-              <a:buFont typeface="Wingdings" charset="2"/>
-              <a:buChar char=""/>
-            </a:pPr>
-            <a:r>
-              <a:rPr b="0" lang="en-IN" sz="2400" spc="-1" strike="noStrike">
-                <a:latin typeface="Arial"/>
-              </a:rPr>
-              <a:t>Third Outline Level</a:t>
-            </a:r>
-            <a:endParaRPr b="0" lang="en-IN" sz="2400" spc="-1" strike="noStrike">
-              <a:latin typeface="Arial"/>
-            </a:endParaRPr>
-          </a:p>
-          <a:p>
-            <a:pPr lvl="3" marL="1728000" indent="-216000">
-              <a:spcBef>
-                <a:spcPts val="567"/>
-              </a:spcBef>
-              <a:buClr>
-                <a:srgbClr val="000000"/>
-              </a:buClr>
-              <a:buSzPct val="75000"/>
-              <a:buFont typeface="Symbol" charset="2"/>
-              <a:buChar char=""/>
-            </a:pPr>
-            <a:r>
-              <a:rPr b="0" lang="en-IN" sz="2000" spc="-1" strike="noStrike">
-                <a:latin typeface="Arial"/>
-              </a:rPr>
-              <a:t>Fourth Outline Level</a:t>
-            </a:r>
-            <a:endParaRPr b="0" lang="en-IN" sz="2000" spc="-1" strike="noStrike">
-              <a:latin typeface="Arial"/>
-            </a:endParaRPr>
-          </a:p>
-          <a:p>
-            <a:pPr lvl="4" marL="2160000" indent="-216000">
-              <a:spcBef>
-                <a:spcPts val="283"/>
-              </a:spcBef>
-              <a:buClr>
-                <a:srgbClr val="000000"/>
-              </a:buClr>
-              <a:buSzPct val="45000"/>
-              <a:buFont typeface="Wingdings" charset="2"/>
-              <a:buChar char=""/>
-            </a:pPr>
-            <a:r>
-              <a:rPr b="0" lang="en-IN" sz="2000" spc="-1" strike="noStrike">
-                <a:latin typeface="Arial"/>
-              </a:rPr>
-              <a:t>Fifth Outline Level</a:t>
-            </a:r>
-            <a:endParaRPr b="0" lang="en-IN" sz="2000" spc="-1" strike="noStrike">
-              <a:latin typeface="Arial"/>
-            </a:endParaRPr>
-          </a:p>
-          <a:p>
-            <a:pPr lvl="5" marL="2592000" indent="-216000">
-              <a:spcBef>
-                <a:spcPts val="283"/>
-              </a:spcBef>
-              <a:buClr>
-                <a:srgbClr val="000000"/>
-              </a:buClr>
-              <a:buSzPct val="45000"/>
-              <a:buFont typeface="Wingdings" charset="2"/>
-              <a:buChar char=""/>
-            </a:pPr>
-            <a:r>
-              <a:rPr b="0" lang="en-IN" sz="2000" spc="-1" strike="noStrike">
-                <a:latin typeface="Arial"/>
-              </a:rPr>
-              <a:t>Sixth Outline Level</a:t>
-            </a:r>
-            <a:endParaRPr b="0" lang="en-IN" sz="2000" spc="-1" strike="noStrike">
-              <a:latin typeface="Arial"/>
-            </a:endParaRPr>
-          </a:p>
-          <a:p>
-            <a:pPr lvl="6" marL="3024000" indent="-216000">
-              <a:spcBef>
-                <a:spcPts val="283"/>
-              </a:spcBef>
-              <a:buClr>
-                <a:srgbClr val="000000"/>
-              </a:buClr>
-              <a:buSzPct val="45000"/>
-              <a:buFont typeface="Wingdings" charset="2"/>
-              <a:buChar char=""/>
-            </a:pPr>
-            <a:r>
-              <a:rPr b="0" lang="en-IN" sz="2000" spc="-1" strike="noStrike">
-                <a:latin typeface="Arial"/>
-              </a:rPr>
-              <a:t>Seventh Outline Level</a:t>
-            </a:r>
-            <a:endParaRPr b="0" lang="en-IN" sz="2000" spc="-1" strike="noStrike">
-              <a:latin typeface="Arial"/>
-            </a:endParaRPr>
-          </a:p>
-        </p:txBody>
-      </p:sp>
-    </p:spTree>
-  </p:cSld>
-  <p:clrMap bg1="lt1" bg2="lt2" tx1="dk1" tx2="dk2" accent1="accent1" accent2="accent2" accent3="accent3" accent4="accent4" accent5="accent5" accent6="accent6" hlink="hlink" folHlink="folHlink"/>
-  <p:sldLayoutIdLst>
     <p:sldLayoutId id="2147483662" r:id="rId2"/>
     <p:sldLayoutId id="2147483663" r:id="rId3"/>
     <p:sldLayoutId id="2147483664" r:id="rId4"/>
@@ -3284,7 +3285,7 @@
         <p:spPr>
           <a:xfrm>
             <a:off x="1836000" y="1332000"/>
-            <a:ext cx="2368800" cy="784800"/>
+            <a:ext cx="2368440" cy="784440"/>
           </a:xfrm>
           <a:prstGeom prst="rect">
             <a:avLst/>
@@ -3339,7 +3340,7 @@
         <p:spPr>
           <a:xfrm>
             <a:off x="1836000" y="2880000"/>
-            <a:ext cx="2368800" cy="784800"/>
+            <a:ext cx="2368440" cy="784440"/>
           </a:xfrm>
           <a:prstGeom prst="rect">
             <a:avLst/>
@@ -3404,7 +3405,7 @@
         <p:spPr>
           <a:xfrm>
             <a:off x="1836000" y="4176000"/>
-            <a:ext cx="2368800" cy="784800"/>
+            <a:ext cx="2368440" cy="784440"/>
           </a:xfrm>
           <a:prstGeom prst="rect">
             <a:avLst/>
@@ -3479,7 +3480,7 @@
         <p:spPr>
           <a:xfrm>
             <a:off x="5292000" y="900000"/>
-            <a:ext cx="2368800" cy="1504800"/>
+            <a:ext cx="2368440" cy="1504440"/>
           </a:xfrm>
           <a:prstGeom prst="rect">
             <a:avLst/>
@@ -3614,7 +3615,7 @@
         <p:spPr>
           <a:xfrm>
             <a:off x="5292000" y="2571480"/>
-            <a:ext cx="2368800" cy="1273320"/>
+            <a:ext cx="2368440" cy="1272960"/>
           </a:xfrm>
           <a:prstGeom prst="rect">
             <a:avLst/>
@@ -3729,7 +3730,7 @@
         <p:spPr>
           <a:xfrm>
             <a:off x="5292000" y="4047480"/>
-            <a:ext cx="2368800" cy="1021320"/>
+            <a:ext cx="2368440" cy="1020960"/>
           </a:xfrm>
           <a:prstGeom prst="rect">
             <a:avLst/>
@@ -3908,7 +3909,7 @@
         <p:spPr>
           <a:xfrm>
             <a:off x="2988000" y="360000"/>
-            <a:ext cx="4384800" cy="339120"/>
+            <a:ext cx="4384440" cy="338760"/>
           </a:xfrm>
           <a:prstGeom prst="rect">
             <a:avLst/>
@@ -3989,7 +3990,7 @@
         <p:spPr>
           <a:xfrm>
             <a:off x="1440000" y="720000"/>
-            <a:ext cx="6762960" cy="1794960"/>
+            <a:ext cx="6762600" cy="1794600"/>
           </a:xfrm>
           <a:prstGeom prst="rect">
             <a:avLst/>
@@ -4019,7 +4020,7 @@
         <p:spPr>
           <a:xfrm>
             <a:off x="2016000" y="1188000"/>
-            <a:ext cx="1433160" cy="785160"/>
+            <a:ext cx="1432800" cy="784800"/>
           </a:xfrm>
           <a:prstGeom prst="rect">
             <a:avLst/>
@@ -4074,7 +4075,7 @@
         <p:spPr>
           <a:xfrm>
             <a:off x="6192000" y="1188000"/>
-            <a:ext cx="1433160" cy="785160"/>
+            <a:ext cx="1432800" cy="784800"/>
           </a:xfrm>
           <a:prstGeom prst="rect">
             <a:avLst/>
@@ -4129,7 +4130,7 @@
         <p:spPr>
           <a:xfrm>
             <a:off x="4140000" y="900000"/>
-            <a:ext cx="1433160" cy="1361160"/>
+            <a:ext cx="1432800" cy="1360800"/>
           </a:xfrm>
           <a:custGeom>
             <a:avLst/>
@@ -4315,7 +4316,7 @@
         <p:spPr>
           <a:xfrm>
             <a:off x="4320000" y="3168000"/>
-            <a:ext cx="1037160" cy="786960"/>
+            <a:ext cx="1036800" cy="786600"/>
           </a:xfrm>
           <a:custGeom>
             <a:avLst/>
@@ -4393,7 +4394,7 @@
         <p:spPr>
           <a:xfrm>
             <a:off x="4176000" y="4428000"/>
-            <a:ext cx="1433160" cy="785160"/>
+            <a:ext cx="1432800" cy="784800"/>
           </a:xfrm>
           <a:prstGeom prst="rect">
             <a:avLst/>
@@ -4475,7 +4476,7 @@
         <p:spPr>
           <a:xfrm>
             <a:off x="5870160" y="3314160"/>
-            <a:ext cx="1146960" cy="498960"/>
+            <a:ext cx="1146600" cy="498600"/>
           </a:xfrm>
           <a:prstGeom prst="ellipse">
             <a:avLst/>
@@ -4614,7 +4615,7 @@
         <p:spPr>
           <a:xfrm>
             <a:off x="1944000" y="900000"/>
-            <a:ext cx="1433160" cy="785160"/>
+            <a:ext cx="1432800" cy="784800"/>
           </a:xfrm>
           <a:prstGeom prst="rect">
             <a:avLst/>
@@ -4669,7 +4670,7 @@
         <p:spPr>
           <a:xfrm>
             <a:off x="6120000" y="900000"/>
-            <a:ext cx="1433160" cy="785160"/>
+            <a:ext cx="1432800" cy="784800"/>
           </a:xfrm>
           <a:prstGeom prst="rect">
             <a:avLst/>
@@ -4724,7 +4725,7 @@
         <p:spPr>
           <a:xfrm>
             <a:off x="4068000" y="612000"/>
-            <a:ext cx="1433160" cy="1361160"/>
+            <a:ext cx="1432800" cy="1360800"/>
           </a:xfrm>
           <a:custGeom>
             <a:avLst/>
@@ -4903,7 +4904,7 @@
         <p:spPr>
           <a:xfrm>
             <a:off x="2592000" y="5904000"/>
-            <a:ext cx="7121880" cy="596160"/>
+            <a:ext cx="7121520" cy="595800"/>
           </a:xfrm>
           <a:prstGeom prst="rect">
             <a:avLst/>
@@ -4974,7 +4975,7 @@
         <p:spPr>
           <a:xfrm>
             <a:off x="360000" y="216360"/>
-            <a:ext cx="1146960" cy="498960"/>
+            <a:ext cx="1146600" cy="498600"/>
           </a:xfrm>
           <a:prstGeom prst="ellipse">
             <a:avLst/>
@@ -5029,7 +5030,7 @@
         <p:spPr>
           <a:xfrm>
             <a:off x="1727640" y="216360"/>
-            <a:ext cx="1146960" cy="498960"/>
+            <a:ext cx="1146600" cy="498600"/>
           </a:xfrm>
           <a:prstGeom prst="ellipse">
             <a:avLst/>
@@ -5084,7 +5085,7 @@
         <p:spPr>
           <a:xfrm>
             <a:off x="359280" y="1008360"/>
-            <a:ext cx="1146960" cy="498960"/>
+            <a:ext cx="1146600" cy="498600"/>
           </a:xfrm>
           <a:prstGeom prst="ellipse">
             <a:avLst/>
@@ -5139,7 +5140,7 @@
         <p:spPr>
           <a:xfrm>
             <a:off x="358920" y="1800360"/>
-            <a:ext cx="1146960" cy="498960"/>
+            <a:ext cx="1146600" cy="498600"/>
           </a:xfrm>
           <a:prstGeom prst="ellipse">
             <a:avLst/>
@@ -5194,7 +5195,7 @@
         <p:spPr>
           <a:xfrm>
             <a:off x="1906560" y="1836360"/>
-            <a:ext cx="1146960" cy="498960"/>
+            <a:ext cx="1146600" cy="498600"/>
           </a:xfrm>
           <a:prstGeom prst="ellipse">
             <a:avLst/>
@@ -5249,7 +5250,7 @@
         <p:spPr>
           <a:xfrm>
             <a:off x="4211280" y="360"/>
-            <a:ext cx="1146960" cy="498960"/>
+            <a:ext cx="1146600" cy="498600"/>
           </a:xfrm>
           <a:prstGeom prst="ellipse">
             <a:avLst/>
@@ -5304,7 +5305,7 @@
         <p:spPr>
           <a:xfrm>
             <a:off x="6226920" y="360"/>
-            <a:ext cx="1146960" cy="498960"/>
+            <a:ext cx="1146600" cy="498600"/>
           </a:xfrm>
           <a:prstGeom prst="ellipse">
             <a:avLst/>
@@ -5359,7 +5360,7 @@
         <p:spPr>
           <a:xfrm>
             <a:off x="4210920" y="360"/>
-            <a:ext cx="1146960" cy="498960"/>
+            <a:ext cx="1146600" cy="498600"/>
           </a:xfrm>
           <a:prstGeom prst="ellipse">
             <a:avLst/>
@@ -5414,7 +5415,7 @@
         <p:spPr>
           <a:xfrm>
             <a:off x="7738920" y="252360"/>
-            <a:ext cx="1146960" cy="498960"/>
+            <a:ext cx="1146600" cy="498600"/>
           </a:xfrm>
           <a:prstGeom prst="ellipse">
             <a:avLst/>
@@ -5469,7 +5470,7 @@
         <p:spPr>
           <a:xfrm>
             <a:off x="7810920" y="936360"/>
-            <a:ext cx="1146960" cy="498960"/>
+            <a:ext cx="1146600" cy="498600"/>
           </a:xfrm>
           <a:prstGeom prst="ellipse">
             <a:avLst/>
@@ -7005,7 +7006,7 @@
         <p:spPr>
           <a:xfrm>
             <a:off x="576000" y="4320000"/>
-            <a:ext cx="2443320" cy="341640"/>
+            <a:ext cx="2442960" cy="341280"/>
           </a:xfrm>
           <a:prstGeom prst="rect">
             <a:avLst/>
@@ -7056,7 +7057,7 @@
         <p:spPr>
           <a:xfrm>
             <a:off x="7092000" y="3672000"/>
-            <a:ext cx="2443320" cy="341640"/>
+            <a:ext cx="2442960" cy="341280"/>
           </a:xfrm>
           <a:prstGeom prst="rect">
             <a:avLst/>
@@ -7107,7 +7108,7 @@
         <p:spPr>
           <a:xfrm>
             <a:off x="3744000" y="5328000"/>
-            <a:ext cx="2443320" cy="341640"/>
+            <a:ext cx="2442960" cy="341280"/>
           </a:xfrm>
           <a:prstGeom prst="rect">
             <a:avLst/>
@@ -7188,7 +7189,7 @@
         <p:spPr>
           <a:xfrm>
             <a:off x="5934960" y="1050480"/>
-            <a:ext cx="1691640" cy="1002600"/>
+            <a:ext cx="1691280" cy="1002240"/>
           </a:xfrm>
           <a:prstGeom prst="rect">
             <a:avLst/>
@@ -7218,7 +7219,7 @@
         <p:spPr>
           <a:xfrm>
             <a:off x="1908000" y="1152000"/>
-            <a:ext cx="1433160" cy="785160"/>
+            <a:ext cx="1432800" cy="784800"/>
           </a:xfrm>
           <a:prstGeom prst="rect">
             <a:avLst/>
@@ -7273,7 +7274,7 @@
         <p:spPr>
           <a:xfrm>
             <a:off x="6084000" y="1152000"/>
-            <a:ext cx="1433160" cy="785160"/>
+            <a:ext cx="1432800" cy="784800"/>
           </a:xfrm>
           <a:prstGeom prst="rect">
             <a:avLst/>
@@ -7328,7 +7329,7 @@
         <p:spPr>
           <a:xfrm>
             <a:off x="4032000" y="864000"/>
-            <a:ext cx="1433160" cy="1361160"/>
+            <a:ext cx="1432800" cy="1360800"/>
           </a:xfrm>
           <a:custGeom>
             <a:avLst/>
@@ -7460,7 +7461,7 @@
         <p:spPr>
           <a:xfrm>
             <a:off x="1548000" y="576000"/>
-            <a:ext cx="2119320" cy="463320"/>
+            <a:ext cx="2118960" cy="462960"/>
           </a:xfrm>
           <a:prstGeom prst="rect">
             <a:avLst/>
@@ -7566,7 +7567,7 @@
         <p:spPr>
           <a:xfrm>
             <a:off x="5760000" y="576000"/>
-            <a:ext cx="2119320" cy="463320"/>
+            <a:ext cx="2118960" cy="462960"/>
           </a:xfrm>
           <a:prstGeom prst="rect">
             <a:avLst/>
@@ -7617,7 +7618,7 @@
         <p:spPr>
           <a:xfrm>
             <a:off x="216000" y="2376000"/>
-            <a:ext cx="2119320" cy="2587320"/>
+            <a:ext cx="2118960" cy="2586960"/>
           </a:xfrm>
           <a:prstGeom prst="rect">
             <a:avLst/>
@@ -8326,7 +8327,7 @@
         <p:spPr>
           <a:xfrm>
             <a:off x="1945800" y="3636000"/>
-            <a:ext cx="1433160" cy="785160"/>
+            <a:ext cx="1432800" cy="784800"/>
           </a:xfrm>
           <a:prstGeom prst="rect">
             <a:avLst/>
@@ -8401,7 +8402,7 @@
         <p:spPr>
           <a:xfrm>
             <a:off x="6300000" y="3673800"/>
-            <a:ext cx="1433160" cy="785160"/>
+            <a:ext cx="1432800" cy="784800"/>
           </a:xfrm>
           <a:prstGeom prst="rect">
             <a:avLst/>
@@ -8530,7 +8531,7 @@
         <p:spPr>
           <a:xfrm>
             <a:off x="1764000" y="4860000"/>
-            <a:ext cx="7121880" cy="596160"/>
+            <a:ext cx="7121520" cy="595800"/>
           </a:xfrm>
           <a:prstGeom prst="rect">
             <a:avLst/>
@@ -8556,7 +8557,7 @@
         <p:spPr>
           <a:xfrm>
             <a:off x="4140000" y="1080000"/>
-            <a:ext cx="1433160" cy="785160"/>
+            <a:ext cx="1432800" cy="784800"/>
           </a:xfrm>
           <a:prstGeom prst="rect">
             <a:avLst/>
@@ -8611,7 +8612,7 @@
         <p:spPr>
           <a:xfrm>
             <a:off x="4392000" y="2267640"/>
-            <a:ext cx="930960" cy="1002960"/>
+            <a:ext cx="930600" cy="1002600"/>
           </a:xfrm>
           <a:custGeom>
             <a:avLst/>
@@ -8660,7 +8661,7 @@
         <p:spPr>
           <a:xfrm>
             <a:off x="4572000" y="2304000"/>
-            <a:ext cx="642960" cy="341280"/>
+            <a:ext cx="642600" cy="340920"/>
           </a:xfrm>
           <a:prstGeom prst="rect">
             <a:avLst/>
@@ -8792,7 +8793,7 @@
         <p:spPr>
           <a:xfrm>
             <a:off x="2592000" y="432000"/>
-            <a:ext cx="1146960" cy="498960"/>
+            <a:ext cx="1146600" cy="498600"/>
           </a:xfrm>
           <a:prstGeom prst="ellipse">
             <a:avLst/>
@@ -8847,7 +8848,7 @@
         <p:spPr>
           <a:xfrm>
             <a:off x="4104360" y="360360"/>
-            <a:ext cx="1146960" cy="498960"/>
+            <a:ext cx="1146600" cy="498600"/>
           </a:xfrm>
           <a:prstGeom prst="ellipse">
             <a:avLst/>
@@ -8902,7 +8903,7 @@
         <p:spPr>
           <a:xfrm>
             <a:off x="5652720" y="432720"/>
-            <a:ext cx="1146960" cy="498960"/>
+            <a:ext cx="1146600" cy="498600"/>
           </a:xfrm>
           <a:prstGeom prst="ellipse">
             <a:avLst/>
@@ -8957,7 +8958,7 @@
         <p:spPr>
           <a:xfrm>
             <a:off x="3813480" y="4321080"/>
-            <a:ext cx="1146960" cy="498960"/>
+            <a:ext cx="1146600" cy="498600"/>
           </a:xfrm>
           <a:prstGeom prst="ellipse">
             <a:avLst/>
@@ -9012,7 +9013,7 @@
         <p:spPr>
           <a:xfrm>
             <a:off x="2193840" y="4717440"/>
-            <a:ext cx="1146960" cy="498960"/>
+            <a:ext cx="1146600" cy="498600"/>
           </a:xfrm>
           <a:prstGeom prst="ellipse">
             <a:avLst/>
@@ -9067,7 +9068,7 @@
         <p:spPr>
           <a:xfrm>
             <a:off x="682200" y="4501800"/>
-            <a:ext cx="1146960" cy="498960"/>
+            <a:ext cx="1146600" cy="498600"/>
           </a:xfrm>
           <a:prstGeom prst="ellipse">
             <a:avLst/>
@@ -9122,7 +9123,7 @@
         <p:spPr>
           <a:xfrm>
             <a:off x="5434560" y="4574160"/>
-            <a:ext cx="1146960" cy="498960"/>
+            <a:ext cx="1146600" cy="498600"/>
           </a:xfrm>
           <a:prstGeom prst="ellipse">
             <a:avLst/>
@@ -9177,7 +9178,7 @@
         <p:spPr>
           <a:xfrm>
             <a:off x="7634160" y="4574520"/>
-            <a:ext cx="1146960" cy="498960"/>
+            <a:ext cx="1146600" cy="498600"/>
           </a:xfrm>
           <a:prstGeom prst="ellipse">
             <a:avLst/>
@@ -9232,7 +9233,7 @@
         <p:spPr>
           <a:xfrm>
             <a:off x="686520" y="3098880"/>
-            <a:ext cx="1146960" cy="498960"/>
+            <a:ext cx="1146600" cy="498600"/>
           </a:xfrm>
           <a:prstGeom prst="ellipse">
             <a:avLst/>
@@ -9530,7 +9531,7 @@
         <p:spPr>
           <a:xfrm>
             <a:off x="216000" y="288000"/>
-            <a:ext cx="2371320" cy="2299320"/>
+            <a:ext cx="2370960" cy="2298960"/>
           </a:xfrm>
           <a:prstGeom prst="rect">
             <a:avLst/>
@@ -9651,7 +9652,7 @@
         <p:spPr>
           <a:xfrm>
             <a:off x="1908000" y="936000"/>
-            <a:ext cx="1433160" cy="785160"/>
+            <a:ext cx="1432800" cy="784800"/>
           </a:xfrm>
           <a:prstGeom prst="rect">
             <a:avLst/>
@@ -9706,7 +9707,7 @@
         <p:spPr>
           <a:xfrm>
             <a:off x="6084000" y="936000"/>
-            <a:ext cx="1433160" cy="785160"/>
+            <a:ext cx="1432800" cy="784800"/>
           </a:xfrm>
           <a:prstGeom prst="rect">
             <a:avLst/>
@@ -9761,7 +9762,7 @@
         <p:spPr>
           <a:xfrm>
             <a:off x="4934160" y="4392000"/>
-            <a:ext cx="1433160" cy="785160"/>
+            <a:ext cx="1432800" cy="784800"/>
           </a:xfrm>
           <a:prstGeom prst="rect">
             <a:avLst/>
@@ -9816,7 +9817,7 @@
         <p:spPr>
           <a:xfrm>
             <a:off x="4032000" y="648000"/>
-            <a:ext cx="1433160" cy="1361160"/>
+            <a:ext cx="1432800" cy="1360800"/>
           </a:xfrm>
           <a:custGeom>
             <a:avLst/>
@@ -9914,7 +9915,7 @@
         <p:spPr>
           <a:xfrm>
             <a:off x="1908000" y="3204360"/>
-            <a:ext cx="1433160" cy="1361160"/>
+            <a:ext cx="1432800" cy="1360800"/>
           </a:xfrm>
           <a:custGeom>
             <a:avLst/>
@@ -10066,7 +10067,7 @@
         <p:spPr>
           <a:xfrm>
             <a:off x="4140000" y="2234160"/>
-            <a:ext cx="1147320" cy="569160"/>
+            <a:ext cx="1146960" cy="568800"/>
           </a:xfrm>
           <a:prstGeom prst="ellipse">
             <a:avLst/>
@@ -10121,7 +10122,7 @@
         <p:spPr>
           <a:xfrm>
             <a:off x="3708360" y="3636360"/>
-            <a:ext cx="1074960" cy="569160"/>
+            <a:ext cx="1074600" cy="568800"/>
           </a:xfrm>
           <a:prstGeom prst="ellipse">
             <a:avLst/>
@@ -10230,7 +10231,7 @@
         <p:spPr>
           <a:xfrm>
             <a:off x="504000" y="396000"/>
-            <a:ext cx="1147320" cy="569160"/>
+            <a:ext cx="1146960" cy="568800"/>
           </a:xfrm>
           <a:prstGeom prst="ellipse">
             <a:avLst/>
@@ -10285,7 +10286,7 @@
         <p:spPr>
           <a:xfrm>
             <a:off x="1944000" y="180000"/>
-            <a:ext cx="1147320" cy="569160"/>
+            <a:ext cx="1146960" cy="568800"/>
           </a:xfrm>
           <a:prstGeom prst="ellipse">
             <a:avLst/>
@@ -10340,7 +10341,7 @@
         <p:spPr>
           <a:xfrm>
             <a:off x="288000" y="1152000"/>
-            <a:ext cx="1147320" cy="569160"/>
+            <a:ext cx="1146960" cy="568800"/>
           </a:xfrm>
           <a:prstGeom prst="ellipse">
             <a:avLst/>
@@ -10395,7 +10396,7 @@
         <p:spPr>
           <a:xfrm>
             <a:off x="5940000" y="180000"/>
-            <a:ext cx="1147320" cy="569160"/>
+            <a:ext cx="1146960" cy="568800"/>
           </a:xfrm>
           <a:prstGeom prst="ellipse">
             <a:avLst/>
@@ -10450,7 +10451,7 @@
         <p:spPr>
           <a:xfrm>
             <a:off x="7560000" y="180000"/>
-            <a:ext cx="1147320" cy="569160"/>
+            <a:ext cx="1146960" cy="568800"/>
           </a:xfrm>
           <a:prstGeom prst="ellipse">
             <a:avLst/>
@@ -10505,7 +10506,7 @@
         <p:spPr>
           <a:xfrm>
             <a:off x="7992000" y="972000"/>
-            <a:ext cx="1147320" cy="569160"/>
+            <a:ext cx="1146960" cy="568800"/>
           </a:xfrm>
           <a:prstGeom prst="ellipse">
             <a:avLst/>
@@ -10587,7 +10588,7 @@
         <p:spPr>
           <a:xfrm>
             <a:off x="432000" y="3636360"/>
-            <a:ext cx="1074960" cy="569160"/>
+            <a:ext cx="1074600" cy="568800"/>
           </a:xfrm>
           <a:prstGeom prst="ellipse">
             <a:avLst/>
@@ -10642,7 +10643,7 @@
         <p:spPr>
           <a:xfrm>
             <a:off x="6803640" y="4068360"/>
-            <a:ext cx="1074960" cy="569160"/>
+            <a:ext cx="1074600" cy="568800"/>
           </a:xfrm>
           <a:prstGeom prst="ellipse">
             <a:avLst/>
@@ -10697,7 +10698,7 @@
         <p:spPr>
           <a:xfrm>
             <a:off x="6839280" y="4752360"/>
-            <a:ext cx="1074960" cy="569160"/>
+            <a:ext cx="1074600" cy="568800"/>
           </a:xfrm>
           <a:prstGeom prst="ellipse">
             <a:avLst/>
@@ -11107,7 +11108,7 @@
         <p:spPr>
           <a:xfrm>
             <a:off x="2556000" y="1152000"/>
-            <a:ext cx="4531680" cy="355680"/>
+            <a:ext cx="4531320" cy="355320"/>
           </a:xfrm>
           <a:prstGeom prst="rect">
             <a:avLst/>
@@ -11957,7 +11958,7 @@
         <p:spPr>
           <a:xfrm>
             <a:off x="3492000" y="3541680"/>
-            <a:ext cx="3020760" cy="343080"/>
+            <a:ext cx="3020400" cy="342720"/>
           </a:xfrm>
           <a:prstGeom prst="rect">
             <a:avLst/>
@@ -12008,7 +12009,7 @@
         <p:spPr>
           <a:xfrm>
             <a:off x="144000" y="3564000"/>
-            <a:ext cx="3020760" cy="343080"/>
+            <a:ext cx="3020400" cy="342720"/>
           </a:xfrm>
           <a:prstGeom prst="rect">
             <a:avLst/>
@@ -12059,7 +12060,7 @@
         <p:spPr>
           <a:xfrm>
             <a:off x="7308000" y="3528000"/>
-            <a:ext cx="3020760" cy="343080"/>
+            <a:ext cx="3020400" cy="342720"/>
           </a:xfrm>
           <a:prstGeom prst="rect">
             <a:avLst/>
@@ -12512,7 +12513,7 @@
         <p:spPr>
           <a:xfrm>
             <a:off x="3492000" y="3541680"/>
-            <a:ext cx="3020760" cy="343080"/>
+            <a:ext cx="3020400" cy="342720"/>
           </a:xfrm>
           <a:prstGeom prst="rect">
             <a:avLst/>
@@ -12563,7 +12564,7 @@
         <p:spPr>
           <a:xfrm>
             <a:off x="144000" y="3564000"/>
-            <a:ext cx="3020760" cy="343080"/>
+            <a:ext cx="3020400" cy="342720"/>
           </a:xfrm>
           <a:prstGeom prst="rect">
             <a:avLst/>
@@ -12614,7 +12615,7 @@
         <p:spPr>
           <a:xfrm>
             <a:off x="7308000" y="3528000"/>
-            <a:ext cx="3020760" cy="343080"/>
+            <a:ext cx="3020400" cy="342720"/>
           </a:xfrm>
           <a:prstGeom prst="rect">
             <a:avLst/>
@@ -13643,7 +13644,7 @@
         <p:spPr>
           <a:xfrm>
             <a:off x="3456000" y="1008000"/>
-            <a:ext cx="3237120" cy="343440"/>
+            <a:ext cx="3236760" cy="343080"/>
           </a:xfrm>
           <a:prstGeom prst="rect">
             <a:avLst/>
@@ -13694,7 +13695,7 @@
         <p:spPr>
           <a:xfrm>
             <a:off x="648000" y="1836000"/>
-            <a:ext cx="3237120" cy="343440"/>
+            <a:ext cx="3236760" cy="343080"/>
           </a:xfrm>
           <a:prstGeom prst="rect">
             <a:avLst/>
@@ -13745,7 +13746,7 @@
         <p:spPr>
           <a:xfrm>
             <a:off x="5436000" y="2160000"/>
-            <a:ext cx="3237120" cy="343440"/>
+            <a:ext cx="3236760" cy="343080"/>
           </a:xfrm>
           <a:prstGeom prst="rect">
             <a:avLst/>
@@ -13823,7 +13824,7 @@
         <p:spPr>
           <a:xfrm>
             <a:off x="8676000" y="2988000"/>
-            <a:ext cx="1041120" cy="753120"/>
+            <a:ext cx="1040760" cy="752760"/>
           </a:xfrm>
           <a:prstGeom prst="rect">
             <a:avLst/>
@@ -13961,7 +13962,7 @@
         <p:spPr>
           <a:xfrm>
             <a:off x="2448000" y="4464000"/>
-            <a:ext cx="5829120" cy="753120"/>
+            <a:ext cx="5828760" cy="752760"/>
           </a:xfrm>
           <a:prstGeom prst="rect">
             <a:avLst/>
@@ -15823,7 +15824,7 @@
         <p:spPr>
           <a:xfrm>
             <a:off x="1728000" y="1741680"/>
-            <a:ext cx="1149480" cy="343800"/>
+            <a:ext cx="1149120" cy="343440"/>
           </a:xfrm>
           <a:prstGeom prst="rect">
             <a:avLst/>
@@ -15874,7 +15875,7 @@
         <p:spPr>
           <a:xfrm>
             <a:off x="6480000" y="648000"/>
-            <a:ext cx="1689480" cy="343800"/>
+            <a:ext cx="1689120" cy="343440"/>
           </a:xfrm>
           <a:prstGeom prst="rect">
             <a:avLst/>
@@ -15955,7 +15956,7 @@
         <p:spPr>
           <a:xfrm>
             <a:off x="1908000" y="936000"/>
-            <a:ext cx="1433160" cy="785160"/>
+            <a:ext cx="1432800" cy="784800"/>
           </a:xfrm>
           <a:prstGeom prst="rect">
             <a:avLst/>
@@ -16010,7 +16011,7 @@
         <p:spPr>
           <a:xfrm>
             <a:off x="6084000" y="936000"/>
-            <a:ext cx="1433160" cy="785160"/>
+            <a:ext cx="1432800" cy="784800"/>
           </a:xfrm>
           <a:prstGeom prst="rect">
             <a:avLst/>
@@ -16065,7 +16066,7 @@
         <p:spPr>
           <a:xfrm>
             <a:off x="1908000" y="4068000"/>
-            <a:ext cx="1433160" cy="785160"/>
+            <a:ext cx="1432800" cy="784800"/>
           </a:xfrm>
           <a:prstGeom prst="rect">
             <a:avLst/>
@@ -16120,7 +16121,7 @@
         <p:spPr>
           <a:xfrm>
             <a:off x="4032000" y="648000"/>
-            <a:ext cx="1433160" cy="1361160"/>
+            <a:ext cx="1432800" cy="1360800"/>
           </a:xfrm>
           <a:custGeom>
             <a:avLst/>
@@ -16218,7 +16219,7 @@
         <p:spPr>
           <a:xfrm>
             <a:off x="1872000" y="2232360"/>
-            <a:ext cx="1433160" cy="1361160"/>
+            <a:ext cx="1432800" cy="1360800"/>
           </a:xfrm>
           <a:custGeom>
             <a:avLst/>
@@ -16424,7 +16425,7 @@
         <p:spPr>
           <a:xfrm>
             <a:off x="5184000" y="2340000"/>
-            <a:ext cx="2009160" cy="569160"/>
+            <a:ext cx="2008800" cy="568800"/>
           </a:xfrm>
           <a:prstGeom prst="ellipse">
             <a:avLst/>
@@ -16479,7 +16480,7 @@
         <p:spPr>
           <a:xfrm>
             <a:off x="3960360" y="3240360"/>
-            <a:ext cx="2009160" cy="569160"/>
+            <a:ext cx="2008800" cy="568800"/>
           </a:xfrm>
           <a:prstGeom prst="ellipse">
             <a:avLst/>
@@ -16822,7 +16823,7 @@
         <p:spPr>
           <a:xfrm>
             <a:off x="144000" y="2057400"/>
-            <a:ext cx="2512440" cy="600120"/>
+            <a:ext cx="2512080" cy="599760"/>
           </a:xfrm>
           <a:prstGeom prst="rect">
             <a:avLst/>
@@ -16873,7 +16874,7 @@
         <p:spPr>
           <a:xfrm>
             <a:off x="3405600" y="976680"/>
-            <a:ext cx="2969640" cy="344160"/>
+            <a:ext cx="2969280" cy="343800"/>
           </a:xfrm>
           <a:prstGeom prst="rect">
             <a:avLst/>
@@ -17008,7 +17009,7 @@
         <p:spPr>
           <a:xfrm>
             <a:off x="457200" y="3742200"/>
-            <a:ext cx="2969640" cy="856080"/>
+            <a:ext cx="2969280" cy="855720"/>
           </a:xfrm>
           <a:prstGeom prst="rect">
             <a:avLst/>
@@ -17059,7 +17060,7 @@
         <p:spPr>
           <a:xfrm>
             <a:off x="3866400" y="3742200"/>
-            <a:ext cx="2532240" cy="1112040"/>
+            <a:ext cx="2531880" cy="1111680"/>
           </a:xfrm>
           <a:prstGeom prst="rect">
             <a:avLst/>
@@ -17110,7 +17111,7 @@
         <p:spPr>
           <a:xfrm>
             <a:off x="7086600" y="3706200"/>
-            <a:ext cx="2741040" cy="1092240"/>
+            <a:ext cx="2740680" cy="1091880"/>
           </a:xfrm>
           <a:prstGeom prst="rect">
             <a:avLst/>
@@ -17161,7 +17162,7 @@
         <p:spPr>
           <a:xfrm>
             <a:off x="7488360" y="2057760"/>
-            <a:ext cx="2512440" cy="344160"/>
+            <a:ext cx="2512080" cy="343800"/>
           </a:xfrm>
           <a:prstGeom prst="rect">
             <a:avLst/>
@@ -17523,7 +17524,7 @@
         <p:spPr>
           <a:xfrm>
             <a:off x="144000" y="2057400"/>
-            <a:ext cx="2512440" cy="600120"/>
+            <a:ext cx="2512080" cy="599760"/>
           </a:xfrm>
           <a:prstGeom prst="rect">
             <a:avLst/>
@@ -17574,7 +17575,7 @@
         <p:spPr>
           <a:xfrm>
             <a:off x="3405600" y="976680"/>
-            <a:ext cx="2969640" cy="344160"/>
+            <a:ext cx="2969280" cy="343800"/>
           </a:xfrm>
           <a:prstGeom prst="rect">
             <a:avLst/>
@@ -17709,7 +17710,7 @@
         <p:spPr>
           <a:xfrm>
             <a:off x="842400" y="3742200"/>
-            <a:ext cx="1695240" cy="1112040"/>
+            <a:ext cx="1694880" cy="1111680"/>
           </a:xfrm>
           <a:prstGeom prst="rect">
             <a:avLst/>
@@ -17760,7 +17761,7 @@
         <p:spPr>
           <a:xfrm>
             <a:off x="2822400" y="3742200"/>
-            <a:ext cx="2208240" cy="856080"/>
+            <a:ext cx="2207880" cy="855720"/>
           </a:xfrm>
           <a:prstGeom prst="rect">
             <a:avLst/>
@@ -17811,7 +17812,7 @@
         <p:spPr>
           <a:xfrm>
             <a:off x="7772400" y="3706200"/>
-            <a:ext cx="2055240" cy="635040"/>
+            <a:ext cx="2054880" cy="634680"/>
           </a:xfrm>
           <a:prstGeom prst="rect">
             <a:avLst/>
@@ -17862,7 +17863,7 @@
         <p:spPr>
           <a:xfrm>
             <a:off x="7488360" y="2057760"/>
-            <a:ext cx="2512440" cy="344160"/>
+            <a:ext cx="2512080" cy="343800"/>
           </a:xfrm>
           <a:prstGeom prst="rect">
             <a:avLst/>
@@ -17941,7 +17942,7 @@
         <p:spPr>
           <a:xfrm>
             <a:off x="5090400" y="3742200"/>
-            <a:ext cx="2208240" cy="856080"/>
+            <a:ext cx="2207880" cy="855720"/>
           </a:xfrm>
           <a:prstGeom prst="rect">
             <a:avLst/>
@@ -18022,7 +18023,7 @@
         <p:spPr>
           <a:xfrm>
             <a:off x="1564920" y="685800"/>
-            <a:ext cx="178920" cy="344520"/>
+            <a:ext cx="178560" cy="344160"/>
           </a:xfrm>
           <a:prstGeom prst="rect">
             <a:avLst/>
@@ -18048,7 +18049,7 @@
         <p:spPr>
           <a:xfrm>
             <a:off x="228600" y="228600"/>
-            <a:ext cx="1141200" cy="344520"/>
+            <a:ext cx="1140840" cy="344160"/>
           </a:xfrm>
           <a:prstGeom prst="rect">
             <a:avLst/>
@@ -18099,7 +18100,7 @@
         <p:spPr>
           <a:xfrm>
             <a:off x="169200" y="950400"/>
-            <a:ext cx="2055600" cy="455400"/>
+            <a:ext cx="2055240" cy="455040"/>
           </a:xfrm>
           <a:prstGeom prst="rect">
             <a:avLst/>
@@ -18512,7 +18513,7 @@
                       <a:noAutofit/>
                     </a:bodyPr>
                     <a:p>
-                      <a:pPr marL="216000" indent="-214200">
+                      <a:pPr marL="216000" indent="-213840">
                         <a:lnSpc>
                           <a:spcPct val="100000"/>
                         </a:lnSpc>
@@ -18835,7 +18836,7 @@
                       <a:noAutofit/>
                     </a:bodyPr>
                     <a:p>
-                      <a:pPr marL="216000" indent="-214200">
+                      <a:pPr marL="216000" indent="-213840">
                         <a:lnSpc>
                           <a:spcPct val="100000"/>
                         </a:lnSpc>
@@ -19315,7 +19316,7 @@
                       <a:noAutofit/>
                     </a:bodyPr>
                     <a:p>
-                      <a:pPr marL="216000" indent="-214200">
+                      <a:pPr marL="216000" indent="-213840">
                         <a:lnSpc>
                           <a:spcPct val="100000"/>
                         </a:lnSpc>
@@ -19611,7 +19612,7 @@
                       <a:noAutofit/>
                     </a:bodyPr>
                     <a:p>
-                      <a:pPr marL="216000" indent="-214200">
+                      <a:pPr marL="216000" indent="-213840">
                         <a:lnSpc>
                           <a:spcPct val="100000"/>
                         </a:lnSpc>
@@ -19879,7 +19880,7 @@
                       <a:noAutofit/>
                     </a:bodyPr>
                     <a:p>
-                      <a:pPr marL="216000" indent="-214200">
+                      <a:pPr marL="216000" indent="-213840">
                         <a:lnSpc>
                           <a:spcPct val="100000"/>
                         </a:lnSpc>
@@ -20118,7 +20119,7 @@
                       <a:noAutofit/>
                     </a:bodyPr>
                     <a:p>
-                      <a:pPr marL="216000" indent="-214200">
+                      <a:pPr marL="216000" indent="-213840">
                         <a:lnSpc>
                           <a:spcPct val="100000"/>
                         </a:lnSpc>
@@ -20264,7 +20265,7 @@
         <p:spPr>
           <a:xfrm>
             <a:off x="2057400" y="685800"/>
-            <a:ext cx="1141560" cy="344880"/>
+            <a:ext cx="1141200" cy="344520"/>
           </a:xfrm>
           <a:prstGeom prst="rect">
             <a:avLst/>
@@ -20315,7 +20316,7 @@
         <p:spPr>
           <a:xfrm>
             <a:off x="5670720" y="685800"/>
-            <a:ext cx="1141560" cy="344880"/>
+            <a:ext cx="1141200" cy="344520"/>
           </a:xfrm>
           <a:prstGeom prst="rect">
             <a:avLst/>
@@ -20366,7 +20367,7 @@
         <p:spPr>
           <a:xfrm>
             <a:off x="8229600" y="2168280"/>
-            <a:ext cx="1141560" cy="344880"/>
+            <a:ext cx="1141200" cy="344520"/>
           </a:xfrm>
           <a:prstGeom prst="rect">
             <a:avLst/>
@@ -20417,7 +20418,7 @@
         <p:spPr>
           <a:xfrm>
             <a:off x="4572000" y="3311280"/>
-            <a:ext cx="1141560" cy="344880"/>
+            <a:ext cx="1141200" cy="344520"/>
           </a:xfrm>
           <a:prstGeom prst="rect">
             <a:avLst/>
@@ -20554,7 +20555,7 @@
         <p:spPr>
           <a:xfrm>
             <a:off x="1564920" y="685800"/>
-            <a:ext cx="178920" cy="344520"/>
+            <a:ext cx="178560" cy="344160"/>
           </a:xfrm>
           <a:prstGeom prst="rect">
             <a:avLst/>
@@ -20580,7 +20581,7 @@
         <p:spPr>
           <a:xfrm>
             <a:off x="228600" y="228600"/>
-            <a:ext cx="1141200" cy="344520"/>
+            <a:ext cx="1140840" cy="344160"/>
           </a:xfrm>
           <a:prstGeom prst="rect">
             <a:avLst/>
@@ -20753,7 +20754,7 @@
                       <a:noAutofit/>
                     </a:bodyPr>
                     <a:p>
-                      <a:pPr marL="216000" indent="-214200">
+                      <a:pPr marL="216000" indent="-213840">
                         <a:lnSpc>
                           <a:spcPct val="100000"/>
                         </a:lnSpc>
@@ -21233,7 +21234,7 @@
                       <a:noAutofit/>
                     </a:bodyPr>
                     <a:p>
-                      <a:pPr marL="216000" indent="-214200">
+                      <a:pPr marL="216000" indent="-213840">
                         <a:lnSpc>
                           <a:spcPct val="100000"/>
                         </a:lnSpc>
@@ -21501,7 +21502,7 @@
                       <a:noAutofit/>
                     </a:bodyPr>
                     <a:p>
-                      <a:pPr marL="216000" indent="-214200">
+                      <a:pPr marL="216000" indent="-213840">
                         <a:lnSpc>
                           <a:spcPct val="100000"/>
                         </a:lnSpc>
@@ -21769,7 +21770,7 @@
                       <a:noAutofit/>
                     </a:bodyPr>
                     <a:p>
-                      <a:pPr marL="216000" indent="-214200">
+                      <a:pPr marL="216000" indent="-213840">
                         <a:lnSpc>
                           <a:spcPct val="100000"/>
                         </a:lnSpc>
@@ -22008,7 +22009,7 @@
                       <a:noAutofit/>
                     </a:bodyPr>
                     <a:p>
-                      <a:pPr marL="216000" indent="-214200">
+                      <a:pPr marL="216000" indent="-213840">
                         <a:lnSpc>
                           <a:spcPct val="100000"/>
                         </a:lnSpc>
@@ -22276,7 +22277,7 @@
                       <a:noAutofit/>
                     </a:bodyPr>
                     <a:p>
-                      <a:pPr marL="216000" indent="-214200">
+                      <a:pPr marL="216000" indent="-213840">
                         <a:lnSpc>
                           <a:spcPct val="100000"/>
                         </a:lnSpc>
@@ -22450,7 +22451,7 @@
         <p:spPr>
           <a:xfrm>
             <a:off x="6436080" y="1371600"/>
-            <a:ext cx="1141560" cy="344880"/>
+            <a:ext cx="1141200" cy="344520"/>
           </a:xfrm>
           <a:prstGeom prst="rect">
             <a:avLst/>
@@ -22615,7 +22616,7 @@
         <p:spPr>
           <a:xfrm>
             <a:off x="1564920" y="685800"/>
-            <a:ext cx="178920" cy="344520"/>
+            <a:ext cx="178560" cy="344160"/>
           </a:xfrm>
           <a:prstGeom prst="rect">
             <a:avLst/>
@@ -22641,7 +22642,7 @@
         <p:spPr>
           <a:xfrm>
             <a:off x="228600" y="228600"/>
-            <a:ext cx="1141200" cy="344520"/>
+            <a:ext cx="1140840" cy="344160"/>
           </a:xfrm>
           <a:prstGeom prst="rect">
             <a:avLst/>
@@ -22814,7 +22815,7 @@
                       <a:noAutofit/>
                     </a:bodyPr>
                     <a:p>
-                      <a:pPr marL="216000" indent="-214200">
+                      <a:pPr marL="216000" indent="-213840">
                         <a:lnSpc>
                           <a:spcPct val="100000"/>
                         </a:lnSpc>
@@ -23294,7 +23295,7 @@
                       <a:noAutofit/>
                     </a:bodyPr>
                     <a:p>
-                      <a:pPr marL="216000" indent="-214200">
+                      <a:pPr marL="216000" indent="-213840">
                         <a:lnSpc>
                           <a:spcPct val="100000"/>
                         </a:lnSpc>
@@ -23562,7 +23563,7 @@
                       <a:noAutofit/>
                     </a:bodyPr>
                     <a:p>
-                      <a:pPr marL="216000" indent="-214200">
+                      <a:pPr marL="216000" indent="-213840">
                         <a:lnSpc>
                           <a:spcPct val="100000"/>
                         </a:lnSpc>
@@ -23708,7 +23709,7 @@
         <p:spPr>
           <a:xfrm>
             <a:off x="799920" y="4158720"/>
-            <a:ext cx="178920" cy="425520"/>
+            <a:ext cx="178560" cy="425160"/>
           </a:xfrm>
           <a:prstGeom prst="rect">
             <a:avLst/>
@@ -23856,7 +23857,7 @@
                       <a:noAutofit/>
                     </a:bodyPr>
                     <a:p>
-                      <a:pPr marL="216000" indent="-214200">
+                      <a:pPr marL="216000" indent="-213840">
                         <a:lnSpc>
                           <a:spcPct val="100000"/>
                         </a:lnSpc>
@@ -24308,7 +24309,7 @@
                       <a:noAutofit/>
                     </a:bodyPr>
                     <a:p>
-                      <a:pPr marL="216000" indent="-214200">
+                      <a:pPr marL="216000" indent="-213840">
                         <a:lnSpc>
                           <a:spcPct val="100000"/>
                         </a:lnSpc>
@@ -24576,7 +24577,7 @@
                       <a:noAutofit/>
                     </a:bodyPr>
                     <a:p>
-                      <a:pPr marL="216000" indent="-214200">
+                      <a:pPr marL="216000" indent="-213840">
                         <a:lnSpc>
                           <a:spcPct val="100000"/>
                         </a:lnSpc>
@@ -25328,7 +25329,7 @@
         <p:spPr>
           <a:xfrm>
             <a:off x="5257800" y="2625480"/>
-            <a:ext cx="1141560" cy="344880"/>
+            <a:ext cx="1141200" cy="344520"/>
           </a:xfrm>
           <a:prstGeom prst="rect">
             <a:avLst/>
@@ -25549,7 +25550,7 @@
         <p:spPr>
           <a:xfrm>
             <a:off x="685800" y="685800"/>
-            <a:ext cx="4114080" cy="345600"/>
+            <a:ext cx="4113720" cy="345240"/>
           </a:xfrm>
           <a:prstGeom prst="rect">
             <a:avLst/>
@@ -25600,7 +25601,7 @@
         <p:spPr>
           <a:xfrm>
             <a:off x="3988800" y="1636200"/>
-            <a:ext cx="913680" cy="913680"/>
+            <a:ext cx="913320" cy="913320"/>
           </a:xfrm>
           <a:prstGeom prst="ellipse">
             <a:avLst/>
@@ -25675,7 +25676,7 @@
         <p:spPr>
           <a:xfrm>
             <a:off x="6841440" y="1622160"/>
-            <a:ext cx="913680" cy="913680"/>
+            <a:ext cx="913320" cy="913320"/>
           </a:xfrm>
           <a:prstGeom prst="ellipse">
             <a:avLst/>
@@ -25730,7 +25731,7 @@
         <p:spPr>
           <a:xfrm>
             <a:off x="1945440" y="2594160"/>
-            <a:ext cx="913680" cy="913680"/>
+            <a:ext cx="913320" cy="913320"/>
           </a:xfrm>
           <a:prstGeom prst="ellipse">
             <a:avLst/>
@@ -25785,7 +25786,7 @@
         <p:spPr>
           <a:xfrm>
             <a:off x="6877440" y="3638160"/>
-            <a:ext cx="913680" cy="913680"/>
+            <a:ext cx="913320" cy="913320"/>
           </a:xfrm>
           <a:prstGeom prst="ellipse">
             <a:avLst/>
@@ -25840,7 +25841,7 @@
         <p:spPr>
           <a:xfrm>
             <a:off x="3997440" y="3638160"/>
-            <a:ext cx="913680" cy="913680"/>
+            <a:ext cx="913320" cy="913320"/>
           </a:xfrm>
           <a:prstGeom prst="ellipse">
             <a:avLst/>
@@ -26065,7 +26066,7 @@
         <p:spPr>
           <a:xfrm>
             <a:off x="360000" y="324000"/>
-            <a:ext cx="6263640" cy="431640"/>
+            <a:ext cx="6263280" cy="431280"/>
           </a:xfrm>
           <a:prstGeom prst="rect">
             <a:avLst/>
@@ -26093,7 +26094,11 @@
             </a:pPr>
             <a:r>
               <a:rPr b="0" lang="en-IN" sz="1800" spc="-1" strike="noStrike">
+                <a:solidFill>
+                  <a:srgbClr val="000000"/>
+                </a:solidFill>
                 <a:latin typeface="Arial"/>
+                <a:ea typeface="DejaVu Sans"/>
               </a:rPr>
               <a:t>Analysis of algorithm to find the maximum of N integers:</a:t>
             </a:r>
@@ -26112,7 +26117,7 @@
         <p:spPr>
           <a:xfrm>
             <a:off x="612000" y="4464000"/>
-            <a:ext cx="719640" cy="647640"/>
+            <a:ext cx="719280" cy="647280"/>
           </a:xfrm>
           <a:prstGeom prst="ellipse">
             <a:avLst/>
@@ -26167,7 +26172,7 @@
         <p:spPr>
           <a:xfrm>
             <a:off x="1512360" y="4464360"/>
-            <a:ext cx="719640" cy="647640"/>
+            <a:ext cx="719280" cy="647280"/>
           </a:xfrm>
           <a:prstGeom prst="ellipse">
             <a:avLst/>
@@ -26222,7 +26227,7 @@
         <p:spPr>
           <a:xfrm>
             <a:off x="2448360" y="4464360"/>
-            <a:ext cx="719640" cy="647640"/>
+            <a:ext cx="719280" cy="647280"/>
           </a:xfrm>
           <a:prstGeom prst="ellipse">
             <a:avLst/>
@@ -26277,7 +26282,7 @@
         <p:spPr>
           <a:xfrm>
             <a:off x="3420360" y="4464360"/>
-            <a:ext cx="719640" cy="647640"/>
+            <a:ext cx="719280" cy="647280"/>
           </a:xfrm>
           <a:prstGeom prst="ellipse">
             <a:avLst/>
@@ -26332,7 +26337,7 @@
         <p:spPr>
           <a:xfrm>
             <a:off x="4392360" y="4464360"/>
-            <a:ext cx="719640" cy="647640"/>
+            <a:ext cx="719280" cy="647280"/>
           </a:xfrm>
           <a:prstGeom prst="ellipse">
             <a:avLst/>
@@ -26387,7 +26392,7 @@
         <p:spPr>
           <a:xfrm>
             <a:off x="5292360" y="4464360"/>
-            <a:ext cx="719640" cy="647640"/>
+            <a:ext cx="719280" cy="647280"/>
           </a:xfrm>
           <a:prstGeom prst="ellipse">
             <a:avLst/>
@@ -26442,7 +26447,7 @@
         <p:spPr>
           <a:xfrm>
             <a:off x="1476360" y="3528360"/>
-            <a:ext cx="719640" cy="647640"/>
+            <a:ext cx="719280" cy="647280"/>
           </a:xfrm>
           <a:prstGeom prst="ellipse">
             <a:avLst/>
@@ -26497,7 +26502,7 @@
         <p:spPr>
           <a:xfrm>
             <a:off x="2412720" y="2988720"/>
-            <a:ext cx="719640" cy="647640"/>
+            <a:ext cx="719280" cy="647280"/>
           </a:xfrm>
           <a:prstGeom prst="ellipse">
             <a:avLst/>
@@ -26552,7 +26557,7 @@
         <p:spPr>
           <a:xfrm>
             <a:off x="3385080" y="2485080"/>
-            <a:ext cx="719640" cy="647640"/>
+            <a:ext cx="719280" cy="647280"/>
           </a:xfrm>
           <a:prstGeom prst="ellipse">
             <a:avLst/>
@@ -26607,7 +26612,7 @@
         <p:spPr>
           <a:xfrm>
             <a:off x="4321440" y="1981440"/>
-            <a:ext cx="719640" cy="647640"/>
+            <a:ext cx="719280" cy="647280"/>
           </a:xfrm>
           <a:prstGeom prst="ellipse">
             <a:avLst/>
@@ -26662,7 +26667,7 @@
         <p:spPr>
           <a:xfrm>
             <a:off x="5257800" y="1549800"/>
-            <a:ext cx="719640" cy="647640"/>
+            <a:ext cx="719280" cy="647280"/>
           </a:xfrm>
           <a:prstGeom prst="ellipse">
             <a:avLst/>
@@ -27297,7 +27302,7 @@
         <p:spPr>
           <a:xfrm>
             <a:off x="360000" y="324000"/>
-            <a:ext cx="6263640" cy="431640"/>
+            <a:ext cx="6263280" cy="431280"/>
           </a:xfrm>
           <a:prstGeom prst="rect">
             <a:avLst/>
@@ -27325,7 +27330,11 @@
             </a:pPr>
             <a:r>
               <a:rPr b="0" lang="en-IN" sz="1800" spc="-1" strike="noStrike">
+                <a:solidFill>
+                  <a:srgbClr val="000000"/>
+                </a:solidFill>
                 <a:latin typeface="Arial"/>
+                <a:ea typeface="DejaVu Sans"/>
               </a:rPr>
               <a:t>Analysis of algorithm to find the maximum of N integers:</a:t>
             </a:r>
@@ -27344,7 +27353,7 @@
         <p:spPr>
           <a:xfrm>
             <a:off x="612000" y="4464000"/>
-            <a:ext cx="719640" cy="647640"/>
+            <a:ext cx="719280" cy="647280"/>
           </a:xfrm>
           <a:prstGeom prst="ellipse">
             <a:avLst/>
@@ -27399,7 +27408,7 @@
         <p:spPr>
           <a:xfrm>
             <a:off x="1512360" y="4464360"/>
-            <a:ext cx="719640" cy="647640"/>
+            <a:ext cx="719280" cy="647280"/>
           </a:xfrm>
           <a:prstGeom prst="ellipse">
             <a:avLst/>
@@ -27454,7 +27463,7 @@
         <p:spPr>
           <a:xfrm>
             <a:off x="2448360" y="4464360"/>
-            <a:ext cx="719640" cy="647640"/>
+            <a:ext cx="719280" cy="647280"/>
           </a:xfrm>
           <a:prstGeom prst="ellipse">
             <a:avLst/>
@@ -27509,7 +27518,7 @@
         <p:spPr>
           <a:xfrm>
             <a:off x="3420360" y="4464360"/>
-            <a:ext cx="719640" cy="647640"/>
+            <a:ext cx="719280" cy="647280"/>
           </a:xfrm>
           <a:prstGeom prst="ellipse">
             <a:avLst/>
@@ -27564,7 +27573,7 @@
         <p:spPr>
           <a:xfrm>
             <a:off x="4392360" y="4464360"/>
-            <a:ext cx="719640" cy="647640"/>
+            <a:ext cx="719280" cy="647280"/>
           </a:xfrm>
           <a:prstGeom prst="ellipse">
             <a:avLst/>
@@ -27619,7 +27628,7 @@
         <p:spPr>
           <a:xfrm>
             <a:off x="5292360" y="4464360"/>
-            <a:ext cx="719640" cy="647640"/>
+            <a:ext cx="719280" cy="647280"/>
           </a:xfrm>
           <a:prstGeom prst="ellipse">
             <a:avLst/>
@@ -27674,7 +27683,7 @@
         <p:spPr>
           <a:xfrm>
             <a:off x="1080360" y="3528360"/>
-            <a:ext cx="719640" cy="647640"/>
+            <a:ext cx="719280" cy="647280"/>
           </a:xfrm>
           <a:prstGeom prst="ellipse">
             <a:avLst/>
@@ -27729,7 +27738,7 @@
         <p:spPr>
           <a:xfrm>
             <a:off x="2880720" y="3492720"/>
-            <a:ext cx="719640" cy="647640"/>
+            <a:ext cx="719280" cy="647280"/>
           </a:xfrm>
           <a:prstGeom prst="ellipse">
             <a:avLst/>
@@ -27784,7 +27793,7 @@
         <p:spPr>
           <a:xfrm>
             <a:off x="2016000" y="2448000"/>
-            <a:ext cx="719640" cy="647640"/>
+            <a:ext cx="719280" cy="647280"/>
           </a:xfrm>
           <a:prstGeom prst="ellipse">
             <a:avLst/>
@@ -27839,7 +27848,7 @@
         <p:spPr>
           <a:xfrm>
             <a:off x="4753440" y="3493440"/>
-            <a:ext cx="719640" cy="647640"/>
+            <a:ext cx="719280" cy="647280"/>
           </a:xfrm>
           <a:prstGeom prst="ellipse">
             <a:avLst/>
@@ -27894,7 +27903,7 @@
         <p:spPr>
           <a:xfrm>
             <a:off x="3096000" y="1440000"/>
-            <a:ext cx="719640" cy="647640"/>
+            <a:ext cx="719280" cy="647280"/>
           </a:xfrm>
           <a:prstGeom prst="ellipse">
             <a:avLst/>
@@ -28259,7 +28268,7 @@
         <p:spPr>
           <a:xfrm>
             <a:off x="5544000" y="834120"/>
-            <a:ext cx="4176000" cy="431640"/>
+            <a:ext cx="4175640" cy="431280"/>
           </a:xfrm>
           <a:prstGeom prst="rect">
             <a:avLst/>
@@ -28287,7 +28296,11 @@
             </a:pPr>
             <a:r>
               <a:rPr b="0" lang="en-IN" sz="1800" spc="-1" strike="noStrike">
+                <a:solidFill>
+                  <a:srgbClr val="000000"/>
+                </a:solidFill>
                 <a:latin typeface="Arial"/>
+                <a:ea typeface="DejaVu Sans"/>
               </a:rPr>
               <a:t>Analysis of algorithm to find the minimum of N integers:</a:t>
             </a:r>
@@ -28306,7 +28319,7 @@
         <p:spPr>
           <a:xfrm>
             <a:off x="576000" y="2880000"/>
-            <a:ext cx="719640" cy="647640"/>
+            <a:ext cx="719280" cy="647280"/>
           </a:xfrm>
           <a:prstGeom prst="ellipse">
             <a:avLst/>
@@ -28361,7 +28374,7 @@
         <p:spPr>
           <a:xfrm>
             <a:off x="1476360" y="2880360"/>
-            <a:ext cx="719640" cy="647640"/>
+            <a:ext cx="719280" cy="647280"/>
           </a:xfrm>
           <a:prstGeom prst="ellipse">
             <a:avLst/>
@@ -28416,7 +28429,7 @@
         <p:spPr>
           <a:xfrm>
             <a:off x="2412360" y="2880360"/>
-            <a:ext cx="719640" cy="647640"/>
+            <a:ext cx="719280" cy="647280"/>
           </a:xfrm>
           <a:prstGeom prst="ellipse">
             <a:avLst/>
@@ -28471,7 +28484,7 @@
         <p:spPr>
           <a:xfrm>
             <a:off x="3384360" y="2880360"/>
-            <a:ext cx="719640" cy="647640"/>
+            <a:ext cx="719280" cy="647280"/>
           </a:xfrm>
           <a:prstGeom prst="ellipse">
             <a:avLst/>
@@ -28526,7 +28539,7 @@
         <p:spPr>
           <a:xfrm>
             <a:off x="4356360" y="2880360"/>
-            <a:ext cx="719640" cy="647640"/>
+            <a:ext cx="719280" cy="647280"/>
           </a:xfrm>
           <a:prstGeom prst="ellipse">
             <a:avLst/>
@@ -28581,7 +28594,7 @@
         <p:spPr>
           <a:xfrm>
             <a:off x="5256360" y="2880360"/>
-            <a:ext cx="719640" cy="647640"/>
+            <a:ext cx="719280" cy="647280"/>
           </a:xfrm>
           <a:prstGeom prst="ellipse">
             <a:avLst/>
@@ -28636,7 +28649,7 @@
         <p:spPr>
           <a:xfrm>
             <a:off x="1044360" y="1944360"/>
-            <a:ext cx="719640" cy="647640"/>
+            <a:ext cx="719280" cy="647280"/>
           </a:xfrm>
           <a:prstGeom prst="ellipse">
             <a:avLst/>
@@ -28691,7 +28704,7 @@
         <p:spPr>
           <a:xfrm>
             <a:off x="2844720" y="1908720"/>
-            <a:ext cx="719640" cy="647640"/>
+            <a:ext cx="719280" cy="647280"/>
           </a:xfrm>
           <a:prstGeom prst="ellipse">
             <a:avLst/>
@@ -28746,7 +28759,7 @@
         <p:spPr>
           <a:xfrm>
             <a:off x="1836000" y="1188000"/>
-            <a:ext cx="719640" cy="647640"/>
+            <a:ext cx="719280" cy="647280"/>
           </a:xfrm>
           <a:prstGeom prst="ellipse">
             <a:avLst/>
@@ -28801,7 +28814,7 @@
         <p:spPr>
           <a:xfrm>
             <a:off x="4717440" y="1909440"/>
-            <a:ext cx="719640" cy="647640"/>
+            <a:ext cx="719280" cy="647280"/>
           </a:xfrm>
           <a:prstGeom prst="ellipse">
             <a:avLst/>
@@ -28856,7 +28869,7 @@
         <p:spPr>
           <a:xfrm>
             <a:off x="3060000" y="432000"/>
-            <a:ext cx="719640" cy="647640"/>
+            <a:ext cx="719280" cy="647280"/>
           </a:xfrm>
           <a:prstGeom prst="ellipse">
             <a:avLst/>
@@ -29275,7 +29288,7 @@
         <p:spPr>
           <a:xfrm>
             <a:off x="1656000" y="4335840"/>
-            <a:ext cx="7056000" cy="1064160"/>
+            <a:ext cx="7055640" cy="1063800"/>
           </a:xfrm>
           <a:prstGeom prst="rect">
             <a:avLst/>
@@ -29303,7 +29316,11 @@
             </a:pPr>
             <a:r>
               <a:rPr b="0" lang="en-IN" sz="1800" spc="-1" strike="noStrike">
+                <a:solidFill>
+                  <a:srgbClr val="000000"/>
+                </a:solidFill>
                 <a:latin typeface="Arial"/>
+                <a:ea typeface="DejaVu Sans"/>
               </a:rPr>
               <a:t>Here the minimum will be in the set of {-1,4,0} which are the numbers that lost in the first knock out set.</a:t>
             </a:r>
@@ -29312,6 +29329,504 @@
             </a:endParaRPr>
           </a:p>
         </p:txBody>
+      </p:sp>
+    </p:spTree>
+  </p:cSld>
+  <mc:AlternateContent>
+    <mc:Choice Requires="p14">
+      <p:transition spd="slow" p14:dur="2000"/>
+    </mc:Choice>
+    <mc:Fallback>
+      <p:transition spd="slow"/>
+    </mc:Fallback>
+  </mc:AlternateContent>
+</p:sld>
+</file>
+
+<file path=ppt/slides/slide29.xml><?xml version="1.0" encoding="utf-8"?>
+<p:sld xmlns:a="http://schemas.openxmlformats.org/drawingml/2006/main" xmlns:p="http://schemas.openxmlformats.org/presentationml/2006/main" xmlns:r="http://schemas.openxmlformats.org/officeDocument/2006/relationships" xmlns:p14="http://schemas.microsoft.com/office/powerpoint/2010/main" xmlns:p15="http://schemas.microsoft.com/office/powerpoint/2012/main" xmlns:mc="http://schemas.openxmlformats.org/markup-compatibility/2006">
+  <p:cSld>
+    <p:spTree>
+      <p:nvGrpSpPr>
+        <p:cNvPr id="1" name=""/>
+        <p:cNvGrpSpPr/>
+        <p:nvPr/>
+      </p:nvGrpSpPr>
+      <p:grpSpPr>
+        <a:xfrm>
+          <a:off x="0" y="0"/>
+          <a:ext cx="0" cy="0"/>
+          <a:chOff x="0" y="0"/>
+          <a:chExt cx="0" cy="0"/>
+        </a:xfrm>
+      </p:grpSpPr>
+      <p:sp>
+        <p:nvSpPr>
+          <p:cNvPr id="607" name="CustomShape 1"/>
+          <p:cNvSpPr/>
+          <p:nvPr/>
+        </p:nvSpPr>
+        <p:spPr>
+          <a:xfrm>
+            <a:off x="2880000" y="504000"/>
+            <a:ext cx="3816000" cy="1080000"/>
+          </a:xfrm>
+          <a:prstGeom prst="rect">
+            <a:avLst/>
+          </a:prstGeom>
+          <a:solidFill>
+            <a:srgbClr val="729fcf"/>
+          </a:solidFill>
+          <a:ln>
+            <a:solidFill>
+              <a:srgbClr val="3465a4"/>
+            </a:solidFill>
+          </a:ln>
+        </p:spPr>
+        <p:style>
+          <a:lnRef idx="0"/>
+          <a:fillRef idx="0"/>
+          <a:effectRef idx="0"/>
+          <a:fontRef idx="minor"/>
+        </p:style>
+        <p:txBody>
+          <a:bodyPr wrap="none" lIns="90000" rIns="90000" tIns="45000" bIns="45000" anchor="ctr">
+            <a:noAutofit/>
+          </a:bodyPr>
+          <a:p>
+            <a:pPr algn="ctr"/>
+            <a:r>
+              <a:rPr b="0" lang="en-IN" sz="1800" spc="-1" strike="noStrike">
+                <a:latin typeface="Arial"/>
+              </a:rPr>
+              <a:t>Processor</a:t>
+            </a:r>
+            <a:endParaRPr b="0" lang="en-IN" sz="1800" spc="-1" strike="noStrike">
+              <a:latin typeface="Arial"/>
+            </a:endParaRPr>
+          </a:p>
+          <a:p>
+            <a:pPr algn="ctr"/>
+            <a:r>
+              <a:rPr b="0" lang="en-IN" sz="1800" spc="-1" strike="noStrike">
+                <a:latin typeface="Arial"/>
+              </a:rPr>
+              <a:t>(Control Unit + Arithmetic Logic Unit)</a:t>
+            </a:r>
+            <a:endParaRPr b="0" lang="en-IN" sz="1800" spc="-1" strike="noStrike">
+              <a:latin typeface="Arial"/>
+            </a:endParaRPr>
+          </a:p>
+        </p:txBody>
+      </p:sp>
+      <p:sp>
+        <p:nvSpPr>
+          <p:cNvPr id="608" name="CustomShape 2"/>
+          <p:cNvSpPr/>
+          <p:nvPr/>
+        </p:nvSpPr>
+        <p:spPr>
+          <a:xfrm>
+            <a:off x="2880000" y="2448000"/>
+            <a:ext cx="3816000" cy="2952000"/>
+          </a:xfrm>
+          <a:prstGeom prst="rect">
+            <a:avLst/>
+          </a:prstGeom>
+          <a:solidFill>
+            <a:srgbClr val="729fcf"/>
+          </a:solidFill>
+          <a:ln>
+            <a:solidFill>
+              <a:srgbClr val="3465a4"/>
+            </a:solidFill>
+          </a:ln>
+        </p:spPr>
+        <p:style>
+          <a:lnRef idx="0"/>
+          <a:fillRef idx="0"/>
+          <a:effectRef idx="0"/>
+          <a:fontRef idx="minor"/>
+        </p:style>
+        <p:txBody>
+          <a:bodyPr wrap="none" lIns="90000" rIns="90000" tIns="45000" bIns="45000" anchor="ctr">
+            <a:noAutofit/>
+          </a:bodyPr>
+          <a:p>
+            <a:pPr algn="ctr"/>
+            <a:r>
+              <a:rPr b="0" lang="en-IN" sz="1800" spc="-1" strike="noStrike">
+                <a:latin typeface="Arial"/>
+              </a:rPr>
+              <a:t>Memory</a:t>
+            </a:r>
+            <a:endParaRPr b="0" lang="en-IN" sz="1800" spc="-1" strike="noStrike">
+              <a:latin typeface="Arial"/>
+            </a:endParaRPr>
+          </a:p>
+          <a:p>
+            <a:pPr algn="ctr"/>
+            <a:r>
+              <a:rPr b="0" lang="en-IN" sz="1800" spc="-1" strike="noStrike">
+                <a:latin typeface="Arial"/>
+              </a:rPr>
+              <a:t>(Primary Memory + </a:t>
+            </a:r>
+            <a:endParaRPr b="0" lang="en-IN" sz="1800" spc="-1" strike="noStrike">
+              <a:latin typeface="Arial"/>
+            </a:endParaRPr>
+          </a:p>
+          <a:p>
+            <a:pPr algn="ctr"/>
+            <a:r>
+              <a:rPr b="0" lang="en-IN" sz="1800" spc="-1" strike="noStrike">
+                <a:latin typeface="Arial"/>
+              </a:rPr>
+              <a:t>Secondary Memory)</a:t>
+            </a:r>
+            <a:endParaRPr b="0" lang="en-IN" sz="1800" spc="-1" strike="noStrike">
+              <a:latin typeface="Arial"/>
+            </a:endParaRPr>
+          </a:p>
+        </p:txBody>
+      </p:sp>
+      <p:sp>
+        <p:nvSpPr>
+          <p:cNvPr id="609" name="CustomShape 3"/>
+          <p:cNvSpPr/>
+          <p:nvPr/>
+        </p:nvSpPr>
+        <p:spPr>
+          <a:xfrm>
+            <a:off x="7416000" y="2952000"/>
+            <a:ext cx="1944000" cy="1008000"/>
+          </a:xfrm>
+          <a:prstGeom prst="rect">
+            <a:avLst/>
+          </a:prstGeom>
+          <a:solidFill>
+            <a:srgbClr val="729fcf"/>
+          </a:solidFill>
+          <a:ln>
+            <a:solidFill>
+              <a:srgbClr val="3465a4"/>
+            </a:solidFill>
+          </a:ln>
+        </p:spPr>
+        <p:style>
+          <a:lnRef idx="0"/>
+          <a:fillRef idx="0"/>
+          <a:effectRef idx="0"/>
+          <a:fontRef idx="minor"/>
+        </p:style>
+        <p:txBody>
+          <a:bodyPr wrap="none" lIns="90000" rIns="90000" tIns="45000" bIns="45000" anchor="ctr">
+            <a:noAutofit/>
+          </a:bodyPr>
+          <a:p>
+            <a:pPr algn="ctr"/>
+            <a:r>
+              <a:rPr b="0" lang="en-IN" sz="1800" spc="-1" strike="noStrike">
+                <a:latin typeface="Arial"/>
+              </a:rPr>
+              <a:t>Output Devices</a:t>
+            </a:r>
+            <a:endParaRPr b="0" lang="en-IN" sz="1800" spc="-1" strike="noStrike">
+              <a:latin typeface="Arial"/>
+            </a:endParaRPr>
+          </a:p>
+        </p:txBody>
+      </p:sp>
+      <p:sp>
+        <p:nvSpPr>
+          <p:cNvPr id="610" name="CustomShape 4"/>
+          <p:cNvSpPr/>
+          <p:nvPr/>
+        </p:nvSpPr>
+        <p:spPr>
+          <a:xfrm>
+            <a:off x="216000" y="2952000"/>
+            <a:ext cx="1944000" cy="1008000"/>
+          </a:xfrm>
+          <a:prstGeom prst="rect">
+            <a:avLst/>
+          </a:prstGeom>
+          <a:solidFill>
+            <a:srgbClr val="729fcf"/>
+          </a:solidFill>
+          <a:ln>
+            <a:solidFill>
+              <a:srgbClr val="3465a4"/>
+            </a:solidFill>
+          </a:ln>
+        </p:spPr>
+        <p:style>
+          <a:lnRef idx="0"/>
+          <a:fillRef idx="0"/>
+          <a:effectRef idx="0"/>
+          <a:fontRef idx="minor"/>
+        </p:style>
+        <p:txBody>
+          <a:bodyPr wrap="none" lIns="90000" rIns="90000" tIns="45000" bIns="45000" anchor="ctr">
+            <a:noAutofit/>
+          </a:bodyPr>
+          <a:p>
+            <a:pPr algn="ctr"/>
+            <a:r>
+              <a:rPr b="0" lang="en-IN" sz="1800" spc="-1" strike="noStrike">
+                <a:latin typeface="Arial"/>
+              </a:rPr>
+              <a:t>Input Devices</a:t>
+            </a:r>
+            <a:endParaRPr b="0" lang="en-IN" sz="1800" spc="-1" strike="noStrike">
+              <a:latin typeface="Arial"/>
+            </a:endParaRPr>
+          </a:p>
+        </p:txBody>
+      </p:sp>
+      <p:sp>
+        <p:nvSpPr>
+          <p:cNvPr id="611" name="CustomShape 5"/>
+          <p:cNvSpPr/>
+          <p:nvPr/>
+        </p:nvSpPr>
+        <p:spPr>
+          <a:xfrm>
+            <a:off x="4536000" y="1800000"/>
+            <a:ext cx="144000" cy="504000"/>
+          </a:xfrm>
+          <a:custGeom>
+            <a:avLst/>
+            <a:gdLst/>
+            <a:ahLst/>
+            <a:rect l="0" t="0" r="r" b="b"/>
+            <a:pathLst>
+              <a:path w="402" h="1401">
+                <a:moveTo>
+                  <a:pt x="100" y="0"/>
+                </a:moveTo>
+                <a:lnTo>
+                  <a:pt x="100" y="1050"/>
+                </a:lnTo>
+                <a:lnTo>
+                  <a:pt x="0" y="1050"/>
+                </a:lnTo>
+                <a:lnTo>
+                  <a:pt x="200" y="1400"/>
+                </a:lnTo>
+                <a:lnTo>
+                  <a:pt x="401" y="1050"/>
+                </a:lnTo>
+                <a:lnTo>
+                  <a:pt x="300" y="1050"/>
+                </a:lnTo>
+                <a:lnTo>
+                  <a:pt x="300" y="0"/>
+                </a:lnTo>
+                <a:lnTo>
+                  <a:pt x="100" y="0"/>
+                </a:lnTo>
+              </a:path>
+            </a:pathLst>
+          </a:custGeom>
+          <a:solidFill>
+            <a:srgbClr val="729fcf"/>
+          </a:solidFill>
+          <a:ln>
+            <a:solidFill>
+              <a:srgbClr val="3465a4"/>
+            </a:solidFill>
+          </a:ln>
+        </p:spPr>
+        <p:style>
+          <a:lnRef idx="0"/>
+          <a:fillRef idx="0"/>
+          <a:effectRef idx="0"/>
+          <a:fontRef idx="minor"/>
+        </p:style>
+      </p:sp>
+      <p:sp>
+        <p:nvSpPr>
+          <p:cNvPr id="612" name="CustomShape 6"/>
+          <p:cNvSpPr/>
+          <p:nvPr/>
+        </p:nvSpPr>
+        <p:spPr>
+          <a:xfrm>
+            <a:off x="4788000" y="1764000"/>
+            <a:ext cx="144000" cy="504000"/>
+          </a:xfrm>
+          <a:custGeom>
+            <a:avLst/>
+            <a:gdLst/>
+            <a:ahLst/>
+            <a:rect l="0" t="0" r="r" b="b"/>
+            <a:pathLst>
+              <a:path w="402" h="1401">
+                <a:moveTo>
+                  <a:pt x="100" y="1400"/>
+                </a:moveTo>
+                <a:lnTo>
+                  <a:pt x="100" y="350"/>
+                </a:lnTo>
+                <a:lnTo>
+                  <a:pt x="0" y="350"/>
+                </a:lnTo>
+                <a:lnTo>
+                  <a:pt x="200" y="0"/>
+                </a:lnTo>
+                <a:lnTo>
+                  <a:pt x="401" y="350"/>
+                </a:lnTo>
+                <a:lnTo>
+                  <a:pt x="300" y="350"/>
+                </a:lnTo>
+                <a:lnTo>
+                  <a:pt x="300" y="1400"/>
+                </a:lnTo>
+                <a:lnTo>
+                  <a:pt x="100" y="1400"/>
+                </a:lnTo>
+              </a:path>
+            </a:pathLst>
+          </a:custGeom>
+          <a:solidFill>
+            <a:srgbClr val="729fcf"/>
+          </a:solidFill>
+          <a:ln>
+            <a:solidFill>
+              <a:srgbClr val="3465a4"/>
+            </a:solidFill>
+          </a:ln>
+        </p:spPr>
+        <p:style>
+          <a:lnRef idx="0"/>
+          <a:fillRef idx="0"/>
+          <a:effectRef idx="0"/>
+          <a:fontRef idx="minor"/>
+        </p:style>
+      </p:sp>
+      <p:sp>
+        <p:nvSpPr>
+          <p:cNvPr id="613" name="CustomShape 7"/>
+          <p:cNvSpPr/>
+          <p:nvPr/>
+        </p:nvSpPr>
+        <p:spPr>
+          <a:xfrm>
+            <a:off x="2304000" y="3384000"/>
+            <a:ext cx="504000" cy="144000"/>
+          </a:xfrm>
+          <a:custGeom>
+            <a:avLst/>
+            <a:gdLst/>
+            <a:ahLst/>
+            <a:rect l="0" t="0" r="r" b="b"/>
+            <a:pathLst>
+              <a:path w="1401" h="402">
+                <a:moveTo>
+                  <a:pt x="0" y="100"/>
+                </a:moveTo>
+                <a:lnTo>
+                  <a:pt x="1050" y="100"/>
+                </a:lnTo>
+                <a:lnTo>
+                  <a:pt x="1050" y="0"/>
+                </a:lnTo>
+                <a:lnTo>
+                  <a:pt x="1400" y="200"/>
+                </a:lnTo>
+                <a:lnTo>
+                  <a:pt x="1050" y="401"/>
+                </a:lnTo>
+                <a:lnTo>
+                  <a:pt x="1050" y="300"/>
+                </a:lnTo>
+                <a:lnTo>
+                  <a:pt x="0" y="300"/>
+                </a:lnTo>
+                <a:lnTo>
+                  <a:pt x="0" y="100"/>
+                </a:lnTo>
+              </a:path>
+            </a:pathLst>
+          </a:custGeom>
+          <a:solidFill>
+            <a:srgbClr val="729fcf"/>
+          </a:solidFill>
+          <a:ln>
+            <a:solidFill>
+              <a:srgbClr val="3465a4"/>
+            </a:solidFill>
+          </a:ln>
+        </p:spPr>
+        <p:style>
+          <a:lnRef idx="0"/>
+          <a:fillRef idx="0"/>
+          <a:effectRef idx="0"/>
+          <a:fontRef idx="minor"/>
+        </p:style>
+      </p:sp>
+      <p:sp>
+        <p:nvSpPr>
+          <p:cNvPr id="614" name="CustomShape 8"/>
+          <p:cNvSpPr/>
+          <p:nvPr/>
+        </p:nvSpPr>
+        <p:spPr>
+          <a:xfrm>
+            <a:off x="6804000" y="3384360"/>
+            <a:ext cx="504000" cy="144000"/>
+          </a:xfrm>
+          <a:custGeom>
+            <a:avLst/>
+            <a:gdLst/>
+            <a:ahLst/>
+            <a:rect l="0" t="0" r="r" b="b"/>
+            <a:pathLst>
+              <a:path w="1401" h="402">
+                <a:moveTo>
+                  <a:pt x="0" y="100"/>
+                </a:moveTo>
+                <a:lnTo>
+                  <a:pt x="1050" y="100"/>
+                </a:lnTo>
+                <a:lnTo>
+                  <a:pt x="1050" y="0"/>
+                </a:lnTo>
+                <a:lnTo>
+                  <a:pt x="1400" y="200"/>
+                </a:lnTo>
+                <a:lnTo>
+                  <a:pt x="1050" y="401"/>
+                </a:lnTo>
+                <a:lnTo>
+                  <a:pt x="1050" y="300"/>
+                </a:lnTo>
+                <a:lnTo>
+                  <a:pt x="0" y="300"/>
+                </a:lnTo>
+                <a:lnTo>
+                  <a:pt x="0" y="100"/>
+                </a:lnTo>
+              </a:path>
+            </a:pathLst>
+          </a:custGeom>
+          <a:solidFill>
+            <a:srgbClr val="729fcf"/>
+          </a:solidFill>
+          <a:ln>
+            <a:solidFill>
+              <a:srgbClr val="3465a4"/>
+            </a:solidFill>
+          </a:ln>
+        </p:spPr>
+        <p:style>
+          <a:lnRef idx="0"/>
+          <a:fillRef idx="0"/>
+          <a:effectRef idx="0"/>
+          <a:fontRef idx="minor"/>
+        </p:style>
       </p:sp>
     </p:spTree>
   </p:cSld>
@@ -29352,7 +29867,7 @@
         <p:spPr>
           <a:xfrm>
             <a:off x="3060000" y="2268000"/>
-            <a:ext cx="1433160" cy="785160"/>
+            <a:ext cx="1432800" cy="784800"/>
           </a:xfrm>
           <a:prstGeom prst="rect">
             <a:avLst/>
@@ -29407,7 +29922,7 @@
         <p:spPr>
           <a:xfrm>
             <a:off x="5832000" y="1980000"/>
-            <a:ext cx="1433160" cy="1361160"/>
+            <a:ext cx="1432800" cy="1360800"/>
           </a:xfrm>
           <a:custGeom>
             <a:avLst/>
@@ -29559,7 +30074,7 @@
         <p:spPr>
           <a:xfrm>
             <a:off x="2376000" y="1044000"/>
-            <a:ext cx="1145160" cy="677160"/>
+            <a:ext cx="1144800" cy="676800"/>
           </a:xfrm>
           <a:prstGeom prst="ellipse">
             <a:avLst/>
@@ -29614,7 +30129,7 @@
         <p:spPr>
           <a:xfrm>
             <a:off x="3780360" y="1044360"/>
-            <a:ext cx="1145160" cy="677160"/>
+            <a:ext cx="1144800" cy="676800"/>
           </a:xfrm>
           <a:prstGeom prst="ellipse">
             <a:avLst/>
@@ -29669,7 +30184,7 @@
         <p:spPr>
           <a:xfrm>
             <a:off x="2376360" y="1044360"/>
-            <a:ext cx="1145160" cy="677160"/>
+            <a:ext cx="1144800" cy="676800"/>
           </a:xfrm>
           <a:prstGeom prst="ellipse">
             <a:avLst/>
@@ -29724,7 +30239,7 @@
         <p:spPr>
           <a:xfrm>
             <a:off x="1512720" y="2160720"/>
-            <a:ext cx="1145160" cy="677160"/>
+            <a:ext cx="1144800" cy="676800"/>
           </a:xfrm>
           <a:prstGeom prst="ellipse">
             <a:avLst/>
@@ -29860,7 +30375,7 @@
         <p:spPr>
           <a:xfrm>
             <a:off x="4500000" y="2376000"/>
-            <a:ext cx="1397160" cy="595440"/>
+            <a:ext cx="1396800" cy="595080"/>
           </a:xfrm>
           <a:prstGeom prst="rect">
             <a:avLst/>
@@ -29911,7 +30426,7 @@
         <p:spPr>
           <a:xfrm>
             <a:off x="4320000" y="3204360"/>
-            <a:ext cx="1397160" cy="595440"/>
+            <a:ext cx="1396800" cy="595080"/>
           </a:xfrm>
           <a:prstGeom prst="rect">
             <a:avLst/>
@@ -29992,7 +30507,7 @@
         <p:spPr>
           <a:xfrm>
             <a:off x="504000" y="576000"/>
-            <a:ext cx="425520" cy="1649520"/>
+            <a:ext cx="425160" cy="1649160"/>
           </a:xfrm>
           <a:prstGeom prst="ellipse">
             <a:avLst/>
@@ -30022,7 +30537,7 @@
         <p:spPr>
           <a:xfrm>
             <a:off x="1440360" y="576360"/>
-            <a:ext cx="425520" cy="1649520"/>
+            <a:ext cx="425160" cy="1649160"/>
           </a:xfrm>
           <a:prstGeom prst="ellipse">
             <a:avLst/>
@@ -30052,7 +30567,7 @@
         <p:spPr>
           <a:xfrm>
             <a:off x="3204720" y="612720"/>
-            <a:ext cx="425520" cy="1649520"/>
+            <a:ext cx="425160" cy="1649160"/>
           </a:xfrm>
           <a:prstGeom prst="ellipse">
             <a:avLst/>
@@ -30082,7 +30597,7 @@
         <p:spPr>
           <a:xfrm>
             <a:off x="4068720" y="576720"/>
-            <a:ext cx="425520" cy="1649520"/>
+            <a:ext cx="425160" cy="1649160"/>
           </a:xfrm>
           <a:prstGeom prst="ellipse">
             <a:avLst/>
@@ -30112,7 +30627,7 @@
         <p:spPr>
           <a:xfrm>
             <a:off x="504720" y="3204720"/>
-            <a:ext cx="425520" cy="1649520"/>
+            <a:ext cx="425160" cy="1649160"/>
           </a:xfrm>
           <a:prstGeom prst="ellipse">
             <a:avLst/>
@@ -30142,7 +30657,7 @@
         <p:spPr>
           <a:xfrm>
             <a:off x="1440720" y="3168720"/>
-            <a:ext cx="425520" cy="1649520"/>
+            <a:ext cx="425160" cy="1649160"/>
           </a:xfrm>
           <a:prstGeom prst="ellipse">
             <a:avLst/>
@@ -30172,7 +30687,7 @@
         <p:spPr>
           <a:xfrm>
             <a:off x="3240720" y="3168720"/>
-            <a:ext cx="425520" cy="1649520"/>
+            <a:ext cx="425160" cy="1649160"/>
           </a:xfrm>
           <a:prstGeom prst="ellipse">
             <a:avLst/>
@@ -30202,7 +30717,7 @@
         <p:spPr>
           <a:xfrm>
             <a:off x="4068720" y="3168720"/>
-            <a:ext cx="425520" cy="1649520"/>
+            <a:ext cx="425160" cy="1649160"/>
           </a:xfrm>
           <a:prstGeom prst="ellipse">
             <a:avLst/>
@@ -30232,7 +30747,7 @@
         <p:spPr>
           <a:xfrm>
             <a:off x="540000" y="936000"/>
-            <a:ext cx="497520" cy="339840"/>
+            <a:ext cx="497160" cy="339480"/>
           </a:xfrm>
           <a:prstGeom prst="rect">
             <a:avLst/>
@@ -30283,7 +30798,7 @@
         <p:spPr>
           <a:xfrm>
             <a:off x="540000" y="1512000"/>
-            <a:ext cx="497520" cy="339840"/>
+            <a:ext cx="497160" cy="339480"/>
           </a:xfrm>
           <a:prstGeom prst="rect">
             <a:avLst/>
@@ -30334,7 +30849,7 @@
         <p:spPr>
           <a:xfrm>
             <a:off x="1512000" y="1512000"/>
-            <a:ext cx="497520" cy="339840"/>
+            <a:ext cx="497160" cy="339480"/>
           </a:xfrm>
           <a:prstGeom prst="rect">
             <a:avLst/>
@@ -30385,7 +30900,7 @@
         <p:spPr>
           <a:xfrm>
             <a:off x="1512000" y="900000"/>
-            <a:ext cx="497520" cy="339840"/>
+            <a:ext cx="497160" cy="339480"/>
           </a:xfrm>
           <a:prstGeom prst="rect">
             <a:avLst/>
@@ -30436,7 +30951,7 @@
         <p:spPr>
           <a:xfrm>
             <a:off x="540000" y="1260000"/>
-            <a:ext cx="497520" cy="339840"/>
+            <a:ext cx="497160" cy="339480"/>
           </a:xfrm>
           <a:prstGeom prst="rect">
             <a:avLst/>
@@ -30487,7 +31002,7 @@
         <p:spPr>
           <a:xfrm>
             <a:off x="1512000" y="1224000"/>
-            <a:ext cx="497520" cy="339840"/>
+            <a:ext cx="497160" cy="339480"/>
           </a:xfrm>
           <a:prstGeom prst="rect">
             <a:avLst/>
@@ -30538,7 +31053,7 @@
         <p:spPr>
           <a:xfrm>
             <a:off x="3240000" y="900000"/>
-            <a:ext cx="497520" cy="339840"/>
+            <a:ext cx="497160" cy="339480"/>
           </a:xfrm>
           <a:prstGeom prst="rect">
             <a:avLst/>
@@ -30589,7 +31104,7 @@
         <p:spPr>
           <a:xfrm>
             <a:off x="4104000" y="900000"/>
-            <a:ext cx="497520" cy="339840"/>
+            <a:ext cx="497160" cy="339480"/>
           </a:xfrm>
           <a:prstGeom prst="rect">
             <a:avLst/>
@@ -30640,7 +31155,7 @@
         <p:spPr>
           <a:xfrm>
             <a:off x="4104000" y="1224000"/>
-            <a:ext cx="497520" cy="339840"/>
+            <a:ext cx="497160" cy="339480"/>
           </a:xfrm>
           <a:prstGeom prst="rect">
             <a:avLst/>
@@ -30691,7 +31206,7 @@
         <p:spPr>
           <a:xfrm>
             <a:off x="4104000" y="1620000"/>
-            <a:ext cx="497520" cy="339840"/>
+            <a:ext cx="497160" cy="339480"/>
           </a:xfrm>
           <a:prstGeom prst="rect">
             <a:avLst/>
@@ -30742,7 +31257,7 @@
         <p:spPr>
           <a:xfrm>
             <a:off x="576000" y="3492000"/>
-            <a:ext cx="497520" cy="339840"/>
+            <a:ext cx="497160" cy="339480"/>
           </a:xfrm>
           <a:prstGeom prst="rect">
             <a:avLst/>
@@ -30793,7 +31308,7 @@
         <p:spPr>
           <a:xfrm>
             <a:off x="576000" y="3852000"/>
-            <a:ext cx="497520" cy="339840"/>
+            <a:ext cx="497160" cy="339480"/>
           </a:xfrm>
           <a:prstGeom prst="rect">
             <a:avLst/>
@@ -30844,7 +31359,7 @@
         <p:spPr>
           <a:xfrm>
             <a:off x="576000" y="4176000"/>
-            <a:ext cx="497520" cy="339840"/>
+            <a:ext cx="497160" cy="339480"/>
           </a:xfrm>
           <a:prstGeom prst="rect">
             <a:avLst/>
@@ -30895,7 +31410,7 @@
         <p:spPr>
           <a:xfrm>
             <a:off x="1476000" y="3492000"/>
-            <a:ext cx="497520" cy="339840"/>
+            <a:ext cx="497160" cy="339480"/>
           </a:xfrm>
           <a:prstGeom prst="rect">
             <a:avLst/>
@@ -30946,7 +31461,7 @@
         <p:spPr>
           <a:xfrm>
             <a:off x="3240000" y="3492000"/>
-            <a:ext cx="497520" cy="339840"/>
+            <a:ext cx="497160" cy="339480"/>
           </a:xfrm>
           <a:prstGeom prst="rect">
             <a:avLst/>
@@ -30997,7 +31512,7 @@
         <p:spPr>
           <a:xfrm>
             <a:off x="3276000" y="3960000"/>
-            <a:ext cx="497520" cy="339840"/>
+            <a:ext cx="497160" cy="339480"/>
           </a:xfrm>
           <a:prstGeom prst="rect">
             <a:avLst/>
@@ -31048,7 +31563,7 @@
         <p:spPr>
           <a:xfrm>
             <a:off x="4140000" y="3492000"/>
-            <a:ext cx="497520" cy="339840"/>
+            <a:ext cx="497160" cy="339480"/>
           </a:xfrm>
           <a:prstGeom prst="rect">
             <a:avLst/>
@@ -31099,7 +31614,7 @@
         <p:spPr>
           <a:xfrm>
             <a:off x="4140000" y="3924000"/>
-            <a:ext cx="497520" cy="339840"/>
+            <a:ext cx="497160" cy="339480"/>
           </a:xfrm>
           <a:prstGeom prst="rect">
             <a:avLst/>
@@ -31447,7 +31962,7 @@
         <p:spPr>
           <a:xfrm>
             <a:off x="540000" y="2412000"/>
-            <a:ext cx="1289520" cy="339840"/>
+            <a:ext cx="1289160" cy="339480"/>
           </a:xfrm>
           <a:prstGeom prst="rect">
             <a:avLst/>
@@ -31498,7 +32013,7 @@
         <p:spPr>
           <a:xfrm>
             <a:off x="3168000" y="2412000"/>
-            <a:ext cx="1433520" cy="389520"/>
+            <a:ext cx="1433160" cy="389160"/>
           </a:xfrm>
           <a:prstGeom prst="rect">
             <a:avLst/>
@@ -31549,7 +32064,7 @@
         <p:spPr>
           <a:xfrm>
             <a:off x="3168000" y="4968000"/>
-            <a:ext cx="1577520" cy="353520"/>
+            <a:ext cx="1577160" cy="353160"/>
           </a:xfrm>
           <a:prstGeom prst="rect">
             <a:avLst/>
@@ -31600,7 +32115,7 @@
         <p:spPr>
           <a:xfrm>
             <a:off x="504000" y="4968000"/>
-            <a:ext cx="1433520" cy="353520"/>
+            <a:ext cx="1433160" cy="353160"/>
           </a:xfrm>
           <a:prstGeom prst="rect">
             <a:avLst/>
@@ -31681,7 +32196,7 @@
         <p:spPr>
           <a:xfrm>
             <a:off x="1872000" y="1008000"/>
-            <a:ext cx="2081880" cy="785880"/>
+            <a:ext cx="2081520" cy="785520"/>
           </a:xfrm>
           <a:prstGeom prst="rect">
             <a:avLst/>
@@ -31711,7 +32226,7 @@
         <p:spPr>
           <a:xfrm>
             <a:off x="5328000" y="756000"/>
-            <a:ext cx="1649880" cy="1217880"/>
+            <a:ext cx="1649520" cy="1217520"/>
           </a:xfrm>
           <a:custGeom>
             <a:avLst/>
@@ -31764,7 +32279,7 @@
         <p:spPr>
           <a:xfrm>
             <a:off x="1872360" y="3672360"/>
-            <a:ext cx="2081880" cy="785880"/>
+            <a:ext cx="2081520" cy="785520"/>
           </a:xfrm>
           <a:prstGeom prst="rect">
             <a:avLst/>
@@ -31794,7 +32309,7 @@
         <p:spPr>
           <a:xfrm>
             <a:off x="5328360" y="3420360"/>
-            <a:ext cx="1649880" cy="1217880"/>
+            <a:ext cx="1649520" cy="1217520"/>
           </a:xfrm>
           <a:custGeom>
             <a:avLst/>
@@ -31902,7 +32417,7 @@
         <p:spPr>
           <a:xfrm>
             <a:off x="1188000" y="2304000"/>
-            <a:ext cx="6905880" cy="340200"/>
+            <a:ext cx="6905520" cy="339840"/>
           </a:xfrm>
           <a:prstGeom prst="rect">
             <a:avLst/>
@@ -31953,7 +32468,7 @@
         <p:spPr>
           <a:xfrm>
             <a:off x="1080000" y="4788000"/>
-            <a:ext cx="7157880" cy="596160"/>
+            <a:ext cx="7157520" cy="595800"/>
           </a:xfrm>
           <a:prstGeom prst="rect">
             <a:avLst/>
@@ -32034,7 +32549,7 @@
         <p:spPr>
           <a:xfrm>
             <a:off x="1908000" y="2232000"/>
-            <a:ext cx="1433160" cy="785160"/>
+            <a:ext cx="1432800" cy="784800"/>
           </a:xfrm>
           <a:prstGeom prst="rect">
             <a:avLst/>
@@ -32089,7 +32604,7 @@
         <p:spPr>
           <a:xfrm>
             <a:off x="6084000" y="2232000"/>
-            <a:ext cx="1433160" cy="785160"/>
+            <a:ext cx="1432800" cy="784800"/>
           </a:xfrm>
           <a:prstGeom prst="rect">
             <a:avLst/>
@@ -32144,7 +32659,7 @@
         <p:spPr>
           <a:xfrm>
             <a:off x="4032000" y="1944000"/>
-            <a:ext cx="1433160" cy="1361160"/>
+            <a:ext cx="1432800" cy="1360800"/>
           </a:xfrm>
           <a:custGeom>
             <a:avLst/>
@@ -32351,7 +32866,7 @@
         <p:spPr>
           <a:xfrm>
             <a:off x="2592000" y="3636000"/>
-            <a:ext cx="7121880" cy="596160"/>
+            <a:ext cx="7121520" cy="595800"/>
           </a:xfrm>
           <a:prstGeom prst="rect">
             <a:avLst/>
@@ -32452,7 +32967,7 @@
         <p:spPr>
           <a:xfrm>
             <a:off x="5934960" y="2130480"/>
-            <a:ext cx="1691640" cy="1002600"/>
+            <a:ext cx="1691280" cy="1002240"/>
           </a:xfrm>
           <a:prstGeom prst="rect">
             <a:avLst/>
@@ -32482,7 +32997,7 @@
         <p:spPr>
           <a:xfrm>
             <a:off x="1908000" y="2232000"/>
-            <a:ext cx="1433160" cy="785160"/>
+            <a:ext cx="1432800" cy="784800"/>
           </a:xfrm>
           <a:prstGeom prst="rect">
             <a:avLst/>
@@ -32537,7 +33052,7 @@
         <p:spPr>
           <a:xfrm>
             <a:off x="6084000" y="2232000"/>
-            <a:ext cx="1433160" cy="785160"/>
+            <a:ext cx="1432800" cy="784800"/>
           </a:xfrm>
           <a:prstGeom prst="rect">
             <a:avLst/>
@@ -32592,7 +33107,7 @@
         <p:spPr>
           <a:xfrm>
             <a:off x="4032000" y="1944000"/>
-            <a:ext cx="1433160" cy="1361160"/>
+            <a:ext cx="1432800" cy="1360800"/>
           </a:xfrm>
           <a:custGeom>
             <a:avLst/>
@@ -32751,7 +33266,7 @@
         <p:spPr>
           <a:xfrm>
             <a:off x="1764000" y="3564000"/>
-            <a:ext cx="7121880" cy="596160"/>
+            <a:ext cx="7121520" cy="595800"/>
           </a:xfrm>
           <a:prstGeom prst="rect">
             <a:avLst/>
@@ -32859,7 +33374,7 @@
         <p:spPr>
           <a:xfrm>
             <a:off x="1945800" y="3636000"/>
-            <a:ext cx="1433160" cy="785160"/>
+            <a:ext cx="1432800" cy="784800"/>
           </a:xfrm>
           <a:prstGeom prst="rect">
             <a:avLst/>
@@ -32934,7 +33449,7 @@
         <p:spPr>
           <a:xfrm>
             <a:off x="6300000" y="3673800"/>
-            <a:ext cx="1433160" cy="785160"/>
+            <a:ext cx="1432800" cy="784800"/>
           </a:xfrm>
           <a:prstGeom prst="rect">
             <a:avLst/>
@@ -33063,7 +33578,7 @@
         <p:spPr>
           <a:xfrm>
             <a:off x="1764000" y="4860000"/>
-            <a:ext cx="7121880" cy="596160"/>
+            <a:ext cx="7121520" cy="595800"/>
           </a:xfrm>
           <a:prstGeom prst="rect">
             <a:avLst/>
@@ -33089,7 +33604,7 @@
         <p:spPr>
           <a:xfrm>
             <a:off x="4140000" y="1080000"/>
-            <a:ext cx="1433160" cy="785160"/>
+            <a:ext cx="1432800" cy="784800"/>
           </a:xfrm>
           <a:prstGeom prst="rect">
             <a:avLst/>
@@ -33144,7 +33659,7 @@
         <p:spPr>
           <a:xfrm>
             <a:off x="4392000" y="2267640"/>
-            <a:ext cx="930960" cy="1002960"/>
+            <a:ext cx="930600" cy="1002600"/>
           </a:xfrm>
           <a:custGeom>
             <a:avLst/>
@@ -33193,7 +33708,7 @@
         <p:spPr>
           <a:xfrm>
             <a:off x="4572000" y="2304000"/>
-            <a:ext cx="642960" cy="341280"/>
+            <a:ext cx="642600" cy="340920"/>
           </a:xfrm>
           <a:prstGeom prst="rect">
             <a:avLst/>
@@ -33325,7 +33840,7 @@
         <p:spPr>
           <a:xfrm>
             <a:off x="2592000" y="432000"/>
-            <a:ext cx="1146960" cy="498960"/>
+            <a:ext cx="1146600" cy="498600"/>
           </a:xfrm>
           <a:prstGeom prst="ellipse">
             <a:avLst/>
@@ -33380,7 +33895,7 @@
         <p:spPr>
           <a:xfrm>
             <a:off x="4104360" y="360360"/>
-            <a:ext cx="1146960" cy="498960"/>
+            <a:ext cx="1146600" cy="498600"/>
           </a:xfrm>
           <a:prstGeom prst="ellipse">
             <a:avLst/>
@@ -33435,7 +33950,7 @@
         <p:spPr>
           <a:xfrm>
             <a:off x="5652720" y="432720"/>
-            <a:ext cx="1146960" cy="498960"/>
+            <a:ext cx="1146600" cy="498600"/>
           </a:xfrm>
           <a:prstGeom prst="ellipse">
             <a:avLst/>
@@ -33490,7 +34005,7 @@
         <p:spPr>
           <a:xfrm>
             <a:off x="3813480" y="4321080"/>
-            <a:ext cx="1146960" cy="498960"/>
+            <a:ext cx="1146600" cy="498600"/>
           </a:xfrm>
           <a:prstGeom prst="ellipse">
             <a:avLst/>
@@ -33545,7 +34060,7 @@
         <p:spPr>
           <a:xfrm>
             <a:off x="2193840" y="4717440"/>
-            <a:ext cx="1146960" cy="498960"/>
+            <a:ext cx="1146600" cy="498600"/>
           </a:xfrm>
           <a:prstGeom prst="ellipse">
             <a:avLst/>
@@ -33600,7 +34115,7 @@
         <p:spPr>
           <a:xfrm>
             <a:off x="682200" y="4501800"/>
-            <a:ext cx="1146960" cy="498960"/>
+            <a:ext cx="1146600" cy="498600"/>
           </a:xfrm>
           <a:prstGeom prst="ellipse">
             <a:avLst/>
@@ -33655,7 +34170,7 @@
         <p:spPr>
           <a:xfrm>
             <a:off x="5434560" y="4574160"/>
-            <a:ext cx="1146960" cy="498960"/>
+            <a:ext cx="1146600" cy="498600"/>
           </a:xfrm>
           <a:prstGeom prst="ellipse">
             <a:avLst/>
@@ -33710,7 +34225,7 @@
         <p:spPr>
           <a:xfrm>
             <a:off x="7634160" y="4574520"/>
-            <a:ext cx="1146960" cy="498960"/>
+            <a:ext cx="1146600" cy="498600"/>
           </a:xfrm>
           <a:prstGeom prst="ellipse">
             <a:avLst/>
@@ -33765,7 +34280,7 @@
         <p:spPr>
           <a:xfrm>
             <a:off x="686520" y="3098880"/>
-            <a:ext cx="1146960" cy="498960"/>
+            <a:ext cx="1146600" cy="498600"/>
           </a:xfrm>
           <a:prstGeom prst="ellipse">
             <a:avLst/>
@@ -34093,7 +34608,7 @@
         <p:spPr>
           <a:xfrm>
             <a:off x="432000" y="72000"/>
-            <a:ext cx="9066960" cy="2514960"/>
+            <a:ext cx="9066600" cy="2514600"/>
           </a:xfrm>
           <a:prstGeom prst="rect">
             <a:avLst/>
@@ -34123,7 +34638,7 @@
         <p:spPr>
           <a:xfrm>
             <a:off x="2016000" y="1188000"/>
-            <a:ext cx="1433160" cy="785160"/>
+            <a:ext cx="1432800" cy="784800"/>
           </a:xfrm>
           <a:prstGeom prst="rect">
             <a:avLst/>
@@ -34178,7 +34693,7 @@
         <p:spPr>
           <a:xfrm>
             <a:off x="6192000" y="1188000"/>
-            <a:ext cx="1433160" cy="785160"/>
+            <a:ext cx="1432800" cy="784800"/>
           </a:xfrm>
           <a:prstGeom prst="rect">
             <a:avLst/>
@@ -34233,7 +34748,7 @@
         <p:spPr>
           <a:xfrm>
             <a:off x="4140000" y="900000"/>
-            <a:ext cx="1433160" cy="1361160"/>
+            <a:ext cx="1432800" cy="1360800"/>
           </a:xfrm>
           <a:custGeom>
             <a:avLst/>
@@ -34392,7 +34907,7 @@
         <p:spPr>
           <a:xfrm>
             <a:off x="-36000" y="3384000"/>
-            <a:ext cx="2622960" cy="596160"/>
+            <a:ext cx="2622600" cy="595800"/>
           </a:xfrm>
           <a:prstGeom prst="rect">
             <a:avLst/>
@@ -34470,7 +34985,7 @@
         <p:spPr>
           <a:xfrm>
             <a:off x="5868360" y="180360"/>
-            <a:ext cx="1146960" cy="498960"/>
+            <a:ext cx="1146600" cy="498600"/>
           </a:xfrm>
           <a:prstGeom prst="ellipse">
             <a:avLst/>
@@ -34525,7 +35040,7 @@
         <p:spPr>
           <a:xfrm>
             <a:off x="7344720" y="216720"/>
-            <a:ext cx="1146960" cy="498960"/>
+            <a:ext cx="1146600" cy="498600"/>
           </a:xfrm>
           <a:prstGeom prst="ellipse">
             <a:avLst/>
@@ -34580,7 +35095,7 @@
         <p:spPr>
           <a:xfrm>
             <a:off x="7921080" y="937080"/>
-            <a:ext cx="1146960" cy="498960"/>
+            <a:ext cx="1146600" cy="498600"/>
           </a:xfrm>
           <a:prstGeom prst="ellipse">
             <a:avLst/>
@@ -34635,7 +35150,7 @@
         <p:spPr>
           <a:xfrm>
             <a:off x="7921440" y="1693440"/>
-            <a:ext cx="1146960" cy="498960"/>
+            <a:ext cx="1146600" cy="498600"/>
           </a:xfrm>
           <a:prstGeom prst="ellipse">
             <a:avLst/>
@@ -34690,7 +35205,7 @@
         <p:spPr>
           <a:xfrm>
             <a:off x="7921440" y="937440"/>
-            <a:ext cx="1146960" cy="498960"/>
+            <a:ext cx="1146600" cy="498600"/>
           </a:xfrm>
           <a:prstGeom prst="ellipse">
             <a:avLst/>
@@ -34745,7 +35260,7 @@
         <p:spPr>
           <a:xfrm>
             <a:off x="2089440" y="433440"/>
-            <a:ext cx="1146960" cy="498960"/>
+            <a:ext cx="1146600" cy="498600"/>
           </a:xfrm>
           <a:prstGeom prst="ellipse">
             <a:avLst/>
@@ -34800,7 +35315,7 @@
         <p:spPr>
           <a:xfrm>
             <a:off x="649800" y="541800"/>
-            <a:ext cx="1146960" cy="498960"/>
+            <a:ext cx="1146600" cy="498600"/>
           </a:xfrm>
           <a:prstGeom prst="ellipse">
             <a:avLst/>
@@ -34855,7 +35370,7 @@
         <p:spPr>
           <a:xfrm>
             <a:off x="4320000" y="3168000"/>
-            <a:ext cx="1037160" cy="786960"/>
+            <a:ext cx="1036800" cy="786600"/>
           </a:xfrm>
           <a:custGeom>
             <a:avLst/>
@@ -34933,7 +35448,7 @@
         <p:spPr>
           <a:xfrm>
             <a:off x="4176000" y="4428000"/>
-            <a:ext cx="1433160" cy="785160"/>
+            <a:ext cx="1432800" cy="784800"/>
           </a:xfrm>
           <a:prstGeom prst="rect">
             <a:avLst/>
@@ -35069,7 +35584,7 @@
         <p:spPr>
           <a:xfrm>
             <a:off x="5870160" y="3782160"/>
-            <a:ext cx="1146960" cy="498960"/>
+            <a:ext cx="1146600" cy="498600"/>
           </a:xfrm>
           <a:prstGeom prst="ellipse">
             <a:avLst/>
@@ -35124,7 +35639,7 @@
         <p:spPr>
           <a:xfrm>
             <a:off x="7380000" y="3115440"/>
-            <a:ext cx="2622960" cy="596160"/>
+            <a:ext cx="2622600" cy="595800"/>
           </a:xfrm>
           <a:prstGeom prst="rect">
             <a:avLst/>

</xml_diff>

<commit_message>
Computer Organization: Part of basic operation of computer
</commit_message>
<xml_diff>
--- a/GATE/images/gate_images.pptx
+++ b/GATE/images/gate_images.pptx
@@ -35,6 +35,7 @@
     <p:sldId id="282" r:id="rId30"/>
     <p:sldId id="283" r:id="rId31"/>
     <p:sldId id="284" r:id="rId32"/>
+    <p:sldId id="285" r:id="rId33"/>
   </p:sldIdLst>
   <p:sldSz cx="10080625" cy="5670550"/>
   <p:notesSz cx="7559675" cy="10691812"/>
@@ -2783,259 +2784,6 @@
         <p:spPr>
           <a:xfrm>
             <a:off x="504000" y="226080"/>
-            <a:ext cx="9071640" cy="946080"/>
-          </a:xfrm>
-          <a:prstGeom prst="rect">
-            <a:avLst/>
-          </a:prstGeom>
-        </p:spPr>
-        <p:txBody>
-          <a:bodyPr lIns="0" rIns="0" tIns="0" bIns="0" anchor="ctr">
-            <a:noAutofit/>
-          </a:bodyPr>
-          <a:p>
-            <a:pPr algn="ctr"/>
-            <a:r>
-              <a:rPr b="0" lang="en-IN" sz="1800" spc="-1" strike="noStrike">
-                <a:latin typeface="Arial"/>
-              </a:rPr>
-              <a:t>Click to edit the title text format</a:t>
-            </a:r>
-            <a:endParaRPr b="0" lang="en-IN" sz="1800" spc="-1" strike="noStrike">
-              <a:latin typeface="Arial"/>
-            </a:endParaRPr>
-          </a:p>
-        </p:txBody>
-      </p:sp>
-      <p:sp>
-        <p:nvSpPr>
-          <p:cNvPr id="1" name="PlaceHolder 2"/>
-          <p:cNvSpPr>
-            <a:spLocks noGrp="1"/>
-          </p:cNvSpPr>
-          <p:nvPr>
-            <p:ph type="body"/>
-          </p:nvPr>
-        </p:nvSpPr>
-        <p:spPr>
-          <a:xfrm>
-            <a:off x="504000" y="1326600"/>
-            <a:ext cx="9071640" cy="3288240"/>
-          </a:xfrm>
-          <a:prstGeom prst="rect">
-            <a:avLst/>
-          </a:prstGeom>
-        </p:spPr>
-        <p:txBody>
-          <a:bodyPr lIns="0" rIns="0" tIns="0" bIns="0">
-            <a:normAutofit/>
-          </a:bodyPr>
-          <a:p>
-            <a:pPr marL="432000" indent="-324000" algn="ctr">
-              <a:spcBef>
-                <a:spcPts val="1417"/>
-              </a:spcBef>
-              <a:buClr>
-                <a:srgbClr val="000000"/>
-              </a:buClr>
-              <a:buSzPct val="45000"/>
-              <a:buFont typeface="Wingdings" charset="2"/>
-              <a:buChar char=""/>
-            </a:pPr>
-            <a:r>
-              <a:rPr b="0" lang="en-IN" sz="1800" spc="-1" strike="noStrike">
-                <a:latin typeface="Arial"/>
-              </a:rPr>
-              <a:t>Click to edit the outline text format</a:t>
-            </a:r>
-            <a:endParaRPr b="0" lang="en-IN" sz="1800" spc="-1" strike="noStrike">
-              <a:latin typeface="Arial"/>
-            </a:endParaRPr>
-          </a:p>
-          <a:p>
-            <a:pPr lvl="1" marL="864000" indent="-324000" algn="ctr">
-              <a:spcBef>
-                <a:spcPts val="1134"/>
-              </a:spcBef>
-              <a:buClr>
-                <a:srgbClr val="000000"/>
-              </a:buClr>
-              <a:buSzPct val="75000"/>
-              <a:buFont typeface="Symbol" charset="2"/>
-              <a:buChar char=""/>
-            </a:pPr>
-            <a:r>
-              <a:rPr b="0" lang="en-IN" sz="1800" spc="-1" strike="noStrike">
-                <a:latin typeface="Arial"/>
-              </a:rPr>
-              <a:t>Second Outline Level</a:t>
-            </a:r>
-            <a:endParaRPr b="0" lang="en-IN" sz="1800" spc="-1" strike="noStrike">
-              <a:latin typeface="Arial"/>
-            </a:endParaRPr>
-          </a:p>
-          <a:p>
-            <a:pPr lvl="2" marL="1296000" indent="-288000" algn="ctr">
-              <a:spcBef>
-                <a:spcPts val="850"/>
-              </a:spcBef>
-              <a:buClr>
-                <a:srgbClr val="000000"/>
-              </a:buClr>
-              <a:buSzPct val="45000"/>
-              <a:buFont typeface="Wingdings" charset="2"/>
-              <a:buChar char=""/>
-            </a:pPr>
-            <a:r>
-              <a:rPr b="0" lang="en-IN" sz="1800" spc="-1" strike="noStrike">
-                <a:latin typeface="Arial"/>
-              </a:rPr>
-              <a:t>Third Outline Level</a:t>
-            </a:r>
-            <a:endParaRPr b="0" lang="en-IN" sz="1800" spc="-1" strike="noStrike">
-              <a:latin typeface="Arial"/>
-            </a:endParaRPr>
-          </a:p>
-          <a:p>
-            <a:pPr lvl="3" marL="1728000" indent="-216000" algn="ctr">
-              <a:spcBef>
-                <a:spcPts val="567"/>
-              </a:spcBef>
-              <a:buClr>
-                <a:srgbClr val="000000"/>
-              </a:buClr>
-              <a:buSzPct val="75000"/>
-              <a:buFont typeface="Symbol" charset="2"/>
-              <a:buChar char=""/>
-            </a:pPr>
-            <a:r>
-              <a:rPr b="0" lang="en-IN" sz="1800" spc="-1" strike="noStrike">
-                <a:latin typeface="Arial"/>
-              </a:rPr>
-              <a:t>Fourth Outline Level</a:t>
-            </a:r>
-            <a:endParaRPr b="0" lang="en-IN" sz="1800" spc="-1" strike="noStrike">
-              <a:latin typeface="Arial"/>
-            </a:endParaRPr>
-          </a:p>
-          <a:p>
-            <a:pPr lvl="4" marL="2160000" indent="-216000" algn="ctr">
-              <a:spcBef>
-                <a:spcPts val="283"/>
-              </a:spcBef>
-              <a:buClr>
-                <a:srgbClr val="000000"/>
-              </a:buClr>
-              <a:buSzPct val="45000"/>
-              <a:buFont typeface="Wingdings" charset="2"/>
-              <a:buChar char=""/>
-            </a:pPr>
-            <a:r>
-              <a:rPr b="0" lang="en-IN" sz="1800" spc="-1" strike="noStrike">
-                <a:latin typeface="Arial"/>
-              </a:rPr>
-              <a:t>Fifth Outline Level</a:t>
-            </a:r>
-            <a:endParaRPr b="0" lang="en-IN" sz="1800" spc="-1" strike="noStrike">
-              <a:latin typeface="Arial"/>
-            </a:endParaRPr>
-          </a:p>
-          <a:p>
-            <a:pPr lvl="5" marL="2592000" indent="-216000" algn="ctr">
-              <a:spcBef>
-                <a:spcPts val="283"/>
-              </a:spcBef>
-              <a:buClr>
-                <a:srgbClr val="000000"/>
-              </a:buClr>
-              <a:buSzPct val="45000"/>
-              <a:buFont typeface="Wingdings" charset="2"/>
-              <a:buChar char=""/>
-            </a:pPr>
-            <a:r>
-              <a:rPr b="0" lang="en-IN" sz="1800" spc="-1" strike="noStrike">
-                <a:latin typeface="Arial"/>
-              </a:rPr>
-              <a:t>Sixth Outline Level</a:t>
-            </a:r>
-            <a:endParaRPr b="0" lang="en-IN" sz="1800" spc="-1" strike="noStrike">
-              <a:latin typeface="Arial"/>
-            </a:endParaRPr>
-          </a:p>
-          <a:p>
-            <a:pPr lvl="6" marL="3024000" indent="-216000" algn="ctr">
-              <a:spcBef>
-                <a:spcPts val="283"/>
-              </a:spcBef>
-              <a:buClr>
-                <a:srgbClr val="000000"/>
-              </a:buClr>
-              <a:buSzPct val="45000"/>
-              <a:buFont typeface="Wingdings" charset="2"/>
-              <a:buChar char=""/>
-            </a:pPr>
-            <a:r>
-              <a:rPr b="0" lang="en-IN" sz="1800" spc="-1" strike="noStrike">
-                <a:latin typeface="Arial"/>
-              </a:rPr>
-              <a:t>Seventh Outline Level</a:t>
-            </a:r>
-            <a:endParaRPr b="0" lang="en-IN" sz="1800" spc="-1" strike="noStrike">
-              <a:latin typeface="Arial"/>
-            </a:endParaRPr>
-          </a:p>
-        </p:txBody>
-      </p:sp>
-    </p:spTree>
-  </p:cSld>
-  <p:clrMap bg1="lt1" bg2="lt2" tx1="dk1" tx2="dk2" accent1="accent1" accent2="accent2" accent3="accent3" accent4="accent4" accent5="accent5" accent6="accent6" hlink="hlink" folHlink="folHlink"/>
-  <p:sldLayoutIdLst>
-    <p:sldLayoutId id="2147483649" r:id="rId2"/>
-    <p:sldLayoutId id="2147483650" r:id="rId3"/>
-    <p:sldLayoutId id="2147483651" r:id="rId4"/>
-    <p:sldLayoutId id="2147483652" r:id="rId5"/>
-    <p:sldLayoutId id="2147483653" r:id="rId6"/>
-    <p:sldLayoutId id="2147483654" r:id="rId7"/>
-    <p:sldLayoutId id="2147483655" r:id="rId8"/>
-    <p:sldLayoutId id="2147483656" r:id="rId9"/>
-    <p:sldLayoutId id="2147483657" r:id="rId10"/>
-    <p:sldLayoutId id="2147483658" r:id="rId11"/>
-    <p:sldLayoutId id="2147483659" r:id="rId12"/>
-    <p:sldLayoutId id="2147483660" r:id="rId13"/>
-  </p:sldLayoutIdLst>
-</p:sldMaster>
-</file>
-
-<file path=ppt/slideMasters/slideMaster2.xml><?xml version="1.0" encoding="utf-8"?>
-<p:sldMaster xmlns:a="http://schemas.openxmlformats.org/drawingml/2006/main" xmlns:p="http://schemas.openxmlformats.org/presentationml/2006/main" xmlns:r="http://schemas.openxmlformats.org/officeDocument/2006/relationships" xmlns:p14="http://schemas.microsoft.com/office/powerpoint/2010/main" xmlns:p15="http://schemas.microsoft.com/office/powerpoint/2012/main" xmlns:mc="http://schemas.openxmlformats.org/markup-compatibility/2006">
-  <p:cSld>
-    <p:spTree>
-      <p:nvGrpSpPr>
-        <p:cNvPr id="1" name=""/>
-        <p:cNvGrpSpPr/>
-        <p:nvPr/>
-      </p:nvGrpSpPr>
-      <p:grpSpPr>
-        <a:xfrm>
-          <a:off x="0" y="0"/>
-          <a:ext cx="0" cy="0"/>
-          <a:chOff x="0" y="0"/>
-          <a:chExt cx="0" cy="0"/>
-        </a:xfrm>
-      </p:grpSpPr>
-      <p:sp>
-        <p:nvSpPr>
-          <p:cNvPr id="38" name="PlaceHolder 1"/>
-          <p:cNvSpPr>
-            <a:spLocks noGrp="1"/>
-          </p:cNvSpPr>
-          <p:nvPr>
-            <p:ph type="title"/>
-          </p:nvPr>
-        </p:nvSpPr>
-        <p:spPr>
-          <a:xfrm>
-            <a:off x="504000" y="226080"/>
             <a:ext cx="9072000" cy="946440"/>
           </a:xfrm>
           <a:prstGeom prst="rect">
@@ -3062,7 +2810,7 @@
       </p:sp>
       <p:sp>
         <p:nvSpPr>
-          <p:cNvPr id="39" name="PlaceHolder 2"/>
+          <p:cNvPr id="1" name="PlaceHolder 2"/>
           <p:cNvSpPr>
             <a:spLocks noGrp="1"/>
           </p:cNvSpPr>
@@ -3243,6 +2991,259 @@
   </p:cSld>
   <p:clrMap bg1="lt1" bg2="lt2" tx1="dk1" tx2="dk2" accent1="accent1" accent2="accent2" accent3="accent3" accent4="accent4" accent5="accent5" accent6="accent6" hlink="hlink" folHlink="folHlink"/>
   <p:sldLayoutIdLst>
+    <p:sldLayoutId id="2147483649" r:id="rId2"/>
+    <p:sldLayoutId id="2147483650" r:id="rId3"/>
+    <p:sldLayoutId id="2147483651" r:id="rId4"/>
+    <p:sldLayoutId id="2147483652" r:id="rId5"/>
+    <p:sldLayoutId id="2147483653" r:id="rId6"/>
+    <p:sldLayoutId id="2147483654" r:id="rId7"/>
+    <p:sldLayoutId id="2147483655" r:id="rId8"/>
+    <p:sldLayoutId id="2147483656" r:id="rId9"/>
+    <p:sldLayoutId id="2147483657" r:id="rId10"/>
+    <p:sldLayoutId id="2147483658" r:id="rId11"/>
+    <p:sldLayoutId id="2147483659" r:id="rId12"/>
+    <p:sldLayoutId id="2147483660" r:id="rId13"/>
+  </p:sldLayoutIdLst>
+</p:sldMaster>
+</file>
+
+<file path=ppt/slideMasters/slideMaster2.xml><?xml version="1.0" encoding="utf-8"?>
+<p:sldMaster xmlns:a="http://schemas.openxmlformats.org/drawingml/2006/main" xmlns:p="http://schemas.openxmlformats.org/presentationml/2006/main" xmlns:r="http://schemas.openxmlformats.org/officeDocument/2006/relationships" xmlns:p14="http://schemas.microsoft.com/office/powerpoint/2010/main" xmlns:p15="http://schemas.microsoft.com/office/powerpoint/2012/main" xmlns:mc="http://schemas.openxmlformats.org/markup-compatibility/2006">
+  <p:cSld>
+    <p:spTree>
+      <p:nvGrpSpPr>
+        <p:cNvPr id="1" name=""/>
+        <p:cNvGrpSpPr/>
+        <p:nvPr/>
+      </p:nvGrpSpPr>
+      <p:grpSpPr>
+        <a:xfrm>
+          <a:off x="0" y="0"/>
+          <a:ext cx="0" cy="0"/>
+          <a:chOff x="0" y="0"/>
+          <a:chExt cx="0" cy="0"/>
+        </a:xfrm>
+      </p:grpSpPr>
+      <p:sp>
+        <p:nvSpPr>
+          <p:cNvPr id="38" name="PlaceHolder 1"/>
+          <p:cNvSpPr>
+            <a:spLocks noGrp="1"/>
+          </p:cNvSpPr>
+          <p:nvPr>
+            <p:ph type="title"/>
+          </p:nvPr>
+        </p:nvSpPr>
+        <p:spPr>
+          <a:xfrm>
+            <a:off x="504000" y="226080"/>
+            <a:ext cx="9072000" cy="946440"/>
+          </a:xfrm>
+          <a:prstGeom prst="rect">
+            <a:avLst/>
+          </a:prstGeom>
+        </p:spPr>
+        <p:txBody>
+          <a:bodyPr lIns="0" rIns="0" tIns="0" bIns="0" anchor="ctr">
+            <a:noAutofit/>
+          </a:bodyPr>
+          <a:p>
+            <a:pPr algn="ctr"/>
+            <a:r>
+              <a:rPr b="0" lang="en-IN" sz="4400" spc="-1" strike="noStrike">
+                <a:latin typeface="Arial"/>
+              </a:rPr>
+              <a:t>Click to edit the title text format</a:t>
+            </a:r>
+            <a:endParaRPr b="0" lang="en-IN" sz="4400" spc="-1" strike="noStrike">
+              <a:latin typeface="Arial"/>
+            </a:endParaRPr>
+          </a:p>
+        </p:txBody>
+      </p:sp>
+      <p:sp>
+        <p:nvSpPr>
+          <p:cNvPr id="39" name="PlaceHolder 2"/>
+          <p:cNvSpPr>
+            <a:spLocks noGrp="1"/>
+          </p:cNvSpPr>
+          <p:nvPr>
+            <p:ph type="body"/>
+          </p:nvPr>
+        </p:nvSpPr>
+        <p:spPr>
+          <a:xfrm>
+            <a:off x="504000" y="1326600"/>
+            <a:ext cx="9072000" cy="3288600"/>
+          </a:xfrm>
+          <a:prstGeom prst="rect">
+            <a:avLst/>
+          </a:prstGeom>
+        </p:spPr>
+        <p:txBody>
+          <a:bodyPr lIns="0" rIns="0" tIns="0" bIns="0">
+            <a:normAutofit/>
+          </a:bodyPr>
+          <a:p>
+            <a:pPr marL="432000" indent="-324000">
+              <a:spcBef>
+                <a:spcPts val="1417"/>
+              </a:spcBef>
+              <a:buClr>
+                <a:srgbClr val="000000"/>
+              </a:buClr>
+              <a:buSzPct val="45000"/>
+              <a:buFont typeface="Wingdings" charset="2"/>
+              <a:buChar char=""/>
+            </a:pPr>
+            <a:r>
+              <a:rPr b="0" lang="en-IN" sz="3200" spc="-1" strike="noStrike">
+                <a:latin typeface="Arial"/>
+              </a:rPr>
+              <a:t>Click to edit the outline text format</a:t>
+            </a:r>
+            <a:endParaRPr b="0" lang="en-IN" sz="3200" spc="-1" strike="noStrike">
+              <a:latin typeface="Arial"/>
+            </a:endParaRPr>
+          </a:p>
+          <a:p>
+            <a:pPr lvl="1" marL="864000" indent="-324000">
+              <a:spcBef>
+                <a:spcPts val="1134"/>
+              </a:spcBef>
+              <a:buClr>
+                <a:srgbClr val="000000"/>
+              </a:buClr>
+              <a:buSzPct val="75000"/>
+              <a:buFont typeface="Symbol" charset="2"/>
+              <a:buChar char=""/>
+            </a:pPr>
+            <a:r>
+              <a:rPr b="0" lang="en-IN" sz="2800" spc="-1" strike="noStrike">
+                <a:latin typeface="Arial"/>
+              </a:rPr>
+              <a:t>Second Outline Level</a:t>
+            </a:r>
+            <a:endParaRPr b="0" lang="en-IN" sz="2800" spc="-1" strike="noStrike">
+              <a:latin typeface="Arial"/>
+            </a:endParaRPr>
+          </a:p>
+          <a:p>
+            <a:pPr lvl="2" marL="1296000" indent="-288000">
+              <a:spcBef>
+                <a:spcPts val="850"/>
+              </a:spcBef>
+              <a:buClr>
+                <a:srgbClr val="000000"/>
+              </a:buClr>
+              <a:buSzPct val="45000"/>
+              <a:buFont typeface="Wingdings" charset="2"/>
+              <a:buChar char=""/>
+            </a:pPr>
+            <a:r>
+              <a:rPr b="0" lang="en-IN" sz="2400" spc="-1" strike="noStrike">
+                <a:latin typeface="Arial"/>
+              </a:rPr>
+              <a:t>Third Outline Level</a:t>
+            </a:r>
+            <a:endParaRPr b="0" lang="en-IN" sz="2400" spc="-1" strike="noStrike">
+              <a:latin typeface="Arial"/>
+            </a:endParaRPr>
+          </a:p>
+          <a:p>
+            <a:pPr lvl="3" marL="1728000" indent="-216000">
+              <a:spcBef>
+                <a:spcPts val="567"/>
+              </a:spcBef>
+              <a:buClr>
+                <a:srgbClr val="000000"/>
+              </a:buClr>
+              <a:buSzPct val="75000"/>
+              <a:buFont typeface="Symbol" charset="2"/>
+              <a:buChar char=""/>
+            </a:pPr>
+            <a:r>
+              <a:rPr b="0" lang="en-IN" sz="2000" spc="-1" strike="noStrike">
+                <a:latin typeface="Arial"/>
+              </a:rPr>
+              <a:t>Fourth Outline Level</a:t>
+            </a:r>
+            <a:endParaRPr b="0" lang="en-IN" sz="2000" spc="-1" strike="noStrike">
+              <a:latin typeface="Arial"/>
+            </a:endParaRPr>
+          </a:p>
+          <a:p>
+            <a:pPr lvl="4" marL="2160000" indent="-216000">
+              <a:spcBef>
+                <a:spcPts val="283"/>
+              </a:spcBef>
+              <a:buClr>
+                <a:srgbClr val="000000"/>
+              </a:buClr>
+              <a:buSzPct val="45000"/>
+              <a:buFont typeface="Wingdings" charset="2"/>
+              <a:buChar char=""/>
+            </a:pPr>
+            <a:r>
+              <a:rPr b="0" lang="en-IN" sz="2000" spc="-1" strike="noStrike">
+                <a:latin typeface="Arial"/>
+              </a:rPr>
+              <a:t>Fifth Outline Level</a:t>
+            </a:r>
+            <a:endParaRPr b="0" lang="en-IN" sz="2000" spc="-1" strike="noStrike">
+              <a:latin typeface="Arial"/>
+            </a:endParaRPr>
+          </a:p>
+          <a:p>
+            <a:pPr lvl="5" marL="2592000" indent="-216000">
+              <a:spcBef>
+                <a:spcPts val="283"/>
+              </a:spcBef>
+              <a:buClr>
+                <a:srgbClr val="000000"/>
+              </a:buClr>
+              <a:buSzPct val="45000"/>
+              <a:buFont typeface="Wingdings" charset="2"/>
+              <a:buChar char=""/>
+            </a:pPr>
+            <a:r>
+              <a:rPr b="0" lang="en-IN" sz="2000" spc="-1" strike="noStrike">
+                <a:latin typeface="Arial"/>
+              </a:rPr>
+              <a:t>Sixth Outline Level</a:t>
+            </a:r>
+            <a:endParaRPr b="0" lang="en-IN" sz="2000" spc="-1" strike="noStrike">
+              <a:latin typeface="Arial"/>
+            </a:endParaRPr>
+          </a:p>
+          <a:p>
+            <a:pPr lvl="6" marL="3024000" indent="-216000">
+              <a:spcBef>
+                <a:spcPts val="283"/>
+              </a:spcBef>
+              <a:buClr>
+                <a:srgbClr val="000000"/>
+              </a:buClr>
+              <a:buSzPct val="45000"/>
+              <a:buFont typeface="Wingdings" charset="2"/>
+              <a:buChar char=""/>
+            </a:pPr>
+            <a:r>
+              <a:rPr b="0" lang="en-IN" sz="2000" spc="-1" strike="noStrike">
+                <a:latin typeface="Arial"/>
+              </a:rPr>
+              <a:t>Seventh Outline Level</a:t>
+            </a:r>
+            <a:endParaRPr b="0" lang="en-IN" sz="2000" spc="-1" strike="noStrike">
+              <a:latin typeface="Arial"/>
+            </a:endParaRPr>
+          </a:p>
+        </p:txBody>
+      </p:sp>
+    </p:spTree>
+  </p:cSld>
+  <p:clrMap bg1="lt1" bg2="lt2" tx1="dk1" tx2="dk2" accent1="accent1" accent2="accent2" accent3="accent3" accent4="accent4" accent5="accent5" accent6="accent6" hlink="hlink" folHlink="folHlink"/>
+  <p:sldLayoutIdLst>
     <p:sldLayoutId id="2147483662" r:id="rId2"/>
     <p:sldLayoutId id="2147483663" r:id="rId3"/>
     <p:sldLayoutId id="2147483664" r:id="rId4"/>
@@ -3285,7 +3286,7 @@
         <p:spPr>
           <a:xfrm>
             <a:off x="1836000" y="1332000"/>
-            <a:ext cx="2368440" cy="784440"/>
+            <a:ext cx="2368080" cy="784080"/>
           </a:xfrm>
           <a:prstGeom prst="rect">
             <a:avLst/>
@@ -3340,7 +3341,7 @@
         <p:spPr>
           <a:xfrm>
             <a:off x="1836000" y="2880000"/>
-            <a:ext cx="2368440" cy="784440"/>
+            <a:ext cx="2368080" cy="784080"/>
           </a:xfrm>
           <a:prstGeom prst="rect">
             <a:avLst/>
@@ -3405,7 +3406,7 @@
         <p:spPr>
           <a:xfrm>
             <a:off x="1836000" y="4176000"/>
-            <a:ext cx="2368440" cy="784440"/>
+            <a:ext cx="2368080" cy="784080"/>
           </a:xfrm>
           <a:prstGeom prst="rect">
             <a:avLst/>
@@ -3480,7 +3481,7 @@
         <p:spPr>
           <a:xfrm>
             <a:off x="5292000" y="900000"/>
-            <a:ext cx="2368440" cy="1504440"/>
+            <a:ext cx="2368080" cy="1504080"/>
           </a:xfrm>
           <a:prstGeom prst="rect">
             <a:avLst/>
@@ -3615,7 +3616,7 @@
         <p:spPr>
           <a:xfrm>
             <a:off x="5292000" y="2571480"/>
-            <a:ext cx="2368440" cy="1272960"/>
+            <a:ext cx="2368080" cy="1272600"/>
           </a:xfrm>
           <a:prstGeom prst="rect">
             <a:avLst/>
@@ -3730,7 +3731,7 @@
         <p:spPr>
           <a:xfrm>
             <a:off x="5292000" y="4047480"/>
-            <a:ext cx="2368440" cy="1020960"/>
+            <a:ext cx="2368080" cy="1020600"/>
           </a:xfrm>
           <a:prstGeom prst="rect">
             <a:avLst/>
@@ -3909,7 +3910,7 @@
         <p:spPr>
           <a:xfrm>
             <a:off x="2988000" y="360000"/>
-            <a:ext cx="4384440" cy="338760"/>
+            <a:ext cx="4384080" cy="338400"/>
           </a:xfrm>
           <a:prstGeom prst="rect">
             <a:avLst/>
@@ -3990,7 +3991,7 @@
         <p:spPr>
           <a:xfrm>
             <a:off x="1440000" y="720000"/>
-            <a:ext cx="6762600" cy="1794600"/>
+            <a:ext cx="6762240" cy="1794240"/>
           </a:xfrm>
           <a:prstGeom prst="rect">
             <a:avLst/>
@@ -4020,7 +4021,7 @@
         <p:spPr>
           <a:xfrm>
             <a:off x="2016000" y="1188000"/>
-            <a:ext cx="1432800" cy="784800"/>
+            <a:ext cx="1432440" cy="784440"/>
           </a:xfrm>
           <a:prstGeom prst="rect">
             <a:avLst/>
@@ -4075,7 +4076,7 @@
         <p:spPr>
           <a:xfrm>
             <a:off x="6192000" y="1188000"/>
-            <a:ext cx="1432800" cy="784800"/>
+            <a:ext cx="1432440" cy="784440"/>
           </a:xfrm>
           <a:prstGeom prst="rect">
             <a:avLst/>
@@ -4130,7 +4131,7 @@
         <p:spPr>
           <a:xfrm>
             <a:off x="4140000" y="900000"/>
-            <a:ext cx="1432800" cy="1360800"/>
+            <a:ext cx="1432440" cy="1360440"/>
           </a:xfrm>
           <a:custGeom>
             <a:avLst/>
@@ -4316,7 +4317,7 @@
         <p:spPr>
           <a:xfrm>
             <a:off x="4320000" y="3168000"/>
-            <a:ext cx="1036800" cy="786600"/>
+            <a:ext cx="1036440" cy="786240"/>
           </a:xfrm>
           <a:custGeom>
             <a:avLst/>
@@ -4394,7 +4395,7 @@
         <p:spPr>
           <a:xfrm>
             <a:off x="4176000" y="4428000"/>
-            <a:ext cx="1432800" cy="784800"/>
+            <a:ext cx="1432440" cy="784440"/>
           </a:xfrm>
           <a:prstGeom prst="rect">
             <a:avLst/>
@@ -4476,7 +4477,7 @@
         <p:spPr>
           <a:xfrm>
             <a:off x="5870160" y="3314160"/>
-            <a:ext cx="1146600" cy="498600"/>
+            <a:ext cx="1146240" cy="498240"/>
           </a:xfrm>
           <a:prstGeom prst="ellipse">
             <a:avLst/>
@@ -4615,7 +4616,7 @@
         <p:spPr>
           <a:xfrm>
             <a:off x="1944000" y="900000"/>
-            <a:ext cx="1432800" cy="784800"/>
+            <a:ext cx="1432440" cy="784440"/>
           </a:xfrm>
           <a:prstGeom prst="rect">
             <a:avLst/>
@@ -4670,7 +4671,7 @@
         <p:spPr>
           <a:xfrm>
             <a:off x="6120000" y="900000"/>
-            <a:ext cx="1432800" cy="784800"/>
+            <a:ext cx="1432440" cy="784440"/>
           </a:xfrm>
           <a:prstGeom prst="rect">
             <a:avLst/>
@@ -4725,7 +4726,7 @@
         <p:spPr>
           <a:xfrm>
             <a:off x="4068000" y="612000"/>
-            <a:ext cx="1432800" cy="1360800"/>
+            <a:ext cx="1432440" cy="1360440"/>
           </a:xfrm>
           <a:custGeom>
             <a:avLst/>
@@ -4904,7 +4905,7 @@
         <p:spPr>
           <a:xfrm>
             <a:off x="2592000" y="5904000"/>
-            <a:ext cx="7121520" cy="595800"/>
+            <a:ext cx="7121160" cy="595440"/>
           </a:xfrm>
           <a:prstGeom prst="rect">
             <a:avLst/>
@@ -4975,7 +4976,7 @@
         <p:spPr>
           <a:xfrm>
             <a:off x="360000" y="216360"/>
-            <a:ext cx="1146600" cy="498600"/>
+            <a:ext cx="1146240" cy="498240"/>
           </a:xfrm>
           <a:prstGeom prst="ellipse">
             <a:avLst/>
@@ -5030,7 +5031,7 @@
         <p:spPr>
           <a:xfrm>
             <a:off x="1727640" y="216360"/>
-            <a:ext cx="1146600" cy="498600"/>
+            <a:ext cx="1146240" cy="498240"/>
           </a:xfrm>
           <a:prstGeom prst="ellipse">
             <a:avLst/>
@@ -5085,7 +5086,7 @@
         <p:spPr>
           <a:xfrm>
             <a:off x="359280" y="1008360"/>
-            <a:ext cx="1146600" cy="498600"/>
+            <a:ext cx="1146240" cy="498240"/>
           </a:xfrm>
           <a:prstGeom prst="ellipse">
             <a:avLst/>
@@ -5140,7 +5141,7 @@
         <p:spPr>
           <a:xfrm>
             <a:off x="358920" y="1800360"/>
-            <a:ext cx="1146600" cy="498600"/>
+            <a:ext cx="1146240" cy="498240"/>
           </a:xfrm>
           <a:prstGeom prst="ellipse">
             <a:avLst/>
@@ -5195,7 +5196,7 @@
         <p:spPr>
           <a:xfrm>
             <a:off x="1906560" y="1836360"/>
-            <a:ext cx="1146600" cy="498600"/>
+            <a:ext cx="1146240" cy="498240"/>
           </a:xfrm>
           <a:prstGeom prst="ellipse">
             <a:avLst/>
@@ -5250,7 +5251,7 @@
         <p:spPr>
           <a:xfrm>
             <a:off x="4211280" y="360"/>
-            <a:ext cx="1146600" cy="498600"/>
+            <a:ext cx="1146240" cy="498240"/>
           </a:xfrm>
           <a:prstGeom prst="ellipse">
             <a:avLst/>
@@ -5305,7 +5306,7 @@
         <p:spPr>
           <a:xfrm>
             <a:off x="6226920" y="360"/>
-            <a:ext cx="1146600" cy="498600"/>
+            <a:ext cx="1146240" cy="498240"/>
           </a:xfrm>
           <a:prstGeom prst="ellipse">
             <a:avLst/>
@@ -5360,7 +5361,7 @@
         <p:spPr>
           <a:xfrm>
             <a:off x="4210920" y="360"/>
-            <a:ext cx="1146600" cy="498600"/>
+            <a:ext cx="1146240" cy="498240"/>
           </a:xfrm>
           <a:prstGeom prst="ellipse">
             <a:avLst/>
@@ -5415,7 +5416,7 @@
         <p:spPr>
           <a:xfrm>
             <a:off x="7738920" y="252360"/>
-            <a:ext cx="1146600" cy="498600"/>
+            <a:ext cx="1146240" cy="498240"/>
           </a:xfrm>
           <a:prstGeom prst="ellipse">
             <a:avLst/>
@@ -5470,7 +5471,7 @@
         <p:spPr>
           <a:xfrm>
             <a:off x="7810920" y="936360"/>
-            <a:ext cx="1146600" cy="498600"/>
+            <a:ext cx="1146240" cy="498240"/>
           </a:xfrm>
           <a:prstGeom prst="ellipse">
             <a:avLst/>
@@ -7006,7 +7007,7 @@
         <p:spPr>
           <a:xfrm>
             <a:off x="576000" y="4320000"/>
-            <a:ext cx="2442960" cy="341280"/>
+            <a:ext cx="2442600" cy="340920"/>
           </a:xfrm>
           <a:prstGeom prst="rect">
             <a:avLst/>
@@ -7057,7 +7058,7 @@
         <p:spPr>
           <a:xfrm>
             <a:off x="7092000" y="3672000"/>
-            <a:ext cx="2442960" cy="341280"/>
+            <a:ext cx="2442600" cy="340920"/>
           </a:xfrm>
           <a:prstGeom prst="rect">
             <a:avLst/>
@@ -7108,7 +7109,7 @@
         <p:spPr>
           <a:xfrm>
             <a:off x="3744000" y="5328000"/>
-            <a:ext cx="2442960" cy="341280"/>
+            <a:ext cx="2442600" cy="340920"/>
           </a:xfrm>
           <a:prstGeom prst="rect">
             <a:avLst/>
@@ -7189,7 +7190,7 @@
         <p:spPr>
           <a:xfrm>
             <a:off x="5934960" y="1050480"/>
-            <a:ext cx="1691280" cy="1002240"/>
+            <a:ext cx="1690920" cy="1001880"/>
           </a:xfrm>
           <a:prstGeom prst="rect">
             <a:avLst/>
@@ -7219,7 +7220,7 @@
         <p:spPr>
           <a:xfrm>
             <a:off x="1908000" y="1152000"/>
-            <a:ext cx="1432800" cy="784800"/>
+            <a:ext cx="1432440" cy="784440"/>
           </a:xfrm>
           <a:prstGeom prst="rect">
             <a:avLst/>
@@ -7274,7 +7275,7 @@
         <p:spPr>
           <a:xfrm>
             <a:off x="6084000" y="1152000"/>
-            <a:ext cx="1432800" cy="784800"/>
+            <a:ext cx="1432440" cy="784440"/>
           </a:xfrm>
           <a:prstGeom prst="rect">
             <a:avLst/>
@@ -7329,7 +7330,7 @@
         <p:spPr>
           <a:xfrm>
             <a:off x="4032000" y="864000"/>
-            <a:ext cx="1432800" cy="1360800"/>
+            <a:ext cx="1432440" cy="1360440"/>
           </a:xfrm>
           <a:custGeom>
             <a:avLst/>
@@ -7461,7 +7462,7 @@
         <p:spPr>
           <a:xfrm>
             <a:off x="1548000" y="576000"/>
-            <a:ext cx="2118960" cy="462960"/>
+            <a:ext cx="2118600" cy="462600"/>
           </a:xfrm>
           <a:prstGeom prst="rect">
             <a:avLst/>
@@ -7567,7 +7568,7 @@
         <p:spPr>
           <a:xfrm>
             <a:off x="5760000" y="576000"/>
-            <a:ext cx="2118960" cy="462960"/>
+            <a:ext cx="2118600" cy="462600"/>
           </a:xfrm>
           <a:prstGeom prst="rect">
             <a:avLst/>
@@ -7618,7 +7619,7 @@
         <p:spPr>
           <a:xfrm>
             <a:off x="216000" y="2376000"/>
-            <a:ext cx="2118960" cy="2586960"/>
+            <a:ext cx="2118600" cy="2586600"/>
           </a:xfrm>
           <a:prstGeom prst="rect">
             <a:avLst/>
@@ -8327,7 +8328,7 @@
         <p:spPr>
           <a:xfrm>
             <a:off x="1945800" y="3636000"/>
-            <a:ext cx="1432800" cy="784800"/>
+            <a:ext cx="1432440" cy="784440"/>
           </a:xfrm>
           <a:prstGeom prst="rect">
             <a:avLst/>
@@ -8402,7 +8403,7 @@
         <p:spPr>
           <a:xfrm>
             <a:off x="6300000" y="3673800"/>
-            <a:ext cx="1432800" cy="784800"/>
+            <a:ext cx="1432440" cy="784440"/>
           </a:xfrm>
           <a:prstGeom prst="rect">
             <a:avLst/>
@@ -8531,7 +8532,7 @@
         <p:spPr>
           <a:xfrm>
             <a:off x="1764000" y="4860000"/>
-            <a:ext cx="7121520" cy="595800"/>
+            <a:ext cx="7121160" cy="595440"/>
           </a:xfrm>
           <a:prstGeom prst="rect">
             <a:avLst/>
@@ -8557,7 +8558,7 @@
         <p:spPr>
           <a:xfrm>
             <a:off x="4140000" y="1080000"/>
-            <a:ext cx="1432800" cy="784800"/>
+            <a:ext cx="1432440" cy="784440"/>
           </a:xfrm>
           <a:prstGeom prst="rect">
             <a:avLst/>
@@ -8612,7 +8613,7 @@
         <p:spPr>
           <a:xfrm>
             <a:off x="4392000" y="2267640"/>
-            <a:ext cx="930600" cy="1002600"/>
+            <a:ext cx="930240" cy="1002240"/>
           </a:xfrm>
           <a:custGeom>
             <a:avLst/>
@@ -8661,7 +8662,7 @@
         <p:spPr>
           <a:xfrm>
             <a:off x="4572000" y="2304000"/>
-            <a:ext cx="642600" cy="340920"/>
+            <a:ext cx="642240" cy="340560"/>
           </a:xfrm>
           <a:prstGeom prst="rect">
             <a:avLst/>
@@ -8793,7 +8794,7 @@
         <p:spPr>
           <a:xfrm>
             <a:off x="2592000" y="432000"/>
-            <a:ext cx="1146600" cy="498600"/>
+            <a:ext cx="1146240" cy="498240"/>
           </a:xfrm>
           <a:prstGeom prst="ellipse">
             <a:avLst/>
@@ -8848,7 +8849,7 @@
         <p:spPr>
           <a:xfrm>
             <a:off x="4104360" y="360360"/>
-            <a:ext cx="1146600" cy="498600"/>
+            <a:ext cx="1146240" cy="498240"/>
           </a:xfrm>
           <a:prstGeom prst="ellipse">
             <a:avLst/>
@@ -8903,7 +8904,7 @@
         <p:spPr>
           <a:xfrm>
             <a:off x="5652720" y="432720"/>
-            <a:ext cx="1146600" cy="498600"/>
+            <a:ext cx="1146240" cy="498240"/>
           </a:xfrm>
           <a:prstGeom prst="ellipse">
             <a:avLst/>
@@ -8958,7 +8959,7 @@
         <p:spPr>
           <a:xfrm>
             <a:off x="3813480" y="4321080"/>
-            <a:ext cx="1146600" cy="498600"/>
+            <a:ext cx="1146240" cy="498240"/>
           </a:xfrm>
           <a:prstGeom prst="ellipse">
             <a:avLst/>
@@ -9013,7 +9014,7 @@
         <p:spPr>
           <a:xfrm>
             <a:off x="2193840" y="4717440"/>
-            <a:ext cx="1146600" cy="498600"/>
+            <a:ext cx="1146240" cy="498240"/>
           </a:xfrm>
           <a:prstGeom prst="ellipse">
             <a:avLst/>
@@ -9068,7 +9069,7 @@
         <p:spPr>
           <a:xfrm>
             <a:off x="682200" y="4501800"/>
-            <a:ext cx="1146600" cy="498600"/>
+            <a:ext cx="1146240" cy="498240"/>
           </a:xfrm>
           <a:prstGeom prst="ellipse">
             <a:avLst/>
@@ -9123,7 +9124,7 @@
         <p:spPr>
           <a:xfrm>
             <a:off x="5434560" y="4574160"/>
-            <a:ext cx="1146600" cy="498600"/>
+            <a:ext cx="1146240" cy="498240"/>
           </a:xfrm>
           <a:prstGeom prst="ellipse">
             <a:avLst/>
@@ -9178,7 +9179,7 @@
         <p:spPr>
           <a:xfrm>
             <a:off x="7634160" y="4574520"/>
-            <a:ext cx="1146600" cy="498600"/>
+            <a:ext cx="1146240" cy="498240"/>
           </a:xfrm>
           <a:prstGeom prst="ellipse">
             <a:avLst/>
@@ -9233,7 +9234,7 @@
         <p:spPr>
           <a:xfrm>
             <a:off x="686520" y="3098880"/>
-            <a:ext cx="1146600" cy="498600"/>
+            <a:ext cx="1146240" cy="498240"/>
           </a:xfrm>
           <a:prstGeom prst="ellipse">
             <a:avLst/>
@@ -9531,7 +9532,7 @@
         <p:spPr>
           <a:xfrm>
             <a:off x="216000" y="288000"/>
-            <a:ext cx="2370960" cy="2298960"/>
+            <a:ext cx="2370600" cy="2298600"/>
           </a:xfrm>
           <a:prstGeom prst="rect">
             <a:avLst/>
@@ -9652,7 +9653,7 @@
         <p:spPr>
           <a:xfrm>
             <a:off x="1908000" y="936000"/>
-            <a:ext cx="1432800" cy="784800"/>
+            <a:ext cx="1432440" cy="784440"/>
           </a:xfrm>
           <a:prstGeom prst="rect">
             <a:avLst/>
@@ -9707,7 +9708,7 @@
         <p:spPr>
           <a:xfrm>
             <a:off x="6084000" y="936000"/>
-            <a:ext cx="1432800" cy="784800"/>
+            <a:ext cx="1432440" cy="784440"/>
           </a:xfrm>
           <a:prstGeom prst="rect">
             <a:avLst/>
@@ -9762,7 +9763,7 @@
         <p:spPr>
           <a:xfrm>
             <a:off x="4934160" y="4392000"/>
-            <a:ext cx="1432800" cy="784800"/>
+            <a:ext cx="1432440" cy="784440"/>
           </a:xfrm>
           <a:prstGeom prst="rect">
             <a:avLst/>
@@ -9817,7 +9818,7 @@
         <p:spPr>
           <a:xfrm>
             <a:off x="4032000" y="648000"/>
-            <a:ext cx="1432800" cy="1360800"/>
+            <a:ext cx="1432440" cy="1360440"/>
           </a:xfrm>
           <a:custGeom>
             <a:avLst/>
@@ -9915,7 +9916,7 @@
         <p:spPr>
           <a:xfrm>
             <a:off x="1908000" y="3204360"/>
-            <a:ext cx="1432800" cy="1360800"/>
+            <a:ext cx="1432440" cy="1360440"/>
           </a:xfrm>
           <a:custGeom>
             <a:avLst/>
@@ -10067,7 +10068,7 @@
         <p:spPr>
           <a:xfrm>
             <a:off x="4140000" y="2234160"/>
-            <a:ext cx="1146960" cy="568800"/>
+            <a:ext cx="1146600" cy="568440"/>
           </a:xfrm>
           <a:prstGeom prst="ellipse">
             <a:avLst/>
@@ -10122,7 +10123,7 @@
         <p:spPr>
           <a:xfrm>
             <a:off x="3708360" y="3636360"/>
-            <a:ext cx="1074600" cy="568800"/>
+            <a:ext cx="1074240" cy="568440"/>
           </a:xfrm>
           <a:prstGeom prst="ellipse">
             <a:avLst/>
@@ -10231,7 +10232,7 @@
         <p:spPr>
           <a:xfrm>
             <a:off x="504000" y="396000"/>
-            <a:ext cx="1146960" cy="568800"/>
+            <a:ext cx="1146600" cy="568440"/>
           </a:xfrm>
           <a:prstGeom prst="ellipse">
             <a:avLst/>
@@ -10286,7 +10287,7 @@
         <p:spPr>
           <a:xfrm>
             <a:off x="1944000" y="180000"/>
-            <a:ext cx="1146960" cy="568800"/>
+            <a:ext cx="1146600" cy="568440"/>
           </a:xfrm>
           <a:prstGeom prst="ellipse">
             <a:avLst/>
@@ -10341,7 +10342,7 @@
         <p:spPr>
           <a:xfrm>
             <a:off x="288000" y="1152000"/>
-            <a:ext cx="1146960" cy="568800"/>
+            <a:ext cx="1146600" cy="568440"/>
           </a:xfrm>
           <a:prstGeom prst="ellipse">
             <a:avLst/>
@@ -10396,7 +10397,7 @@
         <p:spPr>
           <a:xfrm>
             <a:off x="5940000" y="180000"/>
-            <a:ext cx="1146960" cy="568800"/>
+            <a:ext cx="1146600" cy="568440"/>
           </a:xfrm>
           <a:prstGeom prst="ellipse">
             <a:avLst/>
@@ -10451,7 +10452,7 @@
         <p:spPr>
           <a:xfrm>
             <a:off x="7560000" y="180000"/>
-            <a:ext cx="1146960" cy="568800"/>
+            <a:ext cx="1146600" cy="568440"/>
           </a:xfrm>
           <a:prstGeom prst="ellipse">
             <a:avLst/>
@@ -10506,7 +10507,7 @@
         <p:spPr>
           <a:xfrm>
             <a:off x="7992000" y="972000"/>
-            <a:ext cx="1146960" cy="568800"/>
+            <a:ext cx="1146600" cy="568440"/>
           </a:xfrm>
           <a:prstGeom prst="ellipse">
             <a:avLst/>
@@ -10588,7 +10589,7 @@
         <p:spPr>
           <a:xfrm>
             <a:off x="432000" y="3636360"/>
-            <a:ext cx="1074600" cy="568800"/>
+            <a:ext cx="1074240" cy="568440"/>
           </a:xfrm>
           <a:prstGeom prst="ellipse">
             <a:avLst/>
@@ -10643,7 +10644,7 @@
         <p:spPr>
           <a:xfrm>
             <a:off x="6803640" y="4068360"/>
-            <a:ext cx="1074600" cy="568800"/>
+            <a:ext cx="1074240" cy="568440"/>
           </a:xfrm>
           <a:prstGeom prst="ellipse">
             <a:avLst/>
@@ -10698,7 +10699,7 @@
         <p:spPr>
           <a:xfrm>
             <a:off x="6839280" y="4752360"/>
-            <a:ext cx="1074600" cy="568800"/>
+            <a:ext cx="1074240" cy="568440"/>
           </a:xfrm>
           <a:prstGeom prst="ellipse">
             <a:avLst/>
@@ -11108,7 +11109,7 @@
         <p:spPr>
           <a:xfrm>
             <a:off x="2556000" y="1152000"/>
-            <a:ext cx="4531320" cy="355320"/>
+            <a:ext cx="4530960" cy="354960"/>
           </a:xfrm>
           <a:prstGeom prst="rect">
             <a:avLst/>
@@ -11958,7 +11959,7 @@
         <p:spPr>
           <a:xfrm>
             <a:off x="3492000" y="3541680"/>
-            <a:ext cx="3020400" cy="342720"/>
+            <a:ext cx="3020040" cy="342360"/>
           </a:xfrm>
           <a:prstGeom prst="rect">
             <a:avLst/>
@@ -12009,7 +12010,7 @@
         <p:spPr>
           <a:xfrm>
             <a:off x="144000" y="3564000"/>
-            <a:ext cx="3020400" cy="342720"/>
+            <a:ext cx="3020040" cy="342360"/>
           </a:xfrm>
           <a:prstGeom prst="rect">
             <a:avLst/>
@@ -12060,7 +12061,7 @@
         <p:spPr>
           <a:xfrm>
             <a:off x="7308000" y="3528000"/>
-            <a:ext cx="3020400" cy="342720"/>
+            <a:ext cx="3020040" cy="342360"/>
           </a:xfrm>
           <a:prstGeom prst="rect">
             <a:avLst/>
@@ -12513,7 +12514,7 @@
         <p:spPr>
           <a:xfrm>
             <a:off x="3492000" y="3541680"/>
-            <a:ext cx="3020400" cy="342720"/>
+            <a:ext cx="3020040" cy="342360"/>
           </a:xfrm>
           <a:prstGeom prst="rect">
             <a:avLst/>
@@ -12564,7 +12565,7 @@
         <p:spPr>
           <a:xfrm>
             <a:off x="144000" y="3564000"/>
-            <a:ext cx="3020400" cy="342720"/>
+            <a:ext cx="3020040" cy="342360"/>
           </a:xfrm>
           <a:prstGeom prst="rect">
             <a:avLst/>
@@ -12615,7 +12616,7 @@
         <p:spPr>
           <a:xfrm>
             <a:off x="7308000" y="3528000"/>
-            <a:ext cx="3020400" cy="342720"/>
+            <a:ext cx="3020040" cy="342360"/>
           </a:xfrm>
           <a:prstGeom prst="rect">
             <a:avLst/>
@@ -13644,7 +13645,7 @@
         <p:spPr>
           <a:xfrm>
             <a:off x="3456000" y="1008000"/>
-            <a:ext cx="3236760" cy="343080"/>
+            <a:ext cx="3236400" cy="342720"/>
           </a:xfrm>
           <a:prstGeom prst="rect">
             <a:avLst/>
@@ -13695,7 +13696,7 @@
         <p:spPr>
           <a:xfrm>
             <a:off x="648000" y="1836000"/>
-            <a:ext cx="3236760" cy="343080"/>
+            <a:ext cx="3236400" cy="342720"/>
           </a:xfrm>
           <a:prstGeom prst="rect">
             <a:avLst/>
@@ -13746,7 +13747,7 @@
         <p:spPr>
           <a:xfrm>
             <a:off x="5436000" y="2160000"/>
-            <a:ext cx="3236760" cy="343080"/>
+            <a:ext cx="3236400" cy="342720"/>
           </a:xfrm>
           <a:prstGeom prst="rect">
             <a:avLst/>
@@ -13824,7 +13825,7 @@
         <p:spPr>
           <a:xfrm>
             <a:off x="8676000" y="2988000"/>
-            <a:ext cx="1040760" cy="752760"/>
+            <a:ext cx="1040400" cy="752400"/>
           </a:xfrm>
           <a:prstGeom prst="rect">
             <a:avLst/>
@@ -13962,7 +13963,7 @@
         <p:spPr>
           <a:xfrm>
             <a:off x="2448000" y="4464000"/>
-            <a:ext cx="5828760" cy="752760"/>
+            <a:ext cx="5828400" cy="752400"/>
           </a:xfrm>
           <a:prstGeom prst="rect">
             <a:avLst/>
@@ -15824,7 +15825,7 @@
         <p:spPr>
           <a:xfrm>
             <a:off x="1728000" y="1741680"/>
-            <a:ext cx="1149120" cy="343440"/>
+            <a:ext cx="1148760" cy="343080"/>
           </a:xfrm>
           <a:prstGeom prst="rect">
             <a:avLst/>
@@ -15875,7 +15876,7 @@
         <p:spPr>
           <a:xfrm>
             <a:off x="6480000" y="648000"/>
-            <a:ext cx="1689120" cy="343440"/>
+            <a:ext cx="1688760" cy="343080"/>
           </a:xfrm>
           <a:prstGeom prst="rect">
             <a:avLst/>
@@ -15956,7 +15957,7 @@
         <p:spPr>
           <a:xfrm>
             <a:off x="1908000" y="936000"/>
-            <a:ext cx="1432800" cy="784800"/>
+            <a:ext cx="1432440" cy="784440"/>
           </a:xfrm>
           <a:prstGeom prst="rect">
             <a:avLst/>
@@ -16011,7 +16012,7 @@
         <p:spPr>
           <a:xfrm>
             <a:off x="6084000" y="936000"/>
-            <a:ext cx="1432800" cy="784800"/>
+            <a:ext cx="1432440" cy="784440"/>
           </a:xfrm>
           <a:prstGeom prst="rect">
             <a:avLst/>
@@ -16066,7 +16067,7 @@
         <p:spPr>
           <a:xfrm>
             <a:off x="1908000" y="4068000"/>
-            <a:ext cx="1432800" cy="784800"/>
+            <a:ext cx="1432440" cy="784440"/>
           </a:xfrm>
           <a:prstGeom prst="rect">
             <a:avLst/>
@@ -16121,7 +16122,7 @@
         <p:spPr>
           <a:xfrm>
             <a:off x="4032000" y="648000"/>
-            <a:ext cx="1432800" cy="1360800"/>
+            <a:ext cx="1432440" cy="1360440"/>
           </a:xfrm>
           <a:custGeom>
             <a:avLst/>
@@ -16219,7 +16220,7 @@
         <p:spPr>
           <a:xfrm>
             <a:off x="1872000" y="2232360"/>
-            <a:ext cx="1432800" cy="1360800"/>
+            <a:ext cx="1432440" cy="1360440"/>
           </a:xfrm>
           <a:custGeom>
             <a:avLst/>
@@ -16425,7 +16426,7 @@
         <p:spPr>
           <a:xfrm>
             <a:off x="5184000" y="2340000"/>
-            <a:ext cx="2008800" cy="568800"/>
+            <a:ext cx="2008440" cy="568440"/>
           </a:xfrm>
           <a:prstGeom prst="ellipse">
             <a:avLst/>
@@ -16480,7 +16481,7 @@
         <p:spPr>
           <a:xfrm>
             <a:off x="3960360" y="3240360"/>
-            <a:ext cx="2008800" cy="568800"/>
+            <a:ext cx="2008440" cy="568440"/>
           </a:xfrm>
           <a:prstGeom prst="ellipse">
             <a:avLst/>
@@ -16823,7 +16824,7 @@
         <p:spPr>
           <a:xfrm>
             <a:off x="144000" y="2057400"/>
-            <a:ext cx="2512080" cy="599760"/>
+            <a:ext cx="2511720" cy="599400"/>
           </a:xfrm>
           <a:prstGeom prst="rect">
             <a:avLst/>
@@ -16874,7 +16875,7 @@
         <p:spPr>
           <a:xfrm>
             <a:off x="3405600" y="976680"/>
-            <a:ext cx="2969280" cy="343800"/>
+            <a:ext cx="2968920" cy="343440"/>
           </a:xfrm>
           <a:prstGeom prst="rect">
             <a:avLst/>
@@ -17009,7 +17010,7 @@
         <p:spPr>
           <a:xfrm>
             <a:off x="457200" y="3742200"/>
-            <a:ext cx="2969280" cy="855720"/>
+            <a:ext cx="2968920" cy="855360"/>
           </a:xfrm>
           <a:prstGeom prst="rect">
             <a:avLst/>
@@ -17060,7 +17061,7 @@
         <p:spPr>
           <a:xfrm>
             <a:off x="3866400" y="3742200"/>
-            <a:ext cx="2531880" cy="1111680"/>
+            <a:ext cx="2531520" cy="1111320"/>
           </a:xfrm>
           <a:prstGeom prst="rect">
             <a:avLst/>
@@ -17111,7 +17112,7 @@
         <p:spPr>
           <a:xfrm>
             <a:off x="7086600" y="3706200"/>
-            <a:ext cx="2740680" cy="1091880"/>
+            <a:ext cx="2740320" cy="1091520"/>
           </a:xfrm>
           <a:prstGeom prst="rect">
             <a:avLst/>
@@ -17162,7 +17163,7 @@
         <p:spPr>
           <a:xfrm>
             <a:off x="7488360" y="2057760"/>
-            <a:ext cx="2512080" cy="343800"/>
+            <a:ext cx="2511720" cy="343440"/>
           </a:xfrm>
           <a:prstGeom prst="rect">
             <a:avLst/>
@@ -17524,7 +17525,7 @@
         <p:spPr>
           <a:xfrm>
             <a:off x="144000" y="2057400"/>
-            <a:ext cx="2512080" cy="599760"/>
+            <a:ext cx="2511720" cy="599400"/>
           </a:xfrm>
           <a:prstGeom prst="rect">
             <a:avLst/>
@@ -17575,7 +17576,7 @@
         <p:spPr>
           <a:xfrm>
             <a:off x="3405600" y="976680"/>
-            <a:ext cx="2969280" cy="343800"/>
+            <a:ext cx="2968920" cy="343440"/>
           </a:xfrm>
           <a:prstGeom prst="rect">
             <a:avLst/>
@@ -17710,7 +17711,7 @@
         <p:spPr>
           <a:xfrm>
             <a:off x="842400" y="3742200"/>
-            <a:ext cx="1694880" cy="1111680"/>
+            <a:ext cx="1694520" cy="1111320"/>
           </a:xfrm>
           <a:prstGeom prst="rect">
             <a:avLst/>
@@ -17761,7 +17762,7 @@
         <p:spPr>
           <a:xfrm>
             <a:off x="2822400" y="3742200"/>
-            <a:ext cx="2207880" cy="855720"/>
+            <a:ext cx="2207520" cy="855360"/>
           </a:xfrm>
           <a:prstGeom prst="rect">
             <a:avLst/>
@@ -17812,7 +17813,7 @@
         <p:spPr>
           <a:xfrm>
             <a:off x="7772400" y="3706200"/>
-            <a:ext cx="2054880" cy="634680"/>
+            <a:ext cx="2054520" cy="634320"/>
           </a:xfrm>
           <a:prstGeom prst="rect">
             <a:avLst/>
@@ -17863,7 +17864,7 @@
         <p:spPr>
           <a:xfrm>
             <a:off x="7488360" y="2057760"/>
-            <a:ext cx="2512080" cy="343800"/>
+            <a:ext cx="2511720" cy="343440"/>
           </a:xfrm>
           <a:prstGeom prst="rect">
             <a:avLst/>
@@ -17942,7 +17943,7 @@
         <p:spPr>
           <a:xfrm>
             <a:off x="5090400" y="3742200"/>
-            <a:ext cx="2207880" cy="855720"/>
+            <a:ext cx="2207520" cy="855360"/>
           </a:xfrm>
           <a:prstGeom prst="rect">
             <a:avLst/>
@@ -18023,7 +18024,7 @@
         <p:spPr>
           <a:xfrm>
             <a:off x="1564920" y="685800"/>
-            <a:ext cx="178560" cy="344160"/>
+            <a:ext cx="178200" cy="343800"/>
           </a:xfrm>
           <a:prstGeom prst="rect">
             <a:avLst/>
@@ -18049,7 +18050,7 @@
         <p:spPr>
           <a:xfrm>
             <a:off x="228600" y="228600"/>
-            <a:ext cx="1140840" cy="344160"/>
+            <a:ext cx="1140480" cy="343800"/>
           </a:xfrm>
           <a:prstGeom prst="rect">
             <a:avLst/>
@@ -18100,7 +18101,7 @@
         <p:spPr>
           <a:xfrm>
             <a:off x="169200" y="950400"/>
-            <a:ext cx="2055240" cy="455040"/>
+            <a:ext cx="2054880" cy="454680"/>
           </a:xfrm>
           <a:prstGeom prst="rect">
             <a:avLst/>
@@ -18513,7 +18514,7 @@
                       <a:noAutofit/>
                     </a:bodyPr>
                     <a:p>
-                      <a:pPr marL="216000" indent="-213840">
+                      <a:pPr marL="216000" indent="-213480">
                         <a:lnSpc>
                           <a:spcPct val="100000"/>
                         </a:lnSpc>
@@ -18836,7 +18837,7 @@
                       <a:noAutofit/>
                     </a:bodyPr>
                     <a:p>
-                      <a:pPr marL="216000" indent="-213840">
+                      <a:pPr marL="216000" indent="-213480">
                         <a:lnSpc>
                           <a:spcPct val="100000"/>
                         </a:lnSpc>
@@ -19316,7 +19317,7 @@
                       <a:noAutofit/>
                     </a:bodyPr>
                     <a:p>
-                      <a:pPr marL="216000" indent="-213840">
+                      <a:pPr marL="216000" indent="-213480">
                         <a:lnSpc>
                           <a:spcPct val="100000"/>
                         </a:lnSpc>
@@ -19612,7 +19613,7 @@
                       <a:noAutofit/>
                     </a:bodyPr>
                     <a:p>
-                      <a:pPr marL="216000" indent="-213840">
+                      <a:pPr marL="216000" indent="-213480">
                         <a:lnSpc>
                           <a:spcPct val="100000"/>
                         </a:lnSpc>
@@ -19880,7 +19881,7 @@
                       <a:noAutofit/>
                     </a:bodyPr>
                     <a:p>
-                      <a:pPr marL="216000" indent="-213840">
+                      <a:pPr marL="216000" indent="-213480">
                         <a:lnSpc>
                           <a:spcPct val="100000"/>
                         </a:lnSpc>
@@ -20119,7 +20120,7 @@
                       <a:noAutofit/>
                     </a:bodyPr>
                     <a:p>
-                      <a:pPr marL="216000" indent="-213840">
+                      <a:pPr marL="216000" indent="-213480">
                         <a:lnSpc>
                           <a:spcPct val="100000"/>
                         </a:lnSpc>
@@ -20265,7 +20266,7 @@
         <p:spPr>
           <a:xfrm>
             <a:off x="2057400" y="685800"/>
-            <a:ext cx="1141200" cy="344520"/>
+            <a:ext cx="1140840" cy="344160"/>
           </a:xfrm>
           <a:prstGeom prst="rect">
             <a:avLst/>
@@ -20316,7 +20317,7 @@
         <p:spPr>
           <a:xfrm>
             <a:off x="5670720" y="685800"/>
-            <a:ext cx="1141200" cy="344520"/>
+            <a:ext cx="1140840" cy="344160"/>
           </a:xfrm>
           <a:prstGeom prst="rect">
             <a:avLst/>
@@ -20367,7 +20368,7 @@
         <p:spPr>
           <a:xfrm>
             <a:off x="8229600" y="2168280"/>
-            <a:ext cx="1141200" cy="344520"/>
+            <a:ext cx="1140840" cy="344160"/>
           </a:xfrm>
           <a:prstGeom prst="rect">
             <a:avLst/>
@@ -20418,7 +20419,7 @@
         <p:spPr>
           <a:xfrm>
             <a:off x="4572000" y="3311280"/>
-            <a:ext cx="1141200" cy="344520"/>
+            <a:ext cx="1140840" cy="344160"/>
           </a:xfrm>
           <a:prstGeom prst="rect">
             <a:avLst/>
@@ -20555,7 +20556,7 @@
         <p:spPr>
           <a:xfrm>
             <a:off x="1564920" y="685800"/>
-            <a:ext cx="178560" cy="344160"/>
+            <a:ext cx="178200" cy="343800"/>
           </a:xfrm>
           <a:prstGeom prst="rect">
             <a:avLst/>
@@ -20581,7 +20582,7 @@
         <p:spPr>
           <a:xfrm>
             <a:off x="228600" y="228600"/>
-            <a:ext cx="1140840" cy="344160"/>
+            <a:ext cx="1140480" cy="343800"/>
           </a:xfrm>
           <a:prstGeom prst="rect">
             <a:avLst/>
@@ -20754,7 +20755,7 @@
                       <a:noAutofit/>
                     </a:bodyPr>
                     <a:p>
-                      <a:pPr marL="216000" indent="-213840">
+                      <a:pPr marL="216000" indent="-213480">
                         <a:lnSpc>
                           <a:spcPct val="100000"/>
                         </a:lnSpc>
@@ -21234,7 +21235,7 @@
                       <a:noAutofit/>
                     </a:bodyPr>
                     <a:p>
-                      <a:pPr marL="216000" indent="-213840">
+                      <a:pPr marL="216000" indent="-213480">
                         <a:lnSpc>
                           <a:spcPct val="100000"/>
                         </a:lnSpc>
@@ -21502,7 +21503,7 @@
                       <a:noAutofit/>
                     </a:bodyPr>
                     <a:p>
-                      <a:pPr marL="216000" indent="-213840">
+                      <a:pPr marL="216000" indent="-213480">
                         <a:lnSpc>
                           <a:spcPct val="100000"/>
                         </a:lnSpc>
@@ -21770,7 +21771,7 @@
                       <a:noAutofit/>
                     </a:bodyPr>
                     <a:p>
-                      <a:pPr marL="216000" indent="-213840">
+                      <a:pPr marL="216000" indent="-213480">
                         <a:lnSpc>
                           <a:spcPct val="100000"/>
                         </a:lnSpc>
@@ -22009,7 +22010,7 @@
                       <a:noAutofit/>
                     </a:bodyPr>
                     <a:p>
-                      <a:pPr marL="216000" indent="-213840">
+                      <a:pPr marL="216000" indent="-213480">
                         <a:lnSpc>
                           <a:spcPct val="100000"/>
                         </a:lnSpc>
@@ -22277,7 +22278,7 @@
                       <a:noAutofit/>
                     </a:bodyPr>
                     <a:p>
-                      <a:pPr marL="216000" indent="-213840">
+                      <a:pPr marL="216000" indent="-213480">
                         <a:lnSpc>
                           <a:spcPct val="100000"/>
                         </a:lnSpc>
@@ -22451,7 +22452,7 @@
         <p:spPr>
           <a:xfrm>
             <a:off x="6436080" y="1371600"/>
-            <a:ext cx="1141200" cy="344520"/>
+            <a:ext cx="1140840" cy="344160"/>
           </a:xfrm>
           <a:prstGeom prst="rect">
             <a:avLst/>
@@ -22616,7 +22617,7 @@
         <p:spPr>
           <a:xfrm>
             <a:off x="1564920" y="685800"/>
-            <a:ext cx="178560" cy="344160"/>
+            <a:ext cx="178200" cy="343800"/>
           </a:xfrm>
           <a:prstGeom prst="rect">
             <a:avLst/>
@@ -22642,7 +22643,7 @@
         <p:spPr>
           <a:xfrm>
             <a:off x="228600" y="228600"/>
-            <a:ext cx="1140840" cy="344160"/>
+            <a:ext cx="1140480" cy="343800"/>
           </a:xfrm>
           <a:prstGeom prst="rect">
             <a:avLst/>
@@ -22815,7 +22816,7 @@
                       <a:noAutofit/>
                     </a:bodyPr>
                     <a:p>
-                      <a:pPr marL="216000" indent="-213840">
+                      <a:pPr marL="216000" indent="-213480">
                         <a:lnSpc>
                           <a:spcPct val="100000"/>
                         </a:lnSpc>
@@ -23295,7 +23296,7 @@
                       <a:noAutofit/>
                     </a:bodyPr>
                     <a:p>
-                      <a:pPr marL="216000" indent="-213840">
+                      <a:pPr marL="216000" indent="-213480">
                         <a:lnSpc>
                           <a:spcPct val="100000"/>
                         </a:lnSpc>
@@ -23563,7 +23564,7 @@
                       <a:noAutofit/>
                     </a:bodyPr>
                     <a:p>
-                      <a:pPr marL="216000" indent="-213840">
+                      <a:pPr marL="216000" indent="-213480">
                         <a:lnSpc>
                           <a:spcPct val="100000"/>
                         </a:lnSpc>
@@ -23709,7 +23710,7 @@
         <p:spPr>
           <a:xfrm>
             <a:off x="799920" y="4158720"/>
-            <a:ext cx="178560" cy="425160"/>
+            <a:ext cx="178200" cy="424800"/>
           </a:xfrm>
           <a:prstGeom prst="rect">
             <a:avLst/>
@@ -23857,7 +23858,7 @@
                       <a:noAutofit/>
                     </a:bodyPr>
                     <a:p>
-                      <a:pPr marL="216000" indent="-213840">
+                      <a:pPr marL="216000" indent="-213480">
                         <a:lnSpc>
                           <a:spcPct val="100000"/>
                         </a:lnSpc>
@@ -24309,7 +24310,7 @@
                       <a:noAutofit/>
                     </a:bodyPr>
                     <a:p>
-                      <a:pPr marL="216000" indent="-213840">
+                      <a:pPr marL="216000" indent="-213480">
                         <a:lnSpc>
                           <a:spcPct val="100000"/>
                         </a:lnSpc>
@@ -24577,7 +24578,7 @@
                       <a:noAutofit/>
                     </a:bodyPr>
                     <a:p>
-                      <a:pPr marL="216000" indent="-213840">
+                      <a:pPr marL="216000" indent="-213480">
                         <a:lnSpc>
                           <a:spcPct val="100000"/>
                         </a:lnSpc>
@@ -25329,7 +25330,7 @@
         <p:spPr>
           <a:xfrm>
             <a:off x="5257800" y="2625480"/>
-            <a:ext cx="1141200" cy="344520"/>
+            <a:ext cx="1140840" cy="344160"/>
           </a:xfrm>
           <a:prstGeom prst="rect">
             <a:avLst/>
@@ -25550,7 +25551,7 @@
         <p:spPr>
           <a:xfrm>
             <a:off x="685800" y="685800"/>
-            <a:ext cx="4113720" cy="345240"/>
+            <a:ext cx="4113360" cy="344880"/>
           </a:xfrm>
           <a:prstGeom prst="rect">
             <a:avLst/>
@@ -25601,7 +25602,7 @@
         <p:spPr>
           <a:xfrm>
             <a:off x="3988800" y="1636200"/>
-            <a:ext cx="913320" cy="913320"/>
+            <a:ext cx="912960" cy="912960"/>
           </a:xfrm>
           <a:prstGeom prst="ellipse">
             <a:avLst/>
@@ -25676,7 +25677,7 @@
         <p:spPr>
           <a:xfrm>
             <a:off x="6841440" y="1622160"/>
-            <a:ext cx="913320" cy="913320"/>
+            <a:ext cx="912960" cy="912960"/>
           </a:xfrm>
           <a:prstGeom prst="ellipse">
             <a:avLst/>
@@ -25731,7 +25732,7 @@
         <p:spPr>
           <a:xfrm>
             <a:off x="1945440" y="2594160"/>
-            <a:ext cx="913320" cy="913320"/>
+            <a:ext cx="912960" cy="912960"/>
           </a:xfrm>
           <a:prstGeom prst="ellipse">
             <a:avLst/>
@@ -25786,7 +25787,7 @@
         <p:spPr>
           <a:xfrm>
             <a:off x="6877440" y="3638160"/>
-            <a:ext cx="913320" cy="913320"/>
+            <a:ext cx="912960" cy="912960"/>
           </a:xfrm>
           <a:prstGeom prst="ellipse">
             <a:avLst/>
@@ -25841,7 +25842,7 @@
         <p:spPr>
           <a:xfrm>
             <a:off x="3997440" y="3638160"/>
-            <a:ext cx="913320" cy="913320"/>
+            <a:ext cx="912960" cy="912960"/>
           </a:xfrm>
           <a:prstGeom prst="ellipse">
             <a:avLst/>
@@ -26066,7 +26067,7 @@
         <p:spPr>
           <a:xfrm>
             <a:off x="360000" y="324000"/>
-            <a:ext cx="6263280" cy="431280"/>
+            <a:ext cx="6262920" cy="430920"/>
           </a:xfrm>
           <a:prstGeom prst="rect">
             <a:avLst/>
@@ -26117,7 +26118,7 @@
         <p:spPr>
           <a:xfrm>
             <a:off x="612000" y="4464000"/>
-            <a:ext cx="719280" cy="647280"/>
+            <a:ext cx="718920" cy="646920"/>
           </a:xfrm>
           <a:prstGeom prst="ellipse">
             <a:avLst/>
@@ -26172,7 +26173,7 @@
         <p:spPr>
           <a:xfrm>
             <a:off x="1512360" y="4464360"/>
-            <a:ext cx="719280" cy="647280"/>
+            <a:ext cx="718920" cy="646920"/>
           </a:xfrm>
           <a:prstGeom prst="ellipse">
             <a:avLst/>
@@ -26227,7 +26228,7 @@
         <p:spPr>
           <a:xfrm>
             <a:off x="2448360" y="4464360"/>
-            <a:ext cx="719280" cy="647280"/>
+            <a:ext cx="718920" cy="646920"/>
           </a:xfrm>
           <a:prstGeom prst="ellipse">
             <a:avLst/>
@@ -26282,7 +26283,7 @@
         <p:spPr>
           <a:xfrm>
             <a:off x="3420360" y="4464360"/>
-            <a:ext cx="719280" cy="647280"/>
+            <a:ext cx="718920" cy="646920"/>
           </a:xfrm>
           <a:prstGeom prst="ellipse">
             <a:avLst/>
@@ -26337,7 +26338,7 @@
         <p:spPr>
           <a:xfrm>
             <a:off x="4392360" y="4464360"/>
-            <a:ext cx="719280" cy="647280"/>
+            <a:ext cx="718920" cy="646920"/>
           </a:xfrm>
           <a:prstGeom prst="ellipse">
             <a:avLst/>
@@ -26392,7 +26393,7 @@
         <p:spPr>
           <a:xfrm>
             <a:off x="5292360" y="4464360"/>
-            <a:ext cx="719280" cy="647280"/>
+            <a:ext cx="718920" cy="646920"/>
           </a:xfrm>
           <a:prstGeom prst="ellipse">
             <a:avLst/>
@@ -26447,7 +26448,7 @@
         <p:spPr>
           <a:xfrm>
             <a:off x="1476360" y="3528360"/>
-            <a:ext cx="719280" cy="647280"/>
+            <a:ext cx="718920" cy="646920"/>
           </a:xfrm>
           <a:prstGeom prst="ellipse">
             <a:avLst/>
@@ -26502,7 +26503,7 @@
         <p:spPr>
           <a:xfrm>
             <a:off x="2412720" y="2988720"/>
-            <a:ext cx="719280" cy="647280"/>
+            <a:ext cx="718920" cy="646920"/>
           </a:xfrm>
           <a:prstGeom prst="ellipse">
             <a:avLst/>
@@ -26557,7 +26558,7 @@
         <p:spPr>
           <a:xfrm>
             <a:off x="3385080" y="2485080"/>
-            <a:ext cx="719280" cy="647280"/>
+            <a:ext cx="718920" cy="646920"/>
           </a:xfrm>
           <a:prstGeom prst="ellipse">
             <a:avLst/>
@@ -26612,7 +26613,7 @@
         <p:spPr>
           <a:xfrm>
             <a:off x="4321440" y="1981440"/>
-            <a:ext cx="719280" cy="647280"/>
+            <a:ext cx="718920" cy="646920"/>
           </a:xfrm>
           <a:prstGeom prst="ellipse">
             <a:avLst/>
@@ -26667,7 +26668,7 @@
         <p:spPr>
           <a:xfrm>
             <a:off x="5257800" y="1549800"/>
-            <a:ext cx="719280" cy="647280"/>
+            <a:ext cx="718920" cy="646920"/>
           </a:xfrm>
           <a:prstGeom prst="ellipse">
             <a:avLst/>
@@ -27302,7 +27303,7 @@
         <p:spPr>
           <a:xfrm>
             <a:off x="360000" y="324000"/>
-            <a:ext cx="6263280" cy="431280"/>
+            <a:ext cx="6262920" cy="430920"/>
           </a:xfrm>
           <a:prstGeom prst="rect">
             <a:avLst/>
@@ -27353,7 +27354,7 @@
         <p:spPr>
           <a:xfrm>
             <a:off x="612000" y="4464000"/>
-            <a:ext cx="719280" cy="647280"/>
+            <a:ext cx="718920" cy="646920"/>
           </a:xfrm>
           <a:prstGeom prst="ellipse">
             <a:avLst/>
@@ -27408,7 +27409,7 @@
         <p:spPr>
           <a:xfrm>
             <a:off x="1512360" y="4464360"/>
-            <a:ext cx="719280" cy="647280"/>
+            <a:ext cx="718920" cy="646920"/>
           </a:xfrm>
           <a:prstGeom prst="ellipse">
             <a:avLst/>
@@ -27463,7 +27464,7 @@
         <p:spPr>
           <a:xfrm>
             <a:off x="2448360" y="4464360"/>
-            <a:ext cx="719280" cy="647280"/>
+            <a:ext cx="718920" cy="646920"/>
           </a:xfrm>
           <a:prstGeom prst="ellipse">
             <a:avLst/>
@@ -27518,7 +27519,7 @@
         <p:spPr>
           <a:xfrm>
             <a:off x="3420360" y="4464360"/>
-            <a:ext cx="719280" cy="647280"/>
+            <a:ext cx="718920" cy="646920"/>
           </a:xfrm>
           <a:prstGeom prst="ellipse">
             <a:avLst/>
@@ -27573,7 +27574,7 @@
         <p:spPr>
           <a:xfrm>
             <a:off x="4392360" y="4464360"/>
-            <a:ext cx="719280" cy="647280"/>
+            <a:ext cx="718920" cy="646920"/>
           </a:xfrm>
           <a:prstGeom prst="ellipse">
             <a:avLst/>
@@ -27628,7 +27629,7 @@
         <p:spPr>
           <a:xfrm>
             <a:off x="5292360" y="4464360"/>
-            <a:ext cx="719280" cy="647280"/>
+            <a:ext cx="718920" cy="646920"/>
           </a:xfrm>
           <a:prstGeom prst="ellipse">
             <a:avLst/>
@@ -27683,7 +27684,7 @@
         <p:spPr>
           <a:xfrm>
             <a:off x="1080360" y="3528360"/>
-            <a:ext cx="719280" cy="647280"/>
+            <a:ext cx="718920" cy="646920"/>
           </a:xfrm>
           <a:prstGeom prst="ellipse">
             <a:avLst/>
@@ -27738,7 +27739,7 @@
         <p:spPr>
           <a:xfrm>
             <a:off x="2880720" y="3492720"/>
-            <a:ext cx="719280" cy="647280"/>
+            <a:ext cx="718920" cy="646920"/>
           </a:xfrm>
           <a:prstGeom prst="ellipse">
             <a:avLst/>
@@ -27793,7 +27794,7 @@
         <p:spPr>
           <a:xfrm>
             <a:off x="2016000" y="2448000"/>
-            <a:ext cx="719280" cy="647280"/>
+            <a:ext cx="718920" cy="646920"/>
           </a:xfrm>
           <a:prstGeom prst="ellipse">
             <a:avLst/>
@@ -27848,7 +27849,7 @@
         <p:spPr>
           <a:xfrm>
             <a:off x="4753440" y="3493440"/>
-            <a:ext cx="719280" cy="647280"/>
+            <a:ext cx="718920" cy="646920"/>
           </a:xfrm>
           <a:prstGeom prst="ellipse">
             <a:avLst/>
@@ -27903,7 +27904,7 @@
         <p:spPr>
           <a:xfrm>
             <a:off x="3096000" y="1440000"/>
-            <a:ext cx="719280" cy="647280"/>
+            <a:ext cx="718920" cy="646920"/>
           </a:xfrm>
           <a:prstGeom prst="ellipse">
             <a:avLst/>
@@ -28268,7 +28269,7 @@
         <p:spPr>
           <a:xfrm>
             <a:off x="5544000" y="834120"/>
-            <a:ext cx="4175640" cy="431280"/>
+            <a:ext cx="4175280" cy="430920"/>
           </a:xfrm>
           <a:prstGeom prst="rect">
             <a:avLst/>
@@ -28319,7 +28320,7 @@
         <p:spPr>
           <a:xfrm>
             <a:off x="576000" y="2880000"/>
-            <a:ext cx="719280" cy="647280"/>
+            <a:ext cx="718920" cy="646920"/>
           </a:xfrm>
           <a:prstGeom prst="ellipse">
             <a:avLst/>
@@ -28374,7 +28375,7 @@
         <p:spPr>
           <a:xfrm>
             <a:off x="1476360" y="2880360"/>
-            <a:ext cx="719280" cy="647280"/>
+            <a:ext cx="718920" cy="646920"/>
           </a:xfrm>
           <a:prstGeom prst="ellipse">
             <a:avLst/>
@@ -28429,7 +28430,7 @@
         <p:spPr>
           <a:xfrm>
             <a:off x="2412360" y="2880360"/>
-            <a:ext cx="719280" cy="647280"/>
+            <a:ext cx="718920" cy="646920"/>
           </a:xfrm>
           <a:prstGeom prst="ellipse">
             <a:avLst/>
@@ -28484,7 +28485,7 @@
         <p:spPr>
           <a:xfrm>
             <a:off x="3384360" y="2880360"/>
-            <a:ext cx="719280" cy="647280"/>
+            <a:ext cx="718920" cy="646920"/>
           </a:xfrm>
           <a:prstGeom prst="ellipse">
             <a:avLst/>
@@ -28539,7 +28540,7 @@
         <p:spPr>
           <a:xfrm>
             <a:off x="4356360" y="2880360"/>
-            <a:ext cx="719280" cy="647280"/>
+            <a:ext cx="718920" cy="646920"/>
           </a:xfrm>
           <a:prstGeom prst="ellipse">
             <a:avLst/>
@@ -28594,7 +28595,7 @@
         <p:spPr>
           <a:xfrm>
             <a:off x="5256360" y="2880360"/>
-            <a:ext cx="719280" cy="647280"/>
+            <a:ext cx="718920" cy="646920"/>
           </a:xfrm>
           <a:prstGeom prst="ellipse">
             <a:avLst/>
@@ -28649,7 +28650,7 @@
         <p:spPr>
           <a:xfrm>
             <a:off x="1044360" y="1944360"/>
-            <a:ext cx="719280" cy="647280"/>
+            <a:ext cx="718920" cy="646920"/>
           </a:xfrm>
           <a:prstGeom prst="ellipse">
             <a:avLst/>
@@ -28704,7 +28705,7 @@
         <p:spPr>
           <a:xfrm>
             <a:off x="2844720" y="1908720"/>
-            <a:ext cx="719280" cy="647280"/>
+            <a:ext cx="718920" cy="646920"/>
           </a:xfrm>
           <a:prstGeom prst="ellipse">
             <a:avLst/>
@@ -28759,7 +28760,7 @@
         <p:spPr>
           <a:xfrm>
             <a:off x="1836000" y="1188000"/>
-            <a:ext cx="719280" cy="647280"/>
+            <a:ext cx="718920" cy="646920"/>
           </a:xfrm>
           <a:prstGeom prst="ellipse">
             <a:avLst/>
@@ -28814,7 +28815,7 @@
         <p:spPr>
           <a:xfrm>
             <a:off x="4717440" y="1909440"/>
-            <a:ext cx="719280" cy="647280"/>
+            <a:ext cx="718920" cy="646920"/>
           </a:xfrm>
           <a:prstGeom prst="ellipse">
             <a:avLst/>
@@ -28869,7 +28870,7 @@
         <p:spPr>
           <a:xfrm>
             <a:off x="3060000" y="432000"/>
-            <a:ext cx="719280" cy="647280"/>
+            <a:ext cx="718920" cy="646920"/>
           </a:xfrm>
           <a:prstGeom prst="ellipse">
             <a:avLst/>
@@ -29288,7 +29289,7 @@
         <p:spPr>
           <a:xfrm>
             <a:off x="1656000" y="4335840"/>
-            <a:ext cx="7055640" cy="1063800"/>
+            <a:ext cx="7055280" cy="1063440"/>
           </a:xfrm>
           <a:prstGeom prst="rect">
             <a:avLst/>
@@ -29369,7 +29370,7 @@
         <p:spPr>
           <a:xfrm>
             <a:off x="2880000" y="504000"/>
-            <a:ext cx="3816000" cy="1080000"/>
+            <a:ext cx="3815640" cy="1079640"/>
           </a:xfrm>
           <a:prstGeom prst="rect">
             <a:avLst/>
@@ -29394,10 +29395,18 @@
             <a:noAutofit/>
           </a:bodyPr>
           <a:p>
-            <a:pPr algn="ctr"/>
+            <a:pPr algn="ctr">
+              <a:lnSpc>
+                <a:spcPct val="100000"/>
+              </a:lnSpc>
+            </a:pPr>
             <a:r>
               <a:rPr b="0" lang="en-IN" sz="1800" spc="-1" strike="noStrike">
+                <a:solidFill>
+                  <a:srgbClr val="000000"/>
+                </a:solidFill>
                 <a:latin typeface="Arial"/>
+                <a:ea typeface="DejaVu Sans"/>
               </a:rPr>
               <a:t>Processor</a:t>
             </a:r>
@@ -29406,10 +29415,18 @@
             </a:endParaRPr>
           </a:p>
           <a:p>
-            <a:pPr algn="ctr"/>
+            <a:pPr algn="ctr">
+              <a:lnSpc>
+                <a:spcPct val="100000"/>
+              </a:lnSpc>
+            </a:pPr>
             <a:r>
               <a:rPr b="0" lang="en-IN" sz="1800" spc="-1" strike="noStrike">
+                <a:solidFill>
+                  <a:srgbClr val="000000"/>
+                </a:solidFill>
                 <a:latin typeface="Arial"/>
+                <a:ea typeface="DejaVu Sans"/>
               </a:rPr>
               <a:t>(Control Unit + Arithmetic Logic Unit)</a:t>
             </a:r>
@@ -29428,7 +29445,7 @@
         <p:spPr>
           <a:xfrm>
             <a:off x="2880000" y="2448000"/>
-            <a:ext cx="3816000" cy="2952000"/>
+            <a:ext cx="3815640" cy="2951640"/>
           </a:xfrm>
           <a:prstGeom prst="rect">
             <a:avLst/>
@@ -29453,10 +29470,18 @@
             <a:noAutofit/>
           </a:bodyPr>
           <a:p>
-            <a:pPr algn="ctr"/>
+            <a:pPr algn="ctr">
+              <a:lnSpc>
+                <a:spcPct val="100000"/>
+              </a:lnSpc>
+            </a:pPr>
             <a:r>
               <a:rPr b="0" lang="en-IN" sz="1800" spc="-1" strike="noStrike">
+                <a:solidFill>
+                  <a:srgbClr val="000000"/>
+                </a:solidFill>
                 <a:latin typeface="Arial"/>
+                <a:ea typeface="DejaVu Sans"/>
               </a:rPr>
               <a:t>Memory</a:t>
             </a:r>
@@ -29465,10 +29490,18 @@
             </a:endParaRPr>
           </a:p>
           <a:p>
-            <a:pPr algn="ctr"/>
+            <a:pPr algn="ctr">
+              <a:lnSpc>
+                <a:spcPct val="100000"/>
+              </a:lnSpc>
+            </a:pPr>
             <a:r>
               <a:rPr b="0" lang="en-IN" sz="1800" spc="-1" strike="noStrike">
+                <a:solidFill>
+                  <a:srgbClr val="000000"/>
+                </a:solidFill>
                 <a:latin typeface="Arial"/>
+                <a:ea typeface="DejaVu Sans"/>
               </a:rPr>
               <a:t>(Primary Memory + </a:t>
             </a:r>
@@ -29477,10 +29510,18 @@
             </a:endParaRPr>
           </a:p>
           <a:p>
-            <a:pPr algn="ctr"/>
+            <a:pPr algn="ctr">
+              <a:lnSpc>
+                <a:spcPct val="100000"/>
+              </a:lnSpc>
+            </a:pPr>
             <a:r>
               <a:rPr b="0" lang="en-IN" sz="1800" spc="-1" strike="noStrike">
+                <a:solidFill>
+                  <a:srgbClr val="000000"/>
+                </a:solidFill>
                 <a:latin typeface="Arial"/>
+                <a:ea typeface="DejaVu Sans"/>
               </a:rPr>
               <a:t>Secondary Memory)</a:t>
             </a:r>
@@ -29499,7 +29540,7 @@
         <p:spPr>
           <a:xfrm>
             <a:off x="7416000" y="2952000"/>
-            <a:ext cx="1944000" cy="1008000"/>
+            <a:ext cx="1943640" cy="1007640"/>
           </a:xfrm>
           <a:prstGeom prst="rect">
             <a:avLst/>
@@ -29524,10 +29565,18 @@
             <a:noAutofit/>
           </a:bodyPr>
           <a:p>
-            <a:pPr algn="ctr"/>
+            <a:pPr algn="ctr">
+              <a:lnSpc>
+                <a:spcPct val="100000"/>
+              </a:lnSpc>
+            </a:pPr>
             <a:r>
               <a:rPr b="0" lang="en-IN" sz="1800" spc="-1" strike="noStrike">
+                <a:solidFill>
+                  <a:srgbClr val="000000"/>
+                </a:solidFill>
                 <a:latin typeface="Arial"/>
+                <a:ea typeface="DejaVu Sans"/>
               </a:rPr>
               <a:t>Output Devices</a:t>
             </a:r>
@@ -29546,7 +29595,7 @@
         <p:spPr>
           <a:xfrm>
             <a:off x="216000" y="2952000"/>
-            <a:ext cx="1944000" cy="1008000"/>
+            <a:ext cx="1943640" cy="1007640"/>
           </a:xfrm>
           <a:prstGeom prst="rect">
             <a:avLst/>
@@ -29571,10 +29620,18 @@
             <a:noAutofit/>
           </a:bodyPr>
           <a:p>
-            <a:pPr algn="ctr"/>
+            <a:pPr algn="ctr">
+              <a:lnSpc>
+                <a:spcPct val="100000"/>
+              </a:lnSpc>
+            </a:pPr>
             <a:r>
               <a:rPr b="0" lang="en-IN" sz="1800" spc="-1" strike="noStrike">
+                <a:solidFill>
+                  <a:srgbClr val="000000"/>
+                </a:solidFill>
                 <a:latin typeface="Arial"/>
+                <a:ea typeface="DejaVu Sans"/>
               </a:rPr>
               <a:t>Input Devices</a:t>
             </a:r>
@@ -29593,13 +29650,13 @@
         <p:spPr>
           <a:xfrm>
             <a:off x="4536000" y="1800000"/>
-            <a:ext cx="144000" cy="504000"/>
+            <a:ext cx="143640" cy="503640"/>
           </a:xfrm>
           <a:custGeom>
             <a:avLst/>
             <a:gdLst/>
             <a:ahLst/>
-            <a:rect l="0" t="0" r="r" b="b"/>
+            <a:rect l="l" t="t" r="r" b="b"/>
             <a:pathLst>
               <a:path w="402" h="1401">
                 <a:moveTo>
@@ -29654,13 +29711,13 @@
         <p:spPr>
           <a:xfrm>
             <a:off x="4788000" y="1764000"/>
-            <a:ext cx="144000" cy="504000"/>
+            <a:ext cx="143640" cy="503640"/>
           </a:xfrm>
           <a:custGeom>
             <a:avLst/>
             <a:gdLst/>
             <a:ahLst/>
-            <a:rect l="0" t="0" r="r" b="b"/>
+            <a:rect l="l" t="t" r="r" b="b"/>
             <a:pathLst>
               <a:path w="402" h="1401">
                 <a:moveTo>
@@ -29715,13 +29772,13 @@
         <p:spPr>
           <a:xfrm>
             <a:off x="2304000" y="3384000"/>
-            <a:ext cx="504000" cy="144000"/>
+            <a:ext cx="503640" cy="143640"/>
           </a:xfrm>
           <a:custGeom>
             <a:avLst/>
             <a:gdLst/>
             <a:ahLst/>
-            <a:rect l="0" t="0" r="r" b="b"/>
+            <a:rect l="l" t="t" r="r" b="b"/>
             <a:pathLst>
               <a:path w="1401" h="402">
                 <a:moveTo>
@@ -29776,13 +29833,13 @@
         <p:spPr>
           <a:xfrm>
             <a:off x="6804000" y="3384360"/>
-            <a:ext cx="504000" cy="144000"/>
+            <a:ext cx="503640" cy="143640"/>
           </a:xfrm>
           <a:custGeom>
             <a:avLst/>
             <a:gdLst/>
             <a:ahLst/>
-            <a:rect l="0" t="0" r="r" b="b"/>
+            <a:rect l="l" t="t" r="r" b="b"/>
             <a:pathLst>
               <a:path w="1401" h="402">
                 <a:moveTo>
@@ -29867,7 +29924,7 @@
         <p:spPr>
           <a:xfrm>
             <a:off x="3060000" y="2268000"/>
-            <a:ext cx="1432800" cy="784800"/>
+            <a:ext cx="1432440" cy="784440"/>
           </a:xfrm>
           <a:prstGeom prst="rect">
             <a:avLst/>
@@ -29922,7 +29979,7 @@
         <p:spPr>
           <a:xfrm>
             <a:off x="5832000" y="1980000"/>
-            <a:ext cx="1432800" cy="1360800"/>
+            <a:ext cx="1432440" cy="1360440"/>
           </a:xfrm>
           <a:custGeom>
             <a:avLst/>
@@ -30074,7 +30131,7 @@
         <p:spPr>
           <a:xfrm>
             <a:off x="2376000" y="1044000"/>
-            <a:ext cx="1144800" cy="676800"/>
+            <a:ext cx="1144440" cy="676440"/>
           </a:xfrm>
           <a:prstGeom prst="ellipse">
             <a:avLst/>
@@ -30129,7 +30186,7 @@
         <p:spPr>
           <a:xfrm>
             <a:off x="3780360" y="1044360"/>
-            <a:ext cx="1144800" cy="676800"/>
+            <a:ext cx="1144440" cy="676440"/>
           </a:xfrm>
           <a:prstGeom prst="ellipse">
             <a:avLst/>
@@ -30184,7 +30241,7 @@
         <p:spPr>
           <a:xfrm>
             <a:off x="2376360" y="1044360"/>
-            <a:ext cx="1144800" cy="676800"/>
+            <a:ext cx="1144440" cy="676440"/>
           </a:xfrm>
           <a:prstGeom prst="ellipse">
             <a:avLst/>
@@ -30239,7 +30296,7 @@
         <p:spPr>
           <a:xfrm>
             <a:off x="1512720" y="2160720"/>
-            <a:ext cx="1144800" cy="676800"/>
+            <a:ext cx="1144440" cy="676440"/>
           </a:xfrm>
           <a:prstGeom prst="ellipse">
             <a:avLst/>
@@ -30375,7 +30432,7 @@
         <p:spPr>
           <a:xfrm>
             <a:off x="4500000" y="2376000"/>
-            <a:ext cx="1396800" cy="595080"/>
+            <a:ext cx="1396440" cy="594720"/>
           </a:xfrm>
           <a:prstGeom prst="rect">
             <a:avLst/>
@@ -30426,7 +30483,7 @@
         <p:spPr>
           <a:xfrm>
             <a:off x="4320000" y="3204360"/>
-            <a:ext cx="1396800" cy="595080"/>
+            <a:ext cx="1396440" cy="594720"/>
           </a:xfrm>
           <a:prstGeom prst="rect">
             <a:avLst/>
@@ -30461,6 +30518,533 @@
                 <a:ea typeface="DejaVu Sans"/>
               </a:rPr>
               <a:t>WORKER</a:t>
+            </a:r>
+            <a:endParaRPr b="0" lang="en-IN" sz="1800" spc="-1" strike="noStrike">
+              <a:latin typeface="Arial"/>
+            </a:endParaRPr>
+          </a:p>
+        </p:txBody>
+      </p:sp>
+    </p:spTree>
+  </p:cSld>
+  <mc:AlternateContent>
+    <mc:Choice Requires="p14">
+      <p:transition spd="slow" p14:dur="2000"/>
+    </mc:Choice>
+    <mc:Fallback>
+      <p:transition spd="slow"/>
+    </mc:Fallback>
+  </mc:AlternateContent>
+</p:sld>
+</file>
+
+<file path=ppt/slides/slide30.xml><?xml version="1.0" encoding="utf-8"?>
+<p:sld xmlns:a="http://schemas.openxmlformats.org/drawingml/2006/main" xmlns:p="http://schemas.openxmlformats.org/presentationml/2006/main" xmlns:r="http://schemas.openxmlformats.org/officeDocument/2006/relationships" xmlns:p14="http://schemas.microsoft.com/office/powerpoint/2010/main" xmlns:p15="http://schemas.microsoft.com/office/powerpoint/2012/main" xmlns:mc="http://schemas.openxmlformats.org/markup-compatibility/2006">
+  <p:cSld>
+    <p:spTree>
+      <p:nvGrpSpPr>
+        <p:cNvPr id="1" name=""/>
+        <p:cNvGrpSpPr/>
+        <p:nvPr/>
+      </p:nvGrpSpPr>
+      <p:grpSpPr>
+        <a:xfrm>
+          <a:off x="0" y="0"/>
+          <a:ext cx="0" cy="0"/>
+          <a:chOff x="0" y="0"/>
+          <a:chExt cx="0" cy="0"/>
+        </a:xfrm>
+      </p:grpSpPr>
+      <p:sp>
+        <p:nvSpPr>
+          <p:cNvPr id="615" name="CustomShape 1"/>
+          <p:cNvSpPr/>
+          <p:nvPr/>
+        </p:nvSpPr>
+        <p:spPr>
+          <a:xfrm>
+            <a:off x="864000" y="1080000"/>
+            <a:ext cx="3096000" cy="3456000"/>
+          </a:xfrm>
+          <a:prstGeom prst="rect">
+            <a:avLst/>
+          </a:prstGeom>
+          <a:solidFill>
+            <a:srgbClr val="729fcf"/>
+          </a:solidFill>
+          <a:ln>
+            <a:solidFill>
+              <a:srgbClr val="3465a4"/>
+            </a:solidFill>
+          </a:ln>
+        </p:spPr>
+        <p:style>
+          <a:lnRef idx="0"/>
+          <a:fillRef idx="0"/>
+          <a:effectRef idx="0"/>
+          <a:fontRef idx="minor"/>
+        </p:style>
+        <p:txBody>
+          <a:bodyPr wrap="none" lIns="90000" rIns="90000" tIns="45000" bIns="45000" anchor="ctr">
+            <a:noAutofit/>
+          </a:bodyPr>
+          <a:p>
+            <a:pPr algn="ctr"/>
+            <a:r>
+              <a:rPr b="0" lang="en-IN" sz="1800" spc="-1" strike="noStrike">
+                <a:latin typeface="Arial"/>
+              </a:rPr>
+              <a:t>PROCESSOR</a:t>
+            </a:r>
+            <a:endParaRPr b="0" lang="en-IN" sz="1800" spc="-1" strike="noStrike">
+              <a:latin typeface="Arial"/>
+            </a:endParaRPr>
+          </a:p>
+        </p:txBody>
+      </p:sp>
+      <p:sp>
+        <p:nvSpPr>
+          <p:cNvPr id="616" name="CustomShape 2"/>
+          <p:cNvSpPr/>
+          <p:nvPr/>
+        </p:nvSpPr>
+        <p:spPr>
+          <a:xfrm>
+            <a:off x="3384000" y="1656000"/>
+            <a:ext cx="576000" cy="936000"/>
+          </a:xfrm>
+          <a:prstGeom prst="rect">
+            <a:avLst/>
+          </a:prstGeom>
+          <a:solidFill>
+            <a:srgbClr val="729fcf"/>
+          </a:solidFill>
+          <a:ln>
+            <a:solidFill>
+              <a:srgbClr val="3465a4"/>
+            </a:solidFill>
+          </a:ln>
+        </p:spPr>
+        <p:style>
+          <a:lnRef idx="0"/>
+          <a:fillRef idx="0"/>
+          <a:effectRef idx="0"/>
+          <a:fontRef idx="minor"/>
+        </p:style>
+        <p:txBody>
+          <a:bodyPr wrap="none" lIns="90000" rIns="90000" tIns="45000" bIns="45000" anchor="ctr">
+            <a:noAutofit/>
+          </a:bodyPr>
+          <a:p>
+            <a:pPr algn="ctr"/>
+            <a:r>
+              <a:rPr b="0" lang="en-IN" sz="1800" spc="-1" strike="noStrike">
+                <a:latin typeface="Arial"/>
+              </a:rPr>
+              <a:t>M</a:t>
+            </a:r>
+            <a:endParaRPr b="0" lang="en-IN" sz="1800" spc="-1" strike="noStrike">
+              <a:latin typeface="Arial"/>
+            </a:endParaRPr>
+          </a:p>
+          <a:p>
+            <a:pPr algn="ctr"/>
+            <a:r>
+              <a:rPr b="0" lang="en-IN" sz="1800" spc="-1" strike="noStrike">
+                <a:latin typeface="Arial"/>
+              </a:rPr>
+              <a:t>A</a:t>
+            </a:r>
+            <a:endParaRPr b="0" lang="en-IN" sz="1800" spc="-1" strike="noStrike">
+              <a:latin typeface="Arial"/>
+            </a:endParaRPr>
+          </a:p>
+          <a:p>
+            <a:pPr algn="ctr"/>
+            <a:r>
+              <a:rPr b="0" lang="en-IN" sz="1800" spc="-1" strike="noStrike">
+                <a:latin typeface="Arial"/>
+              </a:rPr>
+              <a:t>R</a:t>
+            </a:r>
+            <a:endParaRPr b="0" lang="en-IN" sz="1800" spc="-1" strike="noStrike">
+              <a:latin typeface="Arial"/>
+            </a:endParaRPr>
+          </a:p>
+        </p:txBody>
+      </p:sp>
+      <p:sp>
+        <p:nvSpPr>
+          <p:cNvPr id="617" name="CustomShape 3"/>
+          <p:cNvSpPr/>
+          <p:nvPr/>
+        </p:nvSpPr>
+        <p:spPr>
+          <a:xfrm>
+            <a:off x="3384000" y="2952000"/>
+            <a:ext cx="576000" cy="1008000"/>
+          </a:xfrm>
+          <a:prstGeom prst="rect">
+            <a:avLst/>
+          </a:prstGeom>
+          <a:solidFill>
+            <a:srgbClr val="729fcf"/>
+          </a:solidFill>
+          <a:ln>
+            <a:solidFill>
+              <a:srgbClr val="3465a4"/>
+            </a:solidFill>
+          </a:ln>
+        </p:spPr>
+        <p:style>
+          <a:lnRef idx="0"/>
+          <a:fillRef idx="0"/>
+          <a:effectRef idx="0"/>
+          <a:fontRef idx="minor"/>
+        </p:style>
+        <p:txBody>
+          <a:bodyPr wrap="none" lIns="90000" rIns="90000" tIns="45000" bIns="45000" anchor="ctr">
+            <a:noAutofit/>
+          </a:bodyPr>
+          <a:p>
+            <a:pPr algn="ctr"/>
+            <a:r>
+              <a:rPr b="0" lang="en-IN" sz="1800" spc="-1" strike="noStrike">
+                <a:latin typeface="Arial"/>
+              </a:rPr>
+              <a:t>M</a:t>
+            </a:r>
+            <a:endParaRPr b="0" lang="en-IN" sz="1800" spc="-1" strike="noStrike">
+              <a:latin typeface="Arial"/>
+            </a:endParaRPr>
+          </a:p>
+          <a:p>
+            <a:pPr algn="ctr"/>
+            <a:r>
+              <a:rPr b="0" lang="en-IN" sz="1800" spc="-1" strike="noStrike">
+                <a:latin typeface="Arial"/>
+              </a:rPr>
+              <a:t>D</a:t>
+            </a:r>
+            <a:endParaRPr b="0" lang="en-IN" sz="1800" spc="-1" strike="noStrike">
+              <a:latin typeface="Arial"/>
+            </a:endParaRPr>
+          </a:p>
+          <a:p>
+            <a:pPr algn="ctr"/>
+            <a:r>
+              <a:rPr b="0" lang="en-IN" sz="1800" spc="-1" strike="noStrike">
+                <a:latin typeface="Arial"/>
+              </a:rPr>
+              <a:t>R</a:t>
+            </a:r>
+            <a:endParaRPr b="0" lang="en-IN" sz="1800" spc="-1" strike="noStrike">
+              <a:latin typeface="Arial"/>
+            </a:endParaRPr>
+          </a:p>
+        </p:txBody>
+      </p:sp>
+      <p:sp>
+        <p:nvSpPr>
+          <p:cNvPr id="618" name="CustomShape 4"/>
+          <p:cNvSpPr/>
+          <p:nvPr/>
+        </p:nvSpPr>
+        <p:spPr>
+          <a:xfrm>
+            <a:off x="5832000" y="1692000"/>
+            <a:ext cx="2232000" cy="2160000"/>
+          </a:xfrm>
+          <a:prstGeom prst="rect">
+            <a:avLst/>
+          </a:prstGeom>
+          <a:solidFill>
+            <a:srgbClr val="729fcf"/>
+          </a:solidFill>
+          <a:ln>
+            <a:solidFill>
+              <a:srgbClr val="3465a4"/>
+            </a:solidFill>
+          </a:ln>
+        </p:spPr>
+        <p:style>
+          <a:lnRef idx="0"/>
+          <a:fillRef idx="0"/>
+          <a:effectRef idx="0"/>
+          <a:fontRef idx="minor"/>
+        </p:style>
+        <p:txBody>
+          <a:bodyPr wrap="none" lIns="90000" rIns="90000" tIns="45000" bIns="45000" anchor="ctr">
+            <a:noAutofit/>
+          </a:bodyPr>
+          <a:p>
+            <a:pPr algn="ctr"/>
+            <a:r>
+              <a:rPr b="0" lang="en-IN" sz="1800" spc="-1" strike="noStrike">
+                <a:latin typeface="Arial"/>
+              </a:rPr>
+              <a:t>Primary Memory</a:t>
+            </a:r>
+            <a:endParaRPr b="0" lang="en-IN" sz="1800" spc="-1" strike="noStrike">
+              <a:latin typeface="Arial"/>
+            </a:endParaRPr>
+          </a:p>
+        </p:txBody>
+      </p:sp>
+      <p:sp>
+        <p:nvSpPr>
+          <p:cNvPr id="619" name="CustomShape 5"/>
+          <p:cNvSpPr/>
+          <p:nvPr/>
+        </p:nvSpPr>
+        <p:spPr>
+          <a:xfrm>
+            <a:off x="3960000" y="2016000"/>
+            <a:ext cx="1872000" cy="216000"/>
+          </a:xfrm>
+          <a:custGeom>
+            <a:avLst/>
+            <a:gdLst/>
+            <a:ahLst/>
+            <a:rect l="0" t="0" r="r" b="b"/>
+            <a:pathLst>
+              <a:path w="5202" h="602">
+                <a:moveTo>
+                  <a:pt x="0" y="150"/>
+                </a:moveTo>
+                <a:lnTo>
+                  <a:pt x="3900" y="150"/>
+                </a:lnTo>
+                <a:lnTo>
+                  <a:pt x="3900" y="0"/>
+                </a:lnTo>
+                <a:lnTo>
+                  <a:pt x="5201" y="300"/>
+                </a:lnTo>
+                <a:lnTo>
+                  <a:pt x="3900" y="601"/>
+                </a:lnTo>
+                <a:lnTo>
+                  <a:pt x="3900" y="450"/>
+                </a:lnTo>
+                <a:lnTo>
+                  <a:pt x="0" y="450"/>
+                </a:lnTo>
+                <a:lnTo>
+                  <a:pt x="0" y="150"/>
+                </a:lnTo>
+              </a:path>
+            </a:pathLst>
+          </a:custGeom>
+          <a:solidFill>
+            <a:srgbClr val="729fcf"/>
+          </a:solidFill>
+          <a:ln>
+            <a:solidFill>
+              <a:srgbClr val="3465a4"/>
+            </a:solidFill>
+          </a:ln>
+        </p:spPr>
+        <p:style>
+          <a:lnRef idx="0"/>
+          <a:fillRef idx="0"/>
+          <a:effectRef idx="0"/>
+          <a:fontRef idx="minor"/>
+        </p:style>
+      </p:sp>
+      <p:sp>
+        <p:nvSpPr>
+          <p:cNvPr id="620" name="CustomShape 6"/>
+          <p:cNvSpPr/>
+          <p:nvPr/>
+        </p:nvSpPr>
+        <p:spPr>
+          <a:xfrm>
+            <a:off x="3960000" y="3168000"/>
+            <a:ext cx="1872000" cy="288000"/>
+          </a:xfrm>
+          <a:custGeom>
+            <a:avLst/>
+            <a:gdLst/>
+            <a:ahLst/>
+            <a:rect l="0" t="0" r="r" b="b"/>
+            <a:pathLst>
+              <a:path w="5202" h="802">
+                <a:moveTo>
+                  <a:pt x="0" y="400"/>
+                </a:moveTo>
+                <a:lnTo>
+                  <a:pt x="1035" y="0"/>
+                </a:lnTo>
+                <a:lnTo>
+                  <a:pt x="1035" y="200"/>
+                </a:lnTo>
+                <a:lnTo>
+                  <a:pt x="4165" y="200"/>
+                </a:lnTo>
+                <a:lnTo>
+                  <a:pt x="4165" y="0"/>
+                </a:lnTo>
+                <a:lnTo>
+                  <a:pt x="5201" y="400"/>
+                </a:lnTo>
+                <a:lnTo>
+                  <a:pt x="4165" y="801"/>
+                </a:lnTo>
+                <a:lnTo>
+                  <a:pt x="4165" y="600"/>
+                </a:lnTo>
+                <a:lnTo>
+                  <a:pt x="1035" y="600"/>
+                </a:lnTo>
+                <a:lnTo>
+                  <a:pt x="1035" y="801"/>
+                </a:lnTo>
+                <a:lnTo>
+                  <a:pt x="0" y="400"/>
+                </a:lnTo>
+              </a:path>
+            </a:pathLst>
+          </a:custGeom>
+          <a:solidFill>
+            <a:srgbClr val="729fcf"/>
+          </a:solidFill>
+          <a:ln>
+            <a:solidFill>
+              <a:srgbClr val="3465a4"/>
+            </a:solidFill>
+          </a:ln>
+        </p:spPr>
+        <p:style>
+          <a:lnRef idx="0"/>
+          <a:fillRef idx="0"/>
+          <a:effectRef idx="0"/>
+          <a:fontRef idx="minor"/>
+        </p:style>
+      </p:sp>
+      <p:cxnSp>
+        <p:nvCxnSpPr>
+          <p:cNvPr id="621" name="Line 7"/>
+          <p:cNvCxnSpPr/>
+          <p:nvPr/>
+        </p:nvCxnSpPr>
+        <p:spPr>
+          <a:xfrm>
+            <a:off x="0" y="0"/>
+            <a:ext cx="360" cy="360"/>
+          </a:xfrm>
+          <a:prstGeom prst="line">
+            <a:avLst/>
+          </a:prstGeom>
+          <a:ln>
+            <a:solidFill>
+              <a:srgbClr val="3465a4"/>
+            </a:solidFill>
+            <a:tailEnd len="med" type="triangle" w="med"/>
+          </a:ln>
+        </p:spPr>
+      </p:cxnSp>
+      <p:sp>
+        <p:nvSpPr>
+          <p:cNvPr id="622" name="TextShape 8"/>
+          <p:cNvSpPr txBox="1"/>
+          <p:nvPr/>
+        </p:nvSpPr>
+        <p:spPr>
+          <a:xfrm>
+            <a:off x="4320000" y="4428000"/>
+            <a:ext cx="2520000" cy="346320"/>
+          </a:xfrm>
+          <a:prstGeom prst="rect">
+            <a:avLst/>
+          </a:prstGeom>
+          <a:noFill/>
+          <a:ln>
+            <a:noFill/>
+          </a:ln>
+        </p:spPr>
+        <p:txBody>
+          <a:bodyPr lIns="90000" rIns="90000" tIns="45000" bIns="45000">
+            <a:noAutofit/>
+          </a:bodyPr>
+          <a:p>
+            <a:r>
+              <a:rPr b="0" lang="en-IN" sz="1800" spc="-1" strike="noStrike">
+                <a:latin typeface="Arial"/>
+              </a:rPr>
+              <a:t>Control Signals</a:t>
+            </a:r>
+            <a:endParaRPr b="0" lang="en-IN" sz="1800" spc="-1" strike="noStrike">
+              <a:latin typeface="Arial"/>
+            </a:endParaRPr>
+          </a:p>
+        </p:txBody>
+      </p:sp>
+      <p:sp>
+        <p:nvSpPr>
+          <p:cNvPr id="623" name="TextShape 9"/>
+          <p:cNvSpPr txBox="1"/>
+          <p:nvPr/>
+        </p:nvSpPr>
+        <p:spPr>
+          <a:xfrm>
+            <a:off x="4536000" y="2916000"/>
+            <a:ext cx="2520000" cy="346320"/>
+          </a:xfrm>
+          <a:prstGeom prst="rect">
+            <a:avLst/>
+          </a:prstGeom>
+          <a:noFill/>
+          <a:ln>
+            <a:noFill/>
+          </a:ln>
+        </p:spPr>
+        <p:txBody>
+          <a:bodyPr lIns="90000" rIns="90000" tIns="45000" bIns="45000">
+            <a:noAutofit/>
+          </a:bodyPr>
+          <a:p>
+            <a:r>
+              <a:rPr b="0" lang="en-IN" sz="1800" spc="-1" strike="noStrike">
+                <a:latin typeface="Arial"/>
+              </a:rPr>
+              <a:t>Data</a:t>
+            </a:r>
+            <a:endParaRPr b="0" lang="en-IN" sz="1800" spc="-1" strike="noStrike">
+              <a:latin typeface="Arial"/>
+            </a:endParaRPr>
+          </a:p>
+        </p:txBody>
+      </p:sp>
+      <p:sp>
+        <p:nvSpPr>
+          <p:cNvPr id="624" name="TextShape 10"/>
+          <p:cNvSpPr txBox="1"/>
+          <p:nvPr/>
+        </p:nvSpPr>
+        <p:spPr>
+          <a:xfrm>
+            <a:off x="4248000" y="1764000"/>
+            <a:ext cx="2520000" cy="346320"/>
+          </a:xfrm>
+          <a:prstGeom prst="rect">
+            <a:avLst/>
+          </a:prstGeom>
+          <a:noFill/>
+          <a:ln>
+            <a:noFill/>
+          </a:ln>
+        </p:spPr>
+        <p:txBody>
+          <a:bodyPr lIns="90000" rIns="90000" tIns="45000" bIns="45000">
+            <a:noAutofit/>
+          </a:bodyPr>
+          <a:p>
+            <a:r>
+              <a:rPr b="0" lang="en-IN" sz="1800" spc="-1" strike="noStrike">
+                <a:latin typeface="Arial"/>
+              </a:rPr>
+              <a:t>Address</a:t>
             </a:r>
             <a:endParaRPr b="0" lang="en-IN" sz="1800" spc="-1" strike="noStrike">
               <a:latin typeface="Arial"/>
@@ -30507,7 +31091,7 @@
         <p:spPr>
           <a:xfrm>
             <a:off x="504000" y="576000"/>
-            <a:ext cx="425160" cy="1649160"/>
+            <a:ext cx="424800" cy="1648800"/>
           </a:xfrm>
           <a:prstGeom prst="ellipse">
             <a:avLst/>
@@ -30537,7 +31121,7 @@
         <p:spPr>
           <a:xfrm>
             <a:off x="1440360" y="576360"/>
-            <a:ext cx="425160" cy="1649160"/>
+            <a:ext cx="424800" cy="1648800"/>
           </a:xfrm>
           <a:prstGeom prst="ellipse">
             <a:avLst/>
@@ -30567,7 +31151,7 @@
         <p:spPr>
           <a:xfrm>
             <a:off x="3204720" y="612720"/>
-            <a:ext cx="425160" cy="1649160"/>
+            <a:ext cx="424800" cy="1648800"/>
           </a:xfrm>
           <a:prstGeom prst="ellipse">
             <a:avLst/>
@@ -30597,7 +31181,7 @@
         <p:spPr>
           <a:xfrm>
             <a:off x="4068720" y="576720"/>
-            <a:ext cx="425160" cy="1649160"/>
+            <a:ext cx="424800" cy="1648800"/>
           </a:xfrm>
           <a:prstGeom prst="ellipse">
             <a:avLst/>
@@ -30627,7 +31211,7 @@
         <p:spPr>
           <a:xfrm>
             <a:off x="504720" y="3204720"/>
-            <a:ext cx="425160" cy="1649160"/>
+            <a:ext cx="424800" cy="1648800"/>
           </a:xfrm>
           <a:prstGeom prst="ellipse">
             <a:avLst/>
@@ -30657,7 +31241,7 @@
         <p:spPr>
           <a:xfrm>
             <a:off x="1440720" y="3168720"/>
-            <a:ext cx="425160" cy="1649160"/>
+            <a:ext cx="424800" cy="1648800"/>
           </a:xfrm>
           <a:prstGeom prst="ellipse">
             <a:avLst/>
@@ -30687,7 +31271,7 @@
         <p:spPr>
           <a:xfrm>
             <a:off x="3240720" y="3168720"/>
-            <a:ext cx="425160" cy="1649160"/>
+            <a:ext cx="424800" cy="1648800"/>
           </a:xfrm>
           <a:prstGeom prst="ellipse">
             <a:avLst/>
@@ -30717,7 +31301,7 @@
         <p:spPr>
           <a:xfrm>
             <a:off x="4068720" y="3168720"/>
-            <a:ext cx="425160" cy="1649160"/>
+            <a:ext cx="424800" cy="1648800"/>
           </a:xfrm>
           <a:prstGeom prst="ellipse">
             <a:avLst/>
@@ -30747,7 +31331,7 @@
         <p:spPr>
           <a:xfrm>
             <a:off x="540000" y="936000"/>
-            <a:ext cx="497160" cy="339480"/>
+            <a:ext cx="496800" cy="339120"/>
           </a:xfrm>
           <a:prstGeom prst="rect">
             <a:avLst/>
@@ -30798,7 +31382,7 @@
         <p:spPr>
           <a:xfrm>
             <a:off x="540000" y="1512000"/>
-            <a:ext cx="497160" cy="339480"/>
+            <a:ext cx="496800" cy="339120"/>
           </a:xfrm>
           <a:prstGeom prst="rect">
             <a:avLst/>
@@ -30849,7 +31433,7 @@
         <p:spPr>
           <a:xfrm>
             <a:off x="1512000" y="1512000"/>
-            <a:ext cx="497160" cy="339480"/>
+            <a:ext cx="496800" cy="339120"/>
           </a:xfrm>
           <a:prstGeom prst="rect">
             <a:avLst/>
@@ -30900,7 +31484,7 @@
         <p:spPr>
           <a:xfrm>
             <a:off x="1512000" y="900000"/>
-            <a:ext cx="497160" cy="339480"/>
+            <a:ext cx="496800" cy="339120"/>
           </a:xfrm>
           <a:prstGeom prst="rect">
             <a:avLst/>
@@ -30951,7 +31535,7 @@
         <p:spPr>
           <a:xfrm>
             <a:off x="540000" y="1260000"/>
-            <a:ext cx="497160" cy="339480"/>
+            <a:ext cx="496800" cy="339120"/>
           </a:xfrm>
           <a:prstGeom prst="rect">
             <a:avLst/>
@@ -31002,7 +31586,7 @@
         <p:spPr>
           <a:xfrm>
             <a:off x="1512000" y="1224000"/>
-            <a:ext cx="497160" cy="339480"/>
+            <a:ext cx="496800" cy="339120"/>
           </a:xfrm>
           <a:prstGeom prst="rect">
             <a:avLst/>
@@ -31053,7 +31637,7 @@
         <p:spPr>
           <a:xfrm>
             <a:off x="3240000" y="900000"/>
-            <a:ext cx="497160" cy="339480"/>
+            <a:ext cx="496800" cy="339120"/>
           </a:xfrm>
           <a:prstGeom prst="rect">
             <a:avLst/>
@@ -31104,7 +31688,7 @@
         <p:spPr>
           <a:xfrm>
             <a:off x="4104000" y="900000"/>
-            <a:ext cx="497160" cy="339480"/>
+            <a:ext cx="496800" cy="339120"/>
           </a:xfrm>
           <a:prstGeom prst="rect">
             <a:avLst/>
@@ -31155,7 +31739,7 @@
         <p:spPr>
           <a:xfrm>
             <a:off x="4104000" y="1224000"/>
-            <a:ext cx="497160" cy="339480"/>
+            <a:ext cx="496800" cy="339120"/>
           </a:xfrm>
           <a:prstGeom prst="rect">
             <a:avLst/>
@@ -31206,7 +31790,7 @@
         <p:spPr>
           <a:xfrm>
             <a:off x="4104000" y="1620000"/>
-            <a:ext cx="497160" cy="339480"/>
+            <a:ext cx="496800" cy="339120"/>
           </a:xfrm>
           <a:prstGeom prst="rect">
             <a:avLst/>
@@ -31257,7 +31841,7 @@
         <p:spPr>
           <a:xfrm>
             <a:off x="576000" y="3492000"/>
-            <a:ext cx="497160" cy="339480"/>
+            <a:ext cx="496800" cy="339120"/>
           </a:xfrm>
           <a:prstGeom prst="rect">
             <a:avLst/>
@@ -31308,7 +31892,7 @@
         <p:spPr>
           <a:xfrm>
             <a:off x="576000" y="3852000"/>
-            <a:ext cx="497160" cy="339480"/>
+            <a:ext cx="496800" cy="339120"/>
           </a:xfrm>
           <a:prstGeom prst="rect">
             <a:avLst/>
@@ -31359,7 +31943,7 @@
         <p:spPr>
           <a:xfrm>
             <a:off x="576000" y="4176000"/>
-            <a:ext cx="497160" cy="339480"/>
+            <a:ext cx="496800" cy="339120"/>
           </a:xfrm>
           <a:prstGeom prst="rect">
             <a:avLst/>
@@ -31410,7 +31994,7 @@
         <p:spPr>
           <a:xfrm>
             <a:off x="1476000" y="3492000"/>
-            <a:ext cx="497160" cy="339480"/>
+            <a:ext cx="496800" cy="339120"/>
           </a:xfrm>
           <a:prstGeom prst="rect">
             <a:avLst/>
@@ -31461,7 +32045,7 @@
         <p:spPr>
           <a:xfrm>
             <a:off x="3240000" y="3492000"/>
-            <a:ext cx="497160" cy="339480"/>
+            <a:ext cx="496800" cy="339120"/>
           </a:xfrm>
           <a:prstGeom prst="rect">
             <a:avLst/>
@@ -31512,7 +32096,7 @@
         <p:spPr>
           <a:xfrm>
             <a:off x="3276000" y="3960000"/>
-            <a:ext cx="497160" cy="339480"/>
+            <a:ext cx="496800" cy="339120"/>
           </a:xfrm>
           <a:prstGeom prst="rect">
             <a:avLst/>
@@ -31563,7 +32147,7 @@
         <p:spPr>
           <a:xfrm>
             <a:off x="4140000" y="3492000"/>
-            <a:ext cx="497160" cy="339480"/>
+            <a:ext cx="496800" cy="339120"/>
           </a:xfrm>
           <a:prstGeom prst="rect">
             <a:avLst/>
@@ -31614,7 +32198,7 @@
         <p:spPr>
           <a:xfrm>
             <a:off x="4140000" y="3924000"/>
-            <a:ext cx="497160" cy="339480"/>
+            <a:ext cx="496800" cy="339120"/>
           </a:xfrm>
           <a:prstGeom prst="rect">
             <a:avLst/>
@@ -31962,7 +32546,7 @@
         <p:spPr>
           <a:xfrm>
             <a:off x="540000" y="2412000"/>
-            <a:ext cx="1289160" cy="339480"/>
+            <a:ext cx="1288800" cy="339120"/>
           </a:xfrm>
           <a:prstGeom prst="rect">
             <a:avLst/>
@@ -32013,7 +32597,7 @@
         <p:spPr>
           <a:xfrm>
             <a:off x="3168000" y="2412000"/>
-            <a:ext cx="1433160" cy="389160"/>
+            <a:ext cx="1432800" cy="388800"/>
           </a:xfrm>
           <a:prstGeom prst="rect">
             <a:avLst/>
@@ -32064,7 +32648,7 @@
         <p:spPr>
           <a:xfrm>
             <a:off x="3168000" y="4968000"/>
-            <a:ext cx="1577160" cy="353160"/>
+            <a:ext cx="1576800" cy="352800"/>
           </a:xfrm>
           <a:prstGeom prst="rect">
             <a:avLst/>
@@ -32115,7 +32699,7 @@
         <p:spPr>
           <a:xfrm>
             <a:off x="504000" y="4968000"/>
-            <a:ext cx="1433160" cy="353160"/>
+            <a:ext cx="1432800" cy="352800"/>
           </a:xfrm>
           <a:prstGeom prst="rect">
             <a:avLst/>
@@ -32196,7 +32780,7 @@
         <p:spPr>
           <a:xfrm>
             <a:off x="1872000" y="1008000"/>
-            <a:ext cx="2081520" cy="785520"/>
+            <a:ext cx="2081160" cy="785160"/>
           </a:xfrm>
           <a:prstGeom prst="rect">
             <a:avLst/>
@@ -32226,7 +32810,7 @@
         <p:spPr>
           <a:xfrm>
             <a:off x="5328000" y="756000"/>
-            <a:ext cx="1649520" cy="1217520"/>
+            <a:ext cx="1649160" cy="1217160"/>
           </a:xfrm>
           <a:custGeom>
             <a:avLst/>
@@ -32279,7 +32863,7 @@
         <p:spPr>
           <a:xfrm>
             <a:off x="1872360" y="3672360"/>
-            <a:ext cx="2081520" cy="785520"/>
+            <a:ext cx="2081160" cy="785160"/>
           </a:xfrm>
           <a:prstGeom prst="rect">
             <a:avLst/>
@@ -32309,7 +32893,7 @@
         <p:spPr>
           <a:xfrm>
             <a:off x="5328360" y="3420360"/>
-            <a:ext cx="1649520" cy="1217520"/>
+            <a:ext cx="1649160" cy="1217160"/>
           </a:xfrm>
           <a:custGeom>
             <a:avLst/>
@@ -32417,7 +33001,7 @@
         <p:spPr>
           <a:xfrm>
             <a:off x="1188000" y="2304000"/>
-            <a:ext cx="6905520" cy="339840"/>
+            <a:ext cx="6905160" cy="339480"/>
           </a:xfrm>
           <a:prstGeom prst="rect">
             <a:avLst/>
@@ -32468,7 +33052,7 @@
         <p:spPr>
           <a:xfrm>
             <a:off x="1080000" y="4788000"/>
-            <a:ext cx="7157520" cy="595800"/>
+            <a:ext cx="7157160" cy="595440"/>
           </a:xfrm>
           <a:prstGeom prst="rect">
             <a:avLst/>
@@ -32549,7 +33133,7 @@
         <p:spPr>
           <a:xfrm>
             <a:off x="1908000" y="2232000"/>
-            <a:ext cx="1432800" cy="784800"/>
+            <a:ext cx="1432440" cy="784440"/>
           </a:xfrm>
           <a:prstGeom prst="rect">
             <a:avLst/>
@@ -32604,7 +33188,7 @@
         <p:spPr>
           <a:xfrm>
             <a:off x="6084000" y="2232000"/>
-            <a:ext cx="1432800" cy="784800"/>
+            <a:ext cx="1432440" cy="784440"/>
           </a:xfrm>
           <a:prstGeom prst="rect">
             <a:avLst/>
@@ -32659,7 +33243,7 @@
         <p:spPr>
           <a:xfrm>
             <a:off x="4032000" y="1944000"/>
-            <a:ext cx="1432800" cy="1360800"/>
+            <a:ext cx="1432440" cy="1360440"/>
           </a:xfrm>
           <a:custGeom>
             <a:avLst/>
@@ -32866,7 +33450,7 @@
         <p:spPr>
           <a:xfrm>
             <a:off x="2592000" y="3636000"/>
-            <a:ext cx="7121520" cy="595800"/>
+            <a:ext cx="7121160" cy="595440"/>
           </a:xfrm>
           <a:prstGeom prst="rect">
             <a:avLst/>
@@ -32967,7 +33551,7 @@
         <p:spPr>
           <a:xfrm>
             <a:off x="5934960" y="2130480"/>
-            <a:ext cx="1691280" cy="1002240"/>
+            <a:ext cx="1690920" cy="1001880"/>
           </a:xfrm>
           <a:prstGeom prst="rect">
             <a:avLst/>
@@ -32997,7 +33581,7 @@
         <p:spPr>
           <a:xfrm>
             <a:off x="1908000" y="2232000"/>
-            <a:ext cx="1432800" cy="784800"/>
+            <a:ext cx="1432440" cy="784440"/>
           </a:xfrm>
           <a:prstGeom prst="rect">
             <a:avLst/>
@@ -33052,7 +33636,7 @@
         <p:spPr>
           <a:xfrm>
             <a:off x="6084000" y="2232000"/>
-            <a:ext cx="1432800" cy="784800"/>
+            <a:ext cx="1432440" cy="784440"/>
           </a:xfrm>
           <a:prstGeom prst="rect">
             <a:avLst/>
@@ -33107,7 +33691,7 @@
         <p:spPr>
           <a:xfrm>
             <a:off x="4032000" y="1944000"/>
-            <a:ext cx="1432800" cy="1360800"/>
+            <a:ext cx="1432440" cy="1360440"/>
           </a:xfrm>
           <a:custGeom>
             <a:avLst/>
@@ -33266,7 +33850,7 @@
         <p:spPr>
           <a:xfrm>
             <a:off x="1764000" y="3564000"/>
-            <a:ext cx="7121520" cy="595800"/>
+            <a:ext cx="7121160" cy="595440"/>
           </a:xfrm>
           <a:prstGeom prst="rect">
             <a:avLst/>
@@ -33374,7 +33958,7 @@
         <p:spPr>
           <a:xfrm>
             <a:off x="1945800" y="3636000"/>
-            <a:ext cx="1432800" cy="784800"/>
+            <a:ext cx="1432440" cy="784440"/>
           </a:xfrm>
           <a:prstGeom prst="rect">
             <a:avLst/>
@@ -33449,7 +34033,7 @@
         <p:spPr>
           <a:xfrm>
             <a:off x="6300000" y="3673800"/>
-            <a:ext cx="1432800" cy="784800"/>
+            <a:ext cx="1432440" cy="784440"/>
           </a:xfrm>
           <a:prstGeom prst="rect">
             <a:avLst/>
@@ -33578,7 +34162,7 @@
         <p:spPr>
           <a:xfrm>
             <a:off x="1764000" y="4860000"/>
-            <a:ext cx="7121520" cy="595800"/>
+            <a:ext cx="7121160" cy="595440"/>
           </a:xfrm>
           <a:prstGeom prst="rect">
             <a:avLst/>
@@ -33604,7 +34188,7 @@
         <p:spPr>
           <a:xfrm>
             <a:off x="4140000" y="1080000"/>
-            <a:ext cx="1432800" cy="784800"/>
+            <a:ext cx="1432440" cy="784440"/>
           </a:xfrm>
           <a:prstGeom prst="rect">
             <a:avLst/>
@@ -33659,7 +34243,7 @@
         <p:spPr>
           <a:xfrm>
             <a:off x="4392000" y="2267640"/>
-            <a:ext cx="930600" cy="1002600"/>
+            <a:ext cx="930240" cy="1002240"/>
           </a:xfrm>
           <a:custGeom>
             <a:avLst/>
@@ -33708,7 +34292,7 @@
         <p:spPr>
           <a:xfrm>
             <a:off x="4572000" y="2304000"/>
-            <a:ext cx="642600" cy="340920"/>
+            <a:ext cx="642240" cy="340560"/>
           </a:xfrm>
           <a:prstGeom prst="rect">
             <a:avLst/>
@@ -33840,7 +34424,7 @@
         <p:spPr>
           <a:xfrm>
             <a:off x="2592000" y="432000"/>
-            <a:ext cx="1146600" cy="498600"/>
+            <a:ext cx="1146240" cy="498240"/>
           </a:xfrm>
           <a:prstGeom prst="ellipse">
             <a:avLst/>
@@ -33895,7 +34479,7 @@
         <p:spPr>
           <a:xfrm>
             <a:off x="4104360" y="360360"/>
-            <a:ext cx="1146600" cy="498600"/>
+            <a:ext cx="1146240" cy="498240"/>
           </a:xfrm>
           <a:prstGeom prst="ellipse">
             <a:avLst/>
@@ -33950,7 +34534,7 @@
         <p:spPr>
           <a:xfrm>
             <a:off x="5652720" y="432720"/>
-            <a:ext cx="1146600" cy="498600"/>
+            <a:ext cx="1146240" cy="498240"/>
           </a:xfrm>
           <a:prstGeom prst="ellipse">
             <a:avLst/>
@@ -34005,7 +34589,7 @@
         <p:spPr>
           <a:xfrm>
             <a:off x="3813480" y="4321080"/>
-            <a:ext cx="1146600" cy="498600"/>
+            <a:ext cx="1146240" cy="498240"/>
           </a:xfrm>
           <a:prstGeom prst="ellipse">
             <a:avLst/>
@@ -34060,7 +34644,7 @@
         <p:spPr>
           <a:xfrm>
             <a:off x="2193840" y="4717440"/>
-            <a:ext cx="1146600" cy="498600"/>
+            <a:ext cx="1146240" cy="498240"/>
           </a:xfrm>
           <a:prstGeom prst="ellipse">
             <a:avLst/>
@@ -34115,7 +34699,7 @@
         <p:spPr>
           <a:xfrm>
             <a:off x="682200" y="4501800"/>
-            <a:ext cx="1146600" cy="498600"/>
+            <a:ext cx="1146240" cy="498240"/>
           </a:xfrm>
           <a:prstGeom prst="ellipse">
             <a:avLst/>
@@ -34170,7 +34754,7 @@
         <p:spPr>
           <a:xfrm>
             <a:off x="5434560" y="4574160"/>
-            <a:ext cx="1146600" cy="498600"/>
+            <a:ext cx="1146240" cy="498240"/>
           </a:xfrm>
           <a:prstGeom prst="ellipse">
             <a:avLst/>
@@ -34225,7 +34809,7 @@
         <p:spPr>
           <a:xfrm>
             <a:off x="7634160" y="4574520"/>
-            <a:ext cx="1146600" cy="498600"/>
+            <a:ext cx="1146240" cy="498240"/>
           </a:xfrm>
           <a:prstGeom prst="ellipse">
             <a:avLst/>
@@ -34280,7 +34864,7 @@
         <p:spPr>
           <a:xfrm>
             <a:off x="686520" y="3098880"/>
-            <a:ext cx="1146600" cy="498600"/>
+            <a:ext cx="1146240" cy="498240"/>
           </a:xfrm>
           <a:prstGeom prst="ellipse">
             <a:avLst/>
@@ -34608,7 +35192,7 @@
         <p:spPr>
           <a:xfrm>
             <a:off x="432000" y="72000"/>
-            <a:ext cx="9066600" cy="2514600"/>
+            <a:ext cx="9066240" cy="2514240"/>
           </a:xfrm>
           <a:prstGeom prst="rect">
             <a:avLst/>
@@ -34638,7 +35222,7 @@
         <p:spPr>
           <a:xfrm>
             <a:off x="2016000" y="1188000"/>
-            <a:ext cx="1432800" cy="784800"/>
+            <a:ext cx="1432440" cy="784440"/>
           </a:xfrm>
           <a:prstGeom prst="rect">
             <a:avLst/>
@@ -34693,7 +35277,7 @@
         <p:spPr>
           <a:xfrm>
             <a:off x="6192000" y="1188000"/>
-            <a:ext cx="1432800" cy="784800"/>
+            <a:ext cx="1432440" cy="784440"/>
           </a:xfrm>
           <a:prstGeom prst="rect">
             <a:avLst/>
@@ -34748,7 +35332,7 @@
         <p:spPr>
           <a:xfrm>
             <a:off x="4140000" y="900000"/>
-            <a:ext cx="1432800" cy="1360800"/>
+            <a:ext cx="1432440" cy="1360440"/>
           </a:xfrm>
           <a:custGeom>
             <a:avLst/>
@@ -34907,7 +35491,7 @@
         <p:spPr>
           <a:xfrm>
             <a:off x="-36000" y="3384000"/>
-            <a:ext cx="2622600" cy="595800"/>
+            <a:ext cx="2622240" cy="595440"/>
           </a:xfrm>
           <a:prstGeom prst="rect">
             <a:avLst/>
@@ -34985,7 +35569,7 @@
         <p:spPr>
           <a:xfrm>
             <a:off x="5868360" y="180360"/>
-            <a:ext cx="1146600" cy="498600"/>
+            <a:ext cx="1146240" cy="498240"/>
           </a:xfrm>
           <a:prstGeom prst="ellipse">
             <a:avLst/>
@@ -35040,7 +35624,7 @@
         <p:spPr>
           <a:xfrm>
             <a:off x="7344720" y="216720"/>
-            <a:ext cx="1146600" cy="498600"/>
+            <a:ext cx="1146240" cy="498240"/>
           </a:xfrm>
           <a:prstGeom prst="ellipse">
             <a:avLst/>
@@ -35095,7 +35679,7 @@
         <p:spPr>
           <a:xfrm>
             <a:off x="7921080" y="937080"/>
-            <a:ext cx="1146600" cy="498600"/>
+            <a:ext cx="1146240" cy="498240"/>
           </a:xfrm>
           <a:prstGeom prst="ellipse">
             <a:avLst/>
@@ -35150,7 +35734,7 @@
         <p:spPr>
           <a:xfrm>
             <a:off x="7921440" y="1693440"/>
-            <a:ext cx="1146600" cy="498600"/>
+            <a:ext cx="1146240" cy="498240"/>
           </a:xfrm>
           <a:prstGeom prst="ellipse">
             <a:avLst/>
@@ -35205,7 +35789,7 @@
         <p:spPr>
           <a:xfrm>
             <a:off x="7921440" y="937440"/>
-            <a:ext cx="1146600" cy="498600"/>
+            <a:ext cx="1146240" cy="498240"/>
           </a:xfrm>
           <a:prstGeom prst="ellipse">
             <a:avLst/>
@@ -35260,7 +35844,7 @@
         <p:spPr>
           <a:xfrm>
             <a:off x="2089440" y="433440"/>
-            <a:ext cx="1146600" cy="498600"/>
+            <a:ext cx="1146240" cy="498240"/>
           </a:xfrm>
           <a:prstGeom prst="ellipse">
             <a:avLst/>
@@ -35315,7 +35899,7 @@
         <p:spPr>
           <a:xfrm>
             <a:off x="649800" y="541800"/>
-            <a:ext cx="1146600" cy="498600"/>
+            <a:ext cx="1146240" cy="498240"/>
           </a:xfrm>
           <a:prstGeom prst="ellipse">
             <a:avLst/>
@@ -35370,7 +35954,7 @@
         <p:spPr>
           <a:xfrm>
             <a:off x="4320000" y="3168000"/>
-            <a:ext cx="1036800" cy="786600"/>
+            <a:ext cx="1036440" cy="786240"/>
           </a:xfrm>
           <a:custGeom>
             <a:avLst/>
@@ -35448,7 +36032,7 @@
         <p:spPr>
           <a:xfrm>
             <a:off x="4176000" y="4428000"/>
-            <a:ext cx="1432800" cy="784800"/>
+            <a:ext cx="1432440" cy="784440"/>
           </a:xfrm>
           <a:prstGeom prst="rect">
             <a:avLst/>
@@ -35584,7 +36168,7 @@
         <p:spPr>
           <a:xfrm>
             <a:off x="5870160" y="3782160"/>
-            <a:ext cx="1146600" cy="498600"/>
+            <a:ext cx="1146240" cy="498240"/>
           </a:xfrm>
           <a:prstGeom prst="ellipse">
             <a:avLst/>
@@ -35639,7 +36223,7 @@
         <p:spPr>
           <a:xfrm>
             <a:off x="7380000" y="3115440"/>
-            <a:ext cx="2622600" cy="595800"/>
+            <a:ext cx="2622240" cy="595440"/>
           </a:xfrm>
           <a:prstGeom prst="rect">
             <a:avLst/>

</xml_diff>

<commit_message>
Computer Organization: Completed basic operation of computer
</commit_message>
<xml_diff>
--- a/GATE/images/gate_images.pptx
+++ b/GATE/images/gate_images.pptx
@@ -36,6 +36,9 @@
     <p:sldId id="283" r:id="rId31"/>
     <p:sldId id="284" r:id="rId32"/>
     <p:sldId id="285" r:id="rId33"/>
+    <p:sldId id="286" r:id="rId34"/>
+    <p:sldId id="287" r:id="rId35"/>
+    <p:sldId id="288" r:id="rId36"/>
   </p:sldIdLst>
   <p:sldSz cx="10080625" cy="5670550"/>
   <p:notesSz cx="7559675" cy="10691812"/>
@@ -2800,7 +2803,49 @@
               <a:rPr b="0" lang="en-IN" sz="4400" spc="-1" strike="noStrike">
                 <a:latin typeface="Arial"/>
               </a:rPr>
-              <a:t>Click to edit the title text format</a:t>
+              <a:t>Click </a:t>
+            </a:r>
+            <a:r>
+              <a:rPr b="0" lang="en-IN" sz="4400" spc="-1" strike="noStrike">
+                <a:latin typeface="Arial"/>
+              </a:rPr>
+              <a:t>to </a:t>
+            </a:r>
+            <a:r>
+              <a:rPr b="0" lang="en-IN" sz="4400" spc="-1" strike="noStrike">
+                <a:latin typeface="Arial"/>
+              </a:rPr>
+              <a:t>edit </a:t>
+            </a:r>
+            <a:r>
+              <a:rPr b="0" lang="en-IN" sz="4400" spc="-1" strike="noStrike">
+                <a:latin typeface="Arial"/>
+              </a:rPr>
+              <a:t>the </a:t>
+            </a:r>
+            <a:r>
+              <a:rPr b="0" lang="en-IN" sz="4400" spc="-1" strike="noStrike">
+                <a:latin typeface="Arial"/>
+              </a:rPr>
+              <a:t>title </a:t>
+            </a:r>
+            <a:r>
+              <a:rPr b="0" lang="en-IN" sz="4400" spc="-1" strike="noStrike">
+                <a:latin typeface="Arial"/>
+              </a:rPr>
+              <a:t>text </a:t>
+            </a:r>
+            <a:r>
+              <a:rPr b="0" lang="en-IN" sz="4400" spc="-1" strike="noStrike">
+                <a:latin typeface="Arial"/>
+              </a:rPr>
+              <a:t>forma</a:t>
+            </a:r>
+            <a:r>
+              <a:rPr b="0" lang="en-IN" sz="4400" spc="-1" strike="noStrike">
+                <a:latin typeface="Arial"/>
+              </a:rPr>
+              <a:t>t</a:t>
             </a:r>
             <a:endParaRPr b="0" lang="en-IN" sz="4400" spc="-1" strike="noStrike">
               <a:latin typeface="Arial"/>
@@ -3053,7 +3098,49 @@
               <a:rPr b="0" lang="en-IN" sz="4400" spc="-1" strike="noStrike">
                 <a:latin typeface="Arial"/>
               </a:rPr>
-              <a:t>Click to edit the title text format</a:t>
+              <a:t>Click </a:t>
+            </a:r>
+            <a:r>
+              <a:rPr b="0" lang="en-IN" sz="4400" spc="-1" strike="noStrike">
+                <a:latin typeface="Arial"/>
+              </a:rPr>
+              <a:t>to </a:t>
+            </a:r>
+            <a:r>
+              <a:rPr b="0" lang="en-IN" sz="4400" spc="-1" strike="noStrike">
+                <a:latin typeface="Arial"/>
+              </a:rPr>
+              <a:t>edit </a:t>
+            </a:r>
+            <a:r>
+              <a:rPr b="0" lang="en-IN" sz="4400" spc="-1" strike="noStrike">
+                <a:latin typeface="Arial"/>
+              </a:rPr>
+              <a:t>the </a:t>
+            </a:r>
+            <a:r>
+              <a:rPr b="0" lang="en-IN" sz="4400" spc="-1" strike="noStrike">
+                <a:latin typeface="Arial"/>
+              </a:rPr>
+              <a:t>title </a:t>
+            </a:r>
+            <a:r>
+              <a:rPr b="0" lang="en-IN" sz="4400" spc="-1" strike="noStrike">
+                <a:latin typeface="Arial"/>
+              </a:rPr>
+              <a:t>text </a:t>
+            </a:r>
+            <a:r>
+              <a:rPr b="0" lang="en-IN" sz="4400" spc="-1" strike="noStrike">
+                <a:latin typeface="Arial"/>
+              </a:rPr>
+              <a:t>forma</a:t>
+            </a:r>
+            <a:r>
+              <a:rPr b="0" lang="en-IN" sz="4400" spc="-1" strike="noStrike">
+                <a:latin typeface="Arial"/>
+              </a:rPr>
+              <a:t>t</a:t>
             </a:r>
             <a:endParaRPr b="0" lang="en-IN" sz="4400" spc="-1" strike="noStrike">
               <a:latin typeface="Arial"/>
@@ -3286,7 +3373,7 @@
         <p:spPr>
           <a:xfrm>
             <a:off x="1836000" y="1332000"/>
-            <a:ext cx="2368080" cy="784080"/>
+            <a:ext cx="2367720" cy="783720"/>
           </a:xfrm>
           <a:prstGeom prst="rect">
             <a:avLst/>
@@ -3341,7 +3428,7 @@
         <p:spPr>
           <a:xfrm>
             <a:off x="1836000" y="2880000"/>
-            <a:ext cx="2368080" cy="784080"/>
+            <a:ext cx="2367720" cy="783720"/>
           </a:xfrm>
           <a:prstGeom prst="rect">
             <a:avLst/>
@@ -3406,7 +3493,7 @@
         <p:spPr>
           <a:xfrm>
             <a:off x="1836000" y="4176000"/>
-            <a:ext cx="2368080" cy="784080"/>
+            <a:ext cx="2367720" cy="783720"/>
           </a:xfrm>
           <a:prstGeom prst="rect">
             <a:avLst/>
@@ -3481,7 +3568,7 @@
         <p:spPr>
           <a:xfrm>
             <a:off x="5292000" y="900000"/>
-            <a:ext cx="2368080" cy="1504080"/>
+            <a:ext cx="2367720" cy="1503720"/>
           </a:xfrm>
           <a:prstGeom prst="rect">
             <a:avLst/>
@@ -3616,7 +3703,7 @@
         <p:spPr>
           <a:xfrm>
             <a:off x="5292000" y="2571480"/>
-            <a:ext cx="2368080" cy="1272600"/>
+            <a:ext cx="2367720" cy="1272240"/>
           </a:xfrm>
           <a:prstGeom prst="rect">
             <a:avLst/>
@@ -3731,7 +3818,7 @@
         <p:spPr>
           <a:xfrm>
             <a:off x="5292000" y="4047480"/>
-            <a:ext cx="2368080" cy="1020600"/>
+            <a:ext cx="2367720" cy="1020240"/>
           </a:xfrm>
           <a:prstGeom prst="rect">
             <a:avLst/>
@@ -3910,7 +3997,7 @@
         <p:spPr>
           <a:xfrm>
             <a:off x="2988000" y="360000"/>
-            <a:ext cx="4384080" cy="338400"/>
+            <a:ext cx="4383720" cy="338040"/>
           </a:xfrm>
           <a:prstGeom prst="rect">
             <a:avLst/>
@@ -3991,7 +4078,7 @@
         <p:spPr>
           <a:xfrm>
             <a:off x="1440000" y="720000"/>
-            <a:ext cx="6762240" cy="1794240"/>
+            <a:ext cx="6761880" cy="1793880"/>
           </a:xfrm>
           <a:prstGeom prst="rect">
             <a:avLst/>
@@ -4021,7 +4108,7 @@
         <p:spPr>
           <a:xfrm>
             <a:off x="2016000" y="1188000"/>
-            <a:ext cx="1432440" cy="784440"/>
+            <a:ext cx="1432080" cy="784080"/>
           </a:xfrm>
           <a:prstGeom prst="rect">
             <a:avLst/>
@@ -4076,7 +4163,7 @@
         <p:spPr>
           <a:xfrm>
             <a:off x="6192000" y="1188000"/>
-            <a:ext cx="1432440" cy="784440"/>
+            <a:ext cx="1432080" cy="784080"/>
           </a:xfrm>
           <a:prstGeom prst="rect">
             <a:avLst/>
@@ -4131,7 +4218,7 @@
         <p:spPr>
           <a:xfrm>
             <a:off x="4140000" y="900000"/>
-            <a:ext cx="1432440" cy="1360440"/>
+            <a:ext cx="1432080" cy="1360080"/>
           </a:xfrm>
           <a:custGeom>
             <a:avLst/>
@@ -4317,7 +4404,7 @@
         <p:spPr>
           <a:xfrm>
             <a:off x="4320000" y="3168000"/>
-            <a:ext cx="1036440" cy="786240"/>
+            <a:ext cx="1036080" cy="785880"/>
           </a:xfrm>
           <a:custGeom>
             <a:avLst/>
@@ -4395,7 +4482,7 @@
         <p:spPr>
           <a:xfrm>
             <a:off x="4176000" y="4428000"/>
-            <a:ext cx="1432440" cy="784440"/>
+            <a:ext cx="1432080" cy="784080"/>
           </a:xfrm>
           <a:prstGeom prst="rect">
             <a:avLst/>
@@ -4477,7 +4564,7 @@
         <p:spPr>
           <a:xfrm>
             <a:off x="5870160" y="3314160"/>
-            <a:ext cx="1146240" cy="498240"/>
+            <a:ext cx="1145880" cy="497880"/>
           </a:xfrm>
           <a:prstGeom prst="ellipse">
             <a:avLst/>
@@ -4616,7 +4703,7 @@
         <p:spPr>
           <a:xfrm>
             <a:off x="1944000" y="900000"/>
-            <a:ext cx="1432440" cy="784440"/>
+            <a:ext cx="1432080" cy="784080"/>
           </a:xfrm>
           <a:prstGeom prst="rect">
             <a:avLst/>
@@ -4671,7 +4758,7 @@
         <p:spPr>
           <a:xfrm>
             <a:off x="6120000" y="900000"/>
-            <a:ext cx="1432440" cy="784440"/>
+            <a:ext cx="1432080" cy="784080"/>
           </a:xfrm>
           <a:prstGeom prst="rect">
             <a:avLst/>
@@ -4726,7 +4813,7 @@
         <p:spPr>
           <a:xfrm>
             <a:off x="4068000" y="612000"/>
-            <a:ext cx="1432440" cy="1360440"/>
+            <a:ext cx="1432080" cy="1360080"/>
           </a:xfrm>
           <a:custGeom>
             <a:avLst/>
@@ -4905,7 +4992,7 @@
         <p:spPr>
           <a:xfrm>
             <a:off x="2592000" y="5904000"/>
-            <a:ext cx="7121160" cy="595440"/>
+            <a:ext cx="7120800" cy="595080"/>
           </a:xfrm>
           <a:prstGeom prst="rect">
             <a:avLst/>
@@ -4976,7 +5063,7 @@
         <p:spPr>
           <a:xfrm>
             <a:off x="360000" y="216360"/>
-            <a:ext cx="1146240" cy="498240"/>
+            <a:ext cx="1145880" cy="497880"/>
           </a:xfrm>
           <a:prstGeom prst="ellipse">
             <a:avLst/>
@@ -5031,7 +5118,7 @@
         <p:spPr>
           <a:xfrm>
             <a:off x="1727640" y="216360"/>
-            <a:ext cx="1146240" cy="498240"/>
+            <a:ext cx="1145880" cy="497880"/>
           </a:xfrm>
           <a:prstGeom prst="ellipse">
             <a:avLst/>
@@ -5086,7 +5173,7 @@
         <p:spPr>
           <a:xfrm>
             <a:off x="359280" y="1008360"/>
-            <a:ext cx="1146240" cy="498240"/>
+            <a:ext cx="1145880" cy="497880"/>
           </a:xfrm>
           <a:prstGeom prst="ellipse">
             <a:avLst/>
@@ -5141,7 +5228,7 @@
         <p:spPr>
           <a:xfrm>
             <a:off x="358920" y="1800360"/>
-            <a:ext cx="1146240" cy="498240"/>
+            <a:ext cx="1145880" cy="497880"/>
           </a:xfrm>
           <a:prstGeom prst="ellipse">
             <a:avLst/>
@@ -5196,7 +5283,7 @@
         <p:spPr>
           <a:xfrm>
             <a:off x="1906560" y="1836360"/>
-            <a:ext cx="1146240" cy="498240"/>
+            <a:ext cx="1145880" cy="497880"/>
           </a:xfrm>
           <a:prstGeom prst="ellipse">
             <a:avLst/>
@@ -5251,7 +5338,7 @@
         <p:spPr>
           <a:xfrm>
             <a:off x="4211280" y="360"/>
-            <a:ext cx="1146240" cy="498240"/>
+            <a:ext cx="1145880" cy="497880"/>
           </a:xfrm>
           <a:prstGeom prst="ellipse">
             <a:avLst/>
@@ -5306,7 +5393,7 @@
         <p:spPr>
           <a:xfrm>
             <a:off x="6226920" y="360"/>
-            <a:ext cx="1146240" cy="498240"/>
+            <a:ext cx="1145880" cy="497880"/>
           </a:xfrm>
           <a:prstGeom prst="ellipse">
             <a:avLst/>
@@ -5361,7 +5448,7 @@
         <p:spPr>
           <a:xfrm>
             <a:off x="4210920" y="360"/>
-            <a:ext cx="1146240" cy="498240"/>
+            <a:ext cx="1145880" cy="497880"/>
           </a:xfrm>
           <a:prstGeom prst="ellipse">
             <a:avLst/>
@@ -5416,7 +5503,7 @@
         <p:spPr>
           <a:xfrm>
             <a:off x="7738920" y="252360"/>
-            <a:ext cx="1146240" cy="498240"/>
+            <a:ext cx="1145880" cy="497880"/>
           </a:xfrm>
           <a:prstGeom prst="ellipse">
             <a:avLst/>
@@ -5471,7 +5558,7 @@
         <p:spPr>
           <a:xfrm>
             <a:off x="7810920" y="936360"/>
-            <a:ext cx="1146240" cy="498240"/>
+            <a:ext cx="1145880" cy="497880"/>
           </a:xfrm>
           <a:prstGeom prst="ellipse">
             <a:avLst/>
@@ -7007,7 +7094,7 @@
         <p:spPr>
           <a:xfrm>
             <a:off x="576000" y="4320000"/>
-            <a:ext cx="2442600" cy="340920"/>
+            <a:ext cx="2442240" cy="340560"/>
           </a:xfrm>
           <a:prstGeom prst="rect">
             <a:avLst/>
@@ -7058,7 +7145,7 @@
         <p:spPr>
           <a:xfrm>
             <a:off x="7092000" y="3672000"/>
-            <a:ext cx="2442600" cy="340920"/>
+            <a:ext cx="2442240" cy="340560"/>
           </a:xfrm>
           <a:prstGeom prst="rect">
             <a:avLst/>
@@ -7109,7 +7196,7 @@
         <p:spPr>
           <a:xfrm>
             <a:off x="3744000" y="5328000"/>
-            <a:ext cx="2442600" cy="340920"/>
+            <a:ext cx="2442240" cy="340560"/>
           </a:xfrm>
           <a:prstGeom prst="rect">
             <a:avLst/>
@@ -7190,7 +7277,7 @@
         <p:spPr>
           <a:xfrm>
             <a:off x="5934960" y="1050480"/>
-            <a:ext cx="1690920" cy="1001880"/>
+            <a:ext cx="1690560" cy="1001520"/>
           </a:xfrm>
           <a:prstGeom prst="rect">
             <a:avLst/>
@@ -7220,7 +7307,7 @@
         <p:spPr>
           <a:xfrm>
             <a:off x="1908000" y="1152000"/>
-            <a:ext cx="1432440" cy="784440"/>
+            <a:ext cx="1432080" cy="784080"/>
           </a:xfrm>
           <a:prstGeom prst="rect">
             <a:avLst/>
@@ -7275,7 +7362,7 @@
         <p:spPr>
           <a:xfrm>
             <a:off x="6084000" y="1152000"/>
-            <a:ext cx="1432440" cy="784440"/>
+            <a:ext cx="1432080" cy="784080"/>
           </a:xfrm>
           <a:prstGeom prst="rect">
             <a:avLst/>
@@ -7330,7 +7417,7 @@
         <p:spPr>
           <a:xfrm>
             <a:off x="4032000" y="864000"/>
-            <a:ext cx="1432440" cy="1360440"/>
+            <a:ext cx="1432080" cy="1360080"/>
           </a:xfrm>
           <a:custGeom>
             <a:avLst/>
@@ -7462,7 +7549,7 @@
         <p:spPr>
           <a:xfrm>
             <a:off x="1548000" y="576000"/>
-            <a:ext cx="2118600" cy="462600"/>
+            <a:ext cx="2118240" cy="462240"/>
           </a:xfrm>
           <a:prstGeom prst="rect">
             <a:avLst/>
@@ -7568,7 +7655,7 @@
         <p:spPr>
           <a:xfrm>
             <a:off x="5760000" y="576000"/>
-            <a:ext cx="2118600" cy="462600"/>
+            <a:ext cx="2118240" cy="462240"/>
           </a:xfrm>
           <a:prstGeom prst="rect">
             <a:avLst/>
@@ -7619,7 +7706,7 @@
         <p:spPr>
           <a:xfrm>
             <a:off x="216000" y="2376000"/>
-            <a:ext cx="2118600" cy="2586600"/>
+            <a:ext cx="2118240" cy="2586240"/>
           </a:xfrm>
           <a:prstGeom prst="rect">
             <a:avLst/>
@@ -8328,7 +8415,7 @@
         <p:spPr>
           <a:xfrm>
             <a:off x="1945800" y="3636000"/>
-            <a:ext cx="1432440" cy="784440"/>
+            <a:ext cx="1432080" cy="784080"/>
           </a:xfrm>
           <a:prstGeom prst="rect">
             <a:avLst/>
@@ -8403,7 +8490,7 @@
         <p:spPr>
           <a:xfrm>
             <a:off x="6300000" y="3673800"/>
-            <a:ext cx="1432440" cy="784440"/>
+            <a:ext cx="1432080" cy="784080"/>
           </a:xfrm>
           <a:prstGeom prst="rect">
             <a:avLst/>
@@ -8532,7 +8619,7 @@
         <p:spPr>
           <a:xfrm>
             <a:off x="1764000" y="4860000"/>
-            <a:ext cx="7121160" cy="595440"/>
+            <a:ext cx="7120800" cy="595080"/>
           </a:xfrm>
           <a:prstGeom prst="rect">
             <a:avLst/>
@@ -8558,7 +8645,7 @@
         <p:spPr>
           <a:xfrm>
             <a:off x="4140000" y="1080000"/>
-            <a:ext cx="1432440" cy="784440"/>
+            <a:ext cx="1432080" cy="784080"/>
           </a:xfrm>
           <a:prstGeom prst="rect">
             <a:avLst/>
@@ -8613,7 +8700,7 @@
         <p:spPr>
           <a:xfrm>
             <a:off x="4392000" y="2267640"/>
-            <a:ext cx="930240" cy="1002240"/>
+            <a:ext cx="929880" cy="1001880"/>
           </a:xfrm>
           <a:custGeom>
             <a:avLst/>
@@ -8662,7 +8749,7 @@
         <p:spPr>
           <a:xfrm>
             <a:off x="4572000" y="2304000"/>
-            <a:ext cx="642240" cy="340560"/>
+            <a:ext cx="641880" cy="340200"/>
           </a:xfrm>
           <a:prstGeom prst="rect">
             <a:avLst/>
@@ -8794,7 +8881,7 @@
         <p:spPr>
           <a:xfrm>
             <a:off x="2592000" y="432000"/>
-            <a:ext cx="1146240" cy="498240"/>
+            <a:ext cx="1145880" cy="497880"/>
           </a:xfrm>
           <a:prstGeom prst="ellipse">
             <a:avLst/>
@@ -8849,7 +8936,7 @@
         <p:spPr>
           <a:xfrm>
             <a:off x="4104360" y="360360"/>
-            <a:ext cx="1146240" cy="498240"/>
+            <a:ext cx="1145880" cy="497880"/>
           </a:xfrm>
           <a:prstGeom prst="ellipse">
             <a:avLst/>
@@ -8904,7 +8991,7 @@
         <p:spPr>
           <a:xfrm>
             <a:off x="5652720" y="432720"/>
-            <a:ext cx="1146240" cy="498240"/>
+            <a:ext cx="1145880" cy="497880"/>
           </a:xfrm>
           <a:prstGeom prst="ellipse">
             <a:avLst/>
@@ -8959,7 +9046,7 @@
         <p:spPr>
           <a:xfrm>
             <a:off x="3813480" y="4321080"/>
-            <a:ext cx="1146240" cy="498240"/>
+            <a:ext cx="1145880" cy="497880"/>
           </a:xfrm>
           <a:prstGeom prst="ellipse">
             <a:avLst/>
@@ -9014,7 +9101,7 @@
         <p:spPr>
           <a:xfrm>
             <a:off x="2193840" y="4717440"/>
-            <a:ext cx="1146240" cy="498240"/>
+            <a:ext cx="1145880" cy="497880"/>
           </a:xfrm>
           <a:prstGeom prst="ellipse">
             <a:avLst/>
@@ -9069,7 +9156,7 @@
         <p:spPr>
           <a:xfrm>
             <a:off x="682200" y="4501800"/>
-            <a:ext cx="1146240" cy="498240"/>
+            <a:ext cx="1145880" cy="497880"/>
           </a:xfrm>
           <a:prstGeom prst="ellipse">
             <a:avLst/>
@@ -9124,7 +9211,7 @@
         <p:spPr>
           <a:xfrm>
             <a:off x="5434560" y="4574160"/>
-            <a:ext cx="1146240" cy="498240"/>
+            <a:ext cx="1145880" cy="497880"/>
           </a:xfrm>
           <a:prstGeom prst="ellipse">
             <a:avLst/>
@@ -9179,7 +9266,7 @@
         <p:spPr>
           <a:xfrm>
             <a:off x="7634160" y="4574520"/>
-            <a:ext cx="1146240" cy="498240"/>
+            <a:ext cx="1145880" cy="497880"/>
           </a:xfrm>
           <a:prstGeom prst="ellipse">
             <a:avLst/>
@@ -9234,7 +9321,7 @@
         <p:spPr>
           <a:xfrm>
             <a:off x="686520" y="3098880"/>
-            <a:ext cx="1146240" cy="498240"/>
+            <a:ext cx="1145880" cy="497880"/>
           </a:xfrm>
           <a:prstGeom prst="ellipse">
             <a:avLst/>
@@ -9532,7 +9619,7 @@
         <p:spPr>
           <a:xfrm>
             <a:off x="216000" y="288000"/>
-            <a:ext cx="2370600" cy="2298600"/>
+            <a:ext cx="2370240" cy="2298240"/>
           </a:xfrm>
           <a:prstGeom prst="rect">
             <a:avLst/>
@@ -9653,7 +9740,7 @@
         <p:spPr>
           <a:xfrm>
             <a:off x="1908000" y="936000"/>
-            <a:ext cx="1432440" cy="784440"/>
+            <a:ext cx="1432080" cy="784080"/>
           </a:xfrm>
           <a:prstGeom prst="rect">
             <a:avLst/>
@@ -9708,7 +9795,7 @@
         <p:spPr>
           <a:xfrm>
             <a:off x="6084000" y="936000"/>
-            <a:ext cx="1432440" cy="784440"/>
+            <a:ext cx="1432080" cy="784080"/>
           </a:xfrm>
           <a:prstGeom prst="rect">
             <a:avLst/>
@@ -9763,7 +9850,7 @@
         <p:spPr>
           <a:xfrm>
             <a:off x="4934160" y="4392000"/>
-            <a:ext cx="1432440" cy="784440"/>
+            <a:ext cx="1432080" cy="784080"/>
           </a:xfrm>
           <a:prstGeom prst="rect">
             <a:avLst/>
@@ -9818,7 +9905,7 @@
         <p:spPr>
           <a:xfrm>
             <a:off x="4032000" y="648000"/>
-            <a:ext cx="1432440" cy="1360440"/>
+            <a:ext cx="1432080" cy="1360080"/>
           </a:xfrm>
           <a:custGeom>
             <a:avLst/>
@@ -9916,7 +10003,7 @@
         <p:spPr>
           <a:xfrm>
             <a:off x="1908000" y="3204360"/>
-            <a:ext cx="1432440" cy="1360440"/>
+            <a:ext cx="1432080" cy="1360080"/>
           </a:xfrm>
           <a:custGeom>
             <a:avLst/>
@@ -10068,7 +10155,7 @@
         <p:spPr>
           <a:xfrm>
             <a:off x="4140000" y="2234160"/>
-            <a:ext cx="1146600" cy="568440"/>
+            <a:ext cx="1146240" cy="568080"/>
           </a:xfrm>
           <a:prstGeom prst="ellipse">
             <a:avLst/>
@@ -10123,7 +10210,7 @@
         <p:spPr>
           <a:xfrm>
             <a:off x="3708360" y="3636360"/>
-            <a:ext cx="1074240" cy="568440"/>
+            <a:ext cx="1073880" cy="568080"/>
           </a:xfrm>
           <a:prstGeom prst="ellipse">
             <a:avLst/>
@@ -10232,7 +10319,7 @@
         <p:spPr>
           <a:xfrm>
             <a:off x="504000" y="396000"/>
-            <a:ext cx="1146600" cy="568440"/>
+            <a:ext cx="1146240" cy="568080"/>
           </a:xfrm>
           <a:prstGeom prst="ellipse">
             <a:avLst/>
@@ -10287,7 +10374,7 @@
         <p:spPr>
           <a:xfrm>
             <a:off x="1944000" y="180000"/>
-            <a:ext cx="1146600" cy="568440"/>
+            <a:ext cx="1146240" cy="568080"/>
           </a:xfrm>
           <a:prstGeom prst="ellipse">
             <a:avLst/>
@@ -10342,7 +10429,7 @@
         <p:spPr>
           <a:xfrm>
             <a:off x="288000" y="1152000"/>
-            <a:ext cx="1146600" cy="568440"/>
+            <a:ext cx="1146240" cy="568080"/>
           </a:xfrm>
           <a:prstGeom prst="ellipse">
             <a:avLst/>
@@ -10397,7 +10484,7 @@
         <p:spPr>
           <a:xfrm>
             <a:off x="5940000" y="180000"/>
-            <a:ext cx="1146600" cy="568440"/>
+            <a:ext cx="1146240" cy="568080"/>
           </a:xfrm>
           <a:prstGeom prst="ellipse">
             <a:avLst/>
@@ -10452,7 +10539,7 @@
         <p:spPr>
           <a:xfrm>
             <a:off x="7560000" y="180000"/>
-            <a:ext cx="1146600" cy="568440"/>
+            <a:ext cx="1146240" cy="568080"/>
           </a:xfrm>
           <a:prstGeom prst="ellipse">
             <a:avLst/>
@@ -10507,7 +10594,7 @@
         <p:spPr>
           <a:xfrm>
             <a:off x="7992000" y="972000"/>
-            <a:ext cx="1146600" cy="568440"/>
+            <a:ext cx="1146240" cy="568080"/>
           </a:xfrm>
           <a:prstGeom prst="ellipse">
             <a:avLst/>
@@ -10589,7 +10676,7 @@
         <p:spPr>
           <a:xfrm>
             <a:off x="432000" y="3636360"/>
-            <a:ext cx="1074240" cy="568440"/>
+            <a:ext cx="1073880" cy="568080"/>
           </a:xfrm>
           <a:prstGeom prst="ellipse">
             <a:avLst/>
@@ -10644,7 +10731,7 @@
         <p:spPr>
           <a:xfrm>
             <a:off x="6803640" y="4068360"/>
-            <a:ext cx="1074240" cy="568440"/>
+            <a:ext cx="1073880" cy="568080"/>
           </a:xfrm>
           <a:prstGeom prst="ellipse">
             <a:avLst/>
@@ -10699,7 +10786,7 @@
         <p:spPr>
           <a:xfrm>
             <a:off x="6839280" y="4752360"/>
-            <a:ext cx="1074240" cy="568440"/>
+            <a:ext cx="1073880" cy="568080"/>
           </a:xfrm>
           <a:prstGeom prst="ellipse">
             <a:avLst/>
@@ -11109,7 +11196,7 @@
         <p:spPr>
           <a:xfrm>
             <a:off x="2556000" y="1152000"/>
-            <a:ext cx="4530960" cy="354960"/>
+            <a:ext cx="4530600" cy="354600"/>
           </a:xfrm>
           <a:prstGeom prst="rect">
             <a:avLst/>
@@ -11959,7 +12046,7 @@
         <p:spPr>
           <a:xfrm>
             <a:off x="3492000" y="3541680"/>
-            <a:ext cx="3020040" cy="342360"/>
+            <a:ext cx="3019680" cy="342000"/>
           </a:xfrm>
           <a:prstGeom prst="rect">
             <a:avLst/>
@@ -12010,7 +12097,7 @@
         <p:spPr>
           <a:xfrm>
             <a:off x="144000" y="3564000"/>
-            <a:ext cx="3020040" cy="342360"/>
+            <a:ext cx="3019680" cy="342000"/>
           </a:xfrm>
           <a:prstGeom prst="rect">
             <a:avLst/>
@@ -12061,7 +12148,7 @@
         <p:spPr>
           <a:xfrm>
             <a:off x="7308000" y="3528000"/>
-            <a:ext cx="3020040" cy="342360"/>
+            <a:ext cx="3019680" cy="342000"/>
           </a:xfrm>
           <a:prstGeom prst="rect">
             <a:avLst/>
@@ -12514,7 +12601,7 @@
         <p:spPr>
           <a:xfrm>
             <a:off x="3492000" y="3541680"/>
-            <a:ext cx="3020040" cy="342360"/>
+            <a:ext cx="3019680" cy="342000"/>
           </a:xfrm>
           <a:prstGeom prst="rect">
             <a:avLst/>
@@ -12565,7 +12652,7 @@
         <p:spPr>
           <a:xfrm>
             <a:off x="144000" y="3564000"/>
-            <a:ext cx="3020040" cy="342360"/>
+            <a:ext cx="3019680" cy="342000"/>
           </a:xfrm>
           <a:prstGeom prst="rect">
             <a:avLst/>
@@ -12616,7 +12703,7 @@
         <p:spPr>
           <a:xfrm>
             <a:off x="7308000" y="3528000"/>
-            <a:ext cx="3020040" cy="342360"/>
+            <a:ext cx="3019680" cy="342000"/>
           </a:xfrm>
           <a:prstGeom prst="rect">
             <a:avLst/>
@@ -13645,7 +13732,7 @@
         <p:spPr>
           <a:xfrm>
             <a:off x="3456000" y="1008000"/>
-            <a:ext cx="3236400" cy="342720"/>
+            <a:ext cx="3236040" cy="342360"/>
           </a:xfrm>
           <a:prstGeom prst="rect">
             <a:avLst/>
@@ -13696,7 +13783,7 @@
         <p:spPr>
           <a:xfrm>
             <a:off x="648000" y="1836000"/>
-            <a:ext cx="3236400" cy="342720"/>
+            <a:ext cx="3236040" cy="342360"/>
           </a:xfrm>
           <a:prstGeom prst="rect">
             <a:avLst/>
@@ -13747,7 +13834,7 @@
         <p:spPr>
           <a:xfrm>
             <a:off x="5436000" y="2160000"/>
-            <a:ext cx="3236400" cy="342720"/>
+            <a:ext cx="3236040" cy="342360"/>
           </a:xfrm>
           <a:prstGeom prst="rect">
             <a:avLst/>
@@ -13825,7 +13912,7 @@
         <p:spPr>
           <a:xfrm>
             <a:off x="8676000" y="2988000"/>
-            <a:ext cx="1040400" cy="752400"/>
+            <a:ext cx="1040040" cy="752040"/>
           </a:xfrm>
           <a:prstGeom prst="rect">
             <a:avLst/>
@@ -13963,7 +14050,7 @@
         <p:spPr>
           <a:xfrm>
             <a:off x="2448000" y="4464000"/>
-            <a:ext cx="5828400" cy="752400"/>
+            <a:ext cx="5828040" cy="752040"/>
           </a:xfrm>
           <a:prstGeom prst="rect">
             <a:avLst/>
@@ -15825,7 +15912,7 @@
         <p:spPr>
           <a:xfrm>
             <a:off x="1728000" y="1741680"/>
-            <a:ext cx="1148760" cy="343080"/>
+            <a:ext cx="1148400" cy="342720"/>
           </a:xfrm>
           <a:prstGeom prst="rect">
             <a:avLst/>
@@ -15876,7 +15963,7 @@
         <p:spPr>
           <a:xfrm>
             <a:off x="6480000" y="648000"/>
-            <a:ext cx="1688760" cy="343080"/>
+            <a:ext cx="1688400" cy="342720"/>
           </a:xfrm>
           <a:prstGeom prst="rect">
             <a:avLst/>
@@ -15957,7 +16044,7 @@
         <p:spPr>
           <a:xfrm>
             <a:off x="1908000" y="936000"/>
-            <a:ext cx="1432440" cy="784440"/>
+            <a:ext cx="1432080" cy="784080"/>
           </a:xfrm>
           <a:prstGeom prst="rect">
             <a:avLst/>
@@ -16012,7 +16099,7 @@
         <p:spPr>
           <a:xfrm>
             <a:off x="6084000" y="936000"/>
-            <a:ext cx="1432440" cy="784440"/>
+            <a:ext cx="1432080" cy="784080"/>
           </a:xfrm>
           <a:prstGeom prst="rect">
             <a:avLst/>
@@ -16067,7 +16154,7 @@
         <p:spPr>
           <a:xfrm>
             <a:off x="1908000" y="4068000"/>
-            <a:ext cx="1432440" cy="784440"/>
+            <a:ext cx="1432080" cy="784080"/>
           </a:xfrm>
           <a:prstGeom prst="rect">
             <a:avLst/>
@@ -16122,7 +16209,7 @@
         <p:spPr>
           <a:xfrm>
             <a:off x="4032000" y="648000"/>
-            <a:ext cx="1432440" cy="1360440"/>
+            <a:ext cx="1432080" cy="1360080"/>
           </a:xfrm>
           <a:custGeom>
             <a:avLst/>
@@ -16220,7 +16307,7 @@
         <p:spPr>
           <a:xfrm>
             <a:off x="1872000" y="2232360"/>
-            <a:ext cx="1432440" cy="1360440"/>
+            <a:ext cx="1432080" cy="1360080"/>
           </a:xfrm>
           <a:custGeom>
             <a:avLst/>
@@ -16426,7 +16513,7 @@
         <p:spPr>
           <a:xfrm>
             <a:off x="5184000" y="2340000"/>
-            <a:ext cx="2008440" cy="568440"/>
+            <a:ext cx="2008080" cy="568080"/>
           </a:xfrm>
           <a:prstGeom prst="ellipse">
             <a:avLst/>
@@ -16481,7 +16568,7 @@
         <p:spPr>
           <a:xfrm>
             <a:off x="3960360" y="3240360"/>
-            <a:ext cx="2008440" cy="568440"/>
+            <a:ext cx="2008080" cy="568080"/>
           </a:xfrm>
           <a:prstGeom prst="ellipse">
             <a:avLst/>
@@ -16824,7 +16911,7 @@
         <p:spPr>
           <a:xfrm>
             <a:off x="144000" y="2057400"/>
-            <a:ext cx="2511720" cy="599400"/>
+            <a:ext cx="2511360" cy="599040"/>
           </a:xfrm>
           <a:prstGeom prst="rect">
             <a:avLst/>
@@ -16875,7 +16962,7 @@
         <p:spPr>
           <a:xfrm>
             <a:off x="3405600" y="976680"/>
-            <a:ext cx="2968920" cy="343440"/>
+            <a:ext cx="2968560" cy="343080"/>
           </a:xfrm>
           <a:prstGeom prst="rect">
             <a:avLst/>
@@ -17010,7 +17097,7 @@
         <p:spPr>
           <a:xfrm>
             <a:off x="457200" y="3742200"/>
-            <a:ext cx="2968920" cy="855360"/>
+            <a:ext cx="2968560" cy="855000"/>
           </a:xfrm>
           <a:prstGeom prst="rect">
             <a:avLst/>
@@ -17061,7 +17148,7 @@
         <p:spPr>
           <a:xfrm>
             <a:off x="3866400" y="3742200"/>
-            <a:ext cx="2531520" cy="1111320"/>
+            <a:ext cx="2531160" cy="1110960"/>
           </a:xfrm>
           <a:prstGeom prst="rect">
             <a:avLst/>
@@ -17112,7 +17199,7 @@
         <p:spPr>
           <a:xfrm>
             <a:off x="7086600" y="3706200"/>
-            <a:ext cx="2740320" cy="1091520"/>
+            <a:ext cx="2739960" cy="1091160"/>
           </a:xfrm>
           <a:prstGeom prst="rect">
             <a:avLst/>
@@ -17163,7 +17250,7 @@
         <p:spPr>
           <a:xfrm>
             <a:off x="7488360" y="2057760"/>
-            <a:ext cx="2511720" cy="343440"/>
+            <a:ext cx="2511360" cy="343080"/>
           </a:xfrm>
           <a:prstGeom prst="rect">
             <a:avLst/>
@@ -17525,7 +17612,7 @@
         <p:spPr>
           <a:xfrm>
             <a:off x="144000" y="2057400"/>
-            <a:ext cx="2511720" cy="599400"/>
+            <a:ext cx="2511360" cy="599040"/>
           </a:xfrm>
           <a:prstGeom prst="rect">
             <a:avLst/>
@@ -17576,7 +17663,7 @@
         <p:spPr>
           <a:xfrm>
             <a:off x="3405600" y="976680"/>
-            <a:ext cx="2968920" cy="343440"/>
+            <a:ext cx="2968560" cy="343080"/>
           </a:xfrm>
           <a:prstGeom prst="rect">
             <a:avLst/>
@@ -17711,7 +17798,7 @@
         <p:spPr>
           <a:xfrm>
             <a:off x="842400" y="3742200"/>
-            <a:ext cx="1694520" cy="1111320"/>
+            <a:ext cx="1694160" cy="1110960"/>
           </a:xfrm>
           <a:prstGeom prst="rect">
             <a:avLst/>
@@ -17762,7 +17849,7 @@
         <p:spPr>
           <a:xfrm>
             <a:off x="2822400" y="3742200"/>
-            <a:ext cx="2207520" cy="855360"/>
+            <a:ext cx="2207160" cy="855000"/>
           </a:xfrm>
           <a:prstGeom prst="rect">
             <a:avLst/>
@@ -17813,7 +17900,7 @@
         <p:spPr>
           <a:xfrm>
             <a:off x="7772400" y="3706200"/>
-            <a:ext cx="2054520" cy="634320"/>
+            <a:ext cx="2054160" cy="633960"/>
           </a:xfrm>
           <a:prstGeom prst="rect">
             <a:avLst/>
@@ -17864,7 +17951,7 @@
         <p:spPr>
           <a:xfrm>
             <a:off x="7488360" y="2057760"/>
-            <a:ext cx="2511720" cy="343440"/>
+            <a:ext cx="2511360" cy="343080"/>
           </a:xfrm>
           <a:prstGeom prst="rect">
             <a:avLst/>
@@ -17943,7 +18030,7 @@
         <p:spPr>
           <a:xfrm>
             <a:off x="5090400" y="3742200"/>
-            <a:ext cx="2207520" cy="855360"/>
+            <a:ext cx="2207160" cy="855000"/>
           </a:xfrm>
           <a:prstGeom prst="rect">
             <a:avLst/>
@@ -18024,7 +18111,7 @@
         <p:spPr>
           <a:xfrm>
             <a:off x="1564920" y="685800"/>
-            <a:ext cx="178200" cy="343800"/>
+            <a:ext cx="177840" cy="343440"/>
           </a:xfrm>
           <a:prstGeom prst="rect">
             <a:avLst/>
@@ -18050,7 +18137,7 @@
         <p:spPr>
           <a:xfrm>
             <a:off x="228600" y="228600"/>
-            <a:ext cx="1140480" cy="343800"/>
+            <a:ext cx="1140120" cy="343440"/>
           </a:xfrm>
           <a:prstGeom prst="rect">
             <a:avLst/>
@@ -18101,7 +18188,7 @@
         <p:spPr>
           <a:xfrm>
             <a:off x="169200" y="950400"/>
-            <a:ext cx="2054880" cy="454680"/>
+            <a:ext cx="2054520" cy="454320"/>
           </a:xfrm>
           <a:prstGeom prst="rect">
             <a:avLst/>
@@ -18514,7 +18601,7 @@
                       <a:noAutofit/>
                     </a:bodyPr>
                     <a:p>
-                      <a:pPr marL="216000" indent="-213480">
+                      <a:pPr marL="216000" indent="-213120">
                         <a:lnSpc>
                           <a:spcPct val="100000"/>
                         </a:lnSpc>
@@ -18837,7 +18924,7 @@
                       <a:noAutofit/>
                     </a:bodyPr>
                     <a:p>
-                      <a:pPr marL="216000" indent="-213480">
+                      <a:pPr marL="216000" indent="-213120">
                         <a:lnSpc>
                           <a:spcPct val="100000"/>
                         </a:lnSpc>
@@ -19317,7 +19404,7 @@
                       <a:noAutofit/>
                     </a:bodyPr>
                     <a:p>
-                      <a:pPr marL="216000" indent="-213480">
+                      <a:pPr marL="216000" indent="-213120">
                         <a:lnSpc>
                           <a:spcPct val="100000"/>
                         </a:lnSpc>
@@ -19613,7 +19700,7 @@
                       <a:noAutofit/>
                     </a:bodyPr>
                     <a:p>
-                      <a:pPr marL="216000" indent="-213480">
+                      <a:pPr marL="216000" indent="-213120">
                         <a:lnSpc>
                           <a:spcPct val="100000"/>
                         </a:lnSpc>
@@ -19881,7 +19968,7 @@
                       <a:noAutofit/>
                     </a:bodyPr>
                     <a:p>
-                      <a:pPr marL="216000" indent="-213480">
+                      <a:pPr marL="216000" indent="-213120">
                         <a:lnSpc>
                           <a:spcPct val="100000"/>
                         </a:lnSpc>
@@ -20120,7 +20207,7 @@
                       <a:noAutofit/>
                     </a:bodyPr>
                     <a:p>
-                      <a:pPr marL="216000" indent="-213480">
+                      <a:pPr marL="216000" indent="-213120">
                         <a:lnSpc>
                           <a:spcPct val="100000"/>
                         </a:lnSpc>
@@ -20266,7 +20353,7 @@
         <p:spPr>
           <a:xfrm>
             <a:off x="2057400" y="685800"/>
-            <a:ext cx="1140840" cy="344160"/>
+            <a:ext cx="1140480" cy="343800"/>
           </a:xfrm>
           <a:prstGeom prst="rect">
             <a:avLst/>
@@ -20317,7 +20404,7 @@
         <p:spPr>
           <a:xfrm>
             <a:off x="5670720" y="685800"/>
-            <a:ext cx="1140840" cy="344160"/>
+            <a:ext cx="1140480" cy="343800"/>
           </a:xfrm>
           <a:prstGeom prst="rect">
             <a:avLst/>
@@ -20368,7 +20455,7 @@
         <p:spPr>
           <a:xfrm>
             <a:off x="8229600" y="2168280"/>
-            <a:ext cx="1140840" cy="344160"/>
+            <a:ext cx="1140480" cy="343800"/>
           </a:xfrm>
           <a:prstGeom prst="rect">
             <a:avLst/>
@@ -20419,7 +20506,7 @@
         <p:spPr>
           <a:xfrm>
             <a:off x="4572000" y="3311280"/>
-            <a:ext cx="1140840" cy="344160"/>
+            <a:ext cx="1140480" cy="343800"/>
           </a:xfrm>
           <a:prstGeom prst="rect">
             <a:avLst/>
@@ -20556,7 +20643,7 @@
         <p:spPr>
           <a:xfrm>
             <a:off x="1564920" y="685800"/>
-            <a:ext cx="178200" cy="343800"/>
+            <a:ext cx="177840" cy="343440"/>
           </a:xfrm>
           <a:prstGeom prst="rect">
             <a:avLst/>
@@ -20582,7 +20669,7 @@
         <p:spPr>
           <a:xfrm>
             <a:off x="228600" y="228600"/>
-            <a:ext cx="1140480" cy="343800"/>
+            <a:ext cx="1140120" cy="343440"/>
           </a:xfrm>
           <a:prstGeom prst="rect">
             <a:avLst/>
@@ -20755,7 +20842,7 @@
                       <a:noAutofit/>
                     </a:bodyPr>
                     <a:p>
-                      <a:pPr marL="216000" indent="-213480">
+                      <a:pPr marL="216000" indent="-213120">
                         <a:lnSpc>
                           <a:spcPct val="100000"/>
                         </a:lnSpc>
@@ -21235,7 +21322,7 @@
                       <a:noAutofit/>
                     </a:bodyPr>
                     <a:p>
-                      <a:pPr marL="216000" indent="-213480">
+                      <a:pPr marL="216000" indent="-213120">
                         <a:lnSpc>
                           <a:spcPct val="100000"/>
                         </a:lnSpc>
@@ -21503,7 +21590,7 @@
                       <a:noAutofit/>
                     </a:bodyPr>
                     <a:p>
-                      <a:pPr marL="216000" indent="-213480">
+                      <a:pPr marL="216000" indent="-213120">
                         <a:lnSpc>
                           <a:spcPct val="100000"/>
                         </a:lnSpc>
@@ -21771,7 +21858,7 @@
                       <a:noAutofit/>
                     </a:bodyPr>
                     <a:p>
-                      <a:pPr marL="216000" indent="-213480">
+                      <a:pPr marL="216000" indent="-213120">
                         <a:lnSpc>
                           <a:spcPct val="100000"/>
                         </a:lnSpc>
@@ -22010,7 +22097,7 @@
                       <a:noAutofit/>
                     </a:bodyPr>
                     <a:p>
-                      <a:pPr marL="216000" indent="-213480">
+                      <a:pPr marL="216000" indent="-213120">
                         <a:lnSpc>
                           <a:spcPct val="100000"/>
                         </a:lnSpc>
@@ -22278,7 +22365,7 @@
                       <a:noAutofit/>
                     </a:bodyPr>
                     <a:p>
-                      <a:pPr marL="216000" indent="-213480">
+                      <a:pPr marL="216000" indent="-213120">
                         <a:lnSpc>
                           <a:spcPct val="100000"/>
                         </a:lnSpc>
@@ -22452,7 +22539,7 @@
         <p:spPr>
           <a:xfrm>
             <a:off x="6436080" y="1371600"/>
-            <a:ext cx="1140840" cy="344160"/>
+            <a:ext cx="1140480" cy="343800"/>
           </a:xfrm>
           <a:prstGeom prst="rect">
             <a:avLst/>
@@ -22617,7 +22704,7 @@
         <p:spPr>
           <a:xfrm>
             <a:off x="1564920" y="685800"/>
-            <a:ext cx="178200" cy="343800"/>
+            <a:ext cx="177840" cy="343440"/>
           </a:xfrm>
           <a:prstGeom prst="rect">
             <a:avLst/>
@@ -22643,7 +22730,7 @@
         <p:spPr>
           <a:xfrm>
             <a:off x="228600" y="228600"/>
-            <a:ext cx="1140480" cy="343800"/>
+            <a:ext cx="1140120" cy="343440"/>
           </a:xfrm>
           <a:prstGeom prst="rect">
             <a:avLst/>
@@ -22816,7 +22903,7 @@
                       <a:noAutofit/>
                     </a:bodyPr>
                     <a:p>
-                      <a:pPr marL="216000" indent="-213480">
+                      <a:pPr marL="216000" indent="-213120">
                         <a:lnSpc>
                           <a:spcPct val="100000"/>
                         </a:lnSpc>
@@ -23296,7 +23383,7 @@
                       <a:noAutofit/>
                     </a:bodyPr>
                     <a:p>
-                      <a:pPr marL="216000" indent="-213480">
+                      <a:pPr marL="216000" indent="-213120">
                         <a:lnSpc>
                           <a:spcPct val="100000"/>
                         </a:lnSpc>
@@ -23564,7 +23651,7 @@
                       <a:noAutofit/>
                     </a:bodyPr>
                     <a:p>
-                      <a:pPr marL="216000" indent="-213480">
+                      <a:pPr marL="216000" indent="-213120">
                         <a:lnSpc>
                           <a:spcPct val="100000"/>
                         </a:lnSpc>
@@ -23710,7 +23797,7 @@
         <p:spPr>
           <a:xfrm>
             <a:off x="799920" y="4158720"/>
-            <a:ext cx="178200" cy="424800"/>
+            <a:ext cx="177840" cy="424440"/>
           </a:xfrm>
           <a:prstGeom prst="rect">
             <a:avLst/>
@@ -23858,7 +23945,7 @@
                       <a:noAutofit/>
                     </a:bodyPr>
                     <a:p>
-                      <a:pPr marL="216000" indent="-213480">
+                      <a:pPr marL="216000" indent="-213120">
                         <a:lnSpc>
                           <a:spcPct val="100000"/>
                         </a:lnSpc>
@@ -24310,7 +24397,7 @@
                       <a:noAutofit/>
                     </a:bodyPr>
                     <a:p>
-                      <a:pPr marL="216000" indent="-213480">
+                      <a:pPr marL="216000" indent="-213120">
                         <a:lnSpc>
                           <a:spcPct val="100000"/>
                         </a:lnSpc>
@@ -24578,7 +24665,7 @@
                       <a:noAutofit/>
                     </a:bodyPr>
                     <a:p>
-                      <a:pPr marL="216000" indent="-213480">
+                      <a:pPr marL="216000" indent="-213120">
                         <a:lnSpc>
                           <a:spcPct val="100000"/>
                         </a:lnSpc>
@@ -25330,7 +25417,7 @@
         <p:spPr>
           <a:xfrm>
             <a:off x="5257800" y="2625480"/>
-            <a:ext cx="1140840" cy="344160"/>
+            <a:ext cx="1140480" cy="343800"/>
           </a:xfrm>
           <a:prstGeom prst="rect">
             <a:avLst/>
@@ -25551,7 +25638,7 @@
         <p:spPr>
           <a:xfrm>
             <a:off x="685800" y="685800"/>
-            <a:ext cx="4113360" cy="344880"/>
+            <a:ext cx="4113000" cy="344520"/>
           </a:xfrm>
           <a:prstGeom prst="rect">
             <a:avLst/>
@@ -25602,7 +25689,7 @@
         <p:spPr>
           <a:xfrm>
             <a:off x="3988800" y="1636200"/>
-            <a:ext cx="912960" cy="912960"/>
+            <a:ext cx="912600" cy="912600"/>
           </a:xfrm>
           <a:prstGeom prst="ellipse">
             <a:avLst/>
@@ -25677,7 +25764,7 @@
         <p:spPr>
           <a:xfrm>
             <a:off x="6841440" y="1622160"/>
-            <a:ext cx="912960" cy="912960"/>
+            <a:ext cx="912600" cy="912600"/>
           </a:xfrm>
           <a:prstGeom prst="ellipse">
             <a:avLst/>
@@ -25732,7 +25819,7 @@
         <p:spPr>
           <a:xfrm>
             <a:off x="1945440" y="2594160"/>
-            <a:ext cx="912960" cy="912960"/>
+            <a:ext cx="912600" cy="912600"/>
           </a:xfrm>
           <a:prstGeom prst="ellipse">
             <a:avLst/>
@@ -25787,7 +25874,7 @@
         <p:spPr>
           <a:xfrm>
             <a:off x="6877440" y="3638160"/>
-            <a:ext cx="912960" cy="912960"/>
+            <a:ext cx="912600" cy="912600"/>
           </a:xfrm>
           <a:prstGeom prst="ellipse">
             <a:avLst/>
@@ -25842,7 +25929,7 @@
         <p:spPr>
           <a:xfrm>
             <a:off x="3997440" y="3638160"/>
-            <a:ext cx="912960" cy="912960"/>
+            <a:ext cx="912600" cy="912600"/>
           </a:xfrm>
           <a:prstGeom prst="ellipse">
             <a:avLst/>
@@ -26067,7 +26154,7 @@
         <p:spPr>
           <a:xfrm>
             <a:off x="360000" y="324000"/>
-            <a:ext cx="6262920" cy="430920"/>
+            <a:ext cx="6262560" cy="430560"/>
           </a:xfrm>
           <a:prstGeom prst="rect">
             <a:avLst/>
@@ -26118,7 +26205,7 @@
         <p:spPr>
           <a:xfrm>
             <a:off x="612000" y="4464000"/>
-            <a:ext cx="718920" cy="646920"/>
+            <a:ext cx="718560" cy="646560"/>
           </a:xfrm>
           <a:prstGeom prst="ellipse">
             <a:avLst/>
@@ -26173,7 +26260,7 @@
         <p:spPr>
           <a:xfrm>
             <a:off x="1512360" y="4464360"/>
-            <a:ext cx="718920" cy="646920"/>
+            <a:ext cx="718560" cy="646560"/>
           </a:xfrm>
           <a:prstGeom prst="ellipse">
             <a:avLst/>
@@ -26228,7 +26315,7 @@
         <p:spPr>
           <a:xfrm>
             <a:off x="2448360" y="4464360"/>
-            <a:ext cx="718920" cy="646920"/>
+            <a:ext cx="718560" cy="646560"/>
           </a:xfrm>
           <a:prstGeom prst="ellipse">
             <a:avLst/>
@@ -26283,7 +26370,7 @@
         <p:spPr>
           <a:xfrm>
             <a:off x="3420360" y="4464360"/>
-            <a:ext cx="718920" cy="646920"/>
+            <a:ext cx="718560" cy="646560"/>
           </a:xfrm>
           <a:prstGeom prst="ellipse">
             <a:avLst/>
@@ -26338,7 +26425,7 @@
         <p:spPr>
           <a:xfrm>
             <a:off x="4392360" y="4464360"/>
-            <a:ext cx="718920" cy="646920"/>
+            <a:ext cx="718560" cy="646560"/>
           </a:xfrm>
           <a:prstGeom prst="ellipse">
             <a:avLst/>
@@ -26393,7 +26480,7 @@
         <p:spPr>
           <a:xfrm>
             <a:off x="5292360" y="4464360"/>
-            <a:ext cx="718920" cy="646920"/>
+            <a:ext cx="718560" cy="646560"/>
           </a:xfrm>
           <a:prstGeom prst="ellipse">
             <a:avLst/>
@@ -26448,7 +26535,7 @@
         <p:spPr>
           <a:xfrm>
             <a:off x="1476360" y="3528360"/>
-            <a:ext cx="718920" cy="646920"/>
+            <a:ext cx="718560" cy="646560"/>
           </a:xfrm>
           <a:prstGeom prst="ellipse">
             <a:avLst/>
@@ -26503,7 +26590,7 @@
         <p:spPr>
           <a:xfrm>
             <a:off x="2412720" y="2988720"/>
-            <a:ext cx="718920" cy="646920"/>
+            <a:ext cx="718560" cy="646560"/>
           </a:xfrm>
           <a:prstGeom prst="ellipse">
             <a:avLst/>
@@ -26558,7 +26645,7 @@
         <p:spPr>
           <a:xfrm>
             <a:off x="3385080" y="2485080"/>
-            <a:ext cx="718920" cy="646920"/>
+            <a:ext cx="718560" cy="646560"/>
           </a:xfrm>
           <a:prstGeom prst="ellipse">
             <a:avLst/>
@@ -26613,7 +26700,7 @@
         <p:spPr>
           <a:xfrm>
             <a:off x="4321440" y="1981440"/>
-            <a:ext cx="718920" cy="646920"/>
+            <a:ext cx="718560" cy="646560"/>
           </a:xfrm>
           <a:prstGeom prst="ellipse">
             <a:avLst/>
@@ -26668,7 +26755,7 @@
         <p:spPr>
           <a:xfrm>
             <a:off x="5257800" y="1549800"/>
-            <a:ext cx="718920" cy="646920"/>
+            <a:ext cx="718560" cy="646560"/>
           </a:xfrm>
           <a:prstGeom prst="ellipse">
             <a:avLst/>
@@ -27303,7 +27390,7 @@
         <p:spPr>
           <a:xfrm>
             <a:off x="360000" y="324000"/>
-            <a:ext cx="6262920" cy="430920"/>
+            <a:ext cx="6262560" cy="430560"/>
           </a:xfrm>
           <a:prstGeom prst="rect">
             <a:avLst/>
@@ -27354,7 +27441,7 @@
         <p:spPr>
           <a:xfrm>
             <a:off x="612000" y="4464000"/>
-            <a:ext cx="718920" cy="646920"/>
+            <a:ext cx="718560" cy="646560"/>
           </a:xfrm>
           <a:prstGeom prst="ellipse">
             <a:avLst/>
@@ -27409,7 +27496,7 @@
         <p:spPr>
           <a:xfrm>
             <a:off x="1512360" y="4464360"/>
-            <a:ext cx="718920" cy="646920"/>
+            <a:ext cx="718560" cy="646560"/>
           </a:xfrm>
           <a:prstGeom prst="ellipse">
             <a:avLst/>
@@ -27464,7 +27551,7 @@
         <p:spPr>
           <a:xfrm>
             <a:off x="2448360" y="4464360"/>
-            <a:ext cx="718920" cy="646920"/>
+            <a:ext cx="718560" cy="646560"/>
           </a:xfrm>
           <a:prstGeom prst="ellipse">
             <a:avLst/>
@@ -27519,7 +27606,7 @@
         <p:spPr>
           <a:xfrm>
             <a:off x="3420360" y="4464360"/>
-            <a:ext cx="718920" cy="646920"/>
+            <a:ext cx="718560" cy="646560"/>
           </a:xfrm>
           <a:prstGeom prst="ellipse">
             <a:avLst/>
@@ -27574,7 +27661,7 @@
         <p:spPr>
           <a:xfrm>
             <a:off x="4392360" y="4464360"/>
-            <a:ext cx="718920" cy="646920"/>
+            <a:ext cx="718560" cy="646560"/>
           </a:xfrm>
           <a:prstGeom prst="ellipse">
             <a:avLst/>
@@ -27629,7 +27716,7 @@
         <p:spPr>
           <a:xfrm>
             <a:off x="5292360" y="4464360"/>
-            <a:ext cx="718920" cy="646920"/>
+            <a:ext cx="718560" cy="646560"/>
           </a:xfrm>
           <a:prstGeom prst="ellipse">
             <a:avLst/>
@@ -27684,7 +27771,7 @@
         <p:spPr>
           <a:xfrm>
             <a:off x="1080360" y="3528360"/>
-            <a:ext cx="718920" cy="646920"/>
+            <a:ext cx="718560" cy="646560"/>
           </a:xfrm>
           <a:prstGeom prst="ellipse">
             <a:avLst/>
@@ -27739,7 +27826,7 @@
         <p:spPr>
           <a:xfrm>
             <a:off x="2880720" y="3492720"/>
-            <a:ext cx="718920" cy="646920"/>
+            <a:ext cx="718560" cy="646560"/>
           </a:xfrm>
           <a:prstGeom prst="ellipse">
             <a:avLst/>
@@ -27794,7 +27881,7 @@
         <p:spPr>
           <a:xfrm>
             <a:off x="2016000" y="2448000"/>
-            <a:ext cx="718920" cy="646920"/>
+            <a:ext cx="718560" cy="646560"/>
           </a:xfrm>
           <a:prstGeom prst="ellipse">
             <a:avLst/>
@@ -27849,7 +27936,7 @@
         <p:spPr>
           <a:xfrm>
             <a:off x="4753440" y="3493440"/>
-            <a:ext cx="718920" cy="646920"/>
+            <a:ext cx="718560" cy="646560"/>
           </a:xfrm>
           <a:prstGeom prst="ellipse">
             <a:avLst/>
@@ -27904,7 +27991,7 @@
         <p:spPr>
           <a:xfrm>
             <a:off x="3096000" y="1440000"/>
-            <a:ext cx="718920" cy="646920"/>
+            <a:ext cx="718560" cy="646560"/>
           </a:xfrm>
           <a:prstGeom prst="ellipse">
             <a:avLst/>
@@ -28269,7 +28356,7 @@
         <p:spPr>
           <a:xfrm>
             <a:off x="5544000" y="834120"/>
-            <a:ext cx="4175280" cy="430920"/>
+            <a:ext cx="4174920" cy="430560"/>
           </a:xfrm>
           <a:prstGeom prst="rect">
             <a:avLst/>
@@ -28320,7 +28407,7 @@
         <p:spPr>
           <a:xfrm>
             <a:off x="576000" y="2880000"/>
-            <a:ext cx="718920" cy="646920"/>
+            <a:ext cx="718560" cy="646560"/>
           </a:xfrm>
           <a:prstGeom prst="ellipse">
             <a:avLst/>
@@ -28375,7 +28462,7 @@
         <p:spPr>
           <a:xfrm>
             <a:off x="1476360" y="2880360"/>
-            <a:ext cx="718920" cy="646920"/>
+            <a:ext cx="718560" cy="646560"/>
           </a:xfrm>
           <a:prstGeom prst="ellipse">
             <a:avLst/>
@@ -28430,7 +28517,7 @@
         <p:spPr>
           <a:xfrm>
             <a:off x="2412360" y="2880360"/>
-            <a:ext cx="718920" cy="646920"/>
+            <a:ext cx="718560" cy="646560"/>
           </a:xfrm>
           <a:prstGeom prst="ellipse">
             <a:avLst/>
@@ -28485,7 +28572,7 @@
         <p:spPr>
           <a:xfrm>
             <a:off x="3384360" y="2880360"/>
-            <a:ext cx="718920" cy="646920"/>
+            <a:ext cx="718560" cy="646560"/>
           </a:xfrm>
           <a:prstGeom prst="ellipse">
             <a:avLst/>
@@ -28540,7 +28627,7 @@
         <p:spPr>
           <a:xfrm>
             <a:off x="4356360" y="2880360"/>
-            <a:ext cx="718920" cy="646920"/>
+            <a:ext cx="718560" cy="646560"/>
           </a:xfrm>
           <a:prstGeom prst="ellipse">
             <a:avLst/>
@@ -28595,7 +28682,7 @@
         <p:spPr>
           <a:xfrm>
             <a:off x="5256360" y="2880360"/>
-            <a:ext cx="718920" cy="646920"/>
+            <a:ext cx="718560" cy="646560"/>
           </a:xfrm>
           <a:prstGeom prst="ellipse">
             <a:avLst/>
@@ -28650,7 +28737,7 @@
         <p:spPr>
           <a:xfrm>
             <a:off x="1044360" y="1944360"/>
-            <a:ext cx="718920" cy="646920"/>
+            <a:ext cx="718560" cy="646560"/>
           </a:xfrm>
           <a:prstGeom prst="ellipse">
             <a:avLst/>
@@ -28705,7 +28792,7 @@
         <p:spPr>
           <a:xfrm>
             <a:off x="2844720" y="1908720"/>
-            <a:ext cx="718920" cy="646920"/>
+            <a:ext cx="718560" cy="646560"/>
           </a:xfrm>
           <a:prstGeom prst="ellipse">
             <a:avLst/>
@@ -28760,7 +28847,7 @@
         <p:spPr>
           <a:xfrm>
             <a:off x="1836000" y="1188000"/>
-            <a:ext cx="718920" cy="646920"/>
+            <a:ext cx="718560" cy="646560"/>
           </a:xfrm>
           <a:prstGeom prst="ellipse">
             <a:avLst/>
@@ -28815,7 +28902,7 @@
         <p:spPr>
           <a:xfrm>
             <a:off x="4717440" y="1909440"/>
-            <a:ext cx="718920" cy="646920"/>
+            <a:ext cx="718560" cy="646560"/>
           </a:xfrm>
           <a:prstGeom prst="ellipse">
             <a:avLst/>
@@ -28870,7 +28957,7 @@
         <p:spPr>
           <a:xfrm>
             <a:off x="3060000" y="432000"/>
-            <a:ext cx="718920" cy="646920"/>
+            <a:ext cx="718560" cy="646560"/>
           </a:xfrm>
           <a:prstGeom prst="ellipse">
             <a:avLst/>
@@ -29289,7 +29376,7 @@
         <p:spPr>
           <a:xfrm>
             <a:off x="1656000" y="4335840"/>
-            <a:ext cx="7055280" cy="1063440"/>
+            <a:ext cx="7054920" cy="1063080"/>
           </a:xfrm>
           <a:prstGeom prst="rect">
             <a:avLst/>
@@ -29370,7 +29457,7 @@
         <p:spPr>
           <a:xfrm>
             <a:off x="2880000" y="504000"/>
-            <a:ext cx="3815640" cy="1079640"/>
+            <a:ext cx="3815280" cy="1079280"/>
           </a:xfrm>
           <a:prstGeom prst="rect">
             <a:avLst/>
@@ -29445,7 +29532,7 @@
         <p:spPr>
           <a:xfrm>
             <a:off x="2880000" y="2448000"/>
-            <a:ext cx="3815640" cy="2951640"/>
+            <a:ext cx="3815280" cy="2951280"/>
           </a:xfrm>
           <a:prstGeom prst="rect">
             <a:avLst/>
@@ -29540,7 +29627,7 @@
         <p:spPr>
           <a:xfrm>
             <a:off x="7416000" y="2952000"/>
-            <a:ext cx="1943640" cy="1007640"/>
+            <a:ext cx="1943280" cy="1007280"/>
           </a:xfrm>
           <a:prstGeom prst="rect">
             <a:avLst/>
@@ -29595,7 +29682,7 @@
         <p:spPr>
           <a:xfrm>
             <a:off x="216000" y="2952000"/>
-            <a:ext cx="1943640" cy="1007640"/>
+            <a:ext cx="1943280" cy="1007280"/>
           </a:xfrm>
           <a:prstGeom prst="rect">
             <a:avLst/>
@@ -29650,7 +29737,7 @@
         <p:spPr>
           <a:xfrm>
             <a:off x="4536000" y="1800000"/>
-            <a:ext cx="143640" cy="503640"/>
+            <a:ext cx="143280" cy="503280"/>
           </a:xfrm>
           <a:custGeom>
             <a:avLst/>
@@ -29711,7 +29798,7 @@
         <p:spPr>
           <a:xfrm>
             <a:off x="4788000" y="1764000"/>
-            <a:ext cx="143640" cy="503640"/>
+            <a:ext cx="143280" cy="503280"/>
           </a:xfrm>
           <a:custGeom>
             <a:avLst/>
@@ -29772,7 +29859,7 @@
         <p:spPr>
           <a:xfrm>
             <a:off x="2304000" y="3384000"/>
-            <a:ext cx="503640" cy="143640"/>
+            <a:ext cx="503280" cy="143280"/>
           </a:xfrm>
           <a:custGeom>
             <a:avLst/>
@@ -29833,7 +29920,7 @@
         <p:spPr>
           <a:xfrm>
             <a:off x="6804000" y="3384360"/>
-            <a:ext cx="503640" cy="143640"/>
+            <a:ext cx="503280" cy="143280"/>
           </a:xfrm>
           <a:custGeom>
             <a:avLst/>
@@ -29924,7 +30011,7 @@
         <p:spPr>
           <a:xfrm>
             <a:off x="3060000" y="2268000"/>
-            <a:ext cx="1432440" cy="784440"/>
+            <a:ext cx="1432080" cy="784080"/>
           </a:xfrm>
           <a:prstGeom prst="rect">
             <a:avLst/>
@@ -29979,7 +30066,7 @@
         <p:spPr>
           <a:xfrm>
             <a:off x="5832000" y="1980000"/>
-            <a:ext cx="1432440" cy="1360440"/>
+            <a:ext cx="1432080" cy="1360080"/>
           </a:xfrm>
           <a:custGeom>
             <a:avLst/>
@@ -30131,7 +30218,7 @@
         <p:spPr>
           <a:xfrm>
             <a:off x="2376000" y="1044000"/>
-            <a:ext cx="1144440" cy="676440"/>
+            <a:ext cx="1144080" cy="676080"/>
           </a:xfrm>
           <a:prstGeom prst="ellipse">
             <a:avLst/>
@@ -30186,7 +30273,7 @@
         <p:spPr>
           <a:xfrm>
             <a:off x="3780360" y="1044360"/>
-            <a:ext cx="1144440" cy="676440"/>
+            <a:ext cx="1144080" cy="676080"/>
           </a:xfrm>
           <a:prstGeom prst="ellipse">
             <a:avLst/>
@@ -30241,7 +30328,7 @@
         <p:spPr>
           <a:xfrm>
             <a:off x="2376360" y="1044360"/>
-            <a:ext cx="1144440" cy="676440"/>
+            <a:ext cx="1144080" cy="676080"/>
           </a:xfrm>
           <a:prstGeom prst="ellipse">
             <a:avLst/>
@@ -30296,7 +30383,7 @@
         <p:spPr>
           <a:xfrm>
             <a:off x="1512720" y="2160720"/>
-            <a:ext cx="1144440" cy="676440"/>
+            <a:ext cx="1144080" cy="676080"/>
           </a:xfrm>
           <a:prstGeom prst="ellipse">
             <a:avLst/>
@@ -30432,7 +30519,7 @@
         <p:spPr>
           <a:xfrm>
             <a:off x="4500000" y="2376000"/>
-            <a:ext cx="1396440" cy="594720"/>
+            <a:ext cx="1396080" cy="594360"/>
           </a:xfrm>
           <a:prstGeom prst="rect">
             <a:avLst/>
@@ -30483,7 +30570,7 @@
         <p:spPr>
           <a:xfrm>
             <a:off x="4320000" y="3204360"/>
-            <a:ext cx="1396440" cy="594720"/>
+            <a:ext cx="1396080" cy="594360"/>
           </a:xfrm>
           <a:prstGeom prst="rect">
             <a:avLst/>
@@ -30564,7 +30651,7 @@
         <p:spPr>
           <a:xfrm>
             <a:off x="864000" y="1080000"/>
-            <a:ext cx="3096000" cy="3456000"/>
+            <a:ext cx="3095640" cy="3455640"/>
           </a:xfrm>
           <a:prstGeom prst="rect">
             <a:avLst/>
@@ -30589,10 +30676,18 @@
             <a:noAutofit/>
           </a:bodyPr>
           <a:p>
-            <a:pPr algn="ctr"/>
+            <a:pPr algn="ctr">
+              <a:lnSpc>
+                <a:spcPct val="100000"/>
+              </a:lnSpc>
+            </a:pPr>
             <a:r>
               <a:rPr b="0" lang="en-IN" sz="1800" spc="-1" strike="noStrike">
+                <a:solidFill>
+                  <a:srgbClr val="000000"/>
+                </a:solidFill>
                 <a:latin typeface="Arial"/>
+                <a:ea typeface="DejaVu Sans"/>
               </a:rPr>
               <a:t>PROCESSOR</a:t>
             </a:r>
@@ -30611,7 +30706,7 @@
         <p:spPr>
           <a:xfrm>
             <a:off x="3384000" y="1656000"/>
-            <a:ext cx="576000" cy="936000"/>
+            <a:ext cx="575640" cy="935640"/>
           </a:xfrm>
           <a:prstGeom prst="rect">
             <a:avLst/>
@@ -30636,10 +30731,18 @@
             <a:noAutofit/>
           </a:bodyPr>
           <a:p>
-            <a:pPr algn="ctr"/>
+            <a:pPr algn="ctr">
+              <a:lnSpc>
+                <a:spcPct val="100000"/>
+              </a:lnSpc>
+            </a:pPr>
             <a:r>
               <a:rPr b="0" lang="en-IN" sz="1800" spc="-1" strike="noStrike">
+                <a:solidFill>
+                  <a:srgbClr val="000000"/>
+                </a:solidFill>
                 <a:latin typeface="Arial"/>
+                <a:ea typeface="DejaVu Sans"/>
               </a:rPr>
               <a:t>M</a:t>
             </a:r>
@@ -30648,10 +30751,18 @@
             </a:endParaRPr>
           </a:p>
           <a:p>
-            <a:pPr algn="ctr"/>
+            <a:pPr algn="ctr">
+              <a:lnSpc>
+                <a:spcPct val="100000"/>
+              </a:lnSpc>
+            </a:pPr>
             <a:r>
               <a:rPr b="0" lang="en-IN" sz="1800" spc="-1" strike="noStrike">
+                <a:solidFill>
+                  <a:srgbClr val="000000"/>
+                </a:solidFill>
                 <a:latin typeface="Arial"/>
+                <a:ea typeface="DejaVu Sans"/>
               </a:rPr>
               <a:t>A</a:t>
             </a:r>
@@ -30660,10 +30771,18 @@
             </a:endParaRPr>
           </a:p>
           <a:p>
-            <a:pPr algn="ctr"/>
+            <a:pPr algn="ctr">
+              <a:lnSpc>
+                <a:spcPct val="100000"/>
+              </a:lnSpc>
+            </a:pPr>
             <a:r>
               <a:rPr b="0" lang="en-IN" sz="1800" spc="-1" strike="noStrike">
+                <a:solidFill>
+                  <a:srgbClr val="000000"/>
+                </a:solidFill>
                 <a:latin typeface="Arial"/>
+                <a:ea typeface="DejaVu Sans"/>
               </a:rPr>
               <a:t>R</a:t>
             </a:r>
@@ -30682,7 +30801,7 @@
         <p:spPr>
           <a:xfrm>
             <a:off x="3384000" y="2952000"/>
-            <a:ext cx="576000" cy="1008000"/>
+            <a:ext cx="575640" cy="1007640"/>
           </a:xfrm>
           <a:prstGeom prst="rect">
             <a:avLst/>
@@ -30707,10 +30826,18 @@
             <a:noAutofit/>
           </a:bodyPr>
           <a:p>
-            <a:pPr algn="ctr"/>
+            <a:pPr algn="ctr">
+              <a:lnSpc>
+                <a:spcPct val="100000"/>
+              </a:lnSpc>
+            </a:pPr>
             <a:r>
               <a:rPr b="0" lang="en-IN" sz="1800" spc="-1" strike="noStrike">
+                <a:solidFill>
+                  <a:srgbClr val="000000"/>
+                </a:solidFill>
                 <a:latin typeface="Arial"/>
+                <a:ea typeface="DejaVu Sans"/>
               </a:rPr>
               <a:t>M</a:t>
             </a:r>
@@ -30719,10 +30846,18 @@
             </a:endParaRPr>
           </a:p>
           <a:p>
-            <a:pPr algn="ctr"/>
+            <a:pPr algn="ctr">
+              <a:lnSpc>
+                <a:spcPct val="100000"/>
+              </a:lnSpc>
+            </a:pPr>
             <a:r>
               <a:rPr b="0" lang="en-IN" sz="1800" spc="-1" strike="noStrike">
+                <a:solidFill>
+                  <a:srgbClr val="000000"/>
+                </a:solidFill>
                 <a:latin typeface="Arial"/>
+                <a:ea typeface="DejaVu Sans"/>
               </a:rPr>
               <a:t>D</a:t>
             </a:r>
@@ -30731,10 +30866,18 @@
             </a:endParaRPr>
           </a:p>
           <a:p>
-            <a:pPr algn="ctr"/>
+            <a:pPr algn="ctr">
+              <a:lnSpc>
+                <a:spcPct val="100000"/>
+              </a:lnSpc>
+            </a:pPr>
             <a:r>
               <a:rPr b="0" lang="en-IN" sz="1800" spc="-1" strike="noStrike">
+                <a:solidFill>
+                  <a:srgbClr val="000000"/>
+                </a:solidFill>
                 <a:latin typeface="Arial"/>
+                <a:ea typeface="DejaVu Sans"/>
               </a:rPr>
               <a:t>R</a:t>
             </a:r>
@@ -30753,7 +30896,7 @@
         <p:spPr>
           <a:xfrm>
             <a:off x="5832000" y="1692000"/>
-            <a:ext cx="2232000" cy="2160000"/>
+            <a:ext cx="2231640" cy="2159640"/>
           </a:xfrm>
           <a:prstGeom prst="rect">
             <a:avLst/>
@@ -30778,10 +30921,18 @@
             <a:noAutofit/>
           </a:bodyPr>
           <a:p>
-            <a:pPr algn="ctr"/>
+            <a:pPr algn="ctr">
+              <a:lnSpc>
+                <a:spcPct val="100000"/>
+              </a:lnSpc>
+            </a:pPr>
             <a:r>
               <a:rPr b="0" lang="en-IN" sz="1800" spc="-1" strike="noStrike">
+                <a:solidFill>
+                  <a:srgbClr val="000000"/>
+                </a:solidFill>
                 <a:latin typeface="Arial"/>
+                <a:ea typeface="DejaVu Sans"/>
               </a:rPr>
               <a:t>Primary Memory</a:t>
             </a:r>
@@ -30800,13 +30951,13 @@
         <p:spPr>
           <a:xfrm>
             <a:off x="3960000" y="2016000"/>
-            <a:ext cx="1872000" cy="216000"/>
+            <a:ext cx="1871640" cy="215640"/>
           </a:xfrm>
           <a:custGeom>
             <a:avLst/>
             <a:gdLst/>
             <a:ahLst/>
-            <a:rect l="0" t="0" r="r" b="b"/>
+            <a:rect l="l" t="t" r="r" b="b"/>
             <a:pathLst>
               <a:path w="5202" h="602">
                 <a:moveTo>
@@ -30861,13 +31012,13 @@
         <p:spPr>
           <a:xfrm>
             <a:off x="3960000" y="3168000"/>
-            <a:ext cx="1872000" cy="288000"/>
+            <a:ext cx="1871640" cy="287640"/>
           </a:xfrm>
           <a:custGeom>
             <a:avLst/>
             <a:gdLst/>
             <a:ahLst/>
-            <a:rect l="0" t="0" r="r" b="b"/>
+            <a:rect l="l" t="t" r="r" b="b"/>
             <a:pathLst>
               <a:path w="5202" h="802">
                 <a:moveTo>
@@ -30922,12 +31073,12 @@
           <a:fontRef idx="minor"/>
         </p:style>
       </p:sp>
-      <p:cxnSp>
-        <p:nvCxnSpPr>
+      <p:sp>
+        <p:nvSpPr>
           <p:cNvPr id="621" name="Line 7"/>
-          <p:cNvCxnSpPr/>
-          <p:nvPr/>
-        </p:nvCxnSpPr>
+          <p:cNvSpPr/>
+          <p:nvPr/>
+        </p:nvSpPr>
         <p:spPr>
           <a:xfrm>
             <a:off x="0" y="0"/>
@@ -30943,17 +31094,23 @@
             <a:tailEnd len="med" type="triangle" w="med"/>
           </a:ln>
         </p:spPr>
-      </p:cxnSp>
-      <p:sp>
-        <p:nvSpPr>
-          <p:cNvPr id="622" name="TextShape 8"/>
-          <p:cNvSpPr txBox="1"/>
+        <p:style>
+          <a:lnRef idx="0"/>
+          <a:fillRef idx="0"/>
+          <a:effectRef idx="0"/>
+          <a:fontRef idx="minor"/>
+        </p:style>
+      </p:sp>
+      <p:sp>
+        <p:nvSpPr>
+          <p:cNvPr id="622" name="CustomShape 8"/>
+          <p:cNvSpPr/>
           <p:nvPr/>
         </p:nvSpPr>
         <p:spPr>
           <a:xfrm>
             <a:off x="4320000" y="4428000"/>
-            <a:ext cx="2520000" cy="346320"/>
+            <a:ext cx="2519640" cy="345960"/>
           </a:xfrm>
           <a:prstGeom prst="rect">
             <a:avLst/>
@@ -30963,11 +31120,22 @@
             <a:noFill/>
           </a:ln>
         </p:spPr>
+        <p:style>
+          <a:lnRef idx="0"/>
+          <a:fillRef idx="0"/>
+          <a:effectRef idx="0"/>
+          <a:fontRef idx="minor"/>
+        </p:style>
         <p:txBody>
           <a:bodyPr lIns="90000" rIns="90000" tIns="45000" bIns="45000">
             <a:noAutofit/>
           </a:bodyPr>
           <a:p>
+            <a:pPr>
+              <a:lnSpc>
+                <a:spcPct val="100000"/>
+              </a:lnSpc>
+            </a:pPr>
             <a:r>
               <a:rPr b="0" lang="en-IN" sz="1800" spc="-1" strike="noStrike">
                 <a:latin typeface="Arial"/>
@@ -30982,14 +31150,14 @@
       </p:sp>
       <p:sp>
         <p:nvSpPr>
-          <p:cNvPr id="623" name="TextShape 9"/>
-          <p:cNvSpPr txBox="1"/>
+          <p:cNvPr id="623" name="CustomShape 9"/>
+          <p:cNvSpPr/>
           <p:nvPr/>
         </p:nvSpPr>
         <p:spPr>
           <a:xfrm>
             <a:off x="4536000" y="2916000"/>
-            <a:ext cx="2520000" cy="346320"/>
+            <a:ext cx="2519640" cy="345960"/>
           </a:xfrm>
           <a:prstGeom prst="rect">
             <a:avLst/>
@@ -30999,11 +31167,22 @@
             <a:noFill/>
           </a:ln>
         </p:spPr>
+        <p:style>
+          <a:lnRef idx="0"/>
+          <a:fillRef idx="0"/>
+          <a:effectRef idx="0"/>
+          <a:fontRef idx="minor"/>
+        </p:style>
         <p:txBody>
           <a:bodyPr lIns="90000" rIns="90000" tIns="45000" bIns="45000">
             <a:noAutofit/>
           </a:bodyPr>
           <a:p>
+            <a:pPr>
+              <a:lnSpc>
+                <a:spcPct val="100000"/>
+              </a:lnSpc>
+            </a:pPr>
             <a:r>
               <a:rPr b="0" lang="en-IN" sz="1800" spc="-1" strike="noStrike">
                 <a:latin typeface="Arial"/>
@@ -31018,14 +31197,14 @@
       </p:sp>
       <p:sp>
         <p:nvSpPr>
-          <p:cNvPr id="624" name="TextShape 10"/>
-          <p:cNvSpPr txBox="1"/>
+          <p:cNvPr id="624" name="CustomShape 10"/>
+          <p:cNvSpPr/>
           <p:nvPr/>
         </p:nvSpPr>
         <p:spPr>
           <a:xfrm>
             <a:off x="4248000" y="1764000"/>
-            <a:ext cx="2520000" cy="346320"/>
+            <a:ext cx="2519640" cy="345960"/>
           </a:xfrm>
           <a:prstGeom prst="rect">
             <a:avLst/>
@@ -31035,11 +31214,22 @@
             <a:noFill/>
           </a:ln>
         </p:spPr>
+        <p:style>
+          <a:lnRef idx="0"/>
+          <a:fillRef idx="0"/>
+          <a:effectRef idx="0"/>
+          <a:fontRef idx="minor"/>
+        </p:style>
         <p:txBody>
           <a:bodyPr lIns="90000" rIns="90000" tIns="45000" bIns="45000">
             <a:noAutofit/>
           </a:bodyPr>
           <a:p>
+            <a:pPr>
+              <a:lnSpc>
+                <a:spcPct val="100000"/>
+              </a:lnSpc>
+            </a:pPr>
             <a:r>
               <a:rPr b="0" lang="en-IN" sz="1800" spc="-1" strike="noStrike">
                 <a:latin typeface="Arial"/>
@@ -31051,6 +31241,1463 @@
             </a:endParaRPr>
           </a:p>
         </p:txBody>
+      </p:sp>
+    </p:spTree>
+  </p:cSld>
+  <mc:AlternateContent>
+    <mc:Choice Requires="p14">
+      <p:transition spd="slow" p14:dur="2000"/>
+    </mc:Choice>
+    <mc:Fallback>
+      <p:transition spd="slow"/>
+    </mc:Fallback>
+  </mc:AlternateContent>
+</p:sld>
+</file>
+
+<file path=ppt/slides/slide31.xml><?xml version="1.0" encoding="utf-8"?>
+<p:sld xmlns:a="http://schemas.openxmlformats.org/drawingml/2006/main" xmlns:p="http://schemas.openxmlformats.org/presentationml/2006/main" xmlns:r="http://schemas.openxmlformats.org/officeDocument/2006/relationships" xmlns:p14="http://schemas.microsoft.com/office/powerpoint/2010/main" xmlns:p15="http://schemas.microsoft.com/office/powerpoint/2012/main" xmlns:mc="http://schemas.openxmlformats.org/markup-compatibility/2006">
+  <p:cSld>
+    <p:spTree>
+      <p:nvGrpSpPr>
+        <p:cNvPr id="1" name=""/>
+        <p:cNvGrpSpPr/>
+        <p:nvPr/>
+      </p:nvGrpSpPr>
+      <p:grpSpPr>
+        <a:xfrm>
+          <a:off x="0" y="0"/>
+          <a:ext cx="0" cy="0"/>
+          <a:chOff x="0" y="0"/>
+          <a:chExt cx="0" cy="0"/>
+        </a:xfrm>
+      </p:grpSpPr>
+      <p:sp>
+        <p:nvSpPr>
+          <p:cNvPr id="625" name="CustomShape 1"/>
+          <p:cNvSpPr/>
+          <p:nvPr/>
+        </p:nvSpPr>
+        <p:spPr>
+          <a:xfrm>
+            <a:off x="720000" y="1800000"/>
+            <a:ext cx="1656000" cy="1008000"/>
+          </a:xfrm>
+          <a:prstGeom prst="rect">
+            <a:avLst/>
+          </a:prstGeom>
+          <a:solidFill>
+            <a:srgbClr val="729fcf"/>
+          </a:solidFill>
+          <a:ln>
+            <a:solidFill>
+              <a:srgbClr val="3465a4"/>
+            </a:solidFill>
+          </a:ln>
+        </p:spPr>
+        <p:style>
+          <a:lnRef idx="0"/>
+          <a:fillRef idx="0"/>
+          <a:effectRef idx="0"/>
+          <a:fontRef idx="minor"/>
+        </p:style>
+        <p:txBody>
+          <a:bodyPr wrap="none" lIns="90000" rIns="90000" tIns="45000" bIns="45000" anchor="ctr">
+            <a:noAutofit/>
+          </a:bodyPr>
+          <a:p>
+            <a:pPr algn="ctr"/>
+            <a:r>
+              <a:rPr b="0" lang="en-IN" sz="1800" spc="-1" strike="noStrike">
+                <a:latin typeface="Arial"/>
+              </a:rPr>
+              <a:t>Input</a:t>
+            </a:r>
+            <a:endParaRPr b="0" lang="en-IN" sz="1800" spc="-1" strike="noStrike">
+              <a:latin typeface="Arial"/>
+            </a:endParaRPr>
+          </a:p>
+        </p:txBody>
+      </p:sp>
+      <p:sp>
+        <p:nvSpPr>
+          <p:cNvPr id="626" name="CustomShape 2"/>
+          <p:cNvSpPr/>
+          <p:nvPr/>
+        </p:nvSpPr>
+        <p:spPr>
+          <a:xfrm>
+            <a:off x="2844000" y="1800000"/>
+            <a:ext cx="1656000" cy="1008000"/>
+          </a:xfrm>
+          <a:prstGeom prst="rect">
+            <a:avLst/>
+          </a:prstGeom>
+          <a:solidFill>
+            <a:srgbClr val="729fcf"/>
+          </a:solidFill>
+          <a:ln>
+            <a:solidFill>
+              <a:srgbClr val="3465a4"/>
+            </a:solidFill>
+          </a:ln>
+        </p:spPr>
+        <p:style>
+          <a:lnRef idx="0"/>
+          <a:fillRef idx="0"/>
+          <a:effectRef idx="0"/>
+          <a:fontRef idx="minor"/>
+        </p:style>
+        <p:txBody>
+          <a:bodyPr wrap="none" lIns="90000" rIns="90000" tIns="45000" bIns="45000" anchor="ctr">
+            <a:noAutofit/>
+          </a:bodyPr>
+          <a:p>
+            <a:pPr algn="ctr"/>
+            <a:r>
+              <a:rPr b="0" lang="en-IN" sz="1800" spc="-1" strike="noStrike">
+                <a:latin typeface="Arial"/>
+              </a:rPr>
+              <a:t>Output</a:t>
+            </a:r>
+            <a:endParaRPr b="0" lang="en-IN" sz="1800" spc="-1" strike="noStrike">
+              <a:latin typeface="Arial"/>
+            </a:endParaRPr>
+          </a:p>
+        </p:txBody>
+      </p:sp>
+      <p:sp>
+        <p:nvSpPr>
+          <p:cNvPr id="627" name="CustomShape 3"/>
+          <p:cNvSpPr/>
+          <p:nvPr/>
+        </p:nvSpPr>
+        <p:spPr>
+          <a:xfrm>
+            <a:off x="4932000" y="1800000"/>
+            <a:ext cx="1656000" cy="1008000"/>
+          </a:xfrm>
+          <a:prstGeom prst="rect">
+            <a:avLst/>
+          </a:prstGeom>
+          <a:solidFill>
+            <a:srgbClr val="729fcf"/>
+          </a:solidFill>
+          <a:ln>
+            <a:solidFill>
+              <a:srgbClr val="3465a4"/>
+            </a:solidFill>
+          </a:ln>
+        </p:spPr>
+        <p:style>
+          <a:lnRef idx="0"/>
+          <a:fillRef idx="0"/>
+          <a:effectRef idx="0"/>
+          <a:fontRef idx="minor"/>
+        </p:style>
+        <p:txBody>
+          <a:bodyPr wrap="none" lIns="90000" rIns="90000" tIns="45000" bIns="45000" anchor="ctr">
+            <a:noAutofit/>
+          </a:bodyPr>
+          <a:p>
+            <a:pPr algn="ctr"/>
+            <a:r>
+              <a:rPr b="0" lang="en-IN" sz="1800" spc="-1" strike="noStrike">
+                <a:latin typeface="Arial"/>
+              </a:rPr>
+              <a:t>Memory</a:t>
+            </a:r>
+            <a:endParaRPr b="0" lang="en-IN" sz="1800" spc="-1" strike="noStrike">
+              <a:latin typeface="Arial"/>
+            </a:endParaRPr>
+          </a:p>
+        </p:txBody>
+      </p:sp>
+      <p:sp>
+        <p:nvSpPr>
+          <p:cNvPr id="628" name="CustomShape 4"/>
+          <p:cNvSpPr/>
+          <p:nvPr/>
+        </p:nvSpPr>
+        <p:spPr>
+          <a:xfrm>
+            <a:off x="7056000" y="1800000"/>
+            <a:ext cx="1656000" cy="1008000"/>
+          </a:xfrm>
+          <a:prstGeom prst="rect">
+            <a:avLst/>
+          </a:prstGeom>
+          <a:solidFill>
+            <a:srgbClr val="729fcf"/>
+          </a:solidFill>
+          <a:ln>
+            <a:solidFill>
+              <a:srgbClr val="3465a4"/>
+            </a:solidFill>
+          </a:ln>
+        </p:spPr>
+        <p:style>
+          <a:lnRef idx="0"/>
+          <a:fillRef idx="0"/>
+          <a:effectRef idx="0"/>
+          <a:fontRef idx="minor"/>
+        </p:style>
+        <p:txBody>
+          <a:bodyPr wrap="none" lIns="90000" rIns="90000" tIns="45000" bIns="45000" anchor="ctr">
+            <a:noAutofit/>
+          </a:bodyPr>
+          <a:p>
+            <a:pPr algn="ctr"/>
+            <a:r>
+              <a:rPr b="0" lang="en-IN" sz="1800" spc="-1" strike="noStrike">
+                <a:latin typeface="Arial"/>
+              </a:rPr>
+              <a:t>Processor</a:t>
+            </a:r>
+            <a:endParaRPr b="0" lang="en-IN" sz="1800" spc="-1" strike="noStrike">
+              <a:latin typeface="Arial"/>
+            </a:endParaRPr>
+          </a:p>
+        </p:txBody>
+      </p:sp>
+      <p:sp>
+        <p:nvSpPr>
+          <p:cNvPr id="629" name="CustomShape 5"/>
+          <p:cNvSpPr/>
+          <p:nvPr/>
+        </p:nvSpPr>
+        <p:spPr>
+          <a:xfrm>
+            <a:off x="288000" y="3456000"/>
+            <a:ext cx="9216000" cy="792000"/>
+          </a:xfrm>
+          <a:custGeom>
+            <a:avLst/>
+            <a:gdLst/>
+            <a:ahLst/>
+            <a:rect l="0" t="0" r="r" b="b"/>
+            <a:pathLst>
+              <a:path w="25602" h="2202">
+                <a:moveTo>
+                  <a:pt x="0" y="1100"/>
+                </a:moveTo>
+                <a:lnTo>
+                  <a:pt x="964" y="0"/>
+                </a:lnTo>
+                <a:lnTo>
+                  <a:pt x="964" y="806"/>
+                </a:lnTo>
+                <a:lnTo>
+                  <a:pt x="24637" y="806"/>
+                </a:lnTo>
+                <a:lnTo>
+                  <a:pt x="24637" y="0"/>
+                </a:lnTo>
+                <a:lnTo>
+                  <a:pt x="25601" y="1100"/>
+                </a:lnTo>
+                <a:lnTo>
+                  <a:pt x="24637" y="2201"/>
+                </a:lnTo>
+                <a:lnTo>
+                  <a:pt x="24637" y="1394"/>
+                </a:lnTo>
+                <a:lnTo>
+                  <a:pt x="964" y="1394"/>
+                </a:lnTo>
+                <a:lnTo>
+                  <a:pt x="964" y="2201"/>
+                </a:lnTo>
+                <a:lnTo>
+                  <a:pt x="0" y="1100"/>
+                </a:lnTo>
+              </a:path>
+            </a:pathLst>
+          </a:custGeom>
+          <a:solidFill>
+            <a:srgbClr val="729fcf"/>
+          </a:solidFill>
+          <a:ln>
+            <a:solidFill>
+              <a:srgbClr val="3465a4"/>
+            </a:solidFill>
+          </a:ln>
+        </p:spPr>
+        <p:style>
+          <a:lnRef idx="0"/>
+          <a:fillRef idx="0"/>
+          <a:effectRef idx="0"/>
+          <a:fontRef idx="minor"/>
+        </p:style>
+      </p:sp>
+      <p:sp>
+        <p:nvSpPr>
+          <p:cNvPr id="630" name="CustomShape 6"/>
+          <p:cNvSpPr/>
+          <p:nvPr/>
+        </p:nvSpPr>
+        <p:spPr>
+          <a:xfrm>
+            <a:off x="1404000" y="2808000"/>
+            <a:ext cx="288000" cy="900000"/>
+          </a:xfrm>
+          <a:custGeom>
+            <a:avLst/>
+            <a:gdLst/>
+            <a:ahLst/>
+            <a:rect l="0" t="0" r="r" b="b"/>
+            <a:pathLst>
+              <a:path w="802" h="2502">
+                <a:moveTo>
+                  <a:pt x="200" y="0"/>
+                </a:moveTo>
+                <a:lnTo>
+                  <a:pt x="200" y="1875"/>
+                </a:lnTo>
+                <a:lnTo>
+                  <a:pt x="0" y="1875"/>
+                </a:lnTo>
+                <a:lnTo>
+                  <a:pt x="400" y="2501"/>
+                </a:lnTo>
+                <a:lnTo>
+                  <a:pt x="801" y="1875"/>
+                </a:lnTo>
+                <a:lnTo>
+                  <a:pt x="600" y="1875"/>
+                </a:lnTo>
+                <a:lnTo>
+                  <a:pt x="600" y="0"/>
+                </a:lnTo>
+                <a:lnTo>
+                  <a:pt x="200" y="0"/>
+                </a:lnTo>
+              </a:path>
+            </a:pathLst>
+          </a:custGeom>
+          <a:solidFill>
+            <a:srgbClr val="729fcf"/>
+          </a:solidFill>
+          <a:ln>
+            <a:solidFill>
+              <a:srgbClr val="3465a4"/>
+            </a:solidFill>
+          </a:ln>
+        </p:spPr>
+        <p:style>
+          <a:lnRef idx="0"/>
+          <a:fillRef idx="0"/>
+          <a:effectRef idx="0"/>
+          <a:fontRef idx="minor"/>
+        </p:style>
+      </p:sp>
+      <p:sp>
+        <p:nvSpPr>
+          <p:cNvPr id="631" name="CustomShape 7"/>
+          <p:cNvSpPr/>
+          <p:nvPr/>
+        </p:nvSpPr>
+        <p:spPr>
+          <a:xfrm>
+            <a:off x="3456000" y="2772000"/>
+            <a:ext cx="288000" cy="936000"/>
+          </a:xfrm>
+          <a:custGeom>
+            <a:avLst/>
+            <a:gdLst/>
+            <a:ahLst/>
+            <a:rect l="0" t="0" r="r" b="b"/>
+            <a:pathLst>
+              <a:path w="802" h="2602">
+                <a:moveTo>
+                  <a:pt x="200" y="2601"/>
+                </a:moveTo>
+                <a:lnTo>
+                  <a:pt x="200" y="650"/>
+                </a:lnTo>
+                <a:lnTo>
+                  <a:pt x="0" y="650"/>
+                </a:lnTo>
+                <a:lnTo>
+                  <a:pt x="400" y="0"/>
+                </a:lnTo>
+                <a:lnTo>
+                  <a:pt x="801" y="650"/>
+                </a:lnTo>
+                <a:lnTo>
+                  <a:pt x="600" y="650"/>
+                </a:lnTo>
+                <a:lnTo>
+                  <a:pt x="600" y="2601"/>
+                </a:lnTo>
+                <a:lnTo>
+                  <a:pt x="200" y="2601"/>
+                </a:lnTo>
+              </a:path>
+            </a:pathLst>
+          </a:custGeom>
+          <a:solidFill>
+            <a:srgbClr val="729fcf"/>
+          </a:solidFill>
+          <a:ln>
+            <a:solidFill>
+              <a:srgbClr val="3465a4"/>
+            </a:solidFill>
+          </a:ln>
+        </p:spPr>
+        <p:style>
+          <a:lnRef idx="0"/>
+          <a:fillRef idx="0"/>
+          <a:effectRef idx="0"/>
+          <a:fontRef idx="minor"/>
+        </p:style>
+      </p:sp>
+      <p:sp>
+        <p:nvSpPr>
+          <p:cNvPr id="632" name="CustomShape 8"/>
+          <p:cNvSpPr/>
+          <p:nvPr/>
+        </p:nvSpPr>
+        <p:spPr>
+          <a:xfrm>
+            <a:off x="5544000" y="2808000"/>
+            <a:ext cx="288000" cy="936000"/>
+          </a:xfrm>
+          <a:custGeom>
+            <a:avLst/>
+            <a:gdLst/>
+            <a:ahLst/>
+            <a:rect l="0" t="0" r="r" b="b"/>
+            <a:pathLst>
+              <a:path w="802" h="2602">
+                <a:moveTo>
+                  <a:pt x="0" y="517"/>
+                </a:moveTo>
+                <a:lnTo>
+                  <a:pt x="400" y="0"/>
+                </a:lnTo>
+                <a:lnTo>
+                  <a:pt x="801" y="517"/>
+                </a:lnTo>
+                <a:lnTo>
+                  <a:pt x="600" y="517"/>
+                </a:lnTo>
+                <a:lnTo>
+                  <a:pt x="600" y="2083"/>
+                </a:lnTo>
+                <a:lnTo>
+                  <a:pt x="801" y="2083"/>
+                </a:lnTo>
+                <a:lnTo>
+                  <a:pt x="400" y="2601"/>
+                </a:lnTo>
+                <a:lnTo>
+                  <a:pt x="0" y="2083"/>
+                </a:lnTo>
+                <a:lnTo>
+                  <a:pt x="200" y="2083"/>
+                </a:lnTo>
+                <a:lnTo>
+                  <a:pt x="200" y="517"/>
+                </a:lnTo>
+                <a:lnTo>
+                  <a:pt x="0" y="517"/>
+                </a:lnTo>
+              </a:path>
+            </a:pathLst>
+          </a:custGeom>
+          <a:solidFill>
+            <a:srgbClr val="729fcf"/>
+          </a:solidFill>
+          <a:ln>
+            <a:solidFill>
+              <a:srgbClr val="3465a4"/>
+            </a:solidFill>
+          </a:ln>
+        </p:spPr>
+        <p:style>
+          <a:lnRef idx="0"/>
+          <a:fillRef idx="0"/>
+          <a:effectRef idx="0"/>
+          <a:fontRef idx="minor"/>
+        </p:style>
+      </p:sp>
+      <p:sp>
+        <p:nvSpPr>
+          <p:cNvPr id="633" name="CustomShape 9"/>
+          <p:cNvSpPr/>
+          <p:nvPr/>
+        </p:nvSpPr>
+        <p:spPr>
+          <a:xfrm>
+            <a:off x="7740360" y="2808360"/>
+            <a:ext cx="288000" cy="936000"/>
+          </a:xfrm>
+          <a:custGeom>
+            <a:avLst/>
+            <a:gdLst/>
+            <a:ahLst/>
+            <a:rect l="0" t="0" r="r" b="b"/>
+            <a:pathLst>
+              <a:path w="802" h="2602">
+                <a:moveTo>
+                  <a:pt x="0" y="517"/>
+                </a:moveTo>
+                <a:lnTo>
+                  <a:pt x="400" y="0"/>
+                </a:lnTo>
+                <a:lnTo>
+                  <a:pt x="801" y="517"/>
+                </a:lnTo>
+                <a:lnTo>
+                  <a:pt x="600" y="517"/>
+                </a:lnTo>
+                <a:lnTo>
+                  <a:pt x="600" y="2083"/>
+                </a:lnTo>
+                <a:lnTo>
+                  <a:pt x="801" y="2083"/>
+                </a:lnTo>
+                <a:lnTo>
+                  <a:pt x="400" y="2601"/>
+                </a:lnTo>
+                <a:lnTo>
+                  <a:pt x="0" y="2083"/>
+                </a:lnTo>
+                <a:lnTo>
+                  <a:pt x="200" y="2083"/>
+                </a:lnTo>
+                <a:lnTo>
+                  <a:pt x="200" y="517"/>
+                </a:lnTo>
+                <a:lnTo>
+                  <a:pt x="0" y="517"/>
+                </a:lnTo>
+              </a:path>
+            </a:pathLst>
+          </a:custGeom>
+          <a:solidFill>
+            <a:srgbClr val="729fcf"/>
+          </a:solidFill>
+          <a:ln>
+            <a:solidFill>
+              <a:srgbClr val="3465a4"/>
+            </a:solidFill>
+          </a:ln>
+        </p:spPr>
+        <p:style>
+          <a:lnRef idx="0"/>
+          <a:fillRef idx="0"/>
+          <a:effectRef idx="0"/>
+          <a:fontRef idx="minor"/>
+        </p:style>
+      </p:sp>
+    </p:spTree>
+  </p:cSld>
+  <mc:AlternateContent>
+    <mc:Choice Requires="p14">
+      <p:transition spd="slow" p14:dur="2000"/>
+    </mc:Choice>
+    <mc:Fallback>
+      <p:transition spd="slow"/>
+    </mc:Fallback>
+  </mc:AlternateContent>
+</p:sld>
+</file>
+
+<file path=ppt/slides/slide32.xml><?xml version="1.0" encoding="utf-8"?>
+<p:sld xmlns:a="http://schemas.openxmlformats.org/drawingml/2006/main" xmlns:p="http://schemas.openxmlformats.org/presentationml/2006/main" xmlns:r="http://schemas.openxmlformats.org/officeDocument/2006/relationships" xmlns:p14="http://schemas.microsoft.com/office/powerpoint/2010/main" xmlns:p15="http://schemas.microsoft.com/office/powerpoint/2012/main" xmlns:mc="http://schemas.openxmlformats.org/markup-compatibility/2006">
+  <p:cSld>
+    <p:spTree>
+      <p:nvGrpSpPr>
+        <p:cNvPr id="1" name=""/>
+        <p:cNvGrpSpPr/>
+        <p:nvPr/>
+      </p:nvGrpSpPr>
+      <p:grpSpPr>
+        <a:xfrm>
+          <a:off x="0" y="0"/>
+          <a:ext cx="0" cy="0"/>
+          <a:chOff x="0" y="0"/>
+          <a:chExt cx="0" cy="0"/>
+        </a:xfrm>
+      </p:grpSpPr>
+      <p:sp>
+        <p:nvSpPr>
+          <p:cNvPr id="634" name="CustomShape 1"/>
+          <p:cNvSpPr/>
+          <p:nvPr/>
+        </p:nvSpPr>
+        <p:spPr>
+          <a:xfrm>
+            <a:off x="864000" y="1152000"/>
+            <a:ext cx="1656000" cy="1152000"/>
+          </a:xfrm>
+          <a:prstGeom prst="rect">
+            <a:avLst/>
+          </a:prstGeom>
+          <a:solidFill>
+            <a:srgbClr val="729fcf"/>
+          </a:solidFill>
+          <a:ln>
+            <a:solidFill>
+              <a:srgbClr val="3465a4"/>
+            </a:solidFill>
+          </a:ln>
+        </p:spPr>
+        <p:style>
+          <a:lnRef idx="0"/>
+          <a:fillRef idx="0"/>
+          <a:effectRef idx="0"/>
+          <a:fontRef idx="minor"/>
+        </p:style>
+        <p:txBody>
+          <a:bodyPr wrap="none" lIns="90000" rIns="90000" tIns="45000" bIns="45000" anchor="ctr">
+            <a:noAutofit/>
+          </a:bodyPr>
+          <a:p>
+            <a:pPr algn="ctr"/>
+            <a:r>
+              <a:rPr b="0" lang="en-IN" sz="1800" spc="-1" strike="noStrike">
+                <a:latin typeface="Arial"/>
+              </a:rPr>
+              <a:t>Processor</a:t>
+            </a:r>
+            <a:endParaRPr b="0" lang="en-IN" sz="1800" spc="-1" strike="noStrike">
+              <a:latin typeface="Arial"/>
+            </a:endParaRPr>
+          </a:p>
+        </p:txBody>
+      </p:sp>
+      <p:sp>
+        <p:nvSpPr>
+          <p:cNvPr id="635" name="CustomShape 2"/>
+          <p:cNvSpPr/>
+          <p:nvPr/>
+        </p:nvSpPr>
+        <p:spPr>
+          <a:xfrm>
+            <a:off x="3420000" y="1152000"/>
+            <a:ext cx="1656000" cy="1152000"/>
+          </a:xfrm>
+          <a:prstGeom prst="rect">
+            <a:avLst/>
+          </a:prstGeom>
+          <a:solidFill>
+            <a:srgbClr val="729fcf"/>
+          </a:solidFill>
+          <a:ln>
+            <a:solidFill>
+              <a:srgbClr val="3465a4"/>
+            </a:solidFill>
+          </a:ln>
+        </p:spPr>
+        <p:style>
+          <a:lnRef idx="0"/>
+          <a:fillRef idx="0"/>
+          <a:effectRef idx="0"/>
+          <a:fontRef idx="minor"/>
+        </p:style>
+        <p:txBody>
+          <a:bodyPr wrap="none" lIns="90000" rIns="90000" tIns="45000" bIns="45000" anchor="ctr">
+            <a:noAutofit/>
+          </a:bodyPr>
+          <a:p>
+            <a:pPr algn="ctr"/>
+            <a:r>
+              <a:rPr b="0" lang="en-IN" sz="1800" spc="-1" strike="noStrike">
+                <a:latin typeface="Arial"/>
+              </a:rPr>
+              <a:t>Memory</a:t>
+            </a:r>
+            <a:endParaRPr b="0" lang="en-IN" sz="1800" spc="-1" strike="noStrike">
+              <a:latin typeface="Arial"/>
+            </a:endParaRPr>
+          </a:p>
+        </p:txBody>
+      </p:sp>
+      <p:sp>
+        <p:nvSpPr>
+          <p:cNvPr id="636" name="CustomShape 3"/>
+          <p:cNvSpPr/>
+          <p:nvPr/>
+        </p:nvSpPr>
+        <p:spPr>
+          <a:xfrm>
+            <a:off x="2304000" y="3996000"/>
+            <a:ext cx="1656000" cy="1152000"/>
+          </a:xfrm>
+          <a:prstGeom prst="rect">
+            <a:avLst/>
+          </a:prstGeom>
+          <a:solidFill>
+            <a:srgbClr val="729fcf"/>
+          </a:solidFill>
+          <a:ln>
+            <a:solidFill>
+              <a:srgbClr val="3465a4"/>
+            </a:solidFill>
+          </a:ln>
+        </p:spPr>
+        <p:style>
+          <a:lnRef idx="0"/>
+          <a:fillRef idx="0"/>
+          <a:effectRef idx="0"/>
+          <a:fontRef idx="minor"/>
+        </p:style>
+        <p:txBody>
+          <a:bodyPr wrap="none" lIns="90000" rIns="90000" tIns="45000" bIns="45000" anchor="ctr">
+            <a:noAutofit/>
+          </a:bodyPr>
+          <a:p>
+            <a:pPr algn="ctr"/>
+            <a:r>
+              <a:rPr b="0" lang="en-IN" sz="1800" spc="-1" strike="noStrike">
+                <a:latin typeface="Arial"/>
+              </a:rPr>
+              <a:t>I/O Processor</a:t>
+            </a:r>
+            <a:endParaRPr b="0" lang="en-IN" sz="1800" spc="-1" strike="noStrike">
+              <a:latin typeface="Arial"/>
+            </a:endParaRPr>
+          </a:p>
+        </p:txBody>
+      </p:sp>
+      <p:sp>
+        <p:nvSpPr>
+          <p:cNvPr id="637" name="CustomShape 4"/>
+          <p:cNvSpPr/>
+          <p:nvPr/>
+        </p:nvSpPr>
+        <p:spPr>
+          <a:xfrm>
+            <a:off x="7308000" y="1440000"/>
+            <a:ext cx="1656000" cy="1152000"/>
+          </a:xfrm>
+          <a:prstGeom prst="rect">
+            <a:avLst/>
+          </a:prstGeom>
+          <a:solidFill>
+            <a:srgbClr val="729fcf"/>
+          </a:solidFill>
+          <a:ln>
+            <a:solidFill>
+              <a:srgbClr val="3465a4"/>
+            </a:solidFill>
+          </a:ln>
+        </p:spPr>
+        <p:style>
+          <a:lnRef idx="0"/>
+          <a:fillRef idx="0"/>
+          <a:effectRef idx="0"/>
+          <a:fontRef idx="minor"/>
+        </p:style>
+        <p:txBody>
+          <a:bodyPr wrap="none" lIns="90000" rIns="90000" tIns="45000" bIns="45000" anchor="ctr">
+            <a:noAutofit/>
+          </a:bodyPr>
+          <a:p>
+            <a:pPr algn="ctr"/>
+            <a:r>
+              <a:rPr b="0" lang="en-IN" sz="1800" spc="-1" strike="noStrike">
+                <a:latin typeface="Arial"/>
+              </a:rPr>
+              <a:t>Output</a:t>
+            </a:r>
+            <a:endParaRPr b="0" lang="en-IN" sz="1800" spc="-1" strike="noStrike">
+              <a:latin typeface="Arial"/>
+            </a:endParaRPr>
+          </a:p>
+        </p:txBody>
+      </p:sp>
+      <p:sp>
+        <p:nvSpPr>
+          <p:cNvPr id="638" name="CustomShape 5"/>
+          <p:cNvSpPr/>
+          <p:nvPr/>
+        </p:nvSpPr>
+        <p:spPr>
+          <a:xfrm>
+            <a:off x="7308000" y="3204000"/>
+            <a:ext cx="1656000" cy="1152000"/>
+          </a:xfrm>
+          <a:prstGeom prst="rect">
+            <a:avLst/>
+          </a:prstGeom>
+          <a:solidFill>
+            <a:srgbClr val="729fcf"/>
+          </a:solidFill>
+          <a:ln>
+            <a:solidFill>
+              <a:srgbClr val="3465a4"/>
+            </a:solidFill>
+          </a:ln>
+        </p:spPr>
+        <p:style>
+          <a:lnRef idx="0"/>
+          <a:fillRef idx="0"/>
+          <a:effectRef idx="0"/>
+          <a:fontRef idx="minor"/>
+        </p:style>
+        <p:txBody>
+          <a:bodyPr wrap="none" lIns="90000" rIns="90000" tIns="45000" bIns="45000" anchor="ctr">
+            <a:noAutofit/>
+          </a:bodyPr>
+          <a:p>
+            <a:pPr algn="ctr"/>
+            <a:r>
+              <a:rPr b="0" lang="en-IN" sz="1800" spc="-1" strike="noStrike">
+                <a:latin typeface="Arial"/>
+              </a:rPr>
+              <a:t>Input</a:t>
+            </a:r>
+            <a:endParaRPr b="0" lang="en-IN" sz="1800" spc="-1" strike="noStrike">
+              <a:latin typeface="Arial"/>
+            </a:endParaRPr>
+          </a:p>
+        </p:txBody>
+      </p:sp>
+      <p:sp>
+        <p:nvSpPr>
+          <p:cNvPr id="639" name="CustomShape 6"/>
+          <p:cNvSpPr/>
+          <p:nvPr/>
+        </p:nvSpPr>
+        <p:spPr>
+          <a:xfrm>
+            <a:off x="6444000" y="1008000"/>
+            <a:ext cx="504000" cy="4248000"/>
+          </a:xfrm>
+          <a:custGeom>
+            <a:avLst/>
+            <a:gdLst/>
+            <a:ahLst/>
+            <a:rect l="0" t="0" r="r" b="b"/>
+            <a:pathLst>
+              <a:path w="1401" h="11801">
+                <a:moveTo>
+                  <a:pt x="0" y="1264"/>
+                </a:moveTo>
+                <a:lnTo>
+                  <a:pt x="700" y="0"/>
+                </a:lnTo>
+                <a:lnTo>
+                  <a:pt x="1400" y="1264"/>
+                </a:lnTo>
+                <a:lnTo>
+                  <a:pt x="940" y="1264"/>
+                </a:lnTo>
+                <a:lnTo>
+                  <a:pt x="940" y="10537"/>
+                </a:lnTo>
+                <a:lnTo>
+                  <a:pt x="1400" y="10537"/>
+                </a:lnTo>
+                <a:lnTo>
+                  <a:pt x="700" y="11800"/>
+                </a:lnTo>
+                <a:lnTo>
+                  <a:pt x="0" y="10537"/>
+                </a:lnTo>
+                <a:lnTo>
+                  <a:pt x="460" y="10537"/>
+                </a:lnTo>
+                <a:lnTo>
+                  <a:pt x="460" y="1264"/>
+                </a:lnTo>
+                <a:lnTo>
+                  <a:pt x="0" y="1264"/>
+                </a:lnTo>
+              </a:path>
+            </a:pathLst>
+          </a:custGeom>
+          <a:solidFill>
+            <a:srgbClr val="729fcf"/>
+          </a:solidFill>
+          <a:ln>
+            <a:solidFill>
+              <a:srgbClr val="3465a4"/>
+            </a:solidFill>
+          </a:ln>
+        </p:spPr>
+        <p:style>
+          <a:lnRef idx="0"/>
+          <a:fillRef idx="0"/>
+          <a:effectRef idx="0"/>
+          <a:fontRef idx="minor"/>
+        </p:style>
+      </p:sp>
+      <p:sp>
+        <p:nvSpPr>
+          <p:cNvPr id="640" name="CustomShape 7"/>
+          <p:cNvSpPr/>
+          <p:nvPr/>
+        </p:nvSpPr>
+        <p:spPr>
+          <a:xfrm>
+            <a:off x="3996000" y="4104000"/>
+            <a:ext cx="2592000" cy="720000"/>
+          </a:xfrm>
+          <a:custGeom>
+            <a:avLst/>
+            <a:gdLst/>
+            <a:ahLst/>
+            <a:rect l="0" t="0" r="r" b="b"/>
+            <a:pathLst>
+              <a:path w="7202" h="2002">
+                <a:moveTo>
+                  <a:pt x="0" y="1000"/>
+                </a:moveTo>
+                <a:lnTo>
+                  <a:pt x="810" y="0"/>
+                </a:lnTo>
+                <a:lnTo>
+                  <a:pt x="810" y="678"/>
+                </a:lnTo>
+                <a:lnTo>
+                  <a:pt x="6391" y="678"/>
+                </a:lnTo>
+                <a:lnTo>
+                  <a:pt x="6391" y="0"/>
+                </a:lnTo>
+                <a:lnTo>
+                  <a:pt x="7201" y="1000"/>
+                </a:lnTo>
+                <a:lnTo>
+                  <a:pt x="6391" y="2001"/>
+                </a:lnTo>
+                <a:lnTo>
+                  <a:pt x="6391" y="1323"/>
+                </a:lnTo>
+                <a:lnTo>
+                  <a:pt x="810" y="1323"/>
+                </a:lnTo>
+                <a:lnTo>
+                  <a:pt x="810" y="2001"/>
+                </a:lnTo>
+                <a:lnTo>
+                  <a:pt x="0" y="1000"/>
+                </a:lnTo>
+              </a:path>
+            </a:pathLst>
+          </a:custGeom>
+          <a:solidFill>
+            <a:srgbClr val="729fcf"/>
+          </a:solidFill>
+          <a:ln>
+            <a:solidFill>
+              <a:srgbClr val="3465a4"/>
+            </a:solidFill>
+          </a:ln>
+        </p:spPr>
+        <p:style>
+          <a:lnRef idx="0"/>
+          <a:fillRef idx="0"/>
+          <a:effectRef idx="0"/>
+          <a:fontRef idx="minor"/>
+        </p:style>
+      </p:sp>
+      <p:sp>
+        <p:nvSpPr>
+          <p:cNvPr id="641" name="CustomShape 8"/>
+          <p:cNvSpPr/>
+          <p:nvPr/>
+        </p:nvSpPr>
+        <p:spPr>
+          <a:xfrm>
+            <a:off x="288000" y="2952000"/>
+            <a:ext cx="5184000" cy="360000"/>
+          </a:xfrm>
+          <a:custGeom>
+            <a:avLst/>
+            <a:gdLst/>
+            <a:ahLst/>
+            <a:rect l="0" t="0" r="r" b="b"/>
+            <a:pathLst>
+              <a:path w="14402" h="1002">
+                <a:moveTo>
+                  <a:pt x="0" y="500"/>
+                </a:moveTo>
+                <a:lnTo>
+                  <a:pt x="1002" y="0"/>
+                </a:lnTo>
+                <a:lnTo>
+                  <a:pt x="1002" y="274"/>
+                </a:lnTo>
+                <a:lnTo>
+                  <a:pt x="13399" y="274"/>
+                </a:lnTo>
+                <a:lnTo>
+                  <a:pt x="13399" y="0"/>
+                </a:lnTo>
+                <a:lnTo>
+                  <a:pt x="14401" y="500"/>
+                </a:lnTo>
+                <a:lnTo>
+                  <a:pt x="13399" y="1001"/>
+                </a:lnTo>
+                <a:lnTo>
+                  <a:pt x="13399" y="727"/>
+                </a:lnTo>
+                <a:lnTo>
+                  <a:pt x="1002" y="727"/>
+                </a:lnTo>
+                <a:lnTo>
+                  <a:pt x="1002" y="1001"/>
+                </a:lnTo>
+                <a:lnTo>
+                  <a:pt x="0" y="500"/>
+                </a:lnTo>
+              </a:path>
+            </a:pathLst>
+          </a:custGeom>
+          <a:solidFill>
+            <a:srgbClr val="729fcf"/>
+          </a:solidFill>
+          <a:ln>
+            <a:solidFill>
+              <a:srgbClr val="3465a4"/>
+            </a:solidFill>
+          </a:ln>
+        </p:spPr>
+        <p:style>
+          <a:lnRef idx="0"/>
+          <a:fillRef idx="0"/>
+          <a:effectRef idx="0"/>
+          <a:fontRef idx="minor"/>
+        </p:style>
+      </p:sp>
+      <p:sp>
+        <p:nvSpPr>
+          <p:cNvPr id="642" name="CustomShape 9"/>
+          <p:cNvSpPr/>
+          <p:nvPr/>
+        </p:nvSpPr>
+        <p:spPr>
+          <a:xfrm>
+            <a:off x="6804000" y="1944000"/>
+            <a:ext cx="468000" cy="216000"/>
+          </a:xfrm>
+          <a:custGeom>
+            <a:avLst/>
+            <a:gdLst/>
+            <a:ahLst/>
+            <a:rect l="0" t="0" r="r" b="b"/>
+            <a:pathLst>
+              <a:path w="1302" h="602">
+                <a:moveTo>
+                  <a:pt x="0" y="150"/>
+                </a:moveTo>
+                <a:lnTo>
+                  <a:pt x="975" y="150"/>
+                </a:lnTo>
+                <a:lnTo>
+                  <a:pt x="975" y="0"/>
+                </a:lnTo>
+                <a:lnTo>
+                  <a:pt x="1301" y="300"/>
+                </a:lnTo>
+                <a:lnTo>
+                  <a:pt x="975" y="601"/>
+                </a:lnTo>
+                <a:lnTo>
+                  <a:pt x="975" y="450"/>
+                </a:lnTo>
+                <a:lnTo>
+                  <a:pt x="0" y="450"/>
+                </a:lnTo>
+                <a:lnTo>
+                  <a:pt x="0" y="150"/>
+                </a:lnTo>
+              </a:path>
+            </a:pathLst>
+          </a:custGeom>
+          <a:solidFill>
+            <a:srgbClr val="729fcf"/>
+          </a:solidFill>
+          <a:ln>
+            <a:solidFill>
+              <a:srgbClr val="3465a4"/>
+            </a:solidFill>
+          </a:ln>
+        </p:spPr>
+        <p:style>
+          <a:lnRef idx="0"/>
+          <a:fillRef idx="0"/>
+          <a:effectRef idx="0"/>
+          <a:fontRef idx="minor"/>
+        </p:style>
+      </p:sp>
+      <p:sp>
+        <p:nvSpPr>
+          <p:cNvPr id="643" name="CustomShape 10"/>
+          <p:cNvSpPr/>
+          <p:nvPr/>
+        </p:nvSpPr>
+        <p:spPr>
+          <a:xfrm>
+            <a:off x="6804000" y="3708000"/>
+            <a:ext cx="468000" cy="216000"/>
+          </a:xfrm>
+          <a:custGeom>
+            <a:avLst/>
+            <a:gdLst/>
+            <a:ahLst/>
+            <a:rect l="0" t="0" r="r" b="b"/>
+            <a:pathLst>
+              <a:path w="1302" h="602">
+                <a:moveTo>
+                  <a:pt x="1301" y="150"/>
+                </a:moveTo>
+                <a:lnTo>
+                  <a:pt x="325" y="150"/>
+                </a:lnTo>
+                <a:lnTo>
+                  <a:pt x="325" y="0"/>
+                </a:lnTo>
+                <a:lnTo>
+                  <a:pt x="0" y="300"/>
+                </a:lnTo>
+                <a:lnTo>
+                  <a:pt x="325" y="601"/>
+                </a:lnTo>
+                <a:lnTo>
+                  <a:pt x="325" y="450"/>
+                </a:lnTo>
+                <a:lnTo>
+                  <a:pt x="1301" y="450"/>
+                </a:lnTo>
+                <a:lnTo>
+                  <a:pt x="1301" y="150"/>
+                </a:lnTo>
+              </a:path>
+            </a:pathLst>
+          </a:custGeom>
+          <a:solidFill>
+            <a:srgbClr val="729fcf"/>
+          </a:solidFill>
+          <a:ln>
+            <a:solidFill>
+              <a:srgbClr val="3465a4"/>
+            </a:solidFill>
+          </a:ln>
+        </p:spPr>
+        <p:style>
+          <a:lnRef idx="0"/>
+          <a:fillRef idx="0"/>
+          <a:effectRef idx="0"/>
+          <a:fontRef idx="minor"/>
+        </p:style>
+      </p:sp>
+      <p:sp>
+        <p:nvSpPr>
+          <p:cNvPr id="644" name="CustomShape 11"/>
+          <p:cNvSpPr/>
+          <p:nvPr/>
+        </p:nvSpPr>
+        <p:spPr>
+          <a:xfrm>
+            <a:off x="4068000" y="2304000"/>
+            <a:ext cx="288000" cy="720000"/>
+          </a:xfrm>
+          <a:custGeom>
+            <a:avLst/>
+            <a:gdLst/>
+            <a:ahLst/>
+            <a:rect l="0" t="0" r="r" b="b"/>
+            <a:pathLst>
+              <a:path w="802" h="2002">
+                <a:moveTo>
+                  <a:pt x="0" y="398"/>
+                </a:moveTo>
+                <a:lnTo>
+                  <a:pt x="400" y="0"/>
+                </a:lnTo>
+                <a:lnTo>
+                  <a:pt x="801" y="398"/>
+                </a:lnTo>
+                <a:lnTo>
+                  <a:pt x="600" y="398"/>
+                </a:lnTo>
+                <a:lnTo>
+                  <a:pt x="600" y="1602"/>
+                </a:lnTo>
+                <a:lnTo>
+                  <a:pt x="801" y="1602"/>
+                </a:lnTo>
+                <a:lnTo>
+                  <a:pt x="400" y="2001"/>
+                </a:lnTo>
+                <a:lnTo>
+                  <a:pt x="0" y="1602"/>
+                </a:lnTo>
+                <a:lnTo>
+                  <a:pt x="200" y="1602"/>
+                </a:lnTo>
+                <a:lnTo>
+                  <a:pt x="200" y="398"/>
+                </a:lnTo>
+                <a:lnTo>
+                  <a:pt x="0" y="398"/>
+                </a:lnTo>
+              </a:path>
+            </a:pathLst>
+          </a:custGeom>
+          <a:solidFill>
+            <a:srgbClr val="729fcf"/>
+          </a:solidFill>
+          <a:ln>
+            <a:solidFill>
+              <a:srgbClr val="3465a4"/>
+            </a:solidFill>
+          </a:ln>
+        </p:spPr>
+        <p:style>
+          <a:lnRef idx="0"/>
+          <a:fillRef idx="0"/>
+          <a:effectRef idx="0"/>
+          <a:fontRef idx="minor"/>
+        </p:style>
+      </p:sp>
+      <p:sp>
+        <p:nvSpPr>
+          <p:cNvPr id="645" name="CustomShape 12"/>
+          <p:cNvSpPr/>
+          <p:nvPr/>
+        </p:nvSpPr>
+        <p:spPr>
+          <a:xfrm>
+            <a:off x="1476360" y="2304360"/>
+            <a:ext cx="288000" cy="720000"/>
+          </a:xfrm>
+          <a:custGeom>
+            <a:avLst/>
+            <a:gdLst/>
+            <a:ahLst/>
+            <a:rect l="0" t="0" r="r" b="b"/>
+            <a:pathLst>
+              <a:path w="802" h="2002">
+                <a:moveTo>
+                  <a:pt x="0" y="398"/>
+                </a:moveTo>
+                <a:lnTo>
+                  <a:pt x="400" y="0"/>
+                </a:lnTo>
+                <a:lnTo>
+                  <a:pt x="801" y="398"/>
+                </a:lnTo>
+                <a:lnTo>
+                  <a:pt x="600" y="398"/>
+                </a:lnTo>
+                <a:lnTo>
+                  <a:pt x="600" y="1602"/>
+                </a:lnTo>
+                <a:lnTo>
+                  <a:pt x="801" y="1602"/>
+                </a:lnTo>
+                <a:lnTo>
+                  <a:pt x="400" y="2001"/>
+                </a:lnTo>
+                <a:lnTo>
+                  <a:pt x="0" y="1602"/>
+                </a:lnTo>
+                <a:lnTo>
+                  <a:pt x="200" y="1602"/>
+                </a:lnTo>
+                <a:lnTo>
+                  <a:pt x="200" y="398"/>
+                </a:lnTo>
+                <a:lnTo>
+                  <a:pt x="0" y="398"/>
+                </a:lnTo>
+              </a:path>
+            </a:pathLst>
+          </a:custGeom>
+          <a:solidFill>
+            <a:srgbClr val="729fcf"/>
+          </a:solidFill>
+          <a:ln>
+            <a:solidFill>
+              <a:srgbClr val="3465a4"/>
+            </a:solidFill>
+          </a:ln>
+        </p:spPr>
+        <p:style>
+          <a:lnRef idx="0"/>
+          <a:fillRef idx="0"/>
+          <a:effectRef idx="0"/>
+          <a:fontRef idx="minor"/>
+        </p:style>
+      </p:sp>
+      <p:sp>
+        <p:nvSpPr>
+          <p:cNvPr id="646" name="CustomShape 13"/>
+          <p:cNvSpPr/>
+          <p:nvPr/>
+        </p:nvSpPr>
+        <p:spPr>
+          <a:xfrm>
+            <a:off x="2952360" y="3240360"/>
+            <a:ext cx="288000" cy="720000"/>
+          </a:xfrm>
+          <a:custGeom>
+            <a:avLst/>
+            <a:gdLst/>
+            <a:ahLst/>
+            <a:rect l="0" t="0" r="r" b="b"/>
+            <a:pathLst>
+              <a:path w="802" h="2002">
+                <a:moveTo>
+                  <a:pt x="0" y="398"/>
+                </a:moveTo>
+                <a:lnTo>
+                  <a:pt x="400" y="0"/>
+                </a:lnTo>
+                <a:lnTo>
+                  <a:pt x="801" y="398"/>
+                </a:lnTo>
+                <a:lnTo>
+                  <a:pt x="600" y="398"/>
+                </a:lnTo>
+                <a:lnTo>
+                  <a:pt x="600" y="1602"/>
+                </a:lnTo>
+                <a:lnTo>
+                  <a:pt x="801" y="1602"/>
+                </a:lnTo>
+                <a:lnTo>
+                  <a:pt x="400" y="2001"/>
+                </a:lnTo>
+                <a:lnTo>
+                  <a:pt x="0" y="1602"/>
+                </a:lnTo>
+                <a:lnTo>
+                  <a:pt x="200" y="1602"/>
+                </a:lnTo>
+                <a:lnTo>
+                  <a:pt x="200" y="398"/>
+                </a:lnTo>
+                <a:lnTo>
+                  <a:pt x="0" y="398"/>
+                </a:lnTo>
+              </a:path>
+            </a:pathLst>
+          </a:custGeom>
+          <a:solidFill>
+            <a:srgbClr val="729fcf"/>
+          </a:solidFill>
+          <a:ln>
+            <a:solidFill>
+              <a:srgbClr val="3465a4"/>
+            </a:solidFill>
+          </a:ln>
+        </p:spPr>
+        <p:style>
+          <a:lnRef idx="0"/>
+          <a:fillRef idx="0"/>
+          <a:effectRef idx="0"/>
+          <a:fontRef idx="minor"/>
+        </p:style>
+      </p:sp>
+    </p:spTree>
+  </p:cSld>
+  <mc:AlternateContent>
+    <mc:Choice Requires="p14">
+      <p:transition spd="slow" p14:dur="2000"/>
+    </mc:Choice>
+    <mc:Fallback>
+      <p:transition spd="slow"/>
+    </mc:Fallback>
+  </mc:AlternateContent>
+</p:sld>
+</file>
+
+<file path=ppt/slides/slide33.xml><?xml version="1.0" encoding="utf-8"?>
+<p:sld xmlns:a="http://schemas.openxmlformats.org/drawingml/2006/main" xmlns:p="http://schemas.openxmlformats.org/presentationml/2006/main" xmlns:r="http://schemas.openxmlformats.org/officeDocument/2006/relationships" xmlns:p14="http://schemas.microsoft.com/office/powerpoint/2010/main" xmlns:p15="http://schemas.microsoft.com/office/powerpoint/2012/main" xmlns:mc="http://schemas.openxmlformats.org/markup-compatibility/2006">
+  <p:cSld>
+    <p:spTree>
+      <p:nvGrpSpPr>
+        <p:cNvPr id="1" name=""/>
+        <p:cNvGrpSpPr/>
+        <p:nvPr/>
+      </p:nvGrpSpPr>
+      <p:grpSpPr>
+        <a:xfrm>
+          <a:off x="0" y="0"/>
+          <a:ext cx="0" cy="0"/>
+          <a:chOff x="0" y="0"/>
+          <a:chExt cx="0" cy="0"/>
+        </a:xfrm>
+      </p:grpSpPr>
+      <p:sp>
+        <p:nvSpPr>
+          <p:cNvPr id="647" name="CustomShape 1"/>
+          <p:cNvSpPr/>
+          <p:nvPr/>
+        </p:nvSpPr>
+        <p:spPr>
+          <a:xfrm>
+            <a:off x="4392000" y="648000"/>
+            <a:ext cx="504000" cy="4680000"/>
+          </a:xfrm>
+          <a:custGeom>
+            <a:avLst/>
+            <a:gdLst/>
+            <a:ahLst/>
+            <a:rect l="0" t="0" r="r" b="b"/>
+            <a:pathLst>
+              <a:path w="1401" h="13002">
+                <a:moveTo>
+                  <a:pt x="0" y="1392"/>
+                </a:moveTo>
+                <a:lnTo>
+                  <a:pt x="700" y="0"/>
+                </a:lnTo>
+                <a:lnTo>
+                  <a:pt x="1400" y="1392"/>
+                </a:lnTo>
+                <a:lnTo>
+                  <a:pt x="940" y="1392"/>
+                </a:lnTo>
+                <a:lnTo>
+                  <a:pt x="940" y="11608"/>
+                </a:lnTo>
+                <a:lnTo>
+                  <a:pt x="1400" y="11608"/>
+                </a:lnTo>
+                <a:lnTo>
+                  <a:pt x="700" y="13001"/>
+                </a:lnTo>
+                <a:lnTo>
+                  <a:pt x="0" y="11608"/>
+                </a:lnTo>
+                <a:lnTo>
+                  <a:pt x="460" y="11608"/>
+                </a:lnTo>
+                <a:lnTo>
+                  <a:pt x="460" y="1392"/>
+                </a:lnTo>
+                <a:lnTo>
+                  <a:pt x="0" y="1392"/>
+                </a:lnTo>
+              </a:path>
+            </a:pathLst>
+          </a:custGeom>
+          <a:solidFill>
+            <a:srgbClr val="729fcf"/>
+          </a:solidFill>
+          <a:ln>
+            <a:solidFill>
+              <a:srgbClr val="3465a4"/>
+            </a:solidFill>
+          </a:ln>
+        </p:spPr>
+        <p:style>
+          <a:lnRef idx="0"/>
+          <a:fillRef idx="0"/>
+          <a:effectRef idx="0"/>
+          <a:fontRef idx="minor"/>
+        </p:style>
       </p:sp>
     </p:spTree>
   </p:cSld>
@@ -31091,7 +32738,7 @@
         <p:spPr>
           <a:xfrm>
             <a:off x="504000" y="576000"/>
-            <a:ext cx="424800" cy="1648800"/>
+            <a:ext cx="424440" cy="1648440"/>
           </a:xfrm>
           <a:prstGeom prst="ellipse">
             <a:avLst/>
@@ -31121,7 +32768,7 @@
         <p:spPr>
           <a:xfrm>
             <a:off x="1440360" y="576360"/>
-            <a:ext cx="424800" cy="1648800"/>
+            <a:ext cx="424440" cy="1648440"/>
           </a:xfrm>
           <a:prstGeom prst="ellipse">
             <a:avLst/>
@@ -31151,7 +32798,7 @@
         <p:spPr>
           <a:xfrm>
             <a:off x="3204720" y="612720"/>
-            <a:ext cx="424800" cy="1648800"/>
+            <a:ext cx="424440" cy="1648440"/>
           </a:xfrm>
           <a:prstGeom prst="ellipse">
             <a:avLst/>
@@ -31181,7 +32828,7 @@
         <p:spPr>
           <a:xfrm>
             <a:off x="4068720" y="576720"/>
-            <a:ext cx="424800" cy="1648800"/>
+            <a:ext cx="424440" cy="1648440"/>
           </a:xfrm>
           <a:prstGeom prst="ellipse">
             <a:avLst/>
@@ -31211,7 +32858,7 @@
         <p:spPr>
           <a:xfrm>
             <a:off x="504720" y="3204720"/>
-            <a:ext cx="424800" cy="1648800"/>
+            <a:ext cx="424440" cy="1648440"/>
           </a:xfrm>
           <a:prstGeom prst="ellipse">
             <a:avLst/>
@@ -31241,7 +32888,7 @@
         <p:spPr>
           <a:xfrm>
             <a:off x="1440720" y="3168720"/>
-            <a:ext cx="424800" cy="1648800"/>
+            <a:ext cx="424440" cy="1648440"/>
           </a:xfrm>
           <a:prstGeom prst="ellipse">
             <a:avLst/>
@@ -31271,7 +32918,7 @@
         <p:spPr>
           <a:xfrm>
             <a:off x="3240720" y="3168720"/>
-            <a:ext cx="424800" cy="1648800"/>
+            <a:ext cx="424440" cy="1648440"/>
           </a:xfrm>
           <a:prstGeom prst="ellipse">
             <a:avLst/>
@@ -31301,7 +32948,7 @@
         <p:spPr>
           <a:xfrm>
             <a:off x="4068720" y="3168720"/>
-            <a:ext cx="424800" cy="1648800"/>
+            <a:ext cx="424440" cy="1648440"/>
           </a:xfrm>
           <a:prstGeom prst="ellipse">
             <a:avLst/>
@@ -31331,7 +32978,7 @@
         <p:spPr>
           <a:xfrm>
             <a:off x="540000" y="936000"/>
-            <a:ext cx="496800" cy="339120"/>
+            <a:ext cx="496440" cy="338760"/>
           </a:xfrm>
           <a:prstGeom prst="rect">
             <a:avLst/>
@@ -31382,7 +33029,7 @@
         <p:spPr>
           <a:xfrm>
             <a:off x="540000" y="1512000"/>
-            <a:ext cx="496800" cy="339120"/>
+            <a:ext cx="496440" cy="338760"/>
           </a:xfrm>
           <a:prstGeom prst="rect">
             <a:avLst/>
@@ -31433,7 +33080,7 @@
         <p:spPr>
           <a:xfrm>
             <a:off x="1512000" y="1512000"/>
-            <a:ext cx="496800" cy="339120"/>
+            <a:ext cx="496440" cy="338760"/>
           </a:xfrm>
           <a:prstGeom prst="rect">
             <a:avLst/>
@@ -31484,7 +33131,7 @@
         <p:spPr>
           <a:xfrm>
             <a:off x="1512000" y="900000"/>
-            <a:ext cx="496800" cy="339120"/>
+            <a:ext cx="496440" cy="338760"/>
           </a:xfrm>
           <a:prstGeom prst="rect">
             <a:avLst/>
@@ -31535,7 +33182,7 @@
         <p:spPr>
           <a:xfrm>
             <a:off x="540000" y="1260000"/>
-            <a:ext cx="496800" cy="339120"/>
+            <a:ext cx="496440" cy="338760"/>
           </a:xfrm>
           <a:prstGeom prst="rect">
             <a:avLst/>
@@ -31586,7 +33233,7 @@
         <p:spPr>
           <a:xfrm>
             <a:off x="1512000" y="1224000"/>
-            <a:ext cx="496800" cy="339120"/>
+            <a:ext cx="496440" cy="338760"/>
           </a:xfrm>
           <a:prstGeom prst="rect">
             <a:avLst/>
@@ -31637,7 +33284,7 @@
         <p:spPr>
           <a:xfrm>
             <a:off x="3240000" y="900000"/>
-            <a:ext cx="496800" cy="339120"/>
+            <a:ext cx="496440" cy="338760"/>
           </a:xfrm>
           <a:prstGeom prst="rect">
             <a:avLst/>
@@ -31688,7 +33335,7 @@
         <p:spPr>
           <a:xfrm>
             <a:off x="4104000" y="900000"/>
-            <a:ext cx="496800" cy="339120"/>
+            <a:ext cx="496440" cy="338760"/>
           </a:xfrm>
           <a:prstGeom prst="rect">
             <a:avLst/>
@@ -31739,7 +33386,7 @@
         <p:spPr>
           <a:xfrm>
             <a:off x="4104000" y="1224000"/>
-            <a:ext cx="496800" cy="339120"/>
+            <a:ext cx="496440" cy="338760"/>
           </a:xfrm>
           <a:prstGeom prst="rect">
             <a:avLst/>
@@ -31790,7 +33437,7 @@
         <p:spPr>
           <a:xfrm>
             <a:off x="4104000" y="1620000"/>
-            <a:ext cx="496800" cy="339120"/>
+            <a:ext cx="496440" cy="338760"/>
           </a:xfrm>
           <a:prstGeom prst="rect">
             <a:avLst/>
@@ -31841,7 +33488,7 @@
         <p:spPr>
           <a:xfrm>
             <a:off x="576000" y="3492000"/>
-            <a:ext cx="496800" cy="339120"/>
+            <a:ext cx="496440" cy="338760"/>
           </a:xfrm>
           <a:prstGeom prst="rect">
             <a:avLst/>
@@ -31892,7 +33539,7 @@
         <p:spPr>
           <a:xfrm>
             <a:off x="576000" y="3852000"/>
-            <a:ext cx="496800" cy="339120"/>
+            <a:ext cx="496440" cy="338760"/>
           </a:xfrm>
           <a:prstGeom prst="rect">
             <a:avLst/>
@@ -31943,7 +33590,7 @@
         <p:spPr>
           <a:xfrm>
             <a:off x="576000" y="4176000"/>
-            <a:ext cx="496800" cy="339120"/>
+            <a:ext cx="496440" cy="338760"/>
           </a:xfrm>
           <a:prstGeom prst="rect">
             <a:avLst/>
@@ -31994,7 +33641,7 @@
         <p:spPr>
           <a:xfrm>
             <a:off x="1476000" y="3492000"/>
-            <a:ext cx="496800" cy="339120"/>
+            <a:ext cx="496440" cy="338760"/>
           </a:xfrm>
           <a:prstGeom prst="rect">
             <a:avLst/>
@@ -32045,7 +33692,7 @@
         <p:spPr>
           <a:xfrm>
             <a:off x="3240000" y="3492000"/>
-            <a:ext cx="496800" cy="339120"/>
+            <a:ext cx="496440" cy="338760"/>
           </a:xfrm>
           <a:prstGeom prst="rect">
             <a:avLst/>
@@ -32096,7 +33743,7 @@
         <p:spPr>
           <a:xfrm>
             <a:off x="3276000" y="3960000"/>
-            <a:ext cx="496800" cy="339120"/>
+            <a:ext cx="496440" cy="338760"/>
           </a:xfrm>
           <a:prstGeom prst="rect">
             <a:avLst/>
@@ -32147,7 +33794,7 @@
         <p:spPr>
           <a:xfrm>
             <a:off x="4140000" y="3492000"/>
-            <a:ext cx="496800" cy="339120"/>
+            <a:ext cx="496440" cy="338760"/>
           </a:xfrm>
           <a:prstGeom prst="rect">
             <a:avLst/>
@@ -32198,7 +33845,7 @@
         <p:spPr>
           <a:xfrm>
             <a:off x="4140000" y="3924000"/>
-            <a:ext cx="496800" cy="339120"/>
+            <a:ext cx="496440" cy="338760"/>
           </a:xfrm>
           <a:prstGeom prst="rect">
             <a:avLst/>
@@ -32546,7 +34193,7 @@
         <p:spPr>
           <a:xfrm>
             <a:off x="540000" y="2412000"/>
-            <a:ext cx="1288800" cy="339120"/>
+            <a:ext cx="1288440" cy="338760"/>
           </a:xfrm>
           <a:prstGeom prst="rect">
             <a:avLst/>
@@ -32597,7 +34244,7 @@
         <p:spPr>
           <a:xfrm>
             <a:off x="3168000" y="2412000"/>
-            <a:ext cx="1432800" cy="388800"/>
+            <a:ext cx="1432440" cy="388440"/>
           </a:xfrm>
           <a:prstGeom prst="rect">
             <a:avLst/>
@@ -32648,7 +34295,7 @@
         <p:spPr>
           <a:xfrm>
             <a:off x="3168000" y="4968000"/>
-            <a:ext cx="1576800" cy="352800"/>
+            <a:ext cx="1576440" cy="352440"/>
           </a:xfrm>
           <a:prstGeom prst="rect">
             <a:avLst/>
@@ -32699,7 +34346,7 @@
         <p:spPr>
           <a:xfrm>
             <a:off x="504000" y="4968000"/>
-            <a:ext cx="1432800" cy="352800"/>
+            <a:ext cx="1432440" cy="352440"/>
           </a:xfrm>
           <a:prstGeom prst="rect">
             <a:avLst/>
@@ -32780,7 +34427,7 @@
         <p:spPr>
           <a:xfrm>
             <a:off x="1872000" y="1008000"/>
-            <a:ext cx="2081160" cy="785160"/>
+            <a:ext cx="2080800" cy="784800"/>
           </a:xfrm>
           <a:prstGeom prst="rect">
             <a:avLst/>
@@ -32810,7 +34457,7 @@
         <p:spPr>
           <a:xfrm>
             <a:off x="5328000" y="756000"/>
-            <a:ext cx="1649160" cy="1217160"/>
+            <a:ext cx="1648800" cy="1216800"/>
           </a:xfrm>
           <a:custGeom>
             <a:avLst/>
@@ -32863,7 +34510,7 @@
         <p:spPr>
           <a:xfrm>
             <a:off x="1872360" y="3672360"/>
-            <a:ext cx="2081160" cy="785160"/>
+            <a:ext cx="2080800" cy="784800"/>
           </a:xfrm>
           <a:prstGeom prst="rect">
             <a:avLst/>
@@ -32893,7 +34540,7 @@
         <p:spPr>
           <a:xfrm>
             <a:off x="5328360" y="3420360"/>
-            <a:ext cx="1649160" cy="1217160"/>
+            <a:ext cx="1648800" cy="1216800"/>
           </a:xfrm>
           <a:custGeom>
             <a:avLst/>
@@ -33001,7 +34648,7 @@
         <p:spPr>
           <a:xfrm>
             <a:off x="1188000" y="2304000"/>
-            <a:ext cx="6905160" cy="339480"/>
+            <a:ext cx="6904800" cy="339120"/>
           </a:xfrm>
           <a:prstGeom prst="rect">
             <a:avLst/>
@@ -33052,7 +34699,7 @@
         <p:spPr>
           <a:xfrm>
             <a:off x="1080000" y="4788000"/>
-            <a:ext cx="7157160" cy="595440"/>
+            <a:ext cx="7156800" cy="595080"/>
           </a:xfrm>
           <a:prstGeom prst="rect">
             <a:avLst/>
@@ -33133,7 +34780,7 @@
         <p:spPr>
           <a:xfrm>
             <a:off x="1908000" y="2232000"/>
-            <a:ext cx="1432440" cy="784440"/>
+            <a:ext cx="1432080" cy="784080"/>
           </a:xfrm>
           <a:prstGeom prst="rect">
             <a:avLst/>
@@ -33188,7 +34835,7 @@
         <p:spPr>
           <a:xfrm>
             <a:off x="6084000" y="2232000"/>
-            <a:ext cx="1432440" cy="784440"/>
+            <a:ext cx="1432080" cy="784080"/>
           </a:xfrm>
           <a:prstGeom prst="rect">
             <a:avLst/>
@@ -33243,7 +34890,7 @@
         <p:spPr>
           <a:xfrm>
             <a:off x="4032000" y="1944000"/>
-            <a:ext cx="1432440" cy="1360440"/>
+            <a:ext cx="1432080" cy="1360080"/>
           </a:xfrm>
           <a:custGeom>
             <a:avLst/>
@@ -33450,7 +35097,7 @@
         <p:spPr>
           <a:xfrm>
             <a:off x="2592000" y="3636000"/>
-            <a:ext cx="7121160" cy="595440"/>
+            <a:ext cx="7120800" cy="595080"/>
           </a:xfrm>
           <a:prstGeom prst="rect">
             <a:avLst/>
@@ -33551,7 +35198,7 @@
         <p:spPr>
           <a:xfrm>
             <a:off x="5934960" y="2130480"/>
-            <a:ext cx="1690920" cy="1001880"/>
+            <a:ext cx="1690560" cy="1001520"/>
           </a:xfrm>
           <a:prstGeom prst="rect">
             <a:avLst/>
@@ -33581,7 +35228,7 @@
         <p:spPr>
           <a:xfrm>
             <a:off x="1908000" y="2232000"/>
-            <a:ext cx="1432440" cy="784440"/>
+            <a:ext cx="1432080" cy="784080"/>
           </a:xfrm>
           <a:prstGeom prst="rect">
             <a:avLst/>
@@ -33636,7 +35283,7 @@
         <p:spPr>
           <a:xfrm>
             <a:off x="6084000" y="2232000"/>
-            <a:ext cx="1432440" cy="784440"/>
+            <a:ext cx="1432080" cy="784080"/>
           </a:xfrm>
           <a:prstGeom prst="rect">
             <a:avLst/>
@@ -33691,7 +35338,7 @@
         <p:spPr>
           <a:xfrm>
             <a:off x="4032000" y="1944000"/>
-            <a:ext cx="1432440" cy="1360440"/>
+            <a:ext cx="1432080" cy="1360080"/>
           </a:xfrm>
           <a:custGeom>
             <a:avLst/>
@@ -33850,7 +35497,7 @@
         <p:spPr>
           <a:xfrm>
             <a:off x="1764000" y="3564000"/>
-            <a:ext cx="7121160" cy="595440"/>
+            <a:ext cx="7120800" cy="595080"/>
           </a:xfrm>
           <a:prstGeom prst="rect">
             <a:avLst/>
@@ -33958,7 +35605,7 @@
         <p:spPr>
           <a:xfrm>
             <a:off x="1945800" y="3636000"/>
-            <a:ext cx="1432440" cy="784440"/>
+            <a:ext cx="1432080" cy="784080"/>
           </a:xfrm>
           <a:prstGeom prst="rect">
             <a:avLst/>
@@ -34033,7 +35680,7 @@
         <p:spPr>
           <a:xfrm>
             <a:off x="6300000" y="3673800"/>
-            <a:ext cx="1432440" cy="784440"/>
+            <a:ext cx="1432080" cy="784080"/>
           </a:xfrm>
           <a:prstGeom prst="rect">
             <a:avLst/>
@@ -34162,7 +35809,7 @@
         <p:spPr>
           <a:xfrm>
             <a:off x="1764000" y="4860000"/>
-            <a:ext cx="7121160" cy="595440"/>
+            <a:ext cx="7120800" cy="595080"/>
           </a:xfrm>
           <a:prstGeom prst="rect">
             <a:avLst/>
@@ -34188,7 +35835,7 @@
         <p:spPr>
           <a:xfrm>
             <a:off x="4140000" y="1080000"/>
-            <a:ext cx="1432440" cy="784440"/>
+            <a:ext cx="1432080" cy="784080"/>
           </a:xfrm>
           <a:prstGeom prst="rect">
             <a:avLst/>
@@ -34243,7 +35890,7 @@
         <p:spPr>
           <a:xfrm>
             <a:off x="4392000" y="2267640"/>
-            <a:ext cx="930240" cy="1002240"/>
+            <a:ext cx="929880" cy="1001880"/>
           </a:xfrm>
           <a:custGeom>
             <a:avLst/>
@@ -34292,7 +35939,7 @@
         <p:spPr>
           <a:xfrm>
             <a:off x="4572000" y="2304000"/>
-            <a:ext cx="642240" cy="340560"/>
+            <a:ext cx="641880" cy="340200"/>
           </a:xfrm>
           <a:prstGeom prst="rect">
             <a:avLst/>
@@ -34424,7 +36071,7 @@
         <p:spPr>
           <a:xfrm>
             <a:off x="2592000" y="432000"/>
-            <a:ext cx="1146240" cy="498240"/>
+            <a:ext cx="1145880" cy="497880"/>
           </a:xfrm>
           <a:prstGeom prst="ellipse">
             <a:avLst/>
@@ -34479,7 +36126,7 @@
         <p:spPr>
           <a:xfrm>
             <a:off x="4104360" y="360360"/>
-            <a:ext cx="1146240" cy="498240"/>
+            <a:ext cx="1145880" cy="497880"/>
           </a:xfrm>
           <a:prstGeom prst="ellipse">
             <a:avLst/>
@@ -34534,7 +36181,7 @@
         <p:spPr>
           <a:xfrm>
             <a:off x="5652720" y="432720"/>
-            <a:ext cx="1146240" cy="498240"/>
+            <a:ext cx="1145880" cy="497880"/>
           </a:xfrm>
           <a:prstGeom prst="ellipse">
             <a:avLst/>
@@ -34589,7 +36236,7 @@
         <p:spPr>
           <a:xfrm>
             <a:off x="3813480" y="4321080"/>
-            <a:ext cx="1146240" cy="498240"/>
+            <a:ext cx="1145880" cy="497880"/>
           </a:xfrm>
           <a:prstGeom prst="ellipse">
             <a:avLst/>
@@ -34644,7 +36291,7 @@
         <p:spPr>
           <a:xfrm>
             <a:off x="2193840" y="4717440"/>
-            <a:ext cx="1146240" cy="498240"/>
+            <a:ext cx="1145880" cy="497880"/>
           </a:xfrm>
           <a:prstGeom prst="ellipse">
             <a:avLst/>
@@ -34699,7 +36346,7 @@
         <p:spPr>
           <a:xfrm>
             <a:off x="682200" y="4501800"/>
-            <a:ext cx="1146240" cy="498240"/>
+            <a:ext cx="1145880" cy="497880"/>
           </a:xfrm>
           <a:prstGeom prst="ellipse">
             <a:avLst/>
@@ -34754,7 +36401,7 @@
         <p:spPr>
           <a:xfrm>
             <a:off x="5434560" y="4574160"/>
-            <a:ext cx="1146240" cy="498240"/>
+            <a:ext cx="1145880" cy="497880"/>
           </a:xfrm>
           <a:prstGeom prst="ellipse">
             <a:avLst/>
@@ -34809,7 +36456,7 @@
         <p:spPr>
           <a:xfrm>
             <a:off x="7634160" y="4574520"/>
-            <a:ext cx="1146240" cy="498240"/>
+            <a:ext cx="1145880" cy="497880"/>
           </a:xfrm>
           <a:prstGeom prst="ellipse">
             <a:avLst/>
@@ -34864,7 +36511,7 @@
         <p:spPr>
           <a:xfrm>
             <a:off x="686520" y="3098880"/>
-            <a:ext cx="1146240" cy="498240"/>
+            <a:ext cx="1145880" cy="497880"/>
           </a:xfrm>
           <a:prstGeom prst="ellipse">
             <a:avLst/>
@@ -35192,7 +36839,7 @@
         <p:spPr>
           <a:xfrm>
             <a:off x="432000" y="72000"/>
-            <a:ext cx="9066240" cy="2514240"/>
+            <a:ext cx="9065880" cy="2513880"/>
           </a:xfrm>
           <a:prstGeom prst="rect">
             <a:avLst/>
@@ -35222,7 +36869,7 @@
         <p:spPr>
           <a:xfrm>
             <a:off x="2016000" y="1188000"/>
-            <a:ext cx="1432440" cy="784440"/>
+            <a:ext cx="1432080" cy="784080"/>
           </a:xfrm>
           <a:prstGeom prst="rect">
             <a:avLst/>
@@ -35277,7 +36924,7 @@
         <p:spPr>
           <a:xfrm>
             <a:off x="6192000" y="1188000"/>
-            <a:ext cx="1432440" cy="784440"/>
+            <a:ext cx="1432080" cy="784080"/>
           </a:xfrm>
           <a:prstGeom prst="rect">
             <a:avLst/>
@@ -35332,7 +36979,7 @@
         <p:spPr>
           <a:xfrm>
             <a:off x="4140000" y="900000"/>
-            <a:ext cx="1432440" cy="1360440"/>
+            <a:ext cx="1432080" cy="1360080"/>
           </a:xfrm>
           <a:custGeom>
             <a:avLst/>
@@ -35491,7 +37138,7 @@
         <p:spPr>
           <a:xfrm>
             <a:off x="-36000" y="3384000"/>
-            <a:ext cx="2622240" cy="595440"/>
+            <a:ext cx="2621880" cy="595080"/>
           </a:xfrm>
           <a:prstGeom prst="rect">
             <a:avLst/>
@@ -35569,7 +37216,7 @@
         <p:spPr>
           <a:xfrm>
             <a:off x="5868360" y="180360"/>
-            <a:ext cx="1146240" cy="498240"/>
+            <a:ext cx="1145880" cy="497880"/>
           </a:xfrm>
           <a:prstGeom prst="ellipse">
             <a:avLst/>
@@ -35624,7 +37271,7 @@
         <p:spPr>
           <a:xfrm>
             <a:off x="7344720" y="216720"/>
-            <a:ext cx="1146240" cy="498240"/>
+            <a:ext cx="1145880" cy="497880"/>
           </a:xfrm>
           <a:prstGeom prst="ellipse">
             <a:avLst/>
@@ -35679,7 +37326,7 @@
         <p:spPr>
           <a:xfrm>
             <a:off x="7921080" y="937080"/>
-            <a:ext cx="1146240" cy="498240"/>
+            <a:ext cx="1145880" cy="497880"/>
           </a:xfrm>
           <a:prstGeom prst="ellipse">
             <a:avLst/>
@@ -35734,7 +37381,7 @@
         <p:spPr>
           <a:xfrm>
             <a:off x="7921440" y="1693440"/>
-            <a:ext cx="1146240" cy="498240"/>
+            <a:ext cx="1145880" cy="497880"/>
           </a:xfrm>
           <a:prstGeom prst="ellipse">
             <a:avLst/>
@@ -35789,7 +37436,7 @@
         <p:spPr>
           <a:xfrm>
             <a:off x="7921440" y="937440"/>
-            <a:ext cx="1146240" cy="498240"/>
+            <a:ext cx="1145880" cy="497880"/>
           </a:xfrm>
           <a:prstGeom prst="ellipse">
             <a:avLst/>
@@ -35844,7 +37491,7 @@
         <p:spPr>
           <a:xfrm>
             <a:off x="2089440" y="433440"/>
-            <a:ext cx="1146240" cy="498240"/>
+            <a:ext cx="1145880" cy="497880"/>
           </a:xfrm>
           <a:prstGeom prst="ellipse">
             <a:avLst/>
@@ -35899,7 +37546,7 @@
         <p:spPr>
           <a:xfrm>
             <a:off x="649800" y="541800"/>
-            <a:ext cx="1146240" cy="498240"/>
+            <a:ext cx="1145880" cy="497880"/>
           </a:xfrm>
           <a:prstGeom prst="ellipse">
             <a:avLst/>
@@ -35954,7 +37601,7 @@
         <p:spPr>
           <a:xfrm>
             <a:off x="4320000" y="3168000"/>
-            <a:ext cx="1036440" cy="786240"/>
+            <a:ext cx="1036080" cy="785880"/>
           </a:xfrm>
           <a:custGeom>
             <a:avLst/>
@@ -36032,7 +37679,7 @@
         <p:spPr>
           <a:xfrm>
             <a:off x="4176000" y="4428000"/>
-            <a:ext cx="1432440" cy="784440"/>
+            <a:ext cx="1432080" cy="784080"/>
           </a:xfrm>
           <a:prstGeom prst="rect">
             <a:avLst/>
@@ -36168,7 +37815,7 @@
         <p:spPr>
           <a:xfrm>
             <a:off x="5870160" y="3782160"/>
-            <a:ext cx="1146240" cy="498240"/>
+            <a:ext cx="1145880" cy="497880"/>
           </a:xfrm>
           <a:prstGeom prst="ellipse">
             <a:avLst/>
@@ -36223,7 +37870,7 @@
         <p:spPr>
           <a:xfrm>
             <a:off x="7380000" y="3115440"/>
-            <a:ext cx="2622240" cy="595440"/>
+            <a:ext cx="2621880" cy="595080"/>
           </a:xfrm>
           <a:prstGeom prst="rect">
             <a:avLst/>

</xml_diff>

<commit_message>
Computer Organization: memory addressing and languages
</commit_message>
<xml_diff>
--- a/GATE/images/gate_images.pptx
+++ b/GATE/images/gate_images.pptx
@@ -2803,7 +2803,19 @@
               <a:rPr b="0" lang="en-IN" sz="4400" spc="-1" strike="noStrike">
                 <a:latin typeface="Arial"/>
               </a:rPr>
-              <a:t>Click </a:t>
+              <a:t>Cl</a:t>
+            </a:r>
+            <a:r>
+              <a:rPr b="0" lang="en-IN" sz="4400" spc="-1" strike="noStrike">
+                <a:latin typeface="Arial"/>
+              </a:rPr>
+              <a:t>ic</a:t>
+            </a:r>
+            <a:r>
+              <a:rPr b="0" lang="en-IN" sz="4400" spc="-1" strike="noStrike">
+                <a:latin typeface="Arial"/>
+              </a:rPr>
+              <a:t>k </a:t>
             </a:r>
             <a:r>
               <a:rPr b="0" lang="en-IN" sz="4400" spc="-1" strike="noStrike">
@@ -2815,37 +2827,73 @@
               <a:rPr b="0" lang="en-IN" sz="4400" spc="-1" strike="noStrike">
                 <a:latin typeface="Arial"/>
               </a:rPr>
-              <a:t>edit </a:t>
+              <a:t>ed</a:t>
             </a:r>
             <a:r>
               <a:rPr b="0" lang="en-IN" sz="4400" spc="-1" strike="noStrike">
                 <a:latin typeface="Arial"/>
               </a:rPr>
-              <a:t>the </a:t>
+              <a:t>it </a:t>
             </a:r>
             <a:r>
               <a:rPr b="0" lang="en-IN" sz="4400" spc="-1" strike="noStrike">
                 <a:latin typeface="Arial"/>
               </a:rPr>
-              <a:t>title </a:t>
+              <a:t>th</a:t>
             </a:r>
             <a:r>
               <a:rPr b="0" lang="en-IN" sz="4400" spc="-1" strike="noStrike">
                 <a:latin typeface="Arial"/>
               </a:rPr>
-              <a:t>text </a:t>
+              <a:t>e </a:t>
             </a:r>
             <a:r>
               <a:rPr b="0" lang="en-IN" sz="4400" spc="-1" strike="noStrike">
                 <a:latin typeface="Arial"/>
               </a:rPr>
-              <a:t>forma</a:t>
+              <a:t>titl</a:t>
             </a:r>
             <a:r>
               <a:rPr b="0" lang="en-IN" sz="4400" spc="-1" strike="noStrike">
                 <a:latin typeface="Arial"/>
               </a:rPr>
-              <a:t>t</a:t>
+              <a:t>e </a:t>
+            </a:r>
+            <a:r>
+              <a:rPr b="0" lang="en-IN" sz="4400" spc="-1" strike="noStrike">
+                <a:latin typeface="Arial"/>
+              </a:rPr>
+              <a:t>te</a:t>
+            </a:r>
+            <a:r>
+              <a:rPr b="0" lang="en-IN" sz="4400" spc="-1" strike="noStrike">
+                <a:latin typeface="Arial"/>
+              </a:rPr>
+              <a:t>xt </a:t>
+            </a:r>
+            <a:r>
+              <a:rPr b="0" lang="en-IN" sz="4400" spc="-1" strike="noStrike">
+                <a:latin typeface="Arial"/>
+              </a:rPr>
+              <a:t>fo</a:t>
+            </a:r>
+            <a:r>
+              <a:rPr b="0" lang="en-IN" sz="4400" spc="-1" strike="noStrike">
+                <a:latin typeface="Arial"/>
+              </a:rPr>
+              <a:t>r</a:t>
+            </a:r>
+            <a:r>
+              <a:rPr b="0" lang="en-IN" sz="4400" spc="-1" strike="noStrike">
+                <a:latin typeface="Arial"/>
+              </a:rPr>
+              <a:t>m</a:t>
+            </a:r>
+            <a:r>
+              <a:rPr b="0" lang="en-IN" sz="4400" spc="-1" strike="noStrike">
+                <a:latin typeface="Arial"/>
+              </a:rPr>
+              <a:t>at</a:t>
             </a:r>
             <a:endParaRPr b="0" lang="en-IN" sz="4400" spc="-1" strike="noStrike">
               <a:latin typeface="Arial"/>
@@ -3098,7 +3146,13 @@
               <a:rPr b="0" lang="en-IN" sz="4400" spc="-1" strike="noStrike">
                 <a:latin typeface="Arial"/>
               </a:rPr>
-              <a:t>Click </a:t>
+              <a:t>Cli</a:t>
+            </a:r>
+            <a:r>
+              <a:rPr b="0" lang="en-IN" sz="4400" spc="-1" strike="noStrike">
+                <a:latin typeface="Arial"/>
+              </a:rPr>
+              <a:t>ck </a:t>
             </a:r>
             <a:r>
               <a:rPr b="0" lang="en-IN" sz="4400" spc="-1" strike="noStrike">
@@ -3110,7 +3164,13 @@
               <a:rPr b="0" lang="en-IN" sz="4400" spc="-1" strike="noStrike">
                 <a:latin typeface="Arial"/>
               </a:rPr>
-              <a:t>edit </a:t>
+              <a:t>edi</a:t>
+            </a:r>
+            <a:r>
+              <a:rPr b="0" lang="en-IN" sz="4400" spc="-1" strike="noStrike">
+                <a:latin typeface="Arial"/>
+              </a:rPr>
+              <a:t>t </a:t>
             </a:r>
             <a:r>
               <a:rPr b="0" lang="en-IN" sz="4400" spc="-1" strike="noStrike">
@@ -3122,19 +3182,37 @@
               <a:rPr b="0" lang="en-IN" sz="4400" spc="-1" strike="noStrike">
                 <a:latin typeface="Arial"/>
               </a:rPr>
-              <a:t>title </a:t>
+              <a:t>titl</a:t>
             </a:r>
             <a:r>
               <a:rPr b="0" lang="en-IN" sz="4400" spc="-1" strike="noStrike">
                 <a:latin typeface="Arial"/>
               </a:rPr>
-              <a:t>text </a:t>
+              <a:t>e </a:t>
             </a:r>
             <a:r>
               <a:rPr b="0" lang="en-IN" sz="4400" spc="-1" strike="noStrike">
                 <a:latin typeface="Arial"/>
               </a:rPr>
-              <a:t>forma</a:t>
+              <a:t>tex</a:t>
+            </a:r>
+            <a:r>
+              <a:rPr b="0" lang="en-IN" sz="4400" spc="-1" strike="noStrike">
+                <a:latin typeface="Arial"/>
+              </a:rPr>
+              <a:t>t </a:t>
+            </a:r>
+            <a:r>
+              <a:rPr b="0" lang="en-IN" sz="4400" spc="-1" strike="noStrike">
+                <a:latin typeface="Arial"/>
+              </a:rPr>
+              <a:t>for</a:t>
+            </a:r>
+            <a:r>
+              <a:rPr b="0" lang="en-IN" sz="4400" spc="-1" strike="noStrike">
+                <a:latin typeface="Arial"/>
+              </a:rPr>
+              <a:t>ma</a:t>
             </a:r>
             <a:r>
               <a:rPr b="0" lang="en-IN" sz="4400" spc="-1" strike="noStrike">
@@ -3373,7 +3451,7 @@
         <p:spPr>
           <a:xfrm>
             <a:off x="1836000" y="1332000"/>
-            <a:ext cx="2367720" cy="783720"/>
+            <a:ext cx="2367360" cy="783360"/>
           </a:xfrm>
           <a:prstGeom prst="rect">
             <a:avLst/>
@@ -3428,7 +3506,7 @@
         <p:spPr>
           <a:xfrm>
             <a:off x="1836000" y="2880000"/>
-            <a:ext cx="2367720" cy="783720"/>
+            <a:ext cx="2367360" cy="783360"/>
           </a:xfrm>
           <a:prstGeom prst="rect">
             <a:avLst/>
@@ -3493,7 +3571,7 @@
         <p:spPr>
           <a:xfrm>
             <a:off x="1836000" y="4176000"/>
-            <a:ext cx="2367720" cy="783720"/>
+            <a:ext cx="2367360" cy="783360"/>
           </a:xfrm>
           <a:prstGeom prst="rect">
             <a:avLst/>
@@ -3568,7 +3646,7 @@
         <p:spPr>
           <a:xfrm>
             <a:off x="5292000" y="900000"/>
-            <a:ext cx="2367720" cy="1503720"/>
+            <a:ext cx="2367360" cy="1503360"/>
           </a:xfrm>
           <a:prstGeom prst="rect">
             <a:avLst/>
@@ -3703,7 +3781,7 @@
         <p:spPr>
           <a:xfrm>
             <a:off x="5292000" y="2571480"/>
-            <a:ext cx="2367720" cy="1272240"/>
+            <a:ext cx="2367360" cy="1271880"/>
           </a:xfrm>
           <a:prstGeom prst="rect">
             <a:avLst/>
@@ -3818,7 +3896,7 @@
         <p:spPr>
           <a:xfrm>
             <a:off x="5292000" y="4047480"/>
-            <a:ext cx="2367720" cy="1020240"/>
+            <a:ext cx="2367360" cy="1019880"/>
           </a:xfrm>
           <a:prstGeom prst="rect">
             <a:avLst/>
@@ -3997,7 +4075,7 @@
         <p:spPr>
           <a:xfrm>
             <a:off x="2988000" y="360000"/>
-            <a:ext cx="4383720" cy="338040"/>
+            <a:ext cx="4383360" cy="337680"/>
           </a:xfrm>
           <a:prstGeom prst="rect">
             <a:avLst/>
@@ -4078,7 +4156,7 @@
         <p:spPr>
           <a:xfrm>
             <a:off x="1440000" y="720000"/>
-            <a:ext cx="6761880" cy="1793880"/>
+            <a:ext cx="6761520" cy="1793520"/>
           </a:xfrm>
           <a:prstGeom prst="rect">
             <a:avLst/>
@@ -4108,7 +4186,7 @@
         <p:spPr>
           <a:xfrm>
             <a:off x="2016000" y="1188000"/>
-            <a:ext cx="1432080" cy="784080"/>
+            <a:ext cx="1431720" cy="783720"/>
           </a:xfrm>
           <a:prstGeom prst="rect">
             <a:avLst/>
@@ -4163,7 +4241,7 @@
         <p:spPr>
           <a:xfrm>
             <a:off x="6192000" y="1188000"/>
-            <a:ext cx="1432080" cy="784080"/>
+            <a:ext cx="1431720" cy="783720"/>
           </a:xfrm>
           <a:prstGeom prst="rect">
             <a:avLst/>
@@ -4218,7 +4296,7 @@
         <p:spPr>
           <a:xfrm>
             <a:off x="4140000" y="900000"/>
-            <a:ext cx="1432080" cy="1360080"/>
+            <a:ext cx="1431720" cy="1359720"/>
           </a:xfrm>
           <a:custGeom>
             <a:avLst/>
@@ -4404,7 +4482,7 @@
         <p:spPr>
           <a:xfrm>
             <a:off x="4320000" y="3168000"/>
-            <a:ext cx="1036080" cy="785880"/>
+            <a:ext cx="1035720" cy="785520"/>
           </a:xfrm>
           <a:custGeom>
             <a:avLst/>
@@ -4482,7 +4560,7 @@
         <p:spPr>
           <a:xfrm>
             <a:off x="4176000" y="4428000"/>
-            <a:ext cx="1432080" cy="784080"/>
+            <a:ext cx="1431720" cy="783720"/>
           </a:xfrm>
           <a:prstGeom prst="rect">
             <a:avLst/>
@@ -4564,7 +4642,7 @@
         <p:spPr>
           <a:xfrm>
             <a:off x="5870160" y="3314160"/>
-            <a:ext cx="1145880" cy="497880"/>
+            <a:ext cx="1145520" cy="497520"/>
           </a:xfrm>
           <a:prstGeom prst="ellipse">
             <a:avLst/>
@@ -4703,7 +4781,7 @@
         <p:spPr>
           <a:xfrm>
             <a:off x="1944000" y="900000"/>
-            <a:ext cx="1432080" cy="784080"/>
+            <a:ext cx="1431720" cy="783720"/>
           </a:xfrm>
           <a:prstGeom prst="rect">
             <a:avLst/>
@@ -4758,7 +4836,7 @@
         <p:spPr>
           <a:xfrm>
             <a:off x="6120000" y="900000"/>
-            <a:ext cx="1432080" cy="784080"/>
+            <a:ext cx="1431720" cy="783720"/>
           </a:xfrm>
           <a:prstGeom prst="rect">
             <a:avLst/>
@@ -4813,7 +4891,7 @@
         <p:spPr>
           <a:xfrm>
             <a:off x="4068000" y="612000"/>
-            <a:ext cx="1432080" cy="1360080"/>
+            <a:ext cx="1431720" cy="1359720"/>
           </a:xfrm>
           <a:custGeom>
             <a:avLst/>
@@ -4992,7 +5070,7 @@
         <p:spPr>
           <a:xfrm>
             <a:off x="2592000" y="5904000"/>
-            <a:ext cx="7120800" cy="595080"/>
+            <a:ext cx="7120440" cy="594720"/>
           </a:xfrm>
           <a:prstGeom prst="rect">
             <a:avLst/>
@@ -5063,7 +5141,7 @@
         <p:spPr>
           <a:xfrm>
             <a:off x="360000" y="216360"/>
-            <a:ext cx="1145880" cy="497880"/>
+            <a:ext cx="1145520" cy="497520"/>
           </a:xfrm>
           <a:prstGeom prst="ellipse">
             <a:avLst/>
@@ -5118,7 +5196,7 @@
         <p:spPr>
           <a:xfrm>
             <a:off x="1727640" y="216360"/>
-            <a:ext cx="1145880" cy="497880"/>
+            <a:ext cx="1145520" cy="497520"/>
           </a:xfrm>
           <a:prstGeom prst="ellipse">
             <a:avLst/>
@@ -5173,7 +5251,7 @@
         <p:spPr>
           <a:xfrm>
             <a:off x="359280" y="1008360"/>
-            <a:ext cx="1145880" cy="497880"/>
+            <a:ext cx="1145520" cy="497520"/>
           </a:xfrm>
           <a:prstGeom prst="ellipse">
             <a:avLst/>
@@ -5228,7 +5306,7 @@
         <p:spPr>
           <a:xfrm>
             <a:off x="358920" y="1800360"/>
-            <a:ext cx="1145880" cy="497880"/>
+            <a:ext cx="1145520" cy="497520"/>
           </a:xfrm>
           <a:prstGeom prst="ellipse">
             <a:avLst/>
@@ -5283,7 +5361,7 @@
         <p:spPr>
           <a:xfrm>
             <a:off x="1906560" y="1836360"/>
-            <a:ext cx="1145880" cy="497880"/>
+            <a:ext cx="1145520" cy="497520"/>
           </a:xfrm>
           <a:prstGeom prst="ellipse">
             <a:avLst/>
@@ -5338,7 +5416,7 @@
         <p:spPr>
           <a:xfrm>
             <a:off x="4211280" y="360"/>
-            <a:ext cx="1145880" cy="497880"/>
+            <a:ext cx="1145520" cy="497520"/>
           </a:xfrm>
           <a:prstGeom prst="ellipse">
             <a:avLst/>
@@ -5393,7 +5471,7 @@
         <p:spPr>
           <a:xfrm>
             <a:off x="6226920" y="360"/>
-            <a:ext cx="1145880" cy="497880"/>
+            <a:ext cx="1145520" cy="497520"/>
           </a:xfrm>
           <a:prstGeom prst="ellipse">
             <a:avLst/>
@@ -5448,7 +5526,7 @@
         <p:spPr>
           <a:xfrm>
             <a:off x="4210920" y="360"/>
-            <a:ext cx="1145880" cy="497880"/>
+            <a:ext cx="1145520" cy="497520"/>
           </a:xfrm>
           <a:prstGeom prst="ellipse">
             <a:avLst/>
@@ -5503,7 +5581,7 @@
         <p:spPr>
           <a:xfrm>
             <a:off x="7738920" y="252360"/>
-            <a:ext cx="1145880" cy="497880"/>
+            <a:ext cx="1145520" cy="497520"/>
           </a:xfrm>
           <a:prstGeom prst="ellipse">
             <a:avLst/>
@@ -5558,7 +5636,7 @@
         <p:spPr>
           <a:xfrm>
             <a:off x="7810920" y="936360"/>
-            <a:ext cx="1145880" cy="497880"/>
+            <a:ext cx="1145520" cy="497520"/>
           </a:xfrm>
           <a:prstGeom prst="ellipse">
             <a:avLst/>
@@ -7094,7 +7172,7 @@
         <p:spPr>
           <a:xfrm>
             <a:off x="576000" y="4320000"/>
-            <a:ext cx="2442240" cy="340560"/>
+            <a:ext cx="2441880" cy="340200"/>
           </a:xfrm>
           <a:prstGeom prst="rect">
             <a:avLst/>
@@ -7145,7 +7223,7 @@
         <p:spPr>
           <a:xfrm>
             <a:off x="7092000" y="3672000"/>
-            <a:ext cx="2442240" cy="340560"/>
+            <a:ext cx="2441880" cy="340200"/>
           </a:xfrm>
           <a:prstGeom prst="rect">
             <a:avLst/>
@@ -7196,7 +7274,7 @@
         <p:spPr>
           <a:xfrm>
             <a:off x="3744000" y="5328000"/>
-            <a:ext cx="2442240" cy="340560"/>
+            <a:ext cx="2441880" cy="340200"/>
           </a:xfrm>
           <a:prstGeom prst="rect">
             <a:avLst/>
@@ -7277,7 +7355,7 @@
         <p:spPr>
           <a:xfrm>
             <a:off x="5934960" y="1050480"/>
-            <a:ext cx="1690560" cy="1001520"/>
+            <a:ext cx="1690200" cy="1001160"/>
           </a:xfrm>
           <a:prstGeom prst="rect">
             <a:avLst/>
@@ -7307,7 +7385,7 @@
         <p:spPr>
           <a:xfrm>
             <a:off x="1908000" y="1152000"/>
-            <a:ext cx="1432080" cy="784080"/>
+            <a:ext cx="1431720" cy="783720"/>
           </a:xfrm>
           <a:prstGeom prst="rect">
             <a:avLst/>
@@ -7362,7 +7440,7 @@
         <p:spPr>
           <a:xfrm>
             <a:off x="6084000" y="1152000"/>
-            <a:ext cx="1432080" cy="784080"/>
+            <a:ext cx="1431720" cy="783720"/>
           </a:xfrm>
           <a:prstGeom prst="rect">
             <a:avLst/>
@@ -7417,7 +7495,7 @@
         <p:spPr>
           <a:xfrm>
             <a:off x="4032000" y="864000"/>
-            <a:ext cx="1432080" cy="1360080"/>
+            <a:ext cx="1431720" cy="1359720"/>
           </a:xfrm>
           <a:custGeom>
             <a:avLst/>
@@ -7549,7 +7627,7 @@
         <p:spPr>
           <a:xfrm>
             <a:off x="1548000" y="576000"/>
-            <a:ext cx="2118240" cy="462240"/>
+            <a:ext cx="2117880" cy="461880"/>
           </a:xfrm>
           <a:prstGeom prst="rect">
             <a:avLst/>
@@ -7655,7 +7733,7 @@
         <p:spPr>
           <a:xfrm>
             <a:off x="5760000" y="576000"/>
-            <a:ext cx="2118240" cy="462240"/>
+            <a:ext cx="2117880" cy="461880"/>
           </a:xfrm>
           <a:prstGeom prst="rect">
             <a:avLst/>
@@ -7706,7 +7784,7 @@
         <p:spPr>
           <a:xfrm>
             <a:off x="216000" y="2376000"/>
-            <a:ext cx="2118240" cy="2586240"/>
+            <a:ext cx="2117880" cy="2585880"/>
           </a:xfrm>
           <a:prstGeom prst="rect">
             <a:avLst/>
@@ -8415,7 +8493,7 @@
         <p:spPr>
           <a:xfrm>
             <a:off x="1945800" y="3636000"/>
-            <a:ext cx="1432080" cy="784080"/>
+            <a:ext cx="1431720" cy="783720"/>
           </a:xfrm>
           <a:prstGeom prst="rect">
             <a:avLst/>
@@ -8490,7 +8568,7 @@
         <p:spPr>
           <a:xfrm>
             <a:off x="6300000" y="3673800"/>
-            <a:ext cx="1432080" cy="784080"/>
+            <a:ext cx="1431720" cy="783720"/>
           </a:xfrm>
           <a:prstGeom prst="rect">
             <a:avLst/>
@@ -8619,7 +8697,7 @@
         <p:spPr>
           <a:xfrm>
             <a:off x="1764000" y="4860000"/>
-            <a:ext cx="7120800" cy="595080"/>
+            <a:ext cx="7120440" cy="594720"/>
           </a:xfrm>
           <a:prstGeom prst="rect">
             <a:avLst/>
@@ -8645,7 +8723,7 @@
         <p:spPr>
           <a:xfrm>
             <a:off x="4140000" y="1080000"/>
-            <a:ext cx="1432080" cy="784080"/>
+            <a:ext cx="1431720" cy="783720"/>
           </a:xfrm>
           <a:prstGeom prst="rect">
             <a:avLst/>
@@ -8700,7 +8778,7 @@
         <p:spPr>
           <a:xfrm>
             <a:off x="4392000" y="2267640"/>
-            <a:ext cx="929880" cy="1001880"/>
+            <a:ext cx="929520" cy="1001520"/>
           </a:xfrm>
           <a:custGeom>
             <a:avLst/>
@@ -8749,7 +8827,7 @@
         <p:spPr>
           <a:xfrm>
             <a:off x="4572000" y="2304000"/>
-            <a:ext cx="641880" cy="340200"/>
+            <a:ext cx="641520" cy="339840"/>
           </a:xfrm>
           <a:prstGeom prst="rect">
             <a:avLst/>
@@ -8881,7 +8959,7 @@
         <p:spPr>
           <a:xfrm>
             <a:off x="2592000" y="432000"/>
-            <a:ext cx="1145880" cy="497880"/>
+            <a:ext cx="1145520" cy="497520"/>
           </a:xfrm>
           <a:prstGeom prst="ellipse">
             <a:avLst/>
@@ -8936,7 +9014,7 @@
         <p:spPr>
           <a:xfrm>
             <a:off x="4104360" y="360360"/>
-            <a:ext cx="1145880" cy="497880"/>
+            <a:ext cx="1145520" cy="497520"/>
           </a:xfrm>
           <a:prstGeom prst="ellipse">
             <a:avLst/>
@@ -8991,7 +9069,7 @@
         <p:spPr>
           <a:xfrm>
             <a:off x="5652720" y="432720"/>
-            <a:ext cx="1145880" cy="497880"/>
+            <a:ext cx="1145520" cy="497520"/>
           </a:xfrm>
           <a:prstGeom prst="ellipse">
             <a:avLst/>
@@ -9046,7 +9124,7 @@
         <p:spPr>
           <a:xfrm>
             <a:off x="3813480" y="4321080"/>
-            <a:ext cx="1145880" cy="497880"/>
+            <a:ext cx="1145520" cy="497520"/>
           </a:xfrm>
           <a:prstGeom prst="ellipse">
             <a:avLst/>
@@ -9101,7 +9179,7 @@
         <p:spPr>
           <a:xfrm>
             <a:off x="2193840" y="4717440"/>
-            <a:ext cx="1145880" cy="497880"/>
+            <a:ext cx="1145520" cy="497520"/>
           </a:xfrm>
           <a:prstGeom prst="ellipse">
             <a:avLst/>
@@ -9156,7 +9234,7 @@
         <p:spPr>
           <a:xfrm>
             <a:off x="682200" y="4501800"/>
-            <a:ext cx="1145880" cy="497880"/>
+            <a:ext cx="1145520" cy="497520"/>
           </a:xfrm>
           <a:prstGeom prst="ellipse">
             <a:avLst/>
@@ -9211,7 +9289,7 @@
         <p:spPr>
           <a:xfrm>
             <a:off x="5434560" y="4574160"/>
-            <a:ext cx="1145880" cy="497880"/>
+            <a:ext cx="1145520" cy="497520"/>
           </a:xfrm>
           <a:prstGeom prst="ellipse">
             <a:avLst/>
@@ -9266,7 +9344,7 @@
         <p:spPr>
           <a:xfrm>
             <a:off x="7634160" y="4574520"/>
-            <a:ext cx="1145880" cy="497880"/>
+            <a:ext cx="1145520" cy="497520"/>
           </a:xfrm>
           <a:prstGeom prst="ellipse">
             <a:avLst/>
@@ -9321,7 +9399,7 @@
         <p:spPr>
           <a:xfrm>
             <a:off x="686520" y="3098880"/>
-            <a:ext cx="1145880" cy="497880"/>
+            <a:ext cx="1145520" cy="497520"/>
           </a:xfrm>
           <a:prstGeom prst="ellipse">
             <a:avLst/>
@@ -9619,7 +9697,7 @@
         <p:spPr>
           <a:xfrm>
             <a:off x="216000" y="288000"/>
-            <a:ext cx="2370240" cy="2298240"/>
+            <a:ext cx="2369880" cy="2297880"/>
           </a:xfrm>
           <a:prstGeom prst="rect">
             <a:avLst/>
@@ -9740,7 +9818,7 @@
         <p:spPr>
           <a:xfrm>
             <a:off x="1908000" y="936000"/>
-            <a:ext cx="1432080" cy="784080"/>
+            <a:ext cx="1431720" cy="783720"/>
           </a:xfrm>
           <a:prstGeom prst="rect">
             <a:avLst/>
@@ -9795,7 +9873,7 @@
         <p:spPr>
           <a:xfrm>
             <a:off x="6084000" y="936000"/>
-            <a:ext cx="1432080" cy="784080"/>
+            <a:ext cx="1431720" cy="783720"/>
           </a:xfrm>
           <a:prstGeom prst="rect">
             <a:avLst/>
@@ -9850,7 +9928,7 @@
         <p:spPr>
           <a:xfrm>
             <a:off x="4934160" y="4392000"/>
-            <a:ext cx="1432080" cy="784080"/>
+            <a:ext cx="1431720" cy="783720"/>
           </a:xfrm>
           <a:prstGeom prst="rect">
             <a:avLst/>
@@ -9905,7 +9983,7 @@
         <p:spPr>
           <a:xfrm>
             <a:off x="4032000" y="648000"/>
-            <a:ext cx="1432080" cy="1360080"/>
+            <a:ext cx="1431720" cy="1359720"/>
           </a:xfrm>
           <a:custGeom>
             <a:avLst/>
@@ -10003,7 +10081,7 @@
         <p:spPr>
           <a:xfrm>
             <a:off x="1908000" y="3204360"/>
-            <a:ext cx="1432080" cy="1360080"/>
+            <a:ext cx="1431720" cy="1359720"/>
           </a:xfrm>
           <a:custGeom>
             <a:avLst/>
@@ -10155,7 +10233,7 @@
         <p:spPr>
           <a:xfrm>
             <a:off x="4140000" y="2234160"/>
-            <a:ext cx="1146240" cy="568080"/>
+            <a:ext cx="1145880" cy="567720"/>
           </a:xfrm>
           <a:prstGeom prst="ellipse">
             <a:avLst/>
@@ -10210,7 +10288,7 @@
         <p:spPr>
           <a:xfrm>
             <a:off x="3708360" y="3636360"/>
-            <a:ext cx="1073880" cy="568080"/>
+            <a:ext cx="1073520" cy="567720"/>
           </a:xfrm>
           <a:prstGeom prst="ellipse">
             <a:avLst/>
@@ -10319,7 +10397,7 @@
         <p:spPr>
           <a:xfrm>
             <a:off x="504000" y="396000"/>
-            <a:ext cx="1146240" cy="568080"/>
+            <a:ext cx="1145880" cy="567720"/>
           </a:xfrm>
           <a:prstGeom prst="ellipse">
             <a:avLst/>
@@ -10374,7 +10452,7 @@
         <p:spPr>
           <a:xfrm>
             <a:off x="1944000" y="180000"/>
-            <a:ext cx="1146240" cy="568080"/>
+            <a:ext cx="1145880" cy="567720"/>
           </a:xfrm>
           <a:prstGeom prst="ellipse">
             <a:avLst/>
@@ -10429,7 +10507,7 @@
         <p:spPr>
           <a:xfrm>
             <a:off x="288000" y="1152000"/>
-            <a:ext cx="1146240" cy="568080"/>
+            <a:ext cx="1145880" cy="567720"/>
           </a:xfrm>
           <a:prstGeom prst="ellipse">
             <a:avLst/>
@@ -10484,7 +10562,7 @@
         <p:spPr>
           <a:xfrm>
             <a:off x="5940000" y="180000"/>
-            <a:ext cx="1146240" cy="568080"/>
+            <a:ext cx="1145880" cy="567720"/>
           </a:xfrm>
           <a:prstGeom prst="ellipse">
             <a:avLst/>
@@ -10539,7 +10617,7 @@
         <p:spPr>
           <a:xfrm>
             <a:off x="7560000" y="180000"/>
-            <a:ext cx="1146240" cy="568080"/>
+            <a:ext cx="1145880" cy="567720"/>
           </a:xfrm>
           <a:prstGeom prst="ellipse">
             <a:avLst/>
@@ -10594,7 +10672,7 @@
         <p:spPr>
           <a:xfrm>
             <a:off x="7992000" y="972000"/>
-            <a:ext cx="1146240" cy="568080"/>
+            <a:ext cx="1145880" cy="567720"/>
           </a:xfrm>
           <a:prstGeom prst="ellipse">
             <a:avLst/>
@@ -10676,7 +10754,7 @@
         <p:spPr>
           <a:xfrm>
             <a:off x="432000" y="3636360"/>
-            <a:ext cx="1073880" cy="568080"/>
+            <a:ext cx="1073520" cy="567720"/>
           </a:xfrm>
           <a:prstGeom prst="ellipse">
             <a:avLst/>
@@ -10731,7 +10809,7 @@
         <p:spPr>
           <a:xfrm>
             <a:off x="6803640" y="4068360"/>
-            <a:ext cx="1073880" cy="568080"/>
+            <a:ext cx="1073520" cy="567720"/>
           </a:xfrm>
           <a:prstGeom prst="ellipse">
             <a:avLst/>
@@ -10786,7 +10864,7 @@
         <p:spPr>
           <a:xfrm>
             <a:off x="6839280" y="4752360"/>
-            <a:ext cx="1073880" cy="568080"/>
+            <a:ext cx="1073520" cy="567720"/>
           </a:xfrm>
           <a:prstGeom prst="ellipse">
             <a:avLst/>
@@ -11196,7 +11274,7 @@
         <p:spPr>
           <a:xfrm>
             <a:off x="2556000" y="1152000"/>
-            <a:ext cx="4530600" cy="354600"/>
+            <a:ext cx="4530240" cy="354240"/>
           </a:xfrm>
           <a:prstGeom prst="rect">
             <a:avLst/>
@@ -12046,7 +12124,7 @@
         <p:spPr>
           <a:xfrm>
             <a:off x="3492000" y="3541680"/>
-            <a:ext cx="3019680" cy="342000"/>
+            <a:ext cx="3019320" cy="341640"/>
           </a:xfrm>
           <a:prstGeom prst="rect">
             <a:avLst/>
@@ -12097,7 +12175,7 @@
         <p:spPr>
           <a:xfrm>
             <a:off x="144000" y="3564000"/>
-            <a:ext cx="3019680" cy="342000"/>
+            <a:ext cx="3019320" cy="341640"/>
           </a:xfrm>
           <a:prstGeom prst="rect">
             <a:avLst/>
@@ -12148,7 +12226,7 @@
         <p:spPr>
           <a:xfrm>
             <a:off x="7308000" y="3528000"/>
-            <a:ext cx="3019680" cy="342000"/>
+            <a:ext cx="3019320" cy="341640"/>
           </a:xfrm>
           <a:prstGeom prst="rect">
             <a:avLst/>
@@ -12601,7 +12679,7 @@
         <p:spPr>
           <a:xfrm>
             <a:off x="3492000" y="3541680"/>
-            <a:ext cx="3019680" cy="342000"/>
+            <a:ext cx="3019320" cy="341640"/>
           </a:xfrm>
           <a:prstGeom prst="rect">
             <a:avLst/>
@@ -12652,7 +12730,7 @@
         <p:spPr>
           <a:xfrm>
             <a:off x="144000" y="3564000"/>
-            <a:ext cx="3019680" cy="342000"/>
+            <a:ext cx="3019320" cy="341640"/>
           </a:xfrm>
           <a:prstGeom prst="rect">
             <a:avLst/>
@@ -12703,7 +12781,7 @@
         <p:spPr>
           <a:xfrm>
             <a:off x="7308000" y="3528000"/>
-            <a:ext cx="3019680" cy="342000"/>
+            <a:ext cx="3019320" cy="341640"/>
           </a:xfrm>
           <a:prstGeom prst="rect">
             <a:avLst/>
@@ -13732,7 +13810,7 @@
         <p:spPr>
           <a:xfrm>
             <a:off x="3456000" y="1008000"/>
-            <a:ext cx="3236040" cy="342360"/>
+            <a:ext cx="3235680" cy="342000"/>
           </a:xfrm>
           <a:prstGeom prst="rect">
             <a:avLst/>
@@ -13783,7 +13861,7 @@
         <p:spPr>
           <a:xfrm>
             <a:off x="648000" y="1836000"/>
-            <a:ext cx="3236040" cy="342360"/>
+            <a:ext cx="3235680" cy="342000"/>
           </a:xfrm>
           <a:prstGeom prst="rect">
             <a:avLst/>
@@ -13834,7 +13912,7 @@
         <p:spPr>
           <a:xfrm>
             <a:off x="5436000" y="2160000"/>
-            <a:ext cx="3236040" cy="342360"/>
+            <a:ext cx="3235680" cy="342000"/>
           </a:xfrm>
           <a:prstGeom prst="rect">
             <a:avLst/>
@@ -13912,7 +13990,7 @@
         <p:spPr>
           <a:xfrm>
             <a:off x="8676000" y="2988000"/>
-            <a:ext cx="1040040" cy="752040"/>
+            <a:ext cx="1039680" cy="751680"/>
           </a:xfrm>
           <a:prstGeom prst="rect">
             <a:avLst/>
@@ -14050,7 +14128,7 @@
         <p:spPr>
           <a:xfrm>
             <a:off x="2448000" y="4464000"/>
-            <a:ext cx="5828040" cy="752040"/>
+            <a:ext cx="5827680" cy="751680"/>
           </a:xfrm>
           <a:prstGeom prst="rect">
             <a:avLst/>
@@ -15912,7 +15990,7 @@
         <p:spPr>
           <a:xfrm>
             <a:off x="1728000" y="1741680"/>
-            <a:ext cx="1148400" cy="342720"/>
+            <a:ext cx="1148040" cy="342360"/>
           </a:xfrm>
           <a:prstGeom prst="rect">
             <a:avLst/>
@@ -15963,7 +16041,7 @@
         <p:spPr>
           <a:xfrm>
             <a:off x="6480000" y="648000"/>
-            <a:ext cx="1688400" cy="342720"/>
+            <a:ext cx="1688040" cy="342360"/>
           </a:xfrm>
           <a:prstGeom prst="rect">
             <a:avLst/>
@@ -16044,7 +16122,7 @@
         <p:spPr>
           <a:xfrm>
             <a:off x="1908000" y="936000"/>
-            <a:ext cx="1432080" cy="784080"/>
+            <a:ext cx="1431720" cy="783720"/>
           </a:xfrm>
           <a:prstGeom prst="rect">
             <a:avLst/>
@@ -16099,7 +16177,7 @@
         <p:spPr>
           <a:xfrm>
             <a:off x="6084000" y="936000"/>
-            <a:ext cx="1432080" cy="784080"/>
+            <a:ext cx="1431720" cy="783720"/>
           </a:xfrm>
           <a:prstGeom prst="rect">
             <a:avLst/>
@@ -16154,7 +16232,7 @@
         <p:spPr>
           <a:xfrm>
             <a:off x="1908000" y="4068000"/>
-            <a:ext cx="1432080" cy="784080"/>
+            <a:ext cx="1431720" cy="783720"/>
           </a:xfrm>
           <a:prstGeom prst="rect">
             <a:avLst/>
@@ -16209,7 +16287,7 @@
         <p:spPr>
           <a:xfrm>
             <a:off x="4032000" y="648000"/>
-            <a:ext cx="1432080" cy="1360080"/>
+            <a:ext cx="1431720" cy="1359720"/>
           </a:xfrm>
           <a:custGeom>
             <a:avLst/>
@@ -16307,7 +16385,7 @@
         <p:spPr>
           <a:xfrm>
             <a:off x="1872000" y="2232360"/>
-            <a:ext cx="1432080" cy="1360080"/>
+            <a:ext cx="1431720" cy="1359720"/>
           </a:xfrm>
           <a:custGeom>
             <a:avLst/>
@@ -16513,7 +16591,7 @@
         <p:spPr>
           <a:xfrm>
             <a:off x="5184000" y="2340000"/>
-            <a:ext cx="2008080" cy="568080"/>
+            <a:ext cx="2007720" cy="567720"/>
           </a:xfrm>
           <a:prstGeom prst="ellipse">
             <a:avLst/>
@@ -16568,7 +16646,7 @@
         <p:spPr>
           <a:xfrm>
             <a:off x="3960360" y="3240360"/>
-            <a:ext cx="2008080" cy="568080"/>
+            <a:ext cx="2007720" cy="567720"/>
           </a:xfrm>
           <a:prstGeom prst="ellipse">
             <a:avLst/>
@@ -16911,7 +16989,7 @@
         <p:spPr>
           <a:xfrm>
             <a:off x="144000" y="2057400"/>
-            <a:ext cx="2511360" cy="599040"/>
+            <a:ext cx="2511000" cy="598680"/>
           </a:xfrm>
           <a:prstGeom prst="rect">
             <a:avLst/>
@@ -16962,7 +17040,7 @@
         <p:spPr>
           <a:xfrm>
             <a:off x="3405600" y="976680"/>
-            <a:ext cx="2968560" cy="343080"/>
+            <a:ext cx="2968200" cy="342720"/>
           </a:xfrm>
           <a:prstGeom prst="rect">
             <a:avLst/>
@@ -17097,7 +17175,7 @@
         <p:spPr>
           <a:xfrm>
             <a:off x="457200" y="3742200"/>
-            <a:ext cx="2968560" cy="855000"/>
+            <a:ext cx="2968200" cy="854640"/>
           </a:xfrm>
           <a:prstGeom prst="rect">
             <a:avLst/>
@@ -17148,7 +17226,7 @@
         <p:spPr>
           <a:xfrm>
             <a:off x="3866400" y="3742200"/>
-            <a:ext cx="2531160" cy="1110960"/>
+            <a:ext cx="2530800" cy="1110600"/>
           </a:xfrm>
           <a:prstGeom prst="rect">
             <a:avLst/>
@@ -17199,7 +17277,7 @@
         <p:spPr>
           <a:xfrm>
             <a:off x="7086600" y="3706200"/>
-            <a:ext cx="2739960" cy="1091160"/>
+            <a:ext cx="2739600" cy="1090800"/>
           </a:xfrm>
           <a:prstGeom prst="rect">
             <a:avLst/>
@@ -17250,7 +17328,7 @@
         <p:spPr>
           <a:xfrm>
             <a:off x="7488360" y="2057760"/>
-            <a:ext cx="2511360" cy="343080"/>
+            <a:ext cx="2511000" cy="342720"/>
           </a:xfrm>
           <a:prstGeom prst="rect">
             <a:avLst/>
@@ -17612,7 +17690,7 @@
         <p:spPr>
           <a:xfrm>
             <a:off x="144000" y="2057400"/>
-            <a:ext cx="2511360" cy="599040"/>
+            <a:ext cx="2511000" cy="598680"/>
           </a:xfrm>
           <a:prstGeom prst="rect">
             <a:avLst/>
@@ -17663,7 +17741,7 @@
         <p:spPr>
           <a:xfrm>
             <a:off x="3405600" y="976680"/>
-            <a:ext cx="2968560" cy="343080"/>
+            <a:ext cx="2968200" cy="342720"/>
           </a:xfrm>
           <a:prstGeom prst="rect">
             <a:avLst/>
@@ -17798,7 +17876,7 @@
         <p:spPr>
           <a:xfrm>
             <a:off x="842400" y="3742200"/>
-            <a:ext cx="1694160" cy="1110960"/>
+            <a:ext cx="1693800" cy="1110600"/>
           </a:xfrm>
           <a:prstGeom prst="rect">
             <a:avLst/>
@@ -17849,7 +17927,7 @@
         <p:spPr>
           <a:xfrm>
             <a:off x="2822400" y="3742200"/>
-            <a:ext cx="2207160" cy="855000"/>
+            <a:ext cx="2206800" cy="854640"/>
           </a:xfrm>
           <a:prstGeom prst="rect">
             <a:avLst/>
@@ -17900,7 +17978,7 @@
         <p:spPr>
           <a:xfrm>
             <a:off x="7772400" y="3706200"/>
-            <a:ext cx="2054160" cy="633960"/>
+            <a:ext cx="2053800" cy="633600"/>
           </a:xfrm>
           <a:prstGeom prst="rect">
             <a:avLst/>
@@ -17951,7 +18029,7 @@
         <p:spPr>
           <a:xfrm>
             <a:off x="7488360" y="2057760"/>
-            <a:ext cx="2511360" cy="343080"/>
+            <a:ext cx="2511000" cy="342720"/>
           </a:xfrm>
           <a:prstGeom prst="rect">
             <a:avLst/>
@@ -18030,7 +18108,7 @@
         <p:spPr>
           <a:xfrm>
             <a:off x="5090400" y="3742200"/>
-            <a:ext cx="2207160" cy="855000"/>
+            <a:ext cx="2206800" cy="854640"/>
           </a:xfrm>
           <a:prstGeom prst="rect">
             <a:avLst/>
@@ -18111,7 +18189,7 @@
         <p:spPr>
           <a:xfrm>
             <a:off x="1564920" y="685800"/>
-            <a:ext cx="177840" cy="343440"/>
+            <a:ext cx="177480" cy="343080"/>
           </a:xfrm>
           <a:prstGeom prst="rect">
             <a:avLst/>
@@ -18137,7 +18215,7 @@
         <p:spPr>
           <a:xfrm>
             <a:off x="228600" y="228600"/>
-            <a:ext cx="1140120" cy="343440"/>
+            <a:ext cx="1139760" cy="343080"/>
           </a:xfrm>
           <a:prstGeom prst="rect">
             <a:avLst/>
@@ -18188,7 +18266,7 @@
         <p:spPr>
           <a:xfrm>
             <a:off x="169200" y="950400"/>
-            <a:ext cx="2054520" cy="454320"/>
+            <a:ext cx="2054160" cy="453960"/>
           </a:xfrm>
           <a:prstGeom prst="rect">
             <a:avLst/>
@@ -18601,7 +18679,7 @@
                       <a:noAutofit/>
                     </a:bodyPr>
                     <a:p>
-                      <a:pPr marL="216000" indent="-213120">
+                      <a:pPr marL="216000" indent="-212760">
                         <a:lnSpc>
                           <a:spcPct val="100000"/>
                         </a:lnSpc>
@@ -18924,7 +19002,7 @@
                       <a:noAutofit/>
                     </a:bodyPr>
                     <a:p>
-                      <a:pPr marL="216000" indent="-213120">
+                      <a:pPr marL="216000" indent="-212760">
                         <a:lnSpc>
                           <a:spcPct val="100000"/>
                         </a:lnSpc>
@@ -19404,7 +19482,7 @@
                       <a:noAutofit/>
                     </a:bodyPr>
                     <a:p>
-                      <a:pPr marL="216000" indent="-213120">
+                      <a:pPr marL="216000" indent="-212760">
                         <a:lnSpc>
                           <a:spcPct val="100000"/>
                         </a:lnSpc>
@@ -19700,7 +19778,7 @@
                       <a:noAutofit/>
                     </a:bodyPr>
                     <a:p>
-                      <a:pPr marL="216000" indent="-213120">
+                      <a:pPr marL="216000" indent="-212760">
                         <a:lnSpc>
                           <a:spcPct val="100000"/>
                         </a:lnSpc>
@@ -19968,7 +20046,7 @@
                       <a:noAutofit/>
                     </a:bodyPr>
                     <a:p>
-                      <a:pPr marL="216000" indent="-213120">
+                      <a:pPr marL="216000" indent="-212760">
                         <a:lnSpc>
                           <a:spcPct val="100000"/>
                         </a:lnSpc>
@@ -20207,7 +20285,7 @@
                       <a:noAutofit/>
                     </a:bodyPr>
                     <a:p>
-                      <a:pPr marL="216000" indent="-213120">
+                      <a:pPr marL="216000" indent="-212760">
                         <a:lnSpc>
                           <a:spcPct val="100000"/>
                         </a:lnSpc>
@@ -20353,7 +20431,7 @@
         <p:spPr>
           <a:xfrm>
             <a:off x="2057400" y="685800"/>
-            <a:ext cx="1140480" cy="343800"/>
+            <a:ext cx="1140120" cy="343440"/>
           </a:xfrm>
           <a:prstGeom prst="rect">
             <a:avLst/>
@@ -20404,7 +20482,7 @@
         <p:spPr>
           <a:xfrm>
             <a:off x="5670720" y="685800"/>
-            <a:ext cx="1140480" cy="343800"/>
+            <a:ext cx="1140120" cy="343440"/>
           </a:xfrm>
           <a:prstGeom prst="rect">
             <a:avLst/>
@@ -20455,7 +20533,7 @@
         <p:spPr>
           <a:xfrm>
             <a:off x="8229600" y="2168280"/>
-            <a:ext cx="1140480" cy="343800"/>
+            <a:ext cx="1140120" cy="343440"/>
           </a:xfrm>
           <a:prstGeom prst="rect">
             <a:avLst/>
@@ -20506,7 +20584,7 @@
         <p:spPr>
           <a:xfrm>
             <a:off x="4572000" y="3311280"/>
-            <a:ext cx="1140480" cy="343800"/>
+            <a:ext cx="1140120" cy="343440"/>
           </a:xfrm>
           <a:prstGeom prst="rect">
             <a:avLst/>
@@ -20643,7 +20721,7 @@
         <p:spPr>
           <a:xfrm>
             <a:off x="1564920" y="685800"/>
-            <a:ext cx="177840" cy="343440"/>
+            <a:ext cx="177480" cy="343080"/>
           </a:xfrm>
           <a:prstGeom prst="rect">
             <a:avLst/>
@@ -20669,7 +20747,7 @@
         <p:spPr>
           <a:xfrm>
             <a:off x="228600" y="228600"/>
-            <a:ext cx="1140120" cy="343440"/>
+            <a:ext cx="1139760" cy="343080"/>
           </a:xfrm>
           <a:prstGeom prst="rect">
             <a:avLst/>
@@ -20842,7 +20920,7 @@
                       <a:noAutofit/>
                     </a:bodyPr>
                     <a:p>
-                      <a:pPr marL="216000" indent="-213120">
+                      <a:pPr marL="216000" indent="-212760">
                         <a:lnSpc>
                           <a:spcPct val="100000"/>
                         </a:lnSpc>
@@ -21322,7 +21400,7 @@
                       <a:noAutofit/>
                     </a:bodyPr>
                     <a:p>
-                      <a:pPr marL="216000" indent="-213120">
+                      <a:pPr marL="216000" indent="-212760">
                         <a:lnSpc>
                           <a:spcPct val="100000"/>
                         </a:lnSpc>
@@ -21590,7 +21668,7 @@
                       <a:noAutofit/>
                     </a:bodyPr>
                     <a:p>
-                      <a:pPr marL="216000" indent="-213120">
+                      <a:pPr marL="216000" indent="-212760">
                         <a:lnSpc>
                           <a:spcPct val="100000"/>
                         </a:lnSpc>
@@ -21858,7 +21936,7 @@
                       <a:noAutofit/>
                     </a:bodyPr>
                     <a:p>
-                      <a:pPr marL="216000" indent="-213120">
+                      <a:pPr marL="216000" indent="-212760">
                         <a:lnSpc>
                           <a:spcPct val="100000"/>
                         </a:lnSpc>
@@ -22097,7 +22175,7 @@
                       <a:noAutofit/>
                     </a:bodyPr>
                     <a:p>
-                      <a:pPr marL="216000" indent="-213120">
+                      <a:pPr marL="216000" indent="-212760">
                         <a:lnSpc>
                           <a:spcPct val="100000"/>
                         </a:lnSpc>
@@ -22365,7 +22443,7 @@
                       <a:noAutofit/>
                     </a:bodyPr>
                     <a:p>
-                      <a:pPr marL="216000" indent="-213120">
+                      <a:pPr marL="216000" indent="-212760">
                         <a:lnSpc>
                           <a:spcPct val="100000"/>
                         </a:lnSpc>
@@ -22539,7 +22617,7 @@
         <p:spPr>
           <a:xfrm>
             <a:off x="6436080" y="1371600"/>
-            <a:ext cx="1140480" cy="343800"/>
+            <a:ext cx="1140120" cy="343440"/>
           </a:xfrm>
           <a:prstGeom prst="rect">
             <a:avLst/>
@@ -22704,7 +22782,7 @@
         <p:spPr>
           <a:xfrm>
             <a:off x="1564920" y="685800"/>
-            <a:ext cx="177840" cy="343440"/>
+            <a:ext cx="177480" cy="343080"/>
           </a:xfrm>
           <a:prstGeom prst="rect">
             <a:avLst/>
@@ -22730,7 +22808,7 @@
         <p:spPr>
           <a:xfrm>
             <a:off x="228600" y="228600"/>
-            <a:ext cx="1140120" cy="343440"/>
+            <a:ext cx="1139760" cy="343080"/>
           </a:xfrm>
           <a:prstGeom prst="rect">
             <a:avLst/>
@@ -22903,7 +22981,7 @@
                       <a:noAutofit/>
                     </a:bodyPr>
                     <a:p>
-                      <a:pPr marL="216000" indent="-213120">
+                      <a:pPr marL="216000" indent="-212760">
                         <a:lnSpc>
                           <a:spcPct val="100000"/>
                         </a:lnSpc>
@@ -23383,7 +23461,7 @@
                       <a:noAutofit/>
                     </a:bodyPr>
                     <a:p>
-                      <a:pPr marL="216000" indent="-213120">
+                      <a:pPr marL="216000" indent="-212760">
                         <a:lnSpc>
                           <a:spcPct val="100000"/>
                         </a:lnSpc>
@@ -23651,7 +23729,7 @@
                       <a:noAutofit/>
                     </a:bodyPr>
                     <a:p>
-                      <a:pPr marL="216000" indent="-213120">
+                      <a:pPr marL="216000" indent="-212760">
                         <a:lnSpc>
                           <a:spcPct val="100000"/>
                         </a:lnSpc>
@@ -23797,7 +23875,7 @@
         <p:spPr>
           <a:xfrm>
             <a:off x="799920" y="4158720"/>
-            <a:ext cx="177840" cy="424440"/>
+            <a:ext cx="177480" cy="424080"/>
           </a:xfrm>
           <a:prstGeom prst="rect">
             <a:avLst/>
@@ -23945,7 +24023,7 @@
                       <a:noAutofit/>
                     </a:bodyPr>
                     <a:p>
-                      <a:pPr marL="216000" indent="-213120">
+                      <a:pPr marL="216000" indent="-212760">
                         <a:lnSpc>
                           <a:spcPct val="100000"/>
                         </a:lnSpc>
@@ -24397,7 +24475,7 @@
                       <a:noAutofit/>
                     </a:bodyPr>
                     <a:p>
-                      <a:pPr marL="216000" indent="-213120">
+                      <a:pPr marL="216000" indent="-212760">
                         <a:lnSpc>
                           <a:spcPct val="100000"/>
                         </a:lnSpc>
@@ -24665,7 +24743,7 @@
                       <a:noAutofit/>
                     </a:bodyPr>
                     <a:p>
-                      <a:pPr marL="216000" indent="-213120">
+                      <a:pPr marL="216000" indent="-212760">
                         <a:lnSpc>
                           <a:spcPct val="100000"/>
                         </a:lnSpc>
@@ -25417,7 +25495,7 @@
         <p:spPr>
           <a:xfrm>
             <a:off x="5257800" y="2625480"/>
-            <a:ext cx="1140480" cy="343800"/>
+            <a:ext cx="1140120" cy="343440"/>
           </a:xfrm>
           <a:prstGeom prst="rect">
             <a:avLst/>
@@ -25638,7 +25716,7 @@
         <p:spPr>
           <a:xfrm>
             <a:off x="685800" y="685800"/>
-            <a:ext cx="4113000" cy="344520"/>
+            <a:ext cx="4112640" cy="344160"/>
           </a:xfrm>
           <a:prstGeom prst="rect">
             <a:avLst/>
@@ -25689,7 +25767,7 @@
         <p:spPr>
           <a:xfrm>
             <a:off x="3988800" y="1636200"/>
-            <a:ext cx="912600" cy="912600"/>
+            <a:ext cx="912240" cy="912240"/>
           </a:xfrm>
           <a:prstGeom prst="ellipse">
             <a:avLst/>
@@ -25764,7 +25842,7 @@
         <p:spPr>
           <a:xfrm>
             <a:off x="6841440" y="1622160"/>
-            <a:ext cx="912600" cy="912600"/>
+            <a:ext cx="912240" cy="912240"/>
           </a:xfrm>
           <a:prstGeom prst="ellipse">
             <a:avLst/>
@@ -25819,7 +25897,7 @@
         <p:spPr>
           <a:xfrm>
             <a:off x="1945440" y="2594160"/>
-            <a:ext cx="912600" cy="912600"/>
+            <a:ext cx="912240" cy="912240"/>
           </a:xfrm>
           <a:prstGeom prst="ellipse">
             <a:avLst/>
@@ -25874,7 +25952,7 @@
         <p:spPr>
           <a:xfrm>
             <a:off x="6877440" y="3638160"/>
-            <a:ext cx="912600" cy="912600"/>
+            <a:ext cx="912240" cy="912240"/>
           </a:xfrm>
           <a:prstGeom prst="ellipse">
             <a:avLst/>
@@ -25929,7 +26007,7 @@
         <p:spPr>
           <a:xfrm>
             <a:off x="3997440" y="3638160"/>
-            <a:ext cx="912600" cy="912600"/>
+            <a:ext cx="912240" cy="912240"/>
           </a:xfrm>
           <a:prstGeom prst="ellipse">
             <a:avLst/>
@@ -26154,7 +26232,7 @@
         <p:spPr>
           <a:xfrm>
             <a:off x="360000" y="324000"/>
-            <a:ext cx="6262560" cy="430560"/>
+            <a:ext cx="6262200" cy="430200"/>
           </a:xfrm>
           <a:prstGeom prst="rect">
             <a:avLst/>
@@ -26205,7 +26283,7 @@
         <p:spPr>
           <a:xfrm>
             <a:off x="612000" y="4464000"/>
-            <a:ext cx="718560" cy="646560"/>
+            <a:ext cx="718200" cy="646200"/>
           </a:xfrm>
           <a:prstGeom prst="ellipse">
             <a:avLst/>
@@ -26260,7 +26338,7 @@
         <p:spPr>
           <a:xfrm>
             <a:off x="1512360" y="4464360"/>
-            <a:ext cx="718560" cy="646560"/>
+            <a:ext cx="718200" cy="646200"/>
           </a:xfrm>
           <a:prstGeom prst="ellipse">
             <a:avLst/>
@@ -26315,7 +26393,7 @@
         <p:spPr>
           <a:xfrm>
             <a:off x="2448360" y="4464360"/>
-            <a:ext cx="718560" cy="646560"/>
+            <a:ext cx="718200" cy="646200"/>
           </a:xfrm>
           <a:prstGeom prst="ellipse">
             <a:avLst/>
@@ -26370,7 +26448,7 @@
         <p:spPr>
           <a:xfrm>
             <a:off x="3420360" y="4464360"/>
-            <a:ext cx="718560" cy="646560"/>
+            <a:ext cx="718200" cy="646200"/>
           </a:xfrm>
           <a:prstGeom prst="ellipse">
             <a:avLst/>
@@ -26425,7 +26503,7 @@
         <p:spPr>
           <a:xfrm>
             <a:off x="4392360" y="4464360"/>
-            <a:ext cx="718560" cy="646560"/>
+            <a:ext cx="718200" cy="646200"/>
           </a:xfrm>
           <a:prstGeom prst="ellipse">
             <a:avLst/>
@@ -26480,7 +26558,7 @@
         <p:spPr>
           <a:xfrm>
             <a:off x="5292360" y="4464360"/>
-            <a:ext cx="718560" cy="646560"/>
+            <a:ext cx="718200" cy="646200"/>
           </a:xfrm>
           <a:prstGeom prst="ellipse">
             <a:avLst/>
@@ -26535,7 +26613,7 @@
         <p:spPr>
           <a:xfrm>
             <a:off x="1476360" y="3528360"/>
-            <a:ext cx="718560" cy="646560"/>
+            <a:ext cx="718200" cy="646200"/>
           </a:xfrm>
           <a:prstGeom prst="ellipse">
             <a:avLst/>
@@ -26590,7 +26668,7 @@
         <p:spPr>
           <a:xfrm>
             <a:off x="2412720" y="2988720"/>
-            <a:ext cx="718560" cy="646560"/>
+            <a:ext cx="718200" cy="646200"/>
           </a:xfrm>
           <a:prstGeom prst="ellipse">
             <a:avLst/>
@@ -26645,7 +26723,7 @@
         <p:spPr>
           <a:xfrm>
             <a:off x="3385080" y="2485080"/>
-            <a:ext cx="718560" cy="646560"/>
+            <a:ext cx="718200" cy="646200"/>
           </a:xfrm>
           <a:prstGeom prst="ellipse">
             <a:avLst/>
@@ -26700,7 +26778,7 @@
         <p:spPr>
           <a:xfrm>
             <a:off x="4321440" y="1981440"/>
-            <a:ext cx="718560" cy="646560"/>
+            <a:ext cx="718200" cy="646200"/>
           </a:xfrm>
           <a:prstGeom prst="ellipse">
             <a:avLst/>
@@ -26755,7 +26833,7 @@
         <p:spPr>
           <a:xfrm>
             <a:off x="5257800" y="1549800"/>
-            <a:ext cx="718560" cy="646560"/>
+            <a:ext cx="718200" cy="646200"/>
           </a:xfrm>
           <a:prstGeom prst="ellipse">
             <a:avLst/>
@@ -27390,7 +27468,7 @@
         <p:spPr>
           <a:xfrm>
             <a:off x="360000" y="324000"/>
-            <a:ext cx="6262560" cy="430560"/>
+            <a:ext cx="6262200" cy="430200"/>
           </a:xfrm>
           <a:prstGeom prst="rect">
             <a:avLst/>
@@ -27441,7 +27519,7 @@
         <p:spPr>
           <a:xfrm>
             <a:off x="612000" y="4464000"/>
-            <a:ext cx="718560" cy="646560"/>
+            <a:ext cx="718200" cy="646200"/>
           </a:xfrm>
           <a:prstGeom prst="ellipse">
             <a:avLst/>
@@ -27496,7 +27574,7 @@
         <p:spPr>
           <a:xfrm>
             <a:off x="1512360" y="4464360"/>
-            <a:ext cx="718560" cy="646560"/>
+            <a:ext cx="718200" cy="646200"/>
           </a:xfrm>
           <a:prstGeom prst="ellipse">
             <a:avLst/>
@@ -27551,7 +27629,7 @@
         <p:spPr>
           <a:xfrm>
             <a:off x="2448360" y="4464360"/>
-            <a:ext cx="718560" cy="646560"/>
+            <a:ext cx="718200" cy="646200"/>
           </a:xfrm>
           <a:prstGeom prst="ellipse">
             <a:avLst/>
@@ -27606,7 +27684,7 @@
         <p:spPr>
           <a:xfrm>
             <a:off x="3420360" y="4464360"/>
-            <a:ext cx="718560" cy="646560"/>
+            <a:ext cx="718200" cy="646200"/>
           </a:xfrm>
           <a:prstGeom prst="ellipse">
             <a:avLst/>
@@ -27661,7 +27739,7 @@
         <p:spPr>
           <a:xfrm>
             <a:off x="4392360" y="4464360"/>
-            <a:ext cx="718560" cy="646560"/>
+            <a:ext cx="718200" cy="646200"/>
           </a:xfrm>
           <a:prstGeom prst="ellipse">
             <a:avLst/>
@@ -27716,7 +27794,7 @@
         <p:spPr>
           <a:xfrm>
             <a:off x="5292360" y="4464360"/>
-            <a:ext cx="718560" cy="646560"/>
+            <a:ext cx="718200" cy="646200"/>
           </a:xfrm>
           <a:prstGeom prst="ellipse">
             <a:avLst/>
@@ -27771,7 +27849,7 @@
         <p:spPr>
           <a:xfrm>
             <a:off x="1080360" y="3528360"/>
-            <a:ext cx="718560" cy="646560"/>
+            <a:ext cx="718200" cy="646200"/>
           </a:xfrm>
           <a:prstGeom prst="ellipse">
             <a:avLst/>
@@ -27826,7 +27904,7 @@
         <p:spPr>
           <a:xfrm>
             <a:off x="2880720" y="3492720"/>
-            <a:ext cx="718560" cy="646560"/>
+            <a:ext cx="718200" cy="646200"/>
           </a:xfrm>
           <a:prstGeom prst="ellipse">
             <a:avLst/>
@@ -27881,7 +27959,7 @@
         <p:spPr>
           <a:xfrm>
             <a:off x="2016000" y="2448000"/>
-            <a:ext cx="718560" cy="646560"/>
+            <a:ext cx="718200" cy="646200"/>
           </a:xfrm>
           <a:prstGeom prst="ellipse">
             <a:avLst/>
@@ -27936,7 +28014,7 @@
         <p:spPr>
           <a:xfrm>
             <a:off x="4753440" y="3493440"/>
-            <a:ext cx="718560" cy="646560"/>
+            <a:ext cx="718200" cy="646200"/>
           </a:xfrm>
           <a:prstGeom prst="ellipse">
             <a:avLst/>
@@ -27991,7 +28069,7 @@
         <p:spPr>
           <a:xfrm>
             <a:off x="3096000" y="1440000"/>
-            <a:ext cx="718560" cy="646560"/>
+            <a:ext cx="718200" cy="646200"/>
           </a:xfrm>
           <a:prstGeom prst="ellipse">
             <a:avLst/>
@@ -28356,7 +28434,7 @@
         <p:spPr>
           <a:xfrm>
             <a:off x="5544000" y="834120"/>
-            <a:ext cx="4174920" cy="430560"/>
+            <a:ext cx="4174560" cy="430200"/>
           </a:xfrm>
           <a:prstGeom prst="rect">
             <a:avLst/>
@@ -28407,7 +28485,7 @@
         <p:spPr>
           <a:xfrm>
             <a:off x="576000" y="2880000"/>
-            <a:ext cx="718560" cy="646560"/>
+            <a:ext cx="718200" cy="646200"/>
           </a:xfrm>
           <a:prstGeom prst="ellipse">
             <a:avLst/>
@@ -28462,7 +28540,7 @@
         <p:spPr>
           <a:xfrm>
             <a:off x="1476360" y="2880360"/>
-            <a:ext cx="718560" cy="646560"/>
+            <a:ext cx="718200" cy="646200"/>
           </a:xfrm>
           <a:prstGeom prst="ellipse">
             <a:avLst/>
@@ -28517,7 +28595,7 @@
         <p:spPr>
           <a:xfrm>
             <a:off x="2412360" y="2880360"/>
-            <a:ext cx="718560" cy="646560"/>
+            <a:ext cx="718200" cy="646200"/>
           </a:xfrm>
           <a:prstGeom prst="ellipse">
             <a:avLst/>
@@ -28572,7 +28650,7 @@
         <p:spPr>
           <a:xfrm>
             <a:off x="3384360" y="2880360"/>
-            <a:ext cx="718560" cy="646560"/>
+            <a:ext cx="718200" cy="646200"/>
           </a:xfrm>
           <a:prstGeom prst="ellipse">
             <a:avLst/>
@@ -28627,7 +28705,7 @@
         <p:spPr>
           <a:xfrm>
             <a:off x="4356360" y="2880360"/>
-            <a:ext cx="718560" cy="646560"/>
+            <a:ext cx="718200" cy="646200"/>
           </a:xfrm>
           <a:prstGeom prst="ellipse">
             <a:avLst/>
@@ -28682,7 +28760,7 @@
         <p:spPr>
           <a:xfrm>
             <a:off x="5256360" y="2880360"/>
-            <a:ext cx="718560" cy="646560"/>
+            <a:ext cx="718200" cy="646200"/>
           </a:xfrm>
           <a:prstGeom prst="ellipse">
             <a:avLst/>
@@ -28737,7 +28815,7 @@
         <p:spPr>
           <a:xfrm>
             <a:off x="1044360" y="1944360"/>
-            <a:ext cx="718560" cy="646560"/>
+            <a:ext cx="718200" cy="646200"/>
           </a:xfrm>
           <a:prstGeom prst="ellipse">
             <a:avLst/>
@@ -28792,7 +28870,7 @@
         <p:spPr>
           <a:xfrm>
             <a:off x="2844720" y="1908720"/>
-            <a:ext cx="718560" cy="646560"/>
+            <a:ext cx="718200" cy="646200"/>
           </a:xfrm>
           <a:prstGeom prst="ellipse">
             <a:avLst/>
@@ -28847,7 +28925,7 @@
         <p:spPr>
           <a:xfrm>
             <a:off x="1836000" y="1188000"/>
-            <a:ext cx="718560" cy="646560"/>
+            <a:ext cx="718200" cy="646200"/>
           </a:xfrm>
           <a:prstGeom prst="ellipse">
             <a:avLst/>
@@ -28902,7 +28980,7 @@
         <p:spPr>
           <a:xfrm>
             <a:off x="4717440" y="1909440"/>
-            <a:ext cx="718560" cy="646560"/>
+            <a:ext cx="718200" cy="646200"/>
           </a:xfrm>
           <a:prstGeom prst="ellipse">
             <a:avLst/>
@@ -28957,7 +29035,7 @@
         <p:spPr>
           <a:xfrm>
             <a:off x="3060000" y="432000"/>
-            <a:ext cx="718560" cy="646560"/>
+            <a:ext cx="718200" cy="646200"/>
           </a:xfrm>
           <a:prstGeom prst="ellipse">
             <a:avLst/>
@@ -29376,7 +29454,7 @@
         <p:spPr>
           <a:xfrm>
             <a:off x="1656000" y="4335840"/>
-            <a:ext cx="7054920" cy="1063080"/>
+            <a:ext cx="7054560" cy="1062720"/>
           </a:xfrm>
           <a:prstGeom prst="rect">
             <a:avLst/>
@@ -29457,7 +29535,7 @@
         <p:spPr>
           <a:xfrm>
             <a:off x="2880000" y="504000"/>
-            <a:ext cx="3815280" cy="1079280"/>
+            <a:ext cx="3814920" cy="1078920"/>
           </a:xfrm>
           <a:prstGeom prst="rect">
             <a:avLst/>
@@ -29532,7 +29610,7 @@
         <p:spPr>
           <a:xfrm>
             <a:off x="2880000" y="2448000"/>
-            <a:ext cx="3815280" cy="2951280"/>
+            <a:ext cx="3814920" cy="2950920"/>
           </a:xfrm>
           <a:prstGeom prst="rect">
             <a:avLst/>
@@ -29627,7 +29705,7 @@
         <p:spPr>
           <a:xfrm>
             <a:off x="7416000" y="2952000"/>
-            <a:ext cx="1943280" cy="1007280"/>
+            <a:ext cx="1942920" cy="1006920"/>
           </a:xfrm>
           <a:prstGeom prst="rect">
             <a:avLst/>
@@ -29682,7 +29760,7 @@
         <p:spPr>
           <a:xfrm>
             <a:off x="216000" y="2952000"/>
-            <a:ext cx="1943280" cy="1007280"/>
+            <a:ext cx="1942920" cy="1006920"/>
           </a:xfrm>
           <a:prstGeom prst="rect">
             <a:avLst/>
@@ -29737,7 +29815,7 @@
         <p:spPr>
           <a:xfrm>
             <a:off x="4536000" y="1800000"/>
-            <a:ext cx="143280" cy="503280"/>
+            <a:ext cx="142920" cy="502920"/>
           </a:xfrm>
           <a:custGeom>
             <a:avLst/>
@@ -29798,7 +29876,7 @@
         <p:spPr>
           <a:xfrm>
             <a:off x="4788000" y="1764000"/>
-            <a:ext cx="143280" cy="503280"/>
+            <a:ext cx="142920" cy="502920"/>
           </a:xfrm>
           <a:custGeom>
             <a:avLst/>
@@ -29859,7 +29937,7 @@
         <p:spPr>
           <a:xfrm>
             <a:off x="2304000" y="3384000"/>
-            <a:ext cx="503280" cy="143280"/>
+            <a:ext cx="502920" cy="142920"/>
           </a:xfrm>
           <a:custGeom>
             <a:avLst/>
@@ -29920,7 +29998,7 @@
         <p:spPr>
           <a:xfrm>
             <a:off x="6804000" y="3384360"/>
-            <a:ext cx="503280" cy="143280"/>
+            <a:ext cx="502920" cy="142920"/>
           </a:xfrm>
           <a:custGeom>
             <a:avLst/>
@@ -30011,7 +30089,7 @@
         <p:spPr>
           <a:xfrm>
             <a:off x="3060000" y="2268000"/>
-            <a:ext cx="1432080" cy="784080"/>
+            <a:ext cx="1431720" cy="783720"/>
           </a:xfrm>
           <a:prstGeom prst="rect">
             <a:avLst/>
@@ -30066,7 +30144,7 @@
         <p:spPr>
           <a:xfrm>
             <a:off x="5832000" y="1980000"/>
-            <a:ext cx="1432080" cy="1360080"/>
+            <a:ext cx="1431720" cy="1359720"/>
           </a:xfrm>
           <a:custGeom>
             <a:avLst/>
@@ -30218,7 +30296,7 @@
         <p:spPr>
           <a:xfrm>
             <a:off x="2376000" y="1044000"/>
-            <a:ext cx="1144080" cy="676080"/>
+            <a:ext cx="1143720" cy="675720"/>
           </a:xfrm>
           <a:prstGeom prst="ellipse">
             <a:avLst/>
@@ -30273,7 +30351,7 @@
         <p:spPr>
           <a:xfrm>
             <a:off x="3780360" y="1044360"/>
-            <a:ext cx="1144080" cy="676080"/>
+            <a:ext cx="1143720" cy="675720"/>
           </a:xfrm>
           <a:prstGeom prst="ellipse">
             <a:avLst/>
@@ -30328,7 +30406,7 @@
         <p:spPr>
           <a:xfrm>
             <a:off x="2376360" y="1044360"/>
-            <a:ext cx="1144080" cy="676080"/>
+            <a:ext cx="1143720" cy="675720"/>
           </a:xfrm>
           <a:prstGeom prst="ellipse">
             <a:avLst/>
@@ -30383,7 +30461,7 @@
         <p:spPr>
           <a:xfrm>
             <a:off x="1512720" y="2160720"/>
-            <a:ext cx="1144080" cy="676080"/>
+            <a:ext cx="1143720" cy="675720"/>
           </a:xfrm>
           <a:prstGeom prst="ellipse">
             <a:avLst/>
@@ -30519,7 +30597,7 @@
         <p:spPr>
           <a:xfrm>
             <a:off x="4500000" y="2376000"/>
-            <a:ext cx="1396080" cy="594360"/>
+            <a:ext cx="1395720" cy="594000"/>
           </a:xfrm>
           <a:prstGeom prst="rect">
             <a:avLst/>
@@ -30570,7 +30648,7 @@
         <p:spPr>
           <a:xfrm>
             <a:off x="4320000" y="3204360"/>
-            <a:ext cx="1396080" cy="594360"/>
+            <a:ext cx="1395720" cy="594000"/>
           </a:xfrm>
           <a:prstGeom prst="rect">
             <a:avLst/>
@@ -30651,7 +30729,7 @@
         <p:spPr>
           <a:xfrm>
             <a:off x="864000" y="1080000"/>
-            <a:ext cx="3095640" cy="3455640"/>
+            <a:ext cx="3095280" cy="3455280"/>
           </a:xfrm>
           <a:prstGeom prst="rect">
             <a:avLst/>
@@ -30706,7 +30784,7 @@
         <p:spPr>
           <a:xfrm>
             <a:off x="3384000" y="1656000"/>
-            <a:ext cx="575640" cy="935640"/>
+            <a:ext cx="575280" cy="935280"/>
           </a:xfrm>
           <a:prstGeom prst="rect">
             <a:avLst/>
@@ -30801,7 +30879,7 @@
         <p:spPr>
           <a:xfrm>
             <a:off x="3384000" y="2952000"/>
-            <a:ext cx="575640" cy="1007640"/>
+            <a:ext cx="575280" cy="1007280"/>
           </a:xfrm>
           <a:prstGeom prst="rect">
             <a:avLst/>
@@ -30896,7 +30974,7 @@
         <p:spPr>
           <a:xfrm>
             <a:off x="5832000" y="1692000"/>
-            <a:ext cx="2231640" cy="2159640"/>
+            <a:ext cx="2231280" cy="2159280"/>
           </a:xfrm>
           <a:prstGeom prst="rect">
             <a:avLst/>
@@ -30951,7 +31029,7 @@
         <p:spPr>
           <a:xfrm>
             <a:off x="3960000" y="2016000"/>
-            <a:ext cx="1871640" cy="215640"/>
+            <a:ext cx="1871280" cy="215280"/>
           </a:xfrm>
           <a:custGeom>
             <a:avLst/>
@@ -31012,7 +31090,7 @@
         <p:spPr>
           <a:xfrm>
             <a:off x="3960000" y="3168000"/>
-            <a:ext cx="1871640" cy="287640"/>
+            <a:ext cx="1871280" cy="287280"/>
           </a:xfrm>
           <a:custGeom>
             <a:avLst/>
@@ -31110,7 +31188,7 @@
         <p:spPr>
           <a:xfrm>
             <a:off x="4320000" y="4428000"/>
-            <a:ext cx="2519640" cy="345960"/>
+            <a:ext cx="2519280" cy="345600"/>
           </a:xfrm>
           <a:prstGeom prst="rect">
             <a:avLst/>
@@ -31138,7 +31216,11 @@
             </a:pPr>
             <a:r>
               <a:rPr b="0" lang="en-IN" sz="1800" spc="-1" strike="noStrike">
+                <a:solidFill>
+                  <a:srgbClr val="000000"/>
+                </a:solidFill>
                 <a:latin typeface="Arial"/>
+                <a:ea typeface="DejaVu Sans"/>
               </a:rPr>
               <a:t>Control Signals</a:t>
             </a:r>
@@ -31157,7 +31239,7 @@
         <p:spPr>
           <a:xfrm>
             <a:off x="4536000" y="2916000"/>
-            <a:ext cx="2519640" cy="345960"/>
+            <a:ext cx="2519280" cy="345600"/>
           </a:xfrm>
           <a:prstGeom prst="rect">
             <a:avLst/>
@@ -31185,7 +31267,11 @@
             </a:pPr>
             <a:r>
               <a:rPr b="0" lang="en-IN" sz="1800" spc="-1" strike="noStrike">
+                <a:solidFill>
+                  <a:srgbClr val="000000"/>
+                </a:solidFill>
                 <a:latin typeface="Arial"/>
+                <a:ea typeface="DejaVu Sans"/>
               </a:rPr>
               <a:t>Data</a:t>
             </a:r>
@@ -31204,7 +31290,7 @@
         <p:spPr>
           <a:xfrm>
             <a:off x="4248000" y="1764000"/>
-            <a:ext cx="2519640" cy="345960"/>
+            <a:ext cx="2519280" cy="345600"/>
           </a:xfrm>
           <a:prstGeom prst="rect">
             <a:avLst/>
@@ -31232,7 +31318,11 @@
             </a:pPr>
             <a:r>
               <a:rPr b="0" lang="en-IN" sz="1800" spc="-1" strike="noStrike">
+                <a:solidFill>
+                  <a:srgbClr val="000000"/>
+                </a:solidFill>
                 <a:latin typeface="Arial"/>
+                <a:ea typeface="DejaVu Sans"/>
               </a:rPr>
               <a:t>Address</a:t>
             </a:r>
@@ -31281,7 +31371,7 @@
         <p:spPr>
           <a:xfrm>
             <a:off x="720000" y="1800000"/>
-            <a:ext cx="1656000" cy="1008000"/>
+            <a:ext cx="1655640" cy="1007640"/>
           </a:xfrm>
           <a:prstGeom prst="rect">
             <a:avLst/>
@@ -31306,10 +31396,18 @@
             <a:noAutofit/>
           </a:bodyPr>
           <a:p>
-            <a:pPr algn="ctr"/>
+            <a:pPr algn="ctr">
+              <a:lnSpc>
+                <a:spcPct val="100000"/>
+              </a:lnSpc>
+            </a:pPr>
             <a:r>
               <a:rPr b="0" lang="en-IN" sz="1800" spc="-1" strike="noStrike">
+                <a:solidFill>
+                  <a:srgbClr val="000000"/>
+                </a:solidFill>
                 <a:latin typeface="Arial"/>
+                <a:ea typeface="DejaVu Sans"/>
               </a:rPr>
               <a:t>Input</a:t>
             </a:r>
@@ -31328,7 +31426,7 @@
         <p:spPr>
           <a:xfrm>
             <a:off x="2844000" y="1800000"/>
-            <a:ext cx="1656000" cy="1008000"/>
+            <a:ext cx="1655640" cy="1007640"/>
           </a:xfrm>
           <a:prstGeom prst="rect">
             <a:avLst/>
@@ -31353,10 +31451,18 @@
             <a:noAutofit/>
           </a:bodyPr>
           <a:p>
-            <a:pPr algn="ctr"/>
+            <a:pPr algn="ctr">
+              <a:lnSpc>
+                <a:spcPct val="100000"/>
+              </a:lnSpc>
+            </a:pPr>
             <a:r>
               <a:rPr b="0" lang="en-IN" sz="1800" spc="-1" strike="noStrike">
+                <a:solidFill>
+                  <a:srgbClr val="000000"/>
+                </a:solidFill>
                 <a:latin typeface="Arial"/>
+                <a:ea typeface="DejaVu Sans"/>
               </a:rPr>
               <a:t>Output</a:t>
             </a:r>
@@ -31375,7 +31481,7 @@
         <p:spPr>
           <a:xfrm>
             <a:off x="4932000" y="1800000"/>
-            <a:ext cx="1656000" cy="1008000"/>
+            <a:ext cx="1655640" cy="1007640"/>
           </a:xfrm>
           <a:prstGeom prst="rect">
             <a:avLst/>
@@ -31400,10 +31506,18 @@
             <a:noAutofit/>
           </a:bodyPr>
           <a:p>
-            <a:pPr algn="ctr"/>
+            <a:pPr algn="ctr">
+              <a:lnSpc>
+                <a:spcPct val="100000"/>
+              </a:lnSpc>
+            </a:pPr>
             <a:r>
               <a:rPr b="0" lang="en-IN" sz="1800" spc="-1" strike="noStrike">
+                <a:solidFill>
+                  <a:srgbClr val="000000"/>
+                </a:solidFill>
                 <a:latin typeface="Arial"/>
+                <a:ea typeface="DejaVu Sans"/>
               </a:rPr>
               <a:t>Memory</a:t>
             </a:r>
@@ -31422,7 +31536,7 @@
         <p:spPr>
           <a:xfrm>
             <a:off x="7056000" y="1800000"/>
-            <a:ext cx="1656000" cy="1008000"/>
+            <a:ext cx="1655640" cy="1007640"/>
           </a:xfrm>
           <a:prstGeom prst="rect">
             <a:avLst/>
@@ -31447,10 +31561,18 @@
             <a:noAutofit/>
           </a:bodyPr>
           <a:p>
-            <a:pPr algn="ctr"/>
+            <a:pPr algn="ctr">
+              <a:lnSpc>
+                <a:spcPct val="100000"/>
+              </a:lnSpc>
+            </a:pPr>
             <a:r>
               <a:rPr b="0" lang="en-IN" sz="1800" spc="-1" strike="noStrike">
+                <a:solidFill>
+                  <a:srgbClr val="000000"/>
+                </a:solidFill>
                 <a:latin typeface="Arial"/>
+                <a:ea typeface="DejaVu Sans"/>
               </a:rPr>
               <a:t>Processor</a:t>
             </a:r>
@@ -31469,13 +31591,13 @@
         <p:spPr>
           <a:xfrm>
             <a:off x="288000" y="3456000"/>
-            <a:ext cx="9216000" cy="792000"/>
+            <a:ext cx="9215640" cy="791640"/>
           </a:xfrm>
           <a:custGeom>
             <a:avLst/>
             <a:gdLst/>
             <a:ahLst/>
-            <a:rect l="0" t="0" r="r" b="b"/>
+            <a:rect l="l" t="t" r="r" b="b"/>
             <a:pathLst>
               <a:path w="25602" h="2202">
                 <a:moveTo>
@@ -31539,13 +31661,13 @@
         <p:spPr>
           <a:xfrm>
             <a:off x="1404000" y="2808000"/>
-            <a:ext cx="288000" cy="900000"/>
+            <a:ext cx="287640" cy="899640"/>
           </a:xfrm>
           <a:custGeom>
             <a:avLst/>
             <a:gdLst/>
             <a:ahLst/>
-            <a:rect l="0" t="0" r="r" b="b"/>
+            <a:rect l="l" t="t" r="r" b="b"/>
             <a:pathLst>
               <a:path w="802" h="2502">
                 <a:moveTo>
@@ -31600,13 +31722,13 @@
         <p:spPr>
           <a:xfrm>
             <a:off x="3456000" y="2772000"/>
-            <a:ext cx="288000" cy="936000"/>
+            <a:ext cx="287640" cy="935640"/>
           </a:xfrm>
           <a:custGeom>
             <a:avLst/>
             <a:gdLst/>
             <a:ahLst/>
-            <a:rect l="0" t="0" r="r" b="b"/>
+            <a:rect l="l" t="t" r="r" b="b"/>
             <a:pathLst>
               <a:path w="802" h="2602">
                 <a:moveTo>
@@ -31661,13 +31783,13 @@
         <p:spPr>
           <a:xfrm>
             <a:off x="5544000" y="2808000"/>
-            <a:ext cx="288000" cy="936000"/>
+            <a:ext cx="287640" cy="935640"/>
           </a:xfrm>
           <a:custGeom>
             <a:avLst/>
             <a:gdLst/>
             <a:ahLst/>
-            <a:rect l="0" t="0" r="r" b="b"/>
+            <a:rect l="l" t="t" r="r" b="b"/>
             <a:pathLst>
               <a:path w="802" h="2602">
                 <a:moveTo>
@@ -31731,13 +31853,13 @@
         <p:spPr>
           <a:xfrm>
             <a:off x="7740360" y="2808360"/>
-            <a:ext cx="288000" cy="936000"/>
+            <a:ext cx="287640" cy="935640"/>
           </a:xfrm>
           <a:custGeom>
             <a:avLst/>
             <a:gdLst/>
             <a:ahLst/>
-            <a:rect l="0" t="0" r="r" b="b"/>
+            <a:rect l="l" t="t" r="r" b="b"/>
             <a:pathLst>
               <a:path w="802" h="2602">
                 <a:moveTo>
@@ -31831,7 +31953,7 @@
         <p:spPr>
           <a:xfrm>
             <a:off x="864000" y="1152000"/>
-            <a:ext cx="1656000" cy="1152000"/>
+            <a:ext cx="1655640" cy="1151640"/>
           </a:xfrm>
           <a:prstGeom prst="rect">
             <a:avLst/>
@@ -31856,10 +31978,18 @@
             <a:noAutofit/>
           </a:bodyPr>
           <a:p>
-            <a:pPr algn="ctr"/>
+            <a:pPr algn="ctr">
+              <a:lnSpc>
+                <a:spcPct val="100000"/>
+              </a:lnSpc>
+            </a:pPr>
             <a:r>
               <a:rPr b="0" lang="en-IN" sz="1800" spc="-1" strike="noStrike">
+                <a:solidFill>
+                  <a:srgbClr val="000000"/>
+                </a:solidFill>
                 <a:latin typeface="Arial"/>
+                <a:ea typeface="DejaVu Sans"/>
               </a:rPr>
               <a:t>Processor</a:t>
             </a:r>
@@ -31878,7 +32008,7 @@
         <p:spPr>
           <a:xfrm>
             <a:off x="3420000" y="1152000"/>
-            <a:ext cx="1656000" cy="1152000"/>
+            <a:ext cx="1655640" cy="1151640"/>
           </a:xfrm>
           <a:prstGeom prst="rect">
             <a:avLst/>
@@ -31903,10 +32033,18 @@
             <a:noAutofit/>
           </a:bodyPr>
           <a:p>
-            <a:pPr algn="ctr"/>
+            <a:pPr algn="ctr">
+              <a:lnSpc>
+                <a:spcPct val="100000"/>
+              </a:lnSpc>
+            </a:pPr>
             <a:r>
               <a:rPr b="0" lang="en-IN" sz="1800" spc="-1" strike="noStrike">
+                <a:solidFill>
+                  <a:srgbClr val="000000"/>
+                </a:solidFill>
                 <a:latin typeface="Arial"/>
+                <a:ea typeface="DejaVu Sans"/>
               </a:rPr>
               <a:t>Memory</a:t>
             </a:r>
@@ -31925,7 +32063,7 @@
         <p:spPr>
           <a:xfrm>
             <a:off x="2304000" y="3996000"/>
-            <a:ext cx="1656000" cy="1152000"/>
+            <a:ext cx="1655640" cy="1151640"/>
           </a:xfrm>
           <a:prstGeom prst="rect">
             <a:avLst/>
@@ -31950,10 +32088,18 @@
             <a:noAutofit/>
           </a:bodyPr>
           <a:p>
-            <a:pPr algn="ctr"/>
+            <a:pPr algn="ctr">
+              <a:lnSpc>
+                <a:spcPct val="100000"/>
+              </a:lnSpc>
+            </a:pPr>
             <a:r>
               <a:rPr b="0" lang="en-IN" sz="1800" spc="-1" strike="noStrike">
+                <a:solidFill>
+                  <a:srgbClr val="000000"/>
+                </a:solidFill>
                 <a:latin typeface="Arial"/>
+                <a:ea typeface="DejaVu Sans"/>
               </a:rPr>
               <a:t>I/O Processor</a:t>
             </a:r>
@@ -31972,7 +32118,7 @@
         <p:spPr>
           <a:xfrm>
             <a:off x="7308000" y="1440000"/>
-            <a:ext cx="1656000" cy="1152000"/>
+            <a:ext cx="1655640" cy="1151640"/>
           </a:xfrm>
           <a:prstGeom prst="rect">
             <a:avLst/>
@@ -31997,10 +32143,18 @@
             <a:noAutofit/>
           </a:bodyPr>
           <a:p>
-            <a:pPr algn="ctr"/>
+            <a:pPr algn="ctr">
+              <a:lnSpc>
+                <a:spcPct val="100000"/>
+              </a:lnSpc>
+            </a:pPr>
             <a:r>
               <a:rPr b="0" lang="en-IN" sz="1800" spc="-1" strike="noStrike">
+                <a:solidFill>
+                  <a:srgbClr val="000000"/>
+                </a:solidFill>
                 <a:latin typeface="Arial"/>
+                <a:ea typeface="DejaVu Sans"/>
               </a:rPr>
               <a:t>Output</a:t>
             </a:r>
@@ -32019,7 +32173,7 @@
         <p:spPr>
           <a:xfrm>
             <a:off x="7308000" y="3204000"/>
-            <a:ext cx="1656000" cy="1152000"/>
+            <a:ext cx="1655640" cy="1151640"/>
           </a:xfrm>
           <a:prstGeom prst="rect">
             <a:avLst/>
@@ -32044,10 +32198,18 @@
             <a:noAutofit/>
           </a:bodyPr>
           <a:p>
-            <a:pPr algn="ctr"/>
+            <a:pPr algn="ctr">
+              <a:lnSpc>
+                <a:spcPct val="100000"/>
+              </a:lnSpc>
+            </a:pPr>
             <a:r>
               <a:rPr b="0" lang="en-IN" sz="1800" spc="-1" strike="noStrike">
+                <a:solidFill>
+                  <a:srgbClr val="000000"/>
+                </a:solidFill>
                 <a:latin typeface="Arial"/>
+                <a:ea typeface="DejaVu Sans"/>
               </a:rPr>
               <a:t>Input</a:t>
             </a:r>
@@ -32066,13 +32228,13 @@
         <p:spPr>
           <a:xfrm>
             <a:off x="6444000" y="1008000"/>
-            <a:ext cx="504000" cy="4248000"/>
+            <a:ext cx="503640" cy="4247640"/>
           </a:xfrm>
           <a:custGeom>
             <a:avLst/>
             <a:gdLst/>
             <a:ahLst/>
-            <a:rect l="0" t="0" r="r" b="b"/>
+            <a:rect l="l" t="t" r="r" b="b"/>
             <a:pathLst>
               <a:path w="1401" h="11801">
                 <a:moveTo>
@@ -32136,13 +32298,13 @@
         <p:spPr>
           <a:xfrm>
             <a:off x="3996000" y="4104000"/>
-            <a:ext cx="2592000" cy="720000"/>
+            <a:ext cx="2591640" cy="719640"/>
           </a:xfrm>
           <a:custGeom>
             <a:avLst/>
             <a:gdLst/>
             <a:ahLst/>
-            <a:rect l="0" t="0" r="r" b="b"/>
+            <a:rect l="l" t="t" r="r" b="b"/>
             <a:pathLst>
               <a:path w="7202" h="2002">
                 <a:moveTo>
@@ -32206,13 +32368,13 @@
         <p:spPr>
           <a:xfrm>
             <a:off x="288000" y="2952000"/>
-            <a:ext cx="5184000" cy="360000"/>
+            <a:ext cx="5183640" cy="359640"/>
           </a:xfrm>
           <a:custGeom>
             <a:avLst/>
             <a:gdLst/>
             <a:ahLst/>
-            <a:rect l="0" t="0" r="r" b="b"/>
+            <a:rect l="l" t="t" r="r" b="b"/>
             <a:pathLst>
               <a:path w="14402" h="1002">
                 <a:moveTo>
@@ -32276,13 +32438,13 @@
         <p:spPr>
           <a:xfrm>
             <a:off x="6804000" y="1944000"/>
-            <a:ext cx="468000" cy="216000"/>
+            <a:ext cx="467640" cy="215640"/>
           </a:xfrm>
           <a:custGeom>
             <a:avLst/>
             <a:gdLst/>
             <a:ahLst/>
-            <a:rect l="0" t="0" r="r" b="b"/>
+            <a:rect l="l" t="t" r="r" b="b"/>
             <a:pathLst>
               <a:path w="1302" h="602">
                 <a:moveTo>
@@ -32337,13 +32499,13 @@
         <p:spPr>
           <a:xfrm>
             <a:off x="6804000" y="3708000"/>
-            <a:ext cx="468000" cy="216000"/>
+            <a:ext cx="467640" cy="215640"/>
           </a:xfrm>
           <a:custGeom>
             <a:avLst/>
             <a:gdLst/>
             <a:ahLst/>
-            <a:rect l="0" t="0" r="r" b="b"/>
+            <a:rect l="l" t="t" r="r" b="b"/>
             <a:pathLst>
               <a:path w="1302" h="602">
                 <a:moveTo>
@@ -32398,13 +32560,13 @@
         <p:spPr>
           <a:xfrm>
             <a:off x="4068000" y="2304000"/>
-            <a:ext cx="288000" cy="720000"/>
+            <a:ext cx="287640" cy="719640"/>
           </a:xfrm>
           <a:custGeom>
             <a:avLst/>
             <a:gdLst/>
             <a:ahLst/>
-            <a:rect l="0" t="0" r="r" b="b"/>
+            <a:rect l="l" t="t" r="r" b="b"/>
             <a:pathLst>
               <a:path w="802" h="2002">
                 <a:moveTo>
@@ -32468,13 +32630,13 @@
         <p:spPr>
           <a:xfrm>
             <a:off x="1476360" y="2304360"/>
-            <a:ext cx="288000" cy="720000"/>
+            <a:ext cx="287640" cy="719640"/>
           </a:xfrm>
           <a:custGeom>
             <a:avLst/>
             <a:gdLst/>
             <a:ahLst/>
-            <a:rect l="0" t="0" r="r" b="b"/>
+            <a:rect l="l" t="t" r="r" b="b"/>
             <a:pathLst>
               <a:path w="802" h="2002">
                 <a:moveTo>
@@ -32538,13 +32700,13 @@
         <p:spPr>
           <a:xfrm>
             <a:off x="2952360" y="3240360"/>
-            <a:ext cx="288000" cy="720000"/>
+            <a:ext cx="287640" cy="719640"/>
           </a:xfrm>
           <a:custGeom>
             <a:avLst/>
             <a:gdLst/>
             <a:ahLst/>
-            <a:rect l="0" t="0" r="r" b="b"/>
+            <a:rect l="l" t="t" r="r" b="b"/>
             <a:pathLst>
               <a:path w="802" h="2002">
                 <a:moveTo>
@@ -32638,13 +32800,13 @@
         <p:spPr>
           <a:xfrm>
             <a:off x="4392000" y="648000"/>
-            <a:ext cx="504000" cy="4680000"/>
+            <a:ext cx="503640" cy="4679640"/>
           </a:xfrm>
           <a:custGeom>
             <a:avLst/>
             <a:gdLst/>
             <a:ahLst/>
-            <a:rect l="0" t="0" r="r" b="b"/>
+            <a:rect l="l" t="t" r="r" b="b"/>
             <a:pathLst>
               <a:path w="1401" h="13002">
                 <a:moveTo>
@@ -32738,7 +32900,7 @@
         <p:spPr>
           <a:xfrm>
             <a:off x="504000" y="576000"/>
-            <a:ext cx="424440" cy="1648440"/>
+            <a:ext cx="424080" cy="1648080"/>
           </a:xfrm>
           <a:prstGeom prst="ellipse">
             <a:avLst/>
@@ -32768,7 +32930,7 @@
         <p:spPr>
           <a:xfrm>
             <a:off x="1440360" y="576360"/>
-            <a:ext cx="424440" cy="1648440"/>
+            <a:ext cx="424080" cy="1648080"/>
           </a:xfrm>
           <a:prstGeom prst="ellipse">
             <a:avLst/>
@@ -32798,7 +32960,7 @@
         <p:spPr>
           <a:xfrm>
             <a:off x="3204720" y="612720"/>
-            <a:ext cx="424440" cy="1648440"/>
+            <a:ext cx="424080" cy="1648080"/>
           </a:xfrm>
           <a:prstGeom prst="ellipse">
             <a:avLst/>
@@ -32828,7 +32990,7 @@
         <p:spPr>
           <a:xfrm>
             <a:off x="4068720" y="576720"/>
-            <a:ext cx="424440" cy="1648440"/>
+            <a:ext cx="424080" cy="1648080"/>
           </a:xfrm>
           <a:prstGeom prst="ellipse">
             <a:avLst/>
@@ -32858,7 +33020,7 @@
         <p:spPr>
           <a:xfrm>
             <a:off x="504720" y="3204720"/>
-            <a:ext cx="424440" cy="1648440"/>
+            <a:ext cx="424080" cy="1648080"/>
           </a:xfrm>
           <a:prstGeom prst="ellipse">
             <a:avLst/>
@@ -32888,7 +33050,7 @@
         <p:spPr>
           <a:xfrm>
             <a:off x="1440720" y="3168720"/>
-            <a:ext cx="424440" cy="1648440"/>
+            <a:ext cx="424080" cy="1648080"/>
           </a:xfrm>
           <a:prstGeom prst="ellipse">
             <a:avLst/>
@@ -32918,7 +33080,7 @@
         <p:spPr>
           <a:xfrm>
             <a:off x="3240720" y="3168720"/>
-            <a:ext cx="424440" cy="1648440"/>
+            <a:ext cx="424080" cy="1648080"/>
           </a:xfrm>
           <a:prstGeom prst="ellipse">
             <a:avLst/>
@@ -32948,7 +33110,7 @@
         <p:spPr>
           <a:xfrm>
             <a:off x="4068720" y="3168720"/>
-            <a:ext cx="424440" cy="1648440"/>
+            <a:ext cx="424080" cy="1648080"/>
           </a:xfrm>
           <a:prstGeom prst="ellipse">
             <a:avLst/>
@@ -32978,7 +33140,7 @@
         <p:spPr>
           <a:xfrm>
             <a:off x="540000" y="936000"/>
-            <a:ext cx="496440" cy="338760"/>
+            <a:ext cx="496080" cy="338400"/>
           </a:xfrm>
           <a:prstGeom prst="rect">
             <a:avLst/>
@@ -33029,7 +33191,7 @@
         <p:spPr>
           <a:xfrm>
             <a:off x="540000" y="1512000"/>
-            <a:ext cx="496440" cy="338760"/>
+            <a:ext cx="496080" cy="338400"/>
           </a:xfrm>
           <a:prstGeom prst="rect">
             <a:avLst/>
@@ -33080,7 +33242,7 @@
         <p:spPr>
           <a:xfrm>
             <a:off x="1512000" y="1512000"/>
-            <a:ext cx="496440" cy="338760"/>
+            <a:ext cx="496080" cy="338400"/>
           </a:xfrm>
           <a:prstGeom prst="rect">
             <a:avLst/>
@@ -33131,7 +33293,7 @@
         <p:spPr>
           <a:xfrm>
             <a:off x="1512000" y="900000"/>
-            <a:ext cx="496440" cy="338760"/>
+            <a:ext cx="496080" cy="338400"/>
           </a:xfrm>
           <a:prstGeom prst="rect">
             <a:avLst/>
@@ -33182,7 +33344,7 @@
         <p:spPr>
           <a:xfrm>
             <a:off x="540000" y="1260000"/>
-            <a:ext cx="496440" cy="338760"/>
+            <a:ext cx="496080" cy="338400"/>
           </a:xfrm>
           <a:prstGeom prst="rect">
             <a:avLst/>
@@ -33233,7 +33395,7 @@
         <p:spPr>
           <a:xfrm>
             <a:off x="1512000" y="1224000"/>
-            <a:ext cx="496440" cy="338760"/>
+            <a:ext cx="496080" cy="338400"/>
           </a:xfrm>
           <a:prstGeom prst="rect">
             <a:avLst/>
@@ -33284,7 +33446,7 @@
         <p:spPr>
           <a:xfrm>
             <a:off x="3240000" y="900000"/>
-            <a:ext cx="496440" cy="338760"/>
+            <a:ext cx="496080" cy="338400"/>
           </a:xfrm>
           <a:prstGeom prst="rect">
             <a:avLst/>
@@ -33335,7 +33497,7 @@
         <p:spPr>
           <a:xfrm>
             <a:off x="4104000" y="900000"/>
-            <a:ext cx="496440" cy="338760"/>
+            <a:ext cx="496080" cy="338400"/>
           </a:xfrm>
           <a:prstGeom prst="rect">
             <a:avLst/>
@@ -33386,7 +33548,7 @@
         <p:spPr>
           <a:xfrm>
             <a:off x="4104000" y="1224000"/>
-            <a:ext cx="496440" cy="338760"/>
+            <a:ext cx="496080" cy="338400"/>
           </a:xfrm>
           <a:prstGeom prst="rect">
             <a:avLst/>
@@ -33437,7 +33599,7 @@
         <p:spPr>
           <a:xfrm>
             <a:off x="4104000" y="1620000"/>
-            <a:ext cx="496440" cy="338760"/>
+            <a:ext cx="496080" cy="338400"/>
           </a:xfrm>
           <a:prstGeom prst="rect">
             <a:avLst/>
@@ -33488,7 +33650,7 @@
         <p:spPr>
           <a:xfrm>
             <a:off x="576000" y="3492000"/>
-            <a:ext cx="496440" cy="338760"/>
+            <a:ext cx="496080" cy="338400"/>
           </a:xfrm>
           <a:prstGeom prst="rect">
             <a:avLst/>
@@ -33539,7 +33701,7 @@
         <p:spPr>
           <a:xfrm>
             <a:off x="576000" y="3852000"/>
-            <a:ext cx="496440" cy="338760"/>
+            <a:ext cx="496080" cy="338400"/>
           </a:xfrm>
           <a:prstGeom prst="rect">
             <a:avLst/>
@@ -33590,7 +33752,7 @@
         <p:spPr>
           <a:xfrm>
             <a:off x="576000" y="4176000"/>
-            <a:ext cx="496440" cy="338760"/>
+            <a:ext cx="496080" cy="338400"/>
           </a:xfrm>
           <a:prstGeom prst="rect">
             <a:avLst/>
@@ -33641,7 +33803,7 @@
         <p:spPr>
           <a:xfrm>
             <a:off x="1476000" y="3492000"/>
-            <a:ext cx="496440" cy="338760"/>
+            <a:ext cx="496080" cy="338400"/>
           </a:xfrm>
           <a:prstGeom prst="rect">
             <a:avLst/>
@@ -33692,7 +33854,7 @@
         <p:spPr>
           <a:xfrm>
             <a:off x="3240000" y="3492000"/>
-            <a:ext cx="496440" cy="338760"/>
+            <a:ext cx="496080" cy="338400"/>
           </a:xfrm>
           <a:prstGeom prst="rect">
             <a:avLst/>
@@ -33743,7 +33905,7 @@
         <p:spPr>
           <a:xfrm>
             <a:off x="3276000" y="3960000"/>
-            <a:ext cx="496440" cy="338760"/>
+            <a:ext cx="496080" cy="338400"/>
           </a:xfrm>
           <a:prstGeom prst="rect">
             <a:avLst/>
@@ -33794,7 +33956,7 @@
         <p:spPr>
           <a:xfrm>
             <a:off x="4140000" y="3492000"/>
-            <a:ext cx="496440" cy="338760"/>
+            <a:ext cx="496080" cy="338400"/>
           </a:xfrm>
           <a:prstGeom prst="rect">
             <a:avLst/>
@@ -33845,7 +34007,7 @@
         <p:spPr>
           <a:xfrm>
             <a:off x="4140000" y="3924000"/>
-            <a:ext cx="496440" cy="338760"/>
+            <a:ext cx="496080" cy="338400"/>
           </a:xfrm>
           <a:prstGeom prst="rect">
             <a:avLst/>
@@ -34193,7 +34355,7 @@
         <p:spPr>
           <a:xfrm>
             <a:off x="540000" y="2412000"/>
-            <a:ext cx="1288440" cy="338760"/>
+            <a:ext cx="1288080" cy="338400"/>
           </a:xfrm>
           <a:prstGeom prst="rect">
             <a:avLst/>
@@ -34244,7 +34406,7 @@
         <p:spPr>
           <a:xfrm>
             <a:off x="3168000" y="2412000"/>
-            <a:ext cx="1432440" cy="388440"/>
+            <a:ext cx="1432080" cy="388080"/>
           </a:xfrm>
           <a:prstGeom prst="rect">
             <a:avLst/>
@@ -34295,7 +34457,7 @@
         <p:spPr>
           <a:xfrm>
             <a:off x="3168000" y="4968000"/>
-            <a:ext cx="1576440" cy="352440"/>
+            <a:ext cx="1576080" cy="352080"/>
           </a:xfrm>
           <a:prstGeom prst="rect">
             <a:avLst/>
@@ -34346,7 +34508,7 @@
         <p:spPr>
           <a:xfrm>
             <a:off x="504000" y="4968000"/>
-            <a:ext cx="1432440" cy="352440"/>
+            <a:ext cx="1432080" cy="352080"/>
           </a:xfrm>
           <a:prstGeom prst="rect">
             <a:avLst/>
@@ -34427,7 +34589,7 @@
         <p:spPr>
           <a:xfrm>
             <a:off x="1872000" y="1008000"/>
-            <a:ext cx="2080800" cy="784800"/>
+            <a:ext cx="2080440" cy="784440"/>
           </a:xfrm>
           <a:prstGeom prst="rect">
             <a:avLst/>
@@ -34457,7 +34619,7 @@
         <p:spPr>
           <a:xfrm>
             <a:off x="5328000" y="756000"/>
-            <a:ext cx="1648800" cy="1216800"/>
+            <a:ext cx="1648440" cy="1216440"/>
           </a:xfrm>
           <a:custGeom>
             <a:avLst/>
@@ -34510,7 +34672,7 @@
         <p:spPr>
           <a:xfrm>
             <a:off x="1872360" y="3672360"/>
-            <a:ext cx="2080800" cy="784800"/>
+            <a:ext cx="2080440" cy="784440"/>
           </a:xfrm>
           <a:prstGeom prst="rect">
             <a:avLst/>
@@ -34540,7 +34702,7 @@
         <p:spPr>
           <a:xfrm>
             <a:off x="5328360" y="3420360"/>
-            <a:ext cx="1648800" cy="1216800"/>
+            <a:ext cx="1648440" cy="1216440"/>
           </a:xfrm>
           <a:custGeom>
             <a:avLst/>
@@ -34648,7 +34810,7 @@
         <p:spPr>
           <a:xfrm>
             <a:off x="1188000" y="2304000"/>
-            <a:ext cx="6904800" cy="339120"/>
+            <a:ext cx="6904440" cy="338760"/>
           </a:xfrm>
           <a:prstGeom prst="rect">
             <a:avLst/>
@@ -34699,7 +34861,7 @@
         <p:spPr>
           <a:xfrm>
             <a:off x="1080000" y="4788000"/>
-            <a:ext cx="7156800" cy="595080"/>
+            <a:ext cx="7156440" cy="594720"/>
           </a:xfrm>
           <a:prstGeom prst="rect">
             <a:avLst/>
@@ -34780,7 +34942,7 @@
         <p:spPr>
           <a:xfrm>
             <a:off x="1908000" y="2232000"/>
-            <a:ext cx="1432080" cy="784080"/>
+            <a:ext cx="1431720" cy="783720"/>
           </a:xfrm>
           <a:prstGeom prst="rect">
             <a:avLst/>
@@ -34835,7 +34997,7 @@
         <p:spPr>
           <a:xfrm>
             <a:off x="6084000" y="2232000"/>
-            <a:ext cx="1432080" cy="784080"/>
+            <a:ext cx="1431720" cy="783720"/>
           </a:xfrm>
           <a:prstGeom prst="rect">
             <a:avLst/>
@@ -34890,7 +35052,7 @@
         <p:spPr>
           <a:xfrm>
             <a:off x="4032000" y="1944000"/>
-            <a:ext cx="1432080" cy="1360080"/>
+            <a:ext cx="1431720" cy="1359720"/>
           </a:xfrm>
           <a:custGeom>
             <a:avLst/>
@@ -35097,7 +35259,7 @@
         <p:spPr>
           <a:xfrm>
             <a:off x="2592000" y="3636000"/>
-            <a:ext cx="7120800" cy="595080"/>
+            <a:ext cx="7120440" cy="594720"/>
           </a:xfrm>
           <a:prstGeom prst="rect">
             <a:avLst/>
@@ -35198,7 +35360,7 @@
         <p:spPr>
           <a:xfrm>
             <a:off x="5934960" y="2130480"/>
-            <a:ext cx="1690560" cy="1001520"/>
+            <a:ext cx="1690200" cy="1001160"/>
           </a:xfrm>
           <a:prstGeom prst="rect">
             <a:avLst/>
@@ -35228,7 +35390,7 @@
         <p:spPr>
           <a:xfrm>
             <a:off x="1908000" y="2232000"/>
-            <a:ext cx="1432080" cy="784080"/>
+            <a:ext cx="1431720" cy="783720"/>
           </a:xfrm>
           <a:prstGeom prst="rect">
             <a:avLst/>
@@ -35283,7 +35445,7 @@
         <p:spPr>
           <a:xfrm>
             <a:off x="6084000" y="2232000"/>
-            <a:ext cx="1432080" cy="784080"/>
+            <a:ext cx="1431720" cy="783720"/>
           </a:xfrm>
           <a:prstGeom prst="rect">
             <a:avLst/>
@@ -35338,7 +35500,7 @@
         <p:spPr>
           <a:xfrm>
             <a:off x="4032000" y="1944000"/>
-            <a:ext cx="1432080" cy="1360080"/>
+            <a:ext cx="1431720" cy="1359720"/>
           </a:xfrm>
           <a:custGeom>
             <a:avLst/>
@@ -35497,7 +35659,7 @@
         <p:spPr>
           <a:xfrm>
             <a:off x="1764000" y="3564000"/>
-            <a:ext cx="7120800" cy="595080"/>
+            <a:ext cx="7120440" cy="594720"/>
           </a:xfrm>
           <a:prstGeom prst="rect">
             <a:avLst/>
@@ -35605,7 +35767,7 @@
         <p:spPr>
           <a:xfrm>
             <a:off x="1945800" y="3636000"/>
-            <a:ext cx="1432080" cy="784080"/>
+            <a:ext cx="1431720" cy="783720"/>
           </a:xfrm>
           <a:prstGeom prst="rect">
             <a:avLst/>
@@ -35680,7 +35842,7 @@
         <p:spPr>
           <a:xfrm>
             <a:off x="6300000" y="3673800"/>
-            <a:ext cx="1432080" cy="784080"/>
+            <a:ext cx="1431720" cy="783720"/>
           </a:xfrm>
           <a:prstGeom prst="rect">
             <a:avLst/>
@@ -35809,7 +35971,7 @@
         <p:spPr>
           <a:xfrm>
             <a:off x="1764000" y="4860000"/>
-            <a:ext cx="7120800" cy="595080"/>
+            <a:ext cx="7120440" cy="594720"/>
           </a:xfrm>
           <a:prstGeom prst="rect">
             <a:avLst/>
@@ -35835,7 +35997,7 @@
         <p:spPr>
           <a:xfrm>
             <a:off x="4140000" y="1080000"/>
-            <a:ext cx="1432080" cy="784080"/>
+            <a:ext cx="1431720" cy="783720"/>
           </a:xfrm>
           <a:prstGeom prst="rect">
             <a:avLst/>
@@ -35890,7 +36052,7 @@
         <p:spPr>
           <a:xfrm>
             <a:off x="4392000" y="2267640"/>
-            <a:ext cx="929880" cy="1001880"/>
+            <a:ext cx="929520" cy="1001520"/>
           </a:xfrm>
           <a:custGeom>
             <a:avLst/>
@@ -35939,7 +36101,7 @@
         <p:spPr>
           <a:xfrm>
             <a:off x="4572000" y="2304000"/>
-            <a:ext cx="641880" cy="340200"/>
+            <a:ext cx="641520" cy="339840"/>
           </a:xfrm>
           <a:prstGeom prst="rect">
             <a:avLst/>
@@ -36071,7 +36233,7 @@
         <p:spPr>
           <a:xfrm>
             <a:off x="2592000" y="432000"/>
-            <a:ext cx="1145880" cy="497880"/>
+            <a:ext cx="1145520" cy="497520"/>
           </a:xfrm>
           <a:prstGeom prst="ellipse">
             <a:avLst/>
@@ -36126,7 +36288,7 @@
         <p:spPr>
           <a:xfrm>
             <a:off x="4104360" y="360360"/>
-            <a:ext cx="1145880" cy="497880"/>
+            <a:ext cx="1145520" cy="497520"/>
           </a:xfrm>
           <a:prstGeom prst="ellipse">
             <a:avLst/>
@@ -36181,7 +36343,7 @@
         <p:spPr>
           <a:xfrm>
             <a:off x="5652720" y="432720"/>
-            <a:ext cx="1145880" cy="497880"/>
+            <a:ext cx="1145520" cy="497520"/>
           </a:xfrm>
           <a:prstGeom prst="ellipse">
             <a:avLst/>
@@ -36236,7 +36398,7 @@
         <p:spPr>
           <a:xfrm>
             <a:off x="3813480" y="4321080"/>
-            <a:ext cx="1145880" cy="497880"/>
+            <a:ext cx="1145520" cy="497520"/>
           </a:xfrm>
           <a:prstGeom prst="ellipse">
             <a:avLst/>
@@ -36291,7 +36453,7 @@
         <p:spPr>
           <a:xfrm>
             <a:off x="2193840" y="4717440"/>
-            <a:ext cx="1145880" cy="497880"/>
+            <a:ext cx="1145520" cy="497520"/>
           </a:xfrm>
           <a:prstGeom prst="ellipse">
             <a:avLst/>
@@ -36346,7 +36508,7 @@
         <p:spPr>
           <a:xfrm>
             <a:off x="682200" y="4501800"/>
-            <a:ext cx="1145880" cy="497880"/>
+            <a:ext cx="1145520" cy="497520"/>
           </a:xfrm>
           <a:prstGeom prst="ellipse">
             <a:avLst/>
@@ -36401,7 +36563,7 @@
         <p:spPr>
           <a:xfrm>
             <a:off x="5434560" y="4574160"/>
-            <a:ext cx="1145880" cy="497880"/>
+            <a:ext cx="1145520" cy="497520"/>
           </a:xfrm>
           <a:prstGeom prst="ellipse">
             <a:avLst/>
@@ -36456,7 +36618,7 @@
         <p:spPr>
           <a:xfrm>
             <a:off x="7634160" y="4574520"/>
-            <a:ext cx="1145880" cy="497880"/>
+            <a:ext cx="1145520" cy="497520"/>
           </a:xfrm>
           <a:prstGeom prst="ellipse">
             <a:avLst/>
@@ -36511,7 +36673,7 @@
         <p:spPr>
           <a:xfrm>
             <a:off x="686520" y="3098880"/>
-            <a:ext cx="1145880" cy="497880"/>
+            <a:ext cx="1145520" cy="497520"/>
           </a:xfrm>
           <a:prstGeom prst="ellipse">
             <a:avLst/>
@@ -36839,7 +37001,7 @@
         <p:spPr>
           <a:xfrm>
             <a:off x="432000" y="72000"/>
-            <a:ext cx="9065880" cy="2513880"/>
+            <a:ext cx="9065520" cy="2513520"/>
           </a:xfrm>
           <a:prstGeom prst="rect">
             <a:avLst/>
@@ -36869,7 +37031,7 @@
         <p:spPr>
           <a:xfrm>
             <a:off x="2016000" y="1188000"/>
-            <a:ext cx="1432080" cy="784080"/>
+            <a:ext cx="1431720" cy="783720"/>
           </a:xfrm>
           <a:prstGeom prst="rect">
             <a:avLst/>
@@ -36924,7 +37086,7 @@
         <p:spPr>
           <a:xfrm>
             <a:off x="6192000" y="1188000"/>
-            <a:ext cx="1432080" cy="784080"/>
+            <a:ext cx="1431720" cy="783720"/>
           </a:xfrm>
           <a:prstGeom prst="rect">
             <a:avLst/>
@@ -36979,7 +37141,7 @@
         <p:spPr>
           <a:xfrm>
             <a:off x="4140000" y="900000"/>
-            <a:ext cx="1432080" cy="1360080"/>
+            <a:ext cx="1431720" cy="1359720"/>
           </a:xfrm>
           <a:custGeom>
             <a:avLst/>
@@ -37138,7 +37300,7 @@
         <p:spPr>
           <a:xfrm>
             <a:off x="-36000" y="3384000"/>
-            <a:ext cx="2621880" cy="595080"/>
+            <a:ext cx="2621520" cy="594720"/>
           </a:xfrm>
           <a:prstGeom prst="rect">
             <a:avLst/>
@@ -37216,7 +37378,7 @@
         <p:spPr>
           <a:xfrm>
             <a:off x="5868360" y="180360"/>
-            <a:ext cx="1145880" cy="497880"/>
+            <a:ext cx="1145520" cy="497520"/>
           </a:xfrm>
           <a:prstGeom prst="ellipse">
             <a:avLst/>
@@ -37271,7 +37433,7 @@
         <p:spPr>
           <a:xfrm>
             <a:off x="7344720" y="216720"/>
-            <a:ext cx="1145880" cy="497880"/>
+            <a:ext cx="1145520" cy="497520"/>
           </a:xfrm>
           <a:prstGeom prst="ellipse">
             <a:avLst/>
@@ -37326,7 +37488,7 @@
         <p:spPr>
           <a:xfrm>
             <a:off x="7921080" y="937080"/>
-            <a:ext cx="1145880" cy="497880"/>
+            <a:ext cx="1145520" cy="497520"/>
           </a:xfrm>
           <a:prstGeom prst="ellipse">
             <a:avLst/>
@@ -37381,7 +37543,7 @@
         <p:spPr>
           <a:xfrm>
             <a:off x="7921440" y="1693440"/>
-            <a:ext cx="1145880" cy="497880"/>
+            <a:ext cx="1145520" cy="497520"/>
           </a:xfrm>
           <a:prstGeom prst="ellipse">
             <a:avLst/>
@@ -37436,7 +37598,7 @@
         <p:spPr>
           <a:xfrm>
             <a:off x="7921440" y="937440"/>
-            <a:ext cx="1145880" cy="497880"/>
+            <a:ext cx="1145520" cy="497520"/>
           </a:xfrm>
           <a:prstGeom prst="ellipse">
             <a:avLst/>
@@ -37491,7 +37653,7 @@
         <p:spPr>
           <a:xfrm>
             <a:off x="2089440" y="433440"/>
-            <a:ext cx="1145880" cy="497880"/>
+            <a:ext cx="1145520" cy="497520"/>
           </a:xfrm>
           <a:prstGeom prst="ellipse">
             <a:avLst/>
@@ -37546,7 +37708,7 @@
         <p:spPr>
           <a:xfrm>
             <a:off x="649800" y="541800"/>
-            <a:ext cx="1145880" cy="497880"/>
+            <a:ext cx="1145520" cy="497520"/>
           </a:xfrm>
           <a:prstGeom prst="ellipse">
             <a:avLst/>
@@ -37601,7 +37763,7 @@
         <p:spPr>
           <a:xfrm>
             <a:off x="4320000" y="3168000"/>
-            <a:ext cx="1036080" cy="785880"/>
+            <a:ext cx="1035720" cy="785520"/>
           </a:xfrm>
           <a:custGeom>
             <a:avLst/>
@@ -37679,7 +37841,7 @@
         <p:spPr>
           <a:xfrm>
             <a:off x="4176000" y="4428000"/>
-            <a:ext cx="1432080" cy="784080"/>
+            <a:ext cx="1431720" cy="783720"/>
           </a:xfrm>
           <a:prstGeom prst="rect">
             <a:avLst/>
@@ -37815,7 +37977,7 @@
         <p:spPr>
           <a:xfrm>
             <a:off x="5870160" y="3782160"/>
-            <a:ext cx="1145880" cy="497880"/>
+            <a:ext cx="1145520" cy="497520"/>
           </a:xfrm>
           <a:prstGeom prst="ellipse">
             <a:avLst/>
@@ -37870,7 +38032,7 @@
         <p:spPr>
           <a:xfrm>
             <a:off x="7380000" y="3115440"/>
-            <a:ext cx="2621880" cy="595080"/>
+            <a:ext cx="2621520" cy="594720"/>
           </a:xfrm>
           <a:prstGeom prst="rect">
             <a:avLst/>

</xml_diff>

<commit_message>
Computer Organization: Instruction format and addressing modes and started CISC vs RISC
</commit_message>
<xml_diff>
--- a/GATE/images/gate_images.pptx
+++ b/GATE/images/gate_images.pptx
@@ -39,6 +39,7 @@
     <p:sldId id="286" r:id="rId34"/>
     <p:sldId id="287" r:id="rId35"/>
     <p:sldId id="288" r:id="rId36"/>
+    <p:sldId id="289" r:id="rId37"/>
   </p:sldIdLst>
   <p:sldSz cx="10080625" cy="5670550"/>
   <p:notesSz cx="7559675" cy="10691812"/>
@@ -2803,97 +2804,7 @@
               <a:rPr b="0" lang="en-IN" sz="4400" spc="-1" strike="noStrike">
                 <a:latin typeface="Arial"/>
               </a:rPr>
-              <a:t>Cl</a:t>
-            </a:r>
-            <a:r>
-              <a:rPr b="0" lang="en-IN" sz="4400" spc="-1" strike="noStrike">
-                <a:latin typeface="Arial"/>
-              </a:rPr>
-              <a:t>ic</a:t>
-            </a:r>
-            <a:r>
-              <a:rPr b="0" lang="en-IN" sz="4400" spc="-1" strike="noStrike">
-                <a:latin typeface="Arial"/>
-              </a:rPr>
-              <a:t>k </a:t>
-            </a:r>
-            <a:r>
-              <a:rPr b="0" lang="en-IN" sz="4400" spc="-1" strike="noStrike">
-                <a:latin typeface="Arial"/>
-              </a:rPr>
-              <a:t>to </a:t>
-            </a:r>
-            <a:r>
-              <a:rPr b="0" lang="en-IN" sz="4400" spc="-1" strike="noStrike">
-                <a:latin typeface="Arial"/>
-              </a:rPr>
-              <a:t>ed</a:t>
-            </a:r>
-            <a:r>
-              <a:rPr b="0" lang="en-IN" sz="4400" spc="-1" strike="noStrike">
-                <a:latin typeface="Arial"/>
-              </a:rPr>
-              <a:t>it </a:t>
-            </a:r>
-            <a:r>
-              <a:rPr b="0" lang="en-IN" sz="4400" spc="-1" strike="noStrike">
-                <a:latin typeface="Arial"/>
-              </a:rPr>
-              <a:t>th</a:t>
-            </a:r>
-            <a:r>
-              <a:rPr b="0" lang="en-IN" sz="4400" spc="-1" strike="noStrike">
-                <a:latin typeface="Arial"/>
-              </a:rPr>
-              <a:t>e </a:t>
-            </a:r>
-            <a:r>
-              <a:rPr b="0" lang="en-IN" sz="4400" spc="-1" strike="noStrike">
-                <a:latin typeface="Arial"/>
-              </a:rPr>
-              <a:t>titl</a:t>
-            </a:r>
-            <a:r>
-              <a:rPr b="0" lang="en-IN" sz="4400" spc="-1" strike="noStrike">
-                <a:latin typeface="Arial"/>
-              </a:rPr>
-              <a:t>e </a:t>
-            </a:r>
-            <a:r>
-              <a:rPr b="0" lang="en-IN" sz="4400" spc="-1" strike="noStrike">
-                <a:latin typeface="Arial"/>
-              </a:rPr>
-              <a:t>te</a:t>
-            </a:r>
-            <a:r>
-              <a:rPr b="0" lang="en-IN" sz="4400" spc="-1" strike="noStrike">
-                <a:latin typeface="Arial"/>
-              </a:rPr>
-              <a:t>xt </a:t>
-            </a:r>
-            <a:r>
-              <a:rPr b="0" lang="en-IN" sz="4400" spc="-1" strike="noStrike">
-                <a:latin typeface="Arial"/>
-              </a:rPr>
-              <a:t>fo</a:t>
-            </a:r>
-            <a:r>
-              <a:rPr b="0" lang="en-IN" sz="4400" spc="-1" strike="noStrike">
-                <a:latin typeface="Arial"/>
-              </a:rPr>
-              <a:t>r</a:t>
-            </a:r>
-            <a:r>
-              <a:rPr b="0" lang="en-IN" sz="4400" spc="-1" strike="noStrike">
-                <a:latin typeface="Arial"/>
-              </a:rPr>
-              <a:t>m</a:t>
-            </a:r>
-            <a:r>
-              <a:rPr b="0" lang="en-IN" sz="4400" spc="-1" strike="noStrike">
-                <a:latin typeface="Arial"/>
-              </a:rPr>
-              <a:t>at</a:t>
+              <a:t>Click to edit the title text format</a:t>
             </a:r>
             <a:endParaRPr b="0" lang="en-IN" sz="4400" spc="-1" strike="noStrike">
               <a:latin typeface="Arial"/>
@@ -3146,79 +3057,7 @@
               <a:rPr b="0" lang="en-IN" sz="4400" spc="-1" strike="noStrike">
                 <a:latin typeface="Arial"/>
               </a:rPr>
-              <a:t>Cli</a:t>
-            </a:r>
-            <a:r>
-              <a:rPr b="0" lang="en-IN" sz="4400" spc="-1" strike="noStrike">
-                <a:latin typeface="Arial"/>
-              </a:rPr>
-              <a:t>ck </a:t>
-            </a:r>
-            <a:r>
-              <a:rPr b="0" lang="en-IN" sz="4400" spc="-1" strike="noStrike">
-                <a:latin typeface="Arial"/>
-              </a:rPr>
-              <a:t>to </a:t>
-            </a:r>
-            <a:r>
-              <a:rPr b="0" lang="en-IN" sz="4400" spc="-1" strike="noStrike">
-                <a:latin typeface="Arial"/>
-              </a:rPr>
-              <a:t>edi</a:t>
-            </a:r>
-            <a:r>
-              <a:rPr b="0" lang="en-IN" sz="4400" spc="-1" strike="noStrike">
-                <a:latin typeface="Arial"/>
-              </a:rPr>
-              <a:t>t </a:t>
-            </a:r>
-            <a:r>
-              <a:rPr b="0" lang="en-IN" sz="4400" spc="-1" strike="noStrike">
-                <a:latin typeface="Arial"/>
-              </a:rPr>
-              <a:t>the </a:t>
-            </a:r>
-            <a:r>
-              <a:rPr b="0" lang="en-IN" sz="4400" spc="-1" strike="noStrike">
-                <a:latin typeface="Arial"/>
-              </a:rPr>
-              <a:t>titl</a:t>
-            </a:r>
-            <a:r>
-              <a:rPr b="0" lang="en-IN" sz="4400" spc="-1" strike="noStrike">
-                <a:latin typeface="Arial"/>
-              </a:rPr>
-              <a:t>e </a:t>
-            </a:r>
-            <a:r>
-              <a:rPr b="0" lang="en-IN" sz="4400" spc="-1" strike="noStrike">
-                <a:latin typeface="Arial"/>
-              </a:rPr>
-              <a:t>tex</a:t>
-            </a:r>
-            <a:r>
-              <a:rPr b="0" lang="en-IN" sz="4400" spc="-1" strike="noStrike">
-                <a:latin typeface="Arial"/>
-              </a:rPr>
-              <a:t>t </a:t>
-            </a:r>
-            <a:r>
-              <a:rPr b="0" lang="en-IN" sz="4400" spc="-1" strike="noStrike">
-                <a:latin typeface="Arial"/>
-              </a:rPr>
-              <a:t>for</a:t>
-            </a:r>
-            <a:r>
-              <a:rPr b="0" lang="en-IN" sz="4400" spc="-1" strike="noStrike">
-                <a:latin typeface="Arial"/>
-              </a:rPr>
-              <a:t>ma</a:t>
-            </a:r>
-            <a:r>
-              <a:rPr b="0" lang="en-IN" sz="4400" spc="-1" strike="noStrike">
-                <a:latin typeface="Arial"/>
-              </a:rPr>
-              <a:t>t</a:t>
+              <a:t>Click to edit the title text format</a:t>
             </a:r>
             <a:endParaRPr b="0" lang="en-IN" sz="4400" spc="-1" strike="noStrike">
               <a:latin typeface="Arial"/>
@@ -3451,7 +3290,7 @@
         <p:spPr>
           <a:xfrm>
             <a:off x="1836000" y="1332000"/>
-            <a:ext cx="2367360" cy="783360"/>
+            <a:ext cx="2367000" cy="783000"/>
           </a:xfrm>
           <a:prstGeom prst="rect">
             <a:avLst/>
@@ -3506,7 +3345,7 @@
         <p:spPr>
           <a:xfrm>
             <a:off x="1836000" y="2880000"/>
-            <a:ext cx="2367360" cy="783360"/>
+            <a:ext cx="2367000" cy="783000"/>
           </a:xfrm>
           <a:prstGeom prst="rect">
             <a:avLst/>
@@ -3571,7 +3410,7 @@
         <p:spPr>
           <a:xfrm>
             <a:off x="1836000" y="4176000"/>
-            <a:ext cx="2367360" cy="783360"/>
+            <a:ext cx="2367000" cy="783000"/>
           </a:xfrm>
           <a:prstGeom prst="rect">
             <a:avLst/>
@@ -3646,7 +3485,7 @@
         <p:spPr>
           <a:xfrm>
             <a:off x="5292000" y="900000"/>
-            <a:ext cx="2367360" cy="1503360"/>
+            <a:ext cx="2367000" cy="1503000"/>
           </a:xfrm>
           <a:prstGeom prst="rect">
             <a:avLst/>
@@ -3781,7 +3620,7 @@
         <p:spPr>
           <a:xfrm>
             <a:off x="5292000" y="2571480"/>
-            <a:ext cx="2367360" cy="1271880"/>
+            <a:ext cx="2367000" cy="1271520"/>
           </a:xfrm>
           <a:prstGeom prst="rect">
             <a:avLst/>
@@ -3896,7 +3735,7 @@
         <p:spPr>
           <a:xfrm>
             <a:off x="5292000" y="4047480"/>
-            <a:ext cx="2367360" cy="1019880"/>
+            <a:ext cx="2367000" cy="1019520"/>
           </a:xfrm>
           <a:prstGeom prst="rect">
             <a:avLst/>
@@ -4075,7 +3914,7 @@
         <p:spPr>
           <a:xfrm>
             <a:off x="2988000" y="360000"/>
-            <a:ext cx="4383360" cy="337680"/>
+            <a:ext cx="4383000" cy="337320"/>
           </a:xfrm>
           <a:prstGeom prst="rect">
             <a:avLst/>
@@ -4156,7 +3995,7 @@
         <p:spPr>
           <a:xfrm>
             <a:off x="1440000" y="720000"/>
-            <a:ext cx="6761520" cy="1793520"/>
+            <a:ext cx="6761160" cy="1793160"/>
           </a:xfrm>
           <a:prstGeom prst="rect">
             <a:avLst/>
@@ -4186,7 +4025,7 @@
         <p:spPr>
           <a:xfrm>
             <a:off x="2016000" y="1188000"/>
-            <a:ext cx="1431720" cy="783720"/>
+            <a:ext cx="1431360" cy="783360"/>
           </a:xfrm>
           <a:prstGeom prst="rect">
             <a:avLst/>
@@ -4241,7 +4080,7 @@
         <p:spPr>
           <a:xfrm>
             <a:off x="6192000" y="1188000"/>
-            <a:ext cx="1431720" cy="783720"/>
+            <a:ext cx="1431360" cy="783360"/>
           </a:xfrm>
           <a:prstGeom prst="rect">
             <a:avLst/>
@@ -4296,7 +4135,7 @@
         <p:spPr>
           <a:xfrm>
             <a:off x="4140000" y="900000"/>
-            <a:ext cx="1431720" cy="1359720"/>
+            <a:ext cx="1431360" cy="1359360"/>
           </a:xfrm>
           <a:custGeom>
             <a:avLst/>
@@ -4482,7 +4321,7 @@
         <p:spPr>
           <a:xfrm>
             <a:off x="4320000" y="3168000"/>
-            <a:ext cx="1035720" cy="785520"/>
+            <a:ext cx="1035360" cy="785160"/>
           </a:xfrm>
           <a:custGeom>
             <a:avLst/>
@@ -4560,7 +4399,7 @@
         <p:spPr>
           <a:xfrm>
             <a:off x="4176000" y="4428000"/>
-            <a:ext cx="1431720" cy="783720"/>
+            <a:ext cx="1431360" cy="783360"/>
           </a:xfrm>
           <a:prstGeom prst="rect">
             <a:avLst/>
@@ -4642,7 +4481,7 @@
         <p:spPr>
           <a:xfrm>
             <a:off x="5870160" y="3314160"/>
-            <a:ext cx="1145520" cy="497520"/>
+            <a:ext cx="1145160" cy="497160"/>
           </a:xfrm>
           <a:prstGeom prst="ellipse">
             <a:avLst/>
@@ -4781,7 +4620,7 @@
         <p:spPr>
           <a:xfrm>
             <a:off x="1944000" y="900000"/>
-            <a:ext cx="1431720" cy="783720"/>
+            <a:ext cx="1431360" cy="783360"/>
           </a:xfrm>
           <a:prstGeom prst="rect">
             <a:avLst/>
@@ -4836,7 +4675,7 @@
         <p:spPr>
           <a:xfrm>
             <a:off x="6120000" y="900000"/>
-            <a:ext cx="1431720" cy="783720"/>
+            <a:ext cx="1431360" cy="783360"/>
           </a:xfrm>
           <a:prstGeom prst="rect">
             <a:avLst/>
@@ -4891,7 +4730,7 @@
         <p:spPr>
           <a:xfrm>
             <a:off x="4068000" y="612000"/>
-            <a:ext cx="1431720" cy="1359720"/>
+            <a:ext cx="1431360" cy="1359360"/>
           </a:xfrm>
           <a:custGeom>
             <a:avLst/>
@@ -5070,7 +4909,7 @@
         <p:spPr>
           <a:xfrm>
             <a:off x="2592000" y="5904000"/>
-            <a:ext cx="7120440" cy="594720"/>
+            <a:ext cx="7120080" cy="594360"/>
           </a:xfrm>
           <a:prstGeom prst="rect">
             <a:avLst/>
@@ -5141,7 +4980,7 @@
         <p:spPr>
           <a:xfrm>
             <a:off x="360000" y="216360"/>
-            <a:ext cx="1145520" cy="497520"/>
+            <a:ext cx="1145160" cy="497160"/>
           </a:xfrm>
           <a:prstGeom prst="ellipse">
             <a:avLst/>
@@ -5196,7 +5035,7 @@
         <p:spPr>
           <a:xfrm>
             <a:off x="1727640" y="216360"/>
-            <a:ext cx="1145520" cy="497520"/>
+            <a:ext cx="1145160" cy="497160"/>
           </a:xfrm>
           <a:prstGeom prst="ellipse">
             <a:avLst/>
@@ -5251,7 +5090,7 @@
         <p:spPr>
           <a:xfrm>
             <a:off x="359280" y="1008360"/>
-            <a:ext cx="1145520" cy="497520"/>
+            <a:ext cx="1145160" cy="497160"/>
           </a:xfrm>
           <a:prstGeom prst="ellipse">
             <a:avLst/>
@@ -5306,7 +5145,7 @@
         <p:spPr>
           <a:xfrm>
             <a:off x="358920" y="1800360"/>
-            <a:ext cx="1145520" cy="497520"/>
+            <a:ext cx="1145160" cy="497160"/>
           </a:xfrm>
           <a:prstGeom prst="ellipse">
             <a:avLst/>
@@ -5361,7 +5200,7 @@
         <p:spPr>
           <a:xfrm>
             <a:off x="1906560" y="1836360"/>
-            <a:ext cx="1145520" cy="497520"/>
+            <a:ext cx="1145160" cy="497160"/>
           </a:xfrm>
           <a:prstGeom prst="ellipse">
             <a:avLst/>
@@ -5416,7 +5255,7 @@
         <p:spPr>
           <a:xfrm>
             <a:off x="4211280" y="360"/>
-            <a:ext cx="1145520" cy="497520"/>
+            <a:ext cx="1145160" cy="497160"/>
           </a:xfrm>
           <a:prstGeom prst="ellipse">
             <a:avLst/>
@@ -5471,7 +5310,7 @@
         <p:spPr>
           <a:xfrm>
             <a:off x="6226920" y="360"/>
-            <a:ext cx="1145520" cy="497520"/>
+            <a:ext cx="1145160" cy="497160"/>
           </a:xfrm>
           <a:prstGeom prst="ellipse">
             <a:avLst/>
@@ -5526,7 +5365,7 @@
         <p:spPr>
           <a:xfrm>
             <a:off x="4210920" y="360"/>
-            <a:ext cx="1145520" cy="497520"/>
+            <a:ext cx="1145160" cy="497160"/>
           </a:xfrm>
           <a:prstGeom prst="ellipse">
             <a:avLst/>
@@ -5581,7 +5420,7 @@
         <p:spPr>
           <a:xfrm>
             <a:off x="7738920" y="252360"/>
-            <a:ext cx="1145520" cy="497520"/>
+            <a:ext cx="1145160" cy="497160"/>
           </a:xfrm>
           <a:prstGeom prst="ellipse">
             <a:avLst/>
@@ -5636,7 +5475,7 @@
         <p:spPr>
           <a:xfrm>
             <a:off x="7810920" y="936360"/>
-            <a:ext cx="1145520" cy="497520"/>
+            <a:ext cx="1145160" cy="497160"/>
           </a:xfrm>
           <a:prstGeom prst="ellipse">
             <a:avLst/>
@@ -7172,7 +7011,7 @@
         <p:spPr>
           <a:xfrm>
             <a:off x="576000" y="4320000"/>
-            <a:ext cx="2441880" cy="340200"/>
+            <a:ext cx="2441520" cy="339840"/>
           </a:xfrm>
           <a:prstGeom prst="rect">
             <a:avLst/>
@@ -7223,7 +7062,7 @@
         <p:spPr>
           <a:xfrm>
             <a:off x="7092000" y="3672000"/>
-            <a:ext cx="2441880" cy="340200"/>
+            <a:ext cx="2441520" cy="339840"/>
           </a:xfrm>
           <a:prstGeom prst="rect">
             <a:avLst/>
@@ -7274,7 +7113,7 @@
         <p:spPr>
           <a:xfrm>
             <a:off x="3744000" y="5328000"/>
-            <a:ext cx="2441880" cy="340200"/>
+            <a:ext cx="2441520" cy="339840"/>
           </a:xfrm>
           <a:prstGeom prst="rect">
             <a:avLst/>
@@ -7355,7 +7194,7 @@
         <p:spPr>
           <a:xfrm>
             <a:off x="5934960" y="1050480"/>
-            <a:ext cx="1690200" cy="1001160"/>
+            <a:ext cx="1689840" cy="1000800"/>
           </a:xfrm>
           <a:prstGeom prst="rect">
             <a:avLst/>
@@ -7385,7 +7224,7 @@
         <p:spPr>
           <a:xfrm>
             <a:off x="1908000" y="1152000"/>
-            <a:ext cx="1431720" cy="783720"/>
+            <a:ext cx="1431360" cy="783360"/>
           </a:xfrm>
           <a:prstGeom prst="rect">
             <a:avLst/>
@@ -7440,7 +7279,7 @@
         <p:spPr>
           <a:xfrm>
             <a:off x="6084000" y="1152000"/>
-            <a:ext cx="1431720" cy="783720"/>
+            <a:ext cx="1431360" cy="783360"/>
           </a:xfrm>
           <a:prstGeom prst="rect">
             <a:avLst/>
@@ -7495,7 +7334,7 @@
         <p:spPr>
           <a:xfrm>
             <a:off x="4032000" y="864000"/>
-            <a:ext cx="1431720" cy="1359720"/>
+            <a:ext cx="1431360" cy="1359360"/>
           </a:xfrm>
           <a:custGeom>
             <a:avLst/>
@@ -7627,7 +7466,7 @@
         <p:spPr>
           <a:xfrm>
             <a:off x="1548000" y="576000"/>
-            <a:ext cx="2117880" cy="461880"/>
+            <a:ext cx="2117520" cy="461520"/>
           </a:xfrm>
           <a:prstGeom prst="rect">
             <a:avLst/>
@@ -7733,7 +7572,7 @@
         <p:spPr>
           <a:xfrm>
             <a:off x="5760000" y="576000"/>
-            <a:ext cx="2117880" cy="461880"/>
+            <a:ext cx="2117520" cy="461520"/>
           </a:xfrm>
           <a:prstGeom prst="rect">
             <a:avLst/>
@@ -7784,7 +7623,7 @@
         <p:spPr>
           <a:xfrm>
             <a:off x="216000" y="2376000"/>
-            <a:ext cx="2117880" cy="2585880"/>
+            <a:ext cx="2117520" cy="2585520"/>
           </a:xfrm>
           <a:prstGeom prst="rect">
             <a:avLst/>
@@ -8493,7 +8332,7 @@
         <p:spPr>
           <a:xfrm>
             <a:off x="1945800" y="3636000"/>
-            <a:ext cx="1431720" cy="783720"/>
+            <a:ext cx="1431360" cy="783360"/>
           </a:xfrm>
           <a:prstGeom prst="rect">
             <a:avLst/>
@@ -8568,7 +8407,7 @@
         <p:spPr>
           <a:xfrm>
             <a:off x="6300000" y="3673800"/>
-            <a:ext cx="1431720" cy="783720"/>
+            <a:ext cx="1431360" cy="783360"/>
           </a:xfrm>
           <a:prstGeom prst="rect">
             <a:avLst/>
@@ -8697,7 +8536,7 @@
         <p:spPr>
           <a:xfrm>
             <a:off x="1764000" y="4860000"/>
-            <a:ext cx="7120440" cy="594720"/>
+            <a:ext cx="7120080" cy="594360"/>
           </a:xfrm>
           <a:prstGeom prst="rect">
             <a:avLst/>
@@ -8723,7 +8562,7 @@
         <p:spPr>
           <a:xfrm>
             <a:off x="4140000" y="1080000"/>
-            <a:ext cx="1431720" cy="783720"/>
+            <a:ext cx="1431360" cy="783360"/>
           </a:xfrm>
           <a:prstGeom prst="rect">
             <a:avLst/>
@@ -8778,7 +8617,7 @@
         <p:spPr>
           <a:xfrm>
             <a:off x="4392000" y="2267640"/>
-            <a:ext cx="929520" cy="1001520"/>
+            <a:ext cx="929160" cy="1001160"/>
           </a:xfrm>
           <a:custGeom>
             <a:avLst/>
@@ -8827,7 +8666,7 @@
         <p:spPr>
           <a:xfrm>
             <a:off x="4572000" y="2304000"/>
-            <a:ext cx="641520" cy="339840"/>
+            <a:ext cx="641160" cy="339480"/>
           </a:xfrm>
           <a:prstGeom prst="rect">
             <a:avLst/>
@@ -8959,7 +8798,7 @@
         <p:spPr>
           <a:xfrm>
             <a:off x="2592000" y="432000"/>
-            <a:ext cx="1145520" cy="497520"/>
+            <a:ext cx="1145160" cy="497160"/>
           </a:xfrm>
           <a:prstGeom prst="ellipse">
             <a:avLst/>
@@ -9014,7 +8853,7 @@
         <p:spPr>
           <a:xfrm>
             <a:off x="4104360" y="360360"/>
-            <a:ext cx="1145520" cy="497520"/>
+            <a:ext cx="1145160" cy="497160"/>
           </a:xfrm>
           <a:prstGeom prst="ellipse">
             <a:avLst/>
@@ -9069,7 +8908,7 @@
         <p:spPr>
           <a:xfrm>
             <a:off x="5652720" y="432720"/>
-            <a:ext cx="1145520" cy="497520"/>
+            <a:ext cx="1145160" cy="497160"/>
           </a:xfrm>
           <a:prstGeom prst="ellipse">
             <a:avLst/>
@@ -9124,7 +8963,7 @@
         <p:spPr>
           <a:xfrm>
             <a:off x="3813480" y="4321080"/>
-            <a:ext cx="1145520" cy="497520"/>
+            <a:ext cx="1145160" cy="497160"/>
           </a:xfrm>
           <a:prstGeom prst="ellipse">
             <a:avLst/>
@@ -9179,7 +9018,7 @@
         <p:spPr>
           <a:xfrm>
             <a:off x="2193840" y="4717440"/>
-            <a:ext cx="1145520" cy="497520"/>
+            <a:ext cx="1145160" cy="497160"/>
           </a:xfrm>
           <a:prstGeom prst="ellipse">
             <a:avLst/>
@@ -9234,7 +9073,7 @@
         <p:spPr>
           <a:xfrm>
             <a:off x="682200" y="4501800"/>
-            <a:ext cx="1145520" cy="497520"/>
+            <a:ext cx="1145160" cy="497160"/>
           </a:xfrm>
           <a:prstGeom prst="ellipse">
             <a:avLst/>
@@ -9289,7 +9128,7 @@
         <p:spPr>
           <a:xfrm>
             <a:off x="5434560" y="4574160"/>
-            <a:ext cx="1145520" cy="497520"/>
+            <a:ext cx="1145160" cy="497160"/>
           </a:xfrm>
           <a:prstGeom prst="ellipse">
             <a:avLst/>
@@ -9344,7 +9183,7 @@
         <p:spPr>
           <a:xfrm>
             <a:off x="7634160" y="4574520"/>
-            <a:ext cx="1145520" cy="497520"/>
+            <a:ext cx="1145160" cy="497160"/>
           </a:xfrm>
           <a:prstGeom prst="ellipse">
             <a:avLst/>
@@ -9399,7 +9238,7 @@
         <p:spPr>
           <a:xfrm>
             <a:off x="686520" y="3098880"/>
-            <a:ext cx="1145520" cy="497520"/>
+            <a:ext cx="1145160" cy="497160"/>
           </a:xfrm>
           <a:prstGeom prst="ellipse">
             <a:avLst/>
@@ -9697,7 +9536,7 @@
         <p:spPr>
           <a:xfrm>
             <a:off x="216000" y="288000"/>
-            <a:ext cx="2369880" cy="2297880"/>
+            <a:ext cx="2369520" cy="2297520"/>
           </a:xfrm>
           <a:prstGeom prst="rect">
             <a:avLst/>
@@ -9818,7 +9657,7 @@
         <p:spPr>
           <a:xfrm>
             <a:off x="1908000" y="936000"/>
-            <a:ext cx="1431720" cy="783720"/>
+            <a:ext cx="1431360" cy="783360"/>
           </a:xfrm>
           <a:prstGeom prst="rect">
             <a:avLst/>
@@ -9873,7 +9712,7 @@
         <p:spPr>
           <a:xfrm>
             <a:off x="6084000" y="936000"/>
-            <a:ext cx="1431720" cy="783720"/>
+            <a:ext cx="1431360" cy="783360"/>
           </a:xfrm>
           <a:prstGeom prst="rect">
             <a:avLst/>
@@ -9928,7 +9767,7 @@
         <p:spPr>
           <a:xfrm>
             <a:off x="4934160" y="4392000"/>
-            <a:ext cx="1431720" cy="783720"/>
+            <a:ext cx="1431360" cy="783360"/>
           </a:xfrm>
           <a:prstGeom prst="rect">
             <a:avLst/>
@@ -9983,7 +9822,7 @@
         <p:spPr>
           <a:xfrm>
             <a:off x="4032000" y="648000"/>
-            <a:ext cx="1431720" cy="1359720"/>
+            <a:ext cx="1431360" cy="1359360"/>
           </a:xfrm>
           <a:custGeom>
             <a:avLst/>
@@ -10081,7 +9920,7 @@
         <p:spPr>
           <a:xfrm>
             <a:off x="1908000" y="3204360"/>
-            <a:ext cx="1431720" cy="1359720"/>
+            <a:ext cx="1431360" cy="1359360"/>
           </a:xfrm>
           <a:custGeom>
             <a:avLst/>
@@ -10233,7 +10072,7 @@
         <p:spPr>
           <a:xfrm>
             <a:off x="4140000" y="2234160"/>
-            <a:ext cx="1145880" cy="567720"/>
+            <a:ext cx="1145520" cy="567360"/>
           </a:xfrm>
           <a:prstGeom prst="ellipse">
             <a:avLst/>
@@ -10288,7 +10127,7 @@
         <p:spPr>
           <a:xfrm>
             <a:off x="3708360" y="3636360"/>
-            <a:ext cx="1073520" cy="567720"/>
+            <a:ext cx="1073160" cy="567360"/>
           </a:xfrm>
           <a:prstGeom prst="ellipse">
             <a:avLst/>
@@ -10397,7 +10236,7 @@
         <p:spPr>
           <a:xfrm>
             <a:off x="504000" y="396000"/>
-            <a:ext cx="1145880" cy="567720"/>
+            <a:ext cx="1145520" cy="567360"/>
           </a:xfrm>
           <a:prstGeom prst="ellipse">
             <a:avLst/>
@@ -10452,7 +10291,7 @@
         <p:spPr>
           <a:xfrm>
             <a:off x="1944000" y="180000"/>
-            <a:ext cx="1145880" cy="567720"/>
+            <a:ext cx="1145520" cy="567360"/>
           </a:xfrm>
           <a:prstGeom prst="ellipse">
             <a:avLst/>
@@ -10507,7 +10346,7 @@
         <p:spPr>
           <a:xfrm>
             <a:off x="288000" y="1152000"/>
-            <a:ext cx="1145880" cy="567720"/>
+            <a:ext cx="1145520" cy="567360"/>
           </a:xfrm>
           <a:prstGeom prst="ellipse">
             <a:avLst/>
@@ -10562,7 +10401,7 @@
         <p:spPr>
           <a:xfrm>
             <a:off x="5940000" y="180000"/>
-            <a:ext cx="1145880" cy="567720"/>
+            <a:ext cx="1145520" cy="567360"/>
           </a:xfrm>
           <a:prstGeom prst="ellipse">
             <a:avLst/>
@@ -10617,7 +10456,7 @@
         <p:spPr>
           <a:xfrm>
             <a:off x="7560000" y="180000"/>
-            <a:ext cx="1145880" cy="567720"/>
+            <a:ext cx="1145520" cy="567360"/>
           </a:xfrm>
           <a:prstGeom prst="ellipse">
             <a:avLst/>
@@ -10672,7 +10511,7 @@
         <p:spPr>
           <a:xfrm>
             <a:off x="7992000" y="972000"/>
-            <a:ext cx="1145880" cy="567720"/>
+            <a:ext cx="1145520" cy="567360"/>
           </a:xfrm>
           <a:prstGeom prst="ellipse">
             <a:avLst/>
@@ -10754,7 +10593,7 @@
         <p:spPr>
           <a:xfrm>
             <a:off x="432000" y="3636360"/>
-            <a:ext cx="1073520" cy="567720"/>
+            <a:ext cx="1073160" cy="567360"/>
           </a:xfrm>
           <a:prstGeom prst="ellipse">
             <a:avLst/>
@@ -10809,7 +10648,7 @@
         <p:spPr>
           <a:xfrm>
             <a:off x="6803640" y="4068360"/>
-            <a:ext cx="1073520" cy="567720"/>
+            <a:ext cx="1073160" cy="567360"/>
           </a:xfrm>
           <a:prstGeom prst="ellipse">
             <a:avLst/>
@@ -10864,7 +10703,7 @@
         <p:spPr>
           <a:xfrm>
             <a:off x="6839280" y="4752360"/>
-            <a:ext cx="1073520" cy="567720"/>
+            <a:ext cx="1073160" cy="567360"/>
           </a:xfrm>
           <a:prstGeom prst="ellipse">
             <a:avLst/>
@@ -11274,7 +11113,7 @@
         <p:spPr>
           <a:xfrm>
             <a:off x="2556000" y="1152000"/>
-            <a:ext cx="4530240" cy="354240"/>
+            <a:ext cx="4529880" cy="353880"/>
           </a:xfrm>
           <a:prstGeom prst="rect">
             <a:avLst/>
@@ -12124,7 +11963,7 @@
         <p:spPr>
           <a:xfrm>
             <a:off x="3492000" y="3541680"/>
-            <a:ext cx="3019320" cy="341640"/>
+            <a:ext cx="3018960" cy="341280"/>
           </a:xfrm>
           <a:prstGeom prst="rect">
             <a:avLst/>
@@ -12175,7 +12014,7 @@
         <p:spPr>
           <a:xfrm>
             <a:off x="144000" y="3564000"/>
-            <a:ext cx="3019320" cy="341640"/>
+            <a:ext cx="3018960" cy="341280"/>
           </a:xfrm>
           <a:prstGeom prst="rect">
             <a:avLst/>
@@ -12226,7 +12065,7 @@
         <p:spPr>
           <a:xfrm>
             <a:off x="7308000" y="3528000"/>
-            <a:ext cx="3019320" cy="341640"/>
+            <a:ext cx="3018960" cy="341280"/>
           </a:xfrm>
           <a:prstGeom prst="rect">
             <a:avLst/>
@@ -12679,7 +12518,7 @@
         <p:spPr>
           <a:xfrm>
             <a:off x="3492000" y="3541680"/>
-            <a:ext cx="3019320" cy="341640"/>
+            <a:ext cx="3018960" cy="341280"/>
           </a:xfrm>
           <a:prstGeom prst="rect">
             <a:avLst/>
@@ -12730,7 +12569,7 @@
         <p:spPr>
           <a:xfrm>
             <a:off x="144000" y="3564000"/>
-            <a:ext cx="3019320" cy="341640"/>
+            <a:ext cx="3018960" cy="341280"/>
           </a:xfrm>
           <a:prstGeom prst="rect">
             <a:avLst/>
@@ -12781,7 +12620,7 @@
         <p:spPr>
           <a:xfrm>
             <a:off x="7308000" y="3528000"/>
-            <a:ext cx="3019320" cy="341640"/>
+            <a:ext cx="3018960" cy="341280"/>
           </a:xfrm>
           <a:prstGeom prst="rect">
             <a:avLst/>
@@ -13810,7 +13649,7 @@
         <p:spPr>
           <a:xfrm>
             <a:off x="3456000" y="1008000"/>
-            <a:ext cx="3235680" cy="342000"/>
+            <a:ext cx="3235320" cy="341640"/>
           </a:xfrm>
           <a:prstGeom prst="rect">
             <a:avLst/>
@@ -13861,7 +13700,7 @@
         <p:spPr>
           <a:xfrm>
             <a:off x="648000" y="1836000"/>
-            <a:ext cx="3235680" cy="342000"/>
+            <a:ext cx="3235320" cy="341640"/>
           </a:xfrm>
           <a:prstGeom prst="rect">
             <a:avLst/>
@@ -13912,7 +13751,7 @@
         <p:spPr>
           <a:xfrm>
             <a:off x="5436000" y="2160000"/>
-            <a:ext cx="3235680" cy="342000"/>
+            <a:ext cx="3235320" cy="341640"/>
           </a:xfrm>
           <a:prstGeom prst="rect">
             <a:avLst/>
@@ -13990,7 +13829,7 @@
         <p:spPr>
           <a:xfrm>
             <a:off x="8676000" y="2988000"/>
-            <a:ext cx="1039680" cy="751680"/>
+            <a:ext cx="1039320" cy="751320"/>
           </a:xfrm>
           <a:prstGeom prst="rect">
             <a:avLst/>
@@ -14128,7 +13967,7 @@
         <p:spPr>
           <a:xfrm>
             <a:off x="2448000" y="4464000"/>
-            <a:ext cx="5827680" cy="751680"/>
+            <a:ext cx="5827320" cy="751320"/>
           </a:xfrm>
           <a:prstGeom prst="rect">
             <a:avLst/>
@@ -15990,7 +15829,7 @@
         <p:spPr>
           <a:xfrm>
             <a:off x="1728000" y="1741680"/>
-            <a:ext cx="1148040" cy="342360"/>
+            <a:ext cx="1147680" cy="342000"/>
           </a:xfrm>
           <a:prstGeom prst="rect">
             <a:avLst/>
@@ -16041,7 +15880,7 @@
         <p:spPr>
           <a:xfrm>
             <a:off x="6480000" y="648000"/>
-            <a:ext cx="1688040" cy="342360"/>
+            <a:ext cx="1687680" cy="342000"/>
           </a:xfrm>
           <a:prstGeom prst="rect">
             <a:avLst/>
@@ -16122,7 +15961,7 @@
         <p:spPr>
           <a:xfrm>
             <a:off x="1908000" y="936000"/>
-            <a:ext cx="1431720" cy="783720"/>
+            <a:ext cx="1431360" cy="783360"/>
           </a:xfrm>
           <a:prstGeom prst="rect">
             <a:avLst/>
@@ -16177,7 +16016,7 @@
         <p:spPr>
           <a:xfrm>
             <a:off x="6084000" y="936000"/>
-            <a:ext cx="1431720" cy="783720"/>
+            <a:ext cx="1431360" cy="783360"/>
           </a:xfrm>
           <a:prstGeom prst="rect">
             <a:avLst/>
@@ -16232,7 +16071,7 @@
         <p:spPr>
           <a:xfrm>
             <a:off x="1908000" y="4068000"/>
-            <a:ext cx="1431720" cy="783720"/>
+            <a:ext cx="1431360" cy="783360"/>
           </a:xfrm>
           <a:prstGeom prst="rect">
             <a:avLst/>
@@ -16287,7 +16126,7 @@
         <p:spPr>
           <a:xfrm>
             <a:off x="4032000" y="648000"/>
-            <a:ext cx="1431720" cy="1359720"/>
+            <a:ext cx="1431360" cy="1359360"/>
           </a:xfrm>
           <a:custGeom>
             <a:avLst/>
@@ -16385,7 +16224,7 @@
         <p:spPr>
           <a:xfrm>
             <a:off x="1872000" y="2232360"/>
-            <a:ext cx="1431720" cy="1359720"/>
+            <a:ext cx="1431360" cy="1359360"/>
           </a:xfrm>
           <a:custGeom>
             <a:avLst/>
@@ -16591,7 +16430,7 @@
         <p:spPr>
           <a:xfrm>
             <a:off x="5184000" y="2340000"/>
-            <a:ext cx="2007720" cy="567720"/>
+            <a:ext cx="2007360" cy="567360"/>
           </a:xfrm>
           <a:prstGeom prst="ellipse">
             <a:avLst/>
@@ -16646,7 +16485,7 @@
         <p:spPr>
           <a:xfrm>
             <a:off x="3960360" y="3240360"/>
-            <a:ext cx="2007720" cy="567720"/>
+            <a:ext cx="2007360" cy="567360"/>
           </a:xfrm>
           <a:prstGeom prst="ellipse">
             <a:avLst/>
@@ -16989,7 +16828,7 @@
         <p:spPr>
           <a:xfrm>
             <a:off x="144000" y="2057400"/>
-            <a:ext cx="2511000" cy="598680"/>
+            <a:ext cx="2510640" cy="598320"/>
           </a:xfrm>
           <a:prstGeom prst="rect">
             <a:avLst/>
@@ -17040,7 +16879,7 @@
         <p:spPr>
           <a:xfrm>
             <a:off x="3405600" y="976680"/>
-            <a:ext cx="2968200" cy="342720"/>
+            <a:ext cx="2967840" cy="342360"/>
           </a:xfrm>
           <a:prstGeom prst="rect">
             <a:avLst/>
@@ -17175,7 +17014,7 @@
         <p:spPr>
           <a:xfrm>
             <a:off x="457200" y="3742200"/>
-            <a:ext cx="2968200" cy="854640"/>
+            <a:ext cx="2967840" cy="854280"/>
           </a:xfrm>
           <a:prstGeom prst="rect">
             <a:avLst/>
@@ -17226,7 +17065,7 @@
         <p:spPr>
           <a:xfrm>
             <a:off x="3866400" y="3742200"/>
-            <a:ext cx="2530800" cy="1110600"/>
+            <a:ext cx="2530440" cy="1110240"/>
           </a:xfrm>
           <a:prstGeom prst="rect">
             <a:avLst/>
@@ -17277,7 +17116,7 @@
         <p:spPr>
           <a:xfrm>
             <a:off x="7086600" y="3706200"/>
-            <a:ext cx="2739600" cy="1090800"/>
+            <a:ext cx="2739240" cy="1090440"/>
           </a:xfrm>
           <a:prstGeom prst="rect">
             <a:avLst/>
@@ -17328,7 +17167,7 @@
         <p:spPr>
           <a:xfrm>
             <a:off x="7488360" y="2057760"/>
-            <a:ext cx="2511000" cy="342720"/>
+            <a:ext cx="2510640" cy="342360"/>
           </a:xfrm>
           <a:prstGeom prst="rect">
             <a:avLst/>
@@ -17690,7 +17529,7 @@
         <p:spPr>
           <a:xfrm>
             <a:off x="144000" y="2057400"/>
-            <a:ext cx="2511000" cy="598680"/>
+            <a:ext cx="2510640" cy="598320"/>
           </a:xfrm>
           <a:prstGeom prst="rect">
             <a:avLst/>
@@ -17741,7 +17580,7 @@
         <p:spPr>
           <a:xfrm>
             <a:off x="3405600" y="976680"/>
-            <a:ext cx="2968200" cy="342720"/>
+            <a:ext cx="2967840" cy="342360"/>
           </a:xfrm>
           <a:prstGeom prst="rect">
             <a:avLst/>
@@ -17876,7 +17715,7 @@
         <p:spPr>
           <a:xfrm>
             <a:off x="842400" y="3742200"/>
-            <a:ext cx="1693800" cy="1110600"/>
+            <a:ext cx="1693440" cy="1110240"/>
           </a:xfrm>
           <a:prstGeom prst="rect">
             <a:avLst/>
@@ -17927,7 +17766,7 @@
         <p:spPr>
           <a:xfrm>
             <a:off x="2822400" y="3742200"/>
-            <a:ext cx="2206800" cy="854640"/>
+            <a:ext cx="2206440" cy="854280"/>
           </a:xfrm>
           <a:prstGeom prst="rect">
             <a:avLst/>
@@ -17978,7 +17817,7 @@
         <p:spPr>
           <a:xfrm>
             <a:off x="7772400" y="3706200"/>
-            <a:ext cx="2053800" cy="633600"/>
+            <a:ext cx="2053440" cy="633240"/>
           </a:xfrm>
           <a:prstGeom prst="rect">
             <a:avLst/>
@@ -18029,7 +17868,7 @@
         <p:spPr>
           <a:xfrm>
             <a:off x="7488360" y="2057760"/>
-            <a:ext cx="2511000" cy="342720"/>
+            <a:ext cx="2510640" cy="342360"/>
           </a:xfrm>
           <a:prstGeom prst="rect">
             <a:avLst/>
@@ -18108,7 +17947,7 @@
         <p:spPr>
           <a:xfrm>
             <a:off x="5090400" y="3742200"/>
-            <a:ext cx="2206800" cy="854640"/>
+            <a:ext cx="2206440" cy="854280"/>
           </a:xfrm>
           <a:prstGeom prst="rect">
             <a:avLst/>
@@ -18189,7 +18028,7 @@
         <p:spPr>
           <a:xfrm>
             <a:off x="1564920" y="685800"/>
-            <a:ext cx="177480" cy="343080"/>
+            <a:ext cx="177120" cy="342720"/>
           </a:xfrm>
           <a:prstGeom prst="rect">
             <a:avLst/>
@@ -18215,7 +18054,7 @@
         <p:spPr>
           <a:xfrm>
             <a:off x="228600" y="228600"/>
-            <a:ext cx="1139760" cy="343080"/>
+            <a:ext cx="1139400" cy="342720"/>
           </a:xfrm>
           <a:prstGeom prst="rect">
             <a:avLst/>
@@ -18266,7 +18105,7 @@
         <p:spPr>
           <a:xfrm>
             <a:off x="169200" y="950400"/>
-            <a:ext cx="2054160" cy="453960"/>
+            <a:ext cx="2053800" cy="453600"/>
           </a:xfrm>
           <a:prstGeom prst="rect">
             <a:avLst/>
@@ -18679,7 +18518,7 @@
                       <a:noAutofit/>
                     </a:bodyPr>
                     <a:p>
-                      <a:pPr marL="216000" indent="-212760">
+                      <a:pPr marL="216000" indent="-212400">
                         <a:lnSpc>
                           <a:spcPct val="100000"/>
                         </a:lnSpc>
@@ -19002,7 +18841,7 @@
                       <a:noAutofit/>
                     </a:bodyPr>
                     <a:p>
-                      <a:pPr marL="216000" indent="-212760">
+                      <a:pPr marL="216000" indent="-212400">
                         <a:lnSpc>
                           <a:spcPct val="100000"/>
                         </a:lnSpc>
@@ -19482,7 +19321,7 @@
                       <a:noAutofit/>
                     </a:bodyPr>
                     <a:p>
-                      <a:pPr marL="216000" indent="-212760">
+                      <a:pPr marL="216000" indent="-212400">
                         <a:lnSpc>
                           <a:spcPct val="100000"/>
                         </a:lnSpc>
@@ -19778,7 +19617,7 @@
                       <a:noAutofit/>
                     </a:bodyPr>
                     <a:p>
-                      <a:pPr marL="216000" indent="-212760">
+                      <a:pPr marL="216000" indent="-212400">
                         <a:lnSpc>
                           <a:spcPct val="100000"/>
                         </a:lnSpc>
@@ -20046,7 +19885,7 @@
                       <a:noAutofit/>
                     </a:bodyPr>
                     <a:p>
-                      <a:pPr marL="216000" indent="-212760">
+                      <a:pPr marL="216000" indent="-212400">
                         <a:lnSpc>
                           <a:spcPct val="100000"/>
                         </a:lnSpc>
@@ -20285,7 +20124,7 @@
                       <a:noAutofit/>
                     </a:bodyPr>
                     <a:p>
-                      <a:pPr marL="216000" indent="-212760">
+                      <a:pPr marL="216000" indent="-212400">
                         <a:lnSpc>
                           <a:spcPct val="100000"/>
                         </a:lnSpc>
@@ -20431,7 +20270,7 @@
         <p:spPr>
           <a:xfrm>
             <a:off x="2057400" y="685800"/>
-            <a:ext cx="1140120" cy="343440"/>
+            <a:ext cx="1139760" cy="343080"/>
           </a:xfrm>
           <a:prstGeom prst="rect">
             <a:avLst/>
@@ -20482,7 +20321,7 @@
         <p:spPr>
           <a:xfrm>
             <a:off x="5670720" y="685800"/>
-            <a:ext cx="1140120" cy="343440"/>
+            <a:ext cx="1139760" cy="343080"/>
           </a:xfrm>
           <a:prstGeom prst="rect">
             <a:avLst/>
@@ -20533,7 +20372,7 @@
         <p:spPr>
           <a:xfrm>
             <a:off x="8229600" y="2168280"/>
-            <a:ext cx="1140120" cy="343440"/>
+            <a:ext cx="1139760" cy="343080"/>
           </a:xfrm>
           <a:prstGeom prst="rect">
             <a:avLst/>
@@ -20584,7 +20423,7 @@
         <p:spPr>
           <a:xfrm>
             <a:off x="4572000" y="3311280"/>
-            <a:ext cx="1140120" cy="343440"/>
+            <a:ext cx="1139760" cy="343080"/>
           </a:xfrm>
           <a:prstGeom prst="rect">
             <a:avLst/>
@@ -20721,7 +20560,7 @@
         <p:spPr>
           <a:xfrm>
             <a:off x="1564920" y="685800"/>
-            <a:ext cx="177480" cy="343080"/>
+            <a:ext cx="177120" cy="342720"/>
           </a:xfrm>
           <a:prstGeom prst="rect">
             <a:avLst/>
@@ -20747,7 +20586,7 @@
         <p:spPr>
           <a:xfrm>
             <a:off x="228600" y="228600"/>
-            <a:ext cx="1139760" cy="343080"/>
+            <a:ext cx="1139400" cy="342720"/>
           </a:xfrm>
           <a:prstGeom prst="rect">
             <a:avLst/>
@@ -20920,7 +20759,7 @@
                       <a:noAutofit/>
                     </a:bodyPr>
                     <a:p>
-                      <a:pPr marL="216000" indent="-212760">
+                      <a:pPr marL="216000" indent="-212400">
                         <a:lnSpc>
                           <a:spcPct val="100000"/>
                         </a:lnSpc>
@@ -21400,7 +21239,7 @@
                       <a:noAutofit/>
                     </a:bodyPr>
                     <a:p>
-                      <a:pPr marL="216000" indent="-212760">
+                      <a:pPr marL="216000" indent="-212400">
                         <a:lnSpc>
                           <a:spcPct val="100000"/>
                         </a:lnSpc>
@@ -21668,7 +21507,7 @@
                       <a:noAutofit/>
                     </a:bodyPr>
                     <a:p>
-                      <a:pPr marL="216000" indent="-212760">
+                      <a:pPr marL="216000" indent="-212400">
                         <a:lnSpc>
                           <a:spcPct val="100000"/>
                         </a:lnSpc>
@@ -21936,7 +21775,7 @@
                       <a:noAutofit/>
                     </a:bodyPr>
                     <a:p>
-                      <a:pPr marL="216000" indent="-212760">
+                      <a:pPr marL="216000" indent="-212400">
                         <a:lnSpc>
                           <a:spcPct val="100000"/>
                         </a:lnSpc>
@@ -22175,7 +22014,7 @@
                       <a:noAutofit/>
                     </a:bodyPr>
                     <a:p>
-                      <a:pPr marL="216000" indent="-212760">
+                      <a:pPr marL="216000" indent="-212400">
                         <a:lnSpc>
                           <a:spcPct val="100000"/>
                         </a:lnSpc>
@@ -22443,7 +22282,7 @@
                       <a:noAutofit/>
                     </a:bodyPr>
                     <a:p>
-                      <a:pPr marL="216000" indent="-212760">
+                      <a:pPr marL="216000" indent="-212400">
                         <a:lnSpc>
                           <a:spcPct val="100000"/>
                         </a:lnSpc>
@@ -22617,7 +22456,7 @@
         <p:spPr>
           <a:xfrm>
             <a:off x="6436080" y="1371600"/>
-            <a:ext cx="1140120" cy="343440"/>
+            <a:ext cx="1139760" cy="343080"/>
           </a:xfrm>
           <a:prstGeom prst="rect">
             <a:avLst/>
@@ -22782,7 +22621,7 @@
         <p:spPr>
           <a:xfrm>
             <a:off x="1564920" y="685800"/>
-            <a:ext cx="177480" cy="343080"/>
+            <a:ext cx="177120" cy="342720"/>
           </a:xfrm>
           <a:prstGeom prst="rect">
             <a:avLst/>
@@ -22808,7 +22647,7 @@
         <p:spPr>
           <a:xfrm>
             <a:off x="228600" y="228600"/>
-            <a:ext cx="1139760" cy="343080"/>
+            <a:ext cx="1139400" cy="342720"/>
           </a:xfrm>
           <a:prstGeom prst="rect">
             <a:avLst/>
@@ -22981,7 +22820,7 @@
                       <a:noAutofit/>
                     </a:bodyPr>
                     <a:p>
-                      <a:pPr marL="216000" indent="-212760">
+                      <a:pPr marL="216000" indent="-212400">
                         <a:lnSpc>
                           <a:spcPct val="100000"/>
                         </a:lnSpc>
@@ -23461,7 +23300,7 @@
                       <a:noAutofit/>
                     </a:bodyPr>
                     <a:p>
-                      <a:pPr marL="216000" indent="-212760">
+                      <a:pPr marL="216000" indent="-212400">
                         <a:lnSpc>
                           <a:spcPct val="100000"/>
                         </a:lnSpc>
@@ -23729,7 +23568,7 @@
                       <a:noAutofit/>
                     </a:bodyPr>
                     <a:p>
-                      <a:pPr marL="216000" indent="-212760">
+                      <a:pPr marL="216000" indent="-212400">
                         <a:lnSpc>
                           <a:spcPct val="100000"/>
                         </a:lnSpc>
@@ -23875,7 +23714,7 @@
         <p:spPr>
           <a:xfrm>
             <a:off x="799920" y="4158720"/>
-            <a:ext cx="177480" cy="424080"/>
+            <a:ext cx="177120" cy="423720"/>
           </a:xfrm>
           <a:prstGeom prst="rect">
             <a:avLst/>
@@ -24023,7 +23862,7 @@
                       <a:noAutofit/>
                     </a:bodyPr>
                     <a:p>
-                      <a:pPr marL="216000" indent="-212760">
+                      <a:pPr marL="216000" indent="-212400">
                         <a:lnSpc>
                           <a:spcPct val="100000"/>
                         </a:lnSpc>
@@ -24475,7 +24314,7 @@
                       <a:noAutofit/>
                     </a:bodyPr>
                     <a:p>
-                      <a:pPr marL="216000" indent="-212760">
+                      <a:pPr marL="216000" indent="-212400">
                         <a:lnSpc>
                           <a:spcPct val="100000"/>
                         </a:lnSpc>
@@ -24743,7 +24582,7 @@
                       <a:noAutofit/>
                     </a:bodyPr>
                     <a:p>
-                      <a:pPr marL="216000" indent="-212760">
+                      <a:pPr marL="216000" indent="-212400">
                         <a:lnSpc>
                           <a:spcPct val="100000"/>
                         </a:lnSpc>
@@ -25495,7 +25334,7 @@
         <p:spPr>
           <a:xfrm>
             <a:off x="5257800" y="2625480"/>
-            <a:ext cx="1140120" cy="343440"/>
+            <a:ext cx="1139760" cy="343080"/>
           </a:xfrm>
           <a:prstGeom prst="rect">
             <a:avLst/>
@@ -25716,7 +25555,7 @@
         <p:spPr>
           <a:xfrm>
             <a:off x="685800" y="685800"/>
-            <a:ext cx="4112640" cy="344160"/>
+            <a:ext cx="4112280" cy="343800"/>
           </a:xfrm>
           <a:prstGeom prst="rect">
             <a:avLst/>
@@ -25767,7 +25606,7 @@
         <p:spPr>
           <a:xfrm>
             <a:off x="3988800" y="1636200"/>
-            <a:ext cx="912240" cy="912240"/>
+            <a:ext cx="911880" cy="911880"/>
           </a:xfrm>
           <a:prstGeom prst="ellipse">
             <a:avLst/>
@@ -25842,7 +25681,7 @@
         <p:spPr>
           <a:xfrm>
             <a:off x="6841440" y="1622160"/>
-            <a:ext cx="912240" cy="912240"/>
+            <a:ext cx="911880" cy="911880"/>
           </a:xfrm>
           <a:prstGeom prst="ellipse">
             <a:avLst/>
@@ -25897,7 +25736,7 @@
         <p:spPr>
           <a:xfrm>
             <a:off x="1945440" y="2594160"/>
-            <a:ext cx="912240" cy="912240"/>
+            <a:ext cx="911880" cy="911880"/>
           </a:xfrm>
           <a:prstGeom prst="ellipse">
             <a:avLst/>
@@ -25952,7 +25791,7 @@
         <p:spPr>
           <a:xfrm>
             <a:off x="6877440" y="3638160"/>
-            <a:ext cx="912240" cy="912240"/>
+            <a:ext cx="911880" cy="911880"/>
           </a:xfrm>
           <a:prstGeom prst="ellipse">
             <a:avLst/>
@@ -26007,7 +25846,7 @@
         <p:spPr>
           <a:xfrm>
             <a:off x="3997440" y="3638160"/>
-            <a:ext cx="912240" cy="912240"/>
+            <a:ext cx="911880" cy="911880"/>
           </a:xfrm>
           <a:prstGeom prst="ellipse">
             <a:avLst/>
@@ -26232,7 +26071,7 @@
         <p:spPr>
           <a:xfrm>
             <a:off x="360000" y="324000"/>
-            <a:ext cx="6262200" cy="430200"/>
+            <a:ext cx="6261840" cy="429840"/>
           </a:xfrm>
           <a:prstGeom prst="rect">
             <a:avLst/>
@@ -26283,7 +26122,7 @@
         <p:spPr>
           <a:xfrm>
             <a:off x="612000" y="4464000"/>
-            <a:ext cx="718200" cy="646200"/>
+            <a:ext cx="717840" cy="645840"/>
           </a:xfrm>
           <a:prstGeom prst="ellipse">
             <a:avLst/>
@@ -26338,7 +26177,7 @@
         <p:spPr>
           <a:xfrm>
             <a:off x="1512360" y="4464360"/>
-            <a:ext cx="718200" cy="646200"/>
+            <a:ext cx="717840" cy="645840"/>
           </a:xfrm>
           <a:prstGeom prst="ellipse">
             <a:avLst/>
@@ -26393,7 +26232,7 @@
         <p:spPr>
           <a:xfrm>
             <a:off x="2448360" y="4464360"/>
-            <a:ext cx="718200" cy="646200"/>
+            <a:ext cx="717840" cy="645840"/>
           </a:xfrm>
           <a:prstGeom prst="ellipse">
             <a:avLst/>
@@ -26448,7 +26287,7 @@
         <p:spPr>
           <a:xfrm>
             <a:off x="3420360" y="4464360"/>
-            <a:ext cx="718200" cy="646200"/>
+            <a:ext cx="717840" cy="645840"/>
           </a:xfrm>
           <a:prstGeom prst="ellipse">
             <a:avLst/>
@@ -26503,7 +26342,7 @@
         <p:spPr>
           <a:xfrm>
             <a:off x="4392360" y="4464360"/>
-            <a:ext cx="718200" cy="646200"/>
+            <a:ext cx="717840" cy="645840"/>
           </a:xfrm>
           <a:prstGeom prst="ellipse">
             <a:avLst/>
@@ -26558,7 +26397,7 @@
         <p:spPr>
           <a:xfrm>
             <a:off x="5292360" y="4464360"/>
-            <a:ext cx="718200" cy="646200"/>
+            <a:ext cx="717840" cy="645840"/>
           </a:xfrm>
           <a:prstGeom prst="ellipse">
             <a:avLst/>
@@ -26613,7 +26452,7 @@
         <p:spPr>
           <a:xfrm>
             <a:off x="1476360" y="3528360"/>
-            <a:ext cx="718200" cy="646200"/>
+            <a:ext cx="717840" cy="645840"/>
           </a:xfrm>
           <a:prstGeom prst="ellipse">
             <a:avLst/>
@@ -26668,7 +26507,7 @@
         <p:spPr>
           <a:xfrm>
             <a:off x="2412720" y="2988720"/>
-            <a:ext cx="718200" cy="646200"/>
+            <a:ext cx="717840" cy="645840"/>
           </a:xfrm>
           <a:prstGeom prst="ellipse">
             <a:avLst/>
@@ -26723,7 +26562,7 @@
         <p:spPr>
           <a:xfrm>
             <a:off x="3385080" y="2485080"/>
-            <a:ext cx="718200" cy="646200"/>
+            <a:ext cx="717840" cy="645840"/>
           </a:xfrm>
           <a:prstGeom prst="ellipse">
             <a:avLst/>
@@ -26778,7 +26617,7 @@
         <p:spPr>
           <a:xfrm>
             <a:off x="4321440" y="1981440"/>
-            <a:ext cx="718200" cy="646200"/>
+            <a:ext cx="717840" cy="645840"/>
           </a:xfrm>
           <a:prstGeom prst="ellipse">
             <a:avLst/>
@@ -26833,7 +26672,7 @@
         <p:spPr>
           <a:xfrm>
             <a:off x="5257800" y="1549800"/>
-            <a:ext cx="718200" cy="646200"/>
+            <a:ext cx="717840" cy="645840"/>
           </a:xfrm>
           <a:prstGeom prst="ellipse">
             <a:avLst/>
@@ -27468,7 +27307,7 @@
         <p:spPr>
           <a:xfrm>
             <a:off x="360000" y="324000"/>
-            <a:ext cx="6262200" cy="430200"/>
+            <a:ext cx="6261840" cy="429840"/>
           </a:xfrm>
           <a:prstGeom prst="rect">
             <a:avLst/>
@@ -27519,7 +27358,7 @@
         <p:spPr>
           <a:xfrm>
             <a:off x="612000" y="4464000"/>
-            <a:ext cx="718200" cy="646200"/>
+            <a:ext cx="717840" cy="645840"/>
           </a:xfrm>
           <a:prstGeom prst="ellipse">
             <a:avLst/>
@@ -27574,7 +27413,7 @@
         <p:spPr>
           <a:xfrm>
             <a:off x="1512360" y="4464360"/>
-            <a:ext cx="718200" cy="646200"/>
+            <a:ext cx="717840" cy="645840"/>
           </a:xfrm>
           <a:prstGeom prst="ellipse">
             <a:avLst/>
@@ -27629,7 +27468,7 @@
         <p:spPr>
           <a:xfrm>
             <a:off x="2448360" y="4464360"/>
-            <a:ext cx="718200" cy="646200"/>
+            <a:ext cx="717840" cy="645840"/>
           </a:xfrm>
           <a:prstGeom prst="ellipse">
             <a:avLst/>
@@ -27684,7 +27523,7 @@
         <p:spPr>
           <a:xfrm>
             <a:off x="3420360" y="4464360"/>
-            <a:ext cx="718200" cy="646200"/>
+            <a:ext cx="717840" cy="645840"/>
           </a:xfrm>
           <a:prstGeom prst="ellipse">
             <a:avLst/>
@@ -27739,7 +27578,7 @@
         <p:spPr>
           <a:xfrm>
             <a:off x="4392360" y="4464360"/>
-            <a:ext cx="718200" cy="646200"/>
+            <a:ext cx="717840" cy="645840"/>
           </a:xfrm>
           <a:prstGeom prst="ellipse">
             <a:avLst/>
@@ -27794,7 +27633,7 @@
         <p:spPr>
           <a:xfrm>
             <a:off x="5292360" y="4464360"/>
-            <a:ext cx="718200" cy="646200"/>
+            <a:ext cx="717840" cy="645840"/>
           </a:xfrm>
           <a:prstGeom prst="ellipse">
             <a:avLst/>
@@ -27849,7 +27688,7 @@
         <p:spPr>
           <a:xfrm>
             <a:off x="1080360" y="3528360"/>
-            <a:ext cx="718200" cy="646200"/>
+            <a:ext cx="717840" cy="645840"/>
           </a:xfrm>
           <a:prstGeom prst="ellipse">
             <a:avLst/>
@@ -27904,7 +27743,7 @@
         <p:spPr>
           <a:xfrm>
             <a:off x="2880720" y="3492720"/>
-            <a:ext cx="718200" cy="646200"/>
+            <a:ext cx="717840" cy="645840"/>
           </a:xfrm>
           <a:prstGeom prst="ellipse">
             <a:avLst/>
@@ -27959,7 +27798,7 @@
         <p:spPr>
           <a:xfrm>
             <a:off x="2016000" y="2448000"/>
-            <a:ext cx="718200" cy="646200"/>
+            <a:ext cx="717840" cy="645840"/>
           </a:xfrm>
           <a:prstGeom prst="ellipse">
             <a:avLst/>
@@ -28014,7 +27853,7 @@
         <p:spPr>
           <a:xfrm>
             <a:off x="4753440" y="3493440"/>
-            <a:ext cx="718200" cy="646200"/>
+            <a:ext cx="717840" cy="645840"/>
           </a:xfrm>
           <a:prstGeom prst="ellipse">
             <a:avLst/>
@@ -28069,7 +27908,7 @@
         <p:spPr>
           <a:xfrm>
             <a:off x="3096000" y="1440000"/>
-            <a:ext cx="718200" cy="646200"/>
+            <a:ext cx="717840" cy="645840"/>
           </a:xfrm>
           <a:prstGeom prst="ellipse">
             <a:avLst/>
@@ -28434,7 +28273,7 @@
         <p:spPr>
           <a:xfrm>
             <a:off x="5544000" y="834120"/>
-            <a:ext cx="4174560" cy="430200"/>
+            <a:ext cx="4174200" cy="429840"/>
           </a:xfrm>
           <a:prstGeom prst="rect">
             <a:avLst/>
@@ -28485,7 +28324,7 @@
         <p:spPr>
           <a:xfrm>
             <a:off x="576000" y="2880000"/>
-            <a:ext cx="718200" cy="646200"/>
+            <a:ext cx="717840" cy="645840"/>
           </a:xfrm>
           <a:prstGeom prst="ellipse">
             <a:avLst/>
@@ -28540,7 +28379,7 @@
         <p:spPr>
           <a:xfrm>
             <a:off x="1476360" y="2880360"/>
-            <a:ext cx="718200" cy="646200"/>
+            <a:ext cx="717840" cy="645840"/>
           </a:xfrm>
           <a:prstGeom prst="ellipse">
             <a:avLst/>
@@ -28595,7 +28434,7 @@
         <p:spPr>
           <a:xfrm>
             <a:off x="2412360" y="2880360"/>
-            <a:ext cx="718200" cy="646200"/>
+            <a:ext cx="717840" cy="645840"/>
           </a:xfrm>
           <a:prstGeom prst="ellipse">
             <a:avLst/>
@@ -28650,7 +28489,7 @@
         <p:spPr>
           <a:xfrm>
             <a:off x="3384360" y="2880360"/>
-            <a:ext cx="718200" cy="646200"/>
+            <a:ext cx="717840" cy="645840"/>
           </a:xfrm>
           <a:prstGeom prst="ellipse">
             <a:avLst/>
@@ -28705,7 +28544,7 @@
         <p:spPr>
           <a:xfrm>
             <a:off x="4356360" y="2880360"/>
-            <a:ext cx="718200" cy="646200"/>
+            <a:ext cx="717840" cy="645840"/>
           </a:xfrm>
           <a:prstGeom prst="ellipse">
             <a:avLst/>
@@ -28760,7 +28599,7 @@
         <p:spPr>
           <a:xfrm>
             <a:off x="5256360" y="2880360"/>
-            <a:ext cx="718200" cy="646200"/>
+            <a:ext cx="717840" cy="645840"/>
           </a:xfrm>
           <a:prstGeom prst="ellipse">
             <a:avLst/>
@@ -28815,7 +28654,7 @@
         <p:spPr>
           <a:xfrm>
             <a:off x="1044360" y="1944360"/>
-            <a:ext cx="718200" cy="646200"/>
+            <a:ext cx="717840" cy="645840"/>
           </a:xfrm>
           <a:prstGeom prst="ellipse">
             <a:avLst/>
@@ -28870,7 +28709,7 @@
         <p:spPr>
           <a:xfrm>
             <a:off x="2844720" y="1908720"/>
-            <a:ext cx="718200" cy="646200"/>
+            <a:ext cx="717840" cy="645840"/>
           </a:xfrm>
           <a:prstGeom prst="ellipse">
             <a:avLst/>
@@ -28925,7 +28764,7 @@
         <p:spPr>
           <a:xfrm>
             <a:off x="1836000" y="1188000"/>
-            <a:ext cx="718200" cy="646200"/>
+            <a:ext cx="717840" cy="645840"/>
           </a:xfrm>
           <a:prstGeom prst="ellipse">
             <a:avLst/>
@@ -28980,7 +28819,7 @@
         <p:spPr>
           <a:xfrm>
             <a:off x="4717440" y="1909440"/>
-            <a:ext cx="718200" cy="646200"/>
+            <a:ext cx="717840" cy="645840"/>
           </a:xfrm>
           <a:prstGeom prst="ellipse">
             <a:avLst/>
@@ -29035,7 +28874,7 @@
         <p:spPr>
           <a:xfrm>
             <a:off x="3060000" y="432000"/>
-            <a:ext cx="718200" cy="646200"/>
+            <a:ext cx="717840" cy="645840"/>
           </a:xfrm>
           <a:prstGeom prst="ellipse">
             <a:avLst/>
@@ -29454,7 +29293,7 @@
         <p:spPr>
           <a:xfrm>
             <a:off x="1656000" y="4335840"/>
-            <a:ext cx="7054560" cy="1062720"/>
+            <a:ext cx="7054200" cy="1062360"/>
           </a:xfrm>
           <a:prstGeom prst="rect">
             <a:avLst/>
@@ -29535,7 +29374,7 @@
         <p:spPr>
           <a:xfrm>
             <a:off x="2880000" y="504000"/>
-            <a:ext cx="3814920" cy="1078920"/>
+            <a:ext cx="3814560" cy="1078560"/>
           </a:xfrm>
           <a:prstGeom prst="rect">
             <a:avLst/>
@@ -29610,7 +29449,7 @@
         <p:spPr>
           <a:xfrm>
             <a:off x="2880000" y="2448000"/>
-            <a:ext cx="3814920" cy="2950920"/>
+            <a:ext cx="3814560" cy="2950560"/>
           </a:xfrm>
           <a:prstGeom prst="rect">
             <a:avLst/>
@@ -29705,7 +29544,7 @@
         <p:spPr>
           <a:xfrm>
             <a:off x="7416000" y="2952000"/>
-            <a:ext cx="1942920" cy="1006920"/>
+            <a:ext cx="1942560" cy="1006560"/>
           </a:xfrm>
           <a:prstGeom prst="rect">
             <a:avLst/>
@@ -29760,7 +29599,7 @@
         <p:spPr>
           <a:xfrm>
             <a:off x="216000" y="2952000"/>
-            <a:ext cx="1942920" cy="1006920"/>
+            <a:ext cx="1942560" cy="1006560"/>
           </a:xfrm>
           <a:prstGeom prst="rect">
             <a:avLst/>
@@ -29815,7 +29654,7 @@
         <p:spPr>
           <a:xfrm>
             <a:off x="4536000" y="1800000"/>
-            <a:ext cx="142920" cy="502920"/>
+            <a:ext cx="142560" cy="502560"/>
           </a:xfrm>
           <a:custGeom>
             <a:avLst/>
@@ -29876,7 +29715,7 @@
         <p:spPr>
           <a:xfrm>
             <a:off x="4788000" y="1764000"/>
-            <a:ext cx="142920" cy="502920"/>
+            <a:ext cx="142560" cy="502560"/>
           </a:xfrm>
           <a:custGeom>
             <a:avLst/>
@@ -29937,7 +29776,7 @@
         <p:spPr>
           <a:xfrm>
             <a:off x="2304000" y="3384000"/>
-            <a:ext cx="502920" cy="142920"/>
+            <a:ext cx="502560" cy="142560"/>
           </a:xfrm>
           <a:custGeom>
             <a:avLst/>
@@ -29998,7 +29837,7 @@
         <p:spPr>
           <a:xfrm>
             <a:off x="6804000" y="3384360"/>
-            <a:ext cx="502920" cy="142920"/>
+            <a:ext cx="502560" cy="142560"/>
           </a:xfrm>
           <a:custGeom>
             <a:avLst/>
@@ -30089,7 +29928,7 @@
         <p:spPr>
           <a:xfrm>
             <a:off x="3060000" y="2268000"/>
-            <a:ext cx="1431720" cy="783720"/>
+            <a:ext cx="1431360" cy="783360"/>
           </a:xfrm>
           <a:prstGeom prst="rect">
             <a:avLst/>
@@ -30144,7 +29983,7 @@
         <p:spPr>
           <a:xfrm>
             <a:off x="5832000" y="1980000"/>
-            <a:ext cx="1431720" cy="1359720"/>
+            <a:ext cx="1431360" cy="1359360"/>
           </a:xfrm>
           <a:custGeom>
             <a:avLst/>
@@ -30296,7 +30135,7 @@
         <p:spPr>
           <a:xfrm>
             <a:off x="2376000" y="1044000"/>
-            <a:ext cx="1143720" cy="675720"/>
+            <a:ext cx="1143360" cy="675360"/>
           </a:xfrm>
           <a:prstGeom prst="ellipse">
             <a:avLst/>
@@ -30351,7 +30190,7 @@
         <p:spPr>
           <a:xfrm>
             <a:off x="3780360" y="1044360"/>
-            <a:ext cx="1143720" cy="675720"/>
+            <a:ext cx="1143360" cy="675360"/>
           </a:xfrm>
           <a:prstGeom prst="ellipse">
             <a:avLst/>
@@ -30406,7 +30245,7 @@
         <p:spPr>
           <a:xfrm>
             <a:off x="2376360" y="1044360"/>
-            <a:ext cx="1143720" cy="675720"/>
+            <a:ext cx="1143360" cy="675360"/>
           </a:xfrm>
           <a:prstGeom prst="ellipse">
             <a:avLst/>
@@ -30461,7 +30300,7 @@
         <p:spPr>
           <a:xfrm>
             <a:off x="1512720" y="2160720"/>
-            <a:ext cx="1143720" cy="675720"/>
+            <a:ext cx="1143360" cy="675360"/>
           </a:xfrm>
           <a:prstGeom prst="ellipse">
             <a:avLst/>
@@ -30597,7 +30436,7 @@
         <p:spPr>
           <a:xfrm>
             <a:off x="4500000" y="2376000"/>
-            <a:ext cx="1395720" cy="594000"/>
+            <a:ext cx="1395360" cy="593640"/>
           </a:xfrm>
           <a:prstGeom prst="rect">
             <a:avLst/>
@@ -30648,7 +30487,7 @@
         <p:spPr>
           <a:xfrm>
             <a:off x="4320000" y="3204360"/>
-            <a:ext cx="1395720" cy="594000"/>
+            <a:ext cx="1395360" cy="593640"/>
           </a:xfrm>
           <a:prstGeom prst="rect">
             <a:avLst/>
@@ -30729,7 +30568,7 @@
         <p:spPr>
           <a:xfrm>
             <a:off x="864000" y="1080000"/>
-            <a:ext cx="3095280" cy="3455280"/>
+            <a:ext cx="3094920" cy="3454920"/>
           </a:xfrm>
           <a:prstGeom prst="rect">
             <a:avLst/>
@@ -30784,7 +30623,7 @@
         <p:spPr>
           <a:xfrm>
             <a:off x="3384000" y="1656000"/>
-            <a:ext cx="575280" cy="935280"/>
+            <a:ext cx="574920" cy="934920"/>
           </a:xfrm>
           <a:prstGeom prst="rect">
             <a:avLst/>
@@ -30879,7 +30718,7 @@
         <p:spPr>
           <a:xfrm>
             <a:off x="3384000" y="2952000"/>
-            <a:ext cx="575280" cy="1007280"/>
+            <a:ext cx="574920" cy="1006920"/>
           </a:xfrm>
           <a:prstGeom prst="rect">
             <a:avLst/>
@@ -30974,7 +30813,7 @@
         <p:spPr>
           <a:xfrm>
             <a:off x="5832000" y="1692000"/>
-            <a:ext cx="2231280" cy="2159280"/>
+            <a:ext cx="2230920" cy="2158920"/>
           </a:xfrm>
           <a:prstGeom prst="rect">
             <a:avLst/>
@@ -31029,7 +30868,7 @@
         <p:spPr>
           <a:xfrm>
             <a:off x="3960000" y="2016000"/>
-            <a:ext cx="1871280" cy="215280"/>
+            <a:ext cx="1870920" cy="214920"/>
           </a:xfrm>
           <a:custGeom>
             <a:avLst/>
@@ -31090,7 +30929,7 @@
         <p:spPr>
           <a:xfrm>
             <a:off x="3960000" y="3168000"/>
-            <a:ext cx="1871280" cy="287280"/>
+            <a:ext cx="1870920" cy="286920"/>
           </a:xfrm>
           <a:custGeom>
             <a:avLst/>
@@ -31188,7 +31027,7 @@
         <p:spPr>
           <a:xfrm>
             <a:off x="4320000" y="4428000"/>
-            <a:ext cx="2519280" cy="345600"/>
+            <a:ext cx="2518920" cy="345240"/>
           </a:xfrm>
           <a:prstGeom prst="rect">
             <a:avLst/>
@@ -31239,7 +31078,7 @@
         <p:spPr>
           <a:xfrm>
             <a:off x="4536000" y="2916000"/>
-            <a:ext cx="2519280" cy="345600"/>
+            <a:ext cx="2518920" cy="345240"/>
           </a:xfrm>
           <a:prstGeom prst="rect">
             <a:avLst/>
@@ -31290,7 +31129,7 @@
         <p:spPr>
           <a:xfrm>
             <a:off x="4248000" y="1764000"/>
-            <a:ext cx="2519280" cy="345600"/>
+            <a:ext cx="2518920" cy="345240"/>
           </a:xfrm>
           <a:prstGeom prst="rect">
             <a:avLst/>
@@ -31371,7 +31210,7 @@
         <p:spPr>
           <a:xfrm>
             <a:off x="720000" y="1800000"/>
-            <a:ext cx="1655640" cy="1007640"/>
+            <a:ext cx="1655280" cy="1007280"/>
           </a:xfrm>
           <a:prstGeom prst="rect">
             <a:avLst/>
@@ -31426,7 +31265,7 @@
         <p:spPr>
           <a:xfrm>
             <a:off x="2844000" y="1800000"/>
-            <a:ext cx="1655640" cy="1007640"/>
+            <a:ext cx="1655280" cy="1007280"/>
           </a:xfrm>
           <a:prstGeom prst="rect">
             <a:avLst/>
@@ -31481,7 +31320,7 @@
         <p:spPr>
           <a:xfrm>
             <a:off x="4932000" y="1800000"/>
-            <a:ext cx="1655640" cy="1007640"/>
+            <a:ext cx="1655280" cy="1007280"/>
           </a:xfrm>
           <a:prstGeom prst="rect">
             <a:avLst/>
@@ -31536,7 +31375,7 @@
         <p:spPr>
           <a:xfrm>
             <a:off x="7056000" y="1800000"/>
-            <a:ext cx="1655640" cy="1007640"/>
+            <a:ext cx="1655280" cy="1007280"/>
           </a:xfrm>
           <a:prstGeom prst="rect">
             <a:avLst/>
@@ -31591,7 +31430,7 @@
         <p:spPr>
           <a:xfrm>
             <a:off x="288000" y="3456000"/>
-            <a:ext cx="9215640" cy="791640"/>
+            <a:ext cx="9215280" cy="791280"/>
           </a:xfrm>
           <a:custGeom>
             <a:avLst/>
@@ -31661,7 +31500,7 @@
         <p:spPr>
           <a:xfrm>
             <a:off x="1404000" y="2808000"/>
-            <a:ext cx="287640" cy="899640"/>
+            <a:ext cx="287280" cy="899280"/>
           </a:xfrm>
           <a:custGeom>
             <a:avLst/>
@@ -31722,7 +31561,7 @@
         <p:spPr>
           <a:xfrm>
             <a:off x="3456000" y="2772000"/>
-            <a:ext cx="287640" cy="935640"/>
+            <a:ext cx="287280" cy="935280"/>
           </a:xfrm>
           <a:custGeom>
             <a:avLst/>
@@ -31783,7 +31622,7 @@
         <p:spPr>
           <a:xfrm>
             <a:off x="5544000" y="2808000"/>
-            <a:ext cx="287640" cy="935640"/>
+            <a:ext cx="287280" cy="935280"/>
           </a:xfrm>
           <a:custGeom>
             <a:avLst/>
@@ -31853,7 +31692,7 @@
         <p:spPr>
           <a:xfrm>
             <a:off x="7740360" y="2808360"/>
-            <a:ext cx="287640" cy="935640"/>
+            <a:ext cx="287280" cy="935280"/>
           </a:xfrm>
           <a:custGeom>
             <a:avLst/>
@@ -31953,7 +31792,7 @@
         <p:spPr>
           <a:xfrm>
             <a:off x="864000" y="1152000"/>
-            <a:ext cx="1655640" cy="1151640"/>
+            <a:ext cx="1655280" cy="1151280"/>
           </a:xfrm>
           <a:prstGeom prst="rect">
             <a:avLst/>
@@ -32008,7 +31847,7 @@
         <p:spPr>
           <a:xfrm>
             <a:off x="3420000" y="1152000"/>
-            <a:ext cx="1655640" cy="1151640"/>
+            <a:ext cx="1655280" cy="1151280"/>
           </a:xfrm>
           <a:prstGeom prst="rect">
             <a:avLst/>
@@ -32063,7 +31902,7 @@
         <p:spPr>
           <a:xfrm>
             <a:off x="2304000" y="3996000"/>
-            <a:ext cx="1655640" cy="1151640"/>
+            <a:ext cx="1655280" cy="1151280"/>
           </a:xfrm>
           <a:prstGeom prst="rect">
             <a:avLst/>
@@ -32118,7 +31957,7 @@
         <p:spPr>
           <a:xfrm>
             <a:off x="7308000" y="1440000"/>
-            <a:ext cx="1655640" cy="1151640"/>
+            <a:ext cx="1655280" cy="1151280"/>
           </a:xfrm>
           <a:prstGeom prst="rect">
             <a:avLst/>
@@ -32173,7 +32012,7 @@
         <p:spPr>
           <a:xfrm>
             <a:off x="7308000" y="3204000"/>
-            <a:ext cx="1655640" cy="1151640"/>
+            <a:ext cx="1655280" cy="1151280"/>
           </a:xfrm>
           <a:prstGeom prst="rect">
             <a:avLst/>
@@ -32228,7 +32067,7 @@
         <p:spPr>
           <a:xfrm>
             <a:off x="6444000" y="1008000"/>
-            <a:ext cx="503640" cy="4247640"/>
+            <a:ext cx="503280" cy="4247280"/>
           </a:xfrm>
           <a:custGeom>
             <a:avLst/>
@@ -32298,7 +32137,7 @@
         <p:spPr>
           <a:xfrm>
             <a:off x="3996000" y="4104000"/>
-            <a:ext cx="2591640" cy="719640"/>
+            <a:ext cx="2591280" cy="719280"/>
           </a:xfrm>
           <a:custGeom>
             <a:avLst/>
@@ -32368,7 +32207,7 @@
         <p:spPr>
           <a:xfrm>
             <a:off x="288000" y="2952000"/>
-            <a:ext cx="5183640" cy="359640"/>
+            <a:ext cx="5183280" cy="359280"/>
           </a:xfrm>
           <a:custGeom>
             <a:avLst/>
@@ -32438,7 +32277,7 @@
         <p:spPr>
           <a:xfrm>
             <a:off x="6804000" y="1944000"/>
-            <a:ext cx="467640" cy="215640"/>
+            <a:ext cx="467280" cy="215280"/>
           </a:xfrm>
           <a:custGeom>
             <a:avLst/>
@@ -32499,7 +32338,7 @@
         <p:spPr>
           <a:xfrm>
             <a:off x="6804000" y="3708000"/>
-            <a:ext cx="467640" cy="215640"/>
+            <a:ext cx="467280" cy="215280"/>
           </a:xfrm>
           <a:custGeom>
             <a:avLst/>
@@ -32560,7 +32399,7 @@
         <p:spPr>
           <a:xfrm>
             <a:off x="4068000" y="2304000"/>
-            <a:ext cx="287640" cy="719640"/>
+            <a:ext cx="287280" cy="719280"/>
           </a:xfrm>
           <a:custGeom>
             <a:avLst/>
@@ -32630,7 +32469,7 @@
         <p:spPr>
           <a:xfrm>
             <a:off x="1476360" y="2304360"/>
-            <a:ext cx="287640" cy="719640"/>
+            <a:ext cx="287280" cy="719280"/>
           </a:xfrm>
           <a:custGeom>
             <a:avLst/>
@@ -32700,7 +32539,7 @@
         <p:spPr>
           <a:xfrm>
             <a:off x="2952360" y="3240360"/>
-            <a:ext cx="287640" cy="719640"/>
+            <a:ext cx="287280" cy="719280"/>
           </a:xfrm>
           <a:custGeom>
             <a:avLst/>
@@ -32791,76 +32630,896 @@
           <a:chExt cx="0" cy="0"/>
         </a:xfrm>
       </p:grpSpPr>
-      <p:sp>
-        <p:nvSpPr>
-          <p:cNvPr id="647" name="CustomShape 1"/>
-          <p:cNvSpPr/>
-          <p:nvPr/>
-        </p:nvSpPr>
-        <p:spPr>
-          <a:xfrm>
-            <a:off x="4392000" y="648000"/>
-            <a:ext cx="503640" cy="4679640"/>
-          </a:xfrm>
-          <a:custGeom>
-            <a:avLst/>
-            <a:gdLst/>
-            <a:ahLst/>
-            <a:rect l="l" t="t" r="r" b="b"/>
-            <a:pathLst>
-              <a:path w="1401" h="13002">
-                <a:moveTo>
-                  <a:pt x="0" y="1392"/>
-                </a:moveTo>
-                <a:lnTo>
-                  <a:pt x="700" y="0"/>
-                </a:lnTo>
-                <a:lnTo>
-                  <a:pt x="1400" y="1392"/>
-                </a:lnTo>
-                <a:lnTo>
-                  <a:pt x="940" y="1392"/>
-                </a:lnTo>
-                <a:lnTo>
-                  <a:pt x="940" y="11608"/>
-                </a:lnTo>
-                <a:lnTo>
-                  <a:pt x="1400" y="11608"/>
-                </a:lnTo>
-                <a:lnTo>
-                  <a:pt x="700" y="13001"/>
-                </a:lnTo>
-                <a:lnTo>
-                  <a:pt x="0" y="11608"/>
-                </a:lnTo>
-                <a:lnTo>
-                  <a:pt x="460" y="11608"/>
-                </a:lnTo>
-                <a:lnTo>
-                  <a:pt x="460" y="1392"/>
-                </a:lnTo>
-                <a:lnTo>
-                  <a:pt x="0" y="1392"/>
-                </a:lnTo>
-              </a:path>
-            </a:pathLst>
-          </a:custGeom>
-          <a:solidFill>
-            <a:srgbClr val="729fcf"/>
-          </a:solidFill>
-          <a:ln>
-            <a:solidFill>
-              <a:srgbClr val="3465a4"/>
-            </a:solidFill>
-          </a:ln>
-        </p:spPr>
-        <p:style>
-          <a:lnRef idx="0"/>
-          <a:fillRef idx="0"/>
-          <a:effectRef idx="0"/>
-          <a:fontRef idx="minor"/>
-        </p:style>
-      </p:sp>
+      <p:graphicFrame>
+        <p:nvGraphicFramePr>
+          <p:cNvPr id="647" name="Table 1"/>
+          <p:cNvGraphicFramePr/>
+          <p:nvPr/>
+        </p:nvGraphicFramePr>
+        <p:xfrm>
+          <a:off x="1080000" y="1335960"/>
+          <a:ext cx="4347360" cy="410040"/>
+        </p:xfrm>
+        <a:graphic>
+          <a:graphicData uri="http://schemas.openxmlformats.org/drawingml/2006/table">
+            <a:tbl>
+              <a:tblPr/>
+              <a:tblGrid>
+                <a:gridCol w="2173680"/>
+                <a:gridCol w="2173680"/>
+              </a:tblGrid>
+              <a:tr h="410400">
+                <a:tc>
+                  <a:txBody>
+                    <a:bodyPr lIns="90000" rIns="90000" tIns="46800" bIns="46800">
+                      <a:noAutofit/>
+                    </a:bodyPr>
+                    <a:p>
+                      <a:r>
+                        <a:rPr b="0" lang="en-IN" sz="1800" spc="-1" strike="noStrike">
+                          <a:latin typeface="Arial"/>
+                        </a:rPr>
+                        <a:t>opcode</a:t>
+                      </a:r>
+                      <a:endParaRPr b="0" lang="en-IN" sz="1800" spc="-1" strike="noStrike">
+                        <a:latin typeface="Arial"/>
+                      </a:endParaRPr>
+                    </a:p>
+                  </a:txBody>
+                  <a:tcPr marL="90000" marR="90000">
+                    <a:lnL w="720">
+                      <a:solidFill>
+                        <a:srgbClr val="ffffff"/>
+                      </a:solidFill>
+                    </a:lnL>
+                    <a:lnR w="720">
+                      <a:solidFill>
+                        <a:srgbClr val="ffffff"/>
+                      </a:solidFill>
+                    </a:lnR>
+                    <a:lnT w="720">
+                      <a:solidFill>
+                        <a:srgbClr val="ffffff"/>
+                      </a:solidFill>
+                    </a:lnT>
+                    <a:lnB w="720">
+                      <a:solidFill>
+                        <a:srgbClr val="ffffff"/>
+                      </a:solidFill>
+                    </a:lnB>
+                    <a:solidFill>
+                      <a:srgbClr val="b3b3b3"/>
+                    </a:solidFill>
+                  </a:tcPr>
+                </a:tc>
+                <a:tc>
+                  <a:txBody>
+                    <a:bodyPr lIns="90000" rIns="90000" tIns="46800" bIns="46800">
+                      <a:noAutofit/>
+                    </a:bodyPr>
+                    <a:p>
+                      <a:r>
+                        <a:rPr b="0" lang="en-IN" sz="1800" spc="-1" strike="noStrike">
+                          <a:latin typeface="Arial"/>
+                        </a:rPr>
+                        <a:t>Operand address</a:t>
+                      </a:r>
+                      <a:endParaRPr b="0" lang="en-IN" sz="1800" spc="-1" strike="noStrike">
+                        <a:latin typeface="Arial"/>
+                      </a:endParaRPr>
+                    </a:p>
+                  </a:txBody>
+                  <a:tcPr marL="90000" marR="90000">
+                    <a:lnL w="720">
+                      <a:solidFill>
+                        <a:srgbClr val="ffffff"/>
+                      </a:solidFill>
+                    </a:lnL>
+                    <a:lnR w="720">
+                      <a:solidFill>
+                        <a:srgbClr val="ffffff"/>
+                      </a:solidFill>
+                    </a:lnR>
+                    <a:lnT w="720">
+                      <a:solidFill>
+                        <a:srgbClr val="ffffff"/>
+                      </a:solidFill>
+                    </a:lnT>
+                    <a:lnB w="720">
+                      <a:solidFill>
+                        <a:srgbClr val="ffffff"/>
+                      </a:solidFill>
+                    </a:lnB>
+                    <a:solidFill>
+                      <a:srgbClr val="b3b3b3"/>
+                    </a:solidFill>
+                  </a:tcPr>
+                </a:tc>
+              </a:tr>
+            </a:tbl>
+          </a:graphicData>
+        </a:graphic>
+      </p:graphicFrame>
+      <p:graphicFrame>
+        <p:nvGraphicFramePr>
+          <p:cNvPr id="648" name="Table 2"/>
+          <p:cNvGraphicFramePr/>
+          <p:nvPr/>
+        </p:nvGraphicFramePr>
+        <p:xfrm>
+          <a:off x="5984640" y="1195200"/>
+          <a:ext cx="5075280" cy="5670000"/>
+        </p:xfrm>
+        <a:graphic>
+          <a:graphicData uri="http://schemas.openxmlformats.org/drawingml/2006/table">
+            <a:tbl>
+              <a:tblPr/>
+              <a:tblGrid>
+                <a:gridCol w="3083400"/>
+              </a:tblGrid>
+              <a:tr h="447480">
+                <a:tc>
+                  <a:tcPr marL="90000" marR="90000">
+                    <a:lnL w="720">
+                      <a:solidFill>
+                        <a:srgbClr val="ffffff"/>
+                      </a:solidFill>
+                    </a:lnL>
+                    <a:lnR w="720">
+                      <a:solidFill>
+                        <a:srgbClr val="ffffff"/>
+                      </a:solidFill>
+                    </a:lnR>
+                    <a:lnT w="720">
+                      <a:solidFill>
+                        <a:srgbClr val="ffffff"/>
+                      </a:solidFill>
+                    </a:lnT>
+                    <a:lnB w="720">
+                      <a:solidFill>
+                        <a:srgbClr val="ffffff"/>
+                      </a:solidFill>
+                    </a:lnB>
+                    <a:solidFill>
+                      <a:srgbClr val="b3b3b3"/>
+                    </a:solidFill>
+                  </a:tcPr>
+                </a:tc>
+              </a:tr>
+              <a:tr h="428040">
+                <a:tc>
+                  <a:tcPr marL="90000" marR="90000">
+                    <a:lnL w="720">
+                      <a:solidFill>
+                        <a:srgbClr val="ffffff"/>
+                      </a:solidFill>
+                    </a:lnL>
+                    <a:lnR w="720">
+                      <a:solidFill>
+                        <a:srgbClr val="ffffff"/>
+                      </a:solidFill>
+                    </a:lnR>
+                    <a:lnT w="720">
+                      <a:solidFill>
+                        <a:srgbClr val="ffffff"/>
+                      </a:solidFill>
+                    </a:lnT>
+                    <a:lnB w="720">
+                      <a:solidFill>
+                        <a:srgbClr val="ffffff"/>
+                      </a:solidFill>
+                    </a:lnB>
+                    <a:solidFill>
+                      <a:srgbClr val="cccccc"/>
+                    </a:solidFill>
+                  </a:tcPr>
+                </a:tc>
+              </a:tr>
+              <a:tr h="441720">
+                <a:tc>
+                  <a:tcPr marL="90000" marR="90000">
+                    <a:lnL w="720">
+                      <a:solidFill>
+                        <a:srgbClr val="ffffff"/>
+                      </a:solidFill>
+                    </a:lnL>
+                    <a:lnR w="720">
+                      <a:solidFill>
+                        <a:srgbClr val="ffffff"/>
+                      </a:solidFill>
+                    </a:lnR>
+                    <a:lnT w="720">
+                      <a:solidFill>
+                        <a:srgbClr val="ffffff"/>
+                      </a:solidFill>
+                    </a:lnT>
+                    <a:lnB w="720">
+                      <a:solidFill>
+                        <a:srgbClr val="ffffff"/>
+                      </a:solidFill>
+                    </a:lnB>
+                    <a:solidFill>
+                      <a:srgbClr val="e6e6e6"/>
+                    </a:solidFill>
+                  </a:tcPr>
+                </a:tc>
+              </a:tr>
+              <a:tr h="414000">
+                <a:tc>
+                  <a:tcPr marL="90000" marR="90000">
+                    <a:lnL w="720">
+                      <a:solidFill>
+                        <a:srgbClr val="ffffff"/>
+                      </a:solidFill>
+                    </a:lnL>
+                    <a:lnR w="720">
+                      <a:solidFill>
+                        <a:srgbClr val="ffffff"/>
+                      </a:solidFill>
+                    </a:lnR>
+                    <a:lnT w="720">
+                      <a:solidFill>
+                        <a:srgbClr val="ffffff"/>
+                      </a:solidFill>
+                    </a:lnT>
+                    <a:lnB w="720">
+                      <a:solidFill>
+                        <a:srgbClr val="ffffff"/>
+                      </a:solidFill>
+                    </a:lnB>
+                    <a:solidFill>
+                      <a:srgbClr val="cccccc"/>
+                    </a:solidFill>
+                  </a:tcPr>
+                </a:tc>
+              </a:tr>
+              <a:tr h="372600">
+                <a:tc>
+                  <a:tcPr marL="90000" marR="90000">
+                    <a:lnL w="720">
+                      <a:solidFill>
+                        <a:srgbClr val="ffffff"/>
+                      </a:solidFill>
+                    </a:lnL>
+                    <a:lnR w="720">
+                      <a:solidFill>
+                        <a:srgbClr val="ffffff"/>
+                      </a:solidFill>
+                    </a:lnR>
+                    <a:lnT w="720">
+                      <a:solidFill>
+                        <a:srgbClr val="ffffff"/>
+                      </a:solidFill>
+                    </a:lnT>
+                    <a:lnB w="720">
+                      <a:solidFill>
+                        <a:srgbClr val="ffffff"/>
+                      </a:solidFill>
+                    </a:lnB>
+                    <a:solidFill>
+                      <a:srgbClr val="e6e6e6"/>
+                    </a:solidFill>
+                  </a:tcPr>
+                </a:tc>
+              </a:tr>
+              <a:tr h="428040">
+                <a:tc>
+                  <a:txBody>
+                    <a:bodyPr lIns="90000" rIns="90000" tIns="46800" bIns="46800">
+                      <a:noAutofit/>
+                    </a:bodyPr>
+                    <a:p>
+                      <a:r>
+                        <a:rPr b="0" lang="en-IN" sz="1800" spc="-1" strike="noStrike">
+                          <a:latin typeface="Arial"/>
+                        </a:rPr>
+                        <a:t>operand</a:t>
+                      </a:r>
+                      <a:endParaRPr b="0" lang="en-IN" sz="1800" spc="-1" strike="noStrike">
+                        <a:latin typeface="Arial"/>
+                      </a:endParaRPr>
+                    </a:p>
+                  </a:txBody>
+                  <a:tcPr marL="90000" marR="90000">
+                    <a:lnL w="720">
+                      <a:solidFill>
+                        <a:srgbClr val="ffffff"/>
+                      </a:solidFill>
+                    </a:lnL>
+                    <a:lnR w="720">
+                      <a:solidFill>
+                        <a:srgbClr val="ffffff"/>
+                      </a:solidFill>
+                    </a:lnR>
+                    <a:lnT w="720">
+                      <a:solidFill>
+                        <a:srgbClr val="ffffff"/>
+                      </a:solidFill>
+                    </a:lnT>
+                    <a:lnB w="720">
+                      <a:solidFill>
+                        <a:srgbClr val="ffffff"/>
+                      </a:solidFill>
+                    </a:lnB>
+                    <a:solidFill>
+                      <a:srgbClr val="cccccc"/>
+                    </a:solidFill>
+                  </a:tcPr>
+                </a:tc>
+              </a:tr>
+              <a:tr h="428040">
+                <a:tc>
+                  <a:tcPr marL="90000" marR="90000">
+                    <a:lnL w="720">
+                      <a:solidFill>
+                        <a:srgbClr val="ffffff"/>
+                      </a:solidFill>
+                    </a:lnL>
+                    <a:lnR w="720">
+                      <a:solidFill>
+                        <a:srgbClr val="ffffff"/>
+                      </a:solidFill>
+                    </a:lnR>
+                    <a:lnT w="720">
+                      <a:solidFill>
+                        <a:srgbClr val="ffffff"/>
+                      </a:solidFill>
+                    </a:lnT>
+                    <a:lnB w="720">
+                      <a:solidFill>
+                        <a:srgbClr val="ffffff"/>
+                      </a:solidFill>
+                    </a:lnB>
+                    <a:solidFill>
+                      <a:srgbClr val="e6e6e6"/>
+                    </a:solidFill>
+                  </a:tcPr>
+                </a:tc>
+              </a:tr>
+              <a:tr h="427680">
+                <a:tc>
+                  <a:tcPr marL="90000" marR="90000">
+                    <a:lnL w="720">
+                      <a:solidFill>
+                        <a:srgbClr val="ffffff"/>
+                      </a:solidFill>
+                    </a:lnL>
+                    <a:lnR w="720">
+                      <a:solidFill>
+                        <a:srgbClr val="ffffff"/>
+                      </a:solidFill>
+                    </a:lnR>
+                    <a:lnT w="720">
+                      <a:solidFill>
+                        <a:srgbClr val="ffffff"/>
+                      </a:solidFill>
+                    </a:lnT>
+                    <a:lnB w="720">
+                      <a:solidFill>
+                        <a:srgbClr val="ffffff"/>
+                      </a:solidFill>
+                    </a:lnB>
+                    <a:solidFill>
+                      <a:srgbClr val="cccccc"/>
+                    </a:solidFill>
+                  </a:tcPr>
+                </a:tc>
+              </a:tr>
+              <a:tr h="372960">
+                <a:tc>
+                  <a:tcPr marL="90000" marR="90000">
+                    <a:lnL w="720">
+                      <a:solidFill>
+                        <a:srgbClr val="ffffff"/>
+                      </a:solidFill>
+                    </a:lnL>
+                    <a:lnR w="720">
+                      <a:solidFill>
+                        <a:srgbClr val="ffffff"/>
+                      </a:solidFill>
+                    </a:lnR>
+                    <a:lnT w="720">
+                      <a:solidFill>
+                        <a:srgbClr val="ffffff"/>
+                      </a:solidFill>
+                    </a:lnT>
+                    <a:lnB w="720">
+                      <a:solidFill>
+                        <a:srgbClr val="ffffff"/>
+                      </a:solidFill>
+                    </a:lnB>
+                    <a:solidFill>
+                      <a:srgbClr val="e6e6e6"/>
+                    </a:solidFill>
+                  </a:tcPr>
+                </a:tc>
+              </a:tr>
+            </a:tbl>
+          </a:graphicData>
+        </a:graphic>
+      </p:graphicFrame>
+      <p:cxnSp>
+        <p:nvCxnSpPr>
+          <p:cNvPr id="649" name="Line 3"/>
+          <p:cNvCxnSpPr/>
+          <p:nvPr/>
+        </p:nvCxnSpPr>
+        <p:spPr>
+          <a:xfrm>
+            <a:off x="0" y="0"/>
+            <a:ext cx="360" cy="360"/>
+          </a:xfrm>
+          <a:prstGeom prst="line">
+            <a:avLst/>
+          </a:prstGeom>
+          <a:ln>
+            <a:solidFill>
+              <a:srgbClr val="3465a4"/>
+            </a:solidFill>
+            <a:tailEnd len="med" type="triangle" w="med"/>
+          </a:ln>
+        </p:spPr>
+      </p:cxnSp>
+    </p:spTree>
+  </p:cSld>
+  <mc:AlternateContent>
+    <mc:Choice Requires="p14">
+      <p:transition spd="slow" p14:dur="2000"/>
+    </mc:Choice>
+    <mc:Fallback>
+      <p:transition spd="slow"/>
+    </mc:Fallback>
+  </mc:AlternateContent>
+</p:sld>
+</file>
+
+<file path=ppt/slides/slide34.xml><?xml version="1.0" encoding="utf-8"?>
+<p:sld xmlns:a="http://schemas.openxmlformats.org/drawingml/2006/main" xmlns:p="http://schemas.openxmlformats.org/presentationml/2006/main" xmlns:r="http://schemas.openxmlformats.org/officeDocument/2006/relationships" xmlns:p14="http://schemas.microsoft.com/office/powerpoint/2010/main" xmlns:p15="http://schemas.microsoft.com/office/powerpoint/2012/main" xmlns:mc="http://schemas.openxmlformats.org/markup-compatibility/2006">
+  <p:cSld>
+    <p:spTree>
+      <p:nvGrpSpPr>
+        <p:cNvPr id="1" name=""/>
+        <p:cNvGrpSpPr/>
+        <p:nvPr/>
+      </p:nvGrpSpPr>
+      <p:grpSpPr>
+        <a:xfrm>
+          <a:off x="0" y="0"/>
+          <a:ext cx="0" cy="0"/>
+          <a:chOff x="0" y="0"/>
+          <a:chExt cx="0" cy="0"/>
+        </a:xfrm>
+      </p:grpSpPr>
+      <p:graphicFrame>
+        <p:nvGraphicFramePr>
+          <p:cNvPr id="650" name="Table 1"/>
+          <p:cNvGraphicFramePr/>
+          <p:nvPr/>
+        </p:nvGraphicFramePr>
+        <p:xfrm>
+          <a:off x="1080000" y="1335960"/>
+          <a:ext cx="4347360" cy="410040"/>
+        </p:xfrm>
+        <a:graphic>
+          <a:graphicData uri="http://schemas.openxmlformats.org/drawingml/2006/table">
+            <a:tbl>
+              <a:tblPr/>
+              <a:tblGrid>
+                <a:gridCol w="2173680"/>
+                <a:gridCol w="2173680"/>
+              </a:tblGrid>
+              <a:tr h="410400">
+                <a:tc>
+                  <a:txBody>
+                    <a:bodyPr lIns="90000" rIns="90000" tIns="46800" bIns="46800">
+                      <a:noAutofit/>
+                    </a:bodyPr>
+                    <a:p>
+                      <a:r>
+                        <a:rPr b="0" lang="en-IN" sz="1800" spc="-1" strike="noStrike">
+                          <a:latin typeface="Arial"/>
+                        </a:rPr>
+                        <a:t>opcode</a:t>
+                      </a:r>
+                      <a:endParaRPr b="0" lang="en-IN" sz="1800" spc="-1" strike="noStrike">
+                        <a:latin typeface="Arial"/>
+                      </a:endParaRPr>
+                    </a:p>
+                  </a:txBody>
+                  <a:tcPr marL="90000" marR="90000">
+                    <a:lnL w="720">
+                      <a:solidFill>
+                        <a:srgbClr val="ffffff"/>
+                      </a:solidFill>
+                    </a:lnL>
+                    <a:lnR w="720">
+                      <a:solidFill>
+                        <a:srgbClr val="ffffff"/>
+                      </a:solidFill>
+                    </a:lnR>
+                    <a:lnT w="720">
+                      <a:solidFill>
+                        <a:srgbClr val="ffffff"/>
+                      </a:solidFill>
+                    </a:lnT>
+                    <a:lnB w="720">
+                      <a:solidFill>
+                        <a:srgbClr val="ffffff"/>
+                      </a:solidFill>
+                    </a:lnB>
+                    <a:solidFill>
+                      <a:srgbClr val="b3b3b3"/>
+                    </a:solidFill>
+                  </a:tcPr>
+                </a:tc>
+                <a:tc>
+                  <a:txBody>
+                    <a:bodyPr lIns="90000" rIns="90000" tIns="46800" bIns="46800">
+                      <a:noAutofit/>
+                    </a:bodyPr>
+                    <a:p>
+                      <a:r>
+                        <a:rPr b="0" lang="en-IN" sz="1800" spc="-1" strike="noStrike">
+                          <a:latin typeface="Arial"/>
+                        </a:rPr>
+                        <a:t>Operand address</a:t>
+                      </a:r>
+                      <a:endParaRPr b="0" lang="en-IN" sz="1800" spc="-1" strike="noStrike">
+                        <a:latin typeface="Arial"/>
+                      </a:endParaRPr>
+                    </a:p>
+                  </a:txBody>
+                  <a:tcPr marL="90000" marR="90000">
+                    <a:lnL w="720">
+                      <a:solidFill>
+                        <a:srgbClr val="ffffff"/>
+                      </a:solidFill>
+                    </a:lnL>
+                    <a:lnR w="720">
+                      <a:solidFill>
+                        <a:srgbClr val="ffffff"/>
+                      </a:solidFill>
+                    </a:lnR>
+                    <a:lnT w="720">
+                      <a:solidFill>
+                        <a:srgbClr val="ffffff"/>
+                      </a:solidFill>
+                    </a:lnT>
+                    <a:lnB w="720">
+                      <a:solidFill>
+                        <a:srgbClr val="ffffff"/>
+                      </a:solidFill>
+                    </a:lnB>
+                    <a:solidFill>
+                      <a:srgbClr val="b3b3b3"/>
+                    </a:solidFill>
+                  </a:tcPr>
+                </a:tc>
+              </a:tr>
+            </a:tbl>
+          </a:graphicData>
+        </a:graphic>
+      </p:graphicFrame>
+      <p:graphicFrame>
+        <p:nvGraphicFramePr>
+          <p:cNvPr id="651" name="Table 2"/>
+          <p:cNvGraphicFramePr/>
+          <p:nvPr/>
+        </p:nvGraphicFramePr>
+        <p:xfrm>
+          <a:off x="5968800" y="1603080"/>
+          <a:ext cx="5075280" cy="5670000"/>
+        </p:xfrm>
+        <a:graphic>
+          <a:graphicData uri="http://schemas.openxmlformats.org/drawingml/2006/table">
+            <a:tbl>
+              <a:tblPr/>
+              <a:tblGrid>
+                <a:gridCol w="3083400"/>
+              </a:tblGrid>
+              <a:tr h="447480">
+                <a:tc>
+                  <a:tcPr marL="90000" marR="90000">
+                    <a:lnL w="720">
+                      <a:solidFill>
+                        <a:srgbClr val="ffffff"/>
+                      </a:solidFill>
+                    </a:lnL>
+                    <a:lnR w="720">
+                      <a:solidFill>
+                        <a:srgbClr val="ffffff"/>
+                      </a:solidFill>
+                    </a:lnR>
+                    <a:lnT w="720">
+                      <a:solidFill>
+                        <a:srgbClr val="ffffff"/>
+                      </a:solidFill>
+                    </a:lnT>
+                    <a:lnB w="720">
+                      <a:solidFill>
+                        <a:srgbClr val="ffffff"/>
+                      </a:solidFill>
+                    </a:lnB>
+                    <a:solidFill>
+                      <a:srgbClr val="b3b3b3"/>
+                    </a:solidFill>
+                  </a:tcPr>
+                </a:tc>
+              </a:tr>
+              <a:tr h="428040">
+                <a:tc>
+                  <a:tcPr marL="90000" marR="90000">
+                    <a:lnL w="720">
+                      <a:solidFill>
+                        <a:srgbClr val="ffffff"/>
+                      </a:solidFill>
+                    </a:lnL>
+                    <a:lnR w="720">
+                      <a:solidFill>
+                        <a:srgbClr val="ffffff"/>
+                      </a:solidFill>
+                    </a:lnR>
+                    <a:lnT w="720">
+                      <a:solidFill>
+                        <a:srgbClr val="ffffff"/>
+                      </a:solidFill>
+                    </a:lnT>
+                    <a:lnB w="720">
+                      <a:solidFill>
+                        <a:srgbClr val="ffffff"/>
+                      </a:solidFill>
+                    </a:lnB>
+                    <a:solidFill>
+                      <a:srgbClr val="cccccc"/>
+                    </a:solidFill>
+                  </a:tcPr>
+                </a:tc>
+              </a:tr>
+              <a:tr h="441720">
+                <a:tc>
+                  <a:tcPr marL="90000" marR="90000">
+                    <a:lnL w="720">
+                      <a:solidFill>
+                        <a:srgbClr val="ffffff"/>
+                      </a:solidFill>
+                    </a:lnL>
+                    <a:lnR w="720">
+                      <a:solidFill>
+                        <a:srgbClr val="ffffff"/>
+                      </a:solidFill>
+                    </a:lnR>
+                    <a:lnT w="720">
+                      <a:solidFill>
+                        <a:srgbClr val="ffffff"/>
+                      </a:solidFill>
+                    </a:lnT>
+                    <a:lnB w="720">
+                      <a:solidFill>
+                        <a:srgbClr val="ffffff"/>
+                      </a:solidFill>
+                    </a:lnB>
+                    <a:solidFill>
+                      <a:srgbClr val="e6e6e6"/>
+                    </a:solidFill>
+                  </a:tcPr>
+                </a:tc>
+              </a:tr>
+              <a:tr h="414000">
+                <a:tc>
+                  <a:tcPr marL="90000" marR="90000">
+                    <a:lnL w="720">
+                      <a:solidFill>
+                        <a:srgbClr val="ffffff"/>
+                      </a:solidFill>
+                    </a:lnL>
+                    <a:lnR w="720">
+                      <a:solidFill>
+                        <a:srgbClr val="ffffff"/>
+                      </a:solidFill>
+                    </a:lnR>
+                    <a:lnT w="720">
+                      <a:solidFill>
+                        <a:srgbClr val="ffffff"/>
+                      </a:solidFill>
+                    </a:lnT>
+                    <a:lnB w="720">
+                      <a:solidFill>
+                        <a:srgbClr val="ffffff"/>
+                      </a:solidFill>
+                    </a:lnB>
+                    <a:solidFill>
+                      <a:srgbClr val="cccccc"/>
+                    </a:solidFill>
+                  </a:tcPr>
+                </a:tc>
+              </a:tr>
+              <a:tr h="372600">
+                <a:tc>
+                  <a:tcPr marL="90000" marR="90000">
+                    <a:lnL w="720">
+                      <a:solidFill>
+                        <a:srgbClr val="ffffff"/>
+                      </a:solidFill>
+                    </a:lnL>
+                    <a:lnR w="720">
+                      <a:solidFill>
+                        <a:srgbClr val="ffffff"/>
+                      </a:solidFill>
+                    </a:lnR>
+                    <a:lnT w="720">
+                      <a:solidFill>
+                        <a:srgbClr val="ffffff"/>
+                      </a:solidFill>
+                    </a:lnT>
+                    <a:lnB w="720">
+                      <a:solidFill>
+                        <a:srgbClr val="ffffff"/>
+                      </a:solidFill>
+                    </a:lnB>
+                    <a:solidFill>
+                      <a:srgbClr val="e6e6e6"/>
+                    </a:solidFill>
+                  </a:tcPr>
+                </a:tc>
+              </a:tr>
+              <a:tr h="428040">
+                <a:tc>
+                  <a:txBody>
+                    <a:bodyPr lIns="90000" rIns="90000" tIns="46800" bIns="46800">
+                      <a:noAutofit/>
+                    </a:bodyPr>
+                    <a:p>
+                      <a:r>
+                        <a:rPr b="0" lang="en-IN" sz="1800" spc="-1" strike="noStrike">
+                          <a:latin typeface="Arial"/>
+                        </a:rPr>
+                        <a:t>operand</a:t>
+                      </a:r>
+                      <a:endParaRPr b="0" lang="en-IN" sz="1800" spc="-1" strike="noStrike">
+                        <a:latin typeface="Arial"/>
+                      </a:endParaRPr>
+                    </a:p>
+                  </a:txBody>
+                  <a:tcPr marL="90000" marR="90000">
+                    <a:lnL w="720">
+                      <a:solidFill>
+                        <a:srgbClr val="ffffff"/>
+                      </a:solidFill>
+                    </a:lnL>
+                    <a:lnR w="720">
+                      <a:solidFill>
+                        <a:srgbClr val="ffffff"/>
+                      </a:solidFill>
+                    </a:lnR>
+                    <a:lnT w="720">
+                      <a:solidFill>
+                        <a:srgbClr val="ffffff"/>
+                      </a:solidFill>
+                    </a:lnT>
+                    <a:lnB w="720">
+                      <a:solidFill>
+                        <a:srgbClr val="ffffff"/>
+                      </a:solidFill>
+                    </a:lnB>
+                    <a:solidFill>
+                      <a:srgbClr val="cccccc"/>
+                    </a:solidFill>
+                  </a:tcPr>
+                </a:tc>
+              </a:tr>
+              <a:tr h="428040">
+                <a:tc>
+                  <a:tcPr marL="90000" marR="90000">
+                    <a:lnL w="720">
+                      <a:solidFill>
+                        <a:srgbClr val="ffffff"/>
+                      </a:solidFill>
+                    </a:lnL>
+                    <a:lnR w="720">
+                      <a:solidFill>
+                        <a:srgbClr val="ffffff"/>
+                      </a:solidFill>
+                    </a:lnR>
+                    <a:lnT w="720">
+                      <a:solidFill>
+                        <a:srgbClr val="ffffff"/>
+                      </a:solidFill>
+                    </a:lnT>
+                    <a:lnB w="720">
+                      <a:solidFill>
+                        <a:srgbClr val="ffffff"/>
+                      </a:solidFill>
+                    </a:lnB>
+                    <a:solidFill>
+                      <a:srgbClr val="e6e6e6"/>
+                    </a:solidFill>
+                  </a:tcPr>
+                </a:tc>
+              </a:tr>
+              <a:tr h="427680">
+                <a:tc>
+                  <a:tcPr marL="90000" marR="90000">
+                    <a:lnL w="720">
+                      <a:solidFill>
+                        <a:srgbClr val="ffffff"/>
+                      </a:solidFill>
+                    </a:lnL>
+                    <a:lnR w="720">
+                      <a:solidFill>
+                        <a:srgbClr val="ffffff"/>
+                      </a:solidFill>
+                    </a:lnR>
+                    <a:lnT w="720">
+                      <a:solidFill>
+                        <a:srgbClr val="ffffff"/>
+                      </a:solidFill>
+                    </a:lnT>
+                    <a:lnB w="720">
+                      <a:solidFill>
+                        <a:srgbClr val="ffffff"/>
+                      </a:solidFill>
+                    </a:lnB>
+                    <a:solidFill>
+                      <a:srgbClr val="cccccc"/>
+                    </a:solidFill>
+                  </a:tcPr>
+                </a:tc>
+              </a:tr>
+              <a:tr h="372960">
+                <a:tc>
+                  <a:tcPr marL="90000" marR="90000">
+                    <a:lnL w="720">
+                      <a:solidFill>
+                        <a:srgbClr val="ffffff"/>
+                      </a:solidFill>
+                    </a:lnL>
+                    <a:lnR w="720">
+                      <a:solidFill>
+                        <a:srgbClr val="ffffff"/>
+                      </a:solidFill>
+                    </a:lnR>
+                    <a:lnT w="720">
+                      <a:solidFill>
+                        <a:srgbClr val="ffffff"/>
+                      </a:solidFill>
+                    </a:lnT>
+                    <a:lnB w="720">
+                      <a:solidFill>
+                        <a:srgbClr val="ffffff"/>
+                      </a:solidFill>
+                    </a:lnB>
+                    <a:solidFill>
+                      <a:srgbClr val="e6e6e6"/>
+                    </a:solidFill>
+                  </a:tcPr>
+                </a:tc>
+              </a:tr>
+            </a:tbl>
+          </a:graphicData>
+        </a:graphic>
+      </p:graphicFrame>
+      <p:cxnSp>
+        <p:nvCxnSpPr>
+          <p:cNvPr id="652" name="Line 3"/>
+          <p:cNvCxnSpPr/>
+          <p:nvPr/>
+        </p:nvCxnSpPr>
+        <p:spPr>
+          <a:xfrm>
+            <a:off x="0" y="0"/>
+            <a:ext cx="360" cy="360"/>
+          </a:xfrm>
+          <a:prstGeom prst="line">
+            <a:avLst/>
+          </a:prstGeom>
+          <a:ln>
+            <a:solidFill>
+              <a:srgbClr val="3465a4"/>
+            </a:solidFill>
+            <a:tailEnd len="med" type="triangle" w="med"/>
+          </a:ln>
+        </p:spPr>
+      </p:cxnSp>
     </p:spTree>
   </p:cSld>
   <mc:AlternateContent>
@@ -32900,7 +33559,7 @@
         <p:spPr>
           <a:xfrm>
             <a:off x="504000" y="576000"/>
-            <a:ext cx="424080" cy="1648080"/>
+            <a:ext cx="423720" cy="1647720"/>
           </a:xfrm>
           <a:prstGeom prst="ellipse">
             <a:avLst/>
@@ -32930,7 +33589,7 @@
         <p:spPr>
           <a:xfrm>
             <a:off x="1440360" y="576360"/>
-            <a:ext cx="424080" cy="1648080"/>
+            <a:ext cx="423720" cy="1647720"/>
           </a:xfrm>
           <a:prstGeom prst="ellipse">
             <a:avLst/>
@@ -32960,7 +33619,7 @@
         <p:spPr>
           <a:xfrm>
             <a:off x="3204720" y="612720"/>
-            <a:ext cx="424080" cy="1648080"/>
+            <a:ext cx="423720" cy="1647720"/>
           </a:xfrm>
           <a:prstGeom prst="ellipse">
             <a:avLst/>
@@ -32990,7 +33649,7 @@
         <p:spPr>
           <a:xfrm>
             <a:off x="4068720" y="576720"/>
-            <a:ext cx="424080" cy="1648080"/>
+            <a:ext cx="423720" cy="1647720"/>
           </a:xfrm>
           <a:prstGeom prst="ellipse">
             <a:avLst/>
@@ -33020,7 +33679,7 @@
         <p:spPr>
           <a:xfrm>
             <a:off x="504720" y="3204720"/>
-            <a:ext cx="424080" cy="1648080"/>
+            <a:ext cx="423720" cy="1647720"/>
           </a:xfrm>
           <a:prstGeom prst="ellipse">
             <a:avLst/>
@@ -33050,7 +33709,7 @@
         <p:spPr>
           <a:xfrm>
             <a:off x="1440720" y="3168720"/>
-            <a:ext cx="424080" cy="1648080"/>
+            <a:ext cx="423720" cy="1647720"/>
           </a:xfrm>
           <a:prstGeom prst="ellipse">
             <a:avLst/>
@@ -33080,7 +33739,7 @@
         <p:spPr>
           <a:xfrm>
             <a:off x="3240720" y="3168720"/>
-            <a:ext cx="424080" cy="1648080"/>
+            <a:ext cx="423720" cy="1647720"/>
           </a:xfrm>
           <a:prstGeom prst="ellipse">
             <a:avLst/>
@@ -33110,7 +33769,7 @@
         <p:spPr>
           <a:xfrm>
             <a:off x="4068720" y="3168720"/>
-            <a:ext cx="424080" cy="1648080"/>
+            <a:ext cx="423720" cy="1647720"/>
           </a:xfrm>
           <a:prstGeom prst="ellipse">
             <a:avLst/>
@@ -33140,7 +33799,7 @@
         <p:spPr>
           <a:xfrm>
             <a:off x="540000" y="936000"/>
-            <a:ext cx="496080" cy="338400"/>
+            <a:ext cx="495720" cy="338040"/>
           </a:xfrm>
           <a:prstGeom prst="rect">
             <a:avLst/>
@@ -33191,7 +33850,7 @@
         <p:spPr>
           <a:xfrm>
             <a:off x="540000" y="1512000"/>
-            <a:ext cx="496080" cy="338400"/>
+            <a:ext cx="495720" cy="338040"/>
           </a:xfrm>
           <a:prstGeom prst="rect">
             <a:avLst/>
@@ -33242,7 +33901,7 @@
         <p:spPr>
           <a:xfrm>
             <a:off x="1512000" y="1512000"/>
-            <a:ext cx="496080" cy="338400"/>
+            <a:ext cx="495720" cy="338040"/>
           </a:xfrm>
           <a:prstGeom prst="rect">
             <a:avLst/>
@@ -33293,7 +33952,7 @@
         <p:spPr>
           <a:xfrm>
             <a:off x="1512000" y="900000"/>
-            <a:ext cx="496080" cy="338400"/>
+            <a:ext cx="495720" cy="338040"/>
           </a:xfrm>
           <a:prstGeom prst="rect">
             <a:avLst/>
@@ -33344,7 +34003,7 @@
         <p:spPr>
           <a:xfrm>
             <a:off x="540000" y="1260000"/>
-            <a:ext cx="496080" cy="338400"/>
+            <a:ext cx="495720" cy="338040"/>
           </a:xfrm>
           <a:prstGeom prst="rect">
             <a:avLst/>
@@ -33395,7 +34054,7 @@
         <p:spPr>
           <a:xfrm>
             <a:off x="1512000" y="1224000"/>
-            <a:ext cx="496080" cy="338400"/>
+            <a:ext cx="495720" cy="338040"/>
           </a:xfrm>
           <a:prstGeom prst="rect">
             <a:avLst/>
@@ -33446,7 +34105,7 @@
         <p:spPr>
           <a:xfrm>
             <a:off x="3240000" y="900000"/>
-            <a:ext cx="496080" cy="338400"/>
+            <a:ext cx="495720" cy="338040"/>
           </a:xfrm>
           <a:prstGeom prst="rect">
             <a:avLst/>
@@ -33497,7 +34156,7 @@
         <p:spPr>
           <a:xfrm>
             <a:off x="4104000" y="900000"/>
-            <a:ext cx="496080" cy="338400"/>
+            <a:ext cx="495720" cy="338040"/>
           </a:xfrm>
           <a:prstGeom prst="rect">
             <a:avLst/>
@@ -33548,7 +34207,7 @@
         <p:spPr>
           <a:xfrm>
             <a:off x="4104000" y="1224000"/>
-            <a:ext cx="496080" cy="338400"/>
+            <a:ext cx="495720" cy="338040"/>
           </a:xfrm>
           <a:prstGeom prst="rect">
             <a:avLst/>
@@ -33599,7 +34258,7 @@
         <p:spPr>
           <a:xfrm>
             <a:off x="4104000" y="1620000"/>
-            <a:ext cx="496080" cy="338400"/>
+            <a:ext cx="495720" cy="338040"/>
           </a:xfrm>
           <a:prstGeom prst="rect">
             <a:avLst/>
@@ -33650,7 +34309,7 @@
         <p:spPr>
           <a:xfrm>
             <a:off x="576000" y="3492000"/>
-            <a:ext cx="496080" cy="338400"/>
+            <a:ext cx="495720" cy="338040"/>
           </a:xfrm>
           <a:prstGeom prst="rect">
             <a:avLst/>
@@ -33701,7 +34360,7 @@
         <p:spPr>
           <a:xfrm>
             <a:off x="576000" y="3852000"/>
-            <a:ext cx="496080" cy="338400"/>
+            <a:ext cx="495720" cy="338040"/>
           </a:xfrm>
           <a:prstGeom prst="rect">
             <a:avLst/>
@@ -33752,7 +34411,7 @@
         <p:spPr>
           <a:xfrm>
             <a:off x="576000" y="4176000"/>
-            <a:ext cx="496080" cy="338400"/>
+            <a:ext cx="495720" cy="338040"/>
           </a:xfrm>
           <a:prstGeom prst="rect">
             <a:avLst/>
@@ -33803,7 +34462,7 @@
         <p:spPr>
           <a:xfrm>
             <a:off x="1476000" y="3492000"/>
-            <a:ext cx="496080" cy="338400"/>
+            <a:ext cx="495720" cy="338040"/>
           </a:xfrm>
           <a:prstGeom prst="rect">
             <a:avLst/>
@@ -33854,7 +34513,7 @@
         <p:spPr>
           <a:xfrm>
             <a:off x="3240000" y="3492000"/>
-            <a:ext cx="496080" cy="338400"/>
+            <a:ext cx="495720" cy="338040"/>
           </a:xfrm>
           <a:prstGeom prst="rect">
             <a:avLst/>
@@ -33905,7 +34564,7 @@
         <p:spPr>
           <a:xfrm>
             <a:off x="3276000" y="3960000"/>
-            <a:ext cx="496080" cy="338400"/>
+            <a:ext cx="495720" cy="338040"/>
           </a:xfrm>
           <a:prstGeom prst="rect">
             <a:avLst/>
@@ -33956,7 +34615,7 @@
         <p:spPr>
           <a:xfrm>
             <a:off x="4140000" y="3492000"/>
-            <a:ext cx="496080" cy="338400"/>
+            <a:ext cx="495720" cy="338040"/>
           </a:xfrm>
           <a:prstGeom prst="rect">
             <a:avLst/>
@@ -34007,7 +34666,7 @@
         <p:spPr>
           <a:xfrm>
             <a:off x="4140000" y="3924000"/>
-            <a:ext cx="496080" cy="338400"/>
+            <a:ext cx="495720" cy="338040"/>
           </a:xfrm>
           <a:prstGeom prst="rect">
             <a:avLst/>
@@ -34355,7 +35014,7 @@
         <p:spPr>
           <a:xfrm>
             <a:off x="540000" y="2412000"/>
-            <a:ext cx="1288080" cy="338400"/>
+            <a:ext cx="1287720" cy="338040"/>
           </a:xfrm>
           <a:prstGeom prst="rect">
             <a:avLst/>
@@ -34406,7 +35065,7 @@
         <p:spPr>
           <a:xfrm>
             <a:off x="3168000" y="2412000"/>
-            <a:ext cx="1432080" cy="388080"/>
+            <a:ext cx="1431720" cy="387720"/>
           </a:xfrm>
           <a:prstGeom prst="rect">
             <a:avLst/>
@@ -34457,7 +35116,7 @@
         <p:spPr>
           <a:xfrm>
             <a:off x="3168000" y="4968000"/>
-            <a:ext cx="1576080" cy="352080"/>
+            <a:ext cx="1575720" cy="351720"/>
           </a:xfrm>
           <a:prstGeom prst="rect">
             <a:avLst/>
@@ -34508,7 +35167,7 @@
         <p:spPr>
           <a:xfrm>
             <a:off x="504000" y="4968000"/>
-            <a:ext cx="1432080" cy="352080"/>
+            <a:ext cx="1431720" cy="351720"/>
           </a:xfrm>
           <a:prstGeom prst="rect">
             <a:avLst/>
@@ -34589,7 +35248,7 @@
         <p:spPr>
           <a:xfrm>
             <a:off x="1872000" y="1008000"/>
-            <a:ext cx="2080440" cy="784440"/>
+            <a:ext cx="2080080" cy="784080"/>
           </a:xfrm>
           <a:prstGeom prst="rect">
             <a:avLst/>
@@ -34619,7 +35278,7 @@
         <p:spPr>
           <a:xfrm>
             <a:off x="5328000" y="756000"/>
-            <a:ext cx="1648440" cy="1216440"/>
+            <a:ext cx="1648080" cy="1216080"/>
           </a:xfrm>
           <a:custGeom>
             <a:avLst/>
@@ -34672,7 +35331,7 @@
         <p:spPr>
           <a:xfrm>
             <a:off x="1872360" y="3672360"/>
-            <a:ext cx="2080440" cy="784440"/>
+            <a:ext cx="2080080" cy="784080"/>
           </a:xfrm>
           <a:prstGeom prst="rect">
             <a:avLst/>
@@ -34702,7 +35361,7 @@
         <p:spPr>
           <a:xfrm>
             <a:off x="5328360" y="3420360"/>
-            <a:ext cx="1648440" cy="1216440"/>
+            <a:ext cx="1648080" cy="1216080"/>
           </a:xfrm>
           <a:custGeom>
             <a:avLst/>
@@ -34810,7 +35469,7 @@
         <p:spPr>
           <a:xfrm>
             <a:off x="1188000" y="2304000"/>
-            <a:ext cx="6904440" cy="338760"/>
+            <a:ext cx="6904080" cy="338400"/>
           </a:xfrm>
           <a:prstGeom prst="rect">
             <a:avLst/>
@@ -34861,7 +35520,7 @@
         <p:spPr>
           <a:xfrm>
             <a:off x="1080000" y="4788000"/>
-            <a:ext cx="7156440" cy="594720"/>
+            <a:ext cx="7156080" cy="594360"/>
           </a:xfrm>
           <a:prstGeom prst="rect">
             <a:avLst/>
@@ -34942,7 +35601,7 @@
         <p:spPr>
           <a:xfrm>
             <a:off x="1908000" y="2232000"/>
-            <a:ext cx="1431720" cy="783720"/>
+            <a:ext cx="1431360" cy="783360"/>
           </a:xfrm>
           <a:prstGeom prst="rect">
             <a:avLst/>
@@ -34997,7 +35656,7 @@
         <p:spPr>
           <a:xfrm>
             <a:off x="6084000" y="2232000"/>
-            <a:ext cx="1431720" cy="783720"/>
+            <a:ext cx="1431360" cy="783360"/>
           </a:xfrm>
           <a:prstGeom prst="rect">
             <a:avLst/>
@@ -35052,7 +35711,7 @@
         <p:spPr>
           <a:xfrm>
             <a:off x="4032000" y="1944000"/>
-            <a:ext cx="1431720" cy="1359720"/>
+            <a:ext cx="1431360" cy="1359360"/>
           </a:xfrm>
           <a:custGeom>
             <a:avLst/>
@@ -35259,7 +35918,7 @@
         <p:spPr>
           <a:xfrm>
             <a:off x="2592000" y="3636000"/>
-            <a:ext cx="7120440" cy="594720"/>
+            <a:ext cx="7120080" cy="594360"/>
           </a:xfrm>
           <a:prstGeom prst="rect">
             <a:avLst/>
@@ -35360,7 +36019,7 @@
         <p:spPr>
           <a:xfrm>
             <a:off x="5934960" y="2130480"/>
-            <a:ext cx="1690200" cy="1001160"/>
+            <a:ext cx="1689840" cy="1000800"/>
           </a:xfrm>
           <a:prstGeom prst="rect">
             <a:avLst/>
@@ -35390,7 +36049,7 @@
         <p:spPr>
           <a:xfrm>
             <a:off x="1908000" y="2232000"/>
-            <a:ext cx="1431720" cy="783720"/>
+            <a:ext cx="1431360" cy="783360"/>
           </a:xfrm>
           <a:prstGeom prst="rect">
             <a:avLst/>
@@ -35445,7 +36104,7 @@
         <p:spPr>
           <a:xfrm>
             <a:off x="6084000" y="2232000"/>
-            <a:ext cx="1431720" cy="783720"/>
+            <a:ext cx="1431360" cy="783360"/>
           </a:xfrm>
           <a:prstGeom prst="rect">
             <a:avLst/>
@@ -35500,7 +36159,7 @@
         <p:spPr>
           <a:xfrm>
             <a:off x="4032000" y="1944000"/>
-            <a:ext cx="1431720" cy="1359720"/>
+            <a:ext cx="1431360" cy="1359360"/>
           </a:xfrm>
           <a:custGeom>
             <a:avLst/>
@@ -35659,7 +36318,7 @@
         <p:spPr>
           <a:xfrm>
             <a:off x="1764000" y="3564000"/>
-            <a:ext cx="7120440" cy="594720"/>
+            <a:ext cx="7120080" cy="594360"/>
           </a:xfrm>
           <a:prstGeom prst="rect">
             <a:avLst/>
@@ -35767,7 +36426,7 @@
         <p:spPr>
           <a:xfrm>
             <a:off x="1945800" y="3636000"/>
-            <a:ext cx="1431720" cy="783720"/>
+            <a:ext cx="1431360" cy="783360"/>
           </a:xfrm>
           <a:prstGeom prst="rect">
             <a:avLst/>
@@ -35842,7 +36501,7 @@
         <p:spPr>
           <a:xfrm>
             <a:off x="6300000" y="3673800"/>
-            <a:ext cx="1431720" cy="783720"/>
+            <a:ext cx="1431360" cy="783360"/>
           </a:xfrm>
           <a:prstGeom prst="rect">
             <a:avLst/>
@@ -35971,7 +36630,7 @@
         <p:spPr>
           <a:xfrm>
             <a:off x="1764000" y="4860000"/>
-            <a:ext cx="7120440" cy="594720"/>
+            <a:ext cx="7120080" cy="594360"/>
           </a:xfrm>
           <a:prstGeom prst="rect">
             <a:avLst/>
@@ -35997,7 +36656,7 @@
         <p:spPr>
           <a:xfrm>
             <a:off x="4140000" y="1080000"/>
-            <a:ext cx="1431720" cy="783720"/>
+            <a:ext cx="1431360" cy="783360"/>
           </a:xfrm>
           <a:prstGeom prst="rect">
             <a:avLst/>
@@ -36052,7 +36711,7 @@
         <p:spPr>
           <a:xfrm>
             <a:off x="4392000" y="2267640"/>
-            <a:ext cx="929520" cy="1001520"/>
+            <a:ext cx="929160" cy="1001160"/>
           </a:xfrm>
           <a:custGeom>
             <a:avLst/>
@@ -36101,7 +36760,7 @@
         <p:spPr>
           <a:xfrm>
             <a:off x="4572000" y="2304000"/>
-            <a:ext cx="641520" cy="339840"/>
+            <a:ext cx="641160" cy="339480"/>
           </a:xfrm>
           <a:prstGeom prst="rect">
             <a:avLst/>
@@ -36233,7 +36892,7 @@
         <p:spPr>
           <a:xfrm>
             <a:off x="2592000" y="432000"/>
-            <a:ext cx="1145520" cy="497520"/>
+            <a:ext cx="1145160" cy="497160"/>
           </a:xfrm>
           <a:prstGeom prst="ellipse">
             <a:avLst/>
@@ -36288,7 +36947,7 @@
         <p:spPr>
           <a:xfrm>
             <a:off x="4104360" y="360360"/>
-            <a:ext cx="1145520" cy="497520"/>
+            <a:ext cx="1145160" cy="497160"/>
           </a:xfrm>
           <a:prstGeom prst="ellipse">
             <a:avLst/>
@@ -36343,7 +37002,7 @@
         <p:spPr>
           <a:xfrm>
             <a:off x="5652720" y="432720"/>
-            <a:ext cx="1145520" cy="497520"/>
+            <a:ext cx="1145160" cy="497160"/>
           </a:xfrm>
           <a:prstGeom prst="ellipse">
             <a:avLst/>
@@ -36398,7 +37057,7 @@
         <p:spPr>
           <a:xfrm>
             <a:off x="3813480" y="4321080"/>
-            <a:ext cx="1145520" cy="497520"/>
+            <a:ext cx="1145160" cy="497160"/>
           </a:xfrm>
           <a:prstGeom prst="ellipse">
             <a:avLst/>
@@ -36453,7 +37112,7 @@
         <p:spPr>
           <a:xfrm>
             <a:off x="2193840" y="4717440"/>
-            <a:ext cx="1145520" cy="497520"/>
+            <a:ext cx="1145160" cy="497160"/>
           </a:xfrm>
           <a:prstGeom prst="ellipse">
             <a:avLst/>
@@ -36508,7 +37167,7 @@
         <p:spPr>
           <a:xfrm>
             <a:off x="682200" y="4501800"/>
-            <a:ext cx="1145520" cy="497520"/>
+            <a:ext cx="1145160" cy="497160"/>
           </a:xfrm>
           <a:prstGeom prst="ellipse">
             <a:avLst/>
@@ -36563,7 +37222,7 @@
         <p:spPr>
           <a:xfrm>
             <a:off x="5434560" y="4574160"/>
-            <a:ext cx="1145520" cy="497520"/>
+            <a:ext cx="1145160" cy="497160"/>
           </a:xfrm>
           <a:prstGeom prst="ellipse">
             <a:avLst/>
@@ -36618,7 +37277,7 @@
         <p:spPr>
           <a:xfrm>
             <a:off x="7634160" y="4574520"/>
-            <a:ext cx="1145520" cy="497520"/>
+            <a:ext cx="1145160" cy="497160"/>
           </a:xfrm>
           <a:prstGeom prst="ellipse">
             <a:avLst/>
@@ -36673,7 +37332,7 @@
         <p:spPr>
           <a:xfrm>
             <a:off x="686520" y="3098880"/>
-            <a:ext cx="1145520" cy="497520"/>
+            <a:ext cx="1145160" cy="497160"/>
           </a:xfrm>
           <a:prstGeom prst="ellipse">
             <a:avLst/>
@@ -37001,7 +37660,7 @@
         <p:spPr>
           <a:xfrm>
             <a:off x="432000" y="72000"/>
-            <a:ext cx="9065520" cy="2513520"/>
+            <a:ext cx="9065160" cy="2513160"/>
           </a:xfrm>
           <a:prstGeom prst="rect">
             <a:avLst/>
@@ -37031,7 +37690,7 @@
         <p:spPr>
           <a:xfrm>
             <a:off x="2016000" y="1188000"/>
-            <a:ext cx="1431720" cy="783720"/>
+            <a:ext cx="1431360" cy="783360"/>
           </a:xfrm>
           <a:prstGeom prst="rect">
             <a:avLst/>
@@ -37086,7 +37745,7 @@
         <p:spPr>
           <a:xfrm>
             <a:off x="6192000" y="1188000"/>
-            <a:ext cx="1431720" cy="783720"/>
+            <a:ext cx="1431360" cy="783360"/>
           </a:xfrm>
           <a:prstGeom prst="rect">
             <a:avLst/>
@@ -37141,7 +37800,7 @@
         <p:spPr>
           <a:xfrm>
             <a:off x="4140000" y="900000"/>
-            <a:ext cx="1431720" cy="1359720"/>
+            <a:ext cx="1431360" cy="1359360"/>
           </a:xfrm>
           <a:custGeom>
             <a:avLst/>
@@ -37300,7 +37959,7 @@
         <p:spPr>
           <a:xfrm>
             <a:off x="-36000" y="3384000"/>
-            <a:ext cx="2621520" cy="594720"/>
+            <a:ext cx="2621160" cy="594360"/>
           </a:xfrm>
           <a:prstGeom prst="rect">
             <a:avLst/>
@@ -37378,7 +38037,7 @@
         <p:spPr>
           <a:xfrm>
             <a:off x="5868360" y="180360"/>
-            <a:ext cx="1145520" cy="497520"/>
+            <a:ext cx="1145160" cy="497160"/>
           </a:xfrm>
           <a:prstGeom prst="ellipse">
             <a:avLst/>
@@ -37433,7 +38092,7 @@
         <p:spPr>
           <a:xfrm>
             <a:off x="7344720" y="216720"/>
-            <a:ext cx="1145520" cy="497520"/>
+            <a:ext cx="1145160" cy="497160"/>
           </a:xfrm>
           <a:prstGeom prst="ellipse">
             <a:avLst/>
@@ -37488,7 +38147,7 @@
         <p:spPr>
           <a:xfrm>
             <a:off x="7921080" y="937080"/>
-            <a:ext cx="1145520" cy="497520"/>
+            <a:ext cx="1145160" cy="497160"/>
           </a:xfrm>
           <a:prstGeom prst="ellipse">
             <a:avLst/>
@@ -37543,7 +38202,7 @@
         <p:spPr>
           <a:xfrm>
             <a:off x="7921440" y="1693440"/>
-            <a:ext cx="1145520" cy="497520"/>
+            <a:ext cx="1145160" cy="497160"/>
           </a:xfrm>
           <a:prstGeom prst="ellipse">
             <a:avLst/>
@@ -37598,7 +38257,7 @@
         <p:spPr>
           <a:xfrm>
             <a:off x="7921440" y="937440"/>
-            <a:ext cx="1145520" cy="497520"/>
+            <a:ext cx="1145160" cy="497160"/>
           </a:xfrm>
           <a:prstGeom prst="ellipse">
             <a:avLst/>
@@ -37653,7 +38312,7 @@
         <p:spPr>
           <a:xfrm>
             <a:off x="2089440" y="433440"/>
-            <a:ext cx="1145520" cy="497520"/>
+            <a:ext cx="1145160" cy="497160"/>
           </a:xfrm>
           <a:prstGeom prst="ellipse">
             <a:avLst/>
@@ -37708,7 +38367,7 @@
         <p:spPr>
           <a:xfrm>
             <a:off x="649800" y="541800"/>
-            <a:ext cx="1145520" cy="497520"/>
+            <a:ext cx="1145160" cy="497160"/>
           </a:xfrm>
           <a:prstGeom prst="ellipse">
             <a:avLst/>
@@ -37763,7 +38422,7 @@
         <p:spPr>
           <a:xfrm>
             <a:off x="4320000" y="3168000"/>
-            <a:ext cx="1035720" cy="785520"/>
+            <a:ext cx="1035360" cy="785160"/>
           </a:xfrm>
           <a:custGeom>
             <a:avLst/>
@@ -37841,7 +38500,7 @@
         <p:spPr>
           <a:xfrm>
             <a:off x="4176000" y="4428000"/>
-            <a:ext cx="1431720" cy="783720"/>
+            <a:ext cx="1431360" cy="783360"/>
           </a:xfrm>
           <a:prstGeom prst="rect">
             <a:avLst/>
@@ -37977,7 +38636,7 @@
         <p:spPr>
           <a:xfrm>
             <a:off x="5870160" y="3782160"/>
-            <a:ext cx="1145520" cy="497520"/>
+            <a:ext cx="1145160" cy="497160"/>
           </a:xfrm>
           <a:prstGeom prst="ellipse">
             <a:avLst/>
@@ -38032,7 +38691,7 @@
         <p:spPr>
           <a:xfrm>
             <a:off x="7380000" y="3115440"/>
-            <a:ext cx="2621520" cy="594720"/>
+            <a:ext cx="2621160" cy="594360"/>
           </a:xfrm>
           <a:prstGeom prst="rect">
             <a:avLst/>

</xml_diff>